<commit_message>
Updated slides, nearing a first alpha release!
</commit_message>
<xml_diff>
--- a/Lecture slides/AMOS A01 - Introduction.pptx
+++ b/Lecture slides/AMOS A01 - Introduction.pptx
@@ -6169,7 +6169,7 @@
             <a:tbl>
               <a:tblPr>
                 <a:noFill/>
-                <a:tableStyleId>{D973D59D-80B6-4277-942F-9DE558E24B74}</a:tableStyleId>
+                <a:tableStyleId>{F101E7ED-D1EF-464D-87EA-F2660209952C}</a:tableStyleId>
               </a:tblPr>
               <a:tblGrid>
                 <a:gridCol w="1314475"/>
@@ -13041,7 +13041,7 @@
             <a:tbl>
               <a:tblPr>
                 <a:noFill/>
-                <a:tableStyleId>{D973D59D-80B6-4277-942F-9DE558E24B74}</a:tableStyleId>
+                <a:tableStyleId>{F101E7ED-D1EF-464D-87EA-F2660209952C}</a:tableStyleId>
               </a:tblPr>
               <a:tblGrid>
                 <a:gridCol w="1314450"/>
@@ -15124,6 +15124,285 @@
 </file>
 
 <file path=ppt/theme/theme1.xml><?xml version="1.0" encoding="utf-8"?>
+<a:theme xmlns:a="http://schemas.openxmlformats.org/drawingml/2006/main" xmlns:r="http://schemas.openxmlformats.org/officeDocument/2006/relationships">
+  <a:themeElements>
+    <a:clrScheme name="Default">
+      <a:dk1>
+        <a:srgbClr val="000000"/>
+      </a:dk1>
+      <a:lt1>
+        <a:srgbClr val="FFFFFF"/>
+      </a:lt1>
+      <a:dk2>
+        <a:srgbClr val="158158"/>
+      </a:dk2>
+      <a:lt2>
+        <a:srgbClr val="F3F3F3"/>
+      </a:lt2>
+      <a:accent1>
+        <a:srgbClr val="058DC7"/>
+      </a:accent1>
+      <a:accent2>
+        <a:srgbClr val="50B432"/>
+      </a:accent2>
+      <a:accent3>
+        <a:srgbClr val="ED561B"/>
+      </a:accent3>
+      <a:accent4>
+        <a:srgbClr val="EDEF00"/>
+      </a:accent4>
+      <a:accent5>
+        <a:srgbClr val="24CBE5"/>
+      </a:accent5>
+      <a:accent6>
+        <a:srgbClr val="64E572"/>
+      </a:accent6>
+      <a:hlink>
+        <a:srgbClr val="2200CC"/>
+      </a:hlink>
+      <a:folHlink>
+        <a:srgbClr val="551A8B"/>
+      </a:folHlink>
+    </a:clrScheme>
+    <a:fontScheme name="Office">
+      <a:majorFont>
+        <a:latin typeface="Arial"/>
+        <a:ea typeface=""/>
+        <a:cs typeface=""/>
+        <a:font script="Jpan" typeface="ＭＳ Ｐゴシック"/>
+        <a:font script="Hang" typeface="맑은 고딕"/>
+        <a:font script="Hans" typeface="宋体"/>
+        <a:font script="Hant" typeface="新細明體"/>
+        <a:font script="Arab" typeface="Times New Roman"/>
+        <a:font script="Hebr" typeface="Times New Roman"/>
+        <a:font script="Thai" typeface="Angsana New"/>
+        <a:font script="Ethi" typeface="Nyala"/>
+        <a:font script="Beng" typeface="Vrinda"/>
+        <a:font script="Gujr" typeface="Shruti"/>
+        <a:font script="Khmr" typeface="MoolBoran"/>
+        <a:font script="Knda" typeface="Tunga"/>
+        <a:font script="Guru" typeface="Raavi"/>
+        <a:font script="Cans" typeface="Euphemia"/>
+        <a:font script="Cher" typeface="Plantagenet Cherokee"/>
+        <a:font script="Yiii" typeface="Microsoft Yi Baiti"/>
+        <a:font script="Tibt" typeface="Microsoft Himalaya"/>
+        <a:font script="Thaa" typeface="MV Boli"/>
+        <a:font script="Deva" typeface="Mangal"/>
+        <a:font script="Telu" typeface="Gautami"/>
+        <a:font script="Taml" typeface="Latha"/>
+        <a:font script="Syrc" typeface="Estrangelo Edessa"/>
+        <a:font script="Orya" typeface="Kalinga"/>
+        <a:font script="Mlym" typeface="Kartika"/>
+        <a:font script="Laoo" typeface="DokChampa"/>
+        <a:font script="Sinh" typeface="Iskoola Pota"/>
+        <a:font script="Mong" typeface="Mongolian Baiti"/>
+        <a:font script="Viet" typeface="Times New Roman"/>
+        <a:font script="Uigh" typeface="Microsoft Uighur"/>
+        <a:font script="Geor" typeface="Sylfaen"/>
+      </a:majorFont>
+      <a:minorFont>
+        <a:latin typeface="Arial"/>
+        <a:ea typeface=""/>
+        <a:cs typeface=""/>
+        <a:font script="Jpan" typeface="ＭＳ Ｐゴシック"/>
+        <a:font script="Hang" typeface="맑은 고딕"/>
+        <a:font script="Hans" typeface="宋体"/>
+        <a:font script="Hant" typeface="新細明體"/>
+        <a:font script="Arab" typeface="Arial"/>
+        <a:font script="Hebr" typeface="Arial"/>
+        <a:font script="Thai" typeface="Cordia New"/>
+        <a:font script="Ethi" typeface="Nyala"/>
+        <a:font script="Beng" typeface="Vrinda"/>
+        <a:font script="Gujr" typeface="Shruti"/>
+        <a:font script="Khmr" typeface="DaunPenh"/>
+        <a:font script="Knda" typeface="Tunga"/>
+        <a:font script="Guru" typeface="Raavi"/>
+        <a:font script="Cans" typeface="Euphemia"/>
+        <a:font script="Cher" typeface="Plantagenet Cherokee"/>
+        <a:font script="Yiii" typeface="Microsoft Yi Baiti"/>
+        <a:font script="Tibt" typeface="Microsoft Himalaya"/>
+        <a:font script="Thaa" typeface="MV Boli"/>
+        <a:font script="Deva" typeface="Mangal"/>
+        <a:font script="Telu" typeface="Gautami"/>
+        <a:font script="Taml" typeface="Latha"/>
+        <a:font script="Syrc" typeface="Estrangelo Edessa"/>
+        <a:font script="Orya" typeface="Kalinga"/>
+        <a:font script="Mlym" typeface="Kartika"/>
+        <a:font script="Laoo" typeface="DokChampa"/>
+        <a:font script="Sinh" typeface="Iskoola Pota"/>
+        <a:font script="Mong" typeface="Mongolian Baiti"/>
+        <a:font script="Viet" typeface="Arial"/>
+        <a:font script="Uigh" typeface="Microsoft Uighur"/>
+        <a:font script="Geor" typeface="Sylfaen"/>
+      </a:minorFont>
+    </a:fontScheme>
+    <a:fmtScheme name="Office">
+      <a:fillStyleLst>
+        <a:solidFill>
+          <a:schemeClr val="phClr"/>
+        </a:solidFill>
+        <a:gradFill rotWithShape="1">
+          <a:gsLst>
+            <a:gs pos="0">
+              <a:schemeClr val="phClr">
+                <a:tint val="50000"/>
+                <a:satMod val="300000"/>
+              </a:schemeClr>
+            </a:gs>
+            <a:gs pos="35000">
+              <a:schemeClr val="phClr">
+                <a:tint val="37000"/>
+                <a:satMod val="300000"/>
+              </a:schemeClr>
+            </a:gs>
+            <a:gs pos="100000">
+              <a:schemeClr val="phClr">
+                <a:tint val="15000"/>
+                <a:satMod val="350000"/>
+              </a:schemeClr>
+            </a:gs>
+          </a:gsLst>
+          <a:lin ang="16200000" scaled="1"/>
+        </a:gradFill>
+        <a:gradFill rotWithShape="1">
+          <a:gsLst>
+            <a:gs pos="0">
+              <a:schemeClr val="phClr">
+                <a:tint val="100000"/>
+                <a:shade val="100000"/>
+                <a:satMod val="130000"/>
+              </a:schemeClr>
+            </a:gs>
+            <a:gs pos="100000">
+              <a:schemeClr val="phClr">
+                <a:tint val="50000"/>
+                <a:shade val="100000"/>
+                <a:satMod val="350000"/>
+              </a:schemeClr>
+            </a:gs>
+          </a:gsLst>
+          <a:lin ang="16200000" scaled="0"/>
+        </a:gradFill>
+      </a:fillStyleLst>
+      <a:lnStyleLst>
+        <a:ln w="9525" cap="flat" cmpd="sng" algn="ctr">
+          <a:solidFill>
+            <a:schemeClr val="phClr">
+              <a:shade val="95000"/>
+              <a:satMod val="105000"/>
+            </a:schemeClr>
+          </a:solidFill>
+          <a:prstDash val="solid"/>
+        </a:ln>
+        <a:ln w="25400" cap="flat" cmpd="sng" algn="ctr">
+          <a:solidFill>
+            <a:schemeClr val="phClr"/>
+          </a:solidFill>
+          <a:prstDash val="solid"/>
+        </a:ln>
+        <a:ln w="38100" cap="flat" cmpd="sng" algn="ctr">
+          <a:solidFill>
+            <a:schemeClr val="phClr"/>
+          </a:solidFill>
+          <a:prstDash val="solid"/>
+        </a:ln>
+      </a:lnStyleLst>
+      <a:effectStyleLst>
+        <a:effectStyle>
+          <a:effectLst>
+            <a:outerShdw blurRad="40000" dist="20000" dir="5400000" rotWithShape="0">
+              <a:srgbClr val="000000">
+                <a:alpha val="38000"/>
+              </a:srgbClr>
+            </a:outerShdw>
+          </a:effectLst>
+        </a:effectStyle>
+        <a:effectStyle>
+          <a:effectLst>
+            <a:outerShdw blurRad="40000" dist="23000" dir="5400000" rotWithShape="0">
+              <a:srgbClr val="000000">
+                <a:alpha val="35000"/>
+              </a:srgbClr>
+            </a:outerShdw>
+          </a:effectLst>
+        </a:effectStyle>
+        <a:effectStyle>
+          <a:effectLst>
+            <a:outerShdw blurRad="40000" dist="23000" dir="5400000" rotWithShape="0">
+              <a:srgbClr val="000000">
+                <a:alpha val="35000"/>
+              </a:srgbClr>
+            </a:outerShdw>
+          </a:effectLst>
+          <a:scene3d>
+            <a:camera prst="orthographicFront">
+              <a:rot lat="0" lon="0" rev="0"/>
+            </a:camera>
+            <a:lightRig rig="threePt" dir="t">
+              <a:rot lat="0" lon="0" rev="1200000"/>
+            </a:lightRig>
+          </a:scene3d>
+          <a:sp3d>
+            <a:bevelT w="63500" h="25400"/>
+          </a:sp3d>
+        </a:effectStyle>
+      </a:effectStyleLst>
+      <a:bgFillStyleLst>
+        <a:solidFill>
+          <a:schemeClr val="phClr"/>
+        </a:solidFill>
+        <a:gradFill rotWithShape="1">
+          <a:gsLst>
+            <a:gs pos="0">
+              <a:schemeClr val="phClr">
+                <a:tint val="40000"/>
+                <a:satMod val="350000"/>
+              </a:schemeClr>
+            </a:gs>
+            <a:gs pos="40000">
+              <a:schemeClr val="phClr">
+                <a:tint val="45000"/>
+                <a:shade val="99000"/>
+                <a:satMod val="350000"/>
+              </a:schemeClr>
+            </a:gs>
+            <a:gs pos="100000">
+              <a:schemeClr val="phClr">
+                <a:shade val="20000"/>
+                <a:satMod val="255000"/>
+              </a:schemeClr>
+            </a:gs>
+          </a:gsLst>
+          <a:path path="circle">
+            <a:fillToRect l="50000" t="-80000" r="50000" b="180000"/>
+          </a:path>
+        </a:gradFill>
+        <a:gradFill rotWithShape="1">
+          <a:gsLst>
+            <a:gs pos="0">
+              <a:schemeClr val="phClr">
+                <a:tint val="80000"/>
+                <a:satMod val="300000"/>
+              </a:schemeClr>
+            </a:gs>
+            <a:gs pos="100000">
+              <a:schemeClr val="phClr">
+                <a:shade val="30000"/>
+                <a:satMod val="200000"/>
+              </a:schemeClr>
+            </a:gs>
+          </a:gsLst>
+          <a:path path="circle">
+            <a:fillToRect l="50000" t="50000" r="50000" b="50000"/>
+          </a:path>
+        </a:gradFill>
+      </a:bgFillStyleLst>
+    </a:fmtScheme>
+  </a:themeElements>
+</a:theme>
+</file>
+
+<file path=ppt/theme/theme2.xml><?xml version="1.0" encoding="utf-8"?>
 <a:theme xmlns:a="http://schemas.openxmlformats.org/drawingml/2006/main" xmlns:r="http://schemas.openxmlformats.org/officeDocument/2006/relationships" name="AMOS Slides Template">
   <a:themeElements>
     <a:clrScheme name="Simple Light">
@@ -15400,283 +15679,4 @@
     </a:fmtScheme>
   </a:themeElements>
 </a:theme>
-</file>
-
-<file path=ppt/theme/theme2.xml><?xml version="1.0" encoding="utf-8"?>
-<a:theme xmlns:a="http://schemas.openxmlformats.org/drawingml/2006/main" xmlns:r="http://schemas.openxmlformats.org/officeDocument/2006/relationships">
-  <a:themeElements>
-    <a:clrScheme name="Default">
-      <a:dk1>
-        <a:srgbClr val="000000"/>
-      </a:dk1>
-      <a:lt1>
-        <a:srgbClr val="FFFFFF"/>
-      </a:lt1>
-      <a:dk2>
-        <a:srgbClr val="158158"/>
-      </a:dk2>
-      <a:lt2>
-        <a:srgbClr val="F3F3F3"/>
-      </a:lt2>
-      <a:accent1>
-        <a:srgbClr val="058DC7"/>
-      </a:accent1>
-      <a:accent2>
-        <a:srgbClr val="50B432"/>
-      </a:accent2>
-      <a:accent3>
-        <a:srgbClr val="ED561B"/>
-      </a:accent3>
-      <a:accent4>
-        <a:srgbClr val="EDEF00"/>
-      </a:accent4>
-      <a:accent5>
-        <a:srgbClr val="24CBE5"/>
-      </a:accent5>
-      <a:accent6>
-        <a:srgbClr val="64E572"/>
-      </a:accent6>
-      <a:hlink>
-        <a:srgbClr val="2200CC"/>
-      </a:hlink>
-      <a:folHlink>
-        <a:srgbClr val="551A8B"/>
-      </a:folHlink>
-    </a:clrScheme>
-    <a:fontScheme name="Office">
-      <a:majorFont>
-        <a:latin typeface="Arial"/>
-        <a:ea typeface=""/>
-        <a:cs typeface=""/>
-        <a:font script="Jpan" typeface="ＭＳ Ｐゴシック"/>
-        <a:font script="Hang" typeface="맑은 고딕"/>
-        <a:font script="Hans" typeface="宋体"/>
-        <a:font script="Hant" typeface="新細明體"/>
-        <a:font script="Arab" typeface="Times New Roman"/>
-        <a:font script="Hebr" typeface="Times New Roman"/>
-        <a:font script="Thai" typeface="Angsana New"/>
-        <a:font script="Ethi" typeface="Nyala"/>
-        <a:font script="Beng" typeface="Vrinda"/>
-        <a:font script="Gujr" typeface="Shruti"/>
-        <a:font script="Khmr" typeface="MoolBoran"/>
-        <a:font script="Knda" typeface="Tunga"/>
-        <a:font script="Guru" typeface="Raavi"/>
-        <a:font script="Cans" typeface="Euphemia"/>
-        <a:font script="Cher" typeface="Plantagenet Cherokee"/>
-        <a:font script="Yiii" typeface="Microsoft Yi Baiti"/>
-        <a:font script="Tibt" typeface="Microsoft Himalaya"/>
-        <a:font script="Thaa" typeface="MV Boli"/>
-        <a:font script="Deva" typeface="Mangal"/>
-        <a:font script="Telu" typeface="Gautami"/>
-        <a:font script="Taml" typeface="Latha"/>
-        <a:font script="Syrc" typeface="Estrangelo Edessa"/>
-        <a:font script="Orya" typeface="Kalinga"/>
-        <a:font script="Mlym" typeface="Kartika"/>
-        <a:font script="Laoo" typeface="DokChampa"/>
-        <a:font script="Sinh" typeface="Iskoola Pota"/>
-        <a:font script="Mong" typeface="Mongolian Baiti"/>
-        <a:font script="Viet" typeface="Times New Roman"/>
-        <a:font script="Uigh" typeface="Microsoft Uighur"/>
-        <a:font script="Geor" typeface="Sylfaen"/>
-      </a:majorFont>
-      <a:minorFont>
-        <a:latin typeface="Arial"/>
-        <a:ea typeface=""/>
-        <a:cs typeface=""/>
-        <a:font script="Jpan" typeface="ＭＳ Ｐゴシック"/>
-        <a:font script="Hang" typeface="맑은 고딕"/>
-        <a:font script="Hans" typeface="宋体"/>
-        <a:font script="Hant" typeface="新細明體"/>
-        <a:font script="Arab" typeface="Arial"/>
-        <a:font script="Hebr" typeface="Arial"/>
-        <a:font script="Thai" typeface="Cordia New"/>
-        <a:font script="Ethi" typeface="Nyala"/>
-        <a:font script="Beng" typeface="Vrinda"/>
-        <a:font script="Gujr" typeface="Shruti"/>
-        <a:font script="Khmr" typeface="DaunPenh"/>
-        <a:font script="Knda" typeface="Tunga"/>
-        <a:font script="Guru" typeface="Raavi"/>
-        <a:font script="Cans" typeface="Euphemia"/>
-        <a:font script="Cher" typeface="Plantagenet Cherokee"/>
-        <a:font script="Yiii" typeface="Microsoft Yi Baiti"/>
-        <a:font script="Tibt" typeface="Microsoft Himalaya"/>
-        <a:font script="Thaa" typeface="MV Boli"/>
-        <a:font script="Deva" typeface="Mangal"/>
-        <a:font script="Telu" typeface="Gautami"/>
-        <a:font script="Taml" typeface="Latha"/>
-        <a:font script="Syrc" typeface="Estrangelo Edessa"/>
-        <a:font script="Orya" typeface="Kalinga"/>
-        <a:font script="Mlym" typeface="Kartika"/>
-        <a:font script="Laoo" typeface="DokChampa"/>
-        <a:font script="Sinh" typeface="Iskoola Pota"/>
-        <a:font script="Mong" typeface="Mongolian Baiti"/>
-        <a:font script="Viet" typeface="Arial"/>
-        <a:font script="Uigh" typeface="Microsoft Uighur"/>
-        <a:font script="Geor" typeface="Sylfaen"/>
-      </a:minorFont>
-    </a:fontScheme>
-    <a:fmtScheme name="Office">
-      <a:fillStyleLst>
-        <a:solidFill>
-          <a:schemeClr val="phClr"/>
-        </a:solidFill>
-        <a:gradFill rotWithShape="1">
-          <a:gsLst>
-            <a:gs pos="0">
-              <a:schemeClr val="phClr">
-                <a:tint val="50000"/>
-                <a:satMod val="300000"/>
-              </a:schemeClr>
-            </a:gs>
-            <a:gs pos="35000">
-              <a:schemeClr val="phClr">
-                <a:tint val="37000"/>
-                <a:satMod val="300000"/>
-              </a:schemeClr>
-            </a:gs>
-            <a:gs pos="100000">
-              <a:schemeClr val="phClr">
-                <a:tint val="15000"/>
-                <a:satMod val="350000"/>
-              </a:schemeClr>
-            </a:gs>
-          </a:gsLst>
-          <a:lin ang="16200000" scaled="1"/>
-        </a:gradFill>
-        <a:gradFill rotWithShape="1">
-          <a:gsLst>
-            <a:gs pos="0">
-              <a:schemeClr val="phClr">
-                <a:tint val="100000"/>
-                <a:shade val="100000"/>
-                <a:satMod val="130000"/>
-              </a:schemeClr>
-            </a:gs>
-            <a:gs pos="100000">
-              <a:schemeClr val="phClr">
-                <a:tint val="50000"/>
-                <a:shade val="100000"/>
-                <a:satMod val="350000"/>
-              </a:schemeClr>
-            </a:gs>
-          </a:gsLst>
-          <a:lin ang="16200000" scaled="0"/>
-        </a:gradFill>
-      </a:fillStyleLst>
-      <a:lnStyleLst>
-        <a:ln w="9525" cap="flat" cmpd="sng" algn="ctr">
-          <a:solidFill>
-            <a:schemeClr val="phClr">
-              <a:shade val="95000"/>
-              <a:satMod val="105000"/>
-            </a:schemeClr>
-          </a:solidFill>
-          <a:prstDash val="solid"/>
-        </a:ln>
-        <a:ln w="25400" cap="flat" cmpd="sng" algn="ctr">
-          <a:solidFill>
-            <a:schemeClr val="phClr"/>
-          </a:solidFill>
-          <a:prstDash val="solid"/>
-        </a:ln>
-        <a:ln w="38100" cap="flat" cmpd="sng" algn="ctr">
-          <a:solidFill>
-            <a:schemeClr val="phClr"/>
-          </a:solidFill>
-          <a:prstDash val="solid"/>
-        </a:ln>
-      </a:lnStyleLst>
-      <a:effectStyleLst>
-        <a:effectStyle>
-          <a:effectLst>
-            <a:outerShdw blurRad="40000" dist="20000" dir="5400000" rotWithShape="0">
-              <a:srgbClr val="000000">
-                <a:alpha val="38000"/>
-              </a:srgbClr>
-            </a:outerShdw>
-          </a:effectLst>
-        </a:effectStyle>
-        <a:effectStyle>
-          <a:effectLst>
-            <a:outerShdw blurRad="40000" dist="23000" dir="5400000" rotWithShape="0">
-              <a:srgbClr val="000000">
-                <a:alpha val="35000"/>
-              </a:srgbClr>
-            </a:outerShdw>
-          </a:effectLst>
-        </a:effectStyle>
-        <a:effectStyle>
-          <a:effectLst>
-            <a:outerShdw blurRad="40000" dist="23000" dir="5400000" rotWithShape="0">
-              <a:srgbClr val="000000">
-                <a:alpha val="35000"/>
-              </a:srgbClr>
-            </a:outerShdw>
-          </a:effectLst>
-          <a:scene3d>
-            <a:camera prst="orthographicFront">
-              <a:rot lat="0" lon="0" rev="0"/>
-            </a:camera>
-            <a:lightRig rig="threePt" dir="t">
-              <a:rot lat="0" lon="0" rev="1200000"/>
-            </a:lightRig>
-          </a:scene3d>
-          <a:sp3d>
-            <a:bevelT w="63500" h="25400"/>
-          </a:sp3d>
-        </a:effectStyle>
-      </a:effectStyleLst>
-      <a:bgFillStyleLst>
-        <a:solidFill>
-          <a:schemeClr val="phClr"/>
-        </a:solidFill>
-        <a:gradFill rotWithShape="1">
-          <a:gsLst>
-            <a:gs pos="0">
-              <a:schemeClr val="phClr">
-                <a:tint val="40000"/>
-                <a:satMod val="350000"/>
-              </a:schemeClr>
-            </a:gs>
-            <a:gs pos="40000">
-              <a:schemeClr val="phClr">
-                <a:tint val="45000"/>
-                <a:shade val="99000"/>
-                <a:satMod val="350000"/>
-              </a:schemeClr>
-            </a:gs>
-            <a:gs pos="100000">
-              <a:schemeClr val="phClr">
-                <a:shade val="20000"/>
-                <a:satMod val="255000"/>
-              </a:schemeClr>
-            </a:gs>
-          </a:gsLst>
-          <a:path path="circle">
-            <a:fillToRect l="50000" t="-80000" r="50000" b="180000"/>
-          </a:path>
-        </a:gradFill>
-        <a:gradFill rotWithShape="1">
-          <a:gsLst>
-            <a:gs pos="0">
-              <a:schemeClr val="phClr">
-                <a:tint val="80000"/>
-                <a:satMod val="300000"/>
-              </a:schemeClr>
-            </a:gs>
-            <a:gs pos="100000">
-              <a:schemeClr val="phClr">
-                <a:shade val="30000"/>
-                <a:satMod val="200000"/>
-              </a:schemeClr>
-            </a:gs>
-          </a:gsLst>
-          <a:path path="circle">
-            <a:fillToRect l="50000" t="50000" r="50000" b="50000"/>
-          </a:path>
-        </a:gradFill>
-      </a:bgFillStyleLst>
-    </a:fmtScheme>
-  </a:themeElements>
-</a:theme>
 </file>
</xml_diff>

<commit_message>
Finished A01 B01 for SS 2023
</commit_message>
<xml_diff>
--- a/Lecture slides/AMOS A01 - Introduction.pptx
+++ b/Lecture slides/AMOS A01 - Introduction.pptx
@@ -3002,7 +3002,7 @@
             <a:avLst/>
           </a:prstGeom>
           <a:solidFill>
-            <a:schemeClr val="accent1"/>
+            <a:schemeClr val="accent3"/>
           </a:solidFill>
           <a:ln>
             <a:noFill/>
@@ -3026,7 +3026,11 @@
             <a:r>
               <a:t/>
             </a:r>
-            <a:endParaRPr/>
+            <a:endParaRPr>
+              <a:solidFill>
+                <a:schemeClr val="dk1"/>
+              </a:solidFill>
+            </a:endParaRPr>
           </a:p>
         </p:txBody>
       </p:sp>
@@ -3195,7 +3199,7 @@
             <a:avLst/>
           </a:prstGeom>
           <a:solidFill>
-            <a:schemeClr val="accent1"/>
+            <a:schemeClr val="accent3"/>
           </a:solidFill>
           <a:ln>
             <a:noFill/>
@@ -3219,7 +3223,11 @@
             <a:r>
               <a:t/>
             </a:r>
-            <a:endParaRPr/>
+            <a:endParaRPr>
+              <a:solidFill>
+                <a:schemeClr val="dk1"/>
+              </a:solidFill>
+            </a:endParaRPr>
           </a:p>
         </p:txBody>
       </p:sp>
@@ -3655,7 +3663,7 @@
             <a:avLst/>
           </a:prstGeom>
           <a:solidFill>
-            <a:schemeClr val="accent1"/>
+            <a:schemeClr val="accent3"/>
           </a:solidFill>
           <a:ln>
             <a:noFill/>
@@ -3679,7 +3687,11 @@
             <a:r>
               <a:t/>
             </a:r>
-            <a:endParaRPr/>
+            <a:endParaRPr>
+              <a:solidFill>
+                <a:schemeClr val="dk1"/>
+              </a:solidFill>
+            </a:endParaRPr>
           </a:p>
         </p:txBody>
       </p:sp>
@@ -4243,7 +4255,7 @@
             <a:avLst/>
           </a:prstGeom>
           <a:solidFill>
-            <a:schemeClr val="accent1"/>
+            <a:schemeClr val="accent3"/>
           </a:solidFill>
           <a:ln>
             <a:noFill/>
@@ -4267,7 +4279,11 @@
             <a:r>
               <a:t/>
             </a:r>
-            <a:endParaRPr/>
+            <a:endParaRPr>
+              <a:solidFill>
+                <a:schemeClr val="dk1"/>
+              </a:solidFill>
+            </a:endParaRPr>
           </a:p>
         </p:txBody>
       </p:sp>
@@ -4578,7 +4594,7 @@
             <a:avLst/>
           </a:prstGeom>
           <a:solidFill>
-            <a:schemeClr val="accent1"/>
+            <a:schemeClr val="accent3"/>
           </a:solidFill>
           <a:ln>
             <a:noFill/>
@@ -6169,7 +6185,7 @@
             <a:tbl>
               <a:tblPr>
                 <a:noFill/>
-                <a:tableStyleId>{F101E7ED-D1EF-464D-87EA-F2660209952C}</a:tableStyleId>
+                <a:tableStyleId>{E71F95C4-8580-485C-926D-22E254BEB369}</a:tableStyleId>
               </a:tblPr>
               <a:tblGrid>
                 <a:gridCol w="1314475"/>
@@ -6365,7 +6381,7 @@
                       <a:tailEnd len="sm" w="sm" type="none"/>
                     </a:lnB>
                     <a:solidFill>
-                      <a:schemeClr val="accent4"/>
+                      <a:schemeClr val="dk2"/>
                     </a:solidFill>
                   </a:tcPr>
                 </a:tc>
@@ -6583,7 +6599,7 @@
                       <a:tailEnd len="sm" w="sm" type="none"/>
                     </a:lnB>
                     <a:solidFill>
-                      <a:schemeClr val="dk2"/>
+                      <a:schemeClr val="lt2"/>
                     </a:solidFill>
                   </a:tcPr>
                 </a:tc>
@@ -6654,7 +6670,7 @@
                       <a:tailEnd len="sm" w="sm" type="none"/>
                     </a:lnB>
                     <a:solidFill>
-                      <a:schemeClr val="dk2"/>
+                      <a:schemeClr val="lt2"/>
                     </a:solidFill>
                   </a:tcPr>
                 </a:tc>
@@ -6725,7 +6741,7 @@
                       <a:tailEnd len="sm" w="sm" type="none"/>
                     </a:lnB>
                     <a:solidFill>
-                      <a:schemeClr val="dk2"/>
+                      <a:schemeClr val="lt2"/>
                     </a:solidFill>
                   </a:tcPr>
                 </a:tc>
@@ -6791,7 +6807,7 @@
                       <a:tailEnd len="sm" w="sm" type="none"/>
                     </a:lnB>
                     <a:solidFill>
-                      <a:schemeClr val="dk2"/>
+                      <a:schemeClr val="lt2"/>
                     </a:solidFill>
                   </a:tcPr>
                 </a:tc>
@@ -6864,7 +6880,7 @@
                       <a:tailEnd len="sm" w="sm" type="none"/>
                     </a:lnB>
                     <a:solidFill>
-                      <a:schemeClr val="accent4"/>
+                      <a:schemeClr val="dk2"/>
                     </a:solidFill>
                   </a:tcPr>
                 </a:tc>
@@ -6935,7 +6951,7 @@
                       <a:tailEnd len="sm" w="sm" type="none"/>
                     </a:lnB>
                     <a:solidFill>
-                      <a:schemeClr val="dk2"/>
+                      <a:schemeClr val="lt2"/>
                     </a:solidFill>
                   </a:tcPr>
                 </a:tc>
@@ -6998,7 +7014,7 @@
                       <a:tailEnd len="sm" w="sm" type="none"/>
                     </a:lnB>
                     <a:solidFill>
-                      <a:schemeClr val="lt2"/>
+                      <a:schemeClr val="accent1"/>
                     </a:solidFill>
                   </a:tcPr>
                 </a:tc>
@@ -7061,7 +7077,7 @@
                       <a:tailEnd len="sm" w="sm" type="none"/>
                     </a:lnB>
                     <a:solidFill>
-                      <a:schemeClr val="lt2"/>
+                      <a:schemeClr val="accent1"/>
                     </a:solidFill>
                   </a:tcPr>
                 </a:tc>
@@ -7124,7 +7140,7 @@
                       <a:tailEnd len="sm" w="sm" type="none"/>
                     </a:lnB>
                     <a:solidFill>
-                      <a:schemeClr val="lt2"/>
+                      <a:schemeClr val="accent1"/>
                     </a:solidFill>
                   </a:tcPr>
                 </a:tc>
@@ -7186,7 +7202,7 @@
                       <a:tailEnd len="sm" w="sm" type="none"/>
                     </a:lnB>
                     <a:solidFill>
-                      <a:schemeClr val="lt2"/>
+                      <a:schemeClr val="accent1"/>
                     </a:solidFill>
                   </a:tcPr>
                 </a:tc>
@@ -7260,7 +7276,7 @@
                       <a:tailEnd len="sm" w="sm" type="none"/>
                     </a:lnB>
                     <a:solidFill>
-                      <a:schemeClr val="dk2"/>
+                      <a:schemeClr val="lt2"/>
                     </a:solidFill>
                   </a:tcPr>
                 </a:tc>
@@ -7585,132 +7601,6 @@
                       <a:tailEnd len="sm" w="sm" type="none"/>
                     </a:lnB>
                     <a:solidFill>
-                      <a:schemeClr val="dk2"/>
-                    </a:solidFill>
-                  </a:tcPr>
-                </a:tc>
-                <a:tc>
-                  <a:txBody>
-                    <a:bodyPr/>
-                    <a:lstStyle/>
-                    <a:p>
-                      <a:pPr indent="0" lvl="0" marL="0" rtl="0" algn="ctr">
-                        <a:spcBef>
-                          <a:spcPts val="0"/>
-                        </a:spcBef>
-                        <a:spcAft>
-                          <a:spcPts val="0"/>
-                        </a:spcAft>
-                        <a:buNone/>
-                      </a:pPr>
-                      <a:r>
-                        <a:rPr b="1" lang="en" sz="1500"/>
-                        <a:t>– </a:t>
-                      </a:r>
-                      <a:endParaRPr b="1" sz="1500"/>
-                    </a:p>
-                  </a:txBody>
-                  <a:tcPr marT="91425" marB="91425" marR="91425" marL="91425" anchor="ctr">
-                    <a:lnL cap="flat" cmpd="sng" w="38100">
-                      <a:solidFill>
-                        <a:schemeClr val="lt1"/>
-                      </a:solidFill>
-                      <a:prstDash val="solid"/>
-                      <a:round/>
-                      <a:headEnd len="sm" w="sm" type="none"/>
-                      <a:tailEnd len="sm" w="sm" type="none"/>
-                    </a:lnL>
-                    <a:lnR cap="flat" cmpd="sng" w="38100">
-                      <a:solidFill>
-                        <a:schemeClr val="lt1"/>
-                      </a:solidFill>
-                      <a:prstDash val="solid"/>
-                      <a:round/>
-                      <a:headEnd len="sm" w="sm" type="none"/>
-                      <a:tailEnd len="sm" w="sm" type="none"/>
-                    </a:lnR>
-                    <a:lnT cap="flat" cmpd="sng" w="38100">
-                      <a:solidFill>
-                        <a:schemeClr val="lt1"/>
-                      </a:solidFill>
-                      <a:prstDash val="solid"/>
-                      <a:round/>
-                      <a:headEnd len="sm" w="sm" type="none"/>
-                      <a:tailEnd len="sm" w="sm" type="none"/>
-                    </a:lnT>
-                    <a:lnB cap="flat" cmpd="sng" w="38100">
-                      <a:solidFill>
-                        <a:schemeClr val="lt1"/>
-                      </a:solidFill>
-                      <a:prstDash val="solid"/>
-                      <a:round/>
-                      <a:headEnd len="sm" w="sm" type="none"/>
-                      <a:tailEnd len="sm" w="sm" type="none"/>
-                    </a:lnB>
-                    <a:solidFill>
-                      <a:schemeClr val="lt2"/>
-                    </a:solidFill>
-                  </a:tcPr>
-                </a:tc>
-                <a:tc>
-                  <a:txBody>
-                    <a:bodyPr/>
-                    <a:lstStyle/>
-                    <a:p>
-                      <a:pPr indent="0" lvl="0" marL="0" rtl="0" algn="ctr">
-                        <a:spcBef>
-                          <a:spcPts val="0"/>
-                        </a:spcBef>
-                        <a:spcAft>
-                          <a:spcPts val="0"/>
-                        </a:spcAft>
-                        <a:buNone/>
-                      </a:pPr>
-                      <a:r>
-                        <a:rPr b="1" lang="en"/>
-                        <a:t>x</a:t>
-                      </a:r>
-                      <a:endParaRPr b="1"/>
-                    </a:p>
-                  </a:txBody>
-                  <a:tcPr marT="91425" marB="91425" marR="91425" marL="91425" anchor="ctr">
-                    <a:lnL cap="flat" cmpd="sng" w="38100">
-                      <a:solidFill>
-                        <a:schemeClr val="lt1"/>
-                      </a:solidFill>
-                      <a:prstDash val="solid"/>
-                      <a:round/>
-                      <a:headEnd len="sm" w="sm" type="none"/>
-                      <a:tailEnd len="sm" w="sm" type="none"/>
-                    </a:lnL>
-                    <a:lnR cap="flat" cmpd="sng" w="38100">
-                      <a:solidFill>
-                        <a:schemeClr val="lt1"/>
-                      </a:solidFill>
-                      <a:prstDash val="solid"/>
-                      <a:round/>
-                      <a:headEnd len="sm" w="sm" type="none"/>
-                      <a:tailEnd len="sm" w="sm" type="none"/>
-                    </a:lnR>
-                    <a:lnT cap="flat" cmpd="sng" w="38100">
-                      <a:solidFill>
-                        <a:schemeClr val="lt1"/>
-                      </a:solidFill>
-                      <a:prstDash val="solid"/>
-                      <a:round/>
-                      <a:headEnd len="sm" w="sm" type="none"/>
-                      <a:tailEnd len="sm" w="sm" type="none"/>
-                    </a:lnT>
-                    <a:lnB cap="flat" cmpd="sng" w="38100">
-                      <a:solidFill>
-                        <a:schemeClr val="lt1"/>
-                      </a:solidFill>
-                      <a:prstDash val="solid"/>
-                      <a:round/>
-                      <a:headEnd len="sm" w="sm" type="none"/>
-                      <a:tailEnd len="sm" w="sm" type="none"/>
-                    </a:lnB>
-                    <a:solidFill>
                       <a:schemeClr val="lt2"/>
                     </a:solidFill>
                   </a:tcPr>
@@ -7774,7 +7664,133 @@
                       <a:tailEnd len="sm" w="sm" type="none"/>
                     </a:lnB>
                     <a:solidFill>
-                      <a:schemeClr val="lt2"/>
+                      <a:schemeClr val="accent1"/>
+                    </a:solidFill>
+                  </a:tcPr>
+                </a:tc>
+                <a:tc>
+                  <a:txBody>
+                    <a:bodyPr/>
+                    <a:lstStyle/>
+                    <a:p>
+                      <a:pPr indent="0" lvl="0" marL="0" rtl="0" algn="ctr">
+                        <a:spcBef>
+                          <a:spcPts val="0"/>
+                        </a:spcBef>
+                        <a:spcAft>
+                          <a:spcPts val="0"/>
+                        </a:spcAft>
+                        <a:buNone/>
+                      </a:pPr>
+                      <a:r>
+                        <a:rPr b="1" lang="en"/>
+                        <a:t>x</a:t>
+                      </a:r>
+                      <a:endParaRPr b="1"/>
+                    </a:p>
+                  </a:txBody>
+                  <a:tcPr marT="91425" marB="91425" marR="91425" marL="91425" anchor="ctr">
+                    <a:lnL cap="flat" cmpd="sng" w="38100">
+                      <a:solidFill>
+                        <a:schemeClr val="lt1"/>
+                      </a:solidFill>
+                      <a:prstDash val="solid"/>
+                      <a:round/>
+                      <a:headEnd len="sm" w="sm" type="none"/>
+                      <a:tailEnd len="sm" w="sm" type="none"/>
+                    </a:lnL>
+                    <a:lnR cap="flat" cmpd="sng" w="38100">
+                      <a:solidFill>
+                        <a:schemeClr val="lt1"/>
+                      </a:solidFill>
+                      <a:prstDash val="solid"/>
+                      <a:round/>
+                      <a:headEnd len="sm" w="sm" type="none"/>
+                      <a:tailEnd len="sm" w="sm" type="none"/>
+                    </a:lnR>
+                    <a:lnT cap="flat" cmpd="sng" w="38100">
+                      <a:solidFill>
+                        <a:schemeClr val="lt1"/>
+                      </a:solidFill>
+                      <a:prstDash val="solid"/>
+                      <a:round/>
+                      <a:headEnd len="sm" w="sm" type="none"/>
+                      <a:tailEnd len="sm" w="sm" type="none"/>
+                    </a:lnT>
+                    <a:lnB cap="flat" cmpd="sng" w="38100">
+                      <a:solidFill>
+                        <a:schemeClr val="lt1"/>
+                      </a:solidFill>
+                      <a:prstDash val="solid"/>
+                      <a:round/>
+                      <a:headEnd len="sm" w="sm" type="none"/>
+                      <a:tailEnd len="sm" w="sm" type="none"/>
+                    </a:lnB>
+                    <a:solidFill>
+                      <a:schemeClr val="accent1"/>
+                    </a:solidFill>
+                  </a:tcPr>
+                </a:tc>
+                <a:tc>
+                  <a:txBody>
+                    <a:bodyPr/>
+                    <a:lstStyle/>
+                    <a:p>
+                      <a:pPr indent="0" lvl="0" marL="0" rtl="0" algn="ctr">
+                        <a:spcBef>
+                          <a:spcPts val="0"/>
+                        </a:spcBef>
+                        <a:spcAft>
+                          <a:spcPts val="0"/>
+                        </a:spcAft>
+                        <a:buNone/>
+                      </a:pPr>
+                      <a:r>
+                        <a:rPr b="1" lang="en" sz="1500"/>
+                        <a:t>– </a:t>
+                      </a:r>
+                      <a:endParaRPr b="1" sz="1500"/>
+                    </a:p>
+                  </a:txBody>
+                  <a:tcPr marT="91425" marB="91425" marR="91425" marL="91425" anchor="ctr">
+                    <a:lnL cap="flat" cmpd="sng" w="38100">
+                      <a:solidFill>
+                        <a:schemeClr val="lt1"/>
+                      </a:solidFill>
+                      <a:prstDash val="solid"/>
+                      <a:round/>
+                      <a:headEnd len="sm" w="sm" type="none"/>
+                      <a:tailEnd len="sm" w="sm" type="none"/>
+                    </a:lnL>
+                    <a:lnR cap="flat" cmpd="sng" w="38100">
+                      <a:solidFill>
+                        <a:schemeClr val="lt1"/>
+                      </a:solidFill>
+                      <a:prstDash val="solid"/>
+                      <a:round/>
+                      <a:headEnd len="sm" w="sm" type="none"/>
+                      <a:tailEnd len="sm" w="sm" type="none"/>
+                    </a:lnR>
+                    <a:lnT cap="flat" cmpd="sng" w="38100">
+                      <a:solidFill>
+                        <a:schemeClr val="lt1"/>
+                      </a:solidFill>
+                      <a:prstDash val="solid"/>
+                      <a:round/>
+                      <a:headEnd len="sm" w="sm" type="none"/>
+                      <a:tailEnd len="sm" w="sm" type="none"/>
+                    </a:lnT>
+                    <a:lnB cap="flat" cmpd="sng" w="38100">
+                      <a:solidFill>
+                        <a:schemeClr val="lt1"/>
+                      </a:solidFill>
+                      <a:prstDash val="solid"/>
+                      <a:round/>
+                      <a:headEnd len="sm" w="sm" type="none"/>
+                      <a:tailEnd len="sm" w="sm" type="none"/>
+                    </a:lnB>
+                    <a:solidFill>
+                      <a:schemeClr val="accent1"/>
                     </a:solidFill>
                   </a:tcPr>
                 </a:tc>
@@ -7836,7 +7852,7 @@
                       <a:tailEnd len="sm" w="sm" type="none"/>
                     </a:lnB>
                     <a:solidFill>
-                      <a:schemeClr val="lt2"/>
+                      <a:schemeClr val="accent1"/>
                     </a:solidFill>
                   </a:tcPr>
                 </a:tc>
@@ -7910,7 +7926,7 @@
                       <a:tailEnd len="sm" w="sm" type="none"/>
                     </a:lnB>
                     <a:solidFill>
-                      <a:schemeClr val="dk2"/>
+                      <a:schemeClr val="lt2"/>
                     </a:solidFill>
                   </a:tcPr>
                 </a:tc>
@@ -11301,10 +11317,10 @@
             <a:r>
               <a:rPr b="1" lang="en" sz="3200">
                 <a:solidFill>
-                  <a:schemeClr val="accent1"/>
+                  <a:schemeClr val="accent3"/>
                 </a:solidFill>
               </a:rPr>
-              <a:t>introduce students</a:t>
+              <a:t>introduce students </a:t>
             </a:r>
             <a:r>
               <a:rPr b="1" lang="en" sz="3200">
@@ -11312,15 +11328,15 @@
                   <a:srgbClr val="212121"/>
                 </a:solidFill>
               </a:rPr>
-              <a:t> to </a:t>
+              <a:t>to </a:t>
             </a:r>
             <a:r>
               <a:rPr b="1" lang="en" sz="3200">
                 <a:solidFill>
-                  <a:schemeClr val="accent1"/>
+                  <a:schemeClr val="accent3"/>
                 </a:solidFill>
               </a:rPr>
-              <a:t>agile methods</a:t>
+              <a:t>agile methods </a:t>
             </a:r>
             <a:r>
               <a:rPr b="1" lang="en" sz="3200">
@@ -11328,7 +11344,7 @@
                   <a:srgbClr val="212121"/>
                 </a:solidFill>
               </a:rPr>
-              <a:t> by creating useful </a:t>
+              <a:t>by creating useful </a:t>
             </a:r>
             <a:r>
               <a:rPr b="1" lang="en" sz="3200"/>
@@ -11628,10 +11644,14 @@
               <a:t>https://profriehle.com</a:t>
             </a:r>
             <a:r>
-              <a:rPr b="0" lang="en" sz="900"/>
+              <a:rPr b="0" lang="en" sz="900">
+                <a:solidFill>
+                  <a:schemeClr val="dk2"/>
+                </a:solidFill>
+              </a:rPr>
               <a:t> </a:t>
             </a:r>
-            <a:endParaRPr b="0" sz="900"/>
+            <a:endParaRPr/>
           </a:p>
         </p:txBody>
       </p:sp>
@@ -13041,7 +13061,7 @@
             <a:tbl>
               <a:tblPr>
                 <a:noFill/>
-                <a:tableStyleId>{F101E7ED-D1EF-464D-87EA-F2660209952C}</a:tableStyleId>
+                <a:tableStyleId>{E71F95C4-8580-485C-926D-22E254BEB369}</a:tableStyleId>
               </a:tblPr>
               <a:tblGrid>
                 <a:gridCol w="1314450"/>
@@ -13237,7 +13257,7 @@
                       <a:tailEnd len="sm" w="sm" type="none"/>
                     </a:lnB>
                     <a:solidFill>
-                      <a:schemeClr val="accent4"/>
+                      <a:schemeClr val="dk2"/>
                     </a:solidFill>
                   </a:tcPr>
                 </a:tc>
@@ -13431,7 +13451,7 @@
                       <a:tailEnd len="sm" w="sm" type="none"/>
                     </a:lnB>
                     <a:solidFill>
-                      <a:schemeClr val="dk2"/>
+                      <a:schemeClr val="lt2"/>
                     </a:solidFill>
                   </a:tcPr>
                 </a:tc>
@@ -13517,7 +13537,7 @@
                       <a:tailEnd len="sm" w="sm" type="none"/>
                     </a:lnB>
                     <a:solidFill>
-                      <a:schemeClr val="dk2"/>
+                      <a:schemeClr val="lt2"/>
                     </a:solidFill>
                   </a:tcPr>
                 </a:tc>
@@ -13588,7 +13608,7 @@
                       <a:tailEnd len="sm" w="sm" type="none"/>
                     </a:lnB>
                     <a:solidFill>
-                      <a:schemeClr val="dk2"/>
+                      <a:schemeClr val="lt2"/>
                     </a:solidFill>
                   </a:tcPr>
                 </a:tc>
@@ -13659,7 +13679,7 @@
                       <a:tailEnd len="sm" w="sm" type="none"/>
                     </a:lnB>
                     <a:solidFill>
-                      <a:schemeClr val="dk2"/>
+                      <a:schemeClr val="lt2"/>
                     </a:solidFill>
                   </a:tcPr>
                 </a:tc>
@@ -13732,7 +13752,7 @@
                       <a:tailEnd len="sm" w="sm" type="none"/>
                     </a:lnB>
                     <a:solidFill>
-                      <a:schemeClr val="accent4"/>
+                      <a:schemeClr val="dk2"/>
                     </a:solidFill>
                   </a:tcPr>
                 </a:tc>
@@ -13803,69 +13823,6 @@
                       <a:tailEnd len="sm" w="sm" type="none"/>
                     </a:lnB>
                     <a:solidFill>
-                      <a:schemeClr val="dk2"/>
-                    </a:solidFill>
-                  </a:tcPr>
-                </a:tc>
-                <a:tc>
-                  <a:txBody>
-                    <a:bodyPr/>
-                    <a:lstStyle/>
-                    <a:p>
-                      <a:pPr indent="0" lvl="0" marL="0" rtl="0" algn="ctr">
-                        <a:spcBef>
-                          <a:spcPts val="0"/>
-                        </a:spcBef>
-                        <a:spcAft>
-                          <a:spcPts val="0"/>
-                        </a:spcAft>
-                        <a:buNone/>
-                      </a:pPr>
-                      <a:r>
-                        <a:rPr b="1" lang="en" sz="1500"/>
-                        <a:t>x</a:t>
-                      </a:r>
-                      <a:endParaRPr b="1" sz="1500"/>
-                    </a:p>
-                  </a:txBody>
-                  <a:tcPr marT="91425" marB="91425" marR="91425" marL="91425" anchor="ctr">
-                    <a:lnL cap="flat" cmpd="sng" w="38100">
-                      <a:solidFill>
-                        <a:schemeClr val="lt1"/>
-                      </a:solidFill>
-                      <a:prstDash val="solid"/>
-                      <a:round/>
-                      <a:headEnd len="sm" w="sm" type="none"/>
-                      <a:tailEnd len="sm" w="sm" type="none"/>
-                    </a:lnL>
-                    <a:lnR cap="flat" cmpd="sng" w="38100">
-                      <a:solidFill>
-                        <a:schemeClr val="lt1"/>
-                      </a:solidFill>
-                      <a:prstDash val="solid"/>
-                      <a:round/>
-                      <a:headEnd len="sm" w="sm" type="none"/>
-                      <a:tailEnd len="sm" w="sm" type="none"/>
-                    </a:lnR>
-                    <a:lnT cap="flat" cmpd="sng" w="38100">
-                      <a:solidFill>
-                        <a:schemeClr val="lt1"/>
-                      </a:solidFill>
-                      <a:prstDash val="solid"/>
-                      <a:round/>
-                      <a:headEnd len="sm" w="sm" type="none"/>
-                      <a:tailEnd len="sm" w="sm" type="none"/>
-                    </a:lnT>
-                    <a:lnB cap="flat" cmpd="sng" w="38100">
-                      <a:solidFill>
-                        <a:schemeClr val="lt1"/>
-                      </a:solidFill>
-                      <a:prstDash val="solid"/>
-                      <a:round/>
-                      <a:headEnd len="sm" w="sm" type="none"/>
-                      <a:tailEnd len="sm" w="sm" type="none"/>
-                    </a:lnB>
-                    <a:solidFill>
                       <a:schemeClr val="lt2"/>
                     </a:solidFill>
                   </a:tcPr>
@@ -13929,7 +13886,70 @@
                       <a:tailEnd len="sm" w="sm" type="none"/>
                     </a:lnB>
                     <a:solidFill>
-                      <a:schemeClr val="lt2"/>
+                      <a:schemeClr val="accent1"/>
+                    </a:solidFill>
+                  </a:tcPr>
+                </a:tc>
+                <a:tc>
+                  <a:txBody>
+                    <a:bodyPr/>
+                    <a:lstStyle/>
+                    <a:p>
+                      <a:pPr indent="0" lvl="0" marL="0" rtl="0" algn="ctr">
+                        <a:spcBef>
+                          <a:spcPts val="0"/>
+                        </a:spcBef>
+                        <a:spcAft>
+                          <a:spcPts val="0"/>
+                        </a:spcAft>
+                        <a:buNone/>
+                      </a:pPr>
+                      <a:r>
+                        <a:rPr b="1" lang="en" sz="1500"/>
+                        <a:t>x</a:t>
+                      </a:r>
+                      <a:endParaRPr b="1" sz="1500"/>
+                    </a:p>
+                  </a:txBody>
+                  <a:tcPr marT="91425" marB="91425" marR="91425" marL="91425" anchor="ctr">
+                    <a:lnL cap="flat" cmpd="sng" w="38100">
+                      <a:solidFill>
+                        <a:schemeClr val="lt1"/>
+                      </a:solidFill>
+                      <a:prstDash val="solid"/>
+                      <a:round/>
+                      <a:headEnd len="sm" w="sm" type="none"/>
+                      <a:tailEnd len="sm" w="sm" type="none"/>
+                    </a:lnL>
+                    <a:lnR cap="flat" cmpd="sng" w="38100">
+                      <a:solidFill>
+                        <a:schemeClr val="lt1"/>
+                      </a:solidFill>
+                      <a:prstDash val="solid"/>
+                      <a:round/>
+                      <a:headEnd len="sm" w="sm" type="none"/>
+                      <a:tailEnd len="sm" w="sm" type="none"/>
+                    </a:lnR>
+                    <a:lnT cap="flat" cmpd="sng" w="38100">
+                      <a:solidFill>
+                        <a:schemeClr val="lt1"/>
+                      </a:solidFill>
+                      <a:prstDash val="solid"/>
+                      <a:round/>
+                      <a:headEnd len="sm" w="sm" type="none"/>
+                      <a:tailEnd len="sm" w="sm" type="none"/>
+                    </a:lnT>
+                    <a:lnB cap="flat" cmpd="sng" w="38100">
+                      <a:solidFill>
+                        <a:schemeClr val="lt1"/>
+                      </a:solidFill>
+                      <a:prstDash val="solid"/>
+                      <a:round/>
+                      <a:headEnd len="sm" w="sm" type="none"/>
+                      <a:tailEnd len="sm" w="sm" type="none"/>
+                    </a:lnB>
+                    <a:solidFill>
+                      <a:schemeClr val="accent1"/>
                     </a:solidFill>
                   </a:tcPr>
                 </a:tc>
@@ -13992,7 +14012,7 @@
                       <a:tailEnd len="sm" w="sm" type="none"/>
                     </a:lnB>
                     <a:solidFill>
-                      <a:schemeClr val="lt2"/>
+                      <a:schemeClr val="accent1"/>
                     </a:solidFill>
                   </a:tcPr>
                 </a:tc>
@@ -14055,7 +14075,7 @@
                       <a:tailEnd len="sm" w="sm" type="none"/>
                     </a:lnB>
                     <a:solidFill>
-                      <a:schemeClr val="lt2"/>
+                      <a:schemeClr val="accent1"/>
                     </a:solidFill>
                   </a:tcPr>
                 </a:tc>
@@ -14129,7 +14149,7 @@
                       <a:tailEnd len="sm" w="sm" type="none"/>
                     </a:lnB>
                     <a:solidFill>
-                      <a:schemeClr val="dk2"/>
+                      <a:schemeClr val="lt2"/>
                     </a:solidFill>
                   </a:tcPr>
                 </a:tc>
@@ -14455,7 +14475,7 @@
                       <a:tailEnd len="sm" w="sm" type="none"/>
                     </a:lnB>
                     <a:solidFill>
-                      <a:schemeClr val="dk2"/>
+                      <a:schemeClr val="lt2"/>
                     </a:solidFill>
                   </a:tcPr>
                 </a:tc>
@@ -14518,7 +14538,7 @@
                       <a:tailEnd len="sm" w="sm" type="none"/>
                     </a:lnB>
                     <a:solidFill>
-                      <a:schemeClr val="lt2"/>
+                      <a:schemeClr val="accent1"/>
                     </a:solidFill>
                   </a:tcPr>
                 </a:tc>
@@ -14581,7 +14601,7 @@
                       <a:tailEnd len="sm" w="sm" type="none"/>
                     </a:lnB>
                     <a:solidFill>
-                      <a:schemeClr val="lt2"/>
+                      <a:schemeClr val="accent1"/>
                     </a:solidFill>
                   </a:tcPr>
                 </a:tc>
@@ -14648,7 +14668,7 @@
                       <a:tailEnd len="sm" w="sm" type="none"/>
                     </a:lnB>
                     <a:solidFill>
-                      <a:schemeClr val="lt2"/>
+                      <a:schemeClr val="accent1"/>
                     </a:solidFill>
                   </a:tcPr>
                 </a:tc>
@@ -14711,7 +14731,7 @@
                       <a:tailEnd len="sm" w="sm" type="none"/>
                     </a:lnB>
                     <a:solidFill>
-                      <a:schemeClr val="lt2"/>
+                      <a:schemeClr val="accent1"/>
                     </a:solidFill>
                   </a:tcPr>
                 </a:tc>
@@ -14785,7 +14805,7 @@
                       <a:tailEnd len="sm" w="sm" type="none"/>
                     </a:lnB>
                     <a:solidFill>
-                      <a:schemeClr val="dk2"/>
+                      <a:schemeClr val="lt2"/>
                     </a:solidFill>
                   </a:tcPr>
                 </a:tc>
@@ -15124,6 +15144,285 @@
 </file>
 
 <file path=ppt/theme/theme1.xml><?xml version="1.0" encoding="utf-8"?>
+<a:theme xmlns:a="http://schemas.openxmlformats.org/drawingml/2006/main" xmlns:r="http://schemas.openxmlformats.org/officeDocument/2006/relationships" name="AMOS Slides Template">
+  <a:themeElements>
+    <a:clrScheme name="Simple Light">
+      <a:dk1>
+        <a:srgbClr val="000000"/>
+      </a:dk1>
+      <a:lt1>
+        <a:srgbClr val="FFFFFF"/>
+      </a:lt1>
+      <a:dk2>
+        <a:srgbClr val="404040"/>
+      </a:dk2>
+      <a:lt2>
+        <a:srgbClr val="808080"/>
+      </a:lt2>
+      <a:accent1>
+        <a:srgbClr val="D0D0D0"/>
+      </a:accent1>
+      <a:accent2>
+        <a:srgbClr val="4169E1"/>
+      </a:accent2>
+      <a:accent3>
+        <a:srgbClr val="D50D01"/>
+      </a:accent3>
+      <a:accent4>
+        <a:srgbClr val="FEB612"/>
+      </a:accent4>
+      <a:accent5>
+        <a:srgbClr val="4CAF50"/>
+      </a:accent5>
+      <a:accent6>
+        <a:srgbClr val="8E44AD"/>
+      </a:accent6>
+      <a:hlink>
+        <a:srgbClr val="34A3C5"/>
+      </a:hlink>
+      <a:folHlink>
+        <a:srgbClr val="0097A7"/>
+      </a:folHlink>
+    </a:clrScheme>
+    <a:fontScheme name="Office">
+      <a:majorFont>
+        <a:latin typeface="Arial"/>
+        <a:ea typeface=""/>
+        <a:cs typeface=""/>
+        <a:font script="Jpan" typeface="ＭＳ Ｐゴシック"/>
+        <a:font script="Hang" typeface="맑은 고딕"/>
+        <a:font script="Hans" typeface="宋体"/>
+        <a:font script="Hant" typeface="新細明體"/>
+        <a:font script="Arab" typeface="Times New Roman"/>
+        <a:font script="Hebr" typeface="Times New Roman"/>
+        <a:font script="Thai" typeface="Angsana New"/>
+        <a:font script="Ethi" typeface="Nyala"/>
+        <a:font script="Beng" typeface="Vrinda"/>
+        <a:font script="Gujr" typeface="Shruti"/>
+        <a:font script="Khmr" typeface="MoolBoran"/>
+        <a:font script="Knda" typeface="Tunga"/>
+        <a:font script="Guru" typeface="Raavi"/>
+        <a:font script="Cans" typeface="Euphemia"/>
+        <a:font script="Cher" typeface="Plantagenet Cherokee"/>
+        <a:font script="Yiii" typeface="Microsoft Yi Baiti"/>
+        <a:font script="Tibt" typeface="Microsoft Himalaya"/>
+        <a:font script="Thaa" typeface="MV Boli"/>
+        <a:font script="Deva" typeface="Mangal"/>
+        <a:font script="Telu" typeface="Gautami"/>
+        <a:font script="Taml" typeface="Latha"/>
+        <a:font script="Syrc" typeface="Estrangelo Edessa"/>
+        <a:font script="Orya" typeface="Kalinga"/>
+        <a:font script="Mlym" typeface="Kartika"/>
+        <a:font script="Laoo" typeface="DokChampa"/>
+        <a:font script="Sinh" typeface="Iskoola Pota"/>
+        <a:font script="Mong" typeface="Mongolian Baiti"/>
+        <a:font script="Viet" typeface="Times New Roman"/>
+        <a:font script="Uigh" typeface="Microsoft Uighur"/>
+        <a:font script="Geor" typeface="Sylfaen"/>
+      </a:majorFont>
+      <a:minorFont>
+        <a:latin typeface="Arial"/>
+        <a:ea typeface=""/>
+        <a:cs typeface=""/>
+        <a:font script="Jpan" typeface="ＭＳ Ｐゴシック"/>
+        <a:font script="Hang" typeface="맑은 고딕"/>
+        <a:font script="Hans" typeface="宋体"/>
+        <a:font script="Hant" typeface="新細明體"/>
+        <a:font script="Arab" typeface="Arial"/>
+        <a:font script="Hebr" typeface="Arial"/>
+        <a:font script="Thai" typeface="Cordia New"/>
+        <a:font script="Ethi" typeface="Nyala"/>
+        <a:font script="Beng" typeface="Vrinda"/>
+        <a:font script="Gujr" typeface="Shruti"/>
+        <a:font script="Khmr" typeface="DaunPenh"/>
+        <a:font script="Knda" typeface="Tunga"/>
+        <a:font script="Guru" typeface="Raavi"/>
+        <a:font script="Cans" typeface="Euphemia"/>
+        <a:font script="Cher" typeface="Plantagenet Cherokee"/>
+        <a:font script="Yiii" typeface="Microsoft Yi Baiti"/>
+        <a:font script="Tibt" typeface="Microsoft Himalaya"/>
+        <a:font script="Thaa" typeface="MV Boli"/>
+        <a:font script="Deva" typeface="Mangal"/>
+        <a:font script="Telu" typeface="Gautami"/>
+        <a:font script="Taml" typeface="Latha"/>
+        <a:font script="Syrc" typeface="Estrangelo Edessa"/>
+        <a:font script="Orya" typeface="Kalinga"/>
+        <a:font script="Mlym" typeface="Kartika"/>
+        <a:font script="Laoo" typeface="DokChampa"/>
+        <a:font script="Sinh" typeface="Iskoola Pota"/>
+        <a:font script="Mong" typeface="Mongolian Baiti"/>
+        <a:font script="Viet" typeface="Arial"/>
+        <a:font script="Uigh" typeface="Microsoft Uighur"/>
+        <a:font script="Geor" typeface="Sylfaen"/>
+      </a:minorFont>
+    </a:fontScheme>
+    <a:fmtScheme name="Office">
+      <a:fillStyleLst>
+        <a:solidFill>
+          <a:schemeClr val="phClr"/>
+        </a:solidFill>
+        <a:gradFill rotWithShape="1">
+          <a:gsLst>
+            <a:gs pos="0">
+              <a:schemeClr val="phClr">
+                <a:tint val="50000"/>
+                <a:satMod val="300000"/>
+              </a:schemeClr>
+            </a:gs>
+            <a:gs pos="35000">
+              <a:schemeClr val="phClr">
+                <a:tint val="37000"/>
+                <a:satMod val="300000"/>
+              </a:schemeClr>
+            </a:gs>
+            <a:gs pos="100000">
+              <a:schemeClr val="phClr">
+                <a:tint val="15000"/>
+                <a:satMod val="350000"/>
+              </a:schemeClr>
+            </a:gs>
+          </a:gsLst>
+          <a:lin ang="16200000" scaled="1"/>
+        </a:gradFill>
+        <a:gradFill rotWithShape="1">
+          <a:gsLst>
+            <a:gs pos="0">
+              <a:schemeClr val="phClr">
+                <a:tint val="100000"/>
+                <a:shade val="100000"/>
+                <a:satMod val="130000"/>
+              </a:schemeClr>
+            </a:gs>
+            <a:gs pos="100000">
+              <a:schemeClr val="phClr">
+                <a:tint val="50000"/>
+                <a:shade val="100000"/>
+                <a:satMod val="350000"/>
+              </a:schemeClr>
+            </a:gs>
+          </a:gsLst>
+          <a:lin ang="16200000" scaled="0"/>
+        </a:gradFill>
+      </a:fillStyleLst>
+      <a:lnStyleLst>
+        <a:ln w="9525" cap="flat" cmpd="sng" algn="ctr">
+          <a:solidFill>
+            <a:schemeClr val="phClr">
+              <a:shade val="95000"/>
+              <a:satMod val="105000"/>
+            </a:schemeClr>
+          </a:solidFill>
+          <a:prstDash val="solid"/>
+        </a:ln>
+        <a:ln w="25400" cap="flat" cmpd="sng" algn="ctr">
+          <a:solidFill>
+            <a:schemeClr val="phClr"/>
+          </a:solidFill>
+          <a:prstDash val="solid"/>
+        </a:ln>
+        <a:ln w="38100" cap="flat" cmpd="sng" algn="ctr">
+          <a:solidFill>
+            <a:schemeClr val="phClr"/>
+          </a:solidFill>
+          <a:prstDash val="solid"/>
+        </a:ln>
+      </a:lnStyleLst>
+      <a:effectStyleLst>
+        <a:effectStyle>
+          <a:effectLst>
+            <a:outerShdw blurRad="40000" dist="20000" dir="5400000" rotWithShape="0">
+              <a:srgbClr val="000000">
+                <a:alpha val="38000"/>
+              </a:srgbClr>
+            </a:outerShdw>
+          </a:effectLst>
+        </a:effectStyle>
+        <a:effectStyle>
+          <a:effectLst>
+            <a:outerShdw blurRad="40000" dist="23000" dir="5400000" rotWithShape="0">
+              <a:srgbClr val="000000">
+                <a:alpha val="35000"/>
+              </a:srgbClr>
+            </a:outerShdw>
+          </a:effectLst>
+        </a:effectStyle>
+        <a:effectStyle>
+          <a:effectLst>
+            <a:outerShdw blurRad="40000" dist="23000" dir="5400000" rotWithShape="0">
+              <a:srgbClr val="000000">
+                <a:alpha val="35000"/>
+              </a:srgbClr>
+            </a:outerShdw>
+          </a:effectLst>
+          <a:scene3d>
+            <a:camera prst="orthographicFront">
+              <a:rot lat="0" lon="0" rev="0"/>
+            </a:camera>
+            <a:lightRig rig="threePt" dir="t">
+              <a:rot lat="0" lon="0" rev="1200000"/>
+            </a:lightRig>
+          </a:scene3d>
+          <a:sp3d>
+            <a:bevelT w="63500" h="25400"/>
+          </a:sp3d>
+        </a:effectStyle>
+      </a:effectStyleLst>
+      <a:bgFillStyleLst>
+        <a:solidFill>
+          <a:schemeClr val="phClr"/>
+        </a:solidFill>
+        <a:gradFill rotWithShape="1">
+          <a:gsLst>
+            <a:gs pos="0">
+              <a:schemeClr val="phClr">
+                <a:tint val="40000"/>
+                <a:satMod val="350000"/>
+              </a:schemeClr>
+            </a:gs>
+            <a:gs pos="40000">
+              <a:schemeClr val="phClr">
+                <a:tint val="45000"/>
+                <a:shade val="99000"/>
+                <a:satMod val="350000"/>
+              </a:schemeClr>
+            </a:gs>
+            <a:gs pos="100000">
+              <a:schemeClr val="phClr">
+                <a:shade val="20000"/>
+                <a:satMod val="255000"/>
+              </a:schemeClr>
+            </a:gs>
+          </a:gsLst>
+          <a:path path="circle">
+            <a:fillToRect l="50000" t="-80000" r="50000" b="180000"/>
+          </a:path>
+        </a:gradFill>
+        <a:gradFill rotWithShape="1">
+          <a:gsLst>
+            <a:gs pos="0">
+              <a:schemeClr val="phClr">
+                <a:tint val="80000"/>
+                <a:satMod val="300000"/>
+              </a:schemeClr>
+            </a:gs>
+            <a:gs pos="100000">
+              <a:schemeClr val="phClr">
+                <a:shade val="30000"/>
+                <a:satMod val="200000"/>
+              </a:schemeClr>
+            </a:gs>
+          </a:gsLst>
+          <a:path path="circle">
+            <a:fillToRect l="50000" t="50000" r="50000" b="50000"/>
+          </a:path>
+        </a:gradFill>
+      </a:bgFillStyleLst>
+    </a:fmtScheme>
+  </a:themeElements>
+</a:theme>
+</file>
+
+<file path=ppt/theme/theme2.xml><?xml version="1.0" encoding="utf-8"?>
 <a:theme xmlns:a="http://schemas.openxmlformats.org/drawingml/2006/main" xmlns:r="http://schemas.openxmlformats.org/officeDocument/2006/relationships">
   <a:themeElements>
     <a:clrScheme name="Default">
@@ -15400,283 +15699,4 @@
     </a:fmtScheme>
   </a:themeElements>
 </a:theme>
-</file>
-
-<file path=ppt/theme/theme2.xml><?xml version="1.0" encoding="utf-8"?>
-<a:theme xmlns:a="http://schemas.openxmlformats.org/drawingml/2006/main" xmlns:r="http://schemas.openxmlformats.org/officeDocument/2006/relationships" name="AMOS Slides Template">
-  <a:themeElements>
-    <a:clrScheme name="Simple Light">
-      <a:dk1>
-        <a:srgbClr val="000000"/>
-      </a:dk1>
-      <a:lt1>
-        <a:srgbClr val="FFFFFF"/>
-      </a:lt1>
-      <a:dk2>
-        <a:srgbClr val="808080"/>
-      </a:dk2>
-      <a:lt2>
-        <a:srgbClr val="DCDCDC"/>
-      </a:lt2>
-      <a:accent1>
-        <a:srgbClr val="D50D01"/>
-      </a:accent1>
-      <a:accent2>
-        <a:srgbClr val="448AFF"/>
-      </a:accent2>
-      <a:accent3>
-        <a:srgbClr val="D50D01"/>
-      </a:accent3>
-      <a:accent4>
-        <a:srgbClr val="424242"/>
-      </a:accent4>
-      <a:accent5>
-        <a:srgbClr val="3F51B5"/>
-      </a:accent5>
-      <a:accent6>
-        <a:srgbClr val="4CAF50"/>
-      </a:accent6>
-      <a:hlink>
-        <a:srgbClr val="34A3C5"/>
-      </a:hlink>
-      <a:folHlink>
-        <a:srgbClr val="0097A7"/>
-      </a:folHlink>
-    </a:clrScheme>
-    <a:fontScheme name="Office">
-      <a:majorFont>
-        <a:latin typeface="Arial"/>
-        <a:ea typeface=""/>
-        <a:cs typeface=""/>
-        <a:font script="Jpan" typeface="ＭＳ Ｐゴシック"/>
-        <a:font script="Hang" typeface="맑은 고딕"/>
-        <a:font script="Hans" typeface="宋体"/>
-        <a:font script="Hant" typeface="新細明體"/>
-        <a:font script="Arab" typeface="Times New Roman"/>
-        <a:font script="Hebr" typeface="Times New Roman"/>
-        <a:font script="Thai" typeface="Angsana New"/>
-        <a:font script="Ethi" typeface="Nyala"/>
-        <a:font script="Beng" typeface="Vrinda"/>
-        <a:font script="Gujr" typeface="Shruti"/>
-        <a:font script="Khmr" typeface="MoolBoran"/>
-        <a:font script="Knda" typeface="Tunga"/>
-        <a:font script="Guru" typeface="Raavi"/>
-        <a:font script="Cans" typeface="Euphemia"/>
-        <a:font script="Cher" typeface="Plantagenet Cherokee"/>
-        <a:font script="Yiii" typeface="Microsoft Yi Baiti"/>
-        <a:font script="Tibt" typeface="Microsoft Himalaya"/>
-        <a:font script="Thaa" typeface="MV Boli"/>
-        <a:font script="Deva" typeface="Mangal"/>
-        <a:font script="Telu" typeface="Gautami"/>
-        <a:font script="Taml" typeface="Latha"/>
-        <a:font script="Syrc" typeface="Estrangelo Edessa"/>
-        <a:font script="Orya" typeface="Kalinga"/>
-        <a:font script="Mlym" typeface="Kartika"/>
-        <a:font script="Laoo" typeface="DokChampa"/>
-        <a:font script="Sinh" typeface="Iskoola Pota"/>
-        <a:font script="Mong" typeface="Mongolian Baiti"/>
-        <a:font script="Viet" typeface="Times New Roman"/>
-        <a:font script="Uigh" typeface="Microsoft Uighur"/>
-        <a:font script="Geor" typeface="Sylfaen"/>
-      </a:majorFont>
-      <a:minorFont>
-        <a:latin typeface="Arial"/>
-        <a:ea typeface=""/>
-        <a:cs typeface=""/>
-        <a:font script="Jpan" typeface="ＭＳ Ｐゴシック"/>
-        <a:font script="Hang" typeface="맑은 고딕"/>
-        <a:font script="Hans" typeface="宋体"/>
-        <a:font script="Hant" typeface="新細明體"/>
-        <a:font script="Arab" typeface="Arial"/>
-        <a:font script="Hebr" typeface="Arial"/>
-        <a:font script="Thai" typeface="Cordia New"/>
-        <a:font script="Ethi" typeface="Nyala"/>
-        <a:font script="Beng" typeface="Vrinda"/>
-        <a:font script="Gujr" typeface="Shruti"/>
-        <a:font script="Khmr" typeface="DaunPenh"/>
-        <a:font script="Knda" typeface="Tunga"/>
-        <a:font script="Guru" typeface="Raavi"/>
-        <a:font script="Cans" typeface="Euphemia"/>
-        <a:font script="Cher" typeface="Plantagenet Cherokee"/>
-        <a:font script="Yiii" typeface="Microsoft Yi Baiti"/>
-        <a:font script="Tibt" typeface="Microsoft Himalaya"/>
-        <a:font script="Thaa" typeface="MV Boli"/>
-        <a:font script="Deva" typeface="Mangal"/>
-        <a:font script="Telu" typeface="Gautami"/>
-        <a:font script="Taml" typeface="Latha"/>
-        <a:font script="Syrc" typeface="Estrangelo Edessa"/>
-        <a:font script="Orya" typeface="Kalinga"/>
-        <a:font script="Mlym" typeface="Kartika"/>
-        <a:font script="Laoo" typeface="DokChampa"/>
-        <a:font script="Sinh" typeface="Iskoola Pota"/>
-        <a:font script="Mong" typeface="Mongolian Baiti"/>
-        <a:font script="Viet" typeface="Arial"/>
-        <a:font script="Uigh" typeface="Microsoft Uighur"/>
-        <a:font script="Geor" typeface="Sylfaen"/>
-      </a:minorFont>
-    </a:fontScheme>
-    <a:fmtScheme name="Office">
-      <a:fillStyleLst>
-        <a:solidFill>
-          <a:schemeClr val="phClr"/>
-        </a:solidFill>
-        <a:gradFill rotWithShape="1">
-          <a:gsLst>
-            <a:gs pos="0">
-              <a:schemeClr val="phClr">
-                <a:tint val="50000"/>
-                <a:satMod val="300000"/>
-              </a:schemeClr>
-            </a:gs>
-            <a:gs pos="35000">
-              <a:schemeClr val="phClr">
-                <a:tint val="37000"/>
-                <a:satMod val="300000"/>
-              </a:schemeClr>
-            </a:gs>
-            <a:gs pos="100000">
-              <a:schemeClr val="phClr">
-                <a:tint val="15000"/>
-                <a:satMod val="350000"/>
-              </a:schemeClr>
-            </a:gs>
-          </a:gsLst>
-          <a:lin ang="16200000" scaled="1"/>
-        </a:gradFill>
-        <a:gradFill rotWithShape="1">
-          <a:gsLst>
-            <a:gs pos="0">
-              <a:schemeClr val="phClr">
-                <a:tint val="100000"/>
-                <a:shade val="100000"/>
-                <a:satMod val="130000"/>
-              </a:schemeClr>
-            </a:gs>
-            <a:gs pos="100000">
-              <a:schemeClr val="phClr">
-                <a:tint val="50000"/>
-                <a:shade val="100000"/>
-                <a:satMod val="350000"/>
-              </a:schemeClr>
-            </a:gs>
-          </a:gsLst>
-          <a:lin ang="16200000" scaled="0"/>
-        </a:gradFill>
-      </a:fillStyleLst>
-      <a:lnStyleLst>
-        <a:ln w="9525" cap="flat" cmpd="sng" algn="ctr">
-          <a:solidFill>
-            <a:schemeClr val="phClr">
-              <a:shade val="95000"/>
-              <a:satMod val="105000"/>
-            </a:schemeClr>
-          </a:solidFill>
-          <a:prstDash val="solid"/>
-        </a:ln>
-        <a:ln w="25400" cap="flat" cmpd="sng" algn="ctr">
-          <a:solidFill>
-            <a:schemeClr val="phClr"/>
-          </a:solidFill>
-          <a:prstDash val="solid"/>
-        </a:ln>
-        <a:ln w="38100" cap="flat" cmpd="sng" algn="ctr">
-          <a:solidFill>
-            <a:schemeClr val="phClr"/>
-          </a:solidFill>
-          <a:prstDash val="solid"/>
-        </a:ln>
-      </a:lnStyleLst>
-      <a:effectStyleLst>
-        <a:effectStyle>
-          <a:effectLst>
-            <a:outerShdw blurRad="40000" dist="20000" dir="5400000" rotWithShape="0">
-              <a:srgbClr val="000000">
-                <a:alpha val="38000"/>
-              </a:srgbClr>
-            </a:outerShdw>
-          </a:effectLst>
-        </a:effectStyle>
-        <a:effectStyle>
-          <a:effectLst>
-            <a:outerShdw blurRad="40000" dist="23000" dir="5400000" rotWithShape="0">
-              <a:srgbClr val="000000">
-                <a:alpha val="35000"/>
-              </a:srgbClr>
-            </a:outerShdw>
-          </a:effectLst>
-        </a:effectStyle>
-        <a:effectStyle>
-          <a:effectLst>
-            <a:outerShdw blurRad="40000" dist="23000" dir="5400000" rotWithShape="0">
-              <a:srgbClr val="000000">
-                <a:alpha val="35000"/>
-              </a:srgbClr>
-            </a:outerShdw>
-          </a:effectLst>
-          <a:scene3d>
-            <a:camera prst="orthographicFront">
-              <a:rot lat="0" lon="0" rev="0"/>
-            </a:camera>
-            <a:lightRig rig="threePt" dir="t">
-              <a:rot lat="0" lon="0" rev="1200000"/>
-            </a:lightRig>
-          </a:scene3d>
-          <a:sp3d>
-            <a:bevelT w="63500" h="25400"/>
-          </a:sp3d>
-        </a:effectStyle>
-      </a:effectStyleLst>
-      <a:bgFillStyleLst>
-        <a:solidFill>
-          <a:schemeClr val="phClr"/>
-        </a:solidFill>
-        <a:gradFill rotWithShape="1">
-          <a:gsLst>
-            <a:gs pos="0">
-              <a:schemeClr val="phClr">
-                <a:tint val="40000"/>
-                <a:satMod val="350000"/>
-              </a:schemeClr>
-            </a:gs>
-            <a:gs pos="40000">
-              <a:schemeClr val="phClr">
-                <a:tint val="45000"/>
-                <a:shade val="99000"/>
-                <a:satMod val="350000"/>
-              </a:schemeClr>
-            </a:gs>
-            <a:gs pos="100000">
-              <a:schemeClr val="phClr">
-                <a:shade val="20000"/>
-                <a:satMod val="255000"/>
-              </a:schemeClr>
-            </a:gs>
-          </a:gsLst>
-          <a:path path="circle">
-            <a:fillToRect l="50000" t="-80000" r="50000" b="180000"/>
-          </a:path>
-        </a:gradFill>
-        <a:gradFill rotWithShape="1">
-          <a:gsLst>
-            <a:gs pos="0">
-              <a:schemeClr val="phClr">
-                <a:tint val="80000"/>
-                <a:satMod val="300000"/>
-              </a:schemeClr>
-            </a:gs>
-            <a:gs pos="100000">
-              <a:schemeClr val="phClr">
-                <a:shade val="30000"/>
-                <a:satMod val="200000"/>
-              </a:schemeClr>
-            </a:gs>
-          </a:gsLst>
-          <a:path path="circle">
-            <a:fillToRect l="50000" t="50000" r="50000" b="50000"/>
-          </a:path>
-        </a:gradFill>
-      </a:bgFillStyleLst>
-    </a:fmtScheme>
-  </a:themeElements>
-</a:theme>
 </file>
</xml_diff>

<commit_message>
Updates (not content related)
</commit_message>
<xml_diff>
--- a/Lecture slides/AMOS A01 - Introduction.pptx
+++ b/Lecture slides/AMOS A01 - Introduction.pptx
@@ -6185,7 +6185,7 @@
             <a:tbl>
               <a:tblPr>
                 <a:noFill/>
-                <a:tableStyleId>{E71F95C4-8580-485C-926D-22E254BEB369}</a:tableStyleId>
+                <a:tableStyleId>{1FF0F3D3-011E-41AD-9BD2-7C33C474695F}</a:tableStyleId>
               </a:tblPr>
               <a:tblGrid>
                 <a:gridCol w="1314475"/>
@@ -13061,7 +13061,7 @@
             <a:tbl>
               <a:tblPr>
                 <a:noFill/>
-                <a:tableStyleId>{E71F95C4-8580-485C-926D-22E254BEB369}</a:tableStyleId>
+                <a:tableStyleId>{1FF0F3D3-011E-41AD-9BD2-7C33C474695F}</a:tableStyleId>
               </a:tblPr>
               <a:tblGrid>
                 <a:gridCol w="1314450"/>
@@ -15144,6 +15144,285 @@
 </file>
 
 <file path=ppt/theme/theme1.xml><?xml version="1.0" encoding="utf-8"?>
+<a:theme xmlns:a="http://schemas.openxmlformats.org/drawingml/2006/main" xmlns:r="http://schemas.openxmlformats.org/officeDocument/2006/relationships">
+  <a:themeElements>
+    <a:clrScheme name="Default">
+      <a:dk1>
+        <a:srgbClr val="000000"/>
+      </a:dk1>
+      <a:lt1>
+        <a:srgbClr val="FFFFFF"/>
+      </a:lt1>
+      <a:dk2>
+        <a:srgbClr val="158158"/>
+      </a:dk2>
+      <a:lt2>
+        <a:srgbClr val="F3F3F3"/>
+      </a:lt2>
+      <a:accent1>
+        <a:srgbClr val="058DC7"/>
+      </a:accent1>
+      <a:accent2>
+        <a:srgbClr val="50B432"/>
+      </a:accent2>
+      <a:accent3>
+        <a:srgbClr val="ED561B"/>
+      </a:accent3>
+      <a:accent4>
+        <a:srgbClr val="EDEF00"/>
+      </a:accent4>
+      <a:accent5>
+        <a:srgbClr val="24CBE5"/>
+      </a:accent5>
+      <a:accent6>
+        <a:srgbClr val="64E572"/>
+      </a:accent6>
+      <a:hlink>
+        <a:srgbClr val="2200CC"/>
+      </a:hlink>
+      <a:folHlink>
+        <a:srgbClr val="551A8B"/>
+      </a:folHlink>
+    </a:clrScheme>
+    <a:fontScheme name="Office">
+      <a:majorFont>
+        <a:latin typeface="Arial"/>
+        <a:ea typeface=""/>
+        <a:cs typeface=""/>
+        <a:font script="Jpan" typeface="ＭＳ Ｐゴシック"/>
+        <a:font script="Hang" typeface="맑은 고딕"/>
+        <a:font script="Hans" typeface="宋体"/>
+        <a:font script="Hant" typeface="新細明體"/>
+        <a:font script="Arab" typeface="Times New Roman"/>
+        <a:font script="Hebr" typeface="Times New Roman"/>
+        <a:font script="Thai" typeface="Angsana New"/>
+        <a:font script="Ethi" typeface="Nyala"/>
+        <a:font script="Beng" typeface="Vrinda"/>
+        <a:font script="Gujr" typeface="Shruti"/>
+        <a:font script="Khmr" typeface="MoolBoran"/>
+        <a:font script="Knda" typeface="Tunga"/>
+        <a:font script="Guru" typeface="Raavi"/>
+        <a:font script="Cans" typeface="Euphemia"/>
+        <a:font script="Cher" typeface="Plantagenet Cherokee"/>
+        <a:font script="Yiii" typeface="Microsoft Yi Baiti"/>
+        <a:font script="Tibt" typeface="Microsoft Himalaya"/>
+        <a:font script="Thaa" typeface="MV Boli"/>
+        <a:font script="Deva" typeface="Mangal"/>
+        <a:font script="Telu" typeface="Gautami"/>
+        <a:font script="Taml" typeface="Latha"/>
+        <a:font script="Syrc" typeface="Estrangelo Edessa"/>
+        <a:font script="Orya" typeface="Kalinga"/>
+        <a:font script="Mlym" typeface="Kartika"/>
+        <a:font script="Laoo" typeface="DokChampa"/>
+        <a:font script="Sinh" typeface="Iskoola Pota"/>
+        <a:font script="Mong" typeface="Mongolian Baiti"/>
+        <a:font script="Viet" typeface="Times New Roman"/>
+        <a:font script="Uigh" typeface="Microsoft Uighur"/>
+        <a:font script="Geor" typeface="Sylfaen"/>
+      </a:majorFont>
+      <a:minorFont>
+        <a:latin typeface="Arial"/>
+        <a:ea typeface=""/>
+        <a:cs typeface=""/>
+        <a:font script="Jpan" typeface="ＭＳ Ｐゴシック"/>
+        <a:font script="Hang" typeface="맑은 고딕"/>
+        <a:font script="Hans" typeface="宋体"/>
+        <a:font script="Hant" typeface="新細明體"/>
+        <a:font script="Arab" typeface="Arial"/>
+        <a:font script="Hebr" typeface="Arial"/>
+        <a:font script="Thai" typeface="Cordia New"/>
+        <a:font script="Ethi" typeface="Nyala"/>
+        <a:font script="Beng" typeface="Vrinda"/>
+        <a:font script="Gujr" typeface="Shruti"/>
+        <a:font script="Khmr" typeface="DaunPenh"/>
+        <a:font script="Knda" typeface="Tunga"/>
+        <a:font script="Guru" typeface="Raavi"/>
+        <a:font script="Cans" typeface="Euphemia"/>
+        <a:font script="Cher" typeface="Plantagenet Cherokee"/>
+        <a:font script="Yiii" typeface="Microsoft Yi Baiti"/>
+        <a:font script="Tibt" typeface="Microsoft Himalaya"/>
+        <a:font script="Thaa" typeface="MV Boli"/>
+        <a:font script="Deva" typeface="Mangal"/>
+        <a:font script="Telu" typeface="Gautami"/>
+        <a:font script="Taml" typeface="Latha"/>
+        <a:font script="Syrc" typeface="Estrangelo Edessa"/>
+        <a:font script="Orya" typeface="Kalinga"/>
+        <a:font script="Mlym" typeface="Kartika"/>
+        <a:font script="Laoo" typeface="DokChampa"/>
+        <a:font script="Sinh" typeface="Iskoola Pota"/>
+        <a:font script="Mong" typeface="Mongolian Baiti"/>
+        <a:font script="Viet" typeface="Arial"/>
+        <a:font script="Uigh" typeface="Microsoft Uighur"/>
+        <a:font script="Geor" typeface="Sylfaen"/>
+      </a:minorFont>
+    </a:fontScheme>
+    <a:fmtScheme name="Office">
+      <a:fillStyleLst>
+        <a:solidFill>
+          <a:schemeClr val="phClr"/>
+        </a:solidFill>
+        <a:gradFill rotWithShape="1">
+          <a:gsLst>
+            <a:gs pos="0">
+              <a:schemeClr val="phClr">
+                <a:tint val="50000"/>
+                <a:satMod val="300000"/>
+              </a:schemeClr>
+            </a:gs>
+            <a:gs pos="35000">
+              <a:schemeClr val="phClr">
+                <a:tint val="37000"/>
+                <a:satMod val="300000"/>
+              </a:schemeClr>
+            </a:gs>
+            <a:gs pos="100000">
+              <a:schemeClr val="phClr">
+                <a:tint val="15000"/>
+                <a:satMod val="350000"/>
+              </a:schemeClr>
+            </a:gs>
+          </a:gsLst>
+          <a:lin ang="16200000" scaled="1"/>
+        </a:gradFill>
+        <a:gradFill rotWithShape="1">
+          <a:gsLst>
+            <a:gs pos="0">
+              <a:schemeClr val="phClr">
+                <a:tint val="100000"/>
+                <a:shade val="100000"/>
+                <a:satMod val="130000"/>
+              </a:schemeClr>
+            </a:gs>
+            <a:gs pos="100000">
+              <a:schemeClr val="phClr">
+                <a:tint val="50000"/>
+                <a:shade val="100000"/>
+                <a:satMod val="350000"/>
+              </a:schemeClr>
+            </a:gs>
+          </a:gsLst>
+          <a:lin ang="16200000" scaled="0"/>
+        </a:gradFill>
+      </a:fillStyleLst>
+      <a:lnStyleLst>
+        <a:ln w="9525" cap="flat" cmpd="sng" algn="ctr">
+          <a:solidFill>
+            <a:schemeClr val="phClr">
+              <a:shade val="95000"/>
+              <a:satMod val="105000"/>
+            </a:schemeClr>
+          </a:solidFill>
+          <a:prstDash val="solid"/>
+        </a:ln>
+        <a:ln w="25400" cap="flat" cmpd="sng" algn="ctr">
+          <a:solidFill>
+            <a:schemeClr val="phClr"/>
+          </a:solidFill>
+          <a:prstDash val="solid"/>
+        </a:ln>
+        <a:ln w="38100" cap="flat" cmpd="sng" algn="ctr">
+          <a:solidFill>
+            <a:schemeClr val="phClr"/>
+          </a:solidFill>
+          <a:prstDash val="solid"/>
+        </a:ln>
+      </a:lnStyleLst>
+      <a:effectStyleLst>
+        <a:effectStyle>
+          <a:effectLst>
+            <a:outerShdw blurRad="40000" dist="20000" dir="5400000" rotWithShape="0">
+              <a:srgbClr val="000000">
+                <a:alpha val="38000"/>
+              </a:srgbClr>
+            </a:outerShdw>
+          </a:effectLst>
+        </a:effectStyle>
+        <a:effectStyle>
+          <a:effectLst>
+            <a:outerShdw blurRad="40000" dist="23000" dir="5400000" rotWithShape="0">
+              <a:srgbClr val="000000">
+                <a:alpha val="35000"/>
+              </a:srgbClr>
+            </a:outerShdw>
+          </a:effectLst>
+        </a:effectStyle>
+        <a:effectStyle>
+          <a:effectLst>
+            <a:outerShdw blurRad="40000" dist="23000" dir="5400000" rotWithShape="0">
+              <a:srgbClr val="000000">
+                <a:alpha val="35000"/>
+              </a:srgbClr>
+            </a:outerShdw>
+          </a:effectLst>
+          <a:scene3d>
+            <a:camera prst="orthographicFront">
+              <a:rot lat="0" lon="0" rev="0"/>
+            </a:camera>
+            <a:lightRig rig="threePt" dir="t">
+              <a:rot lat="0" lon="0" rev="1200000"/>
+            </a:lightRig>
+          </a:scene3d>
+          <a:sp3d>
+            <a:bevelT w="63500" h="25400"/>
+          </a:sp3d>
+        </a:effectStyle>
+      </a:effectStyleLst>
+      <a:bgFillStyleLst>
+        <a:solidFill>
+          <a:schemeClr val="phClr"/>
+        </a:solidFill>
+        <a:gradFill rotWithShape="1">
+          <a:gsLst>
+            <a:gs pos="0">
+              <a:schemeClr val="phClr">
+                <a:tint val="40000"/>
+                <a:satMod val="350000"/>
+              </a:schemeClr>
+            </a:gs>
+            <a:gs pos="40000">
+              <a:schemeClr val="phClr">
+                <a:tint val="45000"/>
+                <a:shade val="99000"/>
+                <a:satMod val="350000"/>
+              </a:schemeClr>
+            </a:gs>
+            <a:gs pos="100000">
+              <a:schemeClr val="phClr">
+                <a:shade val="20000"/>
+                <a:satMod val="255000"/>
+              </a:schemeClr>
+            </a:gs>
+          </a:gsLst>
+          <a:path path="circle">
+            <a:fillToRect l="50000" t="-80000" r="50000" b="180000"/>
+          </a:path>
+        </a:gradFill>
+        <a:gradFill rotWithShape="1">
+          <a:gsLst>
+            <a:gs pos="0">
+              <a:schemeClr val="phClr">
+                <a:tint val="80000"/>
+                <a:satMod val="300000"/>
+              </a:schemeClr>
+            </a:gs>
+            <a:gs pos="100000">
+              <a:schemeClr val="phClr">
+                <a:shade val="30000"/>
+                <a:satMod val="200000"/>
+              </a:schemeClr>
+            </a:gs>
+          </a:gsLst>
+          <a:path path="circle">
+            <a:fillToRect l="50000" t="50000" r="50000" b="50000"/>
+          </a:path>
+        </a:gradFill>
+      </a:bgFillStyleLst>
+    </a:fmtScheme>
+  </a:themeElements>
+</a:theme>
+</file>
+
+<file path=ppt/theme/theme2.xml><?xml version="1.0" encoding="utf-8"?>
 <a:theme xmlns:a="http://schemas.openxmlformats.org/drawingml/2006/main" xmlns:r="http://schemas.openxmlformats.org/officeDocument/2006/relationships" name="AMOS Slides Template">
   <a:themeElements>
     <a:clrScheme name="Simple Light">
@@ -15420,283 +15699,4 @@
     </a:fmtScheme>
   </a:themeElements>
 </a:theme>
-</file>
-
-<file path=ppt/theme/theme2.xml><?xml version="1.0" encoding="utf-8"?>
-<a:theme xmlns:a="http://schemas.openxmlformats.org/drawingml/2006/main" xmlns:r="http://schemas.openxmlformats.org/officeDocument/2006/relationships">
-  <a:themeElements>
-    <a:clrScheme name="Default">
-      <a:dk1>
-        <a:srgbClr val="000000"/>
-      </a:dk1>
-      <a:lt1>
-        <a:srgbClr val="FFFFFF"/>
-      </a:lt1>
-      <a:dk2>
-        <a:srgbClr val="158158"/>
-      </a:dk2>
-      <a:lt2>
-        <a:srgbClr val="F3F3F3"/>
-      </a:lt2>
-      <a:accent1>
-        <a:srgbClr val="058DC7"/>
-      </a:accent1>
-      <a:accent2>
-        <a:srgbClr val="50B432"/>
-      </a:accent2>
-      <a:accent3>
-        <a:srgbClr val="ED561B"/>
-      </a:accent3>
-      <a:accent4>
-        <a:srgbClr val="EDEF00"/>
-      </a:accent4>
-      <a:accent5>
-        <a:srgbClr val="24CBE5"/>
-      </a:accent5>
-      <a:accent6>
-        <a:srgbClr val="64E572"/>
-      </a:accent6>
-      <a:hlink>
-        <a:srgbClr val="2200CC"/>
-      </a:hlink>
-      <a:folHlink>
-        <a:srgbClr val="551A8B"/>
-      </a:folHlink>
-    </a:clrScheme>
-    <a:fontScheme name="Office">
-      <a:majorFont>
-        <a:latin typeface="Arial"/>
-        <a:ea typeface=""/>
-        <a:cs typeface=""/>
-        <a:font script="Jpan" typeface="ＭＳ Ｐゴシック"/>
-        <a:font script="Hang" typeface="맑은 고딕"/>
-        <a:font script="Hans" typeface="宋体"/>
-        <a:font script="Hant" typeface="新細明體"/>
-        <a:font script="Arab" typeface="Times New Roman"/>
-        <a:font script="Hebr" typeface="Times New Roman"/>
-        <a:font script="Thai" typeface="Angsana New"/>
-        <a:font script="Ethi" typeface="Nyala"/>
-        <a:font script="Beng" typeface="Vrinda"/>
-        <a:font script="Gujr" typeface="Shruti"/>
-        <a:font script="Khmr" typeface="MoolBoran"/>
-        <a:font script="Knda" typeface="Tunga"/>
-        <a:font script="Guru" typeface="Raavi"/>
-        <a:font script="Cans" typeface="Euphemia"/>
-        <a:font script="Cher" typeface="Plantagenet Cherokee"/>
-        <a:font script="Yiii" typeface="Microsoft Yi Baiti"/>
-        <a:font script="Tibt" typeface="Microsoft Himalaya"/>
-        <a:font script="Thaa" typeface="MV Boli"/>
-        <a:font script="Deva" typeface="Mangal"/>
-        <a:font script="Telu" typeface="Gautami"/>
-        <a:font script="Taml" typeface="Latha"/>
-        <a:font script="Syrc" typeface="Estrangelo Edessa"/>
-        <a:font script="Orya" typeface="Kalinga"/>
-        <a:font script="Mlym" typeface="Kartika"/>
-        <a:font script="Laoo" typeface="DokChampa"/>
-        <a:font script="Sinh" typeface="Iskoola Pota"/>
-        <a:font script="Mong" typeface="Mongolian Baiti"/>
-        <a:font script="Viet" typeface="Times New Roman"/>
-        <a:font script="Uigh" typeface="Microsoft Uighur"/>
-        <a:font script="Geor" typeface="Sylfaen"/>
-      </a:majorFont>
-      <a:minorFont>
-        <a:latin typeface="Arial"/>
-        <a:ea typeface=""/>
-        <a:cs typeface=""/>
-        <a:font script="Jpan" typeface="ＭＳ Ｐゴシック"/>
-        <a:font script="Hang" typeface="맑은 고딕"/>
-        <a:font script="Hans" typeface="宋体"/>
-        <a:font script="Hant" typeface="新細明體"/>
-        <a:font script="Arab" typeface="Arial"/>
-        <a:font script="Hebr" typeface="Arial"/>
-        <a:font script="Thai" typeface="Cordia New"/>
-        <a:font script="Ethi" typeface="Nyala"/>
-        <a:font script="Beng" typeface="Vrinda"/>
-        <a:font script="Gujr" typeface="Shruti"/>
-        <a:font script="Khmr" typeface="DaunPenh"/>
-        <a:font script="Knda" typeface="Tunga"/>
-        <a:font script="Guru" typeface="Raavi"/>
-        <a:font script="Cans" typeface="Euphemia"/>
-        <a:font script="Cher" typeface="Plantagenet Cherokee"/>
-        <a:font script="Yiii" typeface="Microsoft Yi Baiti"/>
-        <a:font script="Tibt" typeface="Microsoft Himalaya"/>
-        <a:font script="Thaa" typeface="MV Boli"/>
-        <a:font script="Deva" typeface="Mangal"/>
-        <a:font script="Telu" typeface="Gautami"/>
-        <a:font script="Taml" typeface="Latha"/>
-        <a:font script="Syrc" typeface="Estrangelo Edessa"/>
-        <a:font script="Orya" typeface="Kalinga"/>
-        <a:font script="Mlym" typeface="Kartika"/>
-        <a:font script="Laoo" typeface="DokChampa"/>
-        <a:font script="Sinh" typeface="Iskoola Pota"/>
-        <a:font script="Mong" typeface="Mongolian Baiti"/>
-        <a:font script="Viet" typeface="Arial"/>
-        <a:font script="Uigh" typeface="Microsoft Uighur"/>
-        <a:font script="Geor" typeface="Sylfaen"/>
-      </a:minorFont>
-    </a:fontScheme>
-    <a:fmtScheme name="Office">
-      <a:fillStyleLst>
-        <a:solidFill>
-          <a:schemeClr val="phClr"/>
-        </a:solidFill>
-        <a:gradFill rotWithShape="1">
-          <a:gsLst>
-            <a:gs pos="0">
-              <a:schemeClr val="phClr">
-                <a:tint val="50000"/>
-                <a:satMod val="300000"/>
-              </a:schemeClr>
-            </a:gs>
-            <a:gs pos="35000">
-              <a:schemeClr val="phClr">
-                <a:tint val="37000"/>
-                <a:satMod val="300000"/>
-              </a:schemeClr>
-            </a:gs>
-            <a:gs pos="100000">
-              <a:schemeClr val="phClr">
-                <a:tint val="15000"/>
-                <a:satMod val="350000"/>
-              </a:schemeClr>
-            </a:gs>
-          </a:gsLst>
-          <a:lin ang="16200000" scaled="1"/>
-        </a:gradFill>
-        <a:gradFill rotWithShape="1">
-          <a:gsLst>
-            <a:gs pos="0">
-              <a:schemeClr val="phClr">
-                <a:tint val="100000"/>
-                <a:shade val="100000"/>
-                <a:satMod val="130000"/>
-              </a:schemeClr>
-            </a:gs>
-            <a:gs pos="100000">
-              <a:schemeClr val="phClr">
-                <a:tint val="50000"/>
-                <a:shade val="100000"/>
-                <a:satMod val="350000"/>
-              </a:schemeClr>
-            </a:gs>
-          </a:gsLst>
-          <a:lin ang="16200000" scaled="0"/>
-        </a:gradFill>
-      </a:fillStyleLst>
-      <a:lnStyleLst>
-        <a:ln w="9525" cap="flat" cmpd="sng" algn="ctr">
-          <a:solidFill>
-            <a:schemeClr val="phClr">
-              <a:shade val="95000"/>
-              <a:satMod val="105000"/>
-            </a:schemeClr>
-          </a:solidFill>
-          <a:prstDash val="solid"/>
-        </a:ln>
-        <a:ln w="25400" cap="flat" cmpd="sng" algn="ctr">
-          <a:solidFill>
-            <a:schemeClr val="phClr"/>
-          </a:solidFill>
-          <a:prstDash val="solid"/>
-        </a:ln>
-        <a:ln w="38100" cap="flat" cmpd="sng" algn="ctr">
-          <a:solidFill>
-            <a:schemeClr val="phClr"/>
-          </a:solidFill>
-          <a:prstDash val="solid"/>
-        </a:ln>
-      </a:lnStyleLst>
-      <a:effectStyleLst>
-        <a:effectStyle>
-          <a:effectLst>
-            <a:outerShdw blurRad="40000" dist="20000" dir="5400000" rotWithShape="0">
-              <a:srgbClr val="000000">
-                <a:alpha val="38000"/>
-              </a:srgbClr>
-            </a:outerShdw>
-          </a:effectLst>
-        </a:effectStyle>
-        <a:effectStyle>
-          <a:effectLst>
-            <a:outerShdw blurRad="40000" dist="23000" dir="5400000" rotWithShape="0">
-              <a:srgbClr val="000000">
-                <a:alpha val="35000"/>
-              </a:srgbClr>
-            </a:outerShdw>
-          </a:effectLst>
-        </a:effectStyle>
-        <a:effectStyle>
-          <a:effectLst>
-            <a:outerShdw blurRad="40000" dist="23000" dir="5400000" rotWithShape="0">
-              <a:srgbClr val="000000">
-                <a:alpha val="35000"/>
-              </a:srgbClr>
-            </a:outerShdw>
-          </a:effectLst>
-          <a:scene3d>
-            <a:camera prst="orthographicFront">
-              <a:rot lat="0" lon="0" rev="0"/>
-            </a:camera>
-            <a:lightRig rig="threePt" dir="t">
-              <a:rot lat="0" lon="0" rev="1200000"/>
-            </a:lightRig>
-          </a:scene3d>
-          <a:sp3d>
-            <a:bevelT w="63500" h="25400"/>
-          </a:sp3d>
-        </a:effectStyle>
-      </a:effectStyleLst>
-      <a:bgFillStyleLst>
-        <a:solidFill>
-          <a:schemeClr val="phClr"/>
-        </a:solidFill>
-        <a:gradFill rotWithShape="1">
-          <a:gsLst>
-            <a:gs pos="0">
-              <a:schemeClr val="phClr">
-                <a:tint val="40000"/>
-                <a:satMod val="350000"/>
-              </a:schemeClr>
-            </a:gs>
-            <a:gs pos="40000">
-              <a:schemeClr val="phClr">
-                <a:tint val="45000"/>
-                <a:shade val="99000"/>
-                <a:satMod val="350000"/>
-              </a:schemeClr>
-            </a:gs>
-            <a:gs pos="100000">
-              <a:schemeClr val="phClr">
-                <a:shade val="20000"/>
-                <a:satMod val="255000"/>
-              </a:schemeClr>
-            </a:gs>
-          </a:gsLst>
-          <a:path path="circle">
-            <a:fillToRect l="50000" t="-80000" r="50000" b="180000"/>
-          </a:path>
-        </a:gradFill>
-        <a:gradFill rotWithShape="1">
-          <a:gsLst>
-            <a:gs pos="0">
-              <a:schemeClr val="phClr">
-                <a:tint val="80000"/>
-                <a:satMod val="300000"/>
-              </a:schemeClr>
-            </a:gs>
-            <a:gs pos="100000">
-              <a:schemeClr val="phClr">
-                <a:shade val="30000"/>
-                <a:satMod val="200000"/>
-              </a:schemeClr>
-            </a:gs>
-          </a:gsLst>
-          <a:path path="circle">
-            <a:fillToRect l="50000" t="50000" r="50000" b="50000"/>
-          </a:path>
-        </a:gradFill>
-      </a:bgFillStyleLst>
-    </a:fmtScheme>
-  </a:themeElements>
-</a:theme>
 </file>
</xml_diff>

<commit_message>
Updated slides with new colors, after B01, before B02
</commit_message>
<xml_diff>
--- a/Lecture slides/AMOS A01 - Introduction.pptx
+++ b/Lecture slides/AMOS A01 - Introduction.pptx
@@ -28,6 +28,8 @@
     <p:sldId id="273" r:id="rId24"/>
     <p:sldId id="274" r:id="rId25"/>
     <p:sldId id="275" r:id="rId26"/>
+    <p:sldId id="276" r:id="rId27"/>
+    <p:sldId id="277" r:id="rId28"/>
   </p:sldIdLst>
   <p:sldSz cy="5143500" cx="9144000"/>
   <p:notesSz cx="6858000" cy="9144000"/>
@@ -1021,7 +1023,7 @@
       </p:grpSpPr>
       <p:sp>
         <p:nvSpPr>
-          <p:cNvPr id="110" name="Google Shape;110;g11ffc178508_0_0:notes"/>
+          <p:cNvPr id="110" name="Google Shape;110;g23985d0d2d4_0_82:notes"/>
           <p:cNvSpPr/>
           <p:nvPr>
             <p:ph idx="2" type="sldImg"/>
@@ -1056,7 +1058,7 @@
       </p:sp>
       <p:sp>
         <p:nvSpPr>
-          <p:cNvPr id="111" name="Google Shape;111;g11ffc178508_0_0:notes"/>
+          <p:cNvPr id="111" name="Google Shape;111;g23985d0d2d4_0_82:notes"/>
           <p:cNvSpPr txBox="1"/>
           <p:nvPr>
             <p:ph idx="1" type="body"/>
@@ -1120,7 +1122,7 @@
       </p:grpSpPr>
       <p:sp>
         <p:nvSpPr>
-          <p:cNvPr id="117" name="Google Shape;117;gdb5ccdfa64_0_0:notes"/>
+          <p:cNvPr id="117" name="Google Shape;117;g11ffc178508_0_0:notes"/>
           <p:cNvSpPr/>
           <p:nvPr>
             <p:ph idx="2" type="sldImg"/>
@@ -1155,7 +1157,7 @@
       </p:sp>
       <p:sp>
         <p:nvSpPr>
-          <p:cNvPr id="118" name="Google Shape;118;gdb5ccdfa64_0_0:notes"/>
+          <p:cNvPr id="118" name="Google Shape;118;g11ffc178508_0_0:notes"/>
           <p:cNvSpPr txBox="1"/>
           <p:nvPr>
             <p:ph idx="1" type="body"/>
@@ -1219,7 +1221,7 @@
       </p:grpSpPr>
       <p:sp>
         <p:nvSpPr>
-          <p:cNvPr id="124" name="Google Shape;124;g126320e9147_0_100:notes"/>
+          <p:cNvPr id="124" name="Google Shape;124;g23985d0d2d4_0_88:notes"/>
           <p:cNvSpPr/>
           <p:nvPr>
             <p:ph idx="2" type="sldImg"/>
@@ -1254,7 +1256,7 @@
       </p:sp>
       <p:sp>
         <p:nvSpPr>
-          <p:cNvPr id="125" name="Google Shape;125;g126320e9147_0_100:notes"/>
+          <p:cNvPr id="125" name="Google Shape;125;g23985d0d2d4_0_88:notes"/>
           <p:cNvSpPr txBox="1"/>
           <p:nvPr>
             <p:ph idx="1" type="body"/>
@@ -1304,7 +1306,7 @@
   <p:cSld>
     <p:spTree>
       <p:nvGrpSpPr>
-        <p:cNvPr id="131" name="Shape 131"/>
+        <p:cNvPr id="130" name="Shape 130"/>
         <p:cNvGrpSpPr/>
         <p:nvPr/>
       </p:nvGrpSpPr>
@@ -1318,7 +1320,7 @@
       </p:grpSpPr>
       <p:sp>
         <p:nvSpPr>
-          <p:cNvPr id="132" name="Google Shape;132;g126320e9147_0_147:notes"/>
+          <p:cNvPr id="131" name="Google Shape;131;g23985d0d2d4_0_94:notes"/>
           <p:cNvSpPr/>
           <p:nvPr>
             <p:ph idx="2" type="sldImg"/>
@@ -1353,7 +1355,7 @@
       </p:sp>
       <p:sp>
         <p:nvSpPr>
-          <p:cNvPr id="133" name="Google Shape;133;g126320e9147_0_147:notes"/>
+          <p:cNvPr id="132" name="Google Shape;132;g23985d0d2d4_0_94:notes"/>
           <p:cNvSpPr txBox="1"/>
           <p:nvPr>
             <p:ph idx="1" type="body"/>
@@ -1403,7 +1405,7 @@
   <p:cSld>
     <p:spTree>
       <p:nvGrpSpPr>
-        <p:cNvPr id="139" name="Shape 139"/>
+        <p:cNvPr id="137" name="Shape 137"/>
         <p:cNvGrpSpPr/>
         <p:nvPr/>
       </p:nvGrpSpPr>
@@ -1417,7 +1419,7 @@
       </p:grpSpPr>
       <p:sp>
         <p:nvSpPr>
-          <p:cNvPr id="140" name="Google Shape;140;g126320e9147_0_94:notes"/>
+          <p:cNvPr id="138" name="Google Shape;138;g23985d0d2d4_0_100:notes"/>
           <p:cNvSpPr/>
           <p:nvPr>
             <p:ph idx="2" type="sldImg"/>
@@ -1452,7 +1454,7 @@
       </p:sp>
       <p:sp>
         <p:nvSpPr>
-          <p:cNvPr id="141" name="Google Shape;141;g126320e9147_0_94:notes"/>
+          <p:cNvPr id="139" name="Google Shape;139;g23985d0d2d4_0_100:notes"/>
           <p:cNvSpPr txBox="1"/>
           <p:nvPr>
             <p:ph idx="1" type="body"/>
@@ -1502,7 +1504,7 @@
   <p:cSld>
     <p:spTree>
       <p:nvGrpSpPr>
-        <p:cNvPr id="146" name="Shape 146"/>
+        <p:cNvPr id="145" name="Shape 145"/>
         <p:cNvGrpSpPr/>
         <p:nvPr/>
       </p:nvGrpSpPr>
@@ -1516,7 +1518,7 @@
       </p:grpSpPr>
       <p:sp>
         <p:nvSpPr>
-          <p:cNvPr id="147" name="Google Shape;147;g126320e9147_0_210:notes"/>
+          <p:cNvPr id="146" name="Google Shape;146;g126320e9147_0_147:notes"/>
           <p:cNvSpPr/>
           <p:nvPr>
             <p:ph idx="2" type="sldImg"/>
@@ -1551,7 +1553,7 @@
       </p:sp>
       <p:sp>
         <p:nvSpPr>
-          <p:cNvPr id="148" name="Google Shape;148;g126320e9147_0_210:notes"/>
+          <p:cNvPr id="147" name="Google Shape;147;g126320e9147_0_147:notes"/>
           <p:cNvSpPr txBox="1"/>
           <p:nvPr>
             <p:ph idx="1" type="body"/>
@@ -1615,7 +1617,7 @@
       </p:grpSpPr>
       <p:sp>
         <p:nvSpPr>
-          <p:cNvPr id="154" name="Google Shape;154;g126320e9147_0_223:notes"/>
+          <p:cNvPr id="154" name="Google Shape;154;g126320e9147_0_94:notes"/>
           <p:cNvSpPr/>
           <p:nvPr>
             <p:ph idx="2" type="sldImg"/>
@@ -1650,7 +1652,7 @@
       </p:sp>
       <p:sp>
         <p:nvSpPr>
-          <p:cNvPr id="155" name="Google Shape;155;g126320e9147_0_223:notes"/>
+          <p:cNvPr id="155" name="Google Shape;155;g126320e9147_0_94:notes"/>
           <p:cNvSpPr txBox="1"/>
           <p:nvPr>
             <p:ph idx="1" type="body"/>
@@ -1714,7 +1716,7 @@
       </p:grpSpPr>
       <p:sp>
         <p:nvSpPr>
-          <p:cNvPr id="161" name="Google Shape;161;g1a19f777a28_0_298:notes"/>
+          <p:cNvPr id="161" name="Google Shape;161;g126320e9147_0_210:notes"/>
           <p:cNvSpPr/>
           <p:nvPr>
             <p:ph idx="2" type="sldImg"/>
@@ -1749,7 +1751,7 @@
       </p:sp>
       <p:sp>
         <p:nvSpPr>
-          <p:cNvPr id="162" name="Google Shape;162;g1a19f777a28_0_298:notes"/>
+          <p:cNvPr id="162" name="Google Shape;162;g126320e9147_0_210:notes"/>
           <p:cNvSpPr txBox="1"/>
           <p:nvPr>
             <p:ph idx="1" type="body"/>
@@ -1898,7 +1900,7 @@
   <p:cSld>
     <p:spTree>
       <p:nvGrpSpPr>
-        <p:cNvPr id="166" name="Shape 166"/>
+        <p:cNvPr id="167" name="Shape 167"/>
         <p:cNvGrpSpPr/>
         <p:nvPr/>
       </p:nvGrpSpPr>
@@ -1912,7 +1914,7 @@
       </p:grpSpPr>
       <p:sp>
         <p:nvSpPr>
-          <p:cNvPr id="167" name="Google Shape;167;g1a19f777a28_0_303:notes"/>
+          <p:cNvPr id="168" name="Google Shape;168;g126320e9147_0_223:notes"/>
           <p:cNvSpPr/>
           <p:nvPr>
             <p:ph idx="2" type="sldImg"/>
@@ -1947,7 +1949,205 @@
       </p:sp>
       <p:sp>
         <p:nvSpPr>
-          <p:cNvPr id="168" name="Google Shape;168;g1a19f777a28_0_303:notes"/>
+          <p:cNvPr id="169" name="Google Shape;169;g126320e9147_0_223:notes"/>
+          <p:cNvSpPr txBox="1"/>
+          <p:nvPr>
+            <p:ph idx="1" type="body"/>
+          </p:nvPr>
+        </p:nvSpPr>
+        <p:spPr>
+          <a:xfrm>
+            <a:off x="685800" y="4343400"/>
+            <a:ext cx="5486400" cy="4114800"/>
+          </a:xfrm>
+          <a:prstGeom prst="rect">
+            <a:avLst/>
+          </a:prstGeom>
+        </p:spPr>
+        <p:txBody>
+          <a:bodyPr anchorCtr="0" anchor="t" bIns="91425" lIns="91425" spcFirstLastPara="1" rIns="91425" wrap="square" tIns="91425">
+            <a:noAutofit/>
+          </a:bodyPr>
+          <a:lstStyle/>
+          <a:p>
+            <a:pPr indent="0" lvl="0" marL="0" rtl="0" algn="l">
+              <a:spcBef>
+                <a:spcPts val="0"/>
+              </a:spcBef>
+              <a:spcAft>
+                <a:spcPts val="0"/>
+              </a:spcAft>
+              <a:buNone/>
+            </a:pPr>
+            <a:r>
+              <a:t/>
+            </a:r>
+            <a:endParaRPr/>
+          </a:p>
+        </p:txBody>
+      </p:sp>
+    </p:spTree>
+  </p:cSld>
+  <p:clrMapOvr>
+    <a:masterClrMapping/>
+  </p:clrMapOvr>
+</p:notes>
+</file>
+
+<file path=ppt/notesSlides/notesSlide21.xml><?xml version="1.0" encoding="utf-8"?>
+<p:notes xmlns:a="http://schemas.openxmlformats.org/drawingml/2006/main" xmlns:r="http://schemas.openxmlformats.org/officeDocument/2006/relationships" xmlns:mc="http://schemas.openxmlformats.org/markup-compatibility/2006" xmlns:mv="urn:schemas-microsoft-com:mac:vml" xmlns:p="http://schemas.openxmlformats.org/presentationml/2006/main" xmlns:c="http://schemas.openxmlformats.org/drawingml/2006/chart" xmlns:dgm="http://schemas.openxmlformats.org/drawingml/2006/diagram" xmlns:o="urn:schemas-microsoft-com:office:office" xmlns:v="urn:schemas-microsoft-com:vml" xmlns:pvml="urn:schemas-microsoft-com:office:powerpoint" xmlns:com="http://schemas.openxmlformats.org/drawingml/2006/compatibility" xmlns:p14="http://schemas.microsoft.com/office/powerpoint/2010/main" xmlns:p15="http://schemas.microsoft.com/office/powerpoint/2012/main" xmlns:ahyp="http://schemas.microsoft.com/office/drawing/2018/hyperlinkcolor" showMasterPhAnim="0" showMasterSp="0">
+  <p:cSld>
+    <p:spTree>
+      <p:nvGrpSpPr>
+        <p:cNvPr id="174" name="Shape 174"/>
+        <p:cNvGrpSpPr/>
+        <p:nvPr/>
+      </p:nvGrpSpPr>
+      <p:grpSpPr>
+        <a:xfrm>
+          <a:off x="0" y="0"/>
+          <a:ext cx="0" cy="0"/>
+          <a:chOff x="0" y="0"/>
+          <a:chExt cx="0" cy="0"/>
+        </a:xfrm>
+      </p:grpSpPr>
+      <p:sp>
+        <p:nvSpPr>
+          <p:cNvPr id="175" name="Google Shape;175;g23985d0d2d4_0_38:notes"/>
+          <p:cNvSpPr/>
+          <p:nvPr>
+            <p:ph idx="2" type="sldImg"/>
+          </p:nvPr>
+        </p:nvSpPr>
+        <p:spPr>
+          <a:xfrm>
+            <a:off x="381300" y="685800"/>
+            <a:ext cx="6096000" cy="3429000"/>
+          </a:xfrm>
+          <a:custGeom>
+            <a:rect b="b" l="l" r="r" t="t"/>
+            <a:pathLst>
+              <a:path extrusionOk="0" h="120000" w="120000">
+                <a:moveTo>
+                  <a:pt x="0" y="0"/>
+                </a:moveTo>
+                <a:lnTo>
+                  <a:pt x="120000" y="0"/>
+                </a:lnTo>
+                <a:lnTo>
+                  <a:pt x="120000" y="120000"/>
+                </a:lnTo>
+                <a:lnTo>
+                  <a:pt x="0" y="120000"/>
+                </a:lnTo>
+                <a:close/>
+              </a:path>
+            </a:pathLst>
+          </a:custGeom>
+        </p:spPr>
+      </p:sp>
+      <p:sp>
+        <p:nvSpPr>
+          <p:cNvPr id="176" name="Google Shape;176;g23985d0d2d4_0_38:notes"/>
+          <p:cNvSpPr txBox="1"/>
+          <p:nvPr>
+            <p:ph idx="1" type="body"/>
+          </p:nvPr>
+        </p:nvSpPr>
+        <p:spPr>
+          <a:xfrm>
+            <a:off x="685800" y="4343400"/>
+            <a:ext cx="5486400" cy="4114800"/>
+          </a:xfrm>
+          <a:prstGeom prst="rect">
+            <a:avLst/>
+          </a:prstGeom>
+        </p:spPr>
+        <p:txBody>
+          <a:bodyPr anchorCtr="0" anchor="t" bIns="91425" lIns="91425" spcFirstLastPara="1" rIns="91425" wrap="square" tIns="91425">
+            <a:noAutofit/>
+          </a:bodyPr>
+          <a:lstStyle/>
+          <a:p>
+            <a:pPr indent="0" lvl="0" marL="0" rtl="0" algn="l">
+              <a:spcBef>
+                <a:spcPts val="0"/>
+              </a:spcBef>
+              <a:spcAft>
+                <a:spcPts val="0"/>
+              </a:spcAft>
+              <a:buNone/>
+            </a:pPr>
+            <a:r>
+              <a:t/>
+            </a:r>
+            <a:endParaRPr/>
+          </a:p>
+        </p:txBody>
+      </p:sp>
+    </p:spTree>
+  </p:cSld>
+  <p:clrMapOvr>
+    <a:masterClrMapping/>
+  </p:clrMapOvr>
+</p:notes>
+</file>
+
+<file path=ppt/notesSlides/notesSlide22.xml><?xml version="1.0" encoding="utf-8"?>
+<p:notes xmlns:a="http://schemas.openxmlformats.org/drawingml/2006/main" xmlns:r="http://schemas.openxmlformats.org/officeDocument/2006/relationships" xmlns:mc="http://schemas.openxmlformats.org/markup-compatibility/2006" xmlns:mv="urn:schemas-microsoft-com:mac:vml" xmlns:p="http://schemas.openxmlformats.org/presentationml/2006/main" xmlns:c="http://schemas.openxmlformats.org/drawingml/2006/chart" xmlns:dgm="http://schemas.openxmlformats.org/drawingml/2006/diagram" xmlns:o="urn:schemas-microsoft-com:office:office" xmlns:v="urn:schemas-microsoft-com:vml" xmlns:pvml="urn:schemas-microsoft-com:office:powerpoint" xmlns:com="http://schemas.openxmlformats.org/drawingml/2006/compatibility" xmlns:p14="http://schemas.microsoft.com/office/powerpoint/2010/main" xmlns:p15="http://schemas.microsoft.com/office/powerpoint/2012/main" xmlns:ahyp="http://schemas.microsoft.com/office/drawing/2018/hyperlinkcolor" showMasterPhAnim="0" showMasterSp="0">
+  <p:cSld>
+    <p:spTree>
+      <p:nvGrpSpPr>
+        <p:cNvPr id="180" name="Shape 180"/>
+        <p:cNvGrpSpPr/>
+        <p:nvPr/>
+      </p:nvGrpSpPr>
+      <p:grpSpPr>
+        <a:xfrm>
+          <a:off x="0" y="0"/>
+          <a:ext cx="0" cy="0"/>
+          <a:chOff x="0" y="0"/>
+          <a:chExt cx="0" cy="0"/>
+        </a:xfrm>
+      </p:grpSpPr>
+      <p:sp>
+        <p:nvSpPr>
+          <p:cNvPr id="181" name="Google Shape;181;g23985d0d2d4_0_43:notes"/>
+          <p:cNvSpPr/>
+          <p:nvPr>
+            <p:ph idx="2" type="sldImg"/>
+          </p:nvPr>
+        </p:nvSpPr>
+        <p:spPr>
+          <a:xfrm>
+            <a:off x="381300" y="685800"/>
+            <a:ext cx="6096000" cy="3429000"/>
+          </a:xfrm>
+          <a:custGeom>
+            <a:rect b="b" l="l" r="r" t="t"/>
+            <a:pathLst>
+              <a:path extrusionOk="0" h="120000" w="120000">
+                <a:moveTo>
+                  <a:pt x="0" y="0"/>
+                </a:moveTo>
+                <a:lnTo>
+                  <a:pt x="120000" y="0"/>
+                </a:lnTo>
+                <a:lnTo>
+                  <a:pt x="120000" y="120000"/>
+                </a:lnTo>
+                <a:lnTo>
+                  <a:pt x="0" y="120000"/>
+                </a:lnTo>
+                <a:close/>
+              </a:path>
+            </a:pathLst>
+          </a:custGeom>
+        </p:spPr>
+      </p:sp>
+      <p:sp>
+        <p:nvSpPr>
+          <p:cNvPr id="182" name="Google Shape;182;g23985d0d2d4_0_43:notes"/>
           <p:cNvSpPr txBox="1"/>
           <p:nvPr>
             <p:ph idx="1" type="body"/>
@@ -2506,7 +2706,7 @@
       </p:grpSpPr>
       <p:sp>
         <p:nvSpPr>
-          <p:cNvPr id="80" name="Google Shape;80;g126320e9147_0_64:notes"/>
+          <p:cNvPr id="80" name="Google Shape;80;g23985d0d2d4_0_76:notes"/>
           <p:cNvSpPr/>
           <p:nvPr>
             <p:ph idx="2" type="sldImg"/>
@@ -2541,7 +2741,7 @@
       </p:sp>
       <p:sp>
         <p:nvSpPr>
-          <p:cNvPr id="81" name="Google Shape;81;g126320e9147_0_64:notes"/>
+          <p:cNvPr id="81" name="Google Shape;81;g23985d0d2d4_0_76:notes"/>
           <p:cNvSpPr txBox="1"/>
           <p:nvPr>
             <p:ph idx="1" type="body"/>
@@ -6185,7 +6385,7 @@
             <a:tbl>
               <a:tblPr>
                 <a:noFill/>
-                <a:tableStyleId>{1FF0F3D3-011E-41AD-9BD2-7C33C474695F}</a:tableStyleId>
+                <a:tableStyleId>{2256ADF0-E40C-4D1B-8BA8-D882754ACB65}</a:tableStyleId>
               </a:tblPr>
               <a:tblGrid>
                 <a:gridCol w="1314475"/>
@@ -8972,7 +9172,7 @@
             </a:pPr>
             <a:r>
               <a:rPr lang="en"/>
-              <a:t>Collaboration and Grading</a:t>
+              <a:t>Class Quizzes</a:t>
             </a:r>
             <a:endParaRPr/>
           </a:p>
@@ -9008,27 +9208,16 @@
               <a:spcAft>
                 <a:spcPts val="0"/>
               </a:spcAft>
+              <a:buClr>
+                <a:schemeClr val="dk1"/>
+              </a:buClr>
+              <a:buSzPts val="1100"/>
+              <a:buFont typeface="Arial"/>
               <a:buNone/>
             </a:pPr>
             <a:r>
               <a:rPr lang="en"/>
-              <a:t>We are required to grade you individually</a:t>
-            </a:r>
-            <a:endParaRPr/>
-          </a:p>
-          <a:p>
-            <a:pPr indent="0" lvl="0" marL="0" rtl="0" algn="l">
-              <a:spcBef>
-                <a:spcPts val="1200"/>
-              </a:spcBef>
-              <a:spcAft>
-                <a:spcPts val="0"/>
-              </a:spcAft>
-              <a:buNone/>
-            </a:pPr>
-            <a:r>
-              <a:rPr lang="en"/>
-              <a:t>If you collaborate, for example,</a:t>
+              <a:t>Each class session starts with a class quiz</a:t>
             </a:r>
             <a:endParaRPr/>
           </a:p>
@@ -9045,7 +9234,7 @@
             </a:pPr>
             <a:r>
               <a:rPr lang="en"/>
-              <a:t>by pair programming</a:t>
+              <a:t>A quiz will test your understanding of last session’s topic</a:t>
             </a:r>
             <a:endParaRPr/>
           </a:p>
@@ -9062,7 +9251,24 @@
             </a:pPr>
             <a:r>
               <a:rPr lang="en"/>
-              <a:t>by pair designing</a:t>
+              <a:t>A quiz typically has 5 questions and will last 10 minutes</a:t>
+            </a:r>
+            <a:endParaRPr/>
+          </a:p>
+          <a:p>
+            <a:pPr indent="-342900" lvl="0" marL="457200" rtl="0" algn="l">
+              <a:spcBef>
+                <a:spcPts val="0"/>
+              </a:spcBef>
+              <a:spcAft>
+                <a:spcPts val="0"/>
+              </a:spcAft>
+              <a:buSzPts val="1800"/>
+              <a:buChar char="●"/>
+            </a:pPr>
+            <a:r>
+              <a:rPr lang="en"/>
+              <a:t>The overall quiz is graded using [0..10] scheme (10 points in total)</a:t>
             </a:r>
             <a:endParaRPr/>
           </a:p>
@@ -9072,13 +9278,89 @@
                 <a:spcPts val="1200"/>
               </a:spcBef>
               <a:spcAft>
+                <a:spcPts val="0"/>
+              </a:spcAft>
+              <a:buClr>
+                <a:schemeClr val="dk1"/>
+              </a:buClr>
+              <a:buSzPts val="1100"/>
+              <a:buFont typeface="Arial"/>
+              <a:buNone/>
+            </a:pPr>
+            <a:r>
+              <a:rPr lang="en"/>
+              <a:t>A class quiz will open precisely when class starts</a:t>
+            </a:r>
+            <a:endParaRPr/>
+          </a:p>
+          <a:p>
+            <a:pPr indent="-342900" lvl="0" marL="457200" rtl="0" algn="l">
+              <a:spcBef>
                 <a:spcPts val="1200"/>
-              </a:spcAft>
-              <a:buNone/>
+              </a:spcBef>
+              <a:spcAft>
+                <a:spcPts val="0"/>
+              </a:spcAft>
+              <a:buSzPts val="1800"/>
+              <a:buChar char="●"/>
             </a:pPr>
             <a:r>
               <a:rPr lang="en"/>
-              <a:t>you agree to be graded jointly</a:t>
+              <a:t>The quiz is administered automatically</a:t>
+            </a:r>
+            <a:endParaRPr/>
+          </a:p>
+          <a:p>
+            <a:pPr indent="-342900" lvl="0" marL="457200" rtl="0" algn="l">
+              <a:spcBef>
+                <a:spcPts val="0"/>
+              </a:spcBef>
+              <a:spcAft>
+                <a:spcPts val="0"/>
+              </a:spcAft>
+              <a:buSzPts val="1800"/>
+              <a:buChar char="●"/>
+            </a:pPr>
+            <a:r>
+              <a:rPr lang="en"/>
+              <a:t>It is your job to have reliable Internet access etc.</a:t>
+            </a:r>
+            <a:endParaRPr/>
+          </a:p>
+          <a:p>
+            <a:pPr indent="-342900" lvl="0" marL="457200" rtl="0" algn="l">
+              <a:spcBef>
+                <a:spcPts val="0"/>
+              </a:spcBef>
+              <a:spcAft>
+                <a:spcPts val="0"/>
+              </a:spcAft>
+              <a:buSzPts val="1800"/>
+              <a:buChar char="●"/>
+            </a:pPr>
+            <a:r>
+              <a:rPr lang="en"/>
+              <a:t>There is no way to make up for a missed quiz</a:t>
+            </a:r>
+            <a:endParaRPr/>
+          </a:p>
+          <a:p>
+            <a:pPr indent="0" lvl="0" marL="0" rtl="0" algn="l">
+              <a:spcBef>
+                <a:spcPts val="1200"/>
+              </a:spcBef>
+              <a:spcAft>
+                <a:spcPts val="1200"/>
+              </a:spcAft>
+              <a:buClr>
+                <a:schemeClr val="dk1"/>
+              </a:buClr>
+              <a:buSzPts val="1100"/>
+              <a:buFont typeface="Arial"/>
+              <a:buNone/>
+            </a:pPr>
+            <a:r>
+              <a:t/>
             </a:r>
             <a:endParaRPr/>
           </a:p>
@@ -9212,7 +9494,7 @@
             </a:pPr>
             <a:r>
               <a:rPr lang="en"/>
-              <a:t>Receiving a Grade for the Course</a:t>
+              <a:t>Collaboration and Grading</a:t>
             </a:r>
             <a:endParaRPr/>
           </a:p>
@@ -9251,18 +9533,26 @@
               <a:buNone/>
             </a:pPr>
             <a:r>
-              <a:rPr lang="en">
-                <a:solidFill>
-                  <a:schemeClr val="dk1"/>
-                </a:solidFill>
-              </a:rPr>
-              <a:t>If you want to receive a grade</a:t>
-            </a:r>
-            <a:endParaRPr>
-              <a:solidFill>
-                <a:schemeClr val="dk1"/>
-              </a:solidFill>
-            </a:endParaRPr>
+              <a:rPr lang="en"/>
+              <a:t>We are required to grade you individually</a:t>
+            </a:r>
+            <a:endParaRPr/>
+          </a:p>
+          <a:p>
+            <a:pPr indent="0" lvl="0" marL="0" rtl="0" algn="l">
+              <a:spcBef>
+                <a:spcPts val="1200"/>
+              </a:spcBef>
+              <a:spcAft>
+                <a:spcPts val="0"/>
+              </a:spcAft>
+              <a:buNone/>
+            </a:pPr>
+            <a:r>
+              <a:rPr lang="en"/>
+              <a:t>If you collaborate, for example,</a:t>
+            </a:r>
+            <a:endParaRPr/>
           </a:p>
           <a:p>
             <a:pPr indent="-342900" lvl="0" marL="457200" rtl="0" algn="l">
@@ -9272,138 +9562,31 @@
               <a:spcAft>
                 <a:spcPts val="0"/>
               </a:spcAft>
-              <a:buClr>
-                <a:schemeClr val="dk1"/>
-              </a:buClr>
               <a:buSzPts val="1800"/>
               <a:buChar char="●"/>
             </a:pPr>
             <a:r>
               <a:rPr lang="en"/>
-              <a:t>You must register through your university’s exam registration system</a:t>
-            </a:r>
-            <a:endParaRPr/>
-          </a:p>
-          <a:p>
-            <a:pPr indent="-317500" lvl="1" marL="914400" rtl="0" algn="l">
-              <a:spcBef>
-                <a:spcPts val="0"/>
-              </a:spcBef>
-              <a:spcAft>
-                <a:spcPts val="0"/>
-              </a:spcAft>
-              <a:buClr>
-                <a:srgbClr val="666666"/>
-              </a:buClr>
-              <a:buSzPts val="1400"/>
-              <a:buChar char="○"/>
-            </a:pPr>
-            <a:r>
-              <a:rPr b="1" lang="en"/>
-              <a:t>Your degree program may have split the course into two (VL + UE)</a:t>
-            </a:r>
-            <a:endParaRPr b="1"/>
-          </a:p>
-          <a:p>
-            <a:pPr indent="-317500" lvl="1" marL="914400" rtl="0" algn="l">
-              <a:spcBef>
-                <a:spcPts val="0"/>
-              </a:spcBef>
-              <a:spcAft>
-                <a:spcPts val="0"/>
-              </a:spcAft>
-              <a:buClr>
-                <a:srgbClr val="666666"/>
-              </a:buClr>
-              <a:buSzPts val="1400"/>
-              <a:buChar char="○"/>
-            </a:pPr>
-            <a:r>
-              <a:rPr b="1" lang="en"/>
-              <a:t>Registration system is different from the course management system</a:t>
-            </a:r>
-            <a:endParaRPr b="1"/>
-          </a:p>
-          <a:p>
-            <a:pPr indent="-317500" lvl="1" marL="914400" rtl="0" algn="l">
-              <a:spcBef>
-                <a:spcPts val="0"/>
-              </a:spcBef>
-              <a:spcAft>
-                <a:spcPts val="0"/>
-              </a:spcAft>
-              <a:buClr>
-                <a:srgbClr val="666666"/>
-              </a:buClr>
-              <a:buSzPts val="1400"/>
-              <a:buChar char="○"/>
-            </a:pPr>
-            <a:r>
-              <a:rPr b="1" lang="en"/>
-              <a:t>Please check asap that the course is available in your degree program!</a:t>
-            </a:r>
-            <a:endParaRPr b="1"/>
-          </a:p>
-          <a:p>
-            <a:pPr indent="0" lvl="0" marL="0" rtl="0" algn="l">
-              <a:spcBef>
-                <a:spcPts val="1200"/>
-              </a:spcBef>
-              <a:spcAft>
-                <a:spcPts val="0"/>
-              </a:spcAft>
-              <a:buNone/>
-            </a:pPr>
-            <a:r>
-              <a:rPr lang="en"/>
-              <a:t>In case of problems, please see</a:t>
-            </a:r>
-            <a:endParaRPr>
-              <a:solidFill>
-                <a:schemeClr val="dk1"/>
-              </a:solidFill>
-            </a:endParaRPr>
+              <a:t>by pair programming</a:t>
+            </a:r>
+            <a:endParaRPr/>
           </a:p>
           <a:p>
             <a:pPr indent="-342900" lvl="0" marL="457200" rtl="0" algn="l">
               <a:spcBef>
-                <a:spcPts val="1200"/>
-              </a:spcBef>
-              <a:spcAft>
-                <a:spcPts val="0"/>
-              </a:spcAft>
-              <a:buClr>
-                <a:schemeClr val="dk1"/>
-              </a:buClr>
+                <a:spcPts val="0"/>
+              </a:spcBef>
+              <a:spcAft>
+                <a:spcPts val="0"/>
+              </a:spcAft>
               <a:buSzPts val="1800"/>
               <a:buChar char="●"/>
             </a:pPr>
             <a:r>
-              <a:rPr lang="en" u="sng">
-                <a:solidFill>
-                  <a:schemeClr val="hlink"/>
-                </a:solidFill>
-                <a:hlinkClick r:id="rId3"/>
-              </a:rPr>
-              <a:t>https://oss.cs.fau.de/teaching/course-resources/course-registration/</a:t>
-            </a:r>
-            <a:r>
               <a:rPr lang="en"/>
-              <a:t> </a:t>
-            </a:r>
-            <a:r>
-              <a:rPr lang="en">
-                <a:solidFill>
-                  <a:schemeClr val="dk1"/>
-                </a:solidFill>
-              </a:rPr>
-              <a:t> </a:t>
-            </a:r>
-            <a:endParaRPr>
-              <a:solidFill>
-                <a:schemeClr val="dk1"/>
-              </a:solidFill>
-            </a:endParaRPr>
+              <a:t>by pair designing</a:t>
+            </a:r>
+            <a:endParaRPr/>
           </a:p>
           <a:p>
             <a:pPr indent="0" lvl="0" marL="0" rtl="0" algn="l">
@@ -9411,42 +9594,15 @@
                 <a:spcPts val="1200"/>
               </a:spcBef>
               <a:spcAft>
-                <a:spcPts val="0"/>
-              </a:spcAft>
-              <a:buNone/>
-            </a:pPr>
-            <a:r>
-              <a:rPr lang="en">
-                <a:solidFill>
-                  <a:schemeClr val="dk1"/>
-                </a:solidFill>
-              </a:rPr>
-              <a:t>Otherwise: No grade</a:t>
-            </a:r>
-            <a:endParaRPr>
-              <a:solidFill>
-                <a:schemeClr val="dk1"/>
-              </a:solidFill>
-            </a:endParaRPr>
-          </a:p>
-          <a:p>
-            <a:pPr indent="0" lvl="0" marL="0" rtl="0" algn="l">
-              <a:spcBef>
                 <a:spcPts val="1200"/>
-              </a:spcBef>
-              <a:spcAft>
-                <a:spcPts val="1200"/>
-              </a:spcAft>
-              <a:buNone/>
-            </a:pPr>
-            <a:r>
-              <a:t/>
-            </a:r>
-            <a:endParaRPr sz="1500">
-              <a:solidFill>
-                <a:srgbClr val="212121"/>
-              </a:solidFill>
-            </a:endParaRPr>
+              </a:spcAft>
+              <a:buNone/>
+            </a:pPr>
+            <a:r>
+              <a:rPr lang="en"/>
+              <a:t>you agree to be graded jointly</a:t>
+            </a:r>
+            <a:endParaRPr/>
           </a:p>
         </p:txBody>
       </p:sp>
@@ -9503,7 +9659,7 @@
                 <a:solidFill>
                   <a:schemeClr val="hlink"/>
                 </a:solidFill>
-                <a:hlinkClick r:id="rId4"/>
+                <a:hlinkClick r:id="rId3"/>
               </a:rPr>
               <a:t>https://profriehle.com</a:t>
             </a:r>
@@ -9562,6 +9718,609 @@
           </a:prstGeom>
         </p:spPr>
         <p:txBody>
+          <a:bodyPr anchorCtr="0" anchor="ctr" bIns="91425" lIns="274300" spcFirstLastPara="1" rIns="91425" wrap="square" tIns="91425">
+            <a:noAutofit/>
+          </a:bodyPr>
+          <a:lstStyle/>
+          <a:p>
+            <a:pPr indent="0" lvl="0" marL="0" rtl="0" algn="l">
+              <a:spcBef>
+                <a:spcPts val="0"/>
+              </a:spcBef>
+              <a:spcAft>
+                <a:spcPts val="0"/>
+              </a:spcAft>
+              <a:buNone/>
+            </a:pPr>
+            <a:r>
+              <a:rPr lang="en"/>
+              <a:t>Course Registration vs. Exam Registration</a:t>
+            </a:r>
+            <a:endParaRPr/>
+          </a:p>
+        </p:txBody>
+      </p:sp>
+      <p:sp>
+        <p:nvSpPr>
+          <p:cNvPr id="128" name="Google Shape;128;p21"/>
+          <p:cNvSpPr txBox="1"/>
+          <p:nvPr>
+            <p:ph idx="1" type="body"/>
+          </p:nvPr>
+        </p:nvSpPr>
+        <p:spPr>
+          <a:xfrm>
+            <a:off x="274320" y="914400"/>
+            <a:ext cx="8595300" cy="4114800"/>
+          </a:xfrm>
+          <a:prstGeom prst="rect">
+            <a:avLst/>
+          </a:prstGeom>
+        </p:spPr>
+        <p:txBody>
+          <a:bodyPr anchorCtr="0" anchor="t" bIns="0" lIns="0" spcFirstLastPara="1" rIns="0" wrap="square" tIns="0">
+            <a:noAutofit/>
+          </a:bodyPr>
+          <a:lstStyle/>
+          <a:p>
+            <a:pPr indent="0" lvl="0" marL="0" rtl="0" algn="l">
+              <a:spcBef>
+                <a:spcPts val="0"/>
+              </a:spcBef>
+              <a:spcAft>
+                <a:spcPts val="0"/>
+              </a:spcAft>
+              <a:buNone/>
+            </a:pPr>
+            <a:r>
+              <a:rPr b="1" lang="en"/>
+              <a:t>Step 1: Course registration </a:t>
+            </a:r>
+            <a:r>
+              <a:rPr lang="en"/>
+              <a:t>(German: Kursanmeldung)</a:t>
+            </a:r>
+            <a:endParaRPr/>
+          </a:p>
+          <a:p>
+            <a:pPr indent="-342900" lvl="0" marL="457200" rtl="0" algn="l">
+              <a:spcBef>
+                <a:spcPts val="1200"/>
+              </a:spcBef>
+              <a:spcAft>
+                <a:spcPts val="0"/>
+              </a:spcAft>
+              <a:buSzPts val="1800"/>
+              <a:buChar char="●"/>
+            </a:pPr>
+            <a:r>
+              <a:rPr lang="en"/>
+              <a:t>Students sign up through the course management system</a:t>
+            </a:r>
+            <a:endParaRPr/>
+          </a:p>
+          <a:p>
+            <a:pPr indent="-342900" lvl="0" marL="457200" rtl="0" algn="l">
+              <a:spcBef>
+                <a:spcPts val="0"/>
+              </a:spcBef>
+              <a:spcAft>
+                <a:spcPts val="0"/>
+              </a:spcAft>
+              <a:buSzPts val="1800"/>
+              <a:buChar char="●"/>
+            </a:pPr>
+            <a:r>
+              <a:rPr lang="en"/>
+              <a:t>You may or may not get in, various rules and regulations apply</a:t>
+            </a:r>
+            <a:endParaRPr/>
+          </a:p>
+          <a:p>
+            <a:pPr indent="-342900" lvl="0" marL="457200" rtl="0" algn="l">
+              <a:spcBef>
+                <a:spcPts val="0"/>
+              </a:spcBef>
+              <a:spcAft>
+                <a:spcPts val="0"/>
+              </a:spcAft>
+              <a:buSzPts val="1800"/>
+              <a:buChar char="●"/>
+            </a:pPr>
+            <a:r>
+              <a:rPr lang="en"/>
+              <a:t>The earlier you sign up, the more likely you are to get in</a:t>
+            </a:r>
+            <a:endParaRPr/>
+          </a:p>
+          <a:p>
+            <a:pPr indent="0" lvl="0" marL="0" rtl="0" algn="l">
+              <a:spcBef>
+                <a:spcPts val="1200"/>
+              </a:spcBef>
+              <a:spcAft>
+                <a:spcPts val="0"/>
+              </a:spcAft>
+              <a:buNone/>
+            </a:pPr>
+            <a:r>
+              <a:rPr b="1" lang="en"/>
+              <a:t>Step 2: Exam registration </a:t>
+            </a:r>
+            <a:r>
+              <a:rPr lang="en"/>
+              <a:t>(German: Prüfungsanmeldung)</a:t>
+            </a:r>
+            <a:endParaRPr/>
+          </a:p>
+          <a:p>
+            <a:pPr indent="-342900" lvl="0" marL="457200" rtl="0" algn="l">
+              <a:spcBef>
+                <a:spcPts val="1200"/>
+              </a:spcBef>
+              <a:spcAft>
+                <a:spcPts val="0"/>
+              </a:spcAft>
+              <a:buSzPts val="1800"/>
+              <a:buChar char="●"/>
+            </a:pPr>
+            <a:r>
+              <a:rPr lang="en"/>
+              <a:t>During the first weeks of the course, you can decide to drop out</a:t>
+            </a:r>
+            <a:endParaRPr/>
+          </a:p>
+          <a:p>
+            <a:pPr indent="-342900" lvl="0" marL="457200" rtl="0" algn="l">
+              <a:spcBef>
+                <a:spcPts val="0"/>
+              </a:spcBef>
+              <a:spcAft>
+                <a:spcPts val="0"/>
+              </a:spcAft>
+              <a:buSzPts val="1800"/>
+              <a:buChar char="●"/>
+            </a:pPr>
+            <a:r>
+              <a:rPr lang="en"/>
+              <a:t>Four weeks (or so) into the semester, you can register for the exam</a:t>
+            </a:r>
+            <a:endParaRPr/>
+          </a:p>
+          <a:p>
+            <a:pPr indent="-342900" lvl="0" marL="457200" rtl="0" algn="l">
+              <a:spcBef>
+                <a:spcPts val="0"/>
+              </a:spcBef>
+              <a:spcAft>
+                <a:spcPts val="0"/>
+              </a:spcAft>
+              <a:buSzPts val="1800"/>
+              <a:buChar char="●"/>
+            </a:pPr>
+            <a:r>
+              <a:rPr lang="en"/>
+              <a:t>After exam registration closes, your decision is binding</a:t>
+            </a:r>
+            <a:endParaRPr/>
+          </a:p>
+        </p:txBody>
+      </p:sp>
+      <p:sp>
+        <p:nvSpPr>
+          <p:cNvPr id="129" name="Google Shape;129;p21"/>
+          <p:cNvSpPr txBox="1"/>
+          <p:nvPr>
+            <p:ph idx="12" type="sldNum"/>
+          </p:nvPr>
+        </p:nvSpPr>
+        <p:spPr>
+          <a:xfrm>
+            <a:off x="7315202" y="4416550"/>
+            <a:ext cx="1828800" cy="731400"/>
+          </a:xfrm>
+          <a:prstGeom prst="rect">
+            <a:avLst/>
+          </a:prstGeom>
+        </p:spPr>
+        <p:txBody>
+          <a:bodyPr anchorCtr="0" anchor="b" bIns="91425" lIns="91425" spcFirstLastPara="1" rIns="91425" wrap="square" tIns="91425">
+            <a:noAutofit/>
+          </a:bodyPr>
+          <a:lstStyle/>
+          <a:p>
+            <a:pPr indent="0" lvl="0" marL="0" rtl="0" algn="r">
+              <a:spcBef>
+                <a:spcPts val="0"/>
+              </a:spcBef>
+              <a:spcAft>
+                <a:spcPts val="0"/>
+              </a:spcAft>
+              <a:buNone/>
+            </a:pPr>
+            <a:fld id="{00000000-1234-1234-1234-123412341234}" type="slidenum">
+              <a:rPr lang="en"/>
+              <a:t>‹#›</a:t>
+            </a:fld>
+            <a:endParaRPr/>
+          </a:p>
+          <a:p>
+            <a:pPr indent="0" lvl="0" marL="0" rtl="0" algn="r">
+              <a:spcBef>
+                <a:spcPts val="0"/>
+              </a:spcBef>
+              <a:spcAft>
+                <a:spcPts val="0"/>
+              </a:spcAft>
+              <a:buNone/>
+            </a:pPr>
+            <a:r>
+              <a:rPr b="0" lang="en" sz="900" u="sng">
+                <a:solidFill>
+                  <a:schemeClr val="hlink"/>
+                </a:solidFill>
+                <a:hlinkClick r:id="rId3"/>
+              </a:rPr>
+              <a:t>https://profriehle.com</a:t>
+            </a:r>
+            <a:r>
+              <a:rPr b="0" lang="en" sz="900">
+                <a:solidFill>
+                  <a:schemeClr val="dk2"/>
+                </a:solidFill>
+              </a:rPr>
+              <a:t> </a:t>
+            </a:r>
+            <a:endParaRPr/>
+          </a:p>
+        </p:txBody>
+      </p:sp>
+    </p:spTree>
+  </p:cSld>
+  <p:clrMapOvr>
+    <a:masterClrMapping/>
+  </p:clrMapOvr>
+</p:sld>
+</file>
+
+<file path=ppt/slides/slide15.xml><?xml version="1.0" encoding="utf-8"?>
+<p:sld xmlns:a="http://schemas.openxmlformats.org/drawingml/2006/main" xmlns:r="http://schemas.openxmlformats.org/officeDocument/2006/relationships" xmlns:mc="http://schemas.openxmlformats.org/markup-compatibility/2006" xmlns:mv="urn:schemas-microsoft-com:mac:vml" xmlns:p="http://schemas.openxmlformats.org/presentationml/2006/main" xmlns:c="http://schemas.openxmlformats.org/drawingml/2006/chart" xmlns:dgm="http://schemas.openxmlformats.org/drawingml/2006/diagram" xmlns:o="urn:schemas-microsoft-com:office:office" xmlns:v="urn:schemas-microsoft-com:vml" xmlns:pvml="urn:schemas-microsoft-com:office:powerpoint" xmlns:com="http://schemas.openxmlformats.org/drawingml/2006/compatibility" xmlns:p14="http://schemas.microsoft.com/office/powerpoint/2010/main" xmlns:p15="http://schemas.microsoft.com/office/powerpoint/2012/main" xmlns:ahyp="http://schemas.microsoft.com/office/drawing/2018/hyperlinkcolor">
+  <p:cSld>
+    <p:spTree>
+      <p:nvGrpSpPr>
+        <p:cNvPr id="133" name="Shape 133"/>
+        <p:cNvGrpSpPr/>
+        <p:nvPr/>
+      </p:nvGrpSpPr>
+      <p:grpSpPr>
+        <a:xfrm>
+          <a:off x="0" y="0"/>
+          <a:ext cx="0" cy="0"/>
+          <a:chOff x="0" y="0"/>
+          <a:chExt cx="0" cy="0"/>
+        </a:xfrm>
+      </p:grpSpPr>
+      <p:sp>
+        <p:nvSpPr>
+          <p:cNvPr id="134" name="Google Shape;134;p22"/>
+          <p:cNvSpPr txBox="1"/>
+          <p:nvPr>
+            <p:ph type="title"/>
+          </p:nvPr>
+        </p:nvSpPr>
+        <p:spPr>
+          <a:xfrm>
+            <a:off x="0" y="0"/>
+            <a:ext cx="9144000" cy="685800"/>
+          </a:xfrm>
+          <a:prstGeom prst="rect">
+            <a:avLst/>
+          </a:prstGeom>
+        </p:spPr>
+        <p:txBody>
+          <a:bodyPr anchorCtr="0" anchor="ctr" bIns="91425" lIns="274300" spcFirstLastPara="1" rIns="91425" wrap="square" tIns="91425">
+            <a:noAutofit/>
+          </a:bodyPr>
+          <a:lstStyle/>
+          <a:p>
+            <a:pPr indent="0" lvl="0" marL="0" rtl="0" algn="l">
+              <a:spcBef>
+                <a:spcPts val="0"/>
+              </a:spcBef>
+              <a:spcAft>
+                <a:spcPts val="0"/>
+              </a:spcAft>
+              <a:buNone/>
+            </a:pPr>
+            <a:r>
+              <a:rPr lang="en"/>
+              <a:t>Receiving a Grade for the Course</a:t>
+            </a:r>
+            <a:endParaRPr/>
+          </a:p>
+        </p:txBody>
+      </p:sp>
+      <p:sp>
+        <p:nvSpPr>
+          <p:cNvPr id="135" name="Google Shape;135;p22"/>
+          <p:cNvSpPr txBox="1"/>
+          <p:nvPr>
+            <p:ph idx="1" type="body"/>
+          </p:nvPr>
+        </p:nvSpPr>
+        <p:spPr>
+          <a:xfrm>
+            <a:off x="274320" y="914400"/>
+            <a:ext cx="8595300" cy="4114800"/>
+          </a:xfrm>
+          <a:prstGeom prst="rect">
+            <a:avLst/>
+          </a:prstGeom>
+        </p:spPr>
+        <p:txBody>
+          <a:bodyPr anchorCtr="0" anchor="t" bIns="0" lIns="0" spcFirstLastPara="1" rIns="0" wrap="square" tIns="0">
+            <a:noAutofit/>
+          </a:bodyPr>
+          <a:lstStyle/>
+          <a:p>
+            <a:pPr indent="0" lvl="0" marL="0" rtl="0" algn="l">
+              <a:spcBef>
+                <a:spcPts val="0"/>
+              </a:spcBef>
+              <a:spcAft>
+                <a:spcPts val="0"/>
+              </a:spcAft>
+              <a:buClr>
+                <a:schemeClr val="dk1"/>
+              </a:buClr>
+              <a:buSzPts val="1100"/>
+              <a:buFont typeface="Arial"/>
+              <a:buNone/>
+            </a:pPr>
+            <a:r>
+              <a:rPr lang="en"/>
+              <a:t>If you want to receive a grade</a:t>
+            </a:r>
+            <a:endParaRPr/>
+          </a:p>
+          <a:p>
+            <a:pPr indent="-342900" lvl="0" marL="457200" rtl="0" algn="l">
+              <a:spcBef>
+                <a:spcPts val="1200"/>
+              </a:spcBef>
+              <a:spcAft>
+                <a:spcPts val="0"/>
+              </a:spcAft>
+              <a:buClr>
+                <a:srgbClr val="212121"/>
+              </a:buClr>
+              <a:buSzPts val="1800"/>
+              <a:buChar char="●"/>
+            </a:pPr>
+            <a:r>
+              <a:rPr lang="en">
+                <a:solidFill>
+                  <a:srgbClr val="212121"/>
+                </a:solidFill>
+              </a:rPr>
+              <a:t>You must register through your university’s exam registration system</a:t>
+            </a:r>
+            <a:endParaRPr>
+              <a:solidFill>
+                <a:srgbClr val="212121"/>
+              </a:solidFill>
+            </a:endParaRPr>
+          </a:p>
+          <a:p>
+            <a:pPr indent="-317500" lvl="1" marL="914400" rtl="0" algn="l">
+              <a:spcBef>
+                <a:spcPts val="1000"/>
+              </a:spcBef>
+              <a:spcAft>
+                <a:spcPts val="0"/>
+              </a:spcAft>
+              <a:buSzPts val="1400"/>
+              <a:buChar char="○"/>
+            </a:pPr>
+            <a:r>
+              <a:rPr b="1" lang="en"/>
+              <a:t>Your degree program may have split the course into two (VL + UE)</a:t>
+            </a:r>
+            <a:endParaRPr b="1"/>
+          </a:p>
+          <a:p>
+            <a:pPr indent="-317500" lvl="1" marL="914400" rtl="0" algn="l">
+              <a:spcBef>
+                <a:spcPts val="0"/>
+              </a:spcBef>
+              <a:spcAft>
+                <a:spcPts val="0"/>
+              </a:spcAft>
+              <a:buSzPts val="1400"/>
+              <a:buChar char="○"/>
+            </a:pPr>
+            <a:r>
+              <a:rPr b="1" lang="en"/>
+              <a:t>Please check asap that the course is available in your degree program!</a:t>
+            </a:r>
+            <a:endParaRPr b="1">
+              <a:solidFill>
+                <a:srgbClr val="212121"/>
+              </a:solidFill>
+            </a:endParaRPr>
+          </a:p>
+          <a:p>
+            <a:pPr indent="0" lvl="0" marL="0" rtl="0" algn="l">
+              <a:spcBef>
+                <a:spcPts val="1200"/>
+              </a:spcBef>
+              <a:spcAft>
+                <a:spcPts val="0"/>
+              </a:spcAft>
+              <a:buNone/>
+            </a:pPr>
+            <a:r>
+              <a:rPr lang="en"/>
+              <a:t>In case of problems, please see</a:t>
+            </a:r>
+            <a:endParaRPr/>
+          </a:p>
+          <a:p>
+            <a:pPr indent="-342900" lvl="0" marL="457200" rtl="0" algn="l">
+              <a:spcBef>
+                <a:spcPts val="1200"/>
+              </a:spcBef>
+              <a:spcAft>
+                <a:spcPts val="0"/>
+              </a:spcAft>
+              <a:buSzPts val="1800"/>
+              <a:buChar char="●"/>
+            </a:pPr>
+            <a:r>
+              <a:rPr lang="en" u="sng">
+                <a:solidFill>
+                  <a:schemeClr val="hlink"/>
+                </a:solidFill>
+                <a:hlinkClick r:id="rId3"/>
+              </a:rPr>
+              <a:t>https://oss.cs.fau.de/teaching/course-resources/course-registration/</a:t>
+            </a:r>
+            <a:r>
+              <a:rPr lang="en"/>
+              <a:t> </a:t>
+            </a:r>
+            <a:endParaRPr/>
+          </a:p>
+          <a:p>
+            <a:pPr indent="0" lvl="0" marL="0" rtl="0" algn="l">
+              <a:spcBef>
+                <a:spcPts val="1200"/>
+              </a:spcBef>
+              <a:spcAft>
+                <a:spcPts val="1200"/>
+              </a:spcAft>
+              <a:buNone/>
+            </a:pPr>
+            <a:r>
+              <a:rPr lang="en"/>
+              <a:t>Otherwise: No grade</a:t>
+            </a:r>
+            <a:endParaRPr/>
+          </a:p>
+        </p:txBody>
+      </p:sp>
+      <p:sp>
+        <p:nvSpPr>
+          <p:cNvPr id="136" name="Google Shape;136;p22"/>
+          <p:cNvSpPr txBox="1"/>
+          <p:nvPr>
+            <p:ph idx="12" type="sldNum"/>
+          </p:nvPr>
+        </p:nvSpPr>
+        <p:spPr>
+          <a:xfrm>
+            <a:off x="7315202" y="4416550"/>
+            <a:ext cx="1828800" cy="731400"/>
+          </a:xfrm>
+          <a:prstGeom prst="rect">
+            <a:avLst/>
+          </a:prstGeom>
+        </p:spPr>
+        <p:txBody>
+          <a:bodyPr anchorCtr="0" anchor="b" bIns="91425" lIns="91425" spcFirstLastPara="1" rIns="91425" wrap="square" tIns="91425">
+            <a:noAutofit/>
+          </a:bodyPr>
+          <a:lstStyle/>
+          <a:p>
+            <a:pPr indent="0" lvl="0" marL="0" rtl="0" algn="r">
+              <a:spcBef>
+                <a:spcPts val="0"/>
+              </a:spcBef>
+              <a:spcAft>
+                <a:spcPts val="0"/>
+              </a:spcAft>
+              <a:buNone/>
+            </a:pPr>
+            <a:fld id="{00000000-1234-1234-1234-123412341234}" type="slidenum">
+              <a:rPr lang="en"/>
+              <a:t>‹#›</a:t>
+            </a:fld>
+            <a:endParaRPr/>
+          </a:p>
+          <a:p>
+            <a:pPr indent="0" lvl="0" marL="0" rtl="0" algn="r">
+              <a:spcBef>
+                <a:spcPts val="0"/>
+              </a:spcBef>
+              <a:spcAft>
+                <a:spcPts val="0"/>
+              </a:spcAft>
+              <a:buNone/>
+            </a:pPr>
+            <a:r>
+              <a:rPr b="0" lang="en" sz="900" u="sng">
+                <a:solidFill>
+                  <a:schemeClr val="hlink"/>
+                </a:solidFill>
+                <a:hlinkClick r:id="rId4"/>
+              </a:rPr>
+              <a:t>https://profriehle.com</a:t>
+            </a:r>
+            <a:r>
+              <a:rPr b="0" lang="en" sz="900">
+                <a:solidFill>
+                  <a:schemeClr val="dk2"/>
+                </a:solidFill>
+              </a:rPr>
+              <a:t> </a:t>
+            </a:r>
+            <a:endParaRPr/>
+          </a:p>
+        </p:txBody>
+      </p:sp>
+    </p:spTree>
+  </p:cSld>
+  <p:clrMapOvr>
+    <a:masterClrMapping/>
+  </p:clrMapOvr>
+</p:sld>
+</file>
+
+<file path=ppt/slides/slide16.xml><?xml version="1.0" encoding="utf-8"?>
+<p:sld xmlns:a="http://schemas.openxmlformats.org/drawingml/2006/main" xmlns:r="http://schemas.openxmlformats.org/officeDocument/2006/relationships" xmlns:mc="http://schemas.openxmlformats.org/markup-compatibility/2006" xmlns:mv="urn:schemas-microsoft-com:mac:vml" xmlns:p="http://schemas.openxmlformats.org/presentationml/2006/main" xmlns:c="http://schemas.openxmlformats.org/drawingml/2006/chart" xmlns:dgm="http://schemas.openxmlformats.org/drawingml/2006/diagram" xmlns:o="urn:schemas-microsoft-com:office:office" xmlns:v="urn:schemas-microsoft-com:vml" xmlns:pvml="urn:schemas-microsoft-com:office:powerpoint" xmlns:com="http://schemas.openxmlformats.org/drawingml/2006/compatibility" xmlns:p14="http://schemas.microsoft.com/office/powerpoint/2010/main" xmlns:p15="http://schemas.microsoft.com/office/powerpoint/2012/main" xmlns:ahyp="http://schemas.microsoft.com/office/drawing/2018/hyperlinkcolor">
+  <p:cSld>
+    <p:spTree>
+      <p:nvGrpSpPr>
+        <p:cNvPr id="140" name="Shape 140"/>
+        <p:cNvGrpSpPr/>
+        <p:nvPr/>
+      </p:nvGrpSpPr>
+      <p:grpSpPr>
+        <a:xfrm>
+          <a:off x="0" y="0"/>
+          <a:ext cx="0" cy="0"/>
+          <a:chOff x="0" y="0"/>
+          <a:chExt cx="0" cy="0"/>
+        </a:xfrm>
+      </p:grpSpPr>
+      <p:sp>
+        <p:nvSpPr>
+          <p:cNvPr id="141" name="Google Shape;141;p23"/>
+          <p:cNvSpPr txBox="1"/>
+          <p:nvPr>
+            <p:ph type="title"/>
+          </p:nvPr>
+        </p:nvSpPr>
+        <p:spPr>
+          <a:xfrm>
+            <a:off x="0" y="0"/>
+            <a:ext cx="9144000" cy="685800"/>
+          </a:xfrm>
+          <a:prstGeom prst="rect">
+            <a:avLst/>
+          </a:prstGeom>
+        </p:spPr>
+        <p:txBody>
           <a:bodyPr anchorCtr="0" anchor="ctr" bIns="0" lIns="274300" spcFirstLastPara="1" rIns="0" wrap="square" tIns="0">
             <a:noAutofit/>
           </a:bodyPr>
@@ -9578,7 +10337,7 @@
             </a:pPr>
             <a:r>
               <a:rPr lang="en"/>
-              <a:t>No Oral or Written Exam [1]</a:t>
+              <a:t>No Oral or Written Exam [1] [2]</a:t>
             </a:r>
             <a:endParaRPr/>
           </a:p>
@@ -9586,7 +10345,7 @@
       </p:sp>
       <p:pic>
         <p:nvPicPr>
-          <p:cNvPr id="128" name="Google Shape;128;p21"/>
+          <p:cNvPr id="142" name="Google Shape;142;p23"/>
           <p:cNvPicPr preferRelativeResize="0"/>
           <p:nvPr/>
         </p:nvPicPr>
@@ -9601,7 +10360,7 @@
         <p:spPr>
           <a:xfrm>
             <a:off x="2743200" y="914400"/>
-            <a:ext cx="3657601" cy="3648679"/>
+            <a:ext cx="3657601" cy="3649471"/>
           </a:xfrm>
           <a:prstGeom prst="rect">
             <a:avLst/>
@@ -9614,7 +10373,7 @@
       </p:pic>
       <p:sp>
         <p:nvSpPr>
-          <p:cNvPr id="129" name="Google Shape;129;p21"/>
+          <p:cNvPr id="143" name="Google Shape;143;p23"/>
           <p:cNvSpPr txBox="1"/>
           <p:nvPr/>
         </p:nvSpPr>
@@ -9648,7 +10407,23 @@
             </a:pPr>
             <a:r>
               <a:rPr lang="en"/>
-              <a:t>[1] You still have to register for the course</a:t>
+              <a:t>[1] If both you and we don’t want to</a:t>
+            </a:r>
+            <a:endParaRPr/>
+          </a:p>
+          <a:p>
+            <a:pPr indent="0" lvl="0" marL="0" rtl="0" algn="l">
+              <a:spcBef>
+                <a:spcPts val="0"/>
+              </a:spcBef>
+              <a:spcAft>
+                <a:spcPts val="0"/>
+              </a:spcAft>
+              <a:buNone/>
+            </a:pPr>
+            <a:r>
+              <a:rPr lang="en"/>
+              <a:t>[2] You still have to register for the course</a:t>
             </a:r>
             <a:endParaRPr/>
           </a:p>
@@ -9656,7 +10431,7 @@
       </p:sp>
       <p:sp>
         <p:nvSpPr>
-          <p:cNvPr id="130" name="Google Shape;130;p21"/>
+          <p:cNvPr id="144" name="Google Shape;144;p23"/>
           <p:cNvSpPr txBox="1"/>
           <p:nvPr>
             <p:ph idx="12" type="sldNum"/>
@@ -9731,12 +10506,12 @@
 </p:sld>
 </file>
 
-<file path=ppt/slides/slide15.xml><?xml version="1.0" encoding="utf-8"?>
+<file path=ppt/slides/slide17.xml><?xml version="1.0" encoding="utf-8"?>
 <p:sld xmlns:a="http://schemas.openxmlformats.org/drawingml/2006/main" xmlns:r="http://schemas.openxmlformats.org/officeDocument/2006/relationships" xmlns:mc="http://schemas.openxmlformats.org/markup-compatibility/2006" xmlns:mv="urn:schemas-microsoft-com:mac:vml" xmlns:p="http://schemas.openxmlformats.org/presentationml/2006/main" xmlns:c="http://schemas.openxmlformats.org/drawingml/2006/chart" xmlns:dgm="http://schemas.openxmlformats.org/drawingml/2006/diagram" xmlns:o="urn:schemas-microsoft-com:office:office" xmlns:v="urn:schemas-microsoft-com:vml" xmlns:pvml="urn:schemas-microsoft-com:office:powerpoint" xmlns:com="http://schemas.openxmlformats.org/drawingml/2006/compatibility" xmlns:p14="http://schemas.microsoft.com/office/powerpoint/2010/main" xmlns:p15="http://schemas.microsoft.com/office/powerpoint/2012/main" xmlns:ahyp="http://schemas.microsoft.com/office/drawing/2018/hyperlinkcolor">
   <p:cSld>
     <p:spTree>
       <p:nvGrpSpPr>
-        <p:cNvPr id="134" name="Shape 134"/>
+        <p:cNvPr id="148" name="Shape 148"/>
         <p:cNvGrpSpPr/>
         <p:nvPr/>
       </p:nvGrpSpPr>
@@ -9750,7 +10525,7 @@
       </p:grpSpPr>
       <p:sp>
         <p:nvSpPr>
-          <p:cNvPr id="135" name="Google Shape;135;p22"/>
+          <p:cNvPr id="149" name="Google Shape;149;p24"/>
           <p:cNvSpPr txBox="1"/>
           <p:nvPr>
             <p:ph type="title"/>
@@ -9790,7 +10565,7 @@
       </p:sp>
       <p:sp>
         <p:nvSpPr>
-          <p:cNvPr id="136" name="Google Shape;136;p22"/>
+          <p:cNvPr id="150" name="Google Shape;150;p24"/>
           <p:cNvSpPr txBox="1"/>
           <p:nvPr/>
         </p:nvSpPr>
@@ -9838,651 +10613,6 @@
             <a:r>
               <a:rPr lang="en"/>
               <a:t> </a:t>
-            </a:r>
-            <a:endParaRPr/>
-          </a:p>
-        </p:txBody>
-      </p:sp>
-      <p:sp>
-        <p:nvSpPr>
-          <p:cNvPr id="137" name="Google Shape;137;p22"/>
-          <p:cNvSpPr txBox="1"/>
-          <p:nvPr>
-            <p:ph idx="1" type="body"/>
-          </p:nvPr>
-        </p:nvSpPr>
-        <p:spPr>
-          <a:xfrm>
-            <a:off x="274320" y="914400"/>
-            <a:ext cx="8595300" cy="4114800"/>
-          </a:xfrm>
-          <a:prstGeom prst="rect">
-            <a:avLst/>
-          </a:prstGeom>
-        </p:spPr>
-        <p:txBody>
-          <a:bodyPr anchorCtr="0" anchor="t" bIns="0" lIns="0" spcFirstLastPara="1" rIns="0" wrap="square" tIns="0">
-            <a:noAutofit/>
-          </a:bodyPr>
-          <a:lstStyle/>
-          <a:p>
-            <a:pPr indent="0" lvl="0" marL="0" rtl="0" algn="l">
-              <a:spcBef>
-                <a:spcPts val="0"/>
-              </a:spcBef>
-              <a:spcAft>
-                <a:spcPts val="0"/>
-              </a:spcAft>
-              <a:buClr>
-                <a:schemeClr val="dk1"/>
-              </a:buClr>
-              <a:buSzPts val="1100"/>
-              <a:buFont typeface="Arial"/>
-              <a:buNone/>
-            </a:pPr>
-            <a:r>
-              <a:rPr b="1" lang="en"/>
-              <a:t>Class</a:t>
-            </a:r>
-            <a:endParaRPr b="1"/>
-          </a:p>
-          <a:p>
-            <a:pPr indent="-342900" lvl="0" marL="457200" rtl="0" algn="l">
-              <a:spcBef>
-                <a:spcPts val="1200"/>
-              </a:spcBef>
-              <a:spcAft>
-                <a:spcPts val="0"/>
-              </a:spcAft>
-              <a:buSzPts val="1800"/>
-              <a:buChar char="●"/>
-            </a:pPr>
-            <a:r>
-              <a:rPr lang="en"/>
-              <a:t>Lecturer: English</a:t>
-            </a:r>
-            <a:endParaRPr/>
-          </a:p>
-          <a:p>
-            <a:pPr indent="-342900" lvl="0" marL="457200" rtl="0" algn="l">
-              <a:spcBef>
-                <a:spcPts val="0"/>
-              </a:spcBef>
-              <a:spcAft>
-                <a:spcPts val="0"/>
-              </a:spcAft>
-              <a:buSzPts val="1800"/>
-              <a:buChar char="●"/>
-            </a:pPr>
-            <a:r>
-              <a:rPr lang="en"/>
-              <a:t>Student: Choice of German or English</a:t>
-            </a:r>
-            <a:endParaRPr/>
-          </a:p>
-          <a:p>
-            <a:pPr indent="0" lvl="0" marL="0" rtl="0" algn="l">
-              <a:spcBef>
-                <a:spcPts val="1200"/>
-              </a:spcBef>
-              <a:spcAft>
-                <a:spcPts val="0"/>
-              </a:spcAft>
-              <a:buClr>
-                <a:schemeClr val="dk1"/>
-              </a:buClr>
-              <a:buSzPts val="1100"/>
-              <a:buFont typeface="Arial"/>
-              <a:buNone/>
-            </a:pPr>
-            <a:r>
-              <a:rPr b="1" lang="en"/>
-              <a:t>Project</a:t>
-            </a:r>
-            <a:endParaRPr b="1"/>
-          </a:p>
-          <a:p>
-            <a:pPr indent="-342900" lvl="0" marL="457200" rtl="0" algn="l">
-              <a:spcBef>
-                <a:spcPts val="1200"/>
-              </a:spcBef>
-              <a:spcAft>
-                <a:spcPts val="0"/>
-              </a:spcAft>
-              <a:buSzPts val="1800"/>
-              <a:buChar char="●"/>
-            </a:pPr>
-            <a:r>
-              <a:rPr lang="en"/>
-              <a:t>Instructor: English</a:t>
-            </a:r>
-            <a:endParaRPr/>
-          </a:p>
-          <a:p>
-            <a:pPr indent="-342900" lvl="0" marL="457200" rtl="0" algn="l">
-              <a:spcBef>
-                <a:spcPts val="0"/>
-              </a:spcBef>
-              <a:spcAft>
-                <a:spcPts val="0"/>
-              </a:spcAft>
-              <a:buSzPts val="1800"/>
-              <a:buChar char="●"/>
-            </a:pPr>
-            <a:r>
-              <a:rPr lang="en"/>
-              <a:t>Team: Choice of German or English</a:t>
-            </a:r>
-            <a:endParaRPr/>
-          </a:p>
-          <a:p>
-            <a:pPr indent="0" lvl="0" marL="0" rtl="0" algn="l">
-              <a:spcBef>
-                <a:spcPts val="1200"/>
-              </a:spcBef>
-              <a:spcAft>
-                <a:spcPts val="1200"/>
-              </a:spcAft>
-              <a:buNone/>
-            </a:pPr>
-            <a:r>
-              <a:t/>
-            </a:r>
-            <a:endParaRPr/>
-          </a:p>
-        </p:txBody>
-      </p:sp>
-      <p:sp>
-        <p:nvSpPr>
-          <p:cNvPr id="138" name="Google Shape;138;p22"/>
-          <p:cNvSpPr txBox="1"/>
-          <p:nvPr>
-            <p:ph idx="12" type="sldNum"/>
-          </p:nvPr>
-        </p:nvSpPr>
-        <p:spPr>
-          <a:xfrm>
-            <a:off x="7315202" y="4416550"/>
-            <a:ext cx="1828800" cy="731400"/>
-          </a:xfrm>
-          <a:prstGeom prst="rect">
-            <a:avLst/>
-          </a:prstGeom>
-        </p:spPr>
-        <p:txBody>
-          <a:bodyPr anchorCtr="0" anchor="b" bIns="91425" lIns="91425" spcFirstLastPara="1" rIns="91425" wrap="square" tIns="91425">
-            <a:noAutofit/>
-          </a:bodyPr>
-          <a:lstStyle/>
-          <a:p>
-            <a:pPr indent="0" lvl="0" marL="0" rtl="0" algn="r">
-              <a:spcBef>
-                <a:spcPts val="0"/>
-              </a:spcBef>
-              <a:spcAft>
-                <a:spcPts val="0"/>
-              </a:spcAft>
-              <a:buNone/>
-            </a:pPr>
-            <a:fld id="{00000000-1234-1234-1234-123412341234}" type="slidenum">
-              <a:rPr lang="en"/>
-              <a:t>‹#›</a:t>
-            </a:fld>
-            <a:endParaRPr/>
-          </a:p>
-          <a:p>
-            <a:pPr indent="0" lvl="0" marL="0" rtl="0" algn="r">
-              <a:spcBef>
-                <a:spcPts val="0"/>
-              </a:spcBef>
-              <a:spcAft>
-                <a:spcPts val="0"/>
-              </a:spcAft>
-              <a:buNone/>
-            </a:pPr>
-            <a:r>
-              <a:rPr b="0" lang="en" sz="900" u="sng">
-                <a:solidFill>
-                  <a:schemeClr val="hlink"/>
-                </a:solidFill>
-                <a:hlinkClick r:id="rId4"/>
-              </a:rPr>
-              <a:t>https://profriehle.com</a:t>
-            </a:r>
-            <a:r>
-              <a:rPr b="0" lang="en" sz="900">
-                <a:solidFill>
-                  <a:schemeClr val="dk2"/>
-                </a:solidFill>
-              </a:rPr>
-              <a:t> </a:t>
-            </a:r>
-            <a:endParaRPr/>
-          </a:p>
-        </p:txBody>
-      </p:sp>
-    </p:spTree>
-  </p:cSld>
-  <p:clrMapOvr>
-    <a:masterClrMapping/>
-  </p:clrMapOvr>
-</p:sld>
-</file>
-
-<file path=ppt/slides/slide16.xml><?xml version="1.0" encoding="utf-8"?>
-<p:sld xmlns:a="http://schemas.openxmlformats.org/drawingml/2006/main" xmlns:r="http://schemas.openxmlformats.org/officeDocument/2006/relationships" xmlns:mc="http://schemas.openxmlformats.org/markup-compatibility/2006" xmlns:mv="urn:schemas-microsoft-com:mac:vml" xmlns:p="http://schemas.openxmlformats.org/presentationml/2006/main" xmlns:c="http://schemas.openxmlformats.org/drawingml/2006/chart" xmlns:dgm="http://schemas.openxmlformats.org/drawingml/2006/diagram" xmlns:o="urn:schemas-microsoft-com:office:office" xmlns:v="urn:schemas-microsoft-com:vml" xmlns:pvml="urn:schemas-microsoft-com:office:powerpoint" xmlns:com="http://schemas.openxmlformats.org/drawingml/2006/compatibility" xmlns:p14="http://schemas.microsoft.com/office/powerpoint/2010/main" xmlns:p15="http://schemas.microsoft.com/office/powerpoint/2012/main" xmlns:ahyp="http://schemas.microsoft.com/office/drawing/2018/hyperlinkcolor">
-  <p:cSld>
-    <p:spTree>
-      <p:nvGrpSpPr>
-        <p:cNvPr id="142" name="Shape 142"/>
-        <p:cNvGrpSpPr/>
-        <p:nvPr/>
-      </p:nvGrpSpPr>
-      <p:grpSpPr>
-        <a:xfrm>
-          <a:off x="0" y="0"/>
-          <a:ext cx="0" cy="0"/>
-          <a:chOff x="0" y="0"/>
-          <a:chExt cx="0" cy="0"/>
-        </a:xfrm>
-      </p:grpSpPr>
-      <p:sp>
-        <p:nvSpPr>
-          <p:cNvPr id="143" name="Google Shape;143;p23"/>
-          <p:cNvSpPr txBox="1"/>
-          <p:nvPr>
-            <p:ph type="title"/>
-          </p:nvPr>
-        </p:nvSpPr>
-        <p:spPr>
-          <a:xfrm>
-            <a:off x="0" y="0"/>
-            <a:ext cx="9144000" cy="685800"/>
-          </a:xfrm>
-          <a:prstGeom prst="rect">
-            <a:avLst/>
-          </a:prstGeom>
-        </p:spPr>
-        <p:txBody>
-          <a:bodyPr anchorCtr="0" anchor="ctr" bIns="91425" lIns="274300" spcFirstLastPara="1" rIns="91425" wrap="square" tIns="91425">
-            <a:noAutofit/>
-          </a:bodyPr>
-          <a:lstStyle/>
-          <a:p>
-            <a:pPr indent="0" lvl="0" marL="0" rtl="0" algn="l">
-              <a:spcBef>
-                <a:spcPts val="0"/>
-              </a:spcBef>
-              <a:spcAft>
-                <a:spcPts val="0"/>
-              </a:spcAft>
-              <a:buNone/>
-            </a:pPr>
-            <a:r>
-              <a:rPr lang="en"/>
-              <a:t>Course Organization</a:t>
-            </a:r>
-            <a:endParaRPr/>
-          </a:p>
-        </p:txBody>
-      </p:sp>
-      <p:sp>
-        <p:nvSpPr>
-          <p:cNvPr id="144" name="Google Shape;144;p23"/>
-          <p:cNvSpPr txBox="1"/>
-          <p:nvPr>
-            <p:ph idx="1" type="body"/>
-          </p:nvPr>
-        </p:nvSpPr>
-        <p:spPr>
-          <a:xfrm>
-            <a:off x="274320" y="914400"/>
-            <a:ext cx="8595300" cy="4114800"/>
-          </a:xfrm>
-          <a:prstGeom prst="rect">
-            <a:avLst/>
-          </a:prstGeom>
-        </p:spPr>
-        <p:txBody>
-          <a:bodyPr anchorCtr="0" anchor="t" bIns="0" lIns="0" spcFirstLastPara="1" rIns="0" wrap="square" tIns="0">
-            <a:noAutofit/>
-          </a:bodyPr>
-          <a:lstStyle/>
-          <a:p>
-            <a:pPr indent="0" lvl="0" marL="0" rtl="0" algn="l">
-              <a:spcBef>
-                <a:spcPts val="0"/>
-              </a:spcBef>
-              <a:spcAft>
-                <a:spcPts val="0"/>
-              </a:spcAft>
-              <a:buClr>
-                <a:schemeClr val="dk1"/>
-              </a:buClr>
-              <a:buSzPts val="1100"/>
-              <a:buFont typeface="Arial"/>
-              <a:buNone/>
-            </a:pPr>
-            <a:r>
-              <a:rPr b="1" lang="en"/>
-              <a:t>Course organization</a:t>
-            </a:r>
-            <a:endParaRPr b="1"/>
-          </a:p>
-          <a:p>
-            <a:pPr indent="-342900" lvl="0" marL="457200" rtl="0" algn="l">
-              <a:spcBef>
-                <a:spcPts val="1200"/>
-              </a:spcBef>
-              <a:spcAft>
-                <a:spcPts val="0"/>
-              </a:spcAft>
-              <a:buSzPts val="1800"/>
-              <a:buChar char="●"/>
-            </a:pPr>
-            <a:r>
-              <a:rPr lang="en"/>
-              <a:t>See </a:t>
-            </a:r>
-            <a:r>
-              <a:rPr lang="en" u="sng">
-                <a:solidFill>
-                  <a:schemeClr val="hlink"/>
-                </a:solidFill>
-                <a:hlinkClick r:id="rId3"/>
-              </a:rPr>
-              <a:t>https://amos.uni1.de</a:t>
-            </a:r>
-            <a:r>
-              <a:rPr lang="en"/>
-              <a:t> </a:t>
-            </a:r>
-            <a:endParaRPr/>
-          </a:p>
-          <a:p>
-            <a:pPr indent="0" lvl="0" marL="0" rtl="0" algn="l">
-              <a:spcBef>
-                <a:spcPts val="1200"/>
-              </a:spcBef>
-              <a:spcAft>
-                <a:spcPts val="0"/>
-              </a:spcAft>
-              <a:buClr>
-                <a:schemeClr val="dk1"/>
-              </a:buClr>
-              <a:buSzPts val="1100"/>
-              <a:buFont typeface="Arial"/>
-              <a:buNone/>
-            </a:pPr>
-            <a:r>
-              <a:rPr b="1" lang="en"/>
-              <a:t>Course schedule</a:t>
-            </a:r>
-            <a:endParaRPr b="1"/>
-          </a:p>
-          <a:p>
-            <a:pPr indent="-342900" lvl="0" marL="457200" rtl="0" algn="l">
-              <a:spcBef>
-                <a:spcPts val="1200"/>
-              </a:spcBef>
-              <a:spcAft>
-                <a:spcPts val="0"/>
-              </a:spcAft>
-              <a:buSzPts val="1800"/>
-              <a:buChar char="●"/>
-            </a:pPr>
-            <a:r>
-              <a:rPr lang="en"/>
-              <a:t>See </a:t>
-            </a:r>
-            <a:r>
-              <a:rPr b="1" lang="en"/>
-              <a:t>Schedule</a:t>
-            </a:r>
-            <a:r>
-              <a:rPr lang="en"/>
-              <a:t> tab on Course Organization doc</a:t>
-            </a:r>
-            <a:endParaRPr/>
-          </a:p>
-          <a:p>
-            <a:pPr indent="0" lvl="0" marL="0" rtl="0" algn="l">
-              <a:spcBef>
-                <a:spcPts val="1200"/>
-              </a:spcBef>
-              <a:spcAft>
-                <a:spcPts val="0"/>
-              </a:spcAft>
-              <a:buClr>
-                <a:schemeClr val="dk1"/>
-              </a:buClr>
-              <a:buSzPts val="1100"/>
-              <a:buFont typeface="Arial"/>
-              <a:buNone/>
-            </a:pPr>
-            <a:r>
-              <a:rPr b="1" lang="en"/>
-              <a:t>Project descriptions</a:t>
-            </a:r>
-            <a:endParaRPr b="1"/>
-          </a:p>
-          <a:p>
-            <a:pPr indent="-342900" lvl="0" marL="457200" rtl="0" algn="l">
-              <a:spcBef>
-                <a:spcPts val="1200"/>
-              </a:spcBef>
-              <a:spcAft>
-                <a:spcPts val="0"/>
-              </a:spcAft>
-              <a:buSzPts val="1800"/>
-              <a:buChar char="●"/>
-            </a:pPr>
-            <a:r>
-              <a:rPr lang="en"/>
-              <a:t>See </a:t>
-            </a:r>
-            <a:r>
-              <a:rPr b="1" lang="en"/>
-              <a:t>Project Descriptions </a:t>
-            </a:r>
-            <a:r>
-              <a:rPr lang="en"/>
-              <a:t>on Course Organization doc</a:t>
-            </a:r>
-            <a:endParaRPr/>
-          </a:p>
-          <a:p>
-            <a:pPr indent="0" lvl="0" marL="0" rtl="0" algn="l">
-              <a:spcBef>
-                <a:spcPts val="1200"/>
-              </a:spcBef>
-              <a:spcAft>
-                <a:spcPts val="0"/>
-              </a:spcAft>
-              <a:buClr>
-                <a:schemeClr val="dk1"/>
-              </a:buClr>
-              <a:buSzPts val="1100"/>
-              <a:buFont typeface="Arial"/>
-              <a:buNone/>
-            </a:pPr>
-            <a:r>
-              <a:rPr b="1" lang="en"/>
-              <a:t>Project teams</a:t>
-            </a:r>
-            <a:endParaRPr b="1"/>
-          </a:p>
-          <a:p>
-            <a:pPr indent="-342900" lvl="0" marL="457200" rtl="0" algn="l">
-              <a:spcBef>
-                <a:spcPts val="1200"/>
-              </a:spcBef>
-              <a:spcAft>
-                <a:spcPts val="0"/>
-              </a:spcAft>
-              <a:buSzPts val="1800"/>
-              <a:buChar char="●"/>
-            </a:pPr>
-            <a:r>
-              <a:rPr lang="en"/>
-              <a:t>See </a:t>
-            </a:r>
-            <a:r>
-              <a:rPr b="1" lang="en"/>
-              <a:t>Project Teams</a:t>
-            </a:r>
-            <a:r>
-              <a:rPr lang="en"/>
-              <a:t> tab on Course Organization doc</a:t>
-            </a:r>
-            <a:endParaRPr/>
-          </a:p>
-          <a:p>
-            <a:pPr indent="0" lvl="0" marL="0" rtl="0" algn="l">
-              <a:spcBef>
-                <a:spcPts val="1200"/>
-              </a:spcBef>
-              <a:spcAft>
-                <a:spcPts val="1200"/>
-              </a:spcAft>
-              <a:buNone/>
-            </a:pPr>
-            <a:r>
-              <a:t/>
-            </a:r>
-            <a:endParaRPr/>
-          </a:p>
-        </p:txBody>
-      </p:sp>
-      <p:sp>
-        <p:nvSpPr>
-          <p:cNvPr id="145" name="Google Shape;145;p23"/>
-          <p:cNvSpPr txBox="1"/>
-          <p:nvPr>
-            <p:ph idx="12" type="sldNum"/>
-          </p:nvPr>
-        </p:nvSpPr>
-        <p:spPr>
-          <a:xfrm>
-            <a:off x="7315202" y="4416550"/>
-            <a:ext cx="1828800" cy="731400"/>
-          </a:xfrm>
-          <a:prstGeom prst="rect">
-            <a:avLst/>
-          </a:prstGeom>
-        </p:spPr>
-        <p:txBody>
-          <a:bodyPr anchorCtr="0" anchor="b" bIns="91425" lIns="91425" spcFirstLastPara="1" rIns="91425" wrap="square" tIns="91425">
-            <a:noAutofit/>
-          </a:bodyPr>
-          <a:lstStyle/>
-          <a:p>
-            <a:pPr indent="0" lvl="0" marL="0" rtl="0" algn="r">
-              <a:spcBef>
-                <a:spcPts val="0"/>
-              </a:spcBef>
-              <a:spcAft>
-                <a:spcPts val="0"/>
-              </a:spcAft>
-              <a:buNone/>
-            </a:pPr>
-            <a:fld id="{00000000-1234-1234-1234-123412341234}" type="slidenum">
-              <a:rPr lang="en"/>
-              <a:t>‹#›</a:t>
-            </a:fld>
-            <a:endParaRPr/>
-          </a:p>
-          <a:p>
-            <a:pPr indent="0" lvl="0" marL="0" rtl="0" algn="r">
-              <a:spcBef>
-                <a:spcPts val="0"/>
-              </a:spcBef>
-              <a:spcAft>
-                <a:spcPts val="0"/>
-              </a:spcAft>
-              <a:buNone/>
-            </a:pPr>
-            <a:r>
-              <a:rPr b="0" lang="en" sz="900" u="sng">
-                <a:solidFill>
-                  <a:schemeClr val="hlink"/>
-                </a:solidFill>
-                <a:hlinkClick r:id="rId4"/>
-              </a:rPr>
-              <a:t>https://profriehle.com</a:t>
-            </a:r>
-            <a:r>
-              <a:rPr b="0" lang="en" sz="900">
-                <a:solidFill>
-                  <a:schemeClr val="dk2"/>
-                </a:solidFill>
-              </a:rPr>
-              <a:t> </a:t>
-            </a:r>
-            <a:endParaRPr/>
-          </a:p>
-        </p:txBody>
-      </p:sp>
-    </p:spTree>
-  </p:cSld>
-  <p:clrMapOvr>
-    <a:masterClrMapping/>
-  </p:clrMapOvr>
-</p:sld>
-</file>
-
-<file path=ppt/slides/slide17.xml><?xml version="1.0" encoding="utf-8"?>
-<p:sld xmlns:a="http://schemas.openxmlformats.org/drawingml/2006/main" xmlns:r="http://schemas.openxmlformats.org/officeDocument/2006/relationships" xmlns:mc="http://schemas.openxmlformats.org/markup-compatibility/2006" xmlns:mv="urn:schemas-microsoft-com:mac:vml" xmlns:p="http://schemas.openxmlformats.org/presentationml/2006/main" xmlns:c="http://schemas.openxmlformats.org/drawingml/2006/chart" xmlns:dgm="http://schemas.openxmlformats.org/drawingml/2006/diagram" xmlns:o="urn:schemas-microsoft-com:office:office" xmlns:v="urn:schemas-microsoft-com:vml" xmlns:pvml="urn:schemas-microsoft-com:office:powerpoint" xmlns:com="http://schemas.openxmlformats.org/drawingml/2006/compatibility" xmlns:p14="http://schemas.microsoft.com/office/powerpoint/2010/main" xmlns:p15="http://schemas.microsoft.com/office/powerpoint/2012/main" xmlns:ahyp="http://schemas.microsoft.com/office/drawing/2018/hyperlinkcolor">
-  <p:cSld>
-    <p:spTree>
-      <p:nvGrpSpPr>
-        <p:cNvPr id="149" name="Shape 149"/>
-        <p:cNvGrpSpPr/>
-        <p:nvPr/>
-      </p:nvGrpSpPr>
-      <p:grpSpPr>
-        <a:xfrm>
-          <a:off x="0" y="0"/>
-          <a:ext cx="0" cy="0"/>
-          <a:chOff x="0" y="0"/>
-          <a:chExt cx="0" cy="0"/>
-        </a:xfrm>
-      </p:grpSpPr>
-      <p:sp>
-        <p:nvSpPr>
-          <p:cNvPr id="150" name="Google Shape;150;p24"/>
-          <p:cNvSpPr txBox="1"/>
-          <p:nvPr>
-            <p:ph type="title"/>
-          </p:nvPr>
-        </p:nvSpPr>
-        <p:spPr>
-          <a:xfrm>
-            <a:off x="0" y="0"/>
-            <a:ext cx="9144000" cy="685800"/>
-          </a:xfrm>
-          <a:prstGeom prst="rect">
-            <a:avLst/>
-          </a:prstGeom>
-        </p:spPr>
-        <p:txBody>
-          <a:bodyPr anchorCtr="0" anchor="ctr" bIns="91425" lIns="274300" spcFirstLastPara="1" rIns="91425" wrap="square" tIns="91425">
-            <a:noAutofit/>
-          </a:bodyPr>
-          <a:lstStyle/>
-          <a:p>
-            <a:pPr indent="0" lvl="0" marL="0" rtl="0" algn="l">
-              <a:spcBef>
-                <a:spcPts val="0"/>
-              </a:spcBef>
-              <a:spcAft>
-                <a:spcPts val="0"/>
-              </a:spcAft>
-              <a:buNone/>
-            </a:pPr>
-            <a:r>
-              <a:rPr lang="en"/>
-              <a:t>Work Rhythm</a:t>
             </a:r>
             <a:endParaRPr/>
           </a:p>
@@ -10527,7 +10657,7 @@
             </a:pPr>
             <a:r>
               <a:rPr b="1" lang="en"/>
-              <a:t>Lectures</a:t>
+              <a:t>Class</a:t>
             </a:r>
             <a:endParaRPr b="1"/>
           </a:p>
@@ -10544,7 +10674,24 @@
             </a:pPr>
             <a:r>
               <a:rPr lang="en"/>
-              <a:t>Class day (90min.)</a:t>
+              <a:t>Lecturer: English</a:t>
+            </a:r>
+            <a:endParaRPr/>
+          </a:p>
+          <a:p>
+            <a:pPr indent="-342900" lvl="0" marL="457200" rtl="0" algn="l">
+              <a:spcBef>
+                <a:spcPts val="0"/>
+              </a:spcBef>
+              <a:spcAft>
+                <a:spcPts val="0"/>
+              </a:spcAft>
+              <a:buSzPts val="1800"/>
+              <a:buChar char="●"/>
+            </a:pPr>
+            <a:r>
+              <a:rPr lang="en"/>
+              <a:t>Student: Choice of German or English</a:t>
             </a:r>
             <a:endParaRPr/>
           </a:p>
@@ -10565,7 +10712,7 @@
             </a:pPr>
             <a:r>
               <a:rPr b="1" lang="en"/>
-              <a:t>Team meetings</a:t>
+              <a:t>Project</a:t>
             </a:r>
             <a:endParaRPr b="1"/>
           </a:p>
@@ -10582,39 +10729,14 @@
             </a:pPr>
             <a:r>
               <a:rPr lang="en"/>
-              <a:t>Next slot after lecture</a:t>
-            </a:r>
-            <a:endParaRPr/>
-          </a:p>
-          <a:p>
-            <a:pPr indent="0" lvl="0" marL="0" rtl="0" algn="l">
-              <a:spcBef>
-                <a:spcPts val="1200"/>
-              </a:spcBef>
-              <a:spcAft>
-                <a:spcPts val="0"/>
-              </a:spcAft>
-              <a:buClr>
-                <a:schemeClr val="dk1"/>
-              </a:buClr>
-              <a:buSzPts val="1100"/>
-              <a:buFont typeface="Arial"/>
-              <a:buNone/>
-            </a:pPr>
-            <a:r>
-              <a:rPr b="1" lang="en"/>
-              <a:t>Project work</a:t>
-            </a:r>
-            <a:r>
-              <a:rPr lang="en"/>
-              <a:t> (self-organized)</a:t>
+              <a:t>Instructor: English</a:t>
             </a:r>
             <a:endParaRPr/>
           </a:p>
           <a:p>
             <a:pPr indent="-342900" lvl="0" marL="457200" rtl="0" algn="l">
               <a:spcBef>
-                <a:spcPts val="1200"/>
+                <a:spcPts val="0"/>
               </a:spcBef>
               <a:spcAft>
                 <a:spcPts val="0"/>
@@ -10624,7 +10746,7 @@
             </a:pPr>
             <a:r>
               <a:rPr lang="en"/>
-              <a:t>Deliverables due according to schedule</a:t>
+              <a:t>Team: Choice of German or English</a:t>
             </a:r>
             <a:endParaRPr/>
           </a:p>
@@ -10698,7 +10820,7 @@
                 <a:solidFill>
                   <a:schemeClr val="hlink"/>
                 </a:solidFill>
-                <a:hlinkClick r:id="rId3"/>
+                <a:hlinkClick r:id="rId4"/>
               </a:rPr>
               <a:t>https://profriehle.com</a:t>
             </a:r>
@@ -10773,7 +10895,7 @@
             </a:pPr>
             <a:r>
               <a:rPr lang="en"/>
-              <a:t>Course Communication</a:t>
+              <a:t>Course Organization</a:t>
             </a:r>
             <a:endParaRPr/>
           </a:p>
@@ -10818,13 +10940,9 @@
             </a:pPr>
             <a:r>
               <a:rPr b="1" lang="en"/>
-              <a:t>Announcements</a:t>
-            </a:r>
-            <a:r>
-              <a:rPr lang="en"/>
-              <a:t> are sent by email</a:t>
-            </a:r>
-            <a:endParaRPr/>
+              <a:t>Course organization</a:t>
+            </a:r>
+            <a:endParaRPr b="1"/>
           </a:p>
           <a:p>
             <a:pPr indent="-342900" lvl="0" marL="457200" rtl="0" algn="l">
@@ -10839,78 +10957,20 @@
             </a:pPr>
             <a:r>
               <a:rPr lang="en"/>
-              <a:t>Through email aliases</a:t>
-            </a:r>
-            <a:endParaRPr/>
-          </a:p>
-          <a:p>
-            <a:pPr indent="-342900" lvl="0" marL="457200" rtl="0" algn="l">
-              <a:spcBef>
-                <a:spcPts val="0"/>
-              </a:spcBef>
-              <a:spcAft>
-                <a:spcPts val="0"/>
-              </a:spcAft>
-              <a:buSzPts val="1800"/>
-              <a:buChar char="●"/>
-            </a:pPr>
+              <a:t>See </a:t>
+            </a:r>
+            <a:r>
+              <a:rPr lang="en" u="sng">
+                <a:solidFill>
+                  <a:schemeClr val="hlink"/>
+                </a:solidFill>
+                <a:hlinkClick r:id="rId3"/>
+              </a:rPr>
+              <a:t>https://amos.uni1.de</a:t>
+            </a:r>
             <a:r>
               <a:rPr lang="en"/>
-              <a:t>Through course management system</a:t>
-            </a:r>
-            <a:endParaRPr/>
-          </a:p>
-          <a:p>
-            <a:pPr indent="0" lvl="0" marL="0" rtl="0" algn="l">
-              <a:spcBef>
-                <a:spcPts val="1200"/>
-              </a:spcBef>
-              <a:spcAft>
-                <a:spcPts val="0"/>
-              </a:spcAft>
-              <a:buNone/>
-            </a:pPr>
-            <a:r>
-              <a:rPr b="1" lang="en"/>
-              <a:t>Administrative questions</a:t>
-            </a:r>
-            <a:r>
-              <a:rPr lang="en"/>
-              <a:t> to teaching team</a:t>
-            </a:r>
-            <a:endParaRPr/>
-          </a:p>
-          <a:p>
-            <a:pPr indent="-342900" lvl="0" marL="457200" rtl="0" algn="l">
-              <a:spcBef>
-                <a:spcPts val="1200"/>
-              </a:spcBef>
-              <a:spcAft>
-                <a:spcPts val="0"/>
-              </a:spcAft>
-              <a:buSzPts val="1800"/>
-              <a:buChar char="●"/>
-            </a:pPr>
-            <a:r>
-              <a:rPr lang="en"/>
-              <a:t>Please ask your question in the course forum</a:t>
-            </a:r>
-            <a:endParaRPr/>
-          </a:p>
-          <a:p>
-            <a:pPr indent="-342900" lvl="0" marL="457200" rtl="0" algn="l">
-              <a:spcBef>
-                <a:spcPts val="0"/>
-              </a:spcBef>
-              <a:spcAft>
-                <a:spcPts val="0"/>
-              </a:spcAft>
-              <a:buSzPts val="1800"/>
-              <a:buChar char="●"/>
-            </a:pPr>
-            <a:r>
-              <a:rPr lang="en"/>
-              <a:t>For private questions, use the teaching team email alias</a:t>
+              <a:t> </a:t>
             </a:r>
             <a:endParaRPr/>
           </a:p>
@@ -10931,11 +10991,124 @@
             </a:pPr>
             <a:r>
               <a:rPr b="1" lang="en"/>
-              <a:t>Process questions</a:t>
-            </a:r>
+              <a:t>Course schedule</a:t>
+            </a:r>
+            <a:endParaRPr b="1"/>
+          </a:p>
+          <a:p>
+            <a:pPr indent="-342900" lvl="0" marL="457200" rtl="0" algn="l">
+              <a:spcBef>
+                <a:spcPts val="1200"/>
+              </a:spcBef>
+              <a:spcAft>
+                <a:spcPts val="0"/>
+              </a:spcAft>
+              <a:buSzPts val="1800"/>
+              <a:buChar char="●"/>
+            </a:pPr>
             <a:r>
               <a:rPr lang="en"/>
-              <a:t> to your Scrum Master</a:t>
+              <a:t>See </a:t>
+            </a:r>
+            <a:r>
+              <a:rPr b="1" lang="en"/>
+              <a:t>Schedule</a:t>
+            </a:r>
+            <a:r>
+              <a:rPr lang="en"/>
+              <a:t> tab on Course Organization doc</a:t>
+            </a:r>
+            <a:endParaRPr/>
+          </a:p>
+          <a:p>
+            <a:pPr indent="0" lvl="0" marL="0" rtl="0" algn="l">
+              <a:spcBef>
+                <a:spcPts val="1200"/>
+              </a:spcBef>
+              <a:spcAft>
+                <a:spcPts val="0"/>
+              </a:spcAft>
+              <a:buClr>
+                <a:schemeClr val="dk1"/>
+              </a:buClr>
+              <a:buSzPts val="1100"/>
+              <a:buFont typeface="Arial"/>
+              <a:buNone/>
+            </a:pPr>
+            <a:r>
+              <a:rPr b="1" lang="en"/>
+              <a:t>Project descriptions</a:t>
+            </a:r>
+            <a:endParaRPr b="1"/>
+          </a:p>
+          <a:p>
+            <a:pPr indent="-342900" lvl="0" marL="457200" rtl="0" algn="l">
+              <a:spcBef>
+                <a:spcPts val="1200"/>
+              </a:spcBef>
+              <a:spcAft>
+                <a:spcPts val="0"/>
+              </a:spcAft>
+              <a:buSzPts val="1800"/>
+              <a:buChar char="●"/>
+            </a:pPr>
+            <a:r>
+              <a:rPr lang="en"/>
+              <a:t>See </a:t>
+            </a:r>
+            <a:r>
+              <a:rPr b="1" lang="en"/>
+              <a:t>Project Descriptions </a:t>
+            </a:r>
+            <a:r>
+              <a:rPr lang="en"/>
+              <a:t>on Course Organization doc</a:t>
+            </a:r>
+            <a:endParaRPr/>
+          </a:p>
+          <a:p>
+            <a:pPr indent="0" lvl="0" marL="0" rtl="0" algn="l">
+              <a:spcBef>
+                <a:spcPts val="1200"/>
+              </a:spcBef>
+              <a:spcAft>
+                <a:spcPts val="0"/>
+              </a:spcAft>
+              <a:buClr>
+                <a:schemeClr val="dk1"/>
+              </a:buClr>
+              <a:buSzPts val="1100"/>
+              <a:buFont typeface="Arial"/>
+              <a:buNone/>
+            </a:pPr>
+            <a:r>
+              <a:rPr b="1" lang="en"/>
+              <a:t>Project teams</a:t>
+            </a:r>
+            <a:endParaRPr b="1"/>
+          </a:p>
+          <a:p>
+            <a:pPr indent="-342900" lvl="0" marL="457200" rtl="0" algn="l">
+              <a:spcBef>
+                <a:spcPts val="1200"/>
+              </a:spcBef>
+              <a:spcAft>
+                <a:spcPts val="0"/>
+              </a:spcAft>
+              <a:buSzPts val="1800"/>
+              <a:buChar char="●"/>
+            </a:pPr>
+            <a:r>
+              <a:rPr lang="en"/>
+              <a:t>See </a:t>
+            </a:r>
+            <a:r>
+              <a:rPr b="1" lang="en"/>
+              <a:t>Project Teams</a:t>
+            </a:r>
+            <a:r>
+              <a:rPr lang="en"/>
+              <a:t> tab on Course Organization doc</a:t>
             </a:r>
             <a:endParaRPr/>
           </a:p>
@@ -11009,7 +11182,7 @@
                 <a:solidFill>
                   <a:schemeClr val="hlink"/>
                 </a:solidFill>
-                <a:hlinkClick r:id="rId3"/>
+                <a:hlinkClick r:id="rId4"/>
               </a:rPr>
               <a:t>https://profriehle.com</a:t>
             </a:r>
@@ -11055,25 +11228,25 @@
           <p:cNvPr id="164" name="Google Shape;164;p26"/>
           <p:cNvSpPr txBox="1"/>
           <p:nvPr>
-            <p:ph type="ctrTitle"/>
+            <p:ph type="title"/>
           </p:nvPr>
         </p:nvSpPr>
         <p:spPr>
           <a:xfrm>
             <a:off x="0" y="0"/>
-            <a:ext cx="9144000" cy="2388900"/>
+            <a:ext cx="9144000" cy="685800"/>
           </a:xfrm>
           <a:prstGeom prst="rect">
             <a:avLst/>
           </a:prstGeom>
         </p:spPr>
         <p:txBody>
-          <a:bodyPr anchorCtr="0" anchor="b" bIns="274300" lIns="91425" spcFirstLastPara="1" rIns="91425" wrap="square" tIns="91425">
+          <a:bodyPr anchorCtr="0" anchor="ctr" bIns="91425" lIns="274300" spcFirstLastPara="1" rIns="91425" wrap="square" tIns="91425">
             <a:noAutofit/>
           </a:bodyPr>
           <a:lstStyle/>
           <a:p>
-            <a:pPr indent="0" lvl="0" marL="0" rtl="0" algn="ctr">
+            <a:pPr indent="0" lvl="0" marL="0" rtl="0" algn="l">
               <a:spcBef>
                 <a:spcPts val="0"/>
               </a:spcBef>
@@ -11084,7 +11257,7 @@
             </a:pPr>
             <a:r>
               <a:rPr lang="en"/>
-              <a:t>Thank you! Any questions?</a:t>
+              <a:t>Work Rhythm</a:t>
             </a:r>
             <a:endParaRPr/>
           </a:p>
@@ -11095,117 +11268,224 @@
           <p:cNvPr id="165" name="Google Shape;165;p26"/>
           <p:cNvSpPr txBox="1"/>
           <p:nvPr>
-            <p:ph idx="1" type="subTitle"/>
+            <p:ph idx="1" type="body"/>
           </p:nvPr>
         </p:nvSpPr>
         <p:spPr>
           <a:xfrm>
-            <a:off x="0" y="2569475"/>
-            <a:ext cx="9144000" cy="2574000"/>
+            <a:off x="274320" y="914400"/>
+            <a:ext cx="8595300" cy="4114800"/>
           </a:xfrm>
           <a:prstGeom prst="rect">
             <a:avLst/>
           </a:prstGeom>
         </p:spPr>
         <p:txBody>
-          <a:bodyPr anchorCtr="0" anchor="t" bIns="91425" lIns="91425" spcFirstLastPara="1" rIns="91425" wrap="square" tIns="274300">
+          <a:bodyPr anchorCtr="0" anchor="t" bIns="0" lIns="0" spcFirstLastPara="1" rIns="0" wrap="square" tIns="0">
             <a:noAutofit/>
           </a:bodyPr>
           <a:lstStyle/>
           <a:p>
-            <a:pPr indent="0" lvl="0" marL="0" rtl="0" algn="ctr">
-              <a:lnSpc>
-                <a:spcPct val="150000"/>
-              </a:lnSpc>
-              <a:spcBef>
-                <a:spcPts val="0"/>
-              </a:spcBef>
-              <a:spcAft>
-                <a:spcPts val="0"/>
-              </a:spcAft>
-              <a:buNone/>
-            </a:pPr>
-            <a:r>
-              <a:rPr lang="en" u="sng">
+            <a:pPr indent="0" lvl="0" marL="0" rtl="0" algn="l">
+              <a:spcBef>
+                <a:spcPts val="0"/>
+              </a:spcBef>
+              <a:spcAft>
+                <a:spcPts val="0"/>
+              </a:spcAft>
+              <a:buClr>
+                <a:schemeClr val="dk1"/>
+              </a:buClr>
+              <a:buSzPts val="1100"/>
+              <a:buFont typeface="Arial"/>
+              <a:buNone/>
+            </a:pPr>
+            <a:r>
+              <a:rPr b="1" lang="en"/>
+              <a:t>Lectures</a:t>
+            </a:r>
+            <a:endParaRPr b="1"/>
+          </a:p>
+          <a:p>
+            <a:pPr indent="-342900" lvl="0" marL="457200" rtl="0" algn="l">
+              <a:spcBef>
+                <a:spcPts val="1200"/>
+              </a:spcBef>
+              <a:spcAft>
+                <a:spcPts val="0"/>
+              </a:spcAft>
+              <a:buSzPts val="1800"/>
+              <a:buChar char="●"/>
+            </a:pPr>
+            <a:r>
+              <a:rPr lang="en"/>
+              <a:t>Class day (90min.)</a:t>
+            </a:r>
+            <a:endParaRPr/>
+          </a:p>
+          <a:p>
+            <a:pPr indent="0" lvl="0" marL="0" rtl="0" algn="l">
+              <a:spcBef>
+                <a:spcPts val="1200"/>
+              </a:spcBef>
+              <a:spcAft>
+                <a:spcPts val="0"/>
+              </a:spcAft>
+              <a:buClr>
+                <a:schemeClr val="dk1"/>
+              </a:buClr>
+              <a:buSzPts val="1100"/>
+              <a:buFont typeface="Arial"/>
+              <a:buNone/>
+            </a:pPr>
+            <a:r>
+              <a:rPr b="1" lang="en"/>
+              <a:t>Team meetings</a:t>
+            </a:r>
+            <a:endParaRPr b="1"/>
+          </a:p>
+          <a:p>
+            <a:pPr indent="-342900" lvl="0" marL="457200" rtl="0" algn="l">
+              <a:spcBef>
+                <a:spcPts val="1200"/>
+              </a:spcBef>
+              <a:spcAft>
+                <a:spcPts val="0"/>
+              </a:spcAft>
+              <a:buSzPts val="1800"/>
+              <a:buChar char="●"/>
+            </a:pPr>
+            <a:r>
+              <a:rPr lang="en"/>
+              <a:t>Next slot after lecture</a:t>
+            </a:r>
+            <a:endParaRPr/>
+          </a:p>
+          <a:p>
+            <a:pPr indent="0" lvl="0" marL="0" rtl="0" algn="l">
+              <a:spcBef>
+                <a:spcPts val="1200"/>
+              </a:spcBef>
+              <a:spcAft>
+                <a:spcPts val="0"/>
+              </a:spcAft>
+              <a:buClr>
+                <a:schemeClr val="dk1"/>
+              </a:buClr>
+              <a:buSzPts val="1100"/>
+              <a:buFont typeface="Arial"/>
+              <a:buNone/>
+            </a:pPr>
+            <a:r>
+              <a:rPr b="1" lang="en"/>
+              <a:t>Project work</a:t>
+            </a:r>
+            <a:r>
+              <a:rPr lang="en"/>
+              <a:t> (self-organized)</a:t>
+            </a:r>
+            <a:endParaRPr/>
+          </a:p>
+          <a:p>
+            <a:pPr indent="-342900" lvl="0" marL="457200" rtl="0" algn="l">
+              <a:spcBef>
+                <a:spcPts val="1200"/>
+              </a:spcBef>
+              <a:spcAft>
+                <a:spcPts val="0"/>
+              </a:spcAft>
+              <a:buSzPts val="1800"/>
+              <a:buChar char="●"/>
+            </a:pPr>
+            <a:r>
+              <a:rPr lang="en"/>
+              <a:t>Deliverables due according to schedule</a:t>
+            </a:r>
+            <a:endParaRPr/>
+          </a:p>
+          <a:p>
+            <a:pPr indent="0" lvl="0" marL="0" rtl="0" algn="l">
+              <a:spcBef>
+                <a:spcPts val="1200"/>
+              </a:spcBef>
+              <a:spcAft>
+                <a:spcPts val="1200"/>
+              </a:spcAft>
+              <a:buNone/>
+            </a:pPr>
+            <a:r>
+              <a:t/>
+            </a:r>
+            <a:endParaRPr/>
+          </a:p>
+        </p:txBody>
+      </p:sp>
+      <p:sp>
+        <p:nvSpPr>
+          <p:cNvPr id="166" name="Google Shape;166;p26"/>
+          <p:cNvSpPr txBox="1"/>
+          <p:nvPr>
+            <p:ph idx="12" type="sldNum"/>
+          </p:nvPr>
+        </p:nvSpPr>
+        <p:spPr>
+          <a:xfrm>
+            <a:off x="7315202" y="4416550"/>
+            <a:ext cx="1828800" cy="731400"/>
+          </a:xfrm>
+          <a:prstGeom prst="rect">
+            <a:avLst/>
+          </a:prstGeom>
+        </p:spPr>
+        <p:txBody>
+          <a:bodyPr anchorCtr="0" anchor="b" bIns="91425" lIns="91425" spcFirstLastPara="1" rIns="91425" wrap="square" tIns="91425">
+            <a:noAutofit/>
+          </a:bodyPr>
+          <a:lstStyle/>
+          <a:p>
+            <a:pPr indent="0" lvl="0" marL="0" rtl="0" algn="r">
+              <a:spcBef>
+                <a:spcPts val="0"/>
+              </a:spcBef>
+              <a:spcAft>
+                <a:spcPts val="0"/>
+              </a:spcAft>
+              <a:buNone/>
+            </a:pPr>
+            <a:fld id="{00000000-1234-1234-1234-123412341234}" type="slidenum">
+              <a:rPr lang="en"/>
+              <a:t>‹#›</a:t>
+            </a:fld>
+            <a:endParaRPr/>
+          </a:p>
+          <a:p>
+            <a:pPr indent="0" lvl="0" marL="0" rtl="0" algn="r">
+              <a:spcBef>
+                <a:spcPts val="0"/>
+              </a:spcBef>
+              <a:spcAft>
+                <a:spcPts val="0"/>
+              </a:spcAft>
+              <a:buNone/>
+            </a:pPr>
+            <a:r>
+              <a:rPr b="0" lang="en" sz="900" u="sng">
                 <a:solidFill>
                   <a:schemeClr val="hlink"/>
                 </a:solidFill>
                 <a:hlinkClick r:id="rId3"/>
               </a:rPr>
-              <a:t>dirk.riehle@fau.de</a:t>
-            </a:r>
-            <a:r>
-              <a:rPr lang="en"/>
+              <a:t>https://profriehle.com</a:t>
+            </a:r>
+            <a:r>
+              <a:rPr b="0" lang="en" sz="900">
+                <a:solidFill>
+                  <a:schemeClr val="dk2"/>
+                </a:solidFill>
+              </a:rPr>
               <a:t> </a:t>
             </a:r>
-            <a:r>
-              <a:rPr lang="en" sz="2400"/>
-              <a:t>–</a:t>
-            </a:r>
-            <a:r>
-              <a:rPr lang="en"/>
-              <a:t> </a:t>
-            </a:r>
-            <a:r>
-              <a:rPr lang="en" u="sng">
-                <a:solidFill>
-                  <a:schemeClr val="hlink"/>
-                </a:solidFill>
-                <a:hlinkClick r:id="rId4"/>
-              </a:rPr>
-              <a:t>https://oss.cs.fau.de</a:t>
-            </a:r>
-            <a:endParaRPr/>
-          </a:p>
-          <a:p>
-            <a:pPr indent="0" lvl="0" marL="0" rtl="0" algn="ctr">
-              <a:lnSpc>
-                <a:spcPct val="150000"/>
-              </a:lnSpc>
-              <a:spcBef>
-                <a:spcPts val="0"/>
-              </a:spcBef>
-              <a:spcAft>
-                <a:spcPts val="0"/>
-              </a:spcAft>
-              <a:buNone/>
-            </a:pPr>
-            <a:r>
-              <a:rPr lang="en" sz="2400" u="sng">
-                <a:solidFill>
-                  <a:schemeClr val="hlink"/>
-                </a:solidFill>
-                <a:hlinkClick r:id="rId5"/>
-              </a:rPr>
-              <a:t>dirk@riehle.org</a:t>
-            </a:r>
-            <a:r>
-              <a:rPr lang="en" sz="2400"/>
-              <a:t> – </a:t>
-            </a:r>
-            <a:r>
-              <a:rPr lang="en" sz="2400" u="sng">
-                <a:solidFill>
-                  <a:schemeClr val="hlink"/>
-                </a:solidFill>
-                <a:hlinkClick r:id="rId6"/>
-              </a:rPr>
-              <a:t>https://dirkriehle.com</a:t>
-            </a:r>
-            <a:r>
-              <a:rPr lang="en" sz="2400"/>
-              <a:t> – </a:t>
-            </a:r>
-            <a:r>
-              <a:rPr lang="en" sz="2400" u="sng">
-                <a:solidFill>
-                  <a:schemeClr val="hlink"/>
-                </a:solidFill>
-                <a:hlinkClick r:id="rId7"/>
-              </a:rPr>
-              <a:t>@dirkriehle</a:t>
-            </a:r>
-            <a:endParaRPr sz="2400"/>
+            <a:endParaRPr/>
           </a:p>
         </p:txBody>
       </p:sp>
@@ -11534,7 +11814,7 @@
   <p:cSld>
     <p:spTree>
       <p:nvGrpSpPr>
-        <p:cNvPr id="169" name="Shape 169"/>
+        <p:cNvPr id="170" name="Shape 170"/>
         <p:cNvGrpSpPr/>
         <p:nvPr/>
       </p:nvGrpSpPr>
@@ -11548,7 +11828,7 @@
       </p:grpSpPr>
       <p:sp>
         <p:nvSpPr>
-          <p:cNvPr id="170" name="Google Shape;170;p27"/>
+          <p:cNvPr id="171" name="Google Shape;171;p27"/>
           <p:cNvSpPr txBox="1"/>
           <p:nvPr>
             <p:ph type="title"/>
@@ -11580,7 +11860,7 @@
             </a:pPr>
             <a:r>
               <a:rPr lang="en"/>
-              <a:t>Legal Notices</a:t>
+              <a:t>Course Communication</a:t>
             </a:r>
             <a:endParaRPr/>
           </a:p>
@@ -11588,7 +11868,184 @@
       </p:sp>
       <p:sp>
         <p:nvSpPr>
-          <p:cNvPr id="171" name="Google Shape;171;p27"/>
+          <p:cNvPr id="172" name="Google Shape;172;p27"/>
+          <p:cNvSpPr txBox="1"/>
+          <p:nvPr>
+            <p:ph idx="1" type="body"/>
+          </p:nvPr>
+        </p:nvSpPr>
+        <p:spPr>
+          <a:xfrm>
+            <a:off x="274320" y="914400"/>
+            <a:ext cx="8595300" cy="4114800"/>
+          </a:xfrm>
+          <a:prstGeom prst="rect">
+            <a:avLst/>
+          </a:prstGeom>
+        </p:spPr>
+        <p:txBody>
+          <a:bodyPr anchorCtr="0" anchor="t" bIns="0" lIns="0" spcFirstLastPara="1" rIns="0" wrap="square" tIns="0">
+            <a:noAutofit/>
+          </a:bodyPr>
+          <a:lstStyle/>
+          <a:p>
+            <a:pPr indent="0" lvl="0" marL="0" rtl="0" algn="l">
+              <a:spcBef>
+                <a:spcPts val="0"/>
+              </a:spcBef>
+              <a:spcAft>
+                <a:spcPts val="0"/>
+              </a:spcAft>
+              <a:buClr>
+                <a:schemeClr val="dk1"/>
+              </a:buClr>
+              <a:buSzPts val="1100"/>
+              <a:buFont typeface="Arial"/>
+              <a:buNone/>
+            </a:pPr>
+            <a:r>
+              <a:rPr b="1" lang="en"/>
+              <a:t>Announcements</a:t>
+            </a:r>
+            <a:r>
+              <a:rPr lang="en"/>
+              <a:t> are sent by email</a:t>
+            </a:r>
+            <a:endParaRPr/>
+          </a:p>
+          <a:p>
+            <a:pPr indent="-342900" lvl="0" marL="457200" rtl="0" algn="l">
+              <a:spcBef>
+                <a:spcPts val="1200"/>
+              </a:spcBef>
+              <a:spcAft>
+                <a:spcPts val="0"/>
+              </a:spcAft>
+              <a:buSzPts val="1800"/>
+              <a:buChar char="●"/>
+            </a:pPr>
+            <a:r>
+              <a:rPr lang="en"/>
+              <a:t>Through email aliases</a:t>
+            </a:r>
+            <a:endParaRPr/>
+          </a:p>
+          <a:p>
+            <a:pPr indent="-342900" lvl="0" marL="457200" rtl="0" algn="l">
+              <a:spcBef>
+                <a:spcPts val="0"/>
+              </a:spcBef>
+              <a:spcAft>
+                <a:spcPts val="0"/>
+              </a:spcAft>
+              <a:buSzPts val="1800"/>
+              <a:buChar char="●"/>
+            </a:pPr>
+            <a:r>
+              <a:rPr lang="en"/>
+              <a:t>Through course management system</a:t>
+            </a:r>
+            <a:endParaRPr/>
+          </a:p>
+          <a:p>
+            <a:pPr indent="0" lvl="0" marL="0" rtl="0" algn="l">
+              <a:spcBef>
+                <a:spcPts val="1200"/>
+              </a:spcBef>
+              <a:spcAft>
+                <a:spcPts val="0"/>
+              </a:spcAft>
+              <a:buNone/>
+            </a:pPr>
+            <a:r>
+              <a:rPr b="1" lang="en"/>
+              <a:t>Administrative questions</a:t>
+            </a:r>
+            <a:r>
+              <a:rPr lang="en"/>
+              <a:t> to teaching team</a:t>
+            </a:r>
+            <a:endParaRPr/>
+          </a:p>
+          <a:p>
+            <a:pPr indent="-342900" lvl="0" marL="457200" rtl="0" algn="l">
+              <a:spcBef>
+                <a:spcPts val="1200"/>
+              </a:spcBef>
+              <a:spcAft>
+                <a:spcPts val="0"/>
+              </a:spcAft>
+              <a:buSzPts val="1800"/>
+              <a:buChar char="●"/>
+            </a:pPr>
+            <a:r>
+              <a:rPr lang="en"/>
+              <a:t>Please ask your question in the course forum</a:t>
+            </a:r>
+            <a:endParaRPr/>
+          </a:p>
+          <a:p>
+            <a:pPr indent="-342900" lvl="0" marL="457200" rtl="0" algn="l">
+              <a:spcBef>
+                <a:spcPts val="0"/>
+              </a:spcBef>
+              <a:spcAft>
+                <a:spcPts val="0"/>
+              </a:spcAft>
+              <a:buSzPts val="1800"/>
+              <a:buChar char="●"/>
+            </a:pPr>
+            <a:r>
+              <a:rPr lang="en"/>
+              <a:t>For private questions, use the teaching team email alias</a:t>
+            </a:r>
+            <a:endParaRPr/>
+          </a:p>
+          <a:p>
+            <a:pPr indent="0" lvl="0" marL="0" rtl="0" algn="l">
+              <a:spcBef>
+                <a:spcPts val="1200"/>
+              </a:spcBef>
+              <a:spcAft>
+                <a:spcPts val="0"/>
+              </a:spcAft>
+              <a:buClr>
+                <a:schemeClr val="dk1"/>
+              </a:buClr>
+              <a:buSzPts val="1100"/>
+              <a:buFont typeface="Arial"/>
+              <a:buNone/>
+            </a:pPr>
+            <a:r>
+              <a:rPr b="1" lang="en"/>
+              <a:t>Process questions</a:t>
+            </a:r>
+            <a:r>
+              <a:rPr lang="en"/>
+              <a:t> to your Scrum Master</a:t>
+            </a:r>
+            <a:endParaRPr/>
+          </a:p>
+          <a:p>
+            <a:pPr indent="0" lvl="0" marL="0" rtl="0" algn="l">
+              <a:spcBef>
+                <a:spcPts val="1200"/>
+              </a:spcBef>
+              <a:spcAft>
+                <a:spcPts val="1200"/>
+              </a:spcAft>
+              <a:buNone/>
+            </a:pPr>
+            <a:r>
+              <a:t/>
+            </a:r>
+            <a:endParaRPr/>
+          </a:p>
+        </p:txBody>
+      </p:sp>
+      <p:sp>
+        <p:nvSpPr>
+          <p:cNvPr id="173" name="Google Shape;173;p27"/>
           <p:cNvSpPr txBox="1"/>
           <p:nvPr>
             <p:ph idx="12" type="sldNum"/>
@@ -11655,9 +12112,323 @@
           </a:p>
         </p:txBody>
       </p:sp>
+    </p:spTree>
+  </p:cSld>
+  <p:clrMapOvr>
+    <a:masterClrMapping/>
+  </p:clrMapOvr>
+</p:sld>
+</file>
+
+<file path=ppt/slides/slide21.xml><?xml version="1.0" encoding="utf-8"?>
+<p:sld xmlns:a="http://schemas.openxmlformats.org/drawingml/2006/main" xmlns:r="http://schemas.openxmlformats.org/officeDocument/2006/relationships" xmlns:mc="http://schemas.openxmlformats.org/markup-compatibility/2006" xmlns:mv="urn:schemas-microsoft-com:mac:vml" xmlns:p="http://schemas.openxmlformats.org/presentationml/2006/main" xmlns:c="http://schemas.openxmlformats.org/drawingml/2006/chart" xmlns:dgm="http://schemas.openxmlformats.org/drawingml/2006/diagram" xmlns:o="urn:schemas-microsoft-com:office:office" xmlns:v="urn:schemas-microsoft-com:vml" xmlns:pvml="urn:schemas-microsoft-com:office:powerpoint" xmlns:com="http://schemas.openxmlformats.org/drawingml/2006/compatibility" xmlns:p14="http://schemas.microsoft.com/office/powerpoint/2010/main" xmlns:p15="http://schemas.microsoft.com/office/powerpoint/2012/main" xmlns:ahyp="http://schemas.microsoft.com/office/drawing/2018/hyperlinkcolor">
+  <p:cSld>
+    <p:spTree>
+      <p:nvGrpSpPr>
+        <p:cNvPr id="177" name="Shape 177"/>
+        <p:cNvGrpSpPr/>
+        <p:nvPr/>
+      </p:nvGrpSpPr>
+      <p:grpSpPr>
+        <a:xfrm>
+          <a:off x="0" y="0"/>
+          <a:ext cx="0" cy="0"/>
+          <a:chOff x="0" y="0"/>
+          <a:chExt cx="0" cy="0"/>
+        </a:xfrm>
+      </p:grpSpPr>
       <p:sp>
         <p:nvSpPr>
-          <p:cNvPr id="172" name="Google Shape;172;p27"/>
+          <p:cNvPr id="178" name="Google Shape;178;p28"/>
+          <p:cNvSpPr txBox="1"/>
+          <p:nvPr>
+            <p:ph type="ctrTitle"/>
+          </p:nvPr>
+        </p:nvSpPr>
+        <p:spPr>
+          <a:xfrm>
+            <a:off x="0" y="0"/>
+            <a:ext cx="9144000" cy="2388900"/>
+          </a:xfrm>
+          <a:prstGeom prst="rect">
+            <a:avLst/>
+          </a:prstGeom>
+        </p:spPr>
+        <p:txBody>
+          <a:bodyPr anchorCtr="0" anchor="b" bIns="274300" lIns="91425" spcFirstLastPara="1" rIns="91425" wrap="square" tIns="91425">
+            <a:noAutofit/>
+          </a:bodyPr>
+          <a:lstStyle/>
+          <a:p>
+            <a:pPr indent="0" lvl="0" marL="0" rtl="0" algn="ctr">
+              <a:spcBef>
+                <a:spcPts val="0"/>
+              </a:spcBef>
+              <a:spcAft>
+                <a:spcPts val="0"/>
+              </a:spcAft>
+              <a:buNone/>
+            </a:pPr>
+            <a:r>
+              <a:rPr lang="en"/>
+              <a:t>Thank you! Any questions?</a:t>
+            </a:r>
+            <a:endParaRPr/>
+          </a:p>
+        </p:txBody>
+      </p:sp>
+      <p:sp>
+        <p:nvSpPr>
+          <p:cNvPr id="179" name="Google Shape;179;p28"/>
+          <p:cNvSpPr txBox="1"/>
+          <p:nvPr>
+            <p:ph idx="1" type="subTitle"/>
+          </p:nvPr>
+        </p:nvSpPr>
+        <p:spPr>
+          <a:xfrm>
+            <a:off x="0" y="2569475"/>
+            <a:ext cx="9144000" cy="2574000"/>
+          </a:xfrm>
+          <a:prstGeom prst="rect">
+            <a:avLst/>
+          </a:prstGeom>
+        </p:spPr>
+        <p:txBody>
+          <a:bodyPr anchorCtr="0" anchor="t" bIns="91425" lIns="91425" spcFirstLastPara="1" rIns="91425" wrap="square" tIns="274300">
+            <a:noAutofit/>
+          </a:bodyPr>
+          <a:lstStyle/>
+          <a:p>
+            <a:pPr indent="0" lvl="0" marL="0" rtl="0" algn="ctr">
+              <a:lnSpc>
+                <a:spcPct val="150000"/>
+              </a:lnSpc>
+              <a:spcBef>
+                <a:spcPts val="0"/>
+              </a:spcBef>
+              <a:spcAft>
+                <a:spcPts val="0"/>
+              </a:spcAft>
+              <a:buNone/>
+            </a:pPr>
+            <a:r>
+              <a:rPr lang="en" u="sng">
+                <a:solidFill>
+                  <a:schemeClr val="hlink"/>
+                </a:solidFill>
+                <a:hlinkClick r:id="rId3"/>
+              </a:rPr>
+              <a:t>dirk.riehle@fau.de</a:t>
+            </a:r>
+            <a:r>
+              <a:rPr lang="en"/>
+              <a:t> </a:t>
+            </a:r>
+            <a:r>
+              <a:rPr lang="en" sz="2400"/>
+              <a:t>–</a:t>
+            </a:r>
+            <a:r>
+              <a:rPr lang="en"/>
+              <a:t> </a:t>
+            </a:r>
+            <a:r>
+              <a:rPr lang="en" u="sng">
+                <a:solidFill>
+                  <a:schemeClr val="hlink"/>
+                </a:solidFill>
+                <a:hlinkClick r:id="rId4"/>
+              </a:rPr>
+              <a:t>https://oss.cs.fau.de</a:t>
+            </a:r>
+            <a:endParaRPr/>
+          </a:p>
+          <a:p>
+            <a:pPr indent="0" lvl="0" marL="0" rtl="0" algn="ctr">
+              <a:lnSpc>
+                <a:spcPct val="150000"/>
+              </a:lnSpc>
+              <a:spcBef>
+                <a:spcPts val="0"/>
+              </a:spcBef>
+              <a:spcAft>
+                <a:spcPts val="0"/>
+              </a:spcAft>
+              <a:buNone/>
+            </a:pPr>
+            <a:r>
+              <a:rPr lang="en" sz="2400" u="sng">
+                <a:solidFill>
+                  <a:schemeClr val="hlink"/>
+                </a:solidFill>
+                <a:hlinkClick r:id="rId5"/>
+              </a:rPr>
+              <a:t>dirk@riehle.org</a:t>
+            </a:r>
+            <a:r>
+              <a:rPr lang="en" sz="2400"/>
+              <a:t> – </a:t>
+            </a:r>
+            <a:r>
+              <a:rPr lang="en" sz="2400" u="sng">
+                <a:solidFill>
+                  <a:schemeClr val="hlink"/>
+                </a:solidFill>
+                <a:hlinkClick r:id="rId6"/>
+              </a:rPr>
+              <a:t>https://dirkriehle.com</a:t>
+            </a:r>
+            <a:r>
+              <a:rPr lang="en" sz="2400"/>
+              <a:t> – </a:t>
+            </a:r>
+            <a:r>
+              <a:rPr lang="en" sz="2400" u="sng">
+                <a:solidFill>
+                  <a:schemeClr val="hlink"/>
+                </a:solidFill>
+                <a:hlinkClick r:id="rId7"/>
+              </a:rPr>
+              <a:t>@dirkriehle</a:t>
+            </a:r>
+            <a:endParaRPr sz="2400"/>
+          </a:p>
+        </p:txBody>
+      </p:sp>
+    </p:spTree>
+  </p:cSld>
+  <p:clrMapOvr>
+    <a:masterClrMapping/>
+  </p:clrMapOvr>
+</p:sld>
+</file>
+
+<file path=ppt/slides/slide22.xml><?xml version="1.0" encoding="utf-8"?>
+<p:sld xmlns:a="http://schemas.openxmlformats.org/drawingml/2006/main" xmlns:r="http://schemas.openxmlformats.org/officeDocument/2006/relationships" xmlns:mc="http://schemas.openxmlformats.org/markup-compatibility/2006" xmlns:mv="urn:schemas-microsoft-com:mac:vml" xmlns:p="http://schemas.openxmlformats.org/presentationml/2006/main" xmlns:c="http://schemas.openxmlformats.org/drawingml/2006/chart" xmlns:dgm="http://schemas.openxmlformats.org/drawingml/2006/diagram" xmlns:o="urn:schemas-microsoft-com:office:office" xmlns:v="urn:schemas-microsoft-com:vml" xmlns:pvml="urn:schemas-microsoft-com:office:powerpoint" xmlns:com="http://schemas.openxmlformats.org/drawingml/2006/compatibility" xmlns:p14="http://schemas.microsoft.com/office/powerpoint/2010/main" xmlns:p15="http://schemas.microsoft.com/office/powerpoint/2012/main" xmlns:ahyp="http://schemas.microsoft.com/office/drawing/2018/hyperlinkcolor">
+  <p:cSld>
+    <p:spTree>
+      <p:nvGrpSpPr>
+        <p:cNvPr id="183" name="Shape 183"/>
+        <p:cNvGrpSpPr/>
+        <p:nvPr/>
+      </p:nvGrpSpPr>
+      <p:grpSpPr>
+        <a:xfrm>
+          <a:off x="0" y="0"/>
+          <a:ext cx="0" cy="0"/>
+          <a:chOff x="0" y="0"/>
+          <a:chExt cx="0" cy="0"/>
+        </a:xfrm>
+      </p:grpSpPr>
+      <p:sp>
+        <p:nvSpPr>
+          <p:cNvPr id="184" name="Google Shape;184;p29"/>
+          <p:cNvSpPr txBox="1"/>
+          <p:nvPr>
+            <p:ph type="title"/>
+          </p:nvPr>
+        </p:nvSpPr>
+        <p:spPr>
+          <a:xfrm>
+            <a:off x="0" y="0"/>
+            <a:ext cx="9144000" cy="685800"/>
+          </a:xfrm>
+          <a:prstGeom prst="rect">
+            <a:avLst/>
+          </a:prstGeom>
+        </p:spPr>
+        <p:txBody>
+          <a:bodyPr anchorCtr="0" anchor="ctr" bIns="91425" lIns="274300" spcFirstLastPara="1" rIns="91425" wrap="square" tIns="91425">
+            <a:noAutofit/>
+          </a:bodyPr>
+          <a:lstStyle/>
+          <a:p>
+            <a:pPr indent="0" lvl="0" marL="0" rtl="0" algn="l">
+              <a:spcBef>
+                <a:spcPts val="0"/>
+              </a:spcBef>
+              <a:spcAft>
+                <a:spcPts val="0"/>
+              </a:spcAft>
+              <a:buNone/>
+            </a:pPr>
+            <a:r>
+              <a:rPr lang="en"/>
+              <a:t>Legal Notices</a:t>
+            </a:r>
+            <a:endParaRPr/>
+          </a:p>
+        </p:txBody>
+      </p:sp>
+      <p:sp>
+        <p:nvSpPr>
+          <p:cNvPr id="185" name="Google Shape;185;p29"/>
+          <p:cNvSpPr txBox="1"/>
+          <p:nvPr>
+            <p:ph idx="12" type="sldNum"/>
+          </p:nvPr>
+        </p:nvSpPr>
+        <p:spPr>
+          <a:xfrm>
+            <a:off x="7315202" y="4416550"/>
+            <a:ext cx="1828800" cy="731400"/>
+          </a:xfrm>
+          <a:prstGeom prst="rect">
+            <a:avLst/>
+          </a:prstGeom>
+        </p:spPr>
+        <p:txBody>
+          <a:bodyPr anchorCtr="0" anchor="b" bIns="91425" lIns="91425" spcFirstLastPara="1" rIns="91425" wrap="square" tIns="91425">
+            <a:noAutofit/>
+          </a:bodyPr>
+          <a:lstStyle/>
+          <a:p>
+            <a:pPr indent="0" lvl="0" marL="0" rtl="0" algn="r">
+              <a:spcBef>
+                <a:spcPts val="0"/>
+              </a:spcBef>
+              <a:spcAft>
+                <a:spcPts val="0"/>
+              </a:spcAft>
+              <a:buNone/>
+            </a:pPr>
+            <a:fld id="{00000000-1234-1234-1234-123412341234}" type="slidenum">
+              <a:rPr lang="en"/>
+              <a:t>‹#›</a:t>
+            </a:fld>
+            <a:endParaRPr/>
+          </a:p>
+          <a:p>
+            <a:pPr indent="0" lvl="0" marL="0" rtl="0" algn="r">
+              <a:spcBef>
+                <a:spcPts val="0"/>
+              </a:spcBef>
+              <a:spcAft>
+                <a:spcPts val="0"/>
+              </a:spcAft>
+              <a:buNone/>
+            </a:pPr>
+            <a:r>
+              <a:rPr b="0" lang="en" sz="900" u="sng">
+                <a:solidFill>
+                  <a:schemeClr val="hlink"/>
+                </a:solidFill>
+                <a:hlinkClick r:id="rId3"/>
+              </a:rPr>
+              <a:t>https://profriehle.com</a:t>
+            </a:r>
+            <a:r>
+              <a:rPr b="0" lang="en" sz="900"/>
+              <a:t> </a:t>
+            </a:r>
+            <a:endParaRPr b="0" sz="900"/>
+          </a:p>
+        </p:txBody>
+      </p:sp>
+      <p:sp>
+        <p:nvSpPr>
+          <p:cNvPr id="186" name="Google Shape;186;p29"/>
           <p:cNvSpPr txBox="1"/>
           <p:nvPr>
             <p:ph idx="1" type="body"/>
@@ -12884,37 +13655,9 @@
           </a:p>
         </p:txBody>
       </p:sp>
-      <p:pic>
-        <p:nvPicPr>
-          <p:cNvPr id="84" name="Google Shape;84;p15"/>
-          <p:cNvPicPr preferRelativeResize="0"/>
-          <p:nvPr/>
-        </p:nvPicPr>
-        <p:blipFill>
-          <a:blip r:embed="rId3">
-            <a:alphaModFix/>
-          </a:blip>
-          <a:stretch>
-            <a:fillRect/>
-          </a:stretch>
-        </p:blipFill>
-        <p:spPr>
-          <a:xfrm>
-            <a:off x="274320" y="914400"/>
-            <a:ext cx="8595361" cy="3648253"/>
-          </a:xfrm>
-          <a:prstGeom prst="rect">
-            <a:avLst/>
-          </a:prstGeom>
-          <a:noFill/>
-          <a:ln>
-            <a:noFill/>
-          </a:ln>
-        </p:spPr>
-      </p:pic>
       <p:sp>
         <p:nvSpPr>
-          <p:cNvPr id="85" name="Google Shape;85;p15"/>
+          <p:cNvPr id="84" name="Google Shape;84;p15"/>
           <p:cNvSpPr txBox="1"/>
           <p:nvPr>
             <p:ph idx="12" type="sldNum"/>
@@ -12965,7 +13708,7 @@
                 <a:solidFill>
                   <a:schemeClr val="hlink"/>
                 </a:solidFill>
-                <a:hlinkClick r:id="rId4"/>
+                <a:hlinkClick r:id="rId3"/>
               </a:rPr>
               <a:t>https://profriehle.com</a:t>
             </a:r>
@@ -12981,6 +13724,34 @@
           </a:p>
         </p:txBody>
       </p:sp>
+      <p:pic>
+        <p:nvPicPr>
+          <p:cNvPr id="85" name="Google Shape;85;p15"/>
+          <p:cNvPicPr preferRelativeResize="0"/>
+          <p:nvPr/>
+        </p:nvPicPr>
+        <p:blipFill>
+          <a:blip r:embed="rId4">
+            <a:alphaModFix/>
+          </a:blip>
+          <a:stretch>
+            <a:fillRect/>
+          </a:stretch>
+        </p:blipFill>
+        <p:spPr>
+          <a:xfrm>
+            <a:off x="274320" y="914400"/>
+            <a:ext cx="8595359" cy="3629153"/>
+          </a:xfrm>
+          <a:prstGeom prst="rect">
+            <a:avLst/>
+          </a:prstGeom>
+          <a:noFill/>
+          <a:ln>
+            <a:noFill/>
+          </a:ln>
+        </p:spPr>
+      </p:pic>
     </p:spTree>
   </p:cSld>
   <p:clrMapOvr>
@@ -13061,7 +13832,7 @@
             <a:tbl>
               <a:tblPr>
                 <a:noFill/>
-                <a:tableStyleId>{1FF0F3D3-011E-41AD-9BD2-7C33C474695F}</a:tableStyleId>
+                <a:tableStyleId>{2256ADF0-E40C-4D1B-8BA8-D882754ACB65}</a:tableStyleId>
               </a:tblPr>
               <a:tblGrid>
                 <a:gridCol w="1314450"/>

</xml_diff>

<commit_message>
Finished lecture B04 on agile planning
</commit_message>
<xml_diff>
--- a/Lecture slides/AMOS A01 - Introduction.pptx
+++ b/Lecture slides/AMOS A01 - Introduction.pptx
@@ -6385,7 +6385,7 @@
             <a:tbl>
               <a:tblPr>
                 <a:noFill/>
-                <a:tableStyleId>{2256ADF0-E40C-4D1B-8BA8-D882754ACB65}</a:tableStyleId>
+                <a:tableStyleId>{61107095-8C8A-4676-AFC7-264FA7A97043}</a:tableStyleId>
               </a:tblPr>
               <a:tblGrid>
                 <a:gridCol w="1314475"/>
@@ -13832,7 +13832,7 @@
             <a:tbl>
               <a:tblPr>
                 <a:noFill/>
-                <a:tableStyleId>{2256ADF0-E40C-4D1B-8BA8-D882754ACB65}</a:tableStyleId>
+                <a:tableStyleId>{61107095-8C8A-4676-AFC7-264FA7A97043}</a:tableStyleId>
               </a:tblPr>
               <a:tblGrid>
                 <a:gridCol w="1314450"/>

</xml_diff>

<commit_message>
Final slide release for summer semester 2023.
</commit_message>
<xml_diff>
--- a/Lecture slides/AMOS A01 - Introduction.pptx
+++ b/Lecture slides/AMOS A01 - Introduction.pptx
@@ -6385,7 +6385,7 @@
             <a:tbl>
               <a:tblPr>
                 <a:noFill/>
-                <a:tableStyleId>{61107095-8C8A-4676-AFC7-264FA7A97043}</a:tableStyleId>
+                <a:tableStyleId>{FBA23C03-D307-4A0D-BA41-A0E6DD65F436}</a:tableStyleId>
               </a:tblPr>
               <a:tblGrid>
                 <a:gridCol w="1314475"/>
@@ -13832,7 +13832,7 @@
             <a:tbl>
               <a:tblPr>
                 <a:noFill/>
-                <a:tableStyleId>{61107095-8C8A-4676-AFC7-264FA7A97043}</a:tableStyleId>
+                <a:tableStyleId>{FBA23C03-D307-4A0D-BA41-A0E6DD65F436}</a:tableStyleId>
               </a:tblPr>
               <a:tblGrid>
                 <a:gridCol w="1314450"/>
@@ -15915,6 +15915,285 @@
 </file>
 
 <file path=ppt/theme/theme1.xml><?xml version="1.0" encoding="utf-8"?>
+<a:theme xmlns:a="http://schemas.openxmlformats.org/drawingml/2006/main" xmlns:r="http://schemas.openxmlformats.org/officeDocument/2006/relationships" name="AMOS Slides Template">
+  <a:themeElements>
+    <a:clrScheme name="Simple Light">
+      <a:dk1>
+        <a:srgbClr val="000000"/>
+      </a:dk1>
+      <a:lt1>
+        <a:srgbClr val="FFFFFF"/>
+      </a:lt1>
+      <a:dk2>
+        <a:srgbClr val="404040"/>
+      </a:dk2>
+      <a:lt2>
+        <a:srgbClr val="808080"/>
+      </a:lt2>
+      <a:accent1>
+        <a:srgbClr val="D0D0D0"/>
+      </a:accent1>
+      <a:accent2>
+        <a:srgbClr val="4169E1"/>
+      </a:accent2>
+      <a:accent3>
+        <a:srgbClr val="D50D01"/>
+      </a:accent3>
+      <a:accent4>
+        <a:srgbClr val="FEB612"/>
+      </a:accent4>
+      <a:accent5>
+        <a:srgbClr val="4CAF50"/>
+      </a:accent5>
+      <a:accent6>
+        <a:srgbClr val="8E44AD"/>
+      </a:accent6>
+      <a:hlink>
+        <a:srgbClr val="34A3C5"/>
+      </a:hlink>
+      <a:folHlink>
+        <a:srgbClr val="0097A7"/>
+      </a:folHlink>
+    </a:clrScheme>
+    <a:fontScheme name="Office">
+      <a:majorFont>
+        <a:latin typeface="Arial"/>
+        <a:ea typeface=""/>
+        <a:cs typeface=""/>
+        <a:font script="Jpan" typeface="ＭＳ Ｐゴシック"/>
+        <a:font script="Hang" typeface="맑은 고딕"/>
+        <a:font script="Hans" typeface="宋体"/>
+        <a:font script="Hant" typeface="新細明體"/>
+        <a:font script="Arab" typeface="Times New Roman"/>
+        <a:font script="Hebr" typeface="Times New Roman"/>
+        <a:font script="Thai" typeface="Angsana New"/>
+        <a:font script="Ethi" typeface="Nyala"/>
+        <a:font script="Beng" typeface="Vrinda"/>
+        <a:font script="Gujr" typeface="Shruti"/>
+        <a:font script="Khmr" typeface="MoolBoran"/>
+        <a:font script="Knda" typeface="Tunga"/>
+        <a:font script="Guru" typeface="Raavi"/>
+        <a:font script="Cans" typeface="Euphemia"/>
+        <a:font script="Cher" typeface="Plantagenet Cherokee"/>
+        <a:font script="Yiii" typeface="Microsoft Yi Baiti"/>
+        <a:font script="Tibt" typeface="Microsoft Himalaya"/>
+        <a:font script="Thaa" typeface="MV Boli"/>
+        <a:font script="Deva" typeface="Mangal"/>
+        <a:font script="Telu" typeface="Gautami"/>
+        <a:font script="Taml" typeface="Latha"/>
+        <a:font script="Syrc" typeface="Estrangelo Edessa"/>
+        <a:font script="Orya" typeface="Kalinga"/>
+        <a:font script="Mlym" typeface="Kartika"/>
+        <a:font script="Laoo" typeface="DokChampa"/>
+        <a:font script="Sinh" typeface="Iskoola Pota"/>
+        <a:font script="Mong" typeface="Mongolian Baiti"/>
+        <a:font script="Viet" typeface="Times New Roman"/>
+        <a:font script="Uigh" typeface="Microsoft Uighur"/>
+        <a:font script="Geor" typeface="Sylfaen"/>
+      </a:majorFont>
+      <a:minorFont>
+        <a:latin typeface="Arial"/>
+        <a:ea typeface=""/>
+        <a:cs typeface=""/>
+        <a:font script="Jpan" typeface="ＭＳ Ｐゴシック"/>
+        <a:font script="Hang" typeface="맑은 고딕"/>
+        <a:font script="Hans" typeface="宋体"/>
+        <a:font script="Hant" typeface="新細明體"/>
+        <a:font script="Arab" typeface="Arial"/>
+        <a:font script="Hebr" typeface="Arial"/>
+        <a:font script="Thai" typeface="Cordia New"/>
+        <a:font script="Ethi" typeface="Nyala"/>
+        <a:font script="Beng" typeface="Vrinda"/>
+        <a:font script="Gujr" typeface="Shruti"/>
+        <a:font script="Khmr" typeface="DaunPenh"/>
+        <a:font script="Knda" typeface="Tunga"/>
+        <a:font script="Guru" typeface="Raavi"/>
+        <a:font script="Cans" typeface="Euphemia"/>
+        <a:font script="Cher" typeface="Plantagenet Cherokee"/>
+        <a:font script="Yiii" typeface="Microsoft Yi Baiti"/>
+        <a:font script="Tibt" typeface="Microsoft Himalaya"/>
+        <a:font script="Thaa" typeface="MV Boli"/>
+        <a:font script="Deva" typeface="Mangal"/>
+        <a:font script="Telu" typeface="Gautami"/>
+        <a:font script="Taml" typeface="Latha"/>
+        <a:font script="Syrc" typeface="Estrangelo Edessa"/>
+        <a:font script="Orya" typeface="Kalinga"/>
+        <a:font script="Mlym" typeface="Kartika"/>
+        <a:font script="Laoo" typeface="DokChampa"/>
+        <a:font script="Sinh" typeface="Iskoola Pota"/>
+        <a:font script="Mong" typeface="Mongolian Baiti"/>
+        <a:font script="Viet" typeface="Arial"/>
+        <a:font script="Uigh" typeface="Microsoft Uighur"/>
+        <a:font script="Geor" typeface="Sylfaen"/>
+      </a:minorFont>
+    </a:fontScheme>
+    <a:fmtScheme name="Office">
+      <a:fillStyleLst>
+        <a:solidFill>
+          <a:schemeClr val="phClr"/>
+        </a:solidFill>
+        <a:gradFill rotWithShape="1">
+          <a:gsLst>
+            <a:gs pos="0">
+              <a:schemeClr val="phClr">
+                <a:tint val="50000"/>
+                <a:satMod val="300000"/>
+              </a:schemeClr>
+            </a:gs>
+            <a:gs pos="35000">
+              <a:schemeClr val="phClr">
+                <a:tint val="37000"/>
+                <a:satMod val="300000"/>
+              </a:schemeClr>
+            </a:gs>
+            <a:gs pos="100000">
+              <a:schemeClr val="phClr">
+                <a:tint val="15000"/>
+                <a:satMod val="350000"/>
+              </a:schemeClr>
+            </a:gs>
+          </a:gsLst>
+          <a:lin ang="16200000" scaled="1"/>
+        </a:gradFill>
+        <a:gradFill rotWithShape="1">
+          <a:gsLst>
+            <a:gs pos="0">
+              <a:schemeClr val="phClr">
+                <a:tint val="100000"/>
+                <a:shade val="100000"/>
+                <a:satMod val="130000"/>
+              </a:schemeClr>
+            </a:gs>
+            <a:gs pos="100000">
+              <a:schemeClr val="phClr">
+                <a:tint val="50000"/>
+                <a:shade val="100000"/>
+                <a:satMod val="350000"/>
+              </a:schemeClr>
+            </a:gs>
+          </a:gsLst>
+          <a:lin ang="16200000" scaled="0"/>
+        </a:gradFill>
+      </a:fillStyleLst>
+      <a:lnStyleLst>
+        <a:ln w="9525" cap="flat" cmpd="sng" algn="ctr">
+          <a:solidFill>
+            <a:schemeClr val="phClr">
+              <a:shade val="95000"/>
+              <a:satMod val="105000"/>
+            </a:schemeClr>
+          </a:solidFill>
+          <a:prstDash val="solid"/>
+        </a:ln>
+        <a:ln w="25400" cap="flat" cmpd="sng" algn="ctr">
+          <a:solidFill>
+            <a:schemeClr val="phClr"/>
+          </a:solidFill>
+          <a:prstDash val="solid"/>
+        </a:ln>
+        <a:ln w="38100" cap="flat" cmpd="sng" algn="ctr">
+          <a:solidFill>
+            <a:schemeClr val="phClr"/>
+          </a:solidFill>
+          <a:prstDash val="solid"/>
+        </a:ln>
+      </a:lnStyleLst>
+      <a:effectStyleLst>
+        <a:effectStyle>
+          <a:effectLst>
+            <a:outerShdw blurRad="40000" dist="20000" dir="5400000" rotWithShape="0">
+              <a:srgbClr val="000000">
+                <a:alpha val="38000"/>
+              </a:srgbClr>
+            </a:outerShdw>
+          </a:effectLst>
+        </a:effectStyle>
+        <a:effectStyle>
+          <a:effectLst>
+            <a:outerShdw blurRad="40000" dist="23000" dir="5400000" rotWithShape="0">
+              <a:srgbClr val="000000">
+                <a:alpha val="35000"/>
+              </a:srgbClr>
+            </a:outerShdw>
+          </a:effectLst>
+        </a:effectStyle>
+        <a:effectStyle>
+          <a:effectLst>
+            <a:outerShdw blurRad="40000" dist="23000" dir="5400000" rotWithShape="0">
+              <a:srgbClr val="000000">
+                <a:alpha val="35000"/>
+              </a:srgbClr>
+            </a:outerShdw>
+          </a:effectLst>
+          <a:scene3d>
+            <a:camera prst="orthographicFront">
+              <a:rot lat="0" lon="0" rev="0"/>
+            </a:camera>
+            <a:lightRig rig="threePt" dir="t">
+              <a:rot lat="0" lon="0" rev="1200000"/>
+            </a:lightRig>
+          </a:scene3d>
+          <a:sp3d>
+            <a:bevelT w="63500" h="25400"/>
+          </a:sp3d>
+        </a:effectStyle>
+      </a:effectStyleLst>
+      <a:bgFillStyleLst>
+        <a:solidFill>
+          <a:schemeClr val="phClr"/>
+        </a:solidFill>
+        <a:gradFill rotWithShape="1">
+          <a:gsLst>
+            <a:gs pos="0">
+              <a:schemeClr val="phClr">
+                <a:tint val="40000"/>
+                <a:satMod val="350000"/>
+              </a:schemeClr>
+            </a:gs>
+            <a:gs pos="40000">
+              <a:schemeClr val="phClr">
+                <a:tint val="45000"/>
+                <a:shade val="99000"/>
+                <a:satMod val="350000"/>
+              </a:schemeClr>
+            </a:gs>
+            <a:gs pos="100000">
+              <a:schemeClr val="phClr">
+                <a:shade val="20000"/>
+                <a:satMod val="255000"/>
+              </a:schemeClr>
+            </a:gs>
+          </a:gsLst>
+          <a:path path="circle">
+            <a:fillToRect l="50000" t="-80000" r="50000" b="180000"/>
+          </a:path>
+        </a:gradFill>
+        <a:gradFill rotWithShape="1">
+          <a:gsLst>
+            <a:gs pos="0">
+              <a:schemeClr val="phClr">
+                <a:tint val="80000"/>
+                <a:satMod val="300000"/>
+              </a:schemeClr>
+            </a:gs>
+            <a:gs pos="100000">
+              <a:schemeClr val="phClr">
+                <a:shade val="30000"/>
+                <a:satMod val="200000"/>
+              </a:schemeClr>
+            </a:gs>
+          </a:gsLst>
+          <a:path path="circle">
+            <a:fillToRect l="50000" t="50000" r="50000" b="50000"/>
+          </a:path>
+        </a:gradFill>
+      </a:bgFillStyleLst>
+    </a:fmtScheme>
+  </a:themeElements>
+</a:theme>
+</file>
+
+<file path=ppt/theme/theme2.xml><?xml version="1.0" encoding="utf-8"?>
 <a:theme xmlns:a="http://schemas.openxmlformats.org/drawingml/2006/main" xmlns:r="http://schemas.openxmlformats.org/officeDocument/2006/relationships">
   <a:themeElements>
     <a:clrScheme name="Default">
@@ -16191,283 +16470,4 @@
     </a:fmtScheme>
   </a:themeElements>
 </a:theme>
-</file>
-
-<file path=ppt/theme/theme2.xml><?xml version="1.0" encoding="utf-8"?>
-<a:theme xmlns:a="http://schemas.openxmlformats.org/drawingml/2006/main" xmlns:r="http://schemas.openxmlformats.org/officeDocument/2006/relationships" name="AMOS Slides Template">
-  <a:themeElements>
-    <a:clrScheme name="Simple Light">
-      <a:dk1>
-        <a:srgbClr val="000000"/>
-      </a:dk1>
-      <a:lt1>
-        <a:srgbClr val="FFFFFF"/>
-      </a:lt1>
-      <a:dk2>
-        <a:srgbClr val="404040"/>
-      </a:dk2>
-      <a:lt2>
-        <a:srgbClr val="808080"/>
-      </a:lt2>
-      <a:accent1>
-        <a:srgbClr val="D0D0D0"/>
-      </a:accent1>
-      <a:accent2>
-        <a:srgbClr val="4169E1"/>
-      </a:accent2>
-      <a:accent3>
-        <a:srgbClr val="D50D01"/>
-      </a:accent3>
-      <a:accent4>
-        <a:srgbClr val="FEB612"/>
-      </a:accent4>
-      <a:accent5>
-        <a:srgbClr val="4CAF50"/>
-      </a:accent5>
-      <a:accent6>
-        <a:srgbClr val="8E44AD"/>
-      </a:accent6>
-      <a:hlink>
-        <a:srgbClr val="34A3C5"/>
-      </a:hlink>
-      <a:folHlink>
-        <a:srgbClr val="0097A7"/>
-      </a:folHlink>
-    </a:clrScheme>
-    <a:fontScheme name="Office">
-      <a:majorFont>
-        <a:latin typeface="Arial"/>
-        <a:ea typeface=""/>
-        <a:cs typeface=""/>
-        <a:font script="Jpan" typeface="ＭＳ Ｐゴシック"/>
-        <a:font script="Hang" typeface="맑은 고딕"/>
-        <a:font script="Hans" typeface="宋体"/>
-        <a:font script="Hant" typeface="新細明體"/>
-        <a:font script="Arab" typeface="Times New Roman"/>
-        <a:font script="Hebr" typeface="Times New Roman"/>
-        <a:font script="Thai" typeface="Angsana New"/>
-        <a:font script="Ethi" typeface="Nyala"/>
-        <a:font script="Beng" typeface="Vrinda"/>
-        <a:font script="Gujr" typeface="Shruti"/>
-        <a:font script="Khmr" typeface="MoolBoran"/>
-        <a:font script="Knda" typeface="Tunga"/>
-        <a:font script="Guru" typeface="Raavi"/>
-        <a:font script="Cans" typeface="Euphemia"/>
-        <a:font script="Cher" typeface="Plantagenet Cherokee"/>
-        <a:font script="Yiii" typeface="Microsoft Yi Baiti"/>
-        <a:font script="Tibt" typeface="Microsoft Himalaya"/>
-        <a:font script="Thaa" typeface="MV Boli"/>
-        <a:font script="Deva" typeface="Mangal"/>
-        <a:font script="Telu" typeface="Gautami"/>
-        <a:font script="Taml" typeface="Latha"/>
-        <a:font script="Syrc" typeface="Estrangelo Edessa"/>
-        <a:font script="Orya" typeface="Kalinga"/>
-        <a:font script="Mlym" typeface="Kartika"/>
-        <a:font script="Laoo" typeface="DokChampa"/>
-        <a:font script="Sinh" typeface="Iskoola Pota"/>
-        <a:font script="Mong" typeface="Mongolian Baiti"/>
-        <a:font script="Viet" typeface="Times New Roman"/>
-        <a:font script="Uigh" typeface="Microsoft Uighur"/>
-        <a:font script="Geor" typeface="Sylfaen"/>
-      </a:majorFont>
-      <a:minorFont>
-        <a:latin typeface="Arial"/>
-        <a:ea typeface=""/>
-        <a:cs typeface=""/>
-        <a:font script="Jpan" typeface="ＭＳ Ｐゴシック"/>
-        <a:font script="Hang" typeface="맑은 고딕"/>
-        <a:font script="Hans" typeface="宋体"/>
-        <a:font script="Hant" typeface="新細明體"/>
-        <a:font script="Arab" typeface="Arial"/>
-        <a:font script="Hebr" typeface="Arial"/>
-        <a:font script="Thai" typeface="Cordia New"/>
-        <a:font script="Ethi" typeface="Nyala"/>
-        <a:font script="Beng" typeface="Vrinda"/>
-        <a:font script="Gujr" typeface="Shruti"/>
-        <a:font script="Khmr" typeface="DaunPenh"/>
-        <a:font script="Knda" typeface="Tunga"/>
-        <a:font script="Guru" typeface="Raavi"/>
-        <a:font script="Cans" typeface="Euphemia"/>
-        <a:font script="Cher" typeface="Plantagenet Cherokee"/>
-        <a:font script="Yiii" typeface="Microsoft Yi Baiti"/>
-        <a:font script="Tibt" typeface="Microsoft Himalaya"/>
-        <a:font script="Thaa" typeface="MV Boli"/>
-        <a:font script="Deva" typeface="Mangal"/>
-        <a:font script="Telu" typeface="Gautami"/>
-        <a:font script="Taml" typeface="Latha"/>
-        <a:font script="Syrc" typeface="Estrangelo Edessa"/>
-        <a:font script="Orya" typeface="Kalinga"/>
-        <a:font script="Mlym" typeface="Kartika"/>
-        <a:font script="Laoo" typeface="DokChampa"/>
-        <a:font script="Sinh" typeface="Iskoola Pota"/>
-        <a:font script="Mong" typeface="Mongolian Baiti"/>
-        <a:font script="Viet" typeface="Arial"/>
-        <a:font script="Uigh" typeface="Microsoft Uighur"/>
-        <a:font script="Geor" typeface="Sylfaen"/>
-      </a:minorFont>
-    </a:fontScheme>
-    <a:fmtScheme name="Office">
-      <a:fillStyleLst>
-        <a:solidFill>
-          <a:schemeClr val="phClr"/>
-        </a:solidFill>
-        <a:gradFill rotWithShape="1">
-          <a:gsLst>
-            <a:gs pos="0">
-              <a:schemeClr val="phClr">
-                <a:tint val="50000"/>
-                <a:satMod val="300000"/>
-              </a:schemeClr>
-            </a:gs>
-            <a:gs pos="35000">
-              <a:schemeClr val="phClr">
-                <a:tint val="37000"/>
-                <a:satMod val="300000"/>
-              </a:schemeClr>
-            </a:gs>
-            <a:gs pos="100000">
-              <a:schemeClr val="phClr">
-                <a:tint val="15000"/>
-                <a:satMod val="350000"/>
-              </a:schemeClr>
-            </a:gs>
-          </a:gsLst>
-          <a:lin ang="16200000" scaled="1"/>
-        </a:gradFill>
-        <a:gradFill rotWithShape="1">
-          <a:gsLst>
-            <a:gs pos="0">
-              <a:schemeClr val="phClr">
-                <a:tint val="100000"/>
-                <a:shade val="100000"/>
-                <a:satMod val="130000"/>
-              </a:schemeClr>
-            </a:gs>
-            <a:gs pos="100000">
-              <a:schemeClr val="phClr">
-                <a:tint val="50000"/>
-                <a:shade val="100000"/>
-                <a:satMod val="350000"/>
-              </a:schemeClr>
-            </a:gs>
-          </a:gsLst>
-          <a:lin ang="16200000" scaled="0"/>
-        </a:gradFill>
-      </a:fillStyleLst>
-      <a:lnStyleLst>
-        <a:ln w="9525" cap="flat" cmpd="sng" algn="ctr">
-          <a:solidFill>
-            <a:schemeClr val="phClr">
-              <a:shade val="95000"/>
-              <a:satMod val="105000"/>
-            </a:schemeClr>
-          </a:solidFill>
-          <a:prstDash val="solid"/>
-        </a:ln>
-        <a:ln w="25400" cap="flat" cmpd="sng" algn="ctr">
-          <a:solidFill>
-            <a:schemeClr val="phClr"/>
-          </a:solidFill>
-          <a:prstDash val="solid"/>
-        </a:ln>
-        <a:ln w="38100" cap="flat" cmpd="sng" algn="ctr">
-          <a:solidFill>
-            <a:schemeClr val="phClr"/>
-          </a:solidFill>
-          <a:prstDash val="solid"/>
-        </a:ln>
-      </a:lnStyleLst>
-      <a:effectStyleLst>
-        <a:effectStyle>
-          <a:effectLst>
-            <a:outerShdw blurRad="40000" dist="20000" dir="5400000" rotWithShape="0">
-              <a:srgbClr val="000000">
-                <a:alpha val="38000"/>
-              </a:srgbClr>
-            </a:outerShdw>
-          </a:effectLst>
-        </a:effectStyle>
-        <a:effectStyle>
-          <a:effectLst>
-            <a:outerShdw blurRad="40000" dist="23000" dir="5400000" rotWithShape="0">
-              <a:srgbClr val="000000">
-                <a:alpha val="35000"/>
-              </a:srgbClr>
-            </a:outerShdw>
-          </a:effectLst>
-        </a:effectStyle>
-        <a:effectStyle>
-          <a:effectLst>
-            <a:outerShdw blurRad="40000" dist="23000" dir="5400000" rotWithShape="0">
-              <a:srgbClr val="000000">
-                <a:alpha val="35000"/>
-              </a:srgbClr>
-            </a:outerShdw>
-          </a:effectLst>
-          <a:scene3d>
-            <a:camera prst="orthographicFront">
-              <a:rot lat="0" lon="0" rev="0"/>
-            </a:camera>
-            <a:lightRig rig="threePt" dir="t">
-              <a:rot lat="0" lon="0" rev="1200000"/>
-            </a:lightRig>
-          </a:scene3d>
-          <a:sp3d>
-            <a:bevelT w="63500" h="25400"/>
-          </a:sp3d>
-        </a:effectStyle>
-      </a:effectStyleLst>
-      <a:bgFillStyleLst>
-        <a:solidFill>
-          <a:schemeClr val="phClr"/>
-        </a:solidFill>
-        <a:gradFill rotWithShape="1">
-          <a:gsLst>
-            <a:gs pos="0">
-              <a:schemeClr val="phClr">
-                <a:tint val="40000"/>
-                <a:satMod val="350000"/>
-              </a:schemeClr>
-            </a:gs>
-            <a:gs pos="40000">
-              <a:schemeClr val="phClr">
-                <a:tint val="45000"/>
-                <a:shade val="99000"/>
-                <a:satMod val="350000"/>
-              </a:schemeClr>
-            </a:gs>
-            <a:gs pos="100000">
-              <a:schemeClr val="phClr">
-                <a:shade val="20000"/>
-                <a:satMod val="255000"/>
-              </a:schemeClr>
-            </a:gs>
-          </a:gsLst>
-          <a:path path="circle">
-            <a:fillToRect l="50000" t="-80000" r="50000" b="180000"/>
-          </a:path>
-        </a:gradFill>
-        <a:gradFill rotWithShape="1">
-          <a:gsLst>
-            <a:gs pos="0">
-              <a:schemeClr val="phClr">
-                <a:tint val="80000"/>
-                <a:satMod val="300000"/>
-              </a:schemeClr>
-            </a:gs>
-            <a:gs pos="100000">
-              <a:schemeClr val="phClr">
-                <a:shade val="30000"/>
-                <a:satMod val="200000"/>
-              </a:schemeClr>
-            </a:gs>
-          </a:gsLst>
-          <a:path path="circle">
-            <a:fillToRect l="50000" t="50000" r="50000" b="50000"/>
-          </a:path>
-        </a:gradFill>
-      </a:bgFillStyleLst>
-    </a:fmtScheme>
-  </a:themeElements>
-</a:theme>
 </file>
</xml_diff>

<commit_message>
Getting ready for winter 2023/24
</commit_message>
<xml_diff>
--- a/Lecture slides/AMOS A01 - Introduction.pptx
+++ b/Lecture slides/AMOS A01 - Introduction.pptx
@@ -30,6 +30,11 @@
     <p:sldId id="275" r:id="rId26"/>
     <p:sldId id="276" r:id="rId27"/>
     <p:sldId id="277" r:id="rId28"/>
+    <p:sldId id="278" r:id="rId29"/>
+    <p:sldId id="279" r:id="rId30"/>
+    <p:sldId id="280" r:id="rId31"/>
+    <p:sldId id="281" r:id="rId32"/>
+    <p:sldId id="282" r:id="rId33"/>
   </p:sldIdLst>
   <p:sldSz cy="5143500" cx="9144000"/>
   <p:notesSz cx="6858000" cy="9144000"/>
@@ -1023,7 +1028,7 @@
       </p:grpSpPr>
       <p:sp>
         <p:nvSpPr>
-          <p:cNvPr id="110" name="Google Shape;110;g23985d0d2d4_0_82:notes"/>
+          <p:cNvPr id="110" name="Google Shape;110;g25f23d62f94_0_3:notes"/>
           <p:cNvSpPr/>
           <p:nvPr>
             <p:ph idx="2" type="sldImg"/>
@@ -1058,7 +1063,7 @@
       </p:sp>
       <p:sp>
         <p:nvSpPr>
-          <p:cNvPr id="111" name="Google Shape;111;g23985d0d2d4_0_82:notes"/>
+          <p:cNvPr id="111" name="Google Shape;111;g25f23d62f94_0_3:notes"/>
           <p:cNvSpPr txBox="1"/>
           <p:nvPr>
             <p:ph idx="1" type="body"/>
@@ -1122,7 +1127,7 @@
       </p:grpSpPr>
       <p:sp>
         <p:nvSpPr>
-          <p:cNvPr id="117" name="Google Shape;117;g11ffc178508_0_0:notes"/>
+          <p:cNvPr id="117" name="Google Shape;117;g23985d0d2d4_0_82:notes"/>
           <p:cNvSpPr/>
           <p:nvPr>
             <p:ph idx="2" type="sldImg"/>
@@ -1157,7 +1162,7 @@
       </p:sp>
       <p:sp>
         <p:nvSpPr>
-          <p:cNvPr id="118" name="Google Shape;118;g11ffc178508_0_0:notes"/>
+          <p:cNvPr id="118" name="Google Shape;118;g23985d0d2d4_0_82:notes"/>
           <p:cNvSpPr txBox="1"/>
           <p:nvPr>
             <p:ph idx="1" type="body"/>
@@ -1221,7 +1226,7 @@
       </p:grpSpPr>
       <p:sp>
         <p:nvSpPr>
-          <p:cNvPr id="124" name="Google Shape;124;g23985d0d2d4_0_88:notes"/>
+          <p:cNvPr id="124" name="Google Shape;124;g25b0a64b870_0_0:notes"/>
           <p:cNvSpPr/>
           <p:nvPr>
             <p:ph idx="2" type="sldImg"/>
@@ -1256,7 +1261,7 @@
       </p:sp>
       <p:sp>
         <p:nvSpPr>
-          <p:cNvPr id="125" name="Google Shape;125;g23985d0d2d4_0_88:notes"/>
+          <p:cNvPr id="125" name="Google Shape;125;g25b0a64b870_0_0:notes"/>
           <p:cNvSpPr txBox="1"/>
           <p:nvPr>
             <p:ph idx="1" type="body"/>
@@ -1320,7 +1325,7 @@
       </p:grpSpPr>
       <p:sp>
         <p:nvSpPr>
-          <p:cNvPr id="131" name="Google Shape;131;g23985d0d2d4_0_94:notes"/>
+          <p:cNvPr id="131" name="Google Shape;131;g11ffc178508_0_0:notes"/>
           <p:cNvSpPr/>
           <p:nvPr>
             <p:ph idx="2" type="sldImg"/>
@@ -1355,7 +1360,7 @@
       </p:sp>
       <p:sp>
         <p:nvSpPr>
-          <p:cNvPr id="132" name="Google Shape;132;g23985d0d2d4_0_94:notes"/>
+          <p:cNvPr id="132" name="Google Shape;132;g11ffc178508_0_0:notes"/>
           <p:cNvSpPr txBox="1"/>
           <p:nvPr>
             <p:ph idx="1" type="body"/>
@@ -1419,7 +1424,7 @@
       </p:grpSpPr>
       <p:sp>
         <p:nvSpPr>
-          <p:cNvPr id="138" name="Google Shape;138;g23985d0d2d4_0_100:notes"/>
+          <p:cNvPr id="138" name="Google Shape;138;g25b0a64b870_0_7:notes"/>
           <p:cNvSpPr/>
           <p:nvPr>
             <p:ph idx="2" type="sldImg"/>
@@ -1454,7 +1459,7 @@
       </p:sp>
       <p:sp>
         <p:nvSpPr>
-          <p:cNvPr id="139" name="Google Shape;139;g23985d0d2d4_0_100:notes"/>
+          <p:cNvPr id="139" name="Google Shape;139;g25b0a64b870_0_7:notes"/>
           <p:cNvSpPr txBox="1"/>
           <p:nvPr>
             <p:ph idx="1" type="body"/>
@@ -1518,7 +1523,7 @@
       </p:grpSpPr>
       <p:sp>
         <p:nvSpPr>
-          <p:cNvPr id="146" name="Google Shape;146;g126320e9147_0_147:notes"/>
+          <p:cNvPr id="146" name="Google Shape;146;g260d82e8164_0_0:notes"/>
           <p:cNvSpPr/>
           <p:nvPr>
             <p:ph idx="2" type="sldImg"/>
@@ -1553,7 +1558,7 @@
       </p:sp>
       <p:sp>
         <p:nvSpPr>
-          <p:cNvPr id="147" name="Google Shape;147;g126320e9147_0_147:notes"/>
+          <p:cNvPr id="147" name="Google Shape;147;g260d82e8164_0_0:notes"/>
           <p:cNvSpPr txBox="1"/>
           <p:nvPr>
             <p:ph idx="1" type="body"/>
@@ -1603,7 +1608,7 @@
   <p:cSld>
     <p:spTree>
       <p:nvGrpSpPr>
-        <p:cNvPr id="153" name="Shape 153"/>
+        <p:cNvPr id="152" name="Shape 152"/>
         <p:cNvGrpSpPr/>
         <p:nvPr/>
       </p:nvGrpSpPr>
@@ -1617,7 +1622,7 @@
       </p:grpSpPr>
       <p:sp>
         <p:nvSpPr>
-          <p:cNvPr id="154" name="Google Shape;154;g126320e9147_0_94:notes"/>
+          <p:cNvPr id="153" name="Google Shape;153;g25f23d62f94_0_9:notes"/>
           <p:cNvSpPr/>
           <p:nvPr>
             <p:ph idx="2" type="sldImg"/>
@@ -1652,7 +1657,7 @@
       </p:sp>
       <p:sp>
         <p:nvSpPr>
-          <p:cNvPr id="155" name="Google Shape;155;g126320e9147_0_94:notes"/>
+          <p:cNvPr id="154" name="Google Shape;154;g25f23d62f94_0_9:notes"/>
           <p:cNvSpPr txBox="1"/>
           <p:nvPr>
             <p:ph idx="1" type="body"/>
@@ -1716,7 +1721,7 @@
       </p:grpSpPr>
       <p:sp>
         <p:nvSpPr>
-          <p:cNvPr id="161" name="Google Shape;161;g126320e9147_0_210:notes"/>
+          <p:cNvPr id="161" name="Google Shape;161;g23985d0d2d4_0_88:notes"/>
           <p:cNvSpPr/>
           <p:nvPr>
             <p:ph idx="2" type="sldImg"/>
@@ -1751,7 +1756,7 @@
       </p:sp>
       <p:sp>
         <p:nvSpPr>
-          <p:cNvPr id="162" name="Google Shape;162;g126320e9147_0_210:notes"/>
+          <p:cNvPr id="162" name="Google Shape;162;g23985d0d2d4_0_88:notes"/>
           <p:cNvSpPr txBox="1"/>
           <p:nvPr>
             <p:ph idx="1" type="body"/>
@@ -1914,7 +1919,7 @@
       </p:grpSpPr>
       <p:sp>
         <p:nvSpPr>
-          <p:cNvPr id="168" name="Google Shape;168;g126320e9147_0_223:notes"/>
+          <p:cNvPr id="168" name="Google Shape;168;g23985d0d2d4_0_94:notes"/>
           <p:cNvSpPr/>
           <p:nvPr>
             <p:ph idx="2" type="sldImg"/>
@@ -1949,7 +1954,7 @@
       </p:sp>
       <p:sp>
         <p:nvSpPr>
-          <p:cNvPr id="169" name="Google Shape;169;g126320e9147_0_223:notes"/>
+          <p:cNvPr id="169" name="Google Shape;169;g23985d0d2d4_0_94:notes"/>
           <p:cNvSpPr txBox="1"/>
           <p:nvPr>
             <p:ph idx="1" type="body"/>
@@ -2013,7 +2018,7 @@
       </p:grpSpPr>
       <p:sp>
         <p:nvSpPr>
-          <p:cNvPr id="175" name="Google Shape;175;g23985d0d2d4_0_38:notes"/>
+          <p:cNvPr id="175" name="Google Shape;175;g23985d0d2d4_0_100:notes"/>
           <p:cNvSpPr/>
           <p:nvPr>
             <p:ph idx="2" type="sldImg"/>
@@ -2048,7 +2053,7 @@
       </p:sp>
       <p:sp>
         <p:nvSpPr>
-          <p:cNvPr id="176" name="Google Shape;176;g23985d0d2d4_0_38:notes"/>
+          <p:cNvPr id="176" name="Google Shape;176;g23985d0d2d4_0_100:notes"/>
           <p:cNvSpPr txBox="1"/>
           <p:nvPr>
             <p:ph idx="1" type="body"/>
@@ -2098,7 +2103,7 @@
   <p:cSld>
     <p:spTree>
       <p:nvGrpSpPr>
-        <p:cNvPr id="180" name="Shape 180"/>
+        <p:cNvPr id="182" name="Shape 182"/>
         <p:cNvGrpSpPr/>
         <p:nvPr/>
       </p:nvGrpSpPr>
@@ -2112,7 +2117,7 @@
       </p:grpSpPr>
       <p:sp>
         <p:nvSpPr>
-          <p:cNvPr id="181" name="Google Shape;181;g23985d0d2d4_0_43:notes"/>
+          <p:cNvPr id="183" name="Google Shape;183;g126320e9147_0_147:notes"/>
           <p:cNvSpPr/>
           <p:nvPr>
             <p:ph idx="2" type="sldImg"/>
@@ -2147,7 +2152,502 @@
       </p:sp>
       <p:sp>
         <p:nvSpPr>
-          <p:cNvPr id="182" name="Google Shape;182;g23985d0d2d4_0_43:notes"/>
+          <p:cNvPr id="184" name="Google Shape;184;g126320e9147_0_147:notes"/>
+          <p:cNvSpPr txBox="1"/>
+          <p:nvPr>
+            <p:ph idx="1" type="body"/>
+          </p:nvPr>
+        </p:nvSpPr>
+        <p:spPr>
+          <a:xfrm>
+            <a:off x="685800" y="4343400"/>
+            <a:ext cx="5486400" cy="4114800"/>
+          </a:xfrm>
+          <a:prstGeom prst="rect">
+            <a:avLst/>
+          </a:prstGeom>
+        </p:spPr>
+        <p:txBody>
+          <a:bodyPr anchorCtr="0" anchor="t" bIns="91425" lIns="91425" spcFirstLastPara="1" rIns="91425" wrap="square" tIns="91425">
+            <a:noAutofit/>
+          </a:bodyPr>
+          <a:lstStyle/>
+          <a:p>
+            <a:pPr indent="0" lvl="0" marL="0" rtl="0" algn="l">
+              <a:spcBef>
+                <a:spcPts val="0"/>
+              </a:spcBef>
+              <a:spcAft>
+                <a:spcPts val="0"/>
+              </a:spcAft>
+              <a:buNone/>
+            </a:pPr>
+            <a:r>
+              <a:t/>
+            </a:r>
+            <a:endParaRPr/>
+          </a:p>
+        </p:txBody>
+      </p:sp>
+    </p:spTree>
+  </p:cSld>
+  <p:clrMapOvr>
+    <a:masterClrMapping/>
+  </p:clrMapOvr>
+</p:notes>
+</file>
+
+<file path=ppt/notesSlides/notesSlide23.xml><?xml version="1.0" encoding="utf-8"?>
+<p:notes xmlns:a="http://schemas.openxmlformats.org/drawingml/2006/main" xmlns:r="http://schemas.openxmlformats.org/officeDocument/2006/relationships" xmlns:mc="http://schemas.openxmlformats.org/markup-compatibility/2006" xmlns:mv="urn:schemas-microsoft-com:mac:vml" xmlns:p="http://schemas.openxmlformats.org/presentationml/2006/main" xmlns:c="http://schemas.openxmlformats.org/drawingml/2006/chart" xmlns:dgm="http://schemas.openxmlformats.org/drawingml/2006/diagram" xmlns:o="urn:schemas-microsoft-com:office:office" xmlns:v="urn:schemas-microsoft-com:vml" xmlns:pvml="urn:schemas-microsoft-com:office:powerpoint" xmlns:com="http://schemas.openxmlformats.org/drawingml/2006/compatibility" xmlns:p14="http://schemas.microsoft.com/office/powerpoint/2010/main" xmlns:p15="http://schemas.microsoft.com/office/powerpoint/2012/main" xmlns:ahyp="http://schemas.microsoft.com/office/drawing/2018/hyperlinkcolor" showMasterPhAnim="0" showMasterSp="0">
+  <p:cSld>
+    <p:spTree>
+      <p:nvGrpSpPr>
+        <p:cNvPr id="190" name="Shape 190"/>
+        <p:cNvGrpSpPr/>
+        <p:nvPr/>
+      </p:nvGrpSpPr>
+      <p:grpSpPr>
+        <a:xfrm>
+          <a:off x="0" y="0"/>
+          <a:ext cx="0" cy="0"/>
+          <a:chOff x="0" y="0"/>
+          <a:chExt cx="0" cy="0"/>
+        </a:xfrm>
+      </p:grpSpPr>
+      <p:sp>
+        <p:nvSpPr>
+          <p:cNvPr id="191" name="Google Shape;191;g126320e9147_0_94:notes"/>
+          <p:cNvSpPr/>
+          <p:nvPr>
+            <p:ph idx="2" type="sldImg"/>
+          </p:nvPr>
+        </p:nvSpPr>
+        <p:spPr>
+          <a:xfrm>
+            <a:off x="381300" y="685800"/>
+            <a:ext cx="6096000" cy="3429000"/>
+          </a:xfrm>
+          <a:custGeom>
+            <a:rect b="b" l="l" r="r" t="t"/>
+            <a:pathLst>
+              <a:path extrusionOk="0" h="120000" w="120000">
+                <a:moveTo>
+                  <a:pt x="0" y="0"/>
+                </a:moveTo>
+                <a:lnTo>
+                  <a:pt x="120000" y="0"/>
+                </a:lnTo>
+                <a:lnTo>
+                  <a:pt x="120000" y="120000"/>
+                </a:lnTo>
+                <a:lnTo>
+                  <a:pt x="0" y="120000"/>
+                </a:lnTo>
+                <a:close/>
+              </a:path>
+            </a:pathLst>
+          </a:custGeom>
+        </p:spPr>
+      </p:sp>
+      <p:sp>
+        <p:nvSpPr>
+          <p:cNvPr id="192" name="Google Shape;192;g126320e9147_0_94:notes"/>
+          <p:cNvSpPr txBox="1"/>
+          <p:nvPr>
+            <p:ph idx="1" type="body"/>
+          </p:nvPr>
+        </p:nvSpPr>
+        <p:spPr>
+          <a:xfrm>
+            <a:off x="685800" y="4343400"/>
+            <a:ext cx="5486400" cy="4114800"/>
+          </a:xfrm>
+          <a:prstGeom prst="rect">
+            <a:avLst/>
+          </a:prstGeom>
+        </p:spPr>
+        <p:txBody>
+          <a:bodyPr anchorCtr="0" anchor="t" bIns="91425" lIns="91425" spcFirstLastPara="1" rIns="91425" wrap="square" tIns="91425">
+            <a:noAutofit/>
+          </a:bodyPr>
+          <a:lstStyle/>
+          <a:p>
+            <a:pPr indent="0" lvl="0" marL="0" rtl="0" algn="l">
+              <a:spcBef>
+                <a:spcPts val="0"/>
+              </a:spcBef>
+              <a:spcAft>
+                <a:spcPts val="0"/>
+              </a:spcAft>
+              <a:buNone/>
+            </a:pPr>
+            <a:r>
+              <a:t/>
+            </a:r>
+            <a:endParaRPr/>
+          </a:p>
+        </p:txBody>
+      </p:sp>
+    </p:spTree>
+  </p:cSld>
+  <p:clrMapOvr>
+    <a:masterClrMapping/>
+  </p:clrMapOvr>
+</p:notes>
+</file>
+
+<file path=ppt/notesSlides/notesSlide24.xml><?xml version="1.0" encoding="utf-8"?>
+<p:notes xmlns:a="http://schemas.openxmlformats.org/drawingml/2006/main" xmlns:r="http://schemas.openxmlformats.org/officeDocument/2006/relationships" xmlns:mc="http://schemas.openxmlformats.org/markup-compatibility/2006" xmlns:mv="urn:schemas-microsoft-com:mac:vml" xmlns:p="http://schemas.openxmlformats.org/presentationml/2006/main" xmlns:c="http://schemas.openxmlformats.org/drawingml/2006/chart" xmlns:dgm="http://schemas.openxmlformats.org/drawingml/2006/diagram" xmlns:o="urn:schemas-microsoft-com:office:office" xmlns:v="urn:schemas-microsoft-com:vml" xmlns:pvml="urn:schemas-microsoft-com:office:powerpoint" xmlns:com="http://schemas.openxmlformats.org/drawingml/2006/compatibility" xmlns:p14="http://schemas.microsoft.com/office/powerpoint/2010/main" xmlns:p15="http://schemas.microsoft.com/office/powerpoint/2012/main" xmlns:ahyp="http://schemas.microsoft.com/office/drawing/2018/hyperlinkcolor" showMasterPhAnim="0" showMasterSp="0">
+  <p:cSld>
+    <p:spTree>
+      <p:nvGrpSpPr>
+        <p:cNvPr id="197" name="Shape 197"/>
+        <p:cNvGrpSpPr/>
+        <p:nvPr/>
+      </p:nvGrpSpPr>
+      <p:grpSpPr>
+        <a:xfrm>
+          <a:off x="0" y="0"/>
+          <a:ext cx="0" cy="0"/>
+          <a:chOff x="0" y="0"/>
+          <a:chExt cx="0" cy="0"/>
+        </a:xfrm>
+      </p:grpSpPr>
+      <p:sp>
+        <p:nvSpPr>
+          <p:cNvPr id="198" name="Google Shape;198;g126320e9147_0_210:notes"/>
+          <p:cNvSpPr/>
+          <p:nvPr>
+            <p:ph idx="2" type="sldImg"/>
+          </p:nvPr>
+        </p:nvSpPr>
+        <p:spPr>
+          <a:xfrm>
+            <a:off x="381300" y="685800"/>
+            <a:ext cx="6096000" cy="3429000"/>
+          </a:xfrm>
+          <a:custGeom>
+            <a:rect b="b" l="l" r="r" t="t"/>
+            <a:pathLst>
+              <a:path extrusionOk="0" h="120000" w="120000">
+                <a:moveTo>
+                  <a:pt x="0" y="0"/>
+                </a:moveTo>
+                <a:lnTo>
+                  <a:pt x="120000" y="0"/>
+                </a:lnTo>
+                <a:lnTo>
+                  <a:pt x="120000" y="120000"/>
+                </a:lnTo>
+                <a:lnTo>
+                  <a:pt x="0" y="120000"/>
+                </a:lnTo>
+                <a:close/>
+              </a:path>
+            </a:pathLst>
+          </a:custGeom>
+        </p:spPr>
+      </p:sp>
+      <p:sp>
+        <p:nvSpPr>
+          <p:cNvPr id="199" name="Google Shape;199;g126320e9147_0_210:notes"/>
+          <p:cNvSpPr txBox="1"/>
+          <p:nvPr>
+            <p:ph idx="1" type="body"/>
+          </p:nvPr>
+        </p:nvSpPr>
+        <p:spPr>
+          <a:xfrm>
+            <a:off x="685800" y="4343400"/>
+            <a:ext cx="5486400" cy="4114800"/>
+          </a:xfrm>
+          <a:prstGeom prst="rect">
+            <a:avLst/>
+          </a:prstGeom>
+        </p:spPr>
+        <p:txBody>
+          <a:bodyPr anchorCtr="0" anchor="t" bIns="91425" lIns="91425" spcFirstLastPara="1" rIns="91425" wrap="square" tIns="91425">
+            <a:noAutofit/>
+          </a:bodyPr>
+          <a:lstStyle/>
+          <a:p>
+            <a:pPr indent="0" lvl="0" marL="0" rtl="0" algn="l">
+              <a:spcBef>
+                <a:spcPts val="0"/>
+              </a:spcBef>
+              <a:spcAft>
+                <a:spcPts val="0"/>
+              </a:spcAft>
+              <a:buNone/>
+            </a:pPr>
+            <a:r>
+              <a:t/>
+            </a:r>
+            <a:endParaRPr/>
+          </a:p>
+        </p:txBody>
+      </p:sp>
+    </p:spTree>
+  </p:cSld>
+  <p:clrMapOvr>
+    <a:masterClrMapping/>
+  </p:clrMapOvr>
+</p:notes>
+</file>
+
+<file path=ppt/notesSlides/notesSlide25.xml><?xml version="1.0" encoding="utf-8"?>
+<p:notes xmlns:a="http://schemas.openxmlformats.org/drawingml/2006/main" xmlns:r="http://schemas.openxmlformats.org/officeDocument/2006/relationships" xmlns:mc="http://schemas.openxmlformats.org/markup-compatibility/2006" xmlns:mv="urn:schemas-microsoft-com:mac:vml" xmlns:p="http://schemas.openxmlformats.org/presentationml/2006/main" xmlns:c="http://schemas.openxmlformats.org/drawingml/2006/chart" xmlns:dgm="http://schemas.openxmlformats.org/drawingml/2006/diagram" xmlns:o="urn:schemas-microsoft-com:office:office" xmlns:v="urn:schemas-microsoft-com:vml" xmlns:pvml="urn:schemas-microsoft-com:office:powerpoint" xmlns:com="http://schemas.openxmlformats.org/drawingml/2006/compatibility" xmlns:p14="http://schemas.microsoft.com/office/powerpoint/2010/main" xmlns:p15="http://schemas.microsoft.com/office/powerpoint/2012/main" xmlns:ahyp="http://schemas.microsoft.com/office/drawing/2018/hyperlinkcolor" showMasterPhAnim="0" showMasterSp="0">
+  <p:cSld>
+    <p:spTree>
+      <p:nvGrpSpPr>
+        <p:cNvPr id="204" name="Shape 204"/>
+        <p:cNvGrpSpPr/>
+        <p:nvPr/>
+      </p:nvGrpSpPr>
+      <p:grpSpPr>
+        <a:xfrm>
+          <a:off x="0" y="0"/>
+          <a:ext cx="0" cy="0"/>
+          <a:chOff x="0" y="0"/>
+          <a:chExt cx="0" cy="0"/>
+        </a:xfrm>
+      </p:grpSpPr>
+      <p:sp>
+        <p:nvSpPr>
+          <p:cNvPr id="205" name="Google Shape;205;g126320e9147_0_223:notes"/>
+          <p:cNvSpPr/>
+          <p:nvPr>
+            <p:ph idx="2" type="sldImg"/>
+          </p:nvPr>
+        </p:nvSpPr>
+        <p:spPr>
+          <a:xfrm>
+            <a:off x="381300" y="685800"/>
+            <a:ext cx="6096000" cy="3429000"/>
+          </a:xfrm>
+          <a:custGeom>
+            <a:rect b="b" l="l" r="r" t="t"/>
+            <a:pathLst>
+              <a:path extrusionOk="0" h="120000" w="120000">
+                <a:moveTo>
+                  <a:pt x="0" y="0"/>
+                </a:moveTo>
+                <a:lnTo>
+                  <a:pt x="120000" y="0"/>
+                </a:lnTo>
+                <a:lnTo>
+                  <a:pt x="120000" y="120000"/>
+                </a:lnTo>
+                <a:lnTo>
+                  <a:pt x="0" y="120000"/>
+                </a:lnTo>
+                <a:close/>
+              </a:path>
+            </a:pathLst>
+          </a:custGeom>
+        </p:spPr>
+      </p:sp>
+      <p:sp>
+        <p:nvSpPr>
+          <p:cNvPr id="206" name="Google Shape;206;g126320e9147_0_223:notes"/>
+          <p:cNvSpPr txBox="1"/>
+          <p:nvPr>
+            <p:ph idx="1" type="body"/>
+          </p:nvPr>
+        </p:nvSpPr>
+        <p:spPr>
+          <a:xfrm>
+            <a:off x="685800" y="4343400"/>
+            <a:ext cx="5486400" cy="4114800"/>
+          </a:xfrm>
+          <a:prstGeom prst="rect">
+            <a:avLst/>
+          </a:prstGeom>
+        </p:spPr>
+        <p:txBody>
+          <a:bodyPr anchorCtr="0" anchor="t" bIns="91425" lIns="91425" spcFirstLastPara="1" rIns="91425" wrap="square" tIns="91425">
+            <a:noAutofit/>
+          </a:bodyPr>
+          <a:lstStyle/>
+          <a:p>
+            <a:pPr indent="0" lvl="0" marL="0" rtl="0" algn="l">
+              <a:spcBef>
+                <a:spcPts val="0"/>
+              </a:spcBef>
+              <a:spcAft>
+                <a:spcPts val="0"/>
+              </a:spcAft>
+              <a:buNone/>
+            </a:pPr>
+            <a:r>
+              <a:t/>
+            </a:r>
+            <a:endParaRPr/>
+          </a:p>
+        </p:txBody>
+      </p:sp>
+    </p:spTree>
+  </p:cSld>
+  <p:clrMapOvr>
+    <a:masterClrMapping/>
+  </p:clrMapOvr>
+</p:notes>
+</file>
+
+<file path=ppt/notesSlides/notesSlide26.xml><?xml version="1.0" encoding="utf-8"?>
+<p:notes xmlns:a="http://schemas.openxmlformats.org/drawingml/2006/main" xmlns:r="http://schemas.openxmlformats.org/officeDocument/2006/relationships" xmlns:mc="http://schemas.openxmlformats.org/markup-compatibility/2006" xmlns:mv="urn:schemas-microsoft-com:mac:vml" xmlns:p="http://schemas.openxmlformats.org/presentationml/2006/main" xmlns:c="http://schemas.openxmlformats.org/drawingml/2006/chart" xmlns:dgm="http://schemas.openxmlformats.org/drawingml/2006/diagram" xmlns:o="urn:schemas-microsoft-com:office:office" xmlns:v="urn:schemas-microsoft-com:vml" xmlns:pvml="urn:schemas-microsoft-com:office:powerpoint" xmlns:com="http://schemas.openxmlformats.org/drawingml/2006/compatibility" xmlns:p14="http://schemas.microsoft.com/office/powerpoint/2010/main" xmlns:p15="http://schemas.microsoft.com/office/powerpoint/2012/main" xmlns:ahyp="http://schemas.microsoft.com/office/drawing/2018/hyperlinkcolor" showMasterPhAnim="0" showMasterSp="0">
+  <p:cSld>
+    <p:spTree>
+      <p:nvGrpSpPr>
+        <p:cNvPr id="211" name="Shape 211"/>
+        <p:cNvGrpSpPr/>
+        <p:nvPr/>
+      </p:nvGrpSpPr>
+      <p:grpSpPr>
+        <a:xfrm>
+          <a:off x="0" y="0"/>
+          <a:ext cx="0" cy="0"/>
+          <a:chOff x="0" y="0"/>
+          <a:chExt cx="0" cy="0"/>
+        </a:xfrm>
+      </p:grpSpPr>
+      <p:sp>
+        <p:nvSpPr>
+          <p:cNvPr id="212" name="Google Shape;212;g23985d0d2d4_0_38:notes"/>
+          <p:cNvSpPr/>
+          <p:nvPr>
+            <p:ph idx="2" type="sldImg"/>
+          </p:nvPr>
+        </p:nvSpPr>
+        <p:spPr>
+          <a:xfrm>
+            <a:off x="381300" y="685800"/>
+            <a:ext cx="6096000" cy="3429000"/>
+          </a:xfrm>
+          <a:custGeom>
+            <a:rect b="b" l="l" r="r" t="t"/>
+            <a:pathLst>
+              <a:path extrusionOk="0" h="120000" w="120000">
+                <a:moveTo>
+                  <a:pt x="0" y="0"/>
+                </a:moveTo>
+                <a:lnTo>
+                  <a:pt x="120000" y="0"/>
+                </a:lnTo>
+                <a:lnTo>
+                  <a:pt x="120000" y="120000"/>
+                </a:lnTo>
+                <a:lnTo>
+                  <a:pt x="0" y="120000"/>
+                </a:lnTo>
+                <a:close/>
+              </a:path>
+            </a:pathLst>
+          </a:custGeom>
+        </p:spPr>
+      </p:sp>
+      <p:sp>
+        <p:nvSpPr>
+          <p:cNvPr id="213" name="Google Shape;213;g23985d0d2d4_0_38:notes"/>
+          <p:cNvSpPr txBox="1"/>
+          <p:nvPr>
+            <p:ph idx="1" type="body"/>
+          </p:nvPr>
+        </p:nvSpPr>
+        <p:spPr>
+          <a:xfrm>
+            <a:off x="685800" y="4343400"/>
+            <a:ext cx="5486400" cy="4114800"/>
+          </a:xfrm>
+          <a:prstGeom prst="rect">
+            <a:avLst/>
+          </a:prstGeom>
+        </p:spPr>
+        <p:txBody>
+          <a:bodyPr anchorCtr="0" anchor="t" bIns="91425" lIns="91425" spcFirstLastPara="1" rIns="91425" wrap="square" tIns="91425">
+            <a:noAutofit/>
+          </a:bodyPr>
+          <a:lstStyle/>
+          <a:p>
+            <a:pPr indent="0" lvl="0" marL="0" rtl="0" algn="l">
+              <a:spcBef>
+                <a:spcPts val="0"/>
+              </a:spcBef>
+              <a:spcAft>
+                <a:spcPts val="0"/>
+              </a:spcAft>
+              <a:buNone/>
+            </a:pPr>
+            <a:r>
+              <a:t/>
+            </a:r>
+            <a:endParaRPr/>
+          </a:p>
+        </p:txBody>
+      </p:sp>
+    </p:spTree>
+  </p:cSld>
+  <p:clrMapOvr>
+    <a:masterClrMapping/>
+  </p:clrMapOvr>
+</p:notes>
+</file>
+
+<file path=ppt/notesSlides/notesSlide27.xml><?xml version="1.0" encoding="utf-8"?>
+<p:notes xmlns:a="http://schemas.openxmlformats.org/drawingml/2006/main" xmlns:r="http://schemas.openxmlformats.org/officeDocument/2006/relationships" xmlns:mc="http://schemas.openxmlformats.org/markup-compatibility/2006" xmlns:mv="urn:schemas-microsoft-com:mac:vml" xmlns:p="http://schemas.openxmlformats.org/presentationml/2006/main" xmlns:c="http://schemas.openxmlformats.org/drawingml/2006/chart" xmlns:dgm="http://schemas.openxmlformats.org/drawingml/2006/diagram" xmlns:o="urn:schemas-microsoft-com:office:office" xmlns:v="urn:schemas-microsoft-com:vml" xmlns:pvml="urn:schemas-microsoft-com:office:powerpoint" xmlns:com="http://schemas.openxmlformats.org/drawingml/2006/compatibility" xmlns:p14="http://schemas.microsoft.com/office/powerpoint/2010/main" xmlns:p15="http://schemas.microsoft.com/office/powerpoint/2012/main" xmlns:ahyp="http://schemas.microsoft.com/office/drawing/2018/hyperlinkcolor" showMasterPhAnim="0" showMasterSp="0">
+  <p:cSld>
+    <p:spTree>
+      <p:nvGrpSpPr>
+        <p:cNvPr id="217" name="Shape 217"/>
+        <p:cNvGrpSpPr/>
+        <p:nvPr/>
+      </p:nvGrpSpPr>
+      <p:grpSpPr>
+        <a:xfrm>
+          <a:off x="0" y="0"/>
+          <a:ext cx="0" cy="0"/>
+          <a:chOff x="0" y="0"/>
+          <a:chExt cx="0" cy="0"/>
+        </a:xfrm>
+      </p:grpSpPr>
+      <p:sp>
+        <p:nvSpPr>
+          <p:cNvPr id="218" name="Google Shape;218;g23985d0d2d4_0_43:notes"/>
+          <p:cNvSpPr/>
+          <p:nvPr>
+            <p:ph idx="2" type="sldImg"/>
+          </p:nvPr>
+        </p:nvSpPr>
+        <p:spPr>
+          <a:xfrm>
+            <a:off x="381300" y="685800"/>
+            <a:ext cx="6096000" cy="3429000"/>
+          </a:xfrm>
+          <a:custGeom>
+            <a:rect b="b" l="l" r="r" t="t"/>
+            <a:pathLst>
+              <a:path extrusionOk="0" h="120000" w="120000">
+                <a:moveTo>
+                  <a:pt x="0" y="0"/>
+                </a:moveTo>
+                <a:lnTo>
+                  <a:pt x="120000" y="0"/>
+                </a:lnTo>
+                <a:lnTo>
+                  <a:pt x="120000" y="120000"/>
+                </a:lnTo>
+                <a:lnTo>
+                  <a:pt x="0" y="120000"/>
+                </a:lnTo>
+                <a:close/>
+              </a:path>
+            </a:pathLst>
+          </a:custGeom>
+        </p:spPr>
+      </p:sp>
+      <p:sp>
+        <p:nvSpPr>
+          <p:cNvPr id="219" name="Google Shape;219;g23985d0d2d4_0_43:notes"/>
           <p:cNvSpPr txBox="1"/>
           <p:nvPr>
             <p:ph idx="1" type="body"/>
@@ -6385,7 +6885,7 @@
             <a:tbl>
               <a:tblPr>
                 <a:noFill/>
-                <a:tableStyleId>{FBA23C03-D307-4A0D-BA41-A0E6DD65F436}</a:tableStyleId>
+                <a:tableStyleId>{FB01EE5D-FCED-4213-B199-629BB343BD29}</a:tableStyleId>
               </a:tblPr>
               <a:tblGrid>
                 <a:gridCol w="1314475"/>
@@ -8570,10 +9070,10 @@
               <a:buChar char="●"/>
             </a:pPr>
             <a:r>
-              <a:rPr lang="en" strike="sngStrike"/>
+              <a:rPr lang="en"/>
               <a:t>Theory (lectures) = 20% of grade</a:t>
             </a:r>
-            <a:endParaRPr strike="sngStrike"/>
+            <a:endParaRPr/>
           </a:p>
           <a:p>
             <a:pPr indent="-317500" lvl="1" marL="914400" rtl="0" algn="l">
@@ -8587,10 +9087,10 @@
               <a:buChar char="○"/>
             </a:pPr>
             <a:r>
-              <a:rPr lang="en" strike="sngStrike"/>
+              <a:rPr lang="en"/>
               <a:t>2 SWS in 5 ECTS = 20%</a:t>
             </a:r>
-            <a:endParaRPr strike="sngStrike"/>
+            <a:endParaRPr/>
           </a:p>
           <a:p>
             <a:pPr indent="-317500" lvl="1" marL="914400" rtl="0" algn="l">
@@ -8604,10 +9104,10 @@
               <a:buChar char="○"/>
             </a:pPr>
             <a:r>
-              <a:rPr lang="en" strike="sngStrike"/>
+              <a:rPr lang="en"/>
               <a:t>As measured by class quizzes</a:t>
             </a:r>
-            <a:endParaRPr strike="sngStrike"/>
+            <a:endParaRPr/>
           </a:p>
           <a:p>
             <a:pPr indent="-317500" lvl="1" marL="914400" rtl="0" algn="l">
@@ -8621,10 +9121,10 @@
               <a:buChar char="○"/>
             </a:pPr>
             <a:r>
-              <a:rPr lang="en" strike="sngStrike"/>
+              <a:rPr lang="en"/>
               <a:t>Grading scale is [0..10] points</a:t>
             </a:r>
-            <a:endParaRPr strike="sngStrike"/>
+            <a:endParaRPr/>
           </a:p>
           <a:p>
             <a:pPr indent="-342900" lvl="0" marL="457200" rtl="0" algn="l">
@@ -8639,7 +9139,7 @@
             </a:pPr>
             <a:r>
               <a:rPr lang="en"/>
-              <a:t>Practice (project) = 100% of grade</a:t>
+              <a:t>Practice (project) = 80% of grade</a:t>
             </a:r>
             <a:endParaRPr/>
           </a:p>
@@ -8797,10 +9297,10 @@
               <a:buChar char="●"/>
             </a:pPr>
             <a:r>
-              <a:rPr lang="en" strike="sngStrike"/>
+              <a:rPr lang="en"/>
               <a:t>Theory (lectures) = 10% of grade</a:t>
             </a:r>
-            <a:endParaRPr strike="sngStrike"/>
+            <a:endParaRPr/>
           </a:p>
           <a:p>
             <a:pPr indent="-317500" lvl="1" marL="914400" rtl="0" algn="l">
@@ -8814,10 +9314,10 @@
               <a:buChar char="○"/>
             </a:pPr>
             <a:r>
-              <a:rPr lang="en" strike="sngStrike"/>
+              <a:rPr lang="en"/>
               <a:t>2 SWS in 10 ECTS = 10%</a:t>
             </a:r>
-            <a:endParaRPr strike="sngStrike"/>
+            <a:endParaRPr/>
           </a:p>
           <a:p>
             <a:pPr indent="-317500" lvl="1" marL="914400" rtl="0" algn="l">
@@ -8831,10 +9331,10 @@
               <a:buChar char="○"/>
             </a:pPr>
             <a:r>
-              <a:rPr lang="en" strike="sngStrike"/>
+              <a:rPr lang="en"/>
               <a:t>As measured by class quizzes</a:t>
             </a:r>
-            <a:endParaRPr strike="sngStrike"/>
+            <a:endParaRPr/>
           </a:p>
           <a:p>
             <a:pPr indent="-317500" lvl="1" marL="914400" rtl="0" algn="l">
@@ -8848,10 +9348,10 @@
               <a:buChar char="○"/>
             </a:pPr>
             <a:r>
-              <a:rPr lang="en" strike="sngStrike"/>
+              <a:rPr lang="en"/>
               <a:t>Grading scale is [0..10] points</a:t>
             </a:r>
-            <a:endParaRPr strike="sngStrike"/>
+            <a:endParaRPr/>
           </a:p>
           <a:p>
             <a:pPr indent="-342900" lvl="0" marL="457200" rtl="0" algn="l">
@@ -8866,7 +9366,7 @@
             </a:pPr>
             <a:r>
               <a:rPr lang="en"/>
-              <a:t>Practice (project) = 100% of grade</a:t>
+              <a:t>Practice (project) = 90% of grade</a:t>
             </a:r>
             <a:endParaRPr/>
           </a:p>
@@ -9143,6 +9643,129 @@
           <p:cNvPr id="113" name="Google Shape;113;p19"/>
           <p:cNvSpPr txBox="1"/>
           <p:nvPr>
+            <p:ph idx="1" type="body"/>
+          </p:nvPr>
+        </p:nvSpPr>
+        <p:spPr>
+          <a:xfrm>
+            <a:off x="274320" y="914400"/>
+            <a:ext cx="8595300" cy="4114800"/>
+          </a:xfrm>
+          <a:prstGeom prst="rect">
+            <a:avLst/>
+          </a:prstGeom>
+        </p:spPr>
+        <p:txBody>
+          <a:bodyPr anchorCtr="0" anchor="t" bIns="0" lIns="0" spcFirstLastPara="1" rIns="0" wrap="square" tIns="0">
+            <a:noAutofit/>
+          </a:bodyPr>
+          <a:lstStyle/>
+          <a:p>
+            <a:pPr indent="0" lvl="0" marL="0" rtl="0" algn="l">
+              <a:spcBef>
+                <a:spcPts val="0"/>
+              </a:spcBef>
+              <a:spcAft>
+                <a:spcPts val="0"/>
+              </a:spcAft>
+              <a:buNone/>
+            </a:pPr>
+            <a:r>
+              <a:rPr b="1" lang="en"/>
+              <a:t>Scrum Master (AMOS-SM)</a:t>
+            </a:r>
+            <a:endParaRPr b="1"/>
+          </a:p>
+          <a:p>
+            <a:pPr indent="-342900" lvl="0" marL="457200" rtl="0" algn="l">
+              <a:spcBef>
+                <a:spcPts val="1200"/>
+              </a:spcBef>
+              <a:spcAft>
+                <a:spcPts val="0"/>
+              </a:spcAft>
+              <a:buSzPts val="1800"/>
+              <a:buChar char="●"/>
+            </a:pPr>
+            <a:r>
+              <a:rPr lang="en"/>
+              <a:t>Grading is handled in separate 5-ECTS course COACH / AMOS-SM</a:t>
+            </a:r>
+            <a:endParaRPr/>
+          </a:p>
+          <a:p>
+            <a:pPr indent="-342900" lvl="0" marL="457200" rtl="0" algn="l">
+              <a:spcBef>
+                <a:spcPts val="0"/>
+              </a:spcBef>
+              <a:spcAft>
+                <a:spcPts val="0"/>
+              </a:spcAft>
+              <a:buSzPts val="1800"/>
+              <a:buChar char="●"/>
+            </a:pPr>
+            <a:r>
+              <a:rPr lang="en"/>
+              <a:t>The Scrum Master leads process improvement / questions</a:t>
+            </a:r>
+            <a:endParaRPr/>
+          </a:p>
+          <a:p>
+            <a:pPr indent="-342900" lvl="0" marL="457200" rtl="0" algn="l">
+              <a:spcBef>
+                <a:spcPts val="0"/>
+              </a:spcBef>
+              <a:spcAft>
+                <a:spcPts val="0"/>
+              </a:spcAft>
+              <a:buSzPts val="1800"/>
+              <a:buChar char="●"/>
+            </a:pPr>
+            <a:r>
+              <a:rPr lang="en"/>
+              <a:t>The Scrum Master does not represent the teaching team</a:t>
+            </a:r>
+            <a:endParaRPr/>
+          </a:p>
+          <a:p>
+            <a:pPr indent="-342900" lvl="0" marL="457200" rtl="0" algn="l">
+              <a:spcBef>
+                <a:spcPts val="0"/>
+              </a:spcBef>
+              <a:spcAft>
+                <a:spcPts val="0"/>
+              </a:spcAft>
+              <a:buSzPts val="1800"/>
+              <a:buChar char="●"/>
+            </a:pPr>
+            <a:r>
+              <a:rPr lang="en"/>
+              <a:t>They do not handle student performance questions</a:t>
+            </a:r>
+            <a:endParaRPr/>
+          </a:p>
+          <a:p>
+            <a:pPr indent="0" lvl="0" marL="0" rtl="0" algn="l">
+              <a:spcBef>
+                <a:spcPts val="1200"/>
+              </a:spcBef>
+              <a:spcAft>
+                <a:spcPts val="1200"/>
+              </a:spcAft>
+              <a:buNone/>
+            </a:pPr>
+            <a:r>
+              <a:t/>
+            </a:r>
+            <a:endParaRPr/>
+          </a:p>
+        </p:txBody>
+      </p:sp>
+      <p:sp>
+        <p:nvSpPr>
+          <p:cNvPr id="114" name="Google Shape;114;p19"/>
+          <p:cNvSpPr txBox="1"/>
+          <p:nvPr>
             <p:ph type="title"/>
           </p:nvPr>
         </p:nvSpPr>
@@ -9172,195 +9795,7 @@
             </a:pPr>
             <a:r>
               <a:rPr lang="en"/>
-              <a:t>Class Quizzes</a:t>
-            </a:r>
-            <a:endParaRPr/>
-          </a:p>
-        </p:txBody>
-      </p:sp>
-      <p:sp>
-        <p:nvSpPr>
-          <p:cNvPr id="114" name="Google Shape;114;p19"/>
-          <p:cNvSpPr txBox="1"/>
-          <p:nvPr>
-            <p:ph idx="1" type="body"/>
-          </p:nvPr>
-        </p:nvSpPr>
-        <p:spPr>
-          <a:xfrm>
-            <a:off x="274320" y="914400"/>
-            <a:ext cx="8595300" cy="4114800"/>
-          </a:xfrm>
-          <a:prstGeom prst="rect">
-            <a:avLst/>
-          </a:prstGeom>
-        </p:spPr>
-        <p:txBody>
-          <a:bodyPr anchorCtr="0" anchor="t" bIns="0" lIns="0" spcFirstLastPara="1" rIns="0" wrap="square" tIns="0">
-            <a:noAutofit/>
-          </a:bodyPr>
-          <a:lstStyle/>
-          <a:p>
-            <a:pPr indent="0" lvl="0" marL="0" rtl="0" algn="l">
-              <a:spcBef>
-                <a:spcPts val="0"/>
-              </a:spcBef>
-              <a:spcAft>
-                <a:spcPts val="0"/>
-              </a:spcAft>
-              <a:buClr>
-                <a:schemeClr val="dk1"/>
-              </a:buClr>
-              <a:buSzPts val="1100"/>
-              <a:buFont typeface="Arial"/>
-              <a:buNone/>
-            </a:pPr>
-            <a:r>
-              <a:rPr lang="en"/>
-              <a:t>Each class session starts with a class quiz</a:t>
-            </a:r>
-            <a:endParaRPr/>
-          </a:p>
-          <a:p>
-            <a:pPr indent="-342900" lvl="0" marL="457200" rtl="0" algn="l">
-              <a:spcBef>
-                <a:spcPts val="1200"/>
-              </a:spcBef>
-              <a:spcAft>
-                <a:spcPts val="0"/>
-              </a:spcAft>
-              <a:buSzPts val="1800"/>
-              <a:buChar char="●"/>
-            </a:pPr>
-            <a:r>
-              <a:rPr lang="en"/>
-              <a:t>A quiz will test your understanding of last session’s topic</a:t>
-            </a:r>
-            <a:endParaRPr/>
-          </a:p>
-          <a:p>
-            <a:pPr indent="-342900" lvl="0" marL="457200" rtl="0" algn="l">
-              <a:spcBef>
-                <a:spcPts val="0"/>
-              </a:spcBef>
-              <a:spcAft>
-                <a:spcPts val="0"/>
-              </a:spcAft>
-              <a:buSzPts val="1800"/>
-              <a:buChar char="●"/>
-            </a:pPr>
-            <a:r>
-              <a:rPr lang="en"/>
-              <a:t>A quiz typically has 5 questions and will last 10 minutes</a:t>
-            </a:r>
-            <a:endParaRPr/>
-          </a:p>
-          <a:p>
-            <a:pPr indent="-342900" lvl="0" marL="457200" rtl="0" algn="l">
-              <a:spcBef>
-                <a:spcPts val="0"/>
-              </a:spcBef>
-              <a:spcAft>
-                <a:spcPts val="0"/>
-              </a:spcAft>
-              <a:buSzPts val="1800"/>
-              <a:buChar char="●"/>
-            </a:pPr>
-            <a:r>
-              <a:rPr lang="en"/>
-              <a:t>The overall quiz is graded using [0..10] scheme (10 points in total)</a:t>
-            </a:r>
-            <a:endParaRPr/>
-          </a:p>
-          <a:p>
-            <a:pPr indent="0" lvl="0" marL="0" rtl="0" algn="l">
-              <a:spcBef>
-                <a:spcPts val="1200"/>
-              </a:spcBef>
-              <a:spcAft>
-                <a:spcPts val="0"/>
-              </a:spcAft>
-              <a:buClr>
-                <a:schemeClr val="dk1"/>
-              </a:buClr>
-              <a:buSzPts val="1100"/>
-              <a:buFont typeface="Arial"/>
-              <a:buNone/>
-            </a:pPr>
-            <a:r>
-              <a:rPr lang="en"/>
-              <a:t>A class quiz will open precisely when class starts</a:t>
-            </a:r>
-            <a:endParaRPr/>
-          </a:p>
-          <a:p>
-            <a:pPr indent="-342900" lvl="0" marL="457200" rtl="0" algn="l">
-              <a:spcBef>
-                <a:spcPts val="1200"/>
-              </a:spcBef>
-              <a:spcAft>
-                <a:spcPts val="0"/>
-              </a:spcAft>
-              <a:buSzPts val="1800"/>
-              <a:buChar char="●"/>
-            </a:pPr>
-            <a:r>
-              <a:rPr lang="en"/>
-              <a:t>The quiz is administered automatically</a:t>
-            </a:r>
-            <a:endParaRPr/>
-          </a:p>
-          <a:p>
-            <a:pPr indent="-342900" lvl="0" marL="457200" rtl="0" algn="l">
-              <a:spcBef>
-                <a:spcPts val="0"/>
-              </a:spcBef>
-              <a:spcAft>
-                <a:spcPts val="0"/>
-              </a:spcAft>
-              <a:buSzPts val="1800"/>
-              <a:buChar char="●"/>
-            </a:pPr>
-            <a:r>
-              <a:rPr lang="en"/>
-              <a:t>It is your job to have reliable Internet access etc.</a:t>
-            </a:r>
-            <a:endParaRPr/>
-          </a:p>
-          <a:p>
-            <a:pPr indent="-342900" lvl="0" marL="457200" rtl="0" algn="l">
-              <a:spcBef>
-                <a:spcPts val="0"/>
-              </a:spcBef>
-              <a:spcAft>
-                <a:spcPts val="0"/>
-              </a:spcAft>
-              <a:buSzPts val="1800"/>
-              <a:buChar char="●"/>
-            </a:pPr>
-            <a:r>
-              <a:rPr lang="en"/>
-              <a:t>There is no way to make up for a missed quiz</a:t>
-            </a:r>
-            <a:endParaRPr/>
-          </a:p>
-          <a:p>
-            <a:pPr indent="0" lvl="0" marL="0" rtl="0" algn="l">
-              <a:spcBef>
-                <a:spcPts val="1200"/>
-              </a:spcBef>
-              <a:spcAft>
-                <a:spcPts val="1200"/>
-              </a:spcAft>
-              <a:buClr>
-                <a:schemeClr val="dk1"/>
-              </a:buClr>
-              <a:buSzPts val="1100"/>
-              <a:buFont typeface="Arial"/>
-              <a:buNone/>
-            </a:pPr>
-            <a:r>
-              <a:t/>
+              <a:t>Scrum Master (COACH / AMOS-SM)</a:t>
             </a:r>
             <a:endParaRPr/>
           </a:p>
@@ -9494,7 +9929,7 @@
             </a:pPr>
             <a:r>
               <a:rPr lang="en"/>
-              <a:t>Collaboration and Grading</a:t>
+              <a:t>Class Quizzes</a:t>
             </a:r>
             <a:endParaRPr/>
           </a:p>
@@ -9530,27 +9965,16 @@
               <a:spcAft>
                 <a:spcPts val="0"/>
               </a:spcAft>
-              <a:buNone/>
-            </a:pPr>
-            <a:r>
-              <a:rPr lang="en"/>
-              <a:t>We are required to grade you individually</a:t>
-            </a:r>
-            <a:endParaRPr/>
-          </a:p>
-          <a:p>
-            <a:pPr indent="0" lvl="0" marL="0" rtl="0" algn="l">
-              <a:spcBef>
-                <a:spcPts val="1200"/>
-              </a:spcBef>
-              <a:spcAft>
-                <a:spcPts val="0"/>
-              </a:spcAft>
-              <a:buNone/>
-            </a:pPr>
-            <a:r>
-              <a:rPr lang="en"/>
-              <a:t>If you collaborate, for example,</a:t>
+              <a:buClr>
+                <a:schemeClr val="dk1"/>
+              </a:buClr>
+              <a:buSzPts val="1100"/>
+              <a:buFont typeface="Arial"/>
+              <a:buNone/>
+            </a:pPr>
+            <a:r>
+              <a:rPr lang="en"/>
+              <a:t>Each class session starts with a class quiz</a:t>
             </a:r>
             <a:endParaRPr/>
           </a:p>
@@ -9567,7 +9991,7 @@
             </a:pPr>
             <a:r>
               <a:rPr lang="en"/>
-              <a:t>by pair programming</a:t>
+              <a:t>A quiz will test your understanding of last session’s topic</a:t>
             </a:r>
             <a:endParaRPr/>
           </a:p>
@@ -9584,7 +10008,24 @@
             </a:pPr>
             <a:r>
               <a:rPr lang="en"/>
-              <a:t>by pair designing</a:t>
+              <a:t>A quiz typically has 5 questions and will last 10 minutes</a:t>
+            </a:r>
+            <a:endParaRPr/>
+          </a:p>
+          <a:p>
+            <a:pPr indent="-342900" lvl="0" marL="457200" rtl="0" algn="l">
+              <a:spcBef>
+                <a:spcPts val="0"/>
+              </a:spcBef>
+              <a:spcAft>
+                <a:spcPts val="0"/>
+              </a:spcAft>
+              <a:buSzPts val="1800"/>
+              <a:buChar char="●"/>
+            </a:pPr>
+            <a:r>
+              <a:rPr lang="en"/>
+              <a:t>The overall quiz is graded using [0..10] scheme (10 points in total)</a:t>
             </a:r>
             <a:endParaRPr/>
           </a:p>
@@ -9594,13 +10035,89 @@
                 <a:spcPts val="1200"/>
               </a:spcBef>
               <a:spcAft>
+                <a:spcPts val="0"/>
+              </a:spcAft>
+              <a:buClr>
+                <a:schemeClr val="dk1"/>
+              </a:buClr>
+              <a:buSzPts val="1100"/>
+              <a:buFont typeface="Arial"/>
+              <a:buNone/>
+            </a:pPr>
+            <a:r>
+              <a:rPr lang="en"/>
+              <a:t>A class quiz will open precisely when class starts</a:t>
+            </a:r>
+            <a:endParaRPr/>
+          </a:p>
+          <a:p>
+            <a:pPr indent="-342900" lvl="0" marL="457200" rtl="0" algn="l">
+              <a:spcBef>
                 <a:spcPts val="1200"/>
-              </a:spcAft>
-              <a:buNone/>
-            </a:pPr>
-            <a:r>
-              <a:rPr lang="en"/>
-              <a:t>you agree to be graded jointly</a:t>
+              </a:spcBef>
+              <a:spcAft>
+                <a:spcPts val="0"/>
+              </a:spcAft>
+              <a:buSzPts val="1800"/>
+              <a:buChar char="●"/>
+            </a:pPr>
+            <a:r>
+              <a:rPr lang="en"/>
+              <a:t>The quiz is administered automatically</a:t>
+            </a:r>
+            <a:endParaRPr/>
+          </a:p>
+          <a:p>
+            <a:pPr indent="-342900" lvl="0" marL="457200" rtl="0" algn="l">
+              <a:spcBef>
+                <a:spcPts val="0"/>
+              </a:spcBef>
+              <a:spcAft>
+                <a:spcPts val="0"/>
+              </a:spcAft>
+              <a:buSzPts val="1800"/>
+              <a:buChar char="●"/>
+            </a:pPr>
+            <a:r>
+              <a:rPr lang="en"/>
+              <a:t>It is your job to have reliable Internet access etc.</a:t>
+            </a:r>
+            <a:endParaRPr/>
+          </a:p>
+          <a:p>
+            <a:pPr indent="-342900" lvl="0" marL="457200" rtl="0" algn="l">
+              <a:spcBef>
+                <a:spcPts val="0"/>
+              </a:spcBef>
+              <a:spcAft>
+                <a:spcPts val="0"/>
+              </a:spcAft>
+              <a:buSzPts val="1800"/>
+              <a:buChar char="●"/>
+            </a:pPr>
+            <a:r>
+              <a:rPr lang="en"/>
+              <a:t>There is no way to make up for a missed quiz</a:t>
+            </a:r>
+            <a:endParaRPr/>
+          </a:p>
+          <a:p>
+            <a:pPr indent="0" lvl="0" marL="0" rtl="0" algn="l">
+              <a:spcBef>
+                <a:spcPts val="1200"/>
+              </a:spcBef>
+              <a:spcAft>
+                <a:spcPts val="1200"/>
+              </a:spcAft>
+              <a:buClr>
+                <a:schemeClr val="dk1"/>
+              </a:buClr>
+              <a:buSzPts val="1100"/>
+              <a:buFont typeface="Arial"/>
+              <a:buNone/>
+            </a:pPr>
+            <a:r>
+              <a:t/>
             </a:r>
             <a:endParaRPr/>
           </a:p>
@@ -9734,7 +10251,7 @@
             </a:pPr>
             <a:r>
               <a:rPr lang="en"/>
-              <a:t>Course Registration vs. Exam Registration</a:t>
+              <a:t>Project Work Grading</a:t>
             </a:r>
             <a:endParaRPr/>
           </a:p>
@@ -9773,12 +10290,8 @@
               <a:buNone/>
             </a:pPr>
             <a:r>
-              <a:rPr b="1" lang="en"/>
-              <a:t>Step 1: Course registration </a:t>
-            </a:r>
-            <a:r>
-              <a:rPr lang="en"/>
-              <a:t>(German: Kursanmeldung)</a:t>
+              <a:rPr lang="en"/>
+              <a:t>We grade by deliverables, see homework document, including</a:t>
             </a:r>
             <a:endParaRPr/>
           </a:p>
@@ -9795,7 +10308,7 @@
             </a:pPr>
             <a:r>
               <a:rPr lang="en"/>
-              <a:t>Students sign up through the course management system</a:t>
+              <a:t>Regular deliverables (product backlog, code contributions, …) every sprint</a:t>
             </a:r>
             <a:endParaRPr/>
           </a:p>
@@ -9812,14 +10325,30 @@
             </a:pPr>
             <a:r>
               <a:rPr lang="en"/>
-              <a:t>You may or may not get in, various rules and regulations apply</a:t>
+              <a:t>Irregular (one-time) deliverables as they happen</a:t>
+            </a:r>
+            <a:endParaRPr/>
+          </a:p>
+          <a:p>
+            <a:pPr indent="0" lvl="0" marL="0" rtl="0" algn="l">
+              <a:spcBef>
+                <a:spcPts val="1200"/>
+              </a:spcBef>
+              <a:spcAft>
+                <a:spcPts val="0"/>
+              </a:spcAft>
+              <a:buNone/>
+            </a:pPr>
+            <a:r>
+              <a:rPr lang="en"/>
+              <a:t>We also grade anyone’s individual teamwork contribution when</a:t>
             </a:r>
             <a:endParaRPr/>
           </a:p>
           <a:p>
             <a:pPr indent="-342900" lvl="0" marL="457200" rtl="0" algn="l">
               <a:spcBef>
-                <a:spcPts val="0"/>
+                <a:spcPts val="1200"/>
               </a:spcBef>
               <a:spcAft>
                 <a:spcPts val="0"/>
@@ -9829,7 +10358,7 @@
             </a:pPr>
             <a:r>
               <a:rPr lang="en"/>
-              <a:t>The earlier you sign up, the more likely you are to get in</a:t>
+              <a:t>We are present in the team meetings, usually sprint 3, 5, 7, 10, and 13</a:t>
             </a:r>
             <a:endParaRPr/>
           </a:p>
@@ -9844,12 +10373,8 @@
               <a:buNone/>
             </a:pPr>
             <a:r>
-              <a:rPr b="1" lang="en"/>
-              <a:t>Step 2: Exam registration </a:t>
-            </a:r>
-            <a:r>
-              <a:rPr lang="en"/>
-              <a:t>(German: Prüfungsanmeldung)</a:t>
+              <a:rPr lang="en"/>
+              <a:t>Our expectations are explained in class and documented as the</a:t>
             </a:r>
             <a:endParaRPr/>
           </a:p>
@@ -9865,8 +10390,17 @@
               <a:buChar char="●"/>
             </a:pPr>
             <a:r>
-              <a:rPr lang="en"/>
-              <a:t>During the first weeks of the course, you can decide to drop out</a:t>
+              <a:rPr lang="en" u="sng">
+                <a:solidFill>
+                  <a:schemeClr val="hlink"/>
+                </a:solidFill>
+                <a:hlinkClick r:id="rId3"/>
+              </a:rPr>
+              <a:t>Capabilities timeline</a:t>
+            </a:r>
+            <a:r>
+              <a:rPr lang="en"/>
+              <a:t> and the</a:t>
             </a:r>
             <a:endParaRPr/>
           </a:p>
@@ -9882,25 +10416,13 @@
               <a:buChar char="●"/>
             </a:pPr>
             <a:r>
-              <a:rPr lang="en"/>
-              <a:t>Four weeks (or so) into the semester, you can register for the exam</a:t>
-            </a:r>
-            <a:endParaRPr/>
-          </a:p>
-          <a:p>
-            <a:pPr indent="-342900" lvl="0" marL="457200" rtl="0" algn="l">
-              <a:spcBef>
-                <a:spcPts val="0"/>
-              </a:spcBef>
-              <a:spcAft>
-                <a:spcPts val="0"/>
-              </a:spcAft>
-              <a:buSzPts val="1800"/>
-              <a:buChar char="●"/>
-            </a:pPr>
-            <a:r>
-              <a:rPr lang="en"/>
-              <a:t>After exam registration closes, your decision is binding</a:t>
+              <a:rPr lang="en" u="sng">
+                <a:solidFill>
+                  <a:schemeClr val="hlink"/>
+                </a:solidFill>
+                <a:hlinkClick r:id="rId4"/>
+              </a:rPr>
+              <a:t>Capabilities timeline explanation</a:t>
             </a:r>
             <a:endParaRPr/>
           </a:p>
@@ -9959,7 +10481,7 @@
                 <a:solidFill>
                   <a:schemeClr val="hlink"/>
                 </a:solidFill>
-                <a:hlinkClick r:id="rId3"/>
+                <a:hlinkClick r:id="rId5"/>
               </a:rPr>
               <a:t>https://profriehle.com</a:t>
             </a:r>
@@ -10034,7 +10556,7 @@
             </a:pPr>
             <a:r>
               <a:rPr lang="en"/>
-              <a:t>Receiving a Grade for the Course</a:t>
+              <a:t>Collaboration and Grading</a:t>
             </a:r>
             <a:endParaRPr/>
           </a:p>
@@ -10070,16 +10592,27 @@
               <a:spcAft>
                 <a:spcPts val="0"/>
               </a:spcAft>
-              <a:buClr>
-                <a:schemeClr val="dk1"/>
-              </a:buClr>
-              <a:buSzPts val="1100"/>
-              <a:buFont typeface="Arial"/>
-              <a:buNone/>
-            </a:pPr>
-            <a:r>
-              <a:rPr lang="en"/>
-              <a:t>If you want to receive a grade</a:t>
+              <a:buNone/>
+            </a:pPr>
+            <a:r>
+              <a:rPr lang="en"/>
+              <a:t>We (have to) grade you individually</a:t>
+            </a:r>
+            <a:endParaRPr/>
+          </a:p>
+          <a:p>
+            <a:pPr indent="0" lvl="0" marL="0" rtl="0" algn="l">
+              <a:spcBef>
+                <a:spcPts val="1200"/>
+              </a:spcBef>
+              <a:spcAft>
+                <a:spcPts val="0"/>
+              </a:spcAft>
+              <a:buNone/>
+            </a:pPr>
+            <a:r>
+              <a:rPr lang="en"/>
+              <a:t>If you collaborate, for example,</a:t>
             </a:r>
             <a:endParaRPr/>
           </a:p>
@@ -10091,84 +10624,19 @@
               <a:spcAft>
                 <a:spcPts val="0"/>
               </a:spcAft>
-              <a:buClr>
-                <a:srgbClr val="212121"/>
-              </a:buClr>
               <a:buSzPts val="1800"/>
               <a:buChar char="●"/>
             </a:pPr>
             <a:r>
-              <a:rPr lang="en">
-                <a:solidFill>
-                  <a:srgbClr val="212121"/>
-                </a:solidFill>
-              </a:rPr>
-              <a:t>You must register through your university’s exam registration system</a:t>
-            </a:r>
-            <a:endParaRPr>
-              <a:solidFill>
-                <a:srgbClr val="212121"/>
-              </a:solidFill>
-            </a:endParaRPr>
-          </a:p>
-          <a:p>
-            <a:pPr indent="-317500" lvl="1" marL="914400" rtl="0" algn="l">
-              <a:spcBef>
-                <a:spcPts val="1000"/>
-              </a:spcBef>
-              <a:spcAft>
-                <a:spcPts val="0"/>
-              </a:spcAft>
-              <a:buSzPts val="1400"/>
-              <a:buChar char="○"/>
-            </a:pPr>
-            <a:r>
-              <a:rPr b="1" lang="en"/>
-              <a:t>Your degree program may have split the course into two (VL + UE)</a:t>
-            </a:r>
-            <a:endParaRPr b="1"/>
-          </a:p>
-          <a:p>
-            <a:pPr indent="-317500" lvl="1" marL="914400" rtl="0" algn="l">
-              <a:spcBef>
-                <a:spcPts val="0"/>
-              </a:spcBef>
-              <a:spcAft>
-                <a:spcPts val="0"/>
-              </a:spcAft>
-              <a:buSzPts val="1400"/>
-              <a:buChar char="○"/>
-            </a:pPr>
-            <a:r>
-              <a:rPr b="1" lang="en"/>
-              <a:t>Please check asap that the course is available in your degree program!</a:t>
-            </a:r>
-            <a:endParaRPr b="1">
-              <a:solidFill>
-                <a:srgbClr val="212121"/>
-              </a:solidFill>
-            </a:endParaRPr>
-          </a:p>
-          <a:p>
-            <a:pPr indent="0" lvl="0" marL="0" rtl="0" algn="l">
-              <a:spcBef>
-                <a:spcPts val="1200"/>
-              </a:spcBef>
-              <a:spcAft>
-                <a:spcPts val="0"/>
-              </a:spcAft>
-              <a:buNone/>
-            </a:pPr>
-            <a:r>
-              <a:rPr lang="en"/>
-              <a:t>In case of problems, please see</a:t>
+              <a:rPr lang="en"/>
+              <a:t>by pair programming</a:t>
             </a:r>
             <a:endParaRPr/>
           </a:p>
           <a:p>
             <a:pPr indent="-342900" lvl="0" marL="457200" rtl="0" algn="l">
               <a:spcBef>
-                <a:spcPts val="1200"/>
+                <a:spcPts val="0"/>
               </a:spcBef>
               <a:spcAft>
                 <a:spcPts val="0"/>
@@ -10177,17 +10645,8 @@
               <a:buChar char="●"/>
             </a:pPr>
             <a:r>
-              <a:rPr lang="en" u="sng">
-                <a:solidFill>
-                  <a:schemeClr val="hlink"/>
-                </a:solidFill>
-                <a:hlinkClick r:id="rId3"/>
-              </a:rPr>
-              <a:t>https://oss.cs.fau.de/teaching/course-resources/course-registration/</a:t>
-            </a:r>
-            <a:r>
-              <a:rPr lang="en"/>
-              <a:t> </a:t>
+              <a:rPr lang="en"/>
+              <a:t>by pair designing</a:t>
             </a:r>
             <a:endParaRPr/>
           </a:p>
@@ -10203,7 +10662,7 @@
             </a:pPr>
             <a:r>
               <a:rPr lang="en"/>
-              <a:t>Otherwise: No grade</a:t>
+              <a:t>you agree to be graded jointly</a:t>
             </a:r>
             <a:endParaRPr/>
           </a:p>
@@ -10262,7 +10721,7 @@
                 <a:solidFill>
                   <a:schemeClr val="hlink"/>
                 </a:solidFill>
-                <a:hlinkClick r:id="rId4"/>
+                <a:hlinkClick r:id="rId3"/>
               </a:rPr>
               <a:t>https://profriehle.com</a:t>
             </a:r>
@@ -10321,7 +10780,7 @@
           </a:prstGeom>
         </p:spPr>
         <p:txBody>
-          <a:bodyPr anchorCtr="0" anchor="ctr" bIns="0" lIns="274300" spcFirstLastPara="1" rIns="0" wrap="square" tIns="0">
+          <a:bodyPr anchorCtr="0" anchor="ctr" bIns="91425" lIns="274300" spcFirstLastPara="1" rIns="91425" wrap="square" tIns="91425">
             <a:noAutofit/>
           </a:bodyPr>
           <a:lstStyle/>
@@ -10337,93 +10796,154 @@
             </a:pPr>
             <a:r>
               <a:rPr lang="en"/>
-              <a:t>No Oral or Written Exam [1] [2]</a:t>
+              <a:t>Major Milestones</a:t>
             </a:r>
             <a:endParaRPr/>
           </a:p>
         </p:txBody>
       </p:sp>
-      <p:pic>
-        <p:nvPicPr>
+      <p:sp>
+        <p:nvSpPr>
           <p:cNvPr id="142" name="Google Shape;142;p23"/>
-          <p:cNvPicPr preferRelativeResize="0"/>
-          <p:nvPr/>
-        </p:nvPicPr>
-        <p:blipFill>
-          <a:blip r:embed="rId3">
-            <a:alphaModFix/>
-          </a:blip>
-          <a:stretch>
-            <a:fillRect/>
-          </a:stretch>
-        </p:blipFill>
+          <p:cNvSpPr txBox="1"/>
+          <p:nvPr>
+            <p:ph idx="1" type="body"/>
+          </p:nvPr>
+        </p:nvSpPr>
         <p:spPr>
           <a:xfrm>
-            <a:off x="2743200" y="914400"/>
-            <a:ext cx="3657601" cy="3649471"/>
+            <a:off x="274320" y="914400"/>
+            <a:ext cx="8595300" cy="4114800"/>
           </a:xfrm>
           <a:prstGeom prst="rect">
             <a:avLst/>
           </a:prstGeom>
-          <a:noFill/>
-          <a:ln>
-            <a:noFill/>
-          </a:ln>
-        </p:spPr>
-      </p:pic>
-      <p:sp>
-        <p:nvSpPr>
-          <p:cNvPr id="143" name="Google Shape;143;p23"/>
-          <p:cNvSpPr txBox="1"/>
-          <p:nvPr/>
-        </p:nvSpPr>
-        <p:spPr>
-          <a:xfrm>
-            <a:off x="0" y="4233672"/>
-            <a:ext cx="9144000" cy="914400"/>
-          </a:xfrm>
-          <a:prstGeom prst="rect">
-            <a:avLst/>
-          </a:prstGeom>
-          <a:noFill/>
-          <a:ln>
-            <a:noFill/>
-          </a:ln>
         </p:spPr>
         <p:txBody>
-          <a:bodyPr anchorCtr="0" anchor="b" bIns="91425" lIns="91425" spcFirstLastPara="1" rIns="91425" wrap="square" tIns="91425">
+          <a:bodyPr anchorCtr="0" anchor="t" bIns="0" lIns="0" spcFirstLastPara="1" rIns="0" wrap="square" tIns="0">
             <a:noAutofit/>
           </a:bodyPr>
           <a:lstStyle/>
           <a:p>
-            <a:pPr indent="0" lvl="0" marL="0" rtl="0" algn="l">
-              <a:spcBef>
-                <a:spcPts val="0"/>
-              </a:spcBef>
-              <a:spcAft>
-                <a:spcPts val="0"/>
-              </a:spcAft>
-              <a:buNone/>
-            </a:pPr>
-            <a:r>
-              <a:rPr lang="en"/>
-              <a:t>[1] If both you and we don’t want to</a:t>
-            </a:r>
-            <a:endParaRPr/>
-          </a:p>
-          <a:p>
-            <a:pPr indent="0" lvl="0" marL="0" rtl="0" algn="l">
-              <a:spcBef>
-                <a:spcPts val="0"/>
-              </a:spcBef>
-              <a:spcAft>
-                <a:spcPts val="0"/>
-              </a:spcAft>
-              <a:buNone/>
-            </a:pPr>
-            <a:r>
-              <a:rPr lang="en"/>
-              <a:t>[2] You still have to register for the course</a:t>
+            <a:pPr indent="-342900" lvl="0" marL="457200" rtl="0" algn="l">
+              <a:spcBef>
+                <a:spcPts val="0"/>
+              </a:spcBef>
+              <a:spcAft>
+                <a:spcPts val="0"/>
+              </a:spcAft>
+              <a:buSzPts val="1800"/>
+              <a:buAutoNum type="arabicPeriod"/>
+            </a:pPr>
+            <a:r>
+              <a:rPr lang="en"/>
+              <a:t>Build process review (quality gate)</a:t>
+            </a:r>
+            <a:endParaRPr/>
+          </a:p>
+          <a:p>
+            <a:pPr indent="-317500" lvl="1" marL="914400" rtl="0" algn="l">
+              <a:spcBef>
+                <a:spcPts val="0"/>
+              </a:spcBef>
+              <a:spcAft>
+                <a:spcPts val="0"/>
+              </a:spcAft>
+              <a:buSzPts val="1400"/>
+              <a:buAutoNum type="alphaLcPeriod"/>
+            </a:pPr>
+            <a:r>
+              <a:rPr lang="en"/>
+              <a:t>You are </a:t>
+            </a:r>
+            <a:r>
+              <a:rPr lang="en"/>
+              <a:t>expected to demo a well working build process</a:t>
+            </a:r>
+            <a:endParaRPr/>
+          </a:p>
+          <a:p>
+            <a:pPr indent="-317500" lvl="1" marL="914400" rtl="0" algn="l">
+              <a:spcBef>
+                <a:spcPts val="0"/>
+              </a:spcBef>
+              <a:spcAft>
+                <a:spcPts val="0"/>
+              </a:spcAft>
+              <a:buSzPts val="1400"/>
+              <a:buAutoNum type="alphaLcPeriod"/>
+            </a:pPr>
+            <a:r>
+              <a:rPr lang="en"/>
+              <a:t>If you fail, you will be put on notice</a:t>
+            </a:r>
+            <a:endParaRPr/>
+          </a:p>
+          <a:p>
+            <a:pPr indent="-342900" lvl="0" marL="457200" rtl="0" algn="l">
+              <a:spcBef>
+                <a:spcPts val="1000"/>
+              </a:spcBef>
+              <a:spcAft>
+                <a:spcPts val="0"/>
+              </a:spcAft>
+              <a:buSzPts val="1800"/>
+              <a:buAutoNum type="arabicPeriod"/>
+            </a:pPr>
+            <a:r>
+              <a:rPr lang="en"/>
+              <a:t>Mid-project review (quality gate)</a:t>
+            </a:r>
+            <a:endParaRPr/>
+          </a:p>
+          <a:p>
+            <a:pPr indent="-317500" lvl="1" marL="914400" rtl="0" algn="l">
+              <a:spcBef>
+                <a:spcPts val="0"/>
+              </a:spcBef>
+              <a:spcAft>
+                <a:spcPts val="0"/>
+              </a:spcAft>
+              <a:buSzPts val="1400"/>
+              <a:buAutoNum type="alphaLcPeriod"/>
+            </a:pPr>
+            <a:r>
+              <a:rPr lang="en"/>
+              <a:t>You are expected to demonstrate your work</a:t>
+            </a:r>
+            <a:endParaRPr/>
+          </a:p>
+          <a:p>
+            <a:pPr indent="-317500" lvl="1" marL="914400" rtl="0" algn="l">
+              <a:spcBef>
+                <a:spcPts val="0"/>
+              </a:spcBef>
+              <a:spcAft>
+                <a:spcPts val="0"/>
+              </a:spcAft>
+              <a:buSzPts val="1400"/>
+              <a:buAutoNum type="alphaLcPeriod"/>
+            </a:pPr>
+            <a:r>
+              <a:rPr lang="en"/>
+              <a:t>If you fail, you may lose your industry partner</a:t>
+            </a:r>
+            <a:endParaRPr/>
+          </a:p>
+          <a:p>
+            <a:pPr indent="-342900" lvl="0" marL="457200" rtl="0" algn="l">
+              <a:spcBef>
+                <a:spcPts val="1000"/>
+              </a:spcBef>
+              <a:spcAft>
+                <a:spcPts val="1200"/>
+              </a:spcAft>
+              <a:buSzPts val="1800"/>
+              <a:buAutoNum type="arabicPeriod"/>
+            </a:pPr>
+            <a:r>
+              <a:rPr lang="en"/>
+              <a:t>Final project release and demo day</a:t>
             </a:r>
             <a:endParaRPr/>
           </a:p>
@@ -10431,7 +10951,7 @@
       </p:sp>
       <p:sp>
         <p:nvSpPr>
-          <p:cNvPr id="144" name="Google Shape;144;p23"/>
+          <p:cNvPr id="143" name="Google Shape;143;p23"/>
           <p:cNvSpPr txBox="1"/>
           <p:nvPr>
             <p:ph idx="12" type="sldNum"/>
@@ -10482,7 +11002,7 @@
                 <a:solidFill>
                   <a:schemeClr val="hlink"/>
                 </a:solidFill>
-                <a:hlinkClick r:id="rId4"/>
+                <a:hlinkClick r:id="rId3"/>
               </a:rPr>
               <a:t>https://profriehle.com</a:t>
             </a:r>
@@ -10498,6 +11018,34 @@
           </a:p>
         </p:txBody>
       </p:sp>
+      <p:pic>
+        <p:nvPicPr>
+          <p:cNvPr id="144" name="Google Shape;144;p23"/>
+          <p:cNvPicPr preferRelativeResize="0"/>
+          <p:nvPr/>
+        </p:nvPicPr>
+        <p:blipFill>
+          <a:blip r:embed="rId4">
+            <a:alphaModFix/>
+          </a:blip>
+          <a:stretch>
+            <a:fillRect/>
+          </a:stretch>
+        </p:blipFill>
+        <p:spPr>
+          <a:xfrm>
+            <a:off x="6355080" y="1066800"/>
+            <a:ext cx="1828800" cy="1828800"/>
+          </a:xfrm>
+          <a:prstGeom prst="rect">
+            <a:avLst/>
+          </a:prstGeom>
+          <a:noFill/>
+          <a:ln>
+            <a:noFill/>
+          </a:ln>
+        </p:spPr>
+      </p:pic>
     </p:spTree>
   </p:cSld>
   <p:clrMapOvr>
@@ -10557,7 +11105,7 @@
             </a:pPr>
             <a:r>
               <a:rPr lang="en"/>
-              <a:t>Course Language [1]</a:t>
+              <a:t>Team Issues</a:t>
             </a:r>
             <a:endParaRPr/>
           </a:p>
@@ -10566,61 +11114,6 @@
       <p:sp>
         <p:nvSpPr>
           <p:cNvPr id="150" name="Google Shape;150;p24"/>
-          <p:cNvSpPr txBox="1"/>
-          <p:nvPr/>
-        </p:nvSpPr>
-        <p:spPr>
-          <a:xfrm>
-            <a:off x="0" y="4229100"/>
-            <a:ext cx="9144000" cy="914400"/>
-          </a:xfrm>
-          <a:prstGeom prst="rect">
-            <a:avLst/>
-          </a:prstGeom>
-          <a:noFill/>
-          <a:ln>
-            <a:noFill/>
-          </a:ln>
-        </p:spPr>
-        <p:txBody>
-          <a:bodyPr anchorCtr="0" anchor="b" bIns="91425" lIns="91425" spcFirstLastPara="1" rIns="91425" wrap="square" tIns="91425">
-            <a:noAutofit/>
-          </a:bodyPr>
-          <a:lstStyle/>
-          <a:p>
-            <a:pPr indent="0" lvl="0" marL="0" rtl="0" algn="l">
-              <a:spcBef>
-                <a:spcPts val="0"/>
-              </a:spcBef>
-              <a:spcAft>
-                <a:spcPts val="0"/>
-              </a:spcAft>
-              <a:buNone/>
-            </a:pPr>
-            <a:r>
-              <a:rPr lang="en"/>
-              <a:t>[1] See </a:t>
-            </a:r>
-            <a:r>
-              <a:rPr lang="en" u="sng">
-                <a:solidFill>
-                  <a:schemeClr val="hlink"/>
-                </a:solidFill>
-                <a:hlinkClick r:id="rId3"/>
-              </a:rPr>
-              <a:t>https://oss.cs.fau.de/2012/03/10/english-or-german-deutsch-oder-englisch/</a:t>
-            </a:r>
-            <a:r>
-              <a:rPr lang="en"/>
-              <a:t> </a:t>
-            </a:r>
-            <a:endParaRPr/>
-          </a:p>
-        </p:txBody>
-      </p:sp>
-      <p:sp>
-        <p:nvSpPr>
-          <p:cNvPr id="151" name="Google Shape;151;p24"/>
           <p:cNvSpPr txBox="1"/>
           <p:nvPr>
             <p:ph idx="1" type="body"/>
@@ -10648,18 +11141,13 @@
               <a:spcAft>
                 <a:spcPts val="0"/>
               </a:spcAft>
-              <a:buClr>
-                <a:schemeClr val="dk1"/>
-              </a:buClr>
-              <a:buSzPts val="1100"/>
-              <a:buFont typeface="Arial"/>
-              <a:buNone/>
-            </a:pPr>
-            <a:r>
-              <a:rPr b="1" lang="en"/>
-              <a:t>Class</a:t>
-            </a:r>
-            <a:endParaRPr b="1"/>
+              <a:buNone/>
+            </a:pPr>
+            <a:r>
+              <a:rPr lang="en"/>
+              <a:t>We grade your individual performance, not the team performance</a:t>
+            </a:r>
+            <a:endParaRPr/>
           </a:p>
           <a:p>
             <a:pPr indent="-342900" lvl="0" marL="457200" rtl="0" algn="l">
@@ -10674,7 +11162,7 @@
             </a:pPr>
             <a:r>
               <a:rPr lang="en"/>
-              <a:t>Lecturer: English</a:t>
+              <a:t>A great team motivates everyone, increases productivity</a:t>
             </a:r>
             <a:endParaRPr/>
           </a:p>
@@ -10691,7 +11179,7 @@
             </a:pPr>
             <a:r>
               <a:rPr lang="en"/>
-              <a:t>Student: Choice of German or English</a:t>
+              <a:t>Encourage slackers to improve and don’t cover for them</a:t>
             </a:r>
             <a:endParaRPr/>
           </a:p>
@@ -10701,67 +11189,13 @@
                 <a:spcPts val="1200"/>
               </a:spcBef>
               <a:spcAft>
-                <a:spcPts val="0"/>
-              </a:spcAft>
-              <a:buClr>
-                <a:schemeClr val="dk1"/>
-              </a:buClr>
-              <a:buSzPts val="1100"/>
-              <a:buFont typeface="Arial"/>
-              <a:buNone/>
-            </a:pPr>
-            <a:r>
-              <a:rPr b="1" lang="en"/>
-              <a:t>Project</a:t>
-            </a:r>
-            <a:endParaRPr b="1"/>
-          </a:p>
-          <a:p>
-            <a:pPr indent="-342900" lvl="0" marL="457200" rtl="0" algn="l">
-              <a:spcBef>
                 <a:spcPts val="1200"/>
-              </a:spcBef>
-              <a:spcAft>
-                <a:spcPts val="0"/>
-              </a:spcAft>
-              <a:buSzPts val="1800"/>
-              <a:buChar char="●"/>
-            </a:pPr>
-            <a:r>
-              <a:rPr lang="en"/>
-              <a:t>Instructor: English</a:t>
-            </a:r>
-            <a:endParaRPr/>
-          </a:p>
-          <a:p>
-            <a:pPr indent="-342900" lvl="0" marL="457200" rtl="0" algn="l">
-              <a:spcBef>
-                <a:spcPts val="0"/>
-              </a:spcBef>
-              <a:spcAft>
-                <a:spcPts val="0"/>
-              </a:spcAft>
-              <a:buSzPts val="1800"/>
-              <a:buChar char="●"/>
-            </a:pPr>
-            <a:r>
-              <a:rPr lang="en"/>
-              <a:t>Team: Choice of German or English</a:t>
-            </a:r>
-            <a:endParaRPr/>
-          </a:p>
-          <a:p>
-            <a:pPr indent="0" lvl="0" marL="0" rtl="0" algn="l">
-              <a:spcBef>
-                <a:spcPts val="1200"/>
-              </a:spcBef>
-              <a:spcAft>
-                <a:spcPts val="1200"/>
-              </a:spcAft>
-              <a:buNone/>
-            </a:pPr>
-            <a:r>
-              <a:t/>
+              </a:spcAft>
+              <a:buNone/>
+            </a:pPr>
+            <a:r>
+              <a:rPr lang="en"/>
+              <a:t>The Scrum master is responsible for resolving process impediments</a:t>
             </a:r>
             <a:endParaRPr/>
           </a:p>
@@ -10769,7 +11203,7 @@
       </p:sp>
       <p:sp>
         <p:nvSpPr>
-          <p:cNvPr id="152" name="Google Shape;152;p24"/>
+          <p:cNvPr id="151" name="Google Shape;151;p24"/>
           <p:cNvSpPr txBox="1"/>
           <p:nvPr>
             <p:ph idx="12" type="sldNum"/>
@@ -10820,7 +11254,7 @@
                 <a:solidFill>
                   <a:schemeClr val="hlink"/>
                 </a:solidFill>
-                <a:hlinkClick r:id="rId4"/>
+                <a:hlinkClick r:id="rId3"/>
               </a:rPr>
               <a:t>https://profriehle.com</a:t>
             </a:r>
@@ -10849,7 +11283,7 @@
   <p:cSld>
     <p:spTree>
       <p:nvGrpSpPr>
-        <p:cNvPr id="156" name="Shape 156"/>
+        <p:cNvPr id="155" name="Shape 155"/>
         <p:cNvGrpSpPr/>
         <p:nvPr/>
       </p:nvGrpSpPr>
@@ -10861,6 +11295,128 @@
           <a:chExt cx="0" cy="0"/>
         </a:xfrm>
       </p:grpSpPr>
+      <p:sp>
+        <p:nvSpPr>
+          <p:cNvPr id="156" name="Google Shape;156;p25"/>
+          <p:cNvSpPr txBox="1"/>
+          <p:nvPr>
+            <p:ph idx="1" type="body"/>
+          </p:nvPr>
+        </p:nvSpPr>
+        <p:spPr>
+          <a:xfrm>
+            <a:off x="274320" y="914400"/>
+            <a:ext cx="8595300" cy="4114800"/>
+          </a:xfrm>
+          <a:prstGeom prst="rect">
+            <a:avLst/>
+          </a:prstGeom>
+        </p:spPr>
+        <p:txBody>
+          <a:bodyPr anchorCtr="0" anchor="t" bIns="0" lIns="0" spcFirstLastPara="1" rIns="0" wrap="square" tIns="0">
+            <a:noAutofit/>
+          </a:bodyPr>
+          <a:lstStyle/>
+          <a:p>
+            <a:pPr indent="0" lvl="0" marL="0" rtl="0" algn="l">
+              <a:spcBef>
+                <a:spcPts val="0"/>
+              </a:spcBef>
+              <a:spcAft>
+                <a:spcPts val="0"/>
+              </a:spcAft>
+              <a:buNone/>
+            </a:pPr>
+            <a:r>
+              <a:rPr lang="en"/>
+              <a:t>You can ask questions using the </a:t>
+            </a:r>
+            <a:r>
+              <a:rPr b="1" lang="en"/>
+              <a:t>AMOS</a:t>
+            </a:r>
+            <a:r>
+              <a:rPr lang="en"/>
+              <a:t> course channel on Slack [1] at</a:t>
+            </a:r>
+            <a:endParaRPr/>
+          </a:p>
+          <a:p>
+            <a:pPr indent="-342900" lvl="0" marL="457200" rtl="0" algn="l">
+              <a:spcBef>
+                <a:spcPts val="1200"/>
+              </a:spcBef>
+              <a:spcAft>
+                <a:spcPts val="0"/>
+              </a:spcAft>
+              <a:buSzPts val="1800"/>
+              <a:buChar char="●"/>
+            </a:pPr>
+            <a:r>
+              <a:rPr lang="en" u="sng">
+                <a:solidFill>
+                  <a:schemeClr val="hlink"/>
+                </a:solidFill>
+                <a:hlinkClick r:id="rId3"/>
+              </a:rPr>
+              <a:t>https://join.slack.com/t/amosproj/signup</a:t>
+            </a:r>
+            <a:r>
+              <a:rPr lang="en"/>
+              <a:t> </a:t>
+            </a:r>
+            <a:endParaRPr/>
+          </a:p>
+          <a:p>
+            <a:pPr indent="0" lvl="0" marL="0" rtl="0" algn="l">
+              <a:spcBef>
+                <a:spcPts val="1200"/>
+              </a:spcBef>
+              <a:spcAft>
+                <a:spcPts val="0"/>
+              </a:spcAft>
+              <a:buNone/>
+            </a:pPr>
+            <a:r>
+              <a:rPr lang="en"/>
+              <a:t>There is no downside to asking questions (no malus)</a:t>
+            </a:r>
+            <a:endParaRPr/>
+          </a:p>
+          <a:p>
+            <a:pPr indent="-342900" lvl="0" marL="457200" rtl="0" algn="l">
+              <a:spcBef>
+                <a:spcPts val="1200"/>
+              </a:spcBef>
+              <a:spcAft>
+                <a:spcPts val="0"/>
+              </a:spcAft>
+              <a:buSzPts val="1800"/>
+              <a:buChar char="●"/>
+            </a:pPr>
+            <a:r>
+              <a:rPr lang="en"/>
+              <a:t>Quality answers will afford a bonus to the answering student</a:t>
+            </a:r>
+            <a:endParaRPr/>
+          </a:p>
+          <a:p>
+            <a:pPr indent="0" lvl="0" marL="0" rtl="0" algn="l">
+              <a:spcBef>
+                <a:spcPts val="1200"/>
+              </a:spcBef>
+              <a:spcAft>
+                <a:spcPts val="1200"/>
+              </a:spcAft>
+              <a:buNone/>
+            </a:pPr>
+            <a:r>
+              <a:t/>
+            </a:r>
+            <a:endParaRPr/>
+          </a:p>
+        </p:txBody>
+      </p:sp>
       <p:sp>
         <p:nvSpPr>
           <p:cNvPr id="157" name="Google Shape;157;p25"/>
@@ -10895,7 +11451,7 @@
             </a:pPr>
             <a:r>
               <a:rPr lang="en"/>
-              <a:t>Course Organization</a:t>
+              <a:t>The AMOS Consultancy</a:t>
             </a:r>
             <a:endParaRPr/>
           </a:p>
@@ -10904,234 +11460,6 @@
       <p:sp>
         <p:nvSpPr>
           <p:cNvPr id="158" name="Google Shape;158;p25"/>
-          <p:cNvSpPr txBox="1"/>
-          <p:nvPr>
-            <p:ph idx="1" type="body"/>
-          </p:nvPr>
-        </p:nvSpPr>
-        <p:spPr>
-          <a:xfrm>
-            <a:off x="274320" y="914400"/>
-            <a:ext cx="8595300" cy="4114800"/>
-          </a:xfrm>
-          <a:prstGeom prst="rect">
-            <a:avLst/>
-          </a:prstGeom>
-        </p:spPr>
-        <p:txBody>
-          <a:bodyPr anchorCtr="0" anchor="t" bIns="0" lIns="0" spcFirstLastPara="1" rIns="0" wrap="square" tIns="0">
-            <a:noAutofit/>
-          </a:bodyPr>
-          <a:lstStyle/>
-          <a:p>
-            <a:pPr indent="0" lvl="0" marL="0" rtl="0" algn="l">
-              <a:spcBef>
-                <a:spcPts val="0"/>
-              </a:spcBef>
-              <a:spcAft>
-                <a:spcPts val="0"/>
-              </a:spcAft>
-              <a:buClr>
-                <a:schemeClr val="dk1"/>
-              </a:buClr>
-              <a:buSzPts val="1100"/>
-              <a:buFont typeface="Arial"/>
-              <a:buNone/>
-            </a:pPr>
-            <a:r>
-              <a:rPr b="1" lang="en"/>
-              <a:t>Course organization</a:t>
-            </a:r>
-            <a:endParaRPr b="1"/>
-          </a:p>
-          <a:p>
-            <a:pPr indent="-342900" lvl="0" marL="457200" rtl="0" algn="l">
-              <a:spcBef>
-                <a:spcPts val="1200"/>
-              </a:spcBef>
-              <a:spcAft>
-                <a:spcPts val="0"/>
-              </a:spcAft>
-              <a:buSzPts val="1800"/>
-              <a:buChar char="●"/>
-            </a:pPr>
-            <a:r>
-              <a:rPr lang="en"/>
-              <a:t>See </a:t>
-            </a:r>
-            <a:r>
-              <a:rPr lang="en" u="sng">
-                <a:solidFill>
-                  <a:schemeClr val="hlink"/>
-                </a:solidFill>
-                <a:hlinkClick r:id="rId3"/>
-              </a:rPr>
-              <a:t>https://amos.uni1.de</a:t>
-            </a:r>
-            <a:r>
-              <a:rPr lang="en"/>
-              <a:t> </a:t>
-            </a:r>
-            <a:endParaRPr/>
-          </a:p>
-          <a:p>
-            <a:pPr indent="0" lvl="0" marL="0" rtl="0" algn="l">
-              <a:spcBef>
-                <a:spcPts val="1200"/>
-              </a:spcBef>
-              <a:spcAft>
-                <a:spcPts val="0"/>
-              </a:spcAft>
-              <a:buClr>
-                <a:schemeClr val="dk1"/>
-              </a:buClr>
-              <a:buSzPts val="1100"/>
-              <a:buFont typeface="Arial"/>
-              <a:buNone/>
-            </a:pPr>
-            <a:r>
-              <a:rPr b="1" lang="en"/>
-              <a:t>Course schedule</a:t>
-            </a:r>
-            <a:endParaRPr b="1"/>
-          </a:p>
-          <a:p>
-            <a:pPr indent="-342900" lvl="0" marL="457200" rtl="0" algn="l">
-              <a:spcBef>
-                <a:spcPts val="1200"/>
-              </a:spcBef>
-              <a:spcAft>
-                <a:spcPts val="0"/>
-              </a:spcAft>
-              <a:buSzPts val="1800"/>
-              <a:buChar char="●"/>
-            </a:pPr>
-            <a:r>
-              <a:rPr lang="en"/>
-              <a:t>See </a:t>
-            </a:r>
-            <a:r>
-              <a:rPr b="1" lang="en"/>
-              <a:t>Schedule</a:t>
-            </a:r>
-            <a:r>
-              <a:rPr lang="en"/>
-              <a:t> tab on Course Organization doc</a:t>
-            </a:r>
-            <a:endParaRPr/>
-          </a:p>
-          <a:p>
-            <a:pPr indent="0" lvl="0" marL="0" rtl="0" algn="l">
-              <a:spcBef>
-                <a:spcPts val="1200"/>
-              </a:spcBef>
-              <a:spcAft>
-                <a:spcPts val="0"/>
-              </a:spcAft>
-              <a:buClr>
-                <a:schemeClr val="dk1"/>
-              </a:buClr>
-              <a:buSzPts val="1100"/>
-              <a:buFont typeface="Arial"/>
-              <a:buNone/>
-            </a:pPr>
-            <a:r>
-              <a:rPr b="1" lang="en"/>
-              <a:t>Project descriptions</a:t>
-            </a:r>
-            <a:endParaRPr b="1"/>
-          </a:p>
-          <a:p>
-            <a:pPr indent="-342900" lvl="0" marL="457200" rtl="0" algn="l">
-              <a:spcBef>
-                <a:spcPts val="1200"/>
-              </a:spcBef>
-              <a:spcAft>
-                <a:spcPts val="0"/>
-              </a:spcAft>
-              <a:buSzPts val="1800"/>
-              <a:buChar char="●"/>
-            </a:pPr>
-            <a:r>
-              <a:rPr lang="en"/>
-              <a:t>See </a:t>
-            </a:r>
-            <a:r>
-              <a:rPr b="1" lang="en"/>
-              <a:t>Project Descriptions </a:t>
-            </a:r>
-            <a:r>
-              <a:rPr lang="en"/>
-              <a:t>on Course Organization doc</a:t>
-            </a:r>
-            <a:endParaRPr/>
-          </a:p>
-          <a:p>
-            <a:pPr indent="0" lvl="0" marL="0" rtl="0" algn="l">
-              <a:spcBef>
-                <a:spcPts val="1200"/>
-              </a:spcBef>
-              <a:spcAft>
-                <a:spcPts val="0"/>
-              </a:spcAft>
-              <a:buClr>
-                <a:schemeClr val="dk1"/>
-              </a:buClr>
-              <a:buSzPts val="1100"/>
-              <a:buFont typeface="Arial"/>
-              <a:buNone/>
-            </a:pPr>
-            <a:r>
-              <a:rPr b="1" lang="en"/>
-              <a:t>Project teams</a:t>
-            </a:r>
-            <a:endParaRPr b="1"/>
-          </a:p>
-          <a:p>
-            <a:pPr indent="-342900" lvl="0" marL="457200" rtl="0" algn="l">
-              <a:spcBef>
-                <a:spcPts val="1200"/>
-              </a:spcBef>
-              <a:spcAft>
-                <a:spcPts val="0"/>
-              </a:spcAft>
-              <a:buSzPts val="1800"/>
-              <a:buChar char="●"/>
-            </a:pPr>
-            <a:r>
-              <a:rPr lang="en"/>
-              <a:t>See </a:t>
-            </a:r>
-            <a:r>
-              <a:rPr b="1" lang="en"/>
-              <a:t>Project Teams</a:t>
-            </a:r>
-            <a:r>
-              <a:rPr lang="en"/>
-              <a:t> tab on Course Organization doc</a:t>
-            </a:r>
-            <a:endParaRPr/>
-          </a:p>
-          <a:p>
-            <a:pPr indent="0" lvl="0" marL="0" rtl="0" algn="l">
-              <a:spcBef>
-                <a:spcPts val="1200"/>
-              </a:spcBef>
-              <a:spcAft>
-                <a:spcPts val="1200"/>
-              </a:spcAft>
-              <a:buNone/>
-            </a:pPr>
-            <a:r>
-              <a:t/>
-            </a:r>
-            <a:endParaRPr/>
-          </a:p>
-        </p:txBody>
-      </p:sp>
-      <p:sp>
-        <p:nvSpPr>
-          <p:cNvPr id="159" name="Google Shape;159;p25"/>
           <p:cNvSpPr txBox="1"/>
           <p:nvPr>
             <p:ph idx="12" type="sldNum"/>
@@ -11193,6 +11521,48 @@
                 </a:solidFill>
               </a:rPr>
               <a:t> </a:t>
+            </a:r>
+            <a:endParaRPr/>
+          </a:p>
+        </p:txBody>
+      </p:sp>
+      <p:sp>
+        <p:nvSpPr>
+          <p:cNvPr id="159" name="Google Shape;159;p25"/>
+          <p:cNvSpPr txBox="1"/>
+          <p:nvPr/>
+        </p:nvSpPr>
+        <p:spPr>
+          <a:xfrm>
+            <a:off x="0" y="4233672"/>
+            <a:ext cx="7315200" cy="914400"/>
+          </a:xfrm>
+          <a:prstGeom prst="rect">
+            <a:avLst/>
+          </a:prstGeom>
+          <a:noFill/>
+          <a:ln>
+            <a:noFill/>
+          </a:ln>
+        </p:spPr>
+        <p:txBody>
+          <a:bodyPr anchorCtr="0" anchor="b" bIns="91425" lIns="91425" spcFirstLastPara="1" rIns="91425" wrap="square" tIns="91425">
+            <a:noAutofit/>
+          </a:bodyPr>
+          <a:lstStyle/>
+          <a:p>
+            <a:pPr indent="0" lvl="0" marL="0" rtl="0" algn="l">
+              <a:spcBef>
+                <a:spcPts val="0"/>
+              </a:spcBef>
+              <a:spcAft>
+                <a:spcPts val="0"/>
+              </a:spcAft>
+              <a:buNone/>
+            </a:pPr>
+            <a:r>
+              <a:rPr lang="en"/>
+              <a:t>[1] We expect to move to an open source solution but aren’t there yet</a:t>
             </a:r>
             <a:endParaRPr/>
           </a:p>
@@ -11257,7 +11627,7 @@
             </a:pPr>
             <a:r>
               <a:rPr lang="en"/>
-              <a:t>Work Rhythm</a:t>
+              <a:t>Course Registration vs. Exam Registration</a:t>
             </a:r>
             <a:endParaRPr/>
           </a:p>
@@ -11293,18 +11663,17 @@
               <a:spcAft>
                 <a:spcPts val="0"/>
               </a:spcAft>
-              <a:buClr>
-                <a:schemeClr val="dk1"/>
-              </a:buClr>
-              <a:buSzPts val="1100"/>
-              <a:buFont typeface="Arial"/>
               <a:buNone/>
             </a:pPr>
             <a:r>
               <a:rPr b="1" lang="en"/>
-              <a:t>Lectures</a:t>
-            </a:r>
-            <a:endParaRPr b="1"/>
+              <a:t>Step 1: Course registration </a:t>
+            </a:r>
+            <a:r>
+              <a:rPr lang="en"/>
+              <a:t>(German: Kursanmeldung)</a:t>
+            </a:r>
+            <a:endParaRPr/>
           </a:p>
           <a:p>
             <a:pPr indent="-342900" lvl="0" marL="457200" rtl="0" algn="l">
@@ -11319,35 +11688,14 @@
             </a:pPr>
             <a:r>
               <a:rPr lang="en"/>
-              <a:t>Class day (90min.)</a:t>
-            </a:r>
-            <a:endParaRPr/>
-          </a:p>
-          <a:p>
-            <a:pPr indent="0" lvl="0" marL="0" rtl="0" algn="l">
-              <a:spcBef>
-                <a:spcPts val="1200"/>
-              </a:spcBef>
-              <a:spcAft>
-                <a:spcPts val="0"/>
-              </a:spcAft>
-              <a:buClr>
-                <a:schemeClr val="dk1"/>
-              </a:buClr>
-              <a:buSzPts val="1100"/>
-              <a:buFont typeface="Arial"/>
-              <a:buNone/>
-            </a:pPr>
-            <a:r>
-              <a:rPr b="1" lang="en"/>
-              <a:t>Team meetings</a:t>
-            </a:r>
-            <a:endParaRPr b="1"/>
+              <a:t>Students sign up through the course management system</a:t>
+            </a:r>
+            <a:endParaRPr/>
           </a:p>
           <a:p>
             <a:pPr indent="-342900" lvl="0" marL="457200" rtl="0" algn="l">
               <a:spcBef>
-                <a:spcPts val="1200"/>
+                <a:spcPts val="0"/>
               </a:spcBef>
               <a:spcAft>
                 <a:spcPts val="0"/>
@@ -11357,39 +11705,14 @@
             </a:pPr>
             <a:r>
               <a:rPr lang="en"/>
-              <a:t>Next slot after lecture</a:t>
-            </a:r>
-            <a:endParaRPr/>
-          </a:p>
-          <a:p>
-            <a:pPr indent="0" lvl="0" marL="0" rtl="0" algn="l">
-              <a:spcBef>
-                <a:spcPts val="1200"/>
-              </a:spcBef>
-              <a:spcAft>
-                <a:spcPts val="0"/>
-              </a:spcAft>
-              <a:buClr>
-                <a:schemeClr val="dk1"/>
-              </a:buClr>
-              <a:buSzPts val="1100"/>
-              <a:buFont typeface="Arial"/>
-              <a:buNone/>
-            </a:pPr>
-            <a:r>
-              <a:rPr b="1" lang="en"/>
-              <a:t>Project work</a:t>
-            </a:r>
-            <a:r>
-              <a:rPr lang="en"/>
-              <a:t> (self-organized)</a:t>
+              <a:t>You may or may not get in, various rules and regulations apply</a:t>
             </a:r>
             <a:endParaRPr/>
           </a:p>
           <a:p>
             <a:pPr indent="-342900" lvl="0" marL="457200" rtl="0" algn="l">
               <a:spcBef>
-                <a:spcPts val="1200"/>
+                <a:spcPts val="0"/>
               </a:spcBef>
               <a:spcAft>
                 <a:spcPts val="0"/>
@@ -11399,7 +11722,7 @@
             </a:pPr>
             <a:r>
               <a:rPr lang="en"/>
-              <a:t>Deliverables due according to schedule</a:t>
+              <a:t>The earlier you sign up, the more likely you are to get in</a:t>
             </a:r>
             <a:endParaRPr/>
           </a:p>
@@ -11409,12 +11732,68 @@
                 <a:spcPts val="1200"/>
               </a:spcBef>
               <a:spcAft>
+                <a:spcPts val="0"/>
+              </a:spcAft>
+              <a:buNone/>
+            </a:pPr>
+            <a:r>
+              <a:rPr b="1" lang="en"/>
+              <a:t>Step 2: Exam registration </a:t>
+            </a:r>
+            <a:r>
+              <a:rPr lang="en"/>
+              <a:t>(German: Prüfungsanmeldung)</a:t>
+            </a:r>
+            <a:endParaRPr/>
+          </a:p>
+          <a:p>
+            <a:pPr indent="-342900" lvl="0" marL="457200" rtl="0" algn="l">
+              <a:spcBef>
                 <a:spcPts val="1200"/>
-              </a:spcAft>
-              <a:buNone/>
-            </a:pPr>
-            <a:r>
-              <a:t/>
+              </a:spcBef>
+              <a:spcAft>
+                <a:spcPts val="0"/>
+              </a:spcAft>
+              <a:buSzPts val="1800"/>
+              <a:buChar char="●"/>
+            </a:pPr>
+            <a:r>
+              <a:rPr lang="en"/>
+              <a:t>During the first weeks of the course, you can decide to drop out</a:t>
+            </a:r>
+            <a:endParaRPr/>
+          </a:p>
+          <a:p>
+            <a:pPr indent="-342900" lvl="0" marL="457200" rtl="0" algn="l">
+              <a:spcBef>
+                <a:spcPts val="0"/>
+              </a:spcBef>
+              <a:spcAft>
+                <a:spcPts val="0"/>
+              </a:spcAft>
+              <a:buSzPts val="1800"/>
+              <a:buChar char="●"/>
+            </a:pPr>
+            <a:r>
+              <a:rPr lang="en"/>
+              <a:t>Four weeks (or so) into the semester, you can register for the exam</a:t>
+            </a:r>
+            <a:endParaRPr/>
+          </a:p>
+          <a:p>
+            <a:pPr indent="-342900" lvl="0" marL="457200" rtl="0" algn="l">
+              <a:spcBef>
+                <a:spcPts val="0"/>
+              </a:spcBef>
+              <a:spcAft>
+                <a:spcPts val="0"/>
+              </a:spcAft>
+              <a:buSzPts val="1800"/>
+              <a:buChar char="●"/>
+            </a:pPr>
+            <a:r>
+              <a:rPr lang="en"/>
+              <a:t>After exam registration closes, your decision is binding</a:t>
             </a:r>
             <a:endParaRPr/>
           </a:p>
@@ -11860,7 +12239,7 @@
             </a:pPr>
             <a:r>
               <a:rPr lang="en"/>
-              <a:t>Course Communication</a:t>
+              <a:t>Receiving a Grade for the Course</a:t>
             </a:r>
             <a:endParaRPr/>
           </a:p>
@@ -11904,12 +12283,8 @@
               <a:buNone/>
             </a:pPr>
             <a:r>
-              <a:rPr b="1" lang="en"/>
-              <a:t>Announcements</a:t>
-            </a:r>
-            <a:r>
-              <a:rPr lang="en"/>
-              <a:t> are sent by email</a:t>
+              <a:rPr lang="en"/>
+              <a:t>If you want to receive a grade</a:t>
             </a:r>
             <a:endParaRPr/>
           </a:p>
@@ -11921,19 +12296,84 @@
               <a:spcAft>
                 <a:spcPts val="0"/>
               </a:spcAft>
+              <a:buClr>
+                <a:srgbClr val="212121"/>
+              </a:buClr>
               <a:buSzPts val="1800"/>
               <a:buChar char="●"/>
             </a:pPr>
             <a:r>
-              <a:rPr lang="en"/>
-              <a:t>Through email aliases</a:t>
+              <a:rPr lang="en">
+                <a:solidFill>
+                  <a:srgbClr val="212121"/>
+                </a:solidFill>
+              </a:rPr>
+              <a:t>You must register through your university’s exam registration system</a:t>
+            </a:r>
+            <a:endParaRPr>
+              <a:solidFill>
+                <a:srgbClr val="212121"/>
+              </a:solidFill>
+            </a:endParaRPr>
+          </a:p>
+          <a:p>
+            <a:pPr indent="-317500" lvl="1" marL="914400" rtl="0" algn="l">
+              <a:spcBef>
+                <a:spcPts val="1000"/>
+              </a:spcBef>
+              <a:spcAft>
+                <a:spcPts val="0"/>
+              </a:spcAft>
+              <a:buSzPts val="1400"/>
+              <a:buChar char="○"/>
+            </a:pPr>
+            <a:r>
+              <a:rPr b="1" lang="en"/>
+              <a:t>Your degree program may have split the course into two (VL + UE)</a:t>
+            </a:r>
+            <a:endParaRPr b="1"/>
+          </a:p>
+          <a:p>
+            <a:pPr indent="-317500" lvl="1" marL="914400" rtl="0" algn="l">
+              <a:spcBef>
+                <a:spcPts val="0"/>
+              </a:spcBef>
+              <a:spcAft>
+                <a:spcPts val="0"/>
+              </a:spcAft>
+              <a:buSzPts val="1400"/>
+              <a:buChar char="○"/>
+            </a:pPr>
+            <a:r>
+              <a:rPr b="1" lang="en"/>
+              <a:t>Please check asap that the course is available in your degree program!</a:t>
+            </a:r>
+            <a:endParaRPr b="1">
+              <a:solidFill>
+                <a:srgbClr val="212121"/>
+              </a:solidFill>
+            </a:endParaRPr>
+          </a:p>
+          <a:p>
+            <a:pPr indent="0" lvl="0" marL="0" rtl="0" algn="l">
+              <a:spcBef>
+                <a:spcPts val="1200"/>
+              </a:spcBef>
+              <a:spcAft>
+                <a:spcPts val="0"/>
+              </a:spcAft>
+              <a:buNone/>
+            </a:pPr>
+            <a:r>
+              <a:rPr lang="en"/>
+              <a:t>In case of problems, please see</a:t>
             </a:r>
             <a:endParaRPr/>
           </a:p>
           <a:p>
             <a:pPr indent="-342900" lvl="0" marL="457200" rtl="0" algn="l">
               <a:spcBef>
-                <a:spcPts val="0"/>
+                <a:spcPts val="1200"/>
               </a:spcBef>
               <a:spcAft>
                 <a:spcPts val="0"/>
@@ -11942,8 +12382,17 @@
               <a:buChar char="●"/>
             </a:pPr>
             <a:r>
-              <a:rPr lang="en"/>
-              <a:t>Through course management system</a:t>
+              <a:rPr lang="en" u="sng">
+                <a:solidFill>
+                  <a:schemeClr val="hlink"/>
+                </a:solidFill>
+                <a:hlinkClick r:id="rId3"/>
+              </a:rPr>
+              <a:t>https://oss.cs.fau.de/teaching/course-resources/course-registration/</a:t>
+            </a:r>
+            <a:r>
+              <a:rPr lang="en"/>
+              <a:t> </a:t>
             </a:r>
             <a:endParaRPr/>
           </a:p>
@@ -11953,91 +12402,13 @@
                 <a:spcPts val="1200"/>
               </a:spcBef>
               <a:spcAft>
-                <a:spcPts val="0"/>
-              </a:spcAft>
-              <a:buNone/>
-            </a:pPr>
-            <a:r>
-              <a:rPr b="1" lang="en"/>
-              <a:t>Administrative questions</a:t>
-            </a:r>
-            <a:r>
-              <a:rPr lang="en"/>
-              <a:t> to teaching team</a:t>
-            </a:r>
-            <a:endParaRPr/>
-          </a:p>
-          <a:p>
-            <a:pPr indent="-342900" lvl="0" marL="457200" rtl="0" algn="l">
-              <a:spcBef>
                 <a:spcPts val="1200"/>
-              </a:spcBef>
-              <a:spcAft>
-                <a:spcPts val="0"/>
-              </a:spcAft>
-              <a:buSzPts val="1800"/>
-              <a:buChar char="●"/>
-            </a:pPr>
-            <a:r>
-              <a:rPr lang="en"/>
-              <a:t>Please ask your question in the course forum</a:t>
-            </a:r>
-            <a:endParaRPr/>
-          </a:p>
-          <a:p>
-            <a:pPr indent="-342900" lvl="0" marL="457200" rtl="0" algn="l">
-              <a:spcBef>
-                <a:spcPts val="0"/>
-              </a:spcBef>
-              <a:spcAft>
-                <a:spcPts val="0"/>
-              </a:spcAft>
-              <a:buSzPts val="1800"/>
-              <a:buChar char="●"/>
-            </a:pPr>
-            <a:r>
-              <a:rPr lang="en"/>
-              <a:t>For private questions, use the teaching team email alias</a:t>
-            </a:r>
-            <a:endParaRPr/>
-          </a:p>
-          <a:p>
-            <a:pPr indent="0" lvl="0" marL="0" rtl="0" algn="l">
-              <a:spcBef>
-                <a:spcPts val="1200"/>
-              </a:spcBef>
-              <a:spcAft>
-                <a:spcPts val="0"/>
-              </a:spcAft>
-              <a:buClr>
-                <a:schemeClr val="dk1"/>
-              </a:buClr>
-              <a:buSzPts val="1100"/>
-              <a:buFont typeface="Arial"/>
-              <a:buNone/>
-            </a:pPr>
-            <a:r>
-              <a:rPr b="1" lang="en"/>
-              <a:t>Process questions</a:t>
-            </a:r>
-            <a:r>
-              <a:rPr lang="en"/>
-              <a:t> to your Scrum Master</a:t>
-            </a:r>
-            <a:endParaRPr/>
-          </a:p>
-          <a:p>
-            <a:pPr indent="0" lvl="0" marL="0" rtl="0" algn="l">
-              <a:spcBef>
-                <a:spcPts val="1200"/>
-              </a:spcBef>
-              <a:spcAft>
-                <a:spcPts val="1200"/>
-              </a:spcAft>
-              <a:buNone/>
-            </a:pPr>
-            <a:r>
-              <a:t/>
+              </a:spcAft>
+              <a:buNone/>
+            </a:pPr>
+            <a:r>
+              <a:rPr lang="en"/>
+              <a:t>Otherwise: No grade</a:t>
             </a:r>
             <a:endParaRPr/>
           </a:p>
@@ -12096,7 +12467,7 @@
                 <a:solidFill>
                   <a:schemeClr val="hlink"/>
                 </a:solidFill>
-                <a:hlinkClick r:id="rId3"/>
+                <a:hlinkClick r:id="rId4"/>
               </a:rPr>
               <a:t>https://profriehle.com</a:t>
             </a:r>
@@ -12142,6 +12513,1503 @@
           <p:cNvPr id="178" name="Google Shape;178;p28"/>
           <p:cNvSpPr txBox="1"/>
           <p:nvPr>
+            <p:ph type="title"/>
+          </p:nvPr>
+        </p:nvSpPr>
+        <p:spPr>
+          <a:xfrm>
+            <a:off x="0" y="0"/>
+            <a:ext cx="9144000" cy="685800"/>
+          </a:xfrm>
+          <a:prstGeom prst="rect">
+            <a:avLst/>
+          </a:prstGeom>
+        </p:spPr>
+        <p:txBody>
+          <a:bodyPr anchorCtr="0" anchor="ctr" bIns="0" lIns="274300" spcFirstLastPara="1" rIns="0" wrap="square" tIns="0">
+            <a:noAutofit/>
+          </a:bodyPr>
+          <a:lstStyle/>
+          <a:p>
+            <a:pPr indent="0" lvl="0" marL="0" rtl="0" algn="l">
+              <a:spcBef>
+                <a:spcPts val="0"/>
+              </a:spcBef>
+              <a:spcAft>
+                <a:spcPts val="0"/>
+              </a:spcAft>
+              <a:buNone/>
+            </a:pPr>
+            <a:r>
+              <a:rPr lang="en"/>
+              <a:t>No Oral or Written Exam [1] [2]</a:t>
+            </a:r>
+            <a:endParaRPr/>
+          </a:p>
+        </p:txBody>
+      </p:sp>
+      <p:pic>
+        <p:nvPicPr>
+          <p:cNvPr id="179" name="Google Shape;179;p28"/>
+          <p:cNvPicPr preferRelativeResize="0"/>
+          <p:nvPr/>
+        </p:nvPicPr>
+        <p:blipFill>
+          <a:blip r:embed="rId3">
+            <a:alphaModFix/>
+          </a:blip>
+          <a:stretch>
+            <a:fillRect/>
+          </a:stretch>
+        </p:blipFill>
+        <p:spPr>
+          <a:xfrm>
+            <a:off x="2743200" y="914400"/>
+            <a:ext cx="3657601" cy="3649471"/>
+          </a:xfrm>
+          <a:prstGeom prst="rect">
+            <a:avLst/>
+          </a:prstGeom>
+          <a:noFill/>
+          <a:ln>
+            <a:noFill/>
+          </a:ln>
+        </p:spPr>
+      </p:pic>
+      <p:sp>
+        <p:nvSpPr>
+          <p:cNvPr id="180" name="Google Shape;180;p28"/>
+          <p:cNvSpPr txBox="1"/>
+          <p:nvPr/>
+        </p:nvSpPr>
+        <p:spPr>
+          <a:xfrm>
+            <a:off x="0" y="4233672"/>
+            <a:ext cx="9144000" cy="914400"/>
+          </a:xfrm>
+          <a:prstGeom prst="rect">
+            <a:avLst/>
+          </a:prstGeom>
+          <a:noFill/>
+          <a:ln>
+            <a:noFill/>
+          </a:ln>
+        </p:spPr>
+        <p:txBody>
+          <a:bodyPr anchorCtr="0" anchor="b" bIns="91425" lIns="91425" spcFirstLastPara="1" rIns="91425" wrap="square" tIns="91425">
+            <a:noAutofit/>
+          </a:bodyPr>
+          <a:lstStyle/>
+          <a:p>
+            <a:pPr indent="0" lvl="0" marL="0" rtl="0" algn="l">
+              <a:spcBef>
+                <a:spcPts val="0"/>
+              </a:spcBef>
+              <a:spcAft>
+                <a:spcPts val="0"/>
+              </a:spcAft>
+              <a:buNone/>
+            </a:pPr>
+            <a:r>
+              <a:rPr lang="en"/>
+              <a:t>[1] If both you and we don’t want to</a:t>
+            </a:r>
+            <a:endParaRPr/>
+          </a:p>
+          <a:p>
+            <a:pPr indent="0" lvl="0" marL="0" rtl="0" algn="l">
+              <a:spcBef>
+                <a:spcPts val="0"/>
+              </a:spcBef>
+              <a:spcAft>
+                <a:spcPts val="0"/>
+              </a:spcAft>
+              <a:buNone/>
+            </a:pPr>
+            <a:r>
+              <a:rPr lang="en"/>
+              <a:t>[2] You still have to register for the course</a:t>
+            </a:r>
+            <a:endParaRPr/>
+          </a:p>
+        </p:txBody>
+      </p:sp>
+      <p:sp>
+        <p:nvSpPr>
+          <p:cNvPr id="181" name="Google Shape;181;p28"/>
+          <p:cNvSpPr txBox="1"/>
+          <p:nvPr>
+            <p:ph idx="12" type="sldNum"/>
+          </p:nvPr>
+        </p:nvSpPr>
+        <p:spPr>
+          <a:xfrm>
+            <a:off x="7315202" y="4416550"/>
+            <a:ext cx="1828800" cy="731400"/>
+          </a:xfrm>
+          <a:prstGeom prst="rect">
+            <a:avLst/>
+          </a:prstGeom>
+        </p:spPr>
+        <p:txBody>
+          <a:bodyPr anchorCtr="0" anchor="b" bIns="91425" lIns="91425" spcFirstLastPara="1" rIns="91425" wrap="square" tIns="91425">
+            <a:noAutofit/>
+          </a:bodyPr>
+          <a:lstStyle/>
+          <a:p>
+            <a:pPr indent="0" lvl="0" marL="0" rtl="0" algn="r">
+              <a:spcBef>
+                <a:spcPts val="0"/>
+              </a:spcBef>
+              <a:spcAft>
+                <a:spcPts val="0"/>
+              </a:spcAft>
+              <a:buNone/>
+            </a:pPr>
+            <a:fld id="{00000000-1234-1234-1234-123412341234}" type="slidenum">
+              <a:rPr lang="en"/>
+              <a:t>‹#›</a:t>
+            </a:fld>
+            <a:endParaRPr/>
+          </a:p>
+          <a:p>
+            <a:pPr indent="0" lvl="0" marL="0" rtl="0" algn="r">
+              <a:spcBef>
+                <a:spcPts val="0"/>
+              </a:spcBef>
+              <a:spcAft>
+                <a:spcPts val="0"/>
+              </a:spcAft>
+              <a:buNone/>
+            </a:pPr>
+            <a:r>
+              <a:rPr b="0" lang="en" sz="900" u="sng">
+                <a:solidFill>
+                  <a:schemeClr val="hlink"/>
+                </a:solidFill>
+                <a:hlinkClick r:id="rId4"/>
+              </a:rPr>
+              <a:t>https://profriehle.com</a:t>
+            </a:r>
+            <a:r>
+              <a:rPr b="0" lang="en" sz="900">
+                <a:solidFill>
+                  <a:schemeClr val="dk2"/>
+                </a:solidFill>
+              </a:rPr>
+              <a:t> </a:t>
+            </a:r>
+            <a:endParaRPr/>
+          </a:p>
+        </p:txBody>
+      </p:sp>
+    </p:spTree>
+  </p:cSld>
+  <p:clrMapOvr>
+    <a:masterClrMapping/>
+  </p:clrMapOvr>
+</p:sld>
+</file>
+
+<file path=ppt/slides/slide22.xml><?xml version="1.0" encoding="utf-8"?>
+<p:sld xmlns:a="http://schemas.openxmlformats.org/drawingml/2006/main" xmlns:r="http://schemas.openxmlformats.org/officeDocument/2006/relationships" xmlns:mc="http://schemas.openxmlformats.org/markup-compatibility/2006" xmlns:mv="urn:schemas-microsoft-com:mac:vml" xmlns:p="http://schemas.openxmlformats.org/presentationml/2006/main" xmlns:c="http://schemas.openxmlformats.org/drawingml/2006/chart" xmlns:dgm="http://schemas.openxmlformats.org/drawingml/2006/diagram" xmlns:o="urn:schemas-microsoft-com:office:office" xmlns:v="urn:schemas-microsoft-com:vml" xmlns:pvml="urn:schemas-microsoft-com:office:powerpoint" xmlns:com="http://schemas.openxmlformats.org/drawingml/2006/compatibility" xmlns:p14="http://schemas.microsoft.com/office/powerpoint/2010/main" xmlns:p15="http://schemas.microsoft.com/office/powerpoint/2012/main" xmlns:ahyp="http://schemas.microsoft.com/office/drawing/2018/hyperlinkcolor">
+  <p:cSld>
+    <p:spTree>
+      <p:nvGrpSpPr>
+        <p:cNvPr id="185" name="Shape 185"/>
+        <p:cNvGrpSpPr/>
+        <p:nvPr/>
+      </p:nvGrpSpPr>
+      <p:grpSpPr>
+        <a:xfrm>
+          <a:off x="0" y="0"/>
+          <a:ext cx="0" cy="0"/>
+          <a:chOff x="0" y="0"/>
+          <a:chExt cx="0" cy="0"/>
+        </a:xfrm>
+      </p:grpSpPr>
+      <p:sp>
+        <p:nvSpPr>
+          <p:cNvPr id="186" name="Google Shape;186;p29"/>
+          <p:cNvSpPr txBox="1"/>
+          <p:nvPr>
+            <p:ph type="title"/>
+          </p:nvPr>
+        </p:nvSpPr>
+        <p:spPr>
+          <a:xfrm>
+            <a:off x="0" y="0"/>
+            <a:ext cx="9144000" cy="685800"/>
+          </a:xfrm>
+          <a:prstGeom prst="rect">
+            <a:avLst/>
+          </a:prstGeom>
+        </p:spPr>
+        <p:txBody>
+          <a:bodyPr anchorCtr="0" anchor="ctr" bIns="91425" lIns="274300" spcFirstLastPara="1" rIns="91425" wrap="square" tIns="91425">
+            <a:noAutofit/>
+          </a:bodyPr>
+          <a:lstStyle/>
+          <a:p>
+            <a:pPr indent="0" lvl="0" marL="0" rtl="0" algn="l">
+              <a:spcBef>
+                <a:spcPts val="0"/>
+              </a:spcBef>
+              <a:spcAft>
+                <a:spcPts val="0"/>
+              </a:spcAft>
+              <a:buNone/>
+            </a:pPr>
+            <a:r>
+              <a:rPr lang="en"/>
+              <a:t>Course Language [1]</a:t>
+            </a:r>
+            <a:endParaRPr/>
+          </a:p>
+        </p:txBody>
+      </p:sp>
+      <p:sp>
+        <p:nvSpPr>
+          <p:cNvPr id="187" name="Google Shape;187;p29"/>
+          <p:cNvSpPr txBox="1"/>
+          <p:nvPr/>
+        </p:nvSpPr>
+        <p:spPr>
+          <a:xfrm>
+            <a:off x="0" y="4229100"/>
+            <a:ext cx="9144000" cy="914400"/>
+          </a:xfrm>
+          <a:prstGeom prst="rect">
+            <a:avLst/>
+          </a:prstGeom>
+          <a:noFill/>
+          <a:ln>
+            <a:noFill/>
+          </a:ln>
+        </p:spPr>
+        <p:txBody>
+          <a:bodyPr anchorCtr="0" anchor="b" bIns="91425" lIns="91425" spcFirstLastPara="1" rIns="91425" wrap="square" tIns="91425">
+            <a:noAutofit/>
+          </a:bodyPr>
+          <a:lstStyle/>
+          <a:p>
+            <a:pPr indent="0" lvl="0" marL="0" rtl="0" algn="l">
+              <a:spcBef>
+                <a:spcPts val="0"/>
+              </a:spcBef>
+              <a:spcAft>
+                <a:spcPts val="0"/>
+              </a:spcAft>
+              <a:buNone/>
+            </a:pPr>
+            <a:r>
+              <a:rPr lang="en"/>
+              <a:t>[1] See </a:t>
+            </a:r>
+            <a:r>
+              <a:rPr lang="en" u="sng">
+                <a:solidFill>
+                  <a:schemeClr val="hlink"/>
+                </a:solidFill>
+                <a:hlinkClick r:id="rId3"/>
+              </a:rPr>
+              <a:t>https://oss.cs.fau.de/2012/03/10/english-or-german-deutsch-oder-englisch/</a:t>
+            </a:r>
+            <a:r>
+              <a:rPr lang="en"/>
+              <a:t> </a:t>
+            </a:r>
+            <a:endParaRPr/>
+          </a:p>
+        </p:txBody>
+      </p:sp>
+      <p:sp>
+        <p:nvSpPr>
+          <p:cNvPr id="188" name="Google Shape;188;p29"/>
+          <p:cNvSpPr txBox="1"/>
+          <p:nvPr>
+            <p:ph idx="1" type="body"/>
+          </p:nvPr>
+        </p:nvSpPr>
+        <p:spPr>
+          <a:xfrm>
+            <a:off x="274320" y="914400"/>
+            <a:ext cx="8595300" cy="4114800"/>
+          </a:xfrm>
+          <a:prstGeom prst="rect">
+            <a:avLst/>
+          </a:prstGeom>
+        </p:spPr>
+        <p:txBody>
+          <a:bodyPr anchorCtr="0" anchor="t" bIns="0" lIns="0" spcFirstLastPara="1" rIns="0" wrap="square" tIns="0">
+            <a:noAutofit/>
+          </a:bodyPr>
+          <a:lstStyle/>
+          <a:p>
+            <a:pPr indent="0" lvl="0" marL="0" rtl="0" algn="l">
+              <a:spcBef>
+                <a:spcPts val="0"/>
+              </a:spcBef>
+              <a:spcAft>
+                <a:spcPts val="0"/>
+              </a:spcAft>
+              <a:buClr>
+                <a:schemeClr val="dk1"/>
+              </a:buClr>
+              <a:buSzPts val="1100"/>
+              <a:buFont typeface="Arial"/>
+              <a:buNone/>
+            </a:pPr>
+            <a:r>
+              <a:rPr b="1" lang="en"/>
+              <a:t>Class</a:t>
+            </a:r>
+            <a:endParaRPr b="1"/>
+          </a:p>
+          <a:p>
+            <a:pPr indent="-342900" lvl="0" marL="457200" rtl="0" algn="l">
+              <a:spcBef>
+                <a:spcPts val="1200"/>
+              </a:spcBef>
+              <a:spcAft>
+                <a:spcPts val="0"/>
+              </a:spcAft>
+              <a:buSzPts val="1800"/>
+              <a:buChar char="●"/>
+            </a:pPr>
+            <a:r>
+              <a:rPr lang="en"/>
+              <a:t>Lecturer: English</a:t>
+            </a:r>
+            <a:endParaRPr/>
+          </a:p>
+          <a:p>
+            <a:pPr indent="-342900" lvl="0" marL="457200" rtl="0" algn="l">
+              <a:spcBef>
+                <a:spcPts val="0"/>
+              </a:spcBef>
+              <a:spcAft>
+                <a:spcPts val="0"/>
+              </a:spcAft>
+              <a:buSzPts val="1800"/>
+              <a:buChar char="●"/>
+            </a:pPr>
+            <a:r>
+              <a:rPr lang="en"/>
+              <a:t>Student: Choice of German or English</a:t>
+            </a:r>
+            <a:endParaRPr/>
+          </a:p>
+          <a:p>
+            <a:pPr indent="0" lvl="0" marL="0" rtl="0" algn="l">
+              <a:spcBef>
+                <a:spcPts val="1200"/>
+              </a:spcBef>
+              <a:spcAft>
+                <a:spcPts val="0"/>
+              </a:spcAft>
+              <a:buClr>
+                <a:schemeClr val="dk1"/>
+              </a:buClr>
+              <a:buSzPts val="1100"/>
+              <a:buFont typeface="Arial"/>
+              <a:buNone/>
+            </a:pPr>
+            <a:r>
+              <a:rPr b="1" lang="en"/>
+              <a:t>Project</a:t>
+            </a:r>
+            <a:endParaRPr b="1"/>
+          </a:p>
+          <a:p>
+            <a:pPr indent="-342900" lvl="0" marL="457200" rtl="0" algn="l">
+              <a:spcBef>
+                <a:spcPts val="1200"/>
+              </a:spcBef>
+              <a:spcAft>
+                <a:spcPts val="0"/>
+              </a:spcAft>
+              <a:buSzPts val="1800"/>
+              <a:buChar char="●"/>
+            </a:pPr>
+            <a:r>
+              <a:rPr lang="en"/>
+              <a:t>Instructor: English</a:t>
+            </a:r>
+            <a:endParaRPr/>
+          </a:p>
+          <a:p>
+            <a:pPr indent="-342900" lvl="0" marL="457200" rtl="0" algn="l">
+              <a:spcBef>
+                <a:spcPts val="0"/>
+              </a:spcBef>
+              <a:spcAft>
+                <a:spcPts val="0"/>
+              </a:spcAft>
+              <a:buSzPts val="1800"/>
+              <a:buChar char="●"/>
+            </a:pPr>
+            <a:r>
+              <a:rPr lang="en"/>
+              <a:t>Team: Choice of German or English</a:t>
+            </a:r>
+            <a:endParaRPr/>
+          </a:p>
+          <a:p>
+            <a:pPr indent="0" lvl="0" marL="0" rtl="0" algn="l">
+              <a:spcBef>
+                <a:spcPts val="1200"/>
+              </a:spcBef>
+              <a:spcAft>
+                <a:spcPts val="1200"/>
+              </a:spcAft>
+              <a:buNone/>
+            </a:pPr>
+            <a:r>
+              <a:t/>
+            </a:r>
+            <a:endParaRPr/>
+          </a:p>
+        </p:txBody>
+      </p:sp>
+      <p:sp>
+        <p:nvSpPr>
+          <p:cNvPr id="189" name="Google Shape;189;p29"/>
+          <p:cNvSpPr txBox="1"/>
+          <p:nvPr>
+            <p:ph idx="12" type="sldNum"/>
+          </p:nvPr>
+        </p:nvSpPr>
+        <p:spPr>
+          <a:xfrm>
+            <a:off x="7315202" y="4416550"/>
+            <a:ext cx="1828800" cy="731400"/>
+          </a:xfrm>
+          <a:prstGeom prst="rect">
+            <a:avLst/>
+          </a:prstGeom>
+        </p:spPr>
+        <p:txBody>
+          <a:bodyPr anchorCtr="0" anchor="b" bIns="91425" lIns="91425" spcFirstLastPara="1" rIns="91425" wrap="square" tIns="91425">
+            <a:noAutofit/>
+          </a:bodyPr>
+          <a:lstStyle/>
+          <a:p>
+            <a:pPr indent="0" lvl="0" marL="0" rtl="0" algn="r">
+              <a:spcBef>
+                <a:spcPts val="0"/>
+              </a:spcBef>
+              <a:spcAft>
+                <a:spcPts val="0"/>
+              </a:spcAft>
+              <a:buNone/>
+            </a:pPr>
+            <a:fld id="{00000000-1234-1234-1234-123412341234}" type="slidenum">
+              <a:rPr lang="en"/>
+              <a:t>‹#›</a:t>
+            </a:fld>
+            <a:endParaRPr/>
+          </a:p>
+          <a:p>
+            <a:pPr indent="0" lvl="0" marL="0" rtl="0" algn="r">
+              <a:spcBef>
+                <a:spcPts val="0"/>
+              </a:spcBef>
+              <a:spcAft>
+                <a:spcPts val="0"/>
+              </a:spcAft>
+              <a:buNone/>
+            </a:pPr>
+            <a:r>
+              <a:rPr b="0" lang="en" sz="900" u="sng">
+                <a:solidFill>
+                  <a:schemeClr val="hlink"/>
+                </a:solidFill>
+                <a:hlinkClick r:id="rId4"/>
+              </a:rPr>
+              <a:t>https://profriehle.com</a:t>
+            </a:r>
+            <a:r>
+              <a:rPr b="0" lang="en" sz="900">
+                <a:solidFill>
+                  <a:schemeClr val="dk2"/>
+                </a:solidFill>
+              </a:rPr>
+              <a:t> </a:t>
+            </a:r>
+            <a:endParaRPr/>
+          </a:p>
+        </p:txBody>
+      </p:sp>
+    </p:spTree>
+  </p:cSld>
+  <p:clrMapOvr>
+    <a:masterClrMapping/>
+  </p:clrMapOvr>
+</p:sld>
+</file>
+
+<file path=ppt/slides/slide23.xml><?xml version="1.0" encoding="utf-8"?>
+<p:sld xmlns:a="http://schemas.openxmlformats.org/drawingml/2006/main" xmlns:r="http://schemas.openxmlformats.org/officeDocument/2006/relationships" xmlns:mc="http://schemas.openxmlformats.org/markup-compatibility/2006" xmlns:mv="urn:schemas-microsoft-com:mac:vml" xmlns:p="http://schemas.openxmlformats.org/presentationml/2006/main" xmlns:c="http://schemas.openxmlformats.org/drawingml/2006/chart" xmlns:dgm="http://schemas.openxmlformats.org/drawingml/2006/diagram" xmlns:o="urn:schemas-microsoft-com:office:office" xmlns:v="urn:schemas-microsoft-com:vml" xmlns:pvml="urn:schemas-microsoft-com:office:powerpoint" xmlns:com="http://schemas.openxmlformats.org/drawingml/2006/compatibility" xmlns:p14="http://schemas.microsoft.com/office/powerpoint/2010/main" xmlns:p15="http://schemas.microsoft.com/office/powerpoint/2012/main" xmlns:ahyp="http://schemas.microsoft.com/office/drawing/2018/hyperlinkcolor">
+  <p:cSld>
+    <p:spTree>
+      <p:nvGrpSpPr>
+        <p:cNvPr id="193" name="Shape 193"/>
+        <p:cNvGrpSpPr/>
+        <p:nvPr/>
+      </p:nvGrpSpPr>
+      <p:grpSpPr>
+        <a:xfrm>
+          <a:off x="0" y="0"/>
+          <a:ext cx="0" cy="0"/>
+          <a:chOff x="0" y="0"/>
+          <a:chExt cx="0" cy="0"/>
+        </a:xfrm>
+      </p:grpSpPr>
+      <p:sp>
+        <p:nvSpPr>
+          <p:cNvPr id="194" name="Google Shape;194;p30"/>
+          <p:cNvSpPr txBox="1"/>
+          <p:nvPr>
+            <p:ph type="title"/>
+          </p:nvPr>
+        </p:nvSpPr>
+        <p:spPr>
+          <a:xfrm>
+            <a:off x="0" y="0"/>
+            <a:ext cx="9144000" cy="685800"/>
+          </a:xfrm>
+          <a:prstGeom prst="rect">
+            <a:avLst/>
+          </a:prstGeom>
+        </p:spPr>
+        <p:txBody>
+          <a:bodyPr anchorCtr="0" anchor="ctr" bIns="91425" lIns="274300" spcFirstLastPara="1" rIns="91425" wrap="square" tIns="91425">
+            <a:noAutofit/>
+          </a:bodyPr>
+          <a:lstStyle/>
+          <a:p>
+            <a:pPr indent="0" lvl="0" marL="0" rtl="0" algn="l">
+              <a:spcBef>
+                <a:spcPts val="0"/>
+              </a:spcBef>
+              <a:spcAft>
+                <a:spcPts val="0"/>
+              </a:spcAft>
+              <a:buNone/>
+            </a:pPr>
+            <a:r>
+              <a:rPr lang="en"/>
+              <a:t>Course Organization</a:t>
+            </a:r>
+            <a:endParaRPr/>
+          </a:p>
+        </p:txBody>
+      </p:sp>
+      <p:sp>
+        <p:nvSpPr>
+          <p:cNvPr id="195" name="Google Shape;195;p30"/>
+          <p:cNvSpPr txBox="1"/>
+          <p:nvPr>
+            <p:ph idx="1" type="body"/>
+          </p:nvPr>
+        </p:nvSpPr>
+        <p:spPr>
+          <a:xfrm>
+            <a:off x="274320" y="914400"/>
+            <a:ext cx="8595300" cy="4114800"/>
+          </a:xfrm>
+          <a:prstGeom prst="rect">
+            <a:avLst/>
+          </a:prstGeom>
+        </p:spPr>
+        <p:txBody>
+          <a:bodyPr anchorCtr="0" anchor="t" bIns="0" lIns="0" spcFirstLastPara="1" rIns="0" wrap="square" tIns="0">
+            <a:noAutofit/>
+          </a:bodyPr>
+          <a:lstStyle/>
+          <a:p>
+            <a:pPr indent="0" lvl="0" marL="0" rtl="0" algn="l">
+              <a:spcBef>
+                <a:spcPts val="0"/>
+              </a:spcBef>
+              <a:spcAft>
+                <a:spcPts val="0"/>
+              </a:spcAft>
+              <a:buClr>
+                <a:schemeClr val="dk1"/>
+              </a:buClr>
+              <a:buSzPts val="1100"/>
+              <a:buFont typeface="Arial"/>
+              <a:buNone/>
+            </a:pPr>
+            <a:r>
+              <a:rPr b="1" lang="en"/>
+              <a:t>Course organization</a:t>
+            </a:r>
+            <a:endParaRPr b="1"/>
+          </a:p>
+          <a:p>
+            <a:pPr indent="-342900" lvl="0" marL="457200" rtl="0" algn="l">
+              <a:spcBef>
+                <a:spcPts val="1200"/>
+              </a:spcBef>
+              <a:spcAft>
+                <a:spcPts val="0"/>
+              </a:spcAft>
+              <a:buSzPts val="1800"/>
+              <a:buChar char="●"/>
+            </a:pPr>
+            <a:r>
+              <a:rPr lang="en"/>
+              <a:t>See </a:t>
+            </a:r>
+            <a:r>
+              <a:rPr lang="en" u="sng">
+                <a:solidFill>
+                  <a:schemeClr val="hlink"/>
+                </a:solidFill>
+                <a:hlinkClick r:id="rId3"/>
+              </a:rPr>
+              <a:t>https://amos.uni1.de</a:t>
+            </a:r>
+            <a:r>
+              <a:rPr lang="en"/>
+              <a:t> </a:t>
+            </a:r>
+            <a:endParaRPr/>
+          </a:p>
+          <a:p>
+            <a:pPr indent="0" lvl="0" marL="0" rtl="0" algn="l">
+              <a:spcBef>
+                <a:spcPts val="1200"/>
+              </a:spcBef>
+              <a:spcAft>
+                <a:spcPts val="0"/>
+              </a:spcAft>
+              <a:buClr>
+                <a:schemeClr val="dk1"/>
+              </a:buClr>
+              <a:buSzPts val="1100"/>
+              <a:buFont typeface="Arial"/>
+              <a:buNone/>
+            </a:pPr>
+            <a:r>
+              <a:rPr b="1" lang="en"/>
+              <a:t>Course schedule</a:t>
+            </a:r>
+            <a:endParaRPr b="1"/>
+          </a:p>
+          <a:p>
+            <a:pPr indent="-342900" lvl="0" marL="457200" rtl="0" algn="l">
+              <a:spcBef>
+                <a:spcPts val="1200"/>
+              </a:spcBef>
+              <a:spcAft>
+                <a:spcPts val="0"/>
+              </a:spcAft>
+              <a:buSzPts val="1800"/>
+              <a:buChar char="●"/>
+            </a:pPr>
+            <a:r>
+              <a:rPr lang="en"/>
+              <a:t>See </a:t>
+            </a:r>
+            <a:r>
+              <a:rPr b="1" lang="en"/>
+              <a:t>Schedule</a:t>
+            </a:r>
+            <a:r>
+              <a:rPr lang="en"/>
+              <a:t> tab on Course Organization doc</a:t>
+            </a:r>
+            <a:endParaRPr/>
+          </a:p>
+          <a:p>
+            <a:pPr indent="0" lvl="0" marL="0" rtl="0" algn="l">
+              <a:spcBef>
+                <a:spcPts val="1200"/>
+              </a:spcBef>
+              <a:spcAft>
+                <a:spcPts val="0"/>
+              </a:spcAft>
+              <a:buClr>
+                <a:schemeClr val="dk1"/>
+              </a:buClr>
+              <a:buSzPts val="1100"/>
+              <a:buFont typeface="Arial"/>
+              <a:buNone/>
+            </a:pPr>
+            <a:r>
+              <a:rPr b="1" lang="en"/>
+              <a:t>Project descriptions</a:t>
+            </a:r>
+            <a:endParaRPr b="1"/>
+          </a:p>
+          <a:p>
+            <a:pPr indent="-342900" lvl="0" marL="457200" rtl="0" algn="l">
+              <a:spcBef>
+                <a:spcPts val="1200"/>
+              </a:spcBef>
+              <a:spcAft>
+                <a:spcPts val="0"/>
+              </a:spcAft>
+              <a:buSzPts val="1800"/>
+              <a:buChar char="●"/>
+            </a:pPr>
+            <a:r>
+              <a:rPr lang="en"/>
+              <a:t>See </a:t>
+            </a:r>
+            <a:r>
+              <a:rPr b="1" lang="en"/>
+              <a:t>Project Descriptions </a:t>
+            </a:r>
+            <a:r>
+              <a:rPr lang="en"/>
+              <a:t>on Course Organization doc</a:t>
+            </a:r>
+            <a:endParaRPr/>
+          </a:p>
+          <a:p>
+            <a:pPr indent="0" lvl="0" marL="0" rtl="0" algn="l">
+              <a:spcBef>
+                <a:spcPts val="1200"/>
+              </a:spcBef>
+              <a:spcAft>
+                <a:spcPts val="0"/>
+              </a:spcAft>
+              <a:buClr>
+                <a:schemeClr val="dk1"/>
+              </a:buClr>
+              <a:buSzPts val="1100"/>
+              <a:buFont typeface="Arial"/>
+              <a:buNone/>
+            </a:pPr>
+            <a:r>
+              <a:rPr b="1" lang="en"/>
+              <a:t>Project teams</a:t>
+            </a:r>
+            <a:endParaRPr b="1"/>
+          </a:p>
+          <a:p>
+            <a:pPr indent="-342900" lvl="0" marL="457200" rtl="0" algn="l">
+              <a:spcBef>
+                <a:spcPts val="1200"/>
+              </a:spcBef>
+              <a:spcAft>
+                <a:spcPts val="0"/>
+              </a:spcAft>
+              <a:buSzPts val="1800"/>
+              <a:buChar char="●"/>
+            </a:pPr>
+            <a:r>
+              <a:rPr lang="en"/>
+              <a:t>See </a:t>
+            </a:r>
+            <a:r>
+              <a:rPr b="1" lang="en"/>
+              <a:t>Project Teams</a:t>
+            </a:r>
+            <a:r>
+              <a:rPr lang="en"/>
+              <a:t> tab on Course Organization doc</a:t>
+            </a:r>
+            <a:endParaRPr/>
+          </a:p>
+          <a:p>
+            <a:pPr indent="0" lvl="0" marL="0" rtl="0" algn="l">
+              <a:spcBef>
+                <a:spcPts val="1200"/>
+              </a:spcBef>
+              <a:spcAft>
+                <a:spcPts val="1200"/>
+              </a:spcAft>
+              <a:buNone/>
+            </a:pPr>
+            <a:r>
+              <a:t/>
+            </a:r>
+            <a:endParaRPr/>
+          </a:p>
+        </p:txBody>
+      </p:sp>
+      <p:sp>
+        <p:nvSpPr>
+          <p:cNvPr id="196" name="Google Shape;196;p30"/>
+          <p:cNvSpPr txBox="1"/>
+          <p:nvPr>
+            <p:ph idx="12" type="sldNum"/>
+          </p:nvPr>
+        </p:nvSpPr>
+        <p:spPr>
+          <a:xfrm>
+            <a:off x="7315202" y="4416550"/>
+            <a:ext cx="1828800" cy="731400"/>
+          </a:xfrm>
+          <a:prstGeom prst="rect">
+            <a:avLst/>
+          </a:prstGeom>
+        </p:spPr>
+        <p:txBody>
+          <a:bodyPr anchorCtr="0" anchor="b" bIns="91425" lIns="91425" spcFirstLastPara="1" rIns="91425" wrap="square" tIns="91425">
+            <a:noAutofit/>
+          </a:bodyPr>
+          <a:lstStyle/>
+          <a:p>
+            <a:pPr indent="0" lvl="0" marL="0" rtl="0" algn="r">
+              <a:spcBef>
+                <a:spcPts val="0"/>
+              </a:spcBef>
+              <a:spcAft>
+                <a:spcPts val="0"/>
+              </a:spcAft>
+              <a:buNone/>
+            </a:pPr>
+            <a:fld id="{00000000-1234-1234-1234-123412341234}" type="slidenum">
+              <a:rPr lang="en"/>
+              <a:t>‹#›</a:t>
+            </a:fld>
+            <a:endParaRPr/>
+          </a:p>
+          <a:p>
+            <a:pPr indent="0" lvl="0" marL="0" rtl="0" algn="r">
+              <a:spcBef>
+                <a:spcPts val="0"/>
+              </a:spcBef>
+              <a:spcAft>
+                <a:spcPts val="0"/>
+              </a:spcAft>
+              <a:buNone/>
+            </a:pPr>
+            <a:r>
+              <a:rPr b="0" lang="en" sz="900" u="sng">
+                <a:solidFill>
+                  <a:schemeClr val="hlink"/>
+                </a:solidFill>
+                <a:hlinkClick r:id="rId4"/>
+              </a:rPr>
+              <a:t>https://profriehle.com</a:t>
+            </a:r>
+            <a:r>
+              <a:rPr b="0" lang="en" sz="900">
+                <a:solidFill>
+                  <a:schemeClr val="dk2"/>
+                </a:solidFill>
+              </a:rPr>
+              <a:t> </a:t>
+            </a:r>
+            <a:endParaRPr/>
+          </a:p>
+        </p:txBody>
+      </p:sp>
+    </p:spTree>
+  </p:cSld>
+  <p:clrMapOvr>
+    <a:masterClrMapping/>
+  </p:clrMapOvr>
+</p:sld>
+</file>
+
+<file path=ppt/slides/slide24.xml><?xml version="1.0" encoding="utf-8"?>
+<p:sld xmlns:a="http://schemas.openxmlformats.org/drawingml/2006/main" xmlns:r="http://schemas.openxmlformats.org/officeDocument/2006/relationships" xmlns:mc="http://schemas.openxmlformats.org/markup-compatibility/2006" xmlns:mv="urn:schemas-microsoft-com:mac:vml" xmlns:p="http://schemas.openxmlformats.org/presentationml/2006/main" xmlns:c="http://schemas.openxmlformats.org/drawingml/2006/chart" xmlns:dgm="http://schemas.openxmlformats.org/drawingml/2006/diagram" xmlns:o="urn:schemas-microsoft-com:office:office" xmlns:v="urn:schemas-microsoft-com:vml" xmlns:pvml="urn:schemas-microsoft-com:office:powerpoint" xmlns:com="http://schemas.openxmlformats.org/drawingml/2006/compatibility" xmlns:p14="http://schemas.microsoft.com/office/powerpoint/2010/main" xmlns:p15="http://schemas.microsoft.com/office/powerpoint/2012/main" xmlns:ahyp="http://schemas.microsoft.com/office/drawing/2018/hyperlinkcolor">
+  <p:cSld>
+    <p:spTree>
+      <p:nvGrpSpPr>
+        <p:cNvPr id="200" name="Shape 200"/>
+        <p:cNvGrpSpPr/>
+        <p:nvPr/>
+      </p:nvGrpSpPr>
+      <p:grpSpPr>
+        <a:xfrm>
+          <a:off x="0" y="0"/>
+          <a:ext cx="0" cy="0"/>
+          <a:chOff x="0" y="0"/>
+          <a:chExt cx="0" cy="0"/>
+        </a:xfrm>
+      </p:grpSpPr>
+      <p:sp>
+        <p:nvSpPr>
+          <p:cNvPr id="201" name="Google Shape;201;p31"/>
+          <p:cNvSpPr txBox="1"/>
+          <p:nvPr>
+            <p:ph type="title"/>
+          </p:nvPr>
+        </p:nvSpPr>
+        <p:spPr>
+          <a:xfrm>
+            <a:off x="0" y="0"/>
+            <a:ext cx="9144000" cy="685800"/>
+          </a:xfrm>
+          <a:prstGeom prst="rect">
+            <a:avLst/>
+          </a:prstGeom>
+        </p:spPr>
+        <p:txBody>
+          <a:bodyPr anchorCtr="0" anchor="ctr" bIns="91425" lIns="274300" spcFirstLastPara="1" rIns="91425" wrap="square" tIns="91425">
+            <a:noAutofit/>
+          </a:bodyPr>
+          <a:lstStyle/>
+          <a:p>
+            <a:pPr indent="0" lvl="0" marL="0" rtl="0" algn="l">
+              <a:spcBef>
+                <a:spcPts val="0"/>
+              </a:spcBef>
+              <a:spcAft>
+                <a:spcPts val="0"/>
+              </a:spcAft>
+              <a:buNone/>
+            </a:pPr>
+            <a:r>
+              <a:rPr lang="en"/>
+              <a:t>Work Rhythm</a:t>
+            </a:r>
+            <a:endParaRPr/>
+          </a:p>
+        </p:txBody>
+      </p:sp>
+      <p:sp>
+        <p:nvSpPr>
+          <p:cNvPr id="202" name="Google Shape;202;p31"/>
+          <p:cNvSpPr txBox="1"/>
+          <p:nvPr>
+            <p:ph idx="1" type="body"/>
+          </p:nvPr>
+        </p:nvSpPr>
+        <p:spPr>
+          <a:xfrm>
+            <a:off x="274320" y="914400"/>
+            <a:ext cx="8595300" cy="4114800"/>
+          </a:xfrm>
+          <a:prstGeom prst="rect">
+            <a:avLst/>
+          </a:prstGeom>
+        </p:spPr>
+        <p:txBody>
+          <a:bodyPr anchorCtr="0" anchor="t" bIns="0" lIns="0" spcFirstLastPara="1" rIns="0" wrap="square" tIns="0">
+            <a:noAutofit/>
+          </a:bodyPr>
+          <a:lstStyle/>
+          <a:p>
+            <a:pPr indent="0" lvl="0" marL="0" rtl="0" algn="l">
+              <a:spcBef>
+                <a:spcPts val="0"/>
+              </a:spcBef>
+              <a:spcAft>
+                <a:spcPts val="0"/>
+              </a:spcAft>
+              <a:buClr>
+                <a:schemeClr val="dk1"/>
+              </a:buClr>
+              <a:buSzPts val="1100"/>
+              <a:buFont typeface="Arial"/>
+              <a:buNone/>
+            </a:pPr>
+            <a:r>
+              <a:rPr b="1" lang="en"/>
+              <a:t>Lectures</a:t>
+            </a:r>
+            <a:endParaRPr b="1"/>
+          </a:p>
+          <a:p>
+            <a:pPr indent="-342900" lvl="0" marL="457200" rtl="0" algn="l">
+              <a:spcBef>
+                <a:spcPts val="1200"/>
+              </a:spcBef>
+              <a:spcAft>
+                <a:spcPts val="0"/>
+              </a:spcAft>
+              <a:buSzPts val="1800"/>
+              <a:buChar char="●"/>
+            </a:pPr>
+            <a:r>
+              <a:rPr lang="en"/>
+              <a:t>Class day (90min.)</a:t>
+            </a:r>
+            <a:endParaRPr/>
+          </a:p>
+          <a:p>
+            <a:pPr indent="0" lvl="0" marL="0" rtl="0" algn="l">
+              <a:spcBef>
+                <a:spcPts val="1200"/>
+              </a:spcBef>
+              <a:spcAft>
+                <a:spcPts val="0"/>
+              </a:spcAft>
+              <a:buClr>
+                <a:schemeClr val="dk1"/>
+              </a:buClr>
+              <a:buSzPts val="1100"/>
+              <a:buFont typeface="Arial"/>
+              <a:buNone/>
+            </a:pPr>
+            <a:r>
+              <a:rPr b="1" lang="en"/>
+              <a:t>Team meetings</a:t>
+            </a:r>
+            <a:endParaRPr b="1"/>
+          </a:p>
+          <a:p>
+            <a:pPr indent="-342900" lvl="0" marL="457200" rtl="0" algn="l">
+              <a:spcBef>
+                <a:spcPts val="1200"/>
+              </a:spcBef>
+              <a:spcAft>
+                <a:spcPts val="0"/>
+              </a:spcAft>
+              <a:buSzPts val="1800"/>
+              <a:buChar char="●"/>
+            </a:pPr>
+            <a:r>
+              <a:rPr lang="en"/>
+              <a:t>Next slot after lecture</a:t>
+            </a:r>
+            <a:endParaRPr/>
+          </a:p>
+          <a:p>
+            <a:pPr indent="0" lvl="0" marL="0" rtl="0" algn="l">
+              <a:spcBef>
+                <a:spcPts val="1200"/>
+              </a:spcBef>
+              <a:spcAft>
+                <a:spcPts val="0"/>
+              </a:spcAft>
+              <a:buClr>
+                <a:schemeClr val="dk1"/>
+              </a:buClr>
+              <a:buSzPts val="1100"/>
+              <a:buFont typeface="Arial"/>
+              <a:buNone/>
+            </a:pPr>
+            <a:r>
+              <a:rPr b="1" lang="en"/>
+              <a:t>Project work</a:t>
+            </a:r>
+            <a:r>
+              <a:rPr lang="en"/>
+              <a:t> (self-organized)</a:t>
+            </a:r>
+            <a:endParaRPr/>
+          </a:p>
+          <a:p>
+            <a:pPr indent="-342900" lvl="0" marL="457200" rtl="0" algn="l">
+              <a:spcBef>
+                <a:spcPts val="1200"/>
+              </a:spcBef>
+              <a:spcAft>
+                <a:spcPts val="0"/>
+              </a:spcAft>
+              <a:buSzPts val="1800"/>
+              <a:buChar char="●"/>
+            </a:pPr>
+            <a:r>
+              <a:rPr lang="en"/>
+              <a:t>Deliverables due according to schedule</a:t>
+            </a:r>
+            <a:endParaRPr/>
+          </a:p>
+          <a:p>
+            <a:pPr indent="0" lvl="0" marL="0" rtl="0" algn="l">
+              <a:spcBef>
+                <a:spcPts val="1200"/>
+              </a:spcBef>
+              <a:spcAft>
+                <a:spcPts val="1200"/>
+              </a:spcAft>
+              <a:buNone/>
+            </a:pPr>
+            <a:r>
+              <a:t/>
+            </a:r>
+            <a:endParaRPr/>
+          </a:p>
+        </p:txBody>
+      </p:sp>
+      <p:sp>
+        <p:nvSpPr>
+          <p:cNvPr id="203" name="Google Shape;203;p31"/>
+          <p:cNvSpPr txBox="1"/>
+          <p:nvPr>
+            <p:ph idx="12" type="sldNum"/>
+          </p:nvPr>
+        </p:nvSpPr>
+        <p:spPr>
+          <a:xfrm>
+            <a:off x="7315202" y="4416550"/>
+            <a:ext cx="1828800" cy="731400"/>
+          </a:xfrm>
+          <a:prstGeom prst="rect">
+            <a:avLst/>
+          </a:prstGeom>
+        </p:spPr>
+        <p:txBody>
+          <a:bodyPr anchorCtr="0" anchor="b" bIns="91425" lIns="91425" spcFirstLastPara="1" rIns="91425" wrap="square" tIns="91425">
+            <a:noAutofit/>
+          </a:bodyPr>
+          <a:lstStyle/>
+          <a:p>
+            <a:pPr indent="0" lvl="0" marL="0" rtl="0" algn="r">
+              <a:spcBef>
+                <a:spcPts val="0"/>
+              </a:spcBef>
+              <a:spcAft>
+                <a:spcPts val="0"/>
+              </a:spcAft>
+              <a:buNone/>
+            </a:pPr>
+            <a:fld id="{00000000-1234-1234-1234-123412341234}" type="slidenum">
+              <a:rPr lang="en"/>
+              <a:t>‹#›</a:t>
+            </a:fld>
+            <a:endParaRPr/>
+          </a:p>
+          <a:p>
+            <a:pPr indent="0" lvl="0" marL="0" rtl="0" algn="r">
+              <a:spcBef>
+                <a:spcPts val="0"/>
+              </a:spcBef>
+              <a:spcAft>
+                <a:spcPts val="0"/>
+              </a:spcAft>
+              <a:buNone/>
+            </a:pPr>
+            <a:r>
+              <a:rPr b="0" lang="en" sz="900" u="sng">
+                <a:solidFill>
+                  <a:schemeClr val="hlink"/>
+                </a:solidFill>
+                <a:hlinkClick r:id="rId3"/>
+              </a:rPr>
+              <a:t>https://profriehle.com</a:t>
+            </a:r>
+            <a:r>
+              <a:rPr b="0" lang="en" sz="900">
+                <a:solidFill>
+                  <a:schemeClr val="dk2"/>
+                </a:solidFill>
+              </a:rPr>
+              <a:t> </a:t>
+            </a:r>
+            <a:endParaRPr/>
+          </a:p>
+        </p:txBody>
+      </p:sp>
+    </p:spTree>
+  </p:cSld>
+  <p:clrMapOvr>
+    <a:masterClrMapping/>
+  </p:clrMapOvr>
+</p:sld>
+</file>
+
+<file path=ppt/slides/slide25.xml><?xml version="1.0" encoding="utf-8"?>
+<p:sld xmlns:a="http://schemas.openxmlformats.org/drawingml/2006/main" xmlns:r="http://schemas.openxmlformats.org/officeDocument/2006/relationships" xmlns:mc="http://schemas.openxmlformats.org/markup-compatibility/2006" xmlns:mv="urn:schemas-microsoft-com:mac:vml" xmlns:p="http://schemas.openxmlformats.org/presentationml/2006/main" xmlns:c="http://schemas.openxmlformats.org/drawingml/2006/chart" xmlns:dgm="http://schemas.openxmlformats.org/drawingml/2006/diagram" xmlns:o="urn:schemas-microsoft-com:office:office" xmlns:v="urn:schemas-microsoft-com:vml" xmlns:pvml="urn:schemas-microsoft-com:office:powerpoint" xmlns:com="http://schemas.openxmlformats.org/drawingml/2006/compatibility" xmlns:p14="http://schemas.microsoft.com/office/powerpoint/2010/main" xmlns:p15="http://schemas.microsoft.com/office/powerpoint/2012/main" xmlns:ahyp="http://schemas.microsoft.com/office/drawing/2018/hyperlinkcolor">
+  <p:cSld>
+    <p:spTree>
+      <p:nvGrpSpPr>
+        <p:cNvPr id="207" name="Shape 207"/>
+        <p:cNvGrpSpPr/>
+        <p:nvPr/>
+      </p:nvGrpSpPr>
+      <p:grpSpPr>
+        <a:xfrm>
+          <a:off x="0" y="0"/>
+          <a:ext cx="0" cy="0"/>
+          <a:chOff x="0" y="0"/>
+          <a:chExt cx="0" cy="0"/>
+        </a:xfrm>
+      </p:grpSpPr>
+      <p:sp>
+        <p:nvSpPr>
+          <p:cNvPr id="208" name="Google Shape;208;p32"/>
+          <p:cNvSpPr txBox="1"/>
+          <p:nvPr>
+            <p:ph type="title"/>
+          </p:nvPr>
+        </p:nvSpPr>
+        <p:spPr>
+          <a:xfrm>
+            <a:off x="0" y="0"/>
+            <a:ext cx="9144000" cy="685800"/>
+          </a:xfrm>
+          <a:prstGeom prst="rect">
+            <a:avLst/>
+          </a:prstGeom>
+        </p:spPr>
+        <p:txBody>
+          <a:bodyPr anchorCtr="0" anchor="ctr" bIns="91425" lIns="274300" spcFirstLastPara="1" rIns="91425" wrap="square" tIns="91425">
+            <a:noAutofit/>
+          </a:bodyPr>
+          <a:lstStyle/>
+          <a:p>
+            <a:pPr indent="0" lvl="0" marL="0" rtl="0" algn="l">
+              <a:spcBef>
+                <a:spcPts val="0"/>
+              </a:spcBef>
+              <a:spcAft>
+                <a:spcPts val="0"/>
+              </a:spcAft>
+              <a:buNone/>
+            </a:pPr>
+            <a:r>
+              <a:rPr lang="en"/>
+              <a:t>Course Communication</a:t>
+            </a:r>
+            <a:endParaRPr/>
+          </a:p>
+        </p:txBody>
+      </p:sp>
+      <p:sp>
+        <p:nvSpPr>
+          <p:cNvPr id="209" name="Google Shape;209;p32"/>
+          <p:cNvSpPr txBox="1"/>
+          <p:nvPr>
+            <p:ph idx="1" type="body"/>
+          </p:nvPr>
+        </p:nvSpPr>
+        <p:spPr>
+          <a:xfrm>
+            <a:off x="274320" y="914400"/>
+            <a:ext cx="8595300" cy="4114800"/>
+          </a:xfrm>
+          <a:prstGeom prst="rect">
+            <a:avLst/>
+          </a:prstGeom>
+        </p:spPr>
+        <p:txBody>
+          <a:bodyPr anchorCtr="0" anchor="t" bIns="0" lIns="0" spcFirstLastPara="1" rIns="0" wrap="square" tIns="0">
+            <a:noAutofit/>
+          </a:bodyPr>
+          <a:lstStyle/>
+          <a:p>
+            <a:pPr indent="0" lvl="0" marL="0" rtl="0" algn="l">
+              <a:spcBef>
+                <a:spcPts val="0"/>
+              </a:spcBef>
+              <a:spcAft>
+                <a:spcPts val="0"/>
+              </a:spcAft>
+              <a:buClr>
+                <a:schemeClr val="dk1"/>
+              </a:buClr>
+              <a:buSzPts val="1100"/>
+              <a:buFont typeface="Arial"/>
+              <a:buNone/>
+            </a:pPr>
+            <a:r>
+              <a:rPr b="1" lang="en"/>
+              <a:t>Announcements</a:t>
+            </a:r>
+            <a:r>
+              <a:rPr lang="en"/>
+              <a:t> are sent by email</a:t>
+            </a:r>
+            <a:endParaRPr/>
+          </a:p>
+          <a:p>
+            <a:pPr indent="-342900" lvl="0" marL="457200" rtl="0" algn="l">
+              <a:spcBef>
+                <a:spcPts val="1200"/>
+              </a:spcBef>
+              <a:spcAft>
+                <a:spcPts val="0"/>
+              </a:spcAft>
+              <a:buSzPts val="1800"/>
+              <a:buChar char="●"/>
+            </a:pPr>
+            <a:r>
+              <a:rPr lang="en"/>
+              <a:t>Through email aliases</a:t>
+            </a:r>
+            <a:endParaRPr/>
+          </a:p>
+          <a:p>
+            <a:pPr indent="-342900" lvl="0" marL="457200" rtl="0" algn="l">
+              <a:spcBef>
+                <a:spcPts val="0"/>
+              </a:spcBef>
+              <a:spcAft>
+                <a:spcPts val="0"/>
+              </a:spcAft>
+              <a:buSzPts val="1800"/>
+              <a:buChar char="●"/>
+            </a:pPr>
+            <a:r>
+              <a:rPr lang="en"/>
+              <a:t>Through course management system</a:t>
+            </a:r>
+            <a:endParaRPr/>
+          </a:p>
+          <a:p>
+            <a:pPr indent="0" lvl="0" marL="0" rtl="0" algn="l">
+              <a:spcBef>
+                <a:spcPts val="1200"/>
+              </a:spcBef>
+              <a:spcAft>
+                <a:spcPts val="0"/>
+              </a:spcAft>
+              <a:buNone/>
+            </a:pPr>
+            <a:r>
+              <a:rPr b="1" lang="en"/>
+              <a:t>Administrative questions</a:t>
+            </a:r>
+            <a:r>
+              <a:rPr lang="en"/>
+              <a:t> to teaching team</a:t>
+            </a:r>
+            <a:endParaRPr/>
+          </a:p>
+          <a:p>
+            <a:pPr indent="-342900" lvl="0" marL="457200" rtl="0" algn="l">
+              <a:spcBef>
+                <a:spcPts val="1200"/>
+              </a:spcBef>
+              <a:spcAft>
+                <a:spcPts val="0"/>
+              </a:spcAft>
+              <a:buSzPts val="1800"/>
+              <a:buChar char="●"/>
+            </a:pPr>
+            <a:r>
+              <a:rPr lang="en"/>
+              <a:t>Please ask your question in the course forum</a:t>
+            </a:r>
+            <a:endParaRPr/>
+          </a:p>
+          <a:p>
+            <a:pPr indent="-342900" lvl="0" marL="457200" rtl="0" algn="l">
+              <a:spcBef>
+                <a:spcPts val="0"/>
+              </a:spcBef>
+              <a:spcAft>
+                <a:spcPts val="0"/>
+              </a:spcAft>
+              <a:buSzPts val="1800"/>
+              <a:buChar char="●"/>
+            </a:pPr>
+            <a:r>
+              <a:rPr lang="en"/>
+              <a:t>For private questions, use the teaching team email alias</a:t>
+            </a:r>
+            <a:endParaRPr/>
+          </a:p>
+          <a:p>
+            <a:pPr indent="0" lvl="0" marL="0" rtl="0" algn="l">
+              <a:spcBef>
+                <a:spcPts val="1200"/>
+              </a:spcBef>
+              <a:spcAft>
+                <a:spcPts val="1200"/>
+              </a:spcAft>
+              <a:buNone/>
+            </a:pPr>
+            <a:r>
+              <a:t/>
+            </a:r>
+            <a:endParaRPr/>
+          </a:p>
+        </p:txBody>
+      </p:sp>
+      <p:sp>
+        <p:nvSpPr>
+          <p:cNvPr id="210" name="Google Shape;210;p32"/>
+          <p:cNvSpPr txBox="1"/>
+          <p:nvPr>
+            <p:ph idx="12" type="sldNum"/>
+          </p:nvPr>
+        </p:nvSpPr>
+        <p:spPr>
+          <a:xfrm>
+            <a:off x="7315202" y="4416550"/>
+            <a:ext cx="1828800" cy="731400"/>
+          </a:xfrm>
+          <a:prstGeom prst="rect">
+            <a:avLst/>
+          </a:prstGeom>
+        </p:spPr>
+        <p:txBody>
+          <a:bodyPr anchorCtr="0" anchor="b" bIns="91425" lIns="91425" spcFirstLastPara="1" rIns="91425" wrap="square" tIns="91425">
+            <a:noAutofit/>
+          </a:bodyPr>
+          <a:lstStyle/>
+          <a:p>
+            <a:pPr indent="0" lvl="0" marL="0" rtl="0" algn="r">
+              <a:spcBef>
+                <a:spcPts val="0"/>
+              </a:spcBef>
+              <a:spcAft>
+                <a:spcPts val="0"/>
+              </a:spcAft>
+              <a:buNone/>
+            </a:pPr>
+            <a:fld id="{00000000-1234-1234-1234-123412341234}" type="slidenum">
+              <a:rPr lang="en"/>
+              <a:t>‹#›</a:t>
+            </a:fld>
+            <a:endParaRPr/>
+          </a:p>
+          <a:p>
+            <a:pPr indent="0" lvl="0" marL="0" rtl="0" algn="r">
+              <a:spcBef>
+                <a:spcPts val="0"/>
+              </a:spcBef>
+              <a:spcAft>
+                <a:spcPts val="0"/>
+              </a:spcAft>
+              <a:buNone/>
+            </a:pPr>
+            <a:r>
+              <a:rPr b="0" lang="en" sz="900" u="sng">
+                <a:solidFill>
+                  <a:schemeClr val="hlink"/>
+                </a:solidFill>
+                <a:hlinkClick r:id="rId3"/>
+              </a:rPr>
+              <a:t>https://profriehle.com</a:t>
+            </a:r>
+            <a:r>
+              <a:rPr b="0" lang="en" sz="900">
+                <a:solidFill>
+                  <a:schemeClr val="dk2"/>
+                </a:solidFill>
+              </a:rPr>
+              <a:t> </a:t>
+            </a:r>
+            <a:endParaRPr/>
+          </a:p>
+        </p:txBody>
+      </p:sp>
+    </p:spTree>
+  </p:cSld>
+  <p:clrMapOvr>
+    <a:masterClrMapping/>
+  </p:clrMapOvr>
+</p:sld>
+</file>
+
+<file path=ppt/slides/slide26.xml><?xml version="1.0" encoding="utf-8"?>
+<p:sld xmlns:a="http://schemas.openxmlformats.org/drawingml/2006/main" xmlns:r="http://schemas.openxmlformats.org/officeDocument/2006/relationships" xmlns:mc="http://schemas.openxmlformats.org/markup-compatibility/2006" xmlns:mv="urn:schemas-microsoft-com:mac:vml" xmlns:p="http://schemas.openxmlformats.org/presentationml/2006/main" xmlns:c="http://schemas.openxmlformats.org/drawingml/2006/chart" xmlns:dgm="http://schemas.openxmlformats.org/drawingml/2006/diagram" xmlns:o="urn:schemas-microsoft-com:office:office" xmlns:v="urn:schemas-microsoft-com:vml" xmlns:pvml="urn:schemas-microsoft-com:office:powerpoint" xmlns:com="http://schemas.openxmlformats.org/drawingml/2006/compatibility" xmlns:p14="http://schemas.microsoft.com/office/powerpoint/2010/main" xmlns:p15="http://schemas.microsoft.com/office/powerpoint/2012/main" xmlns:ahyp="http://schemas.microsoft.com/office/drawing/2018/hyperlinkcolor">
+  <p:cSld>
+    <p:spTree>
+      <p:nvGrpSpPr>
+        <p:cNvPr id="214" name="Shape 214"/>
+        <p:cNvGrpSpPr/>
+        <p:nvPr/>
+      </p:nvGrpSpPr>
+      <p:grpSpPr>
+        <a:xfrm>
+          <a:off x="0" y="0"/>
+          <a:ext cx="0" cy="0"/>
+          <a:chOff x="0" y="0"/>
+          <a:chExt cx="0" cy="0"/>
+        </a:xfrm>
+      </p:grpSpPr>
+      <p:sp>
+        <p:nvSpPr>
+          <p:cNvPr id="215" name="Google Shape;215;p33"/>
+          <p:cNvSpPr txBox="1"/>
+          <p:nvPr>
             <p:ph type="ctrTitle"/>
           </p:nvPr>
         </p:nvSpPr>
@@ -12179,7 +14047,7 @@
       </p:sp>
       <p:sp>
         <p:nvSpPr>
-          <p:cNvPr id="179" name="Google Shape;179;p28"/>
+          <p:cNvPr id="216" name="Google Shape;216;p33"/>
           <p:cNvSpPr txBox="1"/>
           <p:nvPr>
             <p:ph idx="1" type="subTitle"/>
@@ -12304,12 +14172,12 @@
 </p:sld>
 </file>
 
-<file path=ppt/slides/slide22.xml><?xml version="1.0" encoding="utf-8"?>
+<file path=ppt/slides/slide27.xml><?xml version="1.0" encoding="utf-8"?>
 <p:sld xmlns:a="http://schemas.openxmlformats.org/drawingml/2006/main" xmlns:r="http://schemas.openxmlformats.org/officeDocument/2006/relationships" xmlns:mc="http://schemas.openxmlformats.org/markup-compatibility/2006" xmlns:mv="urn:schemas-microsoft-com:mac:vml" xmlns:p="http://schemas.openxmlformats.org/presentationml/2006/main" xmlns:c="http://schemas.openxmlformats.org/drawingml/2006/chart" xmlns:dgm="http://schemas.openxmlformats.org/drawingml/2006/diagram" xmlns:o="urn:schemas-microsoft-com:office:office" xmlns:v="urn:schemas-microsoft-com:vml" xmlns:pvml="urn:schemas-microsoft-com:office:powerpoint" xmlns:com="http://schemas.openxmlformats.org/drawingml/2006/compatibility" xmlns:p14="http://schemas.microsoft.com/office/powerpoint/2010/main" xmlns:p15="http://schemas.microsoft.com/office/powerpoint/2012/main" xmlns:ahyp="http://schemas.microsoft.com/office/drawing/2018/hyperlinkcolor">
   <p:cSld>
     <p:spTree>
       <p:nvGrpSpPr>
-        <p:cNvPr id="183" name="Shape 183"/>
+        <p:cNvPr id="220" name="Shape 220"/>
         <p:cNvGrpSpPr/>
         <p:nvPr/>
       </p:nvGrpSpPr>
@@ -12323,7 +14191,7 @@
       </p:grpSpPr>
       <p:sp>
         <p:nvSpPr>
-          <p:cNvPr id="184" name="Google Shape;184;p29"/>
+          <p:cNvPr id="221" name="Google Shape;221;p34"/>
           <p:cNvSpPr txBox="1"/>
           <p:nvPr>
             <p:ph type="title"/>
@@ -12363,7 +14231,7 @@
       </p:sp>
       <p:sp>
         <p:nvSpPr>
-          <p:cNvPr id="185" name="Google Shape;185;p29"/>
+          <p:cNvPr id="222" name="Google Shape;222;p34"/>
           <p:cNvSpPr txBox="1"/>
           <p:nvPr>
             <p:ph idx="12" type="sldNum"/>
@@ -12428,7 +14296,7 @@
       </p:sp>
       <p:sp>
         <p:nvSpPr>
-          <p:cNvPr id="186" name="Google Shape;186;p29"/>
+          <p:cNvPr id="223" name="Google Shape;223;p34"/>
           <p:cNvSpPr txBox="1"/>
           <p:nvPr>
             <p:ph idx="1" type="body"/>
@@ -13562,34 +15430,59 @@
           </a:p>
         </p:txBody>
       </p:sp>
-      <p:pic>
-        <p:nvPicPr>
+      <p:sp>
+        <p:nvSpPr>
           <p:cNvPr id="78" name="Google Shape;78;p14"/>
-          <p:cNvPicPr preferRelativeResize="0"/>
-          <p:nvPr/>
-        </p:nvPicPr>
-        <p:blipFill>
-          <a:blip r:embed="rId4">
-            <a:alphaModFix/>
-          </a:blip>
-          <a:stretch>
-            <a:fillRect/>
-          </a:stretch>
-        </p:blipFill>
+          <p:cNvSpPr txBox="1"/>
+          <p:nvPr>
+            <p:ph idx="1" type="body"/>
+          </p:nvPr>
+        </p:nvSpPr>
         <p:spPr>
           <a:xfrm>
             <a:off x="274320" y="914400"/>
-            <a:ext cx="8595360" cy="3533648"/>
+            <a:ext cx="8595300" cy="4114800"/>
           </a:xfrm>
           <a:prstGeom prst="rect">
             <a:avLst/>
           </a:prstGeom>
-          <a:noFill/>
-          <a:ln>
-            <a:noFill/>
-          </a:ln>
         </p:spPr>
-      </p:pic>
+        <p:txBody>
+          <a:bodyPr anchorCtr="0" anchor="t" bIns="0" lIns="0" spcFirstLastPara="1" rIns="0" wrap="square" tIns="0">
+            <a:noAutofit/>
+          </a:bodyPr>
+          <a:lstStyle/>
+          <a:p>
+            <a:pPr indent="0" lvl="0" marL="0" rtl="0" algn="l">
+              <a:spcBef>
+                <a:spcPts val="0"/>
+              </a:spcBef>
+              <a:spcAft>
+                <a:spcPts val="1200"/>
+              </a:spcAft>
+              <a:buNone/>
+            </a:pPr>
+            <a:r>
+              <a:rPr lang="en"/>
+              <a:t>See course organization at </a:t>
+            </a:r>
+            <a:r>
+              <a:rPr lang="en" u="sng">
+                <a:solidFill>
+                  <a:schemeClr val="hlink"/>
+                </a:solidFill>
+                <a:hlinkClick r:id="rId4"/>
+              </a:rPr>
+              <a:t>https://amos.uni1.de</a:t>
+            </a:r>
+            <a:r>
+              <a:rPr lang="en"/>
+              <a:t> </a:t>
+            </a:r>
+            <a:endParaRPr/>
+          </a:p>
+        </p:txBody>
+      </p:sp>
     </p:spTree>
   </p:cSld>
   <p:clrMapOvr>
@@ -13832,7 +15725,7 @@
             <a:tbl>
               <a:tblPr>
                 <a:noFill/>
-                <a:tableStyleId>{FBA23C03-D307-4A0D-BA41-A0E6DD65F436}</a:tableStyleId>
+                <a:tableStyleId>{FB01EE5D-FCED-4213-B199-629BB343BD29}</a:tableStyleId>
               </a:tblPr>
               <a:tblGrid>
                 <a:gridCol w="1314450"/>

</xml_diff>

<commit_message>
Updated slides for winter 2023/24
</commit_message>
<xml_diff>
--- a/Lecture slides/AMOS A01 - Introduction.pptx
+++ b/Lecture slides/AMOS A01 - Introduction.pptx
@@ -35,6 +35,7 @@
     <p:sldId id="280" r:id="rId31"/>
     <p:sldId id="281" r:id="rId32"/>
     <p:sldId id="282" r:id="rId33"/>
+    <p:sldId id="283" r:id="rId34"/>
   </p:sldIdLst>
   <p:sldSz cy="5143500" cx="9144000"/>
   <p:notesSz cx="6858000" cy="9144000"/>
@@ -1127,7 +1128,7 @@
       </p:grpSpPr>
       <p:sp>
         <p:nvSpPr>
-          <p:cNvPr id="117" name="Google Shape;117;g23985d0d2d4_0_82:notes"/>
+          <p:cNvPr id="117" name="Google Shape;117;g2744fcb16d9_0_0:notes"/>
           <p:cNvSpPr/>
           <p:nvPr>
             <p:ph idx="2" type="sldImg"/>
@@ -1162,7 +1163,7 @@
       </p:sp>
       <p:sp>
         <p:nvSpPr>
-          <p:cNvPr id="118" name="Google Shape;118;g23985d0d2d4_0_82:notes"/>
+          <p:cNvPr id="118" name="Google Shape;118;g2744fcb16d9_0_0:notes"/>
           <p:cNvSpPr txBox="1"/>
           <p:nvPr>
             <p:ph idx="1" type="body"/>
@@ -1226,7 +1227,7 @@
       </p:grpSpPr>
       <p:sp>
         <p:nvSpPr>
-          <p:cNvPr id="124" name="Google Shape;124;g25b0a64b870_0_0:notes"/>
+          <p:cNvPr id="124" name="Google Shape;124;g23985d0d2d4_0_82:notes"/>
           <p:cNvSpPr/>
           <p:nvPr>
             <p:ph idx="2" type="sldImg"/>
@@ -1261,7 +1262,7 @@
       </p:sp>
       <p:sp>
         <p:nvSpPr>
-          <p:cNvPr id="125" name="Google Shape;125;g25b0a64b870_0_0:notes"/>
+          <p:cNvPr id="125" name="Google Shape;125;g23985d0d2d4_0_82:notes"/>
           <p:cNvSpPr txBox="1"/>
           <p:nvPr>
             <p:ph idx="1" type="body"/>
@@ -1325,7 +1326,7 @@
       </p:grpSpPr>
       <p:sp>
         <p:nvSpPr>
-          <p:cNvPr id="131" name="Google Shape;131;g11ffc178508_0_0:notes"/>
+          <p:cNvPr id="131" name="Google Shape;131;g25b0a64b870_0_0:notes"/>
           <p:cNvSpPr/>
           <p:nvPr>
             <p:ph idx="2" type="sldImg"/>
@@ -1360,7 +1361,7 @@
       </p:sp>
       <p:sp>
         <p:nvSpPr>
-          <p:cNvPr id="132" name="Google Shape;132;g11ffc178508_0_0:notes"/>
+          <p:cNvPr id="132" name="Google Shape;132;g25b0a64b870_0_0:notes"/>
           <p:cNvSpPr txBox="1"/>
           <p:nvPr>
             <p:ph idx="1" type="body"/>
@@ -1424,7 +1425,7 @@
       </p:grpSpPr>
       <p:sp>
         <p:nvSpPr>
-          <p:cNvPr id="138" name="Google Shape;138;g25b0a64b870_0_7:notes"/>
+          <p:cNvPr id="138" name="Google Shape;138;g11ffc178508_0_0:notes"/>
           <p:cNvSpPr/>
           <p:nvPr>
             <p:ph idx="2" type="sldImg"/>
@@ -1459,7 +1460,7 @@
       </p:sp>
       <p:sp>
         <p:nvSpPr>
-          <p:cNvPr id="139" name="Google Shape;139;g25b0a64b870_0_7:notes"/>
+          <p:cNvPr id="139" name="Google Shape;139;g11ffc178508_0_0:notes"/>
           <p:cNvSpPr txBox="1"/>
           <p:nvPr>
             <p:ph idx="1" type="body"/>
@@ -1509,7 +1510,7 @@
   <p:cSld>
     <p:spTree>
       <p:nvGrpSpPr>
-        <p:cNvPr id="145" name="Shape 145"/>
+        <p:cNvPr id="144" name="Shape 144"/>
         <p:cNvGrpSpPr/>
         <p:nvPr/>
       </p:nvGrpSpPr>
@@ -1523,7 +1524,7 @@
       </p:grpSpPr>
       <p:sp>
         <p:nvSpPr>
-          <p:cNvPr id="146" name="Google Shape;146;g260d82e8164_0_0:notes"/>
+          <p:cNvPr id="145" name="Google Shape;145;g25b0a64b870_0_7:notes"/>
           <p:cNvSpPr/>
           <p:nvPr>
             <p:ph idx="2" type="sldImg"/>
@@ -1558,7 +1559,7 @@
       </p:sp>
       <p:sp>
         <p:nvSpPr>
-          <p:cNvPr id="147" name="Google Shape;147;g260d82e8164_0_0:notes"/>
+          <p:cNvPr id="146" name="Google Shape;146;g25b0a64b870_0_7:notes"/>
           <p:cNvSpPr txBox="1"/>
           <p:nvPr>
             <p:ph idx="1" type="body"/>
@@ -1608,7 +1609,7 @@
   <p:cSld>
     <p:spTree>
       <p:nvGrpSpPr>
-        <p:cNvPr id="152" name="Shape 152"/>
+        <p:cNvPr id="151" name="Shape 151"/>
         <p:cNvGrpSpPr/>
         <p:nvPr/>
       </p:nvGrpSpPr>
@@ -1622,7 +1623,7 @@
       </p:grpSpPr>
       <p:sp>
         <p:nvSpPr>
-          <p:cNvPr id="153" name="Google Shape;153;g25f23d62f94_0_9:notes"/>
+          <p:cNvPr id="152" name="Google Shape;152;g260d82e8164_0_0:notes"/>
           <p:cNvSpPr/>
           <p:nvPr>
             <p:ph idx="2" type="sldImg"/>
@@ -1657,7 +1658,7 @@
       </p:sp>
       <p:sp>
         <p:nvSpPr>
-          <p:cNvPr id="154" name="Google Shape;154;g25f23d62f94_0_9:notes"/>
+          <p:cNvPr id="153" name="Google Shape;153;g260d82e8164_0_0:notes"/>
           <p:cNvSpPr txBox="1"/>
           <p:nvPr>
             <p:ph idx="1" type="body"/>
@@ -1707,7 +1708,7 @@
   <p:cSld>
     <p:spTree>
       <p:nvGrpSpPr>
-        <p:cNvPr id="160" name="Shape 160"/>
+        <p:cNvPr id="158" name="Shape 158"/>
         <p:cNvGrpSpPr/>
         <p:nvPr/>
       </p:nvGrpSpPr>
@@ -1721,7 +1722,7 @@
       </p:grpSpPr>
       <p:sp>
         <p:nvSpPr>
-          <p:cNvPr id="161" name="Google Shape;161;g23985d0d2d4_0_88:notes"/>
+          <p:cNvPr id="159" name="Google Shape;159;g25f23d62f94_0_9:notes"/>
           <p:cNvSpPr/>
           <p:nvPr>
             <p:ph idx="2" type="sldImg"/>
@@ -1756,7 +1757,7 @@
       </p:sp>
       <p:sp>
         <p:nvSpPr>
-          <p:cNvPr id="162" name="Google Shape;162;g23985d0d2d4_0_88:notes"/>
+          <p:cNvPr id="160" name="Google Shape;160;g25f23d62f94_0_9:notes"/>
           <p:cNvSpPr txBox="1"/>
           <p:nvPr>
             <p:ph idx="1" type="body"/>
@@ -1905,7 +1906,7 @@
   <p:cSld>
     <p:spTree>
       <p:nvGrpSpPr>
-        <p:cNvPr id="167" name="Shape 167"/>
+        <p:cNvPr id="166" name="Shape 166"/>
         <p:cNvGrpSpPr/>
         <p:nvPr/>
       </p:nvGrpSpPr>
@@ -1919,7 +1920,7 @@
       </p:grpSpPr>
       <p:sp>
         <p:nvSpPr>
-          <p:cNvPr id="168" name="Google Shape;168;g23985d0d2d4_0_94:notes"/>
+          <p:cNvPr id="167" name="Google Shape;167;g23985d0d2d4_0_88:notes"/>
           <p:cNvSpPr/>
           <p:nvPr>
             <p:ph idx="2" type="sldImg"/>
@@ -1954,7 +1955,7 @@
       </p:sp>
       <p:sp>
         <p:nvSpPr>
-          <p:cNvPr id="169" name="Google Shape;169;g23985d0d2d4_0_94:notes"/>
+          <p:cNvPr id="168" name="Google Shape;168;g23985d0d2d4_0_88:notes"/>
           <p:cNvSpPr txBox="1"/>
           <p:nvPr>
             <p:ph idx="1" type="body"/>
@@ -2004,7 +2005,7 @@
   <p:cSld>
     <p:spTree>
       <p:nvGrpSpPr>
-        <p:cNvPr id="174" name="Shape 174"/>
+        <p:cNvPr id="173" name="Shape 173"/>
         <p:cNvGrpSpPr/>
         <p:nvPr/>
       </p:nvGrpSpPr>
@@ -2018,7 +2019,7 @@
       </p:grpSpPr>
       <p:sp>
         <p:nvSpPr>
-          <p:cNvPr id="175" name="Google Shape;175;g23985d0d2d4_0_100:notes"/>
+          <p:cNvPr id="174" name="Google Shape;174;g23985d0d2d4_0_94:notes"/>
           <p:cNvSpPr/>
           <p:nvPr>
             <p:ph idx="2" type="sldImg"/>
@@ -2053,7 +2054,7 @@
       </p:sp>
       <p:sp>
         <p:nvSpPr>
-          <p:cNvPr id="176" name="Google Shape;176;g23985d0d2d4_0_100:notes"/>
+          <p:cNvPr id="175" name="Google Shape;175;g23985d0d2d4_0_94:notes"/>
           <p:cNvSpPr txBox="1"/>
           <p:nvPr>
             <p:ph idx="1" type="body"/>
@@ -2103,7 +2104,7 @@
   <p:cSld>
     <p:spTree>
       <p:nvGrpSpPr>
-        <p:cNvPr id="182" name="Shape 182"/>
+        <p:cNvPr id="180" name="Shape 180"/>
         <p:cNvGrpSpPr/>
         <p:nvPr/>
       </p:nvGrpSpPr>
@@ -2117,7 +2118,7 @@
       </p:grpSpPr>
       <p:sp>
         <p:nvSpPr>
-          <p:cNvPr id="183" name="Google Shape;183;g126320e9147_0_147:notes"/>
+          <p:cNvPr id="181" name="Google Shape;181;g23985d0d2d4_0_100:notes"/>
           <p:cNvSpPr/>
           <p:nvPr>
             <p:ph idx="2" type="sldImg"/>
@@ -2152,7 +2153,7 @@
       </p:sp>
       <p:sp>
         <p:nvSpPr>
-          <p:cNvPr id="184" name="Google Shape;184;g126320e9147_0_147:notes"/>
+          <p:cNvPr id="182" name="Google Shape;182;g23985d0d2d4_0_100:notes"/>
           <p:cNvSpPr txBox="1"/>
           <p:nvPr>
             <p:ph idx="1" type="body"/>
@@ -2202,7 +2203,7 @@
   <p:cSld>
     <p:spTree>
       <p:nvGrpSpPr>
-        <p:cNvPr id="190" name="Shape 190"/>
+        <p:cNvPr id="188" name="Shape 188"/>
         <p:cNvGrpSpPr/>
         <p:nvPr/>
       </p:nvGrpSpPr>
@@ -2216,7 +2217,7 @@
       </p:grpSpPr>
       <p:sp>
         <p:nvSpPr>
-          <p:cNvPr id="191" name="Google Shape;191;g126320e9147_0_94:notes"/>
+          <p:cNvPr id="189" name="Google Shape;189;g126320e9147_0_147:notes"/>
           <p:cNvSpPr/>
           <p:nvPr>
             <p:ph idx="2" type="sldImg"/>
@@ -2251,7 +2252,7 @@
       </p:sp>
       <p:sp>
         <p:nvSpPr>
-          <p:cNvPr id="192" name="Google Shape;192;g126320e9147_0_94:notes"/>
+          <p:cNvPr id="190" name="Google Shape;190;g126320e9147_0_147:notes"/>
           <p:cNvSpPr txBox="1"/>
           <p:nvPr>
             <p:ph idx="1" type="body"/>
@@ -2301,7 +2302,7 @@
   <p:cSld>
     <p:spTree>
       <p:nvGrpSpPr>
-        <p:cNvPr id="197" name="Shape 197"/>
+        <p:cNvPr id="196" name="Shape 196"/>
         <p:cNvGrpSpPr/>
         <p:nvPr/>
       </p:nvGrpSpPr>
@@ -2315,7 +2316,7 @@
       </p:grpSpPr>
       <p:sp>
         <p:nvSpPr>
-          <p:cNvPr id="198" name="Google Shape;198;g126320e9147_0_210:notes"/>
+          <p:cNvPr id="197" name="Google Shape;197;g126320e9147_0_94:notes"/>
           <p:cNvSpPr/>
           <p:nvPr>
             <p:ph idx="2" type="sldImg"/>
@@ -2350,7 +2351,7 @@
       </p:sp>
       <p:sp>
         <p:nvSpPr>
-          <p:cNvPr id="199" name="Google Shape;199;g126320e9147_0_210:notes"/>
+          <p:cNvPr id="198" name="Google Shape;198;g126320e9147_0_94:notes"/>
           <p:cNvSpPr txBox="1"/>
           <p:nvPr>
             <p:ph idx="1" type="body"/>
@@ -2400,7 +2401,7 @@
   <p:cSld>
     <p:spTree>
       <p:nvGrpSpPr>
-        <p:cNvPr id="204" name="Shape 204"/>
+        <p:cNvPr id="203" name="Shape 203"/>
         <p:cNvGrpSpPr/>
         <p:nvPr/>
       </p:nvGrpSpPr>
@@ -2414,7 +2415,7 @@
       </p:grpSpPr>
       <p:sp>
         <p:nvSpPr>
-          <p:cNvPr id="205" name="Google Shape;205;g126320e9147_0_223:notes"/>
+          <p:cNvPr id="204" name="Google Shape;204;g126320e9147_0_210:notes"/>
           <p:cNvSpPr/>
           <p:nvPr>
             <p:ph idx="2" type="sldImg"/>
@@ -2449,7 +2450,7 @@
       </p:sp>
       <p:sp>
         <p:nvSpPr>
-          <p:cNvPr id="206" name="Google Shape;206;g126320e9147_0_223:notes"/>
+          <p:cNvPr id="205" name="Google Shape;205;g126320e9147_0_210:notes"/>
           <p:cNvSpPr txBox="1"/>
           <p:nvPr>
             <p:ph idx="1" type="body"/>
@@ -2499,7 +2500,7 @@
   <p:cSld>
     <p:spTree>
       <p:nvGrpSpPr>
-        <p:cNvPr id="211" name="Shape 211"/>
+        <p:cNvPr id="210" name="Shape 210"/>
         <p:cNvGrpSpPr/>
         <p:nvPr/>
       </p:nvGrpSpPr>
@@ -2513,7 +2514,7 @@
       </p:grpSpPr>
       <p:sp>
         <p:nvSpPr>
-          <p:cNvPr id="212" name="Google Shape;212;g23985d0d2d4_0_38:notes"/>
+          <p:cNvPr id="211" name="Google Shape;211;g126320e9147_0_223:notes"/>
           <p:cNvSpPr/>
           <p:nvPr>
             <p:ph idx="2" type="sldImg"/>
@@ -2548,7 +2549,7 @@
       </p:sp>
       <p:sp>
         <p:nvSpPr>
-          <p:cNvPr id="213" name="Google Shape;213;g23985d0d2d4_0_38:notes"/>
+          <p:cNvPr id="212" name="Google Shape;212;g126320e9147_0_223:notes"/>
           <p:cNvSpPr txBox="1"/>
           <p:nvPr>
             <p:ph idx="1" type="body"/>
@@ -2612,7 +2613,7 @@
       </p:grpSpPr>
       <p:sp>
         <p:nvSpPr>
-          <p:cNvPr id="218" name="Google Shape;218;g23985d0d2d4_0_43:notes"/>
+          <p:cNvPr id="218" name="Google Shape;218;g23985d0d2d4_0_38:notes"/>
           <p:cNvSpPr/>
           <p:nvPr>
             <p:ph idx="2" type="sldImg"/>
@@ -2647,7 +2648,106 @@
       </p:sp>
       <p:sp>
         <p:nvSpPr>
-          <p:cNvPr id="219" name="Google Shape;219;g23985d0d2d4_0_43:notes"/>
+          <p:cNvPr id="219" name="Google Shape;219;g23985d0d2d4_0_38:notes"/>
+          <p:cNvSpPr txBox="1"/>
+          <p:nvPr>
+            <p:ph idx="1" type="body"/>
+          </p:nvPr>
+        </p:nvSpPr>
+        <p:spPr>
+          <a:xfrm>
+            <a:off x="685800" y="4343400"/>
+            <a:ext cx="5486400" cy="4114800"/>
+          </a:xfrm>
+          <a:prstGeom prst="rect">
+            <a:avLst/>
+          </a:prstGeom>
+        </p:spPr>
+        <p:txBody>
+          <a:bodyPr anchorCtr="0" anchor="t" bIns="91425" lIns="91425" spcFirstLastPara="1" rIns="91425" wrap="square" tIns="91425">
+            <a:noAutofit/>
+          </a:bodyPr>
+          <a:lstStyle/>
+          <a:p>
+            <a:pPr indent="0" lvl="0" marL="0" rtl="0" algn="l">
+              <a:spcBef>
+                <a:spcPts val="0"/>
+              </a:spcBef>
+              <a:spcAft>
+                <a:spcPts val="0"/>
+              </a:spcAft>
+              <a:buNone/>
+            </a:pPr>
+            <a:r>
+              <a:t/>
+            </a:r>
+            <a:endParaRPr/>
+          </a:p>
+        </p:txBody>
+      </p:sp>
+    </p:spTree>
+  </p:cSld>
+  <p:clrMapOvr>
+    <a:masterClrMapping/>
+  </p:clrMapOvr>
+</p:notes>
+</file>
+
+<file path=ppt/notesSlides/notesSlide28.xml><?xml version="1.0" encoding="utf-8"?>
+<p:notes xmlns:a="http://schemas.openxmlformats.org/drawingml/2006/main" xmlns:r="http://schemas.openxmlformats.org/officeDocument/2006/relationships" xmlns:mc="http://schemas.openxmlformats.org/markup-compatibility/2006" xmlns:mv="urn:schemas-microsoft-com:mac:vml" xmlns:p="http://schemas.openxmlformats.org/presentationml/2006/main" xmlns:c="http://schemas.openxmlformats.org/drawingml/2006/chart" xmlns:dgm="http://schemas.openxmlformats.org/drawingml/2006/diagram" xmlns:o="urn:schemas-microsoft-com:office:office" xmlns:v="urn:schemas-microsoft-com:vml" xmlns:pvml="urn:schemas-microsoft-com:office:powerpoint" xmlns:com="http://schemas.openxmlformats.org/drawingml/2006/compatibility" xmlns:p14="http://schemas.microsoft.com/office/powerpoint/2010/main" xmlns:p15="http://schemas.microsoft.com/office/powerpoint/2012/main" xmlns:ahyp="http://schemas.microsoft.com/office/drawing/2018/hyperlinkcolor" showMasterPhAnim="0" showMasterSp="0">
+  <p:cSld>
+    <p:spTree>
+      <p:nvGrpSpPr>
+        <p:cNvPr id="223" name="Shape 223"/>
+        <p:cNvGrpSpPr/>
+        <p:nvPr/>
+      </p:nvGrpSpPr>
+      <p:grpSpPr>
+        <a:xfrm>
+          <a:off x="0" y="0"/>
+          <a:ext cx="0" cy="0"/>
+          <a:chOff x="0" y="0"/>
+          <a:chExt cx="0" cy="0"/>
+        </a:xfrm>
+      </p:grpSpPr>
+      <p:sp>
+        <p:nvSpPr>
+          <p:cNvPr id="224" name="Google Shape;224;g23985d0d2d4_0_43:notes"/>
+          <p:cNvSpPr/>
+          <p:nvPr>
+            <p:ph idx="2" type="sldImg"/>
+          </p:nvPr>
+        </p:nvSpPr>
+        <p:spPr>
+          <a:xfrm>
+            <a:off x="381300" y="685800"/>
+            <a:ext cx="6096000" cy="3429000"/>
+          </a:xfrm>
+          <a:custGeom>
+            <a:rect b="b" l="l" r="r" t="t"/>
+            <a:pathLst>
+              <a:path extrusionOk="0" h="120000" w="120000">
+                <a:moveTo>
+                  <a:pt x="0" y="0"/>
+                </a:moveTo>
+                <a:lnTo>
+                  <a:pt x="120000" y="0"/>
+                </a:lnTo>
+                <a:lnTo>
+                  <a:pt x="120000" y="120000"/>
+                </a:lnTo>
+                <a:lnTo>
+                  <a:pt x="0" y="120000"/>
+                </a:lnTo>
+                <a:close/>
+              </a:path>
+            </a:pathLst>
+          </a:custGeom>
+        </p:spPr>
+      </p:sp>
+      <p:sp>
+        <p:nvSpPr>
+          <p:cNvPr id="225" name="Google Shape;225;g23985d0d2d4_0_43:notes"/>
           <p:cNvSpPr txBox="1"/>
           <p:nvPr>
             <p:ph idx="1" type="body"/>
@@ -6885,7 +6985,7 @@
             <a:tbl>
               <a:tblPr>
                 <a:noFill/>
-                <a:tableStyleId>{FB01EE5D-FCED-4213-B199-629BB343BD29}</a:tableStyleId>
+                <a:tableStyleId>{C11ED610-C3B9-4A8A-B426-B030FC94A886}</a:tableStyleId>
               </a:tblPr>
               <a:tblGrid>
                 <a:gridCol w="1314475"/>
@@ -9929,7 +10029,7 @@
             </a:pPr>
             <a:r>
               <a:rPr lang="en"/>
-              <a:t>Class Quizzes</a:t>
+              <a:t>Class Participation</a:t>
             </a:r>
             <a:endParaRPr/>
           </a:p>
@@ -9938,6 +10038,75 @@
       <p:sp>
         <p:nvSpPr>
           <p:cNvPr id="121" name="Google Shape;121;p20"/>
+          <p:cNvSpPr txBox="1"/>
+          <p:nvPr>
+            <p:ph idx="12" type="sldNum"/>
+          </p:nvPr>
+        </p:nvSpPr>
+        <p:spPr>
+          <a:xfrm>
+            <a:off x="7315202" y="4416550"/>
+            <a:ext cx="1828800" cy="731400"/>
+          </a:xfrm>
+          <a:prstGeom prst="rect">
+            <a:avLst/>
+          </a:prstGeom>
+        </p:spPr>
+        <p:txBody>
+          <a:bodyPr anchorCtr="0" anchor="b" bIns="91425" lIns="91425" spcFirstLastPara="1" rIns="91425" wrap="square" tIns="91425">
+            <a:noAutofit/>
+          </a:bodyPr>
+          <a:lstStyle/>
+          <a:p>
+            <a:pPr indent="0" lvl="0" marL="0" rtl="0" algn="r">
+              <a:spcBef>
+                <a:spcPts val="0"/>
+              </a:spcBef>
+              <a:spcAft>
+                <a:spcPts val="0"/>
+              </a:spcAft>
+              <a:buNone/>
+            </a:pPr>
+            <a:fld id="{00000000-1234-1234-1234-123412341234}" type="slidenum">
+              <a:rPr lang="en"/>
+              <a:t>‹#›</a:t>
+            </a:fld>
+            <a:endParaRPr/>
+          </a:p>
+          <a:p>
+            <a:pPr indent="0" lvl="0" marL="0" rtl="0" algn="r">
+              <a:spcBef>
+                <a:spcPts val="0"/>
+              </a:spcBef>
+              <a:spcAft>
+                <a:spcPts val="0"/>
+              </a:spcAft>
+              <a:buNone/>
+            </a:pPr>
+            <a:r>
+              <a:rPr b="0" lang="en" sz="900" u="sng">
+                <a:solidFill>
+                  <a:schemeClr val="hlink"/>
+                </a:solidFill>
+                <a:hlinkClick r:id="rId3"/>
+              </a:rPr>
+              <a:t>https://profriehle.com</a:t>
+            </a:r>
+            <a:r>
+              <a:rPr b="0" lang="en" sz="900">
+                <a:solidFill>
+                  <a:schemeClr val="dk2"/>
+                </a:solidFill>
+              </a:rPr>
+              <a:t> </a:t>
+            </a:r>
+            <a:endParaRPr/>
+          </a:p>
+        </p:txBody>
+      </p:sp>
+      <p:sp>
+        <p:nvSpPr>
+          <p:cNvPr id="122" name="Google Shape;122;p20"/>
           <p:cNvSpPr txBox="1"/>
           <p:nvPr>
             <p:ph idx="1" type="body"/>
@@ -9965,16 +10134,15 @@
               <a:spcAft>
                 <a:spcPts val="0"/>
               </a:spcAft>
-              <a:buClr>
-                <a:schemeClr val="dk1"/>
-              </a:buClr>
-              <a:buSzPts val="1100"/>
-              <a:buFont typeface="Arial"/>
-              <a:buNone/>
-            </a:pPr>
-            <a:r>
-              <a:rPr lang="en"/>
-              <a:t>Each class session starts with a class quiz</a:t>
+              <a:buNone/>
+            </a:pPr>
+            <a:r>
+              <a:rPr lang="en"/>
+              <a:t>Pa</a:t>
+            </a:r>
+            <a:r>
+              <a:rPr lang="en"/>
+              <a:t>rticipation is mandatory for</a:t>
             </a:r>
             <a:endParaRPr/>
           </a:p>
@@ -9991,7 +10159,7 @@
             </a:pPr>
             <a:r>
               <a:rPr lang="en"/>
-              <a:t>A quiz will test your understanding of last session’s topic</a:t>
+              <a:t>First day of class</a:t>
             </a:r>
             <a:endParaRPr/>
           </a:p>
@@ -10008,7 +10176,7 @@
             </a:pPr>
             <a:r>
               <a:rPr lang="en"/>
-              <a:t>A quiz typically has 5 questions and will last 10 minutes</a:t>
+              <a:t>Build process review</a:t>
             </a:r>
             <a:endParaRPr/>
           </a:p>
@@ -10025,35 +10193,14 @@
             </a:pPr>
             <a:r>
               <a:rPr lang="en"/>
-              <a:t>The overall quiz is graded using [0..10] scheme (10 points in total)</a:t>
-            </a:r>
-            <a:endParaRPr/>
-          </a:p>
-          <a:p>
-            <a:pPr indent="0" lvl="0" marL="0" rtl="0" algn="l">
-              <a:spcBef>
-                <a:spcPts val="1200"/>
-              </a:spcBef>
-              <a:spcAft>
-                <a:spcPts val="0"/>
-              </a:spcAft>
-              <a:buClr>
-                <a:schemeClr val="dk1"/>
-              </a:buClr>
-              <a:buSzPts val="1100"/>
-              <a:buFont typeface="Arial"/>
-              <a:buNone/>
-            </a:pPr>
-            <a:r>
-              <a:rPr lang="en"/>
-              <a:t>A class quiz will open precisely when class starts</a:t>
+              <a:t>Mid-project review</a:t>
             </a:r>
             <a:endParaRPr/>
           </a:p>
           <a:p>
             <a:pPr indent="-342900" lvl="0" marL="457200" rtl="0" algn="l">
               <a:spcBef>
-                <a:spcPts val="1200"/>
+                <a:spcPts val="0"/>
               </a:spcBef>
               <a:spcAft>
                 <a:spcPts val="0"/>
@@ -10063,14 +10210,30 @@
             </a:pPr>
             <a:r>
               <a:rPr lang="en"/>
-              <a:t>The quiz is administered automatically</a:t>
+              <a:t>AMOS demo day</a:t>
+            </a:r>
+            <a:endParaRPr/>
+          </a:p>
+          <a:p>
+            <a:pPr indent="0" lvl="0" marL="0" rtl="0" algn="l">
+              <a:spcBef>
+                <a:spcPts val="1200"/>
+              </a:spcBef>
+              <a:spcAft>
+                <a:spcPts val="0"/>
+              </a:spcAft>
+              <a:buNone/>
+            </a:pPr>
+            <a:r>
+              <a:rPr lang="en"/>
+              <a:t>For all other class days</a:t>
             </a:r>
             <a:endParaRPr/>
           </a:p>
           <a:p>
             <a:pPr indent="-342900" lvl="0" marL="457200" rtl="0" algn="l">
               <a:spcBef>
-                <a:spcPts val="0"/>
+                <a:spcPts val="1200"/>
               </a:spcBef>
               <a:spcAft>
                 <a:spcPts val="0"/>
@@ -10080,113 +10243,7 @@
             </a:pPr>
             <a:r>
               <a:rPr lang="en"/>
-              <a:t>It is your job to have reliable Internet access etc.</a:t>
-            </a:r>
-            <a:endParaRPr/>
-          </a:p>
-          <a:p>
-            <a:pPr indent="-342900" lvl="0" marL="457200" rtl="0" algn="l">
-              <a:spcBef>
-                <a:spcPts val="0"/>
-              </a:spcBef>
-              <a:spcAft>
-                <a:spcPts val="0"/>
-              </a:spcAft>
-              <a:buSzPts val="1800"/>
-              <a:buChar char="●"/>
-            </a:pPr>
-            <a:r>
-              <a:rPr lang="en"/>
-              <a:t>There is no way to make up for a missed quiz</a:t>
-            </a:r>
-            <a:endParaRPr/>
-          </a:p>
-          <a:p>
-            <a:pPr indent="0" lvl="0" marL="0" rtl="0" algn="l">
-              <a:spcBef>
-                <a:spcPts val="1200"/>
-              </a:spcBef>
-              <a:spcAft>
-                <a:spcPts val="1200"/>
-              </a:spcAft>
-              <a:buClr>
-                <a:schemeClr val="dk1"/>
-              </a:buClr>
-              <a:buSzPts val="1100"/>
-              <a:buFont typeface="Arial"/>
-              <a:buNone/>
-            </a:pPr>
-            <a:r>
-              <a:t/>
-            </a:r>
-            <a:endParaRPr/>
-          </a:p>
-        </p:txBody>
-      </p:sp>
-      <p:sp>
-        <p:nvSpPr>
-          <p:cNvPr id="122" name="Google Shape;122;p20"/>
-          <p:cNvSpPr txBox="1"/>
-          <p:nvPr>
-            <p:ph idx="12" type="sldNum"/>
-          </p:nvPr>
-        </p:nvSpPr>
-        <p:spPr>
-          <a:xfrm>
-            <a:off x="7315202" y="4416550"/>
-            <a:ext cx="1828800" cy="731400"/>
-          </a:xfrm>
-          <a:prstGeom prst="rect">
-            <a:avLst/>
-          </a:prstGeom>
-        </p:spPr>
-        <p:txBody>
-          <a:bodyPr anchorCtr="0" anchor="b" bIns="91425" lIns="91425" spcFirstLastPara="1" rIns="91425" wrap="square" tIns="91425">
-            <a:noAutofit/>
-          </a:bodyPr>
-          <a:lstStyle/>
-          <a:p>
-            <a:pPr indent="0" lvl="0" marL="0" rtl="0" algn="r">
-              <a:spcBef>
-                <a:spcPts val="0"/>
-              </a:spcBef>
-              <a:spcAft>
-                <a:spcPts val="0"/>
-              </a:spcAft>
-              <a:buNone/>
-            </a:pPr>
-            <a:fld id="{00000000-1234-1234-1234-123412341234}" type="slidenum">
-              <a:rPr lang="en"/>
-              <a:t>‹#›</a:t>
-            </a:fld>
-            <a:endParaRPr/>
-          </a:p>
-          <a:p>
-            <a:pPr indent="0" lvl="0" marL="0" rtl="0" algn="r">
-              <a:spcBef>
-                <a:spcPts val="0"/>
-              </a:spcBef>
-              <a:spcAft>
-                <a:spcPts val="0"/>
-              </a:spcAft>
-              <a:buNone/>
-            </a:pPr>
-            <a:r>
-              <a:rPr b="0" lang="en" sz="900" u="sng">
-                <a:solidFill>
-                  <a:schemeClr val="hlink"/>
-                </a:solidFill>
-                <a:hlinkClick r:id="rId3"/>
-              </a:rPr>
-              <a:t>https://profriehle.com</a:t>
-            </a:r>
-            <a:r>
-              <a:rPr b="0" lang="en" sz="900">
-                <a:solidFill>
-                  <a:schemeClr val="dk2"/>
-                </a:solidFill>
-              </a:rPr>
-              <a:t> </a:t>
+              <a:t>Class &gt;&gt; Slides &gt;&gt; Videos</a:t>
             </a:r>
             <a:endParaRPr/>
           </a:p>
@@ -10251,7 +10308,7 @@
             </a:pPr>
             <a:r>
               <a:rPr lang="en"/>
-              <a:t>Project Work Grading</a:t>
+              <a:t>Class Quizzes</a:t>
             </a:r>
             <a:endParaRPr/>
           </a:p>
@@ -10287,11 +10344,16 @@
               <a:spcAft>
                 <a:spcPts val="0"/>
               </a:spcAft>
-              <a:buNone/>
-            </a:pPr>
-            <a:r>
-              <a:rPr lang="en"/>
-              <a:t>We grade by deliverables, see homework document, including</a:t>
+              <a:buClr>
+                <a:schemeClr val="dk1"/>
+              </a:buClr>
+              <a:buSzPts val="1100"/>
+              <a:buFont typeface="Arial"/>
+              <a:buNone/>
+            </a:pPr>
+            <a:r>
+              <a:rPr lang="en"/>
+              <a:t>Each class session starts with a class quiz</a:t>
             </a:r>
             <a:endParaRPr/>
           </a:p>
@@ -10308,7 +10370,7 @@
             </a:pPr>
             <a:r>
               <a:rPr lang="en"/>
-              <a:t>Regular deliverables (product backlog, code contributions, …) every sprint</a:t>
+              <a:t>A quiz will test your understanding of last session’s topic</a:t>
             </a:r>
             <a:endParaRPr/>
           </a:p>
@@ -10325,30 +10387,14 @@
             </a:pPr>
             <a:r>
               <a:rPr lang="en"/>
-              <a:t>Irregular (one-time) deliverables as they happen</a:t>
-            </a:r>
-            <a:endParaRPr/>
-          </a:p>
-          <a:p>
-            <a:pPr indent="0" lvl="0" marL="0" rtl="0" algn="l">
-              <a:spcBef>
-                <a:spcPts val="1200"/>
-              </a:spcBef>
-              <a:spcAft>
-                <a:spcPts val="0"/>
-              </a:spcAft>
-              <a:buNone/>
-            </a:pPr>
-            <a:r>
-              <a:rPr lang="en"/>
-              <a:t>We also grade anyone’s individual teamwork contribution when</a:t>
+              <a:t>A quiz typically has 5 questions and will last 10 minutes</a:t>
             </a:r>
             <a:endParaRPr/>
           </a:p>
           <a:p>
             <a:pPr indent="-342900" lvl="0" marL="457200" rtl="0" algn="l">
               <a:spcBef>
-                <a:spcPts val="1200"/>
+                <a:spcPts val="0"/>
               </a:spcBef>
               <a:spcAft>
                 <a:spcPts val="0"/>
@@ -10358,7 +10404,7 @@
             </a:pPr>
             <a:r>
               <a:rPr lang="en"/>
-              <a:t>We are present in the team meetings, usually sprint 3, 5, 7, 10, and 13</a:t>
+              <a:t>The overall quiz is graded using [0..10] scheme (10 points in total)</a:t>
             </a:r>
             <a:endParaRPr/>
           </a:p>
@@ -10370,11 +10416,16 @@
               <a:spcAft>
                 <a:spcPts val="0"/>
               </a:spcAft>
-              <a:buNone/>
-            </a:pPr>
-            <a:r>
-              <a:rPr lang="en"/>
-              <a:t>Our expectations are explained in class and documented as the</a:t>
+              <a:buClr>
+                <a:schemeClr val="dk1"/>
+              </a:buClr>
+              <a:buSzPts val="1100"/>
+              <a:buFont typeface="Arial"/>
+              <a:buNone/>
+            </a:pPr>
+            <a:r>
+              <a:rPr lang="en"/>
+              <a:t>A class quiz will open precisely when class starts</a:t>
             </a:r>
             <a:endParaRPr/>
           </a:p>
@@ -10389,6 +10440,65 @@
               <a:buSzPts val="1800"/>
               <a:buChar char="●"/>
             </a:pPr>
+            <a:r>
+              <a:rPr lang="en"/>
+              <a:t>The quiz is administered automatically</a:t>
+            </a:r>
+            <a:endParaRPr/>
+          </a:p>
+          <a:p>
+            <a:pPr indent="-342900" lvl="0" marL="457200" rtl="0" algn="l">
+              <a:spcBef>
+                <a:spcPts val="0"/>
+              </a:spcBef>
+              <a:spcAft>
+                <a:spcPts val="0"/>
+              </a:spcAft>
+              <a:buSzPts val="1800"/>
+              <a:buChar char="●"/>
+            </a:pPr>
+            <a:r>
+              <a:rPr lang="en"/>
+              <a:t>It is your job to have reliable Internet access etc.</a:t>
+            </a:r>
+            <a:endParaRPr/>
+          </a:p>
+          <a:p>
+            <a:pPr indent="-342900" lvl="0" marL="457200" rtl="0" algn="l">
+              <a:spcBef>
+                <a:spcPts val="0"/>
+              </a:spcBef>
+              <a:spcAft>
+                <a:spcPts val="0"/>
+              </a:spcAft>
+              <a:buSzPts val="1800"/>
+              <a:buChar char="●"/>
+            </a:pPr>
+            <a:r>
+              <a:rPr lang="en"/>
+              <a:t>There is no way to make up for a missed quiz</a:t>
+            </a:r>
+            <a:endParaRPr/>
+          </a:p>
+          <a:p>
+            <a:pPr indent="0" lvl="0" marL="0" rtl="0" algn="l">
+              <a:spcBef>
+                <a:spcPts val="1200"/>
+              </a:spcBef>
+              <a:spcAft>
+                <a:spcPts val="1200"/>
+              </a:spcAft>
+              <a:buClr>
+                <a:schemeClr val="dk1"/>
+              </a:buClr>
+              <a:buSzPts val="1100"/>
+              <a:buFont typeface="Arial"/>
+              <a:buNone/>
+            </a:pPr>
+            <a:r>
+              <a:rPr lang="en"/>
+              <a:t>Class quizzes are available at </a:t>
+            </a:r>
             <a:r>
               <a:rPr lang="en" u="sng">
                 <a:solidFill>
@@ -10396,33 +10506,11 @@
                 </a:solidFill>
                 <a:hlinkClick r:id="rId3"/>
               </a:rPr>
-              <a:t>Capabilities timeline</a:t>
-            </a:r>
-            <a:r>
-              <a:rPr lang="en"/>
-              <a:t> and the</a:t>
-            </a:r>
-            <a:endParaRPr/>
-          </a:p>
-          <a:p>
-            <a:pPr indent="-342900" lvl="0" marL="457200" rtl="0" algn="l">
-              <a:spcBef>
-                <a:spcPts val="0"/>
-              </a:spcBef>
-              <a:spcAft>
-                <a:spcPts val="0"/>
-              </a:spcAft>
-              <a:buSzPts val="1800"/>
-              <a:buChar char="●"/>
-            </a:pPr>
-            <a:r>
-              <a:rPr lang="en" u="sng">
-                <a:solidFill>
-                  <a:schemeClr val="hlink"/>
-                </a:solidFill>
-                <a:hlinkClick r:id="rId4"/>
-              </a:rPr>
-              <a:t>Capabilities timeline explanation</a:t>
+              <a:t>https://learn.uni1.de</a:t>
+            </a:r>
+            <a:r>
+              <a:rPr lang="en"/>
+              <a:t> </a:t>
             </a:r>
             <a:endParaRPr/>
           </a:p>
@@ -10481,7 +10569,7 @@
                 <a:solidFill>
                   <a:schemeClr val="hlink"/>
                 </a:solidFill>
-                <a:hlinkClick r:id="rId5"/>
+                <a:hlinkClick r:id="rId4"/>
               </a:rPr>
               <a:t>https://profriehle.com</a:t>
             </a:r>
@@ -10556,7 +10644,7 @@
             </a:pPr>
             <a:r>
               <a:rPr lang="en"/>
-              <a:t>Collaboration and Grading</a:t>
+              <a:t>Project Work</a:t>
             </a:r>
             <a:endParaRPr/>
           </a:p>
@@ -10596,23 +10684,7 @@
             </a:pPr>
             <a:r>
               <a:rPr lang="en"/>
-              <a:t>We (have to) grade you individually</a:t>
-            </a:r>
-            <a:endParaRPr/>
-          </a:p>
-          <a:p>
-            <a:pPr indent="0" lvl="0" marL="0" rtl="0" algn="l">
-              <a:spcBef>
-                <a:spcPts val="1200"/>
-              </a:spcBef>
-              <a:spcAft>
-                <a:spcPts val="0"/>
-              </a:spcAft>
-              <a:buNone/>
-            </a:pPr>
-            <a:r>
-              <a:rPr lang="en"/>
-              <a:t>If you collaborate, for example,</a:t>
+              <a:t>We grade by deliverables, see homework document, including</a:t>
             </a:r>
             <a:endParaRPr/>
           </a:p>
@@ -10629,7 +10701,7 @@
             </a:pPr>
             <a:r>
               <a:rPr lang="en"/>
-              <a:t>by pair programming</a:t>
+              <a:t>Regular deliverables (product backlog, code contributions, …) every sprint</a:t>
             </a:r>
             <a:endParaRPr/>
           </a:p>
@@ -10646,7 +10718,7 @@
             </a:pPr>
             <a:r>
               <a:rPr lang="en"/>
-              <a:t>by pair designing</a:t>
+              <a:t>Irregular (one-time) deliverables as they happen</a:t>
             </a:r>
             <a:endParaRPr/>
           </a:p>
@@ -10656,13 +10728,94 @@
                 <a:spcPts val="1200"/>
               </a:spcBef>
               <a:spcAft>
+                <a:spcPts val="0"/>
+              </a:spcAft>
+              <a:buNone/>
+            </a:pPr>
+            <a:r>
+              <a:rPr lang="en"/>
+              <a:t>We also grade anyone’s individual teamwork contribution when</a:t>
+            </a:r>
+            <a:endParaRPr/>
+          </a:p>
+          <a:p>
+            <a:pPr indent="-342900" lvl="0" marL="457200" rtl="0" algn="l">
+              <a:spcBef>
                 <a:spcPts val="1200"/>
-              </a:spcAft>
-              <a:buNone/>
-            </a:pPr>
-            <a:r>
-              <a:rPr lang="en"/>
-              <a:t>you agree to be graded jointly</a:t>
+              </a:spcBef>
+              <a:spcAft>
+                <a:spcPts val="0"/>
+              </a:spcAft>
+              <a:buSzPts val="1800"/>
+              <a:buChar char="●"/>
+            </a:pPr>
+            <a:r>
+              <a:rPr lang="en"/>
+              <a:t>We are present in the team meetings (class days 3, 5, 7, 10, and 13)</a:t>
+            </a:r>
+            <a:endParaRPr/>
+          </a:p>
+          <a:p>
+            <a:pPr indent="0" lvl="0" marL="0" rtl="0" algn="l">
+              <a:spcBef>
+                <a:spcPts val="1200"/>
+              </a:spcBef>
+              <a:spcAft>
+                <a:spcPts val="0"/>
+              </a:spcAft>
+              <a:buNone/>
+            </a:pPr>
+            <a:r>
+              <a:rPr lang="en"/>
+              <a:t>Our expectations are explained in class and documented as the</a:t>
+            </a:r>
+            <a:endParaRPr/>
+          </a:p>
+          <a:p>
+            <a:pPr indent="-342900" lvl="0" marL="457200" rtl="0" algn="l">
+              <a:spcBef>
+                <a:spcPts val="1200"/>
+              </a:spcBef>
+              <a:spcAft>
+                <a:spcPts val="0"/>
+              </a:spcAft>
+              <a:buSzPts val="1800"/>
+              <a:buChar char="●"/>
+            </a:pPr>
+            <a:r>
+              <a:rPr lang="en" u="sng">
+                <a:solidFill>
+                  <a:schemeClr val="hlink"/>
+                </a:solidFill>
+                <a:hlinkClick r:id="rId3"/>
+              </a:rPr>
+              <a:t>Capabilities timeline</a:t>
+            </a:r>
+            <a:r>
+              <a:rPr lang="en"/>
+              <a:t> and the</a:t>
+            </a:r>
+            <a:endParaRPr/>
+          </a:p>
+          <a:p>
+            <a:pPr indent="-342900" lvl="0" marL="457200" rtl="0" algn="l">
+              <a:spcBef>
+                <a:spcPts val="0"/>
+              </a:spcBef>
+              <a:spcAft>
+                <a:spcPts val="0"/>
+              </a:spcAft>
+              <a:buSzPts val="1800"/>
+              <a:buChar char="●"/>
+            </a:pPr>
+            <a:r>
+              <a:rPr lang="en" u="sng">
+                <a:solidFill>
+                  <a:schemeClr val="hlink"/>
+                </a:solidFill>
+                <a:hlinkClick r:id="rId4"/>
+              </a:rPr>
+              <a:t>Capabilities timeline explanation</a:t>
             </a:r>
             <a:endParaRPr/>
           </a:p>
@@ -10721,7 +10874,7 @@
                 <a:solidFill>
                   <a:schemeClr val="hlink"/>
                 </a:solidFill>
-                <a:hlinkClick r:id="rId3"/>
+                <a:hlinkClick r:id="rId5"/>
               </a:rPr>
               <a:t>https://profriehle.com</a:t>
             </a:r>
@@ -10796,7 +10949,7 @@
             </a:pPr>
             <a:r>
               <a:rPr lang="en"/>
-              <a:t>Major Milestones</a:t>
+              <a:t>Collaboration and Grading</a:t>
             </a:r>
             <a:endParaRPr/>
           </a:p>
@@ -10825,125 +10978,84 @@
           </a:bodyPr>
           <a:lstStyle/>
           <a:p>
+            <a:pPr indent="0" lvl="0" marL="0" rtl="0" algn="l">
+              <a:spcBef>
+                <a:spcPts val="0"/>
+              </a:spcBef>
+              <a:spcAft>
+                <a:spcPts val="0"/>
+              </a:spcAft>
+              <a:buNone/>
+            </a:pPr>
+            <a:r>
+              <a:rPr lang="en"/>
+              <a:t>We (have to) grade you individually</a:t>
+            </a:r>
+            <a:endParaRPr/>
+          </a:p>
+          <a:p>
+            <a:pPr indent="0" lvl="0" marL="0" rtl="0" algn="l">
+              <a:spcBef>
+                <a:spcPts val="1200"/>
+              </a:spcBef>
+              <a:spcAft>
+                <a:spcPts val="0"/>
+              </a:spcAft>
+              <a:buNone/>
+            </a:pPr>
+            <a:r>
+              <a:rPr lang="en"/>
+              <a:t>If you collaborate, for example,</a:t>
+            </a:r>
+            <a:endParaRPr/>
+          </a:p>
+          <a:p>
             <a:pPr indent="-342900" lvl="0" marL="457200" rtl="0" algn="l">
               <a:spcBef>
-                <a:spcPts val="0"/>
+                <a:spcPts val="1200"/>
               </a:spcBef>
               <a:spcAft>
                 <a:spcPts val="0"/>
               </a:spcAft>
               <a:buSzPts val="1800"/>
-              <a:buAutoNum type="arabicPeriod"/>
-            </a:pPr>
-            <a:r>
-              <a:rPr lang="en"/>
-              <a:t>Build process review (quality gate)</a:t>
-            </a:r>
-            <a:endParaRPr/>
-          </a:p>
-          <a:p>
-            <a:pPr indent="-317500" lvl="1" marL="914400" rtl="0" algn="l">
-              <a:spcBef>
-                <a:spcPts val="0"/>
-              </a:spcBef>
-              <a:spcAft>
-                <a:spcPts val="0"/>
-              </a:spcAft>
-              <a:buSzPts val="1400"/>
-              <a:buAutoNum type="alphaLcPeriod"/>
-            </a:pPr>
-            <a:r>
-              <a:rPr lang="en"/>
-              <a:t>You are </a:t>
-            </a:r>
-            <a:r>
-              <a:rPr lang="en"/>
-              <a:t>expected to demo a well working build process</a:t>
-            </a:r>
-            <a:endParaRPr/>
-          </a:p>
-          <a:p>
-            <a:pPr indent="-317500" lvl="1" marL="914400" rtl="0" algn="l">
-              <a:spcBef>
-                <a:spcPts val="0"/>
-              </a:spcBef>
-              <a:spcAft>
-                <a:spcPts val="0"/>
-              </a:spcAft>
-              <a:buSzPts val="1400"/>
-              <a:buAutoNum type="alphaLcPeriod"/>
-            </a:pPr>
-            <a:r>
-              <a:rPr lang="en"/>
-              <a:t>If you fail, you will be put on notice</a:t>
+              <a:buChar char="●"/>
+            </a:pPr>
+            <a:r>
+              <a:rPr lang="en"/>
+              <a:t>by pair programming</a:t>
             </a:r>
             <a:endParaRPr/>
           </a:p>
           <a:p>
             <a:pPr indent="-342900" lvl="0" marL="457200" rtl="0" algn="l">
               <a:spcBef>
-                <a:spcPts val="1000"/>
+                <a:spcPts val="0"/>
               </a:spcBef>
               <a:spcAft>
                 <a:spcPts val="0"/>
               </a:spcAft>
               <a:buSzPts val="1800"/>
-              <a:buAutoNum type="arabicPeriod"/>
-            </a:pPr>
-            <a:r>
-              <a:rPr lang="en"/>
-              <a:t>Mid-project review (quality gate)</a:t>
-            </a:r>
-            <a:endParaRPr/>
-          </a:p>
-          <a:p>
-            <a:pPr indent="-317500" lvl="1" marL="914400" rtl="0" algn="l">
-              <a:spcBef>
-                <a:spcPts val="0"/>
-              </a:spcBef>
-              <a:spcAft>
-                <a:spcPts val="0"/>
-              </a:spcAft>
-              <a:buSzPts val="1400"/>
-              <a:buAutoNum type="alphaLcPeriod"/>
-            </a:pPr>
-            <a:r>
-              <a:rPr lang="en"/>
-              <a:t>You are expected to demonstrate your work</a:t>
-            </a:r>
-            <a:endParaRPr/>
-          </a:p>
-          <a:p>
-            <a:pPr indent="-317500" lvl="1" marL="914400" rtl="0" algn="l">
-              <a:spcBef>
-                <a:spcPts val="0"/>
-              </a:spcBef>
-              <a:spcAft>
-                <a:spcPts val="0"/>
-              </a:spcAft>
-              <a:buSzPts val="1400"/>
-              <a:buAutoNum type="alphaLcPeriod"/>
-            </a:pPr>
-            <a:r>
-              <a:rPr lang="en"/>
-              <a:t>If you fail, you may lose your industry partner</a:t>
-            </a:r>
-            <a:endParaRPr/>
-          </a:p>
-          <a:p>
-            <a:pPr indent="-342900" lvl="0" marL="457200" rtl="0" algn="l">
-              <a:spcBef>
-                <a:spcPts val="1000"/>
-              </a:spcBef>
-              <a:spcAft>
+              <a:buChar char="●"/>
+            </a:pPr>
+            <a:r>
+              <a:rPr lang="en"/>
+              <a:t>by pair designing</a:t>
+            </a:r>
+            <a:endParaRPr/>
+          </a:p>
+          <a:p>
+            <a:pPr indent="0" lvl="0" marL="0" rtl="0" algn="l">
+              <a:spcBef>
                 <a:spcPts val="1200"/>
-              </a:spcAft>
-              <a:buSzPts val="1800"/>
-              <a:buAutoNum type="arabicPeriod"/>
-            </a:pPr>
-            <a:r>
-              <a:rPr lang="en"/>
-              <a:t>Final project release and demo day</a:t>
+              </a:spcBef>
+              <a:spcAft>
+                <a:spcPts val="1200"/>
+              </a:spcAft>
+              <a:buNone/>
+            </a:pPr>
+            <a:r>
+              <a:rPr lang="en"/>
+              <a:t>you agree to be graded jointly</a:t>
             </a:r>
             <a:endParaRPr/>
           </a:p>
@@ -11018,34 +11130,6 @@
           </a:p>
         </p:txBody>
       </p:sp>
-      <p:pic>
-        <p:nvPicPr>
-          <p:cNvPr id="144" name="Google Shape;144;p23"/>
-          <p:cNvPicPr preferRelativeResize="0"/>
-          <p:nvPr/>
-        </p:nvPicPr>
-        <p:blipFill>
-          <a:blip r:embed="rId4">
-            <a:alphaModFix/>
-          </a:blip>
-          <a:stretch>
-            <a:fillRect/>
-          </a:stretch>
-        </p:blipFill>
-        <p:spPr>
-          <a:xfrm>
-            <a:off x="6355080" y="1066800"/>
-            <a:ext cx="1828800" cy="1828800"/>
-          </a:xfrm>
-          <a:prstGeom prst="rect">
-            <a:avLst/>
-          </a:prstGeom>
-          <a:noFill/>
-          <a:ln>
-            <a:noFill/>
-          </a:ln>
-        </p:spPr>
-      </p:pic>
     </p:spTree>
   </p:cSld>
   <p:clrMapOvr>
@@ -11059,7 +11143,7 @@
   <p:cSld>
     <p:spTree>
       <p:nvGrpSpPr>
-        <p:cNvPr id="148" name="Shape 148"/>
+        <p:cNvPr id="147" name="Shape 147"/>
         <p:cNvGrpSpPr/>
         <p:nvPr/>
       </p:nvGrpSpPr>
@@ -11073,7 +11157,7 @@
       </p:grpSpPr>
       <p:sp>
         <p:nvSpPr>
-          <p:cNvPr id="149" name="Google Shape;149;p24"/>
+          <p:cNvPr id="148" name="Google Shape;148;p24"/>
           <p:cNvSpPr txBox="1"/>
           <p:nvPr>
             <p:ph type="title"/>
@@ -11105,7 +11189,7 @@
             </a:pPr>
             <a:r>
               <a:rPr lang="en"/>
-              <a:t>Team Issues</a:t>
+              <a:t>Major Milestones</a:t>
             </a:r>
             <a:endParaRPr/>
           </a:p>
@@ -11113,7 +11197,7 @@
       </p:sp>
       <p:sp>
         <p:nvSpPr>
-          <p:cNvPr id="150" name="Google Shape;150;p24"/>
+          <p:cNvPr id="149" name="Google Shape;149;p24"/>
           <p:cNvSpPr txBox="1"/>
           <p:nvPr>
             <p:ph idx="1" type="body"/>
@@ -11134,68 +11218,125 @@
           </a:bodyPr>
           <a:lstStyle/>
           <a:p>
-            <a:pPr indent="0" lvl="0" marL="0" rtl="0" algn="l">
-              <a:spcBef>
-                <a:spcPts val="0"/>
-              </a:spcBef>
-              <a:spcAft>
-                <a:spcPts val="0"/>
-              </a:spcAft>
-              <a:buNone/>
-            </a:pPr>
-            <a:r>
-              <a:rPr lang="en"/>
-              <a:t>We grade your individual performance, not the team performance</a:t>
-            </a:r>
-            <a:endParaRPr/>
-          </a:p>
-          <a:p>
             <a:pPr indent="-342900" lvl="0" marL="457200" rtl="0" algn="l">
               <a:spcBef>
+                <a:spcPts val="0"/>
+              </a:spcBef>
+              <a:spcAft>
+                <a:spcPts val="0"/>
+              </a:spcAft>
+              <a:buSzPts val="1800"/>
+              <a:buAutoNum type="arabicPeriod"/>
+            </a:pPr>
+            <a:r>
+              <a:rPr lang="en"/>
+              <a:t>Build process review (quality gate)</a:t>
+            </a:r>
+            <a:endParaRPr/>
+          </a:p>
+          <a:p>
+            <a:pPr indent="-317500" lvl="1" marL="914400" rtl="0" algn="l">
+              <a:spcBef>
+                <a:spcPts val="0"/>
+              </a:spcBef>
+              <a:spcAft>
+                <a:spcPts val="0"/>
+              </a:spcAft>
+              <a:buSzPts val="1400"/>
+              <a:buAutoNum type="alphaLcPeriod"/>
+            </a:pPr>
+            <a:r>
+              <a:rPr lang="en"/>
+              <a:t>You are </a:t>
+            </a:r>
+            <a:r>
+              <a:rPr lang="en"/>
+              <a:t>expected to demo a well working build process</a:t>
+            </a:r>
+            <a:endParaRPr/>
+          </a:p>
+          <a:p>
+            <a:pPr indent="-317500" lvl="1" marL="914400" rtl="0" algn="l">
+              <a:spcBef>
+                <a:spcPts val="0"/>
+              </a:spcBef>
+              <a:spcAft>
+                <a:spcPts val="0"/>
+              </a:spcAft>
+              <a:buSzPts val="1400"/>
+              <a:buAutoNum type="alphaLcPeriod"/>
+            </a:pPr>
+            <a:r>
+              <a:rPr lang="en"/>
+              <a:t>Everyone in the team should be able to do this</a:t>
+            </a:r>
+            <a:endParaRPr/>
+          </a:p>
+          <a:p>
+            <a:pPr indent="-342900" lvl="0" marL="457200" rtl="0" algn="l">
+              <a:spcBef>
+                <a:spcPts val="1000"/>
+              </a:spcBef>
+              <a:spcAft>
+                <a:spcPts val="0"/>
+              </a:spcAft>
+              <a:buSzPts val="1800"/>
+              <a:buAutoNum type="arabicPeriod"/>
+            </a:pPr>
+            <a:r>
+              <a:rPr lang="en"/>
+              <a:t>Mid-project review (quality gate)</a:t>
+            </a:r>
+            <a:endParaRPr/>
+          </a:p>
+          <a:p>
+            <a:pPr indent="-317500" lvl="1" marL="914400" rtl="0" algn="l">
+              <a:spcBef>
+                <a:spcPts val="0"/>
+              </a:spcBef>
+              <a:spcAft>
+                <a:spcPts val="0"/>
+              </a:spcAft>
+              <a:buSzPts val="1400"/>
+              <a:buAutoNum type="alphaLcPeriod"/>
+            </a:pPr>
+            <a:r>
+              <a:rPr lang="en"/>
+              <a:t>You are expected to demonstrate your work</a:t>
+            </a:r>
+            <a:endParaRPr/>
+          </a:p>
+          <a:p>
+            <a:pPr indent="-317500" lvl="1" marL="914400" rtl="0" algn="l">
+              <a:spcBef>
+                <a:spcPts val="0"/>
+              </a:spcBef>
+              <a:spcAft>
+                <a:spcPts val="0"/>
+              </a:spcAft>
+              <a:buSzPts val="1400"/>
+              <a:buAutoNum type="alphaLcPeriod"/>
+            </a:pPr>
+            <a:r>
+              <a:rPr lang="en"/>
+              <a:t>If you fail, you may lose your industry partner</a:t>
+            </a:r>
+            <a:endParaRPr/>
+          </a:p>
+          <a:p>
+            <a:pPr indent="-342900" lvl="0" marL="457200" rtl="0" algn="l">
+              <a:spcBef>
+                <a:spcPts val="1000"/>
+              </a:spcBef>
+              <a:spcAft>
                 <a:spcPts val="1200"/>
-              </a:spcBef>
-              <a:spcAft>
-                <a:spcPts val="0"/>
               </a:spcAft>
               <a:buSzPts val="1800"/>
-              <a:buChar char="●"/>
-            </a:pPr>
-            <a:r>
-              <a:rPr lang="en"/>
-              <a:t>A great team motivates everyone, increases productivity</a:t>
-            </a:r>
-            <a:endParaRPr/>
-          </a:p>
-          <a:p>
-            <a:pPr indent="-342900" lvl="0" marL="457200" rtl="0" algn="l">
-              <a:spcBef>
-                <a:spcPts val="0"/>
-              </a:spcBef>
-              <a:spcAft>
-                <a:spcPts val="0"/>
-              </a:spcAft>
-              <a:buSzPts val="1800"/>
-              <a:buChar char="●"/>
-            </a:pPr>
-            <a:r>
-              <a:rPr lang="en"/>
-              <a:t>Encourage slackers to improve and don’t cover for them</a:t>
-            </a:r>
-            <a:endParaRPr/>
-          </a:p>
-          <a:p>
-            <a:pPr indent="0" lvl="0" marL="0" rtl="0" algn="l">
-              <a:spcBef>
-                <a:spcPts val="1200"/>
-              </a:spcBef>
-              <a:spcAft>
-                <a:spcPts val="1200"/>
-              </a:spcAft>
-              <a:buNone/>
-            </a:pPr>
-            <a:r>
-              <a:rPr lang="en"/>
-              <a:t>The Scrum master is responsible for resolving process impediments</a:t>
+              <a:buAutoNum type="arabicPeriod"/>
+            </a:pPr>
+            <a:r>
+              <a:rPr lang="en"/>
+              <a:t>Final project release and demo day</a:t>
             </a:r>
             <a:endParaRPr/>
           </a:p>
@@ -11203,7 +11344,7 @@
       </p:sp>
       <p:sp>
         <p:nvSpPr>
-          <p:cNvPr id="151" name="Google Shape;151;p24"/>
+          <p:cNvPr id="150" name="Google Shape;150;p24"/>
           <p:cNvSpPr txBox="1"/>
           <p:nvPr>
             <p:ph idx="12" type="sldNum"/>
@@ -11283,7 +11424,7 @@
   <p:cSld>
     <p:spTree>
       <p:nvGrpSpPr>
-        <p:cNvPr id="155" name="Shape 155"/>
+        <p:cNvPr id="154" name="Shape 154"/>
         <p:cNvGrpSpPr/>
         <p:nvPr/>
       </p:nvGrpSpPr>
@@ -11295,6 +11436,46 @@
           <a:chExt cx="0" cy="0"/>
         </a:xfrm>
       </p:grpSpPr>
+      <p:sp>
+        <p:nvSpPr>
+          <p:cNvPr id="155" name="Google Shape;155;p25"/>
+          <p:cNvSpPr txBox="1"/>
+          <p:nvPr>
+            <p:ph type="title"/>
+          </p:nvPr>
+        </p:nvSpPr>
+        <p:spPr>
+          <a:xfrm>
+            <a:off x="0" y="0"/>
+            <a:ext cx="9144000" cy="685800"/>
+          </a:xfrm>
+          <a:prstGeom prst="rect">
+            <a:avLst/>
+          </a:prstGeom>
+        </p:spPr>
+        <p:txBody>
+          <a:bodyPr anchorCtr="0" anchor="ctr" bIns="91425" lIns="274300" spcFirstLastPara="1" rIns="91425" wrap="square" tIns="91425">
+            <a:noAutofit/>
+          </a:bodyPr>
+          <a:lstStyle/>
+          <a:p>
+            <a:pPr indent="0" lvl="0" marL="0" rtl="0" algn="l">
+              <a:spcBef>
+                <a:spcPts val="0"/>
+              </a:spcBef>
+              <a:spcAft>
+                <a:spcPts val="0"/>
+              </a:spcAft>
+              <a:buNone/>
+            </a:pPr>
+            <a:r>
+              <a:rPr lang="en"/>
+              <a:t>Team Issues</a:t>
+            </a:r>
+            <a:endParaRPr/>
+          </a:p>
+        </p:txBody>
+      </p:sp>
       <p:sp>
         <p:nvSpPr>
           <p:cNvPr id="156" name="Google Shape;156;p25"/>
@@ -11329,6 +11510,190 @@
             </a:pPr>
             <a:r>
               <a:rPr lang="en"/>
+              <a:t>We grade your individual performance, not the team performance</a:t>
+            </a:r>
+            <a:endParaRPr/>
+          </a:p>
+          <a:p>
+            <a:pPr indent="-342900" lvl="0" marL="457200" rtl="0" algn="l">
+              <a:spcBef>
+                <a:spcPts val="1200"/>
+              </a:spcBef>
+              <a:spcAft>
+                <a:spcPts val="0"/>
+              </a:spcAft>
+              <a:buSzPts val="1800"/>
+              <a:buChar char="●"/>
+            </a:pPr>
+            <a:r>
+              <a:rPr lang="en"/>
+              <a:t>A great team motivates everyone, increases productivity</a:t>
+            </a:r>
+            <a:endParaRPr/>
+          </a:p>
+          <a:p>
+            <a:pPr indent="-342900" lvl="0" marL="457200" rtl="0" algn="l">
+              <a:spcBef>
+                <a:spcPts val="0"/>
+              </a:spcBef>
+              <a:spcAft>
+                <a:spcPts val="0"/>
+              </a:spcAft>
+              <a:buSzPts val="1800"/>
+              <a:buChar char="●"/>
+            </a:pPr>
+            <a:r>
+              <a:rPr lang="en"/>
+              <a:t>Encourage slackers to improve and don’t cover for them</a:t>
+            </a:r>
+            <a:endParaRPr/>
+          </a:p>
+          <a:p>
+            <a:pPr indent="0" lvl="0" marL="0" rtl="0" algn="l">
+              <a:spcBef>
+                <a:spcPts val="1200"/>
+              </a:spcBef>
+              <a:spcAft>
+                <a:spcPts val="1200"/>
+              </a:spcAft>
+              <a:buNone/>
+            </a:pPr>
+            <a:r>
+              <a:rPr lang="en"/>
+              <a:t>The Scrum master is responsible for resolving process impediments</a:t>
+            </a:r>
+            <a:endParaRPr/>
+          </a:p>
+        </p:txBody>
+      </p:sp>
+      <p:sp>
+        <p:nvSpPr>
+          <p:cNvPr id="157" name="Google Shape;157;p25"/>
+          <p:cNvSpPr txBox="1"/>
+          <p:nvPr>
+            <p:ph idx="12" type="sldNum"/>
+          </p:nvPr>
+        </p:nvSpPr>
+        <p:spPr>
+          <a:xfrm>
+            <a:off x="7315202" y="4416550"/>
+            <a:ext cx="1828800" cy="731400"/>
+          </a:xfrm>
+          <a:prstGeom prst="rect">
+            <a:avLst/>
+          </a:prstGeom>
+        </p:spPr>
+        <p:txBody>
+          <a:bodyPr anchorCtr="0" anchor="b" bIns="91425" lIns="91425" spcFirstLastPara="1" rIns="91425" wrap="square" tIns="91425">
+            <a:noAutofit/>
+          </a:bodyPr>
+          <a:lstStyle/>
+          <a:p>
+            <a:pPr indent="0" lvl="0" marL="0" rtl="0" algn="r">
+              <a:spcBef>
+                <a:spcPts val="0"/>
+              </a:spcBef>
+              <a:spcAft>
+                <a:spcPts val="0"/>
+              </a:spcAft>
+              <a:buNone/>
+            </a:pPr>
+            <a:fld id="{00000000-1234-1234-1234-123412341234}" type="slidenum">
+              <a:rPr lang="en"/>
+              <a:t>‹#›</a:t>
+            </a:fld>
+            <a:endParaRPr/>
+          </a:p>
+          <a:p>
+            <a:pPr indent="0" lvl="0" marL="0" rtl="0" algn="r">
+              <a:spcBef>
+                <a:spcPts val="0"/>
+              </a:spcBef>
+              <a:spcAft>
+                <a:spcPts val="0"/>
+              </a:spcAft>
+              <a:buNone/>
+            </a:pPr>
+            <a:r>
+              <a:rPr b="0" lang="en" sz="900" u="sng">
+                <a:solidFill>
+                  <a:schemeClr val="hlink"/>
+                </a:solidFill>
+                <a:hlinkClick r:id="rId3"/>
+              </a:rPr>
+              <a:t>https://profriehle.com</a:t>
+            </a:r>
+            <a:r>
+              <a:rPr b="0" lang="en" sz="900">
+                <a:solidFill>
+                  <a:schemeClr val="dk2"/>
+                </a:solidFill>
+              </a:rPr>
+              <a:t> </a:t>
+            </a:r>
+            <a:endParaRPr/>
+          </a:p>
+        </p:txBody>
+      </p:sp>
+    </p:spTree>
+  </p:cSld>
+  <p:clrMapOvr>
+    <a:masterClrMapping/>
+  </p:clrMapOvr>
+</p:sld>
+</file>
+
+<file path=ppt/slides/slide19.xml><?xml version="1.0" encoding="utf-8"?>
+<p:sld xmlns:a="http://schemas.openxmlformats.org/drawingml/2006/main" xmlns:r="http://schemas.openxmlformats.org/officeDocument/2006/relationships" xmlns:mc="http://schemas.openxmlformats.org/markup-compatibility/2006" xmlns:mv="urn:schemas-microsoft-com:mac:vml" xmlns:p="http://schemas.openxmlformats.org/presentationml/2006/main" xmlns:c="http://schemas.openxmlformats.org/drawingml/2006/chart" xmlns:dgm="http://schemas.openxmlformats.org/drawingml/2006/diagram" xmlns:o="urn:schemas-microsoft-com:office:office" xmlns:v="urn:schemas-microsoft-com:vml" xmlns:pvml="urn:schemas-microsoft-com:office:powerpoint" xmlns:com="http://schemas.openxmlformats.org/drawingml/2006/compatibility" xmlns:p14="http://schemas.microsoft.com/office/powerpoint/2010/main" xmlns:p15="http://schemas.microsoft.com/office/powerpoint/2012/main" xmlns:ahyp="http://schemas.microsoft.com/office/drawing/2018/hyperlinkcolor">
+  <p:cSld>
+    <p:spTree>
+      <p:nvGrpSpPr>
+        <p:cNvPr id="161" name="Shape 161"/>
+        <p:cNvGrpSpPr/>
+        <p:nvPr/>
+      </p:nvGrpSpPr>
+      <p:grpSpPr>
+        <a:xfrm>
+          <a:off x="0" y="0"/>
+          <a:ext cx="0" cy="0"/>
+          <a:chOff x="0" y="0"/>
+          <a:chExt cx="0" cy="0"/>
+        </a:xfrm>
+      </p:grpSpPr>
+      <p:sp>
+        <p:nvSpPr>
+          <p:cNvPr id="162" name="Google Shape;162;p26"/>
+          <p:cNvSpPr txBox="1"/>
+          <p:nvPr>
+            <p:ph idx="1" type="body"/>
+          </p:nvPr>
+        </p:nvSpPr>
+        <p:spPr>
+          <a:xfrm>
+            <a:off x="274320" y="914400"/>
+            <a:ext cx="8595300" cy="4114800"/>
+          </a:xfrm>
+          <a:prstGeom prst="rect">
+            <a:avLst/>
+          </a:prstGeom>
+        </p:spPr>
+        <p:txBody>
+          <a:bodyPr anchorCtr="0" anchor="t" bIns="0" lIns="0" spcFirstLastPara="1" rIns="0" wrap="square" tIns="0">
+            <a:noAutofit/>
+          </a:bodyPr>
+          <a:lstStyle/>
+          <a:p>
+            <a:pPr indent="0" lvl="0" marL="0" rtl="0" algn="l">
+              <a:spcBef>
+                <a:spcPts val="0"/>
+              </a:spcBef>
+              <a:spcAft>
+                <a:spcPts val="0"/>
+              </a:spcAft>
+              <a:buNone/>
+            </a:pPr>
+            <a:r>
+              <a:rPr lang="en"/>
               <a:t>You can ask questions using the </a:t>
             </a:r>
             <a:r>
@@ -11419,7 +11784,7 @@
       </p:sp>
       <p:sp>
         <p:nvSpPr>
-          <p:cNvPr id="157" name="Google Shape;157;p25"/>
+          <p:cNvPr id="163" name="Google Shape;163;p26"/>
           <p:cNvSpPr txBox="1"/>
           <p:nvPr>
             <p:ph type="title"/>
@@ -11459,7 +11824,7 @@
       </p:sp>
       <p:sp>
         <p:nvSpPr>
-          <p:cNvPr id="158" name="Google Shape;158;p25"/>
+          <p:cNvPr id="164" name="Google Shape;164;p26"/>
           <p:cNvSpPr txBox="1"/>
           <p:nvPr>
             <p:ph idx="12" type="sldNum"/>
@@ -11528,7 +11893,7 @@
       </p:sp>
       <p:sp>
         <p:nvSpPr>
-          <p:cNvPr id="159" name="Google Shape;159;p25"/>
+          <p:cNvPr id="165" name="Google Shape;165;p26"/>
           <p:cNvSpPr txBox="1"/>
           <p:nvPr/>
         </p:nvSpPr>
@@ -11563,306 +11928,6 @@
             <a:r>
               <a:rPr lang="en"/>
               <a:t>[1] We expect to move to an open source solution but aren’t there yet</a:t>
-            </a:r>
-            <a:endParaRPr/>
-          </a:p>
-        </p:txBody>
-      </p:sp>
-    </p:spTree>
-  </p:cSld>
-  <p:clrMapOvr>
-    <a:masterClrMapping/>
-  </p:clrMapOvr>
-</p:sld>
-</file>
-
-<file path=ppt/slides/slide19.xml><?xml version="1.0" encoding="utf-8"?>
-<p:sld xmlns:a="http://schemas.openxmlformats.org/drawingml/2006/main" xmlns:r="http://schemas.openxmlformats.org/officeDocument/2006/relationships" xmlns:mc="http://schemas.openxmlformats.org/markup-compatibility/2006" xmlns:mv="urn:schemas-microsoft-com:mac:vml" xmlns:p="http://schemas.openxmlformats.org/presentationml/2006/main" xmlns:c="http://schemas.openxmlformats.org/drawingml/2006/chart" xmlns:dgm="http://schemas.openxmlformats.org/drawingml/2006/diagram" xmlns:o="urn:schemas-microsoft-com:office:office" xmlns:v="urn:schemas-microsoft-com:vml" xmlns:pvml="urn:schemas-microsoft-com:office:powerpoint" xmlns:com="http://schemas.openxmlformats.org/drawingml/2006/compatibility" xmlns:p14="http://schemas.microsoft.com/office/powerpoint/2010/main" xmlns:p15="http://schemas.microsoft.com/office/powerpoint/2012/main" xmlns:ahyp="http://schemas.microsoft.com/office/drawing/2018/hyperlinkcolor">
-  <p:cSld>
-    <p:spTree>
-      <p:nvGrpSpPr>
-        <p:cNvPr id="163" name="Shape 163"/>
-        <p:cNvGrpSpPr/>
-        <p:nvPr/>
-      </p:nvGrpSpPr>
-      <p:grpSpPr>
-        <a:xfrm>
-          <a:off x="0" y="0"/>
-          <a:ext cx="0" cy="0"/>
-          <a:chOff x="0" y="0"/>
-          <a:chExt cx="0" cy="0"/>
-        </a:xfrm>
-      </p:grpSpPr>
-      <p:sp>
-        <p:nvSpPr>
-          <p:cNvPr id="164" name="Google Shape;164;p26"/>
-          <p:cNvSpPr txBox="1"/>
-          <p:nvPr>
-            <p:ph type="title"/>
-          </p:nvPr>
-        </p:nvSpPr>
-        <p:spPr>
-          <a:xfrm>
-            <a:off x="0" y="0"/>
-            <a:ext cx="9144000" cy="685800"/>
-          </a:xfrm>
-          <a:prstGeom prst="rect">
-            <a:avLst/>
-          </a:prstGeom>
-        </p:spPr>
-        <p:txBody>
-          <a:bodyPr anchorCtr="0" anchor="ctr" bIns="91425" lIns="274300" spcFirstLastPara="1" rIns="91425" wrap="square" tIns="91425">
-            <a:noAutofit/>
-          </a:bodyPr>
-          <a:lstStyle/>
-          <a:p>
-            <a:pPr indent="0" lvl="0" marL="0" rtl="0" algn="l">
-              <a:spcBef>
-                <a:spcPts val="0"/>
-              </a:spcBef>
-              <a:spcAft>
-                <a:spcPts val="0"/>
-              </a:spcAft>
-              <a:buNone/>
-            </a:pPr>
-            <a:r>
-              <a:rPr lang="en"/>
-              <a:t>Course Registration vs. Exam Registration</a:t>
-            </a:r>
-            <a:endParaRPr/>
-          </a:p>
-        </p:txBody>
-      </p:sp>
-      <p:sp>
-        <p:nvSpPr>
-          <p:cNvPr id="165" name="Google Shape;165;p26"/>
-          <p:cNvSpPr txBox="1"/>
-          <p:nvPr>
-            <p:ph idx="1" type="body"/>
-          </p:nvPr>
-        </p:nvSpPr>
-        <p:spPr>
-          <a:xfrm>
-            <a:off x="274320" y="914400"/>
-            <a:ext cx="8595300" cy="4114800"/>
-          </a:xfrm>
-          <a:prstGeom prst="rect">
-            <a:avLst/>
-          </a:prstGeom>
-        </p:spPr>
-        <p:txBody>
-          <a:bodyPr anchorCtr="0" anchor="t" bIns="0" lIns="0" spcFirstLastPara="1" rIns="0" wrap="square" tIns="0">
-            <a:noAutofit/>
-          </a:bodyPr>
-          <a:lstStyle/>
-          <a:p>
-            <a:pPr indent="0" lvl="0" marL="0" rtl="0" algn="l">
-              <a:spcBef>
-                <a:spcPts val="0"/>
-              </a:spcBef>
-              <a:spcAft>
-                <a:spcPts val="0"/>
-              </a:spcAft>
-              <a:buNone/>
-            </a:pPr>
-            <a:r>
-              <a:rPr b="1" lang="en"/>
-              <a:t>Step 1: Course registration </a:t>
-            </a:r>
-            <a:r>
-              <a:rPr lang="en"/>
-              <a:t>(German: Kursanmeldung)</a:t>
-            </a:r>
-            <a:endParaRPr/>
-          </a:p>
-          <a:p>
-            <a:pPr indent="-342900" lvl="0" marL="457200" rtl="0" algn="l">
-              <a:spcBef>
-                <a:spcPts val="1200"/>
-              </a:spcBef>
-              <a:spcAft>
-                <a:spcPts val="0"/>
-              </a:spcAft>
-              <a:buSzPts val="1800"/>
-              <a:buChar char="●"/>
-            </a:pPr>
-            <a:r>
-              <a:rPr lang="en"/>
-              <a:t>Students sign up through the course management system</a:t>
-            </a:r>
-            <a:endParaRPr/>
-          </a:p>
-          <a:p>
-            <a:pPr indent="-342900" lvl="0" marL="457200" rtl="0" algn="l">
-              <a:spcBef>
-                <a:spcPts val="0"/>
-              </a:spcBef>
-              <a:spcAft>
-                <a:spcPts val="0"/>
-              </a:spcAft>
-              <a:buSzPts val="1800"/>
-              <a:buChar char="●"/>
-            </a:pPr>
-            <a:r>
-              <a:rPr lang="en"/>
-              <a:t>You may or may not get in, various rules and regulations apply</a:t>
-            </a:r>
-            <a:endParaRPr/>
-          </a:p>
-          <a:p>
-            <a:pPr indent="-342900" lvl="0" marL="457200" rtl="0" algn="l">
-              <a:spcBef>
-                <a:spcPts val="0"/>
-              </a:spcBef>
-              <a:spcAft>
-                <a:spcPts val="0"/>
-              </a:spcAft>
-              <a:buSzPts val="1800"/>
-              <a:buChar char="●"/>
-            </a:pPr>
-            <a:r>
-              <a:rPr lang="en"/>
-              <a:t>The earlier you sign up, the more likely you are to get in</a:t>
-            </a:r>
-            <a:endParaRPr/>
-          </a:p>
-          <a:p>
-            <a:pPr indent="0" lvl="0" marL="0" rtl="0" algn="l">
-              <a:spcBef>
-                <a:spcPts val="1200"/>
-              </a:spcBef>
-              <a:spcAft>
-                <a:spcPts val="0"/>
-              </a:spcAft>
-              <a:buNone/>
-            </a:pPr>
-            <a:r>
-              <a:rPr b="1" lang="en"/>
-              <a:t>Step 2: Exam registration </a:t>
-            </a:r>
-            <a:r>
-              <a:rPr lang="en"/>
-              <a:t>(German: Prüfungsanmeldung)</a:t>
-            </a:r>
-            <a:endParaRPr/>
-          </a:p>
-          <a:p>
-            <a:pPr indent="-342900" lvl="0" marL="457200" rtl="0" algn="l">
-              <a:spcBef>
-                <a:spcPts val="1200"/>
-              </a:spcBef>
-              <a:spcAft>
-                <a:spcPts val="0"/>
-              </a:spcAft>
-              <a:buSzPts val="1800"/>
-              <a:buChar char="●"/>
-            </a:pPr>
-            <a:r>
-              <a:rPr lang="en"/>
-              <a:t>During the first weeks of the course, you can decide to drop out</a:t>
-            </a:r>
-            <a:endParaRPr/>
-          </a:p>
-          <a:p>
-            <a:pPr indent="-342900" lvl="0" marL="457200" rtl="0" algn="l">
-              <a:spcBef>
-                <a:spcPts val="0"/>
-              </a:spcBef>
-              <a:spcAft>
-                <a:spcPts val="0"/>
-              </a:spcAft>
-              <a:buSzPts val="1800"/>
-              <a:buChar char="●"/>
-            </a:pPr>
-            <a:r>
-              <a:rPr lang="en"/>
-              <a:t>Four weeks (or so) into the semester, you can register for the exam</a:t>
-            </a:r>
-            <a:endParaRPr/>
-          </a:p>
-          <a:p>
-            <a:pPr indent="-342900" lvl="0" marL="457200" rtl="0" algn="l">
-              <a:spcBef>
-                <a:spcPts val="0"/>
-              </a:spcBef>
-              <a:spcAft>
-                <a:spcPts val="0"/>
-              </a:spcAft>
-              <a:buSzPts val="1800"/>
-              <a:buChar char="●"/>
-            </a:pPr>
-            <a:r>
-              <a:rPr lang="en"/>
-              <a:t>After exam registration closes, your decision is binding</a:t>
-            </a:r>
-            <a:endParaRPr/>
-          </a:p>
-        </p:txBody>
-      </p:sp>
-      <p:sp>
-        <p:nvSpPr>
-          <p:cNvPr id="166" name="Google Shape;166;p26"/>
-          <p:cNvSpPr txBox="1"/>
-          <p:nvPr>
-            <p:ph idx="12" type="sldNum"/>
-          </p:nvPr>
-        </p:nvSpPr>
-        <p:spPr>
-          <a:xfrm>
-            <a:off x="7315202" y="4416550"/>
-            <a:ext cx="1828800" cy="731400"/>
-          </a:xfrm>
-          <a:prstGeom prst="rect">
-            <a:avLst/>
-          </a:prstGeom>
-        </p:spPr>
-        <p:txBody>
-          <a:bodyPr anchorCtr="0" anchor="b" bIns="91425" lIns="91425" spcFirstLastPara="1" rIns="91425" wrap="square" tIns="91425">
-            <a:noAutofit/>
-          </a:bodyPr>
-          <a:lstStyle/>
-          <a:p>
-            <a:pPr indent="0" lvl="0" marL="0" rtl="0" algn="r">
-              <a:spcBef>
-                <a:spcPts val="0"/>
-              </a:spcBef>
-              <a:spcAft>
-                <a:spcPts val="0"/>
-              </a:spcAft>
-              <a:buNone/>
-            </a:pPr>
-            <a:fld id="{00000000-1234-1234-1234-123412341234}" type="slidenum">
-              <a:rPr lang="en"/>
-              <a:t>‹#›</a:t>
-            </a:fld>
-            <a:endParaRPr/>
-          </a:p>
-          <a:p>
-            <a:pPr indent="0" lvl="0" marL="0" rtl="0" algn="r">
-              <a:spcBef>
-                <a:spcPts val="0"/>
-              </a:spcBef>
-              <a:spcAft>
-                <a:spcPts val="0"/>
-              </a:spcAft>
-              <a:buNone/>
-            </a:pPr>
-            <a:r>
-              <a:rPr b="0" lang="en" sz="900" u="sng">
-                <a:solidFill>
-                  <a:schemeClr val="hlink"/>
-                </a:solidFill>
-                <a:hlinkClick r:id="rId3"/>
-              </a:rPr>
-              <a:t>https://profriehle.com</a:t>
-            </a:r>
-            <a:r>
-              <a:rPr b="0" lang="en" sz="900">
-                <a:solidFill>
-                  <a:schemeClr val="dk2"/>
-                </a:solidFill>
-              </a:rPr>
-              <a:t> </a:t>
             </a:r>
             <a:endParaRPr/>
           </a:p>
@@ -11971,7 +12036,7 @@
                   <a:srgbClr val="212121"/>
                 </a:solidFill>
               </a:rPr>
-              <a:t>To </a:t>
+              <a:t>Create useful </a:t>
             </a:r>
             <a:r>
               <a:rPr b="1" lang="en" sz="3200">
@@ -11979,7 +12044,7 @@
                   <a:schemeClr val="accent3"/>
                 </a:solidFill>
               </a:rPr>
-              <a:t>introduce students </a:t>
+              <a:t>open-source software</a:t>
             </a:r>
             <a:r>
               <a:rPr b="1" lang="en" sz="3200">
@@ -11987,7 +12052,23 @@
                   <a:srgbClr val="212121"/>
                 </a:solidFill>
               </a:rPr>
-              <a:t>to </a:t>
+              <a:t> </a:t>
+            </a:r>
+            <a:r>
+              <a:rPr b="1" lang="en" sz="3200">
+                <a:solidFill>
+                  <a:srgbClr val="212121"/>
+                </a:solidFill>
+              </a:rPr>
+              <a:t>and</a:t>
+            </a:r>
+            <a:r>
+              <a:rPr b="1" lang="en" sz="3200">
+                <a:solidFill>
+                  <a:srgbClr val="212121"/>
+                </a:solidFill>
+              </a:rPr>
+              <a:t> learn </a:t>
             </a:r>
             <a:r>
               <a:rPr b="1" lang="en" sz="3200">
@@ -11995,27 +12076,38 @@
                   <a:schemeClr val="accent3"/>
                 </a:solidFill>
               </a:rPr>
-              <a:t>agile methods </a:t>
-            </a:r>
-            <a:r>
+              <a:t>agile methods</a:t>
+            </a:r>
+            <a:br>
               <a:rPr b="1" lang="en" sz="3200">
                 <a:solidFill>
                   <a:srgbClr val="212121"/>
                 </a:solidFill>
               </a:rPr>
-              <a:t>by creating useful </a:t>
-            </a:r>
-            <a:r>
-              <a:rPr b="1" lang="en" sz="3200"/>
-              <a:t>open- source</a:t>
-            </a:r>
+            </a:br>
             <a:r>
               <a:rPr b="1" lang="en" sz="3200">
                 <a:solidFill>
                   <a:srgbClr val="212121"/>
                 </a:solidFill>
               </a:rPr>
-              <a:t> software in a team</a:t>
+              <a:t>in</a:t>
+            </a:r>
+            <a:r>
+              <a:rPr b="1" lang="en" sz="3200">
+                <a:solidFill>
+                  <a:srgbClr val="212121"/>
+                </a:solidFill>
+              </a:rPr>
+              <a:t> </a:t>
+            </a:r>
+            <a:r>
+              <a:rPr b="1" lang="en" sz="3200">
+                <a:solidFill>
+                  <a:srgbClr val="212121"/>
+                </a:solidFill>
+              </a:rPr>
+              <a:t>a Scrum team</a:t>
             </a:r>
             <a:endParaRPr b="1" sz="3200"/>
           </a:p>
@@ -12193,7 +12285,7 @@
   <p:cSld>
     <p:spTree>
       <p:nvGrpSpPr>
-        <p:cNvPr id="170" name="Shape 170"/>
+        <p:cNvPr id="169" name="Shape 169"/>
         <p:cNvGrpSpPr/>
         <p:nvPr/>
       </p:nvGrpSpPr>
@@ -12207,7 +12299,7 @@
       </p:grpSpPr>
       <p:sp>
         <p:nvSpPr>
-          <p:cNvPr id="171" name="Google Shape;171;p27"/>
+          <p:cNvPr id="170" name="Google Shape;170;p27"/>
           <p:cNvSpPr txBox="1"/>
           <p:nvPr>
             <p:ph type="title"/>
@@ -12239,7 +12331,7 @@
             </a:pPr>
             <a:r>
               <a:rPr lang="en"/>
-              <a:t>Receiving a Grade for the Course</a:t>
+              <a:t>Course Registration vs. Exam Registration</a:t>
             </a:r>
             <a:endParaRPr/>
           </a:p>
@@ -12247,7 +12339,7 @@
       </p:sp>
       <p:sp>
         <p:nvSpPr>
-          <p:cNvPr id="172" name="Google Shape;172;p27"/>
+          <p:cNvPr id="171" name="Google Shape;171;p27"/>
           <p:cNvSpPr txBox="1"/>
           <p:nvPr>
             <p:ph idx="1" type="body"/>
@@ -12275,16 +12367,15 @@
               <a:spcAft>
                 <a:spcPts val="0"/>
               </a:spcAft>
-              <a:buClr>
-                <a:schemeClr val="dk1"/>
-              </a:buClr>
-              <a:buSzPts val="1100"/>
-              <a:buFont typeface="Arial"/>
-              <a:buNone/>
-            </a:pPr>
-            <a:r>
-              <a:rPr lang="en"/>
-              <a:t>If you want to receive a grade</a:t>
+              <a:buNone/>
+            </a:pPr>
+            <a:r>
+              <a:rPr b="1" lang="en"/>
+              <a:t>Step 1: Course registration </a:t>
+            </a:r>
+            <a:r>
+              <a:rPr lang="en"/>
+              <a:t>(German: Kursanmeldung)</a:t>
             </a:r>
             <a:endParaRPr/>
           </a:p>
@@ -12296,84 +12387,19 @@
               <a:spcAft>
                 <a:spcPts val="0"/>
               </a:spcAft>
-              <a:buClr>
-                <a:srgbClr val="212121"/>
-              </a:buClr>
               <a:buSzPts val="1800"/>
               <a:buChar char="●"/>
             </a:pPr>
             <a:r>
-              <a:rPr lang="en">
-                <a:solidFill>
-                  <a:srgbClr val="212121"/>
-                </a:solidFill>
-              </a:rPr>
-              <a:t>You must register through your university’s exam registration system</a:t>
-            </a:r>
-            <a:endParaRPr>
-              <a:solidFill>
-                <a:srgbClr val="212121"/>
-              </a:solidFill>
-            </a:endParaRPr>
-          </a:p>
-          <a:p>
-            <a:pPr indent="-317500" lvl="1" marL="914400" rtl="0" algn="l">
-              <a:spcBef>
-                <a:spcPts val="1000"/>
-              </a:spcBef>
-              <a:spcAft>
-                <a:spcPts val="0"/>
-              </a:spcAft>
-              <a:buSzPts val="1400"/>
-              <a:buChar char="○"/>
-            </a:pPr>
-            <a:r>
-              <a:rPr b="1" lang="en"/>
-              <a:t>Your degree program may have split the course into two (VL + UE)</a:t>
-            </a:r>
-            <a:endParaRPr b="1"/>
-          </a:p>
-          <a:p>
-            <a:pPr indent="-317500" lvl="1" marL="914400" rtl="0" algn="l">
-              <a:spcBef>
-                <a:spcPts val="0"/>
-              </a:spcBef>
-              <a:spcAft>
-                <a:spcPts val="0"/>
-              </a:spcAft>
-              <a:buSzPts val="1400"/>
-              <a:buChar char="○"/>
-            </a:pPr>
-            <a:r>
-              <a:rPr b="1" lang="en"/>
-              <a:t>Please check asap that the course is available in your degree program!</a:t>
-            </a:r>
-            <a:endParaRPr b="1">
-              <a:solidFill>
-                <a:srgbClr val="212121"/>
-              </a:solidFill>
-            </a:endParaRPr>
-          </a:p>
-          <a:p>
-            <a:pPr indent="0" lvl="0" marL="0" rtl="0" algn="l">
-              <a:spcBef>
-                <a:spcPts val="1200"/>
-              </a:spcBef>
-              <a:spcAft>
-                <a:spcPts val="0"/>
-              </a:spcAft>
-              <a:buNone/>
-            </a:pPr>
-            <a:r>
-              <a:rPr lang="en"/>
-              <a:t>In case of problems, please see</a:t>
+              <a:rPr lang="en"/>
+              <a:t>Students sign up through the course management system</a:t>
             </a:r>
             <a:endParaRPr/>
           </a:p>
           <a:p>
             <a:pPr indent="-342900" lvl="0" marL="457200" rtl="0" algn="l">
               <a:spcBef>
-                <a:spcPts val="1200"/>
+                <a:spcPts val="0"/>
               </a:spcBef>
               <a:spcAft>
                 <a:spcPts val="0"/>
@@ -12382,17 +12408,25 @@
               <a:buChar char="●"/>
             </a:pPr>
             <a:r>
-              <a:rPr lang="en" u="sng">
-                <a:solidFill>
-                  <a:schemeClr val="hlink"/>
-                </a:solidFill>
-                <a:hlinkClick r:id="rId3"/>
-              </a:rPr>
-              <a:t>https://oss.cs.fau.de/teaching/course-resources/course-registration/</a:t>
-            </a:r>
-            <a:r>
-              <a:rPr lang="en"/>
-              <a:t> </a:t>
+              <a:rPr lang="en"/>
+              <a:t>You may or may not get in, various rules and regulations apply</a:t>
+            </a:r>
+            <a:endParaRPr/>
+          </a:p>
+          <a:p>
+            <a:pPr indent="-342900" lvl="0" marL="457200" rtl="0" algn="l">
+              <a:spcBef>
+                <a:spcPts val="0"/>
+              </a:spcBef>
+              <a:spcAft>
+                <a:spcPts val="0"/>
+              </a:spcAft>
+              <a:buSzPts val="1800"/>
+              <a:buChar char="●"/>
+            </a:pPr>
+            <a:r>
+              <a:rPr lang="en"/>
+              <a:t>The earlier you sign up, the more likely you are to get in</a:t>
             </a:r>
             <a:endParaRPr/>
           </a:p>
@@ -12402,13 +12436,68 @@
                 <a:spcPts val="1200"/>
               </a:spcBef>
               <a:spcAft>
+                <a:spcPts val="0"/>
+              </a:spcAft>
+              <a:buNone/>
+            </a:pPr>
+            <a:r>
+              <a:rPr b="1" lang="en"/>
+              <a:t>Step 2: Exam registration </a:t>
+            </a:r>
+            <a:r>
+              <a:rPr lang="en"/>
+              <a:t>(German: Prüfungsanmeldung)</a:t>
+            </a:r>
+            <a:endParaRPr/>
+          </a:p>
+          <a:p>
+            <a:pPr indent="-342900" lvl="0" marL="457200" rtl="0" algn="l">
+              <a:spcBef>
                 <a:spcPts val="1200"/>
-              </a:spcAft>
-              <a:buNone/>
-            </a:pPr>
-            <a:r>
-              <a:rPr lang="en"/>
-              <a:t>Otherwise: No grade</a:t>
+              </a:spcBef>
+              <a:spcAft>
+                <a:spcPts val="0"/>
+              </a:spcAft>
+              <a:buSzPts val="1800"/>
+              <a:buChar char="●"/>
+            </a:pPr>
+            <a:r>
+              <a:rPr lang="en"/>
+              <a:t>During the first weeks of the course, you can decide to drop out</a:t>
+            </a:r>
+            <a:endParaRPr/>
+          </a:p>
+          <a:p>
+            <a:pPr indent="-342900" lvl="0" marL="457200" rtl="0" algn="l">
+              <a:spcBef>
+                <a:spcPts val="0"/>
+              </a:spcBef>
+              <a:spcAft>
+                <a:spcPts val="0"/>
+              </a:spcAft>
+              <a:buSzPts val="1800"/>
+              <a:buChar char="●"/>
+            </a:pPr>
+            <a:r>
+              <a:rPr lang="en"/>
+              <a:t>Four weeks (or so) into the semester, you can register for the exam</a:t>
+            </a:r>
+            <a:endParaRPr/>
+          </a:p>
+          <a:p>
+            <a:pPr indent="-342900" lvl="0" marL="457200" rtl="0" algn="l">
+              <a:spcBef>
+                <a:spcPts val="0"/>
+              </a:spcBef>
+              <a:spcAft>
+                <a:spcPts val="0"/>
+              </a:spcAft>
+              <a:buSzPts val="1800"/>
+              <a:buChar char="●"/>
+            </a:pPr>
+            <a:r>
+              <a:rPr lang="en"/>
+              <a:t>After exam registration closes, your decision is binding</a:t>
             </a:r>
             <a:endParaRPr/>
           </a:p>
@@ -12416,7 +12505,7 @@
       </p:sp>
       <p:sp>
         <p:nvSpPr>
-          <p:cNvPr id="173" name="Google Shape;173;p27"/>
+          <p:cNvPr id="172" name="Google Shape;172;p27"/>
           <p:cNvSpPr txBox="1"/>
           <p:nvPr>
             <p:ph idx="12" type="sldNum"/>
@@ -12467,7 +12556,7 @@
                 <a:solidFill>
                   <a:schemeClr val="hlink"/>
                 </a:solidFill>
-                <a:hlinkClick r:id="rId4"/>
+                <a:hlinkClick r:id="rId3"/>
               </a:rPr>
               <a:t>https://profriehle.com</a:t>
             </a:r>
@@ -12496,7 +12585,7 @@
   <p:cSld>
     <p:spTree>
       <p:nvGrpSpPr>
-        <p:cNvPr id="177" name="Shape 177"/>
+        <p:cNvPr id="176" name="Shape 176"/>
         <p:cNvGrpSpPr/>
         <p:nvPr/>
       </p:nvGrpSpPr>
@@ -12510,7 +12599,310 @@
       </p:grpSpPr>
       <p:sp>
         <p:nvSpPr>
+          <p:cNvPr id="177" name="Google Shape;177;p28"/>
+          <p:cNvSpPr txBox="1"/>
+          <p:nvPr>
+            <p:ph type="title"/>
+          </p:nvPr>
+        </p:nvSpPr>
+        <p:spPr>
+          <a:xfrm>
+            <a:off x="0" y="0"/>
+            <a:ext cx="9144000" cy="685800"/>
+          </a:xfrm>
+          <a:prstGeom prst="rect">
+            <a:avLst/>
+          </a:prstGeom>
+        </p:spPr>
+        <p:txBody>
+          <a:bodyPr anchorCtr="0" anchor="ctr" bIns="91425" lIns="274300" spcFirstLastPara="1" rIns="91425" wrap="square" tIns="91425">
+            <a:noAutofit/>
+          </a:bodyPr>
+          <a:lstStyle/>
+          <a:p>
+            <a:pPr indent="0" lvl="0" marL="0" rtl="0" algn="l">
+              <a:spcBef>
+                <a:spcPts val="0"/>
+              </a:spcBef>
+              <a:spcAft>
+                <a:spcPts val="0"/>
+              </a:spcAft>
+              <a:buNone/>
+            </a:pPr>
+            <a:r>
+              <a:rPr lang="en"/>
+              <a:t>Receiving a Grade for the Course</a:t>
+            </a:r>
+            <a:endParaRPr/>
+          </a:p>
+        </p:txBody>
+      </p:sp>
+      <p:sp>
+        <p:nvSpPr>
           <p:cNvPr id="178" name="Google Shape;178;p28"/>
+          <p:cNvSpPr txBox="1"/>
+          <p:nvPr>
+            <p:ph idx="1" type="body"/>
+          </p:nvPr>
+        </p:nvSpPr>
+        <p:spPr>
+          <a:xfrm>
+            <a:off x="274320" y="914400"/>
+            <a:ext cx="8595300" cy="4114800"/>
+          </a:xfrm>
+          <a:prstGeom prst="rect">
+            <a:avLst/>
+          </a:prstGeom>
+        </p:spPr>
+        <p:txBody>
+          <a:bodyPr anchorCtr="0" anchor="t" bIns="0" lIns="0" spcFirstLastPara="1" rIns="0" wrap="square" tIns="0">
+            <a:noAutofit/>
+          </a:bodyPr>
+          <a:lstStyle/>
+          <a:p>
+            <a:pPr indent="0" lvl="0" marL="0" rtl="0" algn="l">
+              <a:spcBef>
+                <a:spcPts val="0"/>
+              </a:spcBef>
+              <a:spcAft>
+                <a:spcPts val="0"/>
+              </a:spcAft>
+              <a:buClr>
+                <a:schemeClr val="dk1"/>
+              </a:buClr>
+              <a:buSzPts val="1100"/>
+              <a:buFont typeface="Arial"/>
+              <a:buNone/>
+            </a:pPr>
+            <a:r>
+              <a:rPr lang="en"/>
+              <a:t>If you want to receive a grade</a:t>
+            </a:r>
+            <a:endParaRPr/>
+          </a:p>
+          <a:p>
+            <a:pPr indent="-342900" lvl="0" marL="457200" rtl="0" algn="l">
+              <a:spcBef>
+                <a:spcPts val="1200"/>
+              </a:spcBef>
+              <a:spcAft>
+                <a:spcPts val="0"/>
+              </a:spcAft>
+              <a:buClr>
+                <a:srgbClr val="212121"/>
+              </a:buClr>
+              <a:buSzPts val="1800"/>
+              <a:buChar char="●"/>
+            </a:pPr>
+            <a:r>
+              <a:rPr lang="en">
+                <a:solidFill>
+                  <a:srgbClr val="212121"/>
+                </a:solidFill>
+              </a:rPr>
+              <a:t>You must register through your university’s exam registration system</a:t>
+            </a:r>
+            <a:endParaRPr>
+              <a:solidFill>
+                <a:srgbClr val="212121"/>
+              </a:solidFill>
+            </a:endParaRPr>
+          </a:p>
+          <a:p>
+            <a:pPr indent="-317500" lvl="1" marL="914400" rtl="0" algn="l">
+              <a:spcBef>
+                <a:spcPts val="1000"/>
+              </a:spcBef>
+              <a:spcAft>
+                <a:spcPts val="0"/>
+              </a:spcAft>
+              <a:buSzPts val="1400"/>
+              <a:buChar char="○"/>
+            </a:pPr>
+            <a:r>
+              <a:rPr b="1" lang="en"/>
+              <a:t>Your degree program may have split the course into two (VL + UE)</a:t>
+            </a:r>
+            <a:endParaRPr b="1"/>
+          </a:p>
+          <a:p>
+            <a:pPr indent="-317500" lvl="1" marL="914400" rtl="0" algn="l">
+              <a:spcBef>
+                <a:spcPts val="0"/>
+              </a:spcBef>
+              <a:spcAft>
+                <a:spcPts val="0"/>
+              </a:spcAft>
+              <a:buSzPts val="1400"/>
+              <a:buChar char="○"/>
+            </a:pPr>
+            <a:r>
+              <a:rPr b="1" lang="en"/>
+              <a:t>Please check asap that the course is available in your degree program!</a:t>
+            </a:r>
+            <a:endParaRPr b="1">
+              <a:solidFill>
+                <a:srgbClr val="212121"/>
+              </a:solidFill>
+            </a:endParaRPr>
+          </a:p>
+          <a:p>
+            <a:pPr indent="0" lvl="0" marL="0" rtl="0" algn="l">
+              <a:spcBef>
+                <a:spcPts val="1200"/>
+              </a:spcBef>
+              <a:spcAft>
+                <a:spcPts val="0"/>
+              </a:spcAft>
+              <a:buNone/>
+            </a:pPr>
+            <a:r>
+              <a:rPr lang="en"/>
+              <a:t>In case of problems, please see</a:t>
+            </a:r>
+            <a:endParaRPr/>
+          </a:p>
+          <a:p>
+            <a:pPr indent="-342900" lvl="0" marL="457200" rtl="0" algn="l">
+              <a:spcBef>
+                <a:spcPts val="1200"/>
+              </a:spcBef>
+              <a:spcAft>
+                <a:spcPts val="0"/>
+              </a:spcAft>
+              <a:buSzPts val="1800"/>
+              <a:buChar char="●"/>
+            </a:pPr>
+            <a:r>
+              <a:rPr lang="en" u="sng">
+                <a:solidFill>
+                  <a:schemeClr val="hlink"/>
+                </a:solidFill>
+                <a:hlinkClick r:id="rId3"/>
+              </a:rPr>
+              <a:t>https://oss.cs.fau.de/teaching/course-resources/course-registration/</a:t>
+            </a:r>
+            <a:r>
+              <a:rPr lang="en"/>
+              <a:t> </a:t>
+            </a:r>
+            <a:endParaRPr/>
+          </a:p>
+          <a:p>
+            <a:pPr indent="0" lvl="0" marL="0" rtl="0" algn="l">
+              <a:spcBef>
+                <a:spcPts val="1200"/>
+              </a:spcBef>
+              <a:spcAft>
+                <a:spcPts val="1200"/>
+              </a:spcAft>
+              <a:buNone/>
+            </a:pPr>
+            <a:r>
+              <a:rPr lang="en"/>
+              <a:t>Otherwise: No grade</a:t>
+            </a:r>
+            <a:endParaRPr/>
+          </a:p>
+        </p:txBody>
+      </p:sp>
+      <p:sp>
+        <p:nvSpPr>
+          <p:cNvPr id="179" name="Google Shape;179;p28"/>
+          <p:cNvSpPr txBox="1"/>
+          <p:nvPr>
+            <p:ph idx="12" type="sldNum"/>
+          </p:nvPr>
+        </p:nvSpPr>
+        <p:spPr>
+          <a:xfrm>
+            <a:off x="7315202" y="4416550"/>
+            <a:ext cx="1828800" cy="731400"/>
+          </a:xfrm>
+          <a:prstGeom prst="rect">
+            <a:avLst/>
+          </a:prstGeom>
+        </p:spPr>
+        <p:txBody>
+          <a:bodyPr anchorCtr="0" anchor="b" bIns="91425" lIns="91425" spcFirstLastPara="1" rIns="91425" wrap="square" tIns="91425">
+            <a:noAutofit/>
+          </a:bodyPr>
+          <a:lstStyle/>
+          <a:p>
+            <a:pPr indent="0" lvl="0" marL="0" rtl="0" algn="r">
+              <a:spcBef>
+                <a:spcPts val="0"/>
+              </a:spcBef>
+              <a:spcAft>
+                <a:spcPts val="0"/>
+              </a:spcAft>
+              <a:buNone/>
+            </a:pPr>
+            <a:fld id="{00000000-1234-1234-1234-123412341234}" type="slidenum">
+              <a:rPr lang="en"/>
+              <a:t>‹#›</a:t>
+            </a:fld>
+            <a:endParaRPr/>
+          </a:p>
+          <a:p>
+            <a:pPr indent="0" lvl="0" marL="0" rtl="0" algn="r">
+              <a:spcBef>
+                <a:spcPts val="0"/>
+              </a:spcBef>
+              <a:spcAft>
+                <a:spcPts val="0"/>
+              </a:spcAft>
+              <a:buNone/>
+            </a:pPr>
+            <a:r>
+              <a:rPr b="0" lang="en" sz="900" u="sng">
+                <a:solidFill>
+                  <a:schemeClr val="hlink"/>
+                </a:solidFill>
+                <a:hlinkClick r:id="rId4"/>
+              </a:rPr>
+              <a:t>https://profriehle.com</a:t>
+            </a:r>
+            <a:r>
+              <a:rPr b="0" lang="en" sz="900">
+                <a:solidFill>
+                  <a:schemeClr val="dk2"/>
+                </a:solidFill>
+              </a:rPr>
+              <a:t> </a:t>
+            </a:r>
+            <a:endParaRPr/>
+          </a:p>
+        </p:txBody>
+      </p:sp>
+    </p:spTree>
+  </p:cSld>
+  <p:clrMapOvr>
+    <a:masterClrMapping/>
+  </p:clrMapOvr>
+</p:sld>
+</file>
+
+<file path=ppt/slides/slide22.xml><?xml version="1.0" encoding="utf-8"?>
+<p:sld xmlns:a="http://schemas.openxmlformats.org/drawingml/2006/main" xmlns:r="http://schemas.openxmlformats.org/officeDocument/2006/relationships" xmlns:mc="http://schemas.openxmlformats.org/markup-compatibility/2006" xmlns:mv="urn:schemas-microsoft-com:mac:vml" xmlns:p="http://schemas.openxmlformats.org/presentationml/2006/main" xmlns:c="http://schemas.openxmlformats.org/drawingml/2006/chart" xmlns:dgm="http://schemas.openxmlformats.org/drawingml/2006/diagram" xmlns:o="urn:schemas-microsoft-com:office:office" xmlns:v="urn:schemas-microsoft-com:vml" xmlns:pvml="urn:schemas-microsoft-com:office:powerpoint" xmlns:com="http://schemas.openxmlformats.org/drawingml/2006/compatibility" xmlns:p14="http://schemas.microsoft.com/office/powerpoint/2010/main" xmlns:p15="http://schemas.microsoft.com/office/powerpoint/2012/main" xmlns:ahyp="http://schemas.microsoft.com/office/drawing/2018/hyperlinkcolor">
+  <p:cSld>
+    <p:spTree>
+      <p:nvGrpSpPr>
+        <p:cNvPr id="183" name="Shape 183"/>
+        <p:cNvGrpSpPr/>
+        <p:nvPr/>
+      </p:nvGrpSpPr>
+      <p:grpSpPr>
+        <a:xfrm>
+          <a:off x="0" y="0"/>
+          <a:ext cx="0" cy="0"/>
+          <a:chOff x="0" y="0"/>
+          <a:chExt cx="0" cy="0"/>
+        </a:xfrm>
+      </p:grpSpPr>
+      <p:sp>
+        <p:nvSpPr>
+          <p:cNvPr id="184" name="Google Shape;184;p29"/>
           <p:cNvSpPr txBox="1"/>
           <p:nvPr>
             <p:ph type="title"/>
@@ -12550,7 +12942,7 @@
       </p:sp>
       <p:pic>
         <p:nvPicPr>
-          <p:cNvPr id="179" name="Google Shape;179;p28"/>
+          <p:cNvPr id="185" name="Google Shape;185;p29"/>
           <p:cNvPicPr preferRelativeResize="0"/>
           <p:nvPr/>
         </p:nvPicPr>
@@ -12578,7 +12970,7 @@
       </p:pic>
       <p:sp>
         <p:nvSpPr>
-          <p:cNvPr id="180" name="Google Shape;180;p28"/>
+          <p:cNvPr id="186" name="Google Shape;186;p29"/>
           <p:cNvSpPr txBox="1"/>
           <p:nvPr/>
         </p:nvSpPr>
@@ -12636,7 +13028,7 @@
       </p:sp>
       <p:sp>
         <p:nvSpPr>
-          <p:cNvPr id="181" name="Google Shape;181;p28"/>
+          <p:cNvPr id="187" name="Google Shape;187;p29"/>
           <p:cNvSpPr txBox="1"/>
           <p:nvPr>
             <p:ph idx="12" type="sldNum"/>
@@ -12711,12 +13103,12 @@
 </p:sld>
 </file>
 
-<file path=ppt/slides/slide22.xml><?xml version="1.0" encoding="utf-8"?>
+<file path=ppt/slides/slide23.xml><?xml version="1.0" encoding="utf-8"?>
 <p:sld xmlns:a="http://schemas.openxmlformats.org/drawingml/2006/main" xmlns:r="http://schemas.openxmlformats.org/officeDocument/2006/relationships" xmlns:mc="http://schemas.openxmlformats.org/markup-compatibility/2006" xmlns:mv="urn:schemas-microsoft-com:mac:vml" xmlns:p="http://schemas.openxmlformats.org/presentationml/2006/main" xmlns:c="http://schemas.openxmlformats.org/drawingml/2006/chart" xmlns:dgm="http://schemas.openxmlformats.org/drawingml/2006/diagram" xmlns:o="urn:schemas-microsoft-com:office:office" xmlns:v="urn:schemas-microsoft-com:vml" xmlns:pvml="urn:schemas-microsoft-com:office:powerpoint" xmlns:com="http://schemas.openxmlformats.org/drawingml/2006/compatibility" xmlns:p14="http://schemas.microsoft.com/office/powerpoint/2010/main" xmlns:p15="http://schemas.microsoft.com/office/powerpoint/2012/main" xmlns:ahyp="http://schemas.microsoft.com/office/drawing/2018/hyperlinkcolor">
   <p:cSld>
     <p:spTree>
       <p:nvGrpSpPr>
-        <p:cNvPr id="185" name="Shape 185"/>
+        <p:cNvPr id="191" name="Shape 191"/>
         <p:cNvGrpSpPr/>
         <p:nvPr/>
       </p:nvGrpSpPr>
@@ -12730,7 +13122,7 @@
       </p:grpSpPr>
       <p:sp>
         <p:nvSpPr>
-          <p:cNvPr id="186" name="Google Shape;186;p29"/>
+          <p:cNvPr id="192" name="Google Shape;192;p30"/>
           <p:cNvSpPr txBox="1"/>
           <p:nvPr>
             <p:ph type="title"/>
@@ -12770,7 +13162,7 @@
       </p:sp>
       <p:sp>
         <p:nvSpPr>
-          <p:cNvPr id="187" name="Google Shape;187;p29"/>
+          <p:cNvPr id="193" name="Google Shape;193;p30"/>
           <p:cNvSpPr txBox="1"/>
           <p:nvPr/>
         </p:nvSpPr>
@@ -12825,7 +13217,7 @@
       </p:sp>
       <p:sp>
         <p:nvSpPr>
-          <p:cNvPr id="188" name="Google Shape;188;p29"/>
+          <p:cNvPr id="194" name="Google Shape;194;p30"/>
           <p:cNvSpPr txBox="1"/>
           <p:nvPr>
             <p:ph idx="1" type="body"/>
@@ -12974,7 +13366,7 @@
       </p:sp>
       <p:sp>
         <p:nvSpPr>
-          <p:cNvPr id="189" name="Google Shape;189;p29"/>
+          <p:cNvPr id="195" name="Google Shape;195;p30"/>
           <p:cNvSpPr txBox="1"/>
           <p:nvPr>
             <p:ph idx="12" type="sldNum"/>
@@ -13049,12 +13441,12 @@
 </p:sld>
 </file>
 
-<file path=ppt/slides/slide23.xml><?xml version="1.0" encoding="utf-8"?>
+<file path=ppt/slides/slide24.xml><?xml version="1.0" encoding="utf-8"?>
 <p:sld xmlns:a="http://schemas.openxmlformats.org/drawingml/2006/main" xmlns:r="http://schemas.openxmlformats.org/officeDocument/2006/relationships" xmlns:mc="http://schemas.openxmlformats.org/markup-compatibility/2006" xmlns:mv="urn:schemas-microsoft-com:mac:vml" xmlns:p="http://schemas.openxmlformats.org/presentationml/2006/main" xmlns:c="http://schemas.openxmlformats.org/drawingml/2006/chart" xmlns:dgm="http://schemas.openxmlformats.org/drawingml/2006/diagram" xmlns:o="urn:schemas-microsoft-com:office:office" xmlns:v="urn:schemas-microsoft-com:vml" xmlns:pvml="urn:schemas-microsoft-com:office:powerpoint" xmlns:com="http://schemas.openxmlformats.org/drawingml/2006/compatibility" xmlns:p14="http://schemas.microsoft.com/office/powerpoint/2010/main" xmlns:p15="http://schemas.microsoft.com/office/powerpoint/2012/main" xmlns:ahyp="http://schemas.microsoft.com/office/drawing/2018/hyperlinkcolor">
   <p:cSld>
     <p:spTree>
       <p:nvGrpSpPr>
-        <p:cNvPr id="193" name="Shape 193"/>
+        <p:cNvPr id="199" name="Shape 199"/>
         <p:cNvGrpSpPr/>
         <p:nvPr/>
       </p:nvGrpSpPr>
@@ -13068,7 +13460,7 @@
       </p:grpSpPr>
       <p:sp>
         <p:nvSpPr>
-          <p:cNvPr id="194" name="Google Shape;194;p30"/>
+          <p:cNvPr id="200" name="Google Shape;200;p31"/>
           <p:cNvSpPr txBox="1"/>
           <p:nvPr>
             <p:ph type="title"/>
@@ -13108,7 +13500,7 @@
       </p:sp>
       <p:sp>
         <p:nvSpPr>
-          <p:cNvPr id="195" name="Google Shape;195;p30"/>
+          <p:cNvPr id="201" name="Google Shape;201;p31"/>
           <p:cNvSpPr txBox="1"/>
           <p:nvPr>
             <p:ph idx="1" type="body"/>
@@ -13336,7 +13728,7 @@
       </p:sp>
       <p:sp>
         <p:nvSpPr>
-          <p:cNvPr id="196" name="Google Shape;196;p30"/>
+          <p:cNvPr id="202" name="Google Shape;202;p31"/>
           <p:cNvSpPr txBox="1"/>
           <p:nvPr>
             <p:ph idx="12" type="sldNum"/>
@@ -13411,12 +13803,12 @@
 </p:sld>
 </file>
 
-<file path=ppt/slides/slide24.xml><?xml version="1.0" encoding="utf-8"?>
+<file path=ppt/slides/slide25.xml><?xml version="1.0" encoding="utf-8"?>
 <p:sld xmlns:a="http://schemas.openxmlformats.org/drawingml/2006/main" xmlns:r="http://schemas.openxmlformats.org/officeDocument/2006/relationships" xmlns:mc="http://schemas.openxmlformats.org/markup-compatibility/2006" xmlns:mv="urn:schemas-microsoft-com:mac:vml" xmlns:p="http://schemas.openxmlformats.org/presentationml/2006/main" xmlns:c="http://schemas.openxmlformats.org/drawingml/2006/chart" xmlns:dgm="http://schemas.openxmlformats.org/drawingml/2006/diagram" xmlns:o="urn:schemas-microsoft-com:office:office" xmlns:v="urn:schemas-microsoft-com:vml" xmlns:pvml="urn:schemas-microsoft-com:office:powerpoint" xmlns:com="http://schemas.openxmlformats.org/drawingml/2006/compatibility" xmlns:p14="http://schemas.microsoft.com/office/powerpoint/2010/main" xmlns:p15="http://schemas.microsoft.com/office/powerpoint/2012/main" xmlns:ahyp="http://schemas.microsoft.com/office/drawing/2018/hyperlinkcolor">
   <p:cSld>
     <p:spTree>
       <p:nvGrpSpPr>
-        <p:cNvPr id="200" name="Shape 200"/>
+        <p:cNvPr id="206" name="Shape 206"/>
         <p:cNvGrpSpPr/>
         <p:nvPr/>
       </p:nvGrpSpPr>
@@ -13430,7 +13822,7 @@
       </p:grpSpPr>
       <p:sp>
         <p:nvSpPr>
-          <p:cNvPr id="201" name="Google Shape;201;p31"/>
+          <p:cNvPr id="207" name="Google Shape;207;p32"/>
           <p:cNvSpPr txBox="1"/>
           <p:nvPr>
             <p:ph type="title"/>
@@ -13470,7 +13862,7 @@
       </p:sp>
       <p:sp>
         <p:nvSpPr>
-          <p:cNvPr id="202" name="Google Shape;202;p31"/>
+          <p:cNvPr id="208" name="Google Shape;208;p32"/>
           <p:cNvSpPr txBox="1"/>
           <p:nvPr>
             <p:ph idx="1" type="body"/>
@@ -13627,7 +14019,7 @@
       </p:sp>
       <p:sp>
         <p:nvSpPr>
-          <p:cNvPr id="203" name="Google Shape;203;p31"/>
+          <p:cNvPr id="209" name="Google Shape;209;p32"/>
           <p:cNvSpPr txBox="1"/>
           <p:nvPr>
             <p:ph idx="12" type="sldNum"/>
@@ -13702,12 +14094,12 @@
 </p:sld>
 </file>
 
-<file path=ppt/slides/slide25.xml><?xml version="1.0" encoding="utf-8"?>
+<file path=ppt/slides/slide26.xml><?xml version="1.0" encoding="utf-8"?>
 <p:sld xmlns:a="http://schemas.openxmlformats.org/drawingml/2006/main" xmlns:r="http://schemas.openxmlformats.org/officeDocument/2006/relationships" xmlns:mc="http://schemas.openxmlformats.org/markup-compatibility/2006" xmlns:mv="urn:schemas-microsoft-com:mac:vml" xmlns:p="http://schemas.openxmlformats.org/presentationml/2006/main" xmlns:c="http://schemas.openxmlformats.org/drawingml/2006/chart" xmlns:dgm="http://schemas.openxmlformats.org/drawingml/2006/diagram" xmlns:o="urn:schemas-microsoft-com:office:office" xmlns:v="urn:schemas-microsoft-com:vml" xmlns:pvml="urn:schemas-microsoft-com:office:powerpoint" xmlns:com="http://schemas.openxmlformats.org/drawingml/2006/compatibility" xmlns:p14="http://schemas.microsoft.com/office/powerpoint/2010/main" xmlns:p15="http://schemas.microsoft.com/office/powerpoint/2012/main" xmlns:ahyp="http://schemas.microsoft.com/office/drawing/2018/hyperlinkcolor">
   <p:cSld>
     <p:spTree>
       <p:nvGrpSpPr>
-        <p:cNvPr id="207" name="Shape 207"/>
+        <p:cNvPr id="213" name="Shape 213"/>
         <p:cNvGrpSpPr/>
         <p:nvPr/>
       </p:nvGrpSpPr>
@@ -13721,7 +14113,7 @@
       </p:grpSpPr>
       <p:sp>
         <p:nvSpPr>
-          <p:cNvPr id="208" name="Google Shape;208;p32"/>
+          <p:cNvPr id="214" name="Google Shape;214;p33"/>
           <p:cNvSpPr txBox="1"/>
           <p:nvPr>
             <p:ph type="title"/>
@@ -13761,7 +14153,7 @@
       </p:sp>
       <p:sp>
         <p:nvSpPr>
-          <p:cNvPr id="209" name="Google Shape;209;p32"/>
+          <p:cNvPr id="215" name="Google Shape;215;p33"/>
           <p:cNvSpPr txBox="1"/>
           <p:nvPr>
             <p:ph idx="1" type="body"/>
@@ -13913,7 +14305,7 @@
       </p:sp>
       <p:sp>
         <p:nvSpPr>
-          <p:cNvPr id="210" name="Google Shape;210;p32"/>
+          <p:cNvPr id="216" name="Google Shape;216;p33"/>
           <p:cNvSpPr txBox="1"/>
           <p:nvPr>
             <p:ph idx="12" type="sldNum"/>
@@ -13977,190 +14369,6 @@
               <a:t> </a:t>
             </a:r>
             <a:endParaRPr/>
-          </a:p>
-        </p:txBody>
-      </p:sp>
-    </p:spTree>
-  </p:cSld>
-  <p:clrMapOvr>
-    <a:masterClrMapping/>
-  </p:clrMapOvr>
-</p:sld>
-</file>
-
-<file path=ppt/slides/slide26.xml><?xml version="1.0" encoding="utf-8"?>
-<p:sld xmlns:a="http://schemas.openxmlformats.org/drawingml/2006/main" xmlns:r="http://schemas.openxmlformats.org/officeDocument/2006/relationships" xmlns:mc="http://schemas.openxmlformats.org/markup-compatibility/2006" xmlns:mv="urn:schemas-microsoft-com:mac:vml" xmlns:p="http://schemas.openxmlformats.org/presentationml/2006/main" xmlns:c="http://schemas.openxmlformats.org/drawingml/2006/chart" xmlns:dgm="http://schemas.openxmlformats.org/drawingml/2006/diagram" xmlns:o="urn:schemas-microsoft-com:office:office" xmlns:v="urn:schemas-microsoft-com:vml" xmlns:pvml="urn:schemas-microsoft-com:office:powerpoint" xmlns:com="http://schemas.openxmlformats.org/drawingml/2006/compatibility" xmlns:p14="http://schemas.microsoft.com/office/powerpoint/2010/main" xmlns:p15="http://schemas.microsoft.com/office/powerpoint/2012/main" xmlns:ahyp="http://schemas.microsoft.com/office/drawing/2018/hyperlinkcolor">
-  <p:cSld>
-    <p:spTree>
-      <p:nvGrpSpPr>
-        <p:cNvPr id="214" name="Shape 214"/>
-        <p:cNvGrpSpPr/>
-        <p:nvPr/>
-      </p:nvGrpSpPr>
-      <p:grpSpPr>
-        <a:xfrm>
-          <a:off x="0" y="0"/>
-          <a:ext cx="0" cy="0"/>
-          <a:chOff x="0" y="0"/>
-          <a:chExt cx="0" cy="0"/>
-        </a:xfrm>
-      </p:grpSpPr>
-      <p:sp>
-        <p:nvSpPr>
-          <p:cNvPr id="215" name="Google Shape;215;p33"/>
-          <p:cNvSpPr txBox="1"/>
-          <p:nvPr>
-            <p:ph type="ctrTitle"/>
-          </p:nvPr>
-        </p:nvSpPr>
-        <p:spPr>
-          <a:xfrm>
-            <a:off x="0" y="0"/>
-            <a:ext cx="9144000" cy="2388900"/>
-          </a:xfrm>
-          <a:prstGeom prst="rect">
-            <a:avLst/>
-          </a:prstGeom>
-        </p:spPr>
-        <p:txBody>
-          <a:bodyPr anchorCtr="0" anchor="b" bIns="274300" lIns="91425" spcFirstLastPara="1" rIns="91425" wrap="square" tIns="91425">
-            <a:noAutofit/>
-          </a:bodyPr>
-          <a:lstStyle/>
-          <a:p>
-            <a:pPr indent="0" lvl="0" marL="0" rtl="0" algn="ctr">
-              <a:spcBef>
-                <a:spcPts val="0"/>
-              </a:spcBef>
-              <a:spcAft>
-                <a:spcPts val="0"/>
-              </a:spcAft>
-              <a:buNone/>
-            </a:pPr>
-            <a:r>
-              <a:rPr lang="en"/>
-              <a:t>Thank you! Any questions?</a:t>
-            </a:r>
-            <a:endParaRPr/>
-          </a:p>
-        </p:txBody>
-      </p:sp>
-      <p:sp>
-        <p:nvSpPr>
-          <p:cNvPr id="216" name="Google Shape;216;p33"/>
-          <p:cNvSpPr txBox="1"/>
-          <p:nvPr>
-            <p:ph idx="1" type="subTitle"/>
-          </p:nvPr>
-        </p:nvSpPr>
-        <p:spPr>
-          <a:xfrm>
-            <a:off x="0" y="2569475"/>
-            <a:ext cx="9144000" cy="2574000"/>
-          </a:xfrm>
-          <a:prstGeom prst="rect">
-            <a:avLst/>
-          </a:prstGeom>
-        </p:spPr>
-        <p:txBody>
-          <a:bodyPr anchorCtr="0" anchor="t" bIns="91425" lIns="91425" spcFirstLastPara="1" rIns="91425" wrap="square" tIns="274300">
-            <a:noAutofit/>
-          </a:bodyPr>
-          <a:lstStyle/>
-          <a:p>
-            <a:pPr indent="0" lvl="0" marL="0" rtl="0" algn="ctr">
-              <a:lnSpc>
-                <a:spcPct val="150000"/>
-              </a:lnSpc>
-              <a:spcBef>
-                <a:spcPts val="0"/>
-              </a:spcBef>
-              <a:spcAft>
-                <a:spcPts val="0"/>
-              </a:spcAft>
-              <a:buNone/>
-            </a:pPr>
-            <a:r>
-              <a:rPr lang="en" u="sng">
-                <a:solidFill>
-                  <a:schemeClr val="hlink"/>
-                </a:solidFill>
-                <a:hlinkClick r:id="rId3"/>
-              </a:rPr>
-              <a:t>dirk.riehle@fau.de</a:t>
-            </a:r>
-            <a:r>
-              <a:rPr lang="en"/>
-              <a:t> </a:t>
-            </a:r>
-            <a:r>
-              <a:rPr lang="en" sz="2400"/>
-              <a:t>–</a:t>
-            </a:r>
-            <a:r>
-              <a:rPr lang="en"/>
-              <a:t> </a:t>
-            </a:r>
-            <a:r>
-              <a:rPr lang="en" u="sng">
-                <a:solidFill>
-                  <a:schemeClr val="hlink"/>
-                </a:solidFill>
-                <a:hlinkClick r:id="rId4"/>
-              </a:rPr>
-              <a:t>https://oss.cs.fau.de</a:t>
-            </a:r>
-            <a:endParaRPr/>
-          </a:p>
-          <a:p>
-            <a:pPr indent="0" lvl="0" marL="0" rtl="0" algn="ctr">
-              <a:lnSpc>
-                <a:spcPct val="150000"/>
-              </a:lnSpc>
-              <a:spcBef>
-                <a:spcPts val="0"/>
-              </a:spcBef>
-              <a:spcAft>
-                <a:spcPts val="0"/>
-              </a:spcAft>
-              <a:buNone/>
-            </a:pPr>
-            <a:r>
-              <a:rPr lang="en" sz="2400" u="sng">
-                <a:solidFill>
-                  <a:schemeClr val="hlink"/>
-                </a:solidFill>
-                <a:hlinkClick r:id="rId5"/>
-              </a:rPr>
-              <a:t>dirk@riehle.org</a:t>
-            </a:r>
-            <a:r>
-              <a:rPr lang="en" sz="2400"/>
-              <a:t> – </a:t>
-            </a:r>
-            <a:r>
-              <a:rPr lang="en" sz="2400" u="sng">
-                <a:solidFill>
-                  <a:schemeClr val="hlink"/>
-                </a:solidFill>
-                <a:hlinkClick r:id="rId6"/>
-              </a:rPr>
-              <a:t>https://dirkriehle.com</a:t>
-            </a:r>
-            <a:r>
-              <a:rPr lang="en" sz="2400"/>
-              <a:t> – </a:t>
-            </a:r>
-            <a:r>
-              <a:rPr lang="en" sz="2400" u="sng">
-                <a:solidFill>
-                  <a:schemeClr val="hlink"/>
-                </a:solidFill>
-                <a:hlinkClick r:id="rId7"/>
-              </a:rPr>
-              <a:t>@dirkriehle</a:t>
-            </a:r>
-            <a:endParaRPr sz="2400"/>
           </a:p>
         </p:txBody>
       </p:sp>
@@ -14194,6 +14402,190 @@
           <p:cNvPr id="221" name="Google Shape;221;p34"/>
           <p:cNvSpPr txBox="1"/>
           <p:nvPr>
+            <p:ph type="ctrTitle"/>
+          </p:nvPr>
+        </p:nvSpPr>
+        <p:spPr>
+          <a:xfrm>
+            <a:off x="0" y="0"/>
+            <a:ext cx="9144000" cy="2388900"/>
+          </a:xfrm>
+          <a:prstGeom prst="rect">
+            <a:avLst/>
+          </a:prstGeom>
+        </p:spPr>
+        <p:txBody>
+          <a:bodyPr anchorCtr="0" anchor="b" bIns="274300" lIns="91425" spcFirstLastPara="1" rIns="91425" wrap="square" tIns="91425">
+            <a:noAutofit/>
+          </a:bodyPr>
+          <a:lstStyle/>
+          <a:p>
+            <a:pPr indent="0" lvl="0" marL="0" rtl="0" algn="ctr">
+              <a:spcBef>
+                <a:spcPts val="0"/>
+              </a:spcBef>
+              <a:spcAft>
+                <a:spcPts val="0"/>
+              </a:spcAft>
+              <a:buNone/>
+            </a:pPr>
+            <a:r>
+              <a:rPr lang="en"/>
+              <a:t>Thank you! Any questions?</a:t>
+            </a:r>
+            <a:endParaRPr/>
+          </a:p>
+        </p:txBody>
+      </p:sp>
+      <p:sp>
+        <p:nvSpPr>
+          <p:cNvPr id="222" name="Google Shape;222;p34"/>
+          <p:cNvSpPr txBox="1"/>
+          <p:nvPr>
+            <p:ph idx="1" type="subTitle"/>
+          </p:nvPr>
+        </p:nvSpPr>
+        <p:spPr>
+          <a:xfrm>
+            <a:off x="0" y="2569475"/>
+            <a:ext cx="9144000" cy="2574000"/>
+          </a:xfrm>
+          <a:prstGeom prst="rect">
+            <a:avLst/>
+          </a:prstGeom>
+        </p:spPr>
+        <p:txBody>
+          <a:bodyPr anchorCtr="0" anchor="t" bIns="91425" lIns="91425" spcFirstLastPara="1" rIns="91425" wrap="square" tIns="274300">
+            <a:noAutofit/>
+          </a:bodyPr>
+          <a:lstStyle/>
+          <a:p>
+            <a:pPr indent="0" lvl="0" marL="0" rtl="0" algn="ctr">
+              <a:lnSpc>
+                <a:spcPct val="150000"/>
+              </a:lnSpc>
+              <a:spcBef>
+                <a:spcPts val="0"/>
+              </a:spcBef>
+              <a:spcAft>
+                <a:spcPts val="0"/>
+              </a:spcAft>
+              <a:buNone/>
+            </a:pPr>
+            <a:r>
+              <a:rPr lang="en" u="sng">
+                <a:solidFill>
+                  <a:schemeClr val="hlink"/>
+                </a:solidFill>
+                <a:hlinkClick r:id="rId3"/>
+              </a:rPr>
+              <a:t>dirk.riehle@fau.de</a:t>
+            </a:r>
+            <a:r>
+              <a:rPr lang="en"/>
+              <a:t> </a:t>
+            </a:r>
+            <a:r>
+              <a:rPr lang="en" sz="2400"/>
+              <a:t>–</a:t>
+            </a:r>
+            <a:r>
+              <a:rPr lang="en"/>
+              <a:t> </a:t>
+            </a:r>
+            <a:r>
+              <a:rPr lang="en" u="sng">
+                <a:solidFill>
+                  <a:schemeClr val="hlink"/>
+                </a:solidFill>
+                <a:hlinkClick r:id="rId4"/>
+              </a:rPr>
+              <a:t>https://oss.cs.fau.de</a:t>
+            </a:r>
+            <a:endParaRPr/>
+          </a:p>
+          <a:p>
+            <a:pPr indent="0" lvl="0" marL="0" rtl="0" algn="ctr">
+              <a:lnSpc>
+                <a:spcPct val="150000"/>
+              </a:lnSpc>
+              <a:spcBef>
+                <a:spcPts val="0"/>
+              </a:spcBef>
+              <a:spcAft>
+                <a:spcPts val="0"/>
+              </a:spcAft>
+              <a:buNone/>
+            </a:pPr>
+            <a:r>
+              <a:rPr lang="en" sz="2400" u="sng">
+                <a:solidFill>
+                  <a:schemeClr val="hlink"/>
+                </a:solidFill>
+                <a:hlinkClick r:id="rId5"/>
+              </a:rPr>
+              <a:t>dirk@riehle.org</a:t>
+            </a:r>
+            <a:r>
+              <a:rPr lang="en" sz="2400"/>
+              <a:t> – </a:t>
+            </a:r>
+            <a:r>
+              <a:rPr lang="en" sz="2400" u="sng">
+                <a:solidFill>
+                  <a:schemeClr val="hlink"/>
+                </a:solidFill>
+                <a:hlinkClick r:id="rId6"/>
+              </a:rPr>
+              <a:t>https://dirkriehle.com</a:t>
+            </a:r>
+            <a:r>
+              <a:rPr lang="en" sz="2400"/>
+              <a:t> – </a:t>
+            </a:r>
+            <a:r>
+              <a:rPr lang="en" sz="2400" u="sng">
+                <a:solidFill>
+                  <a:schemeClr val="hlink"/>
+                </a:solidFill>
+                <a:hlinkClick r:id="rId7"/>
+              </a:rPr>
+              <a:t>@dirkriehle</a:t>
+            </a:r>
+            <a:endParaRPr sz="2400"/>
+          </a:p>
+        </p:txBody>
+      </p:sp>
+    </p:spTree>
+  </p:cSld>
+  <p:clrMapOvr>
+    <a:masterClrMapping/>
+  </p:clrMapOvr>
+</p:sld>
+</file>
+
+<file path=ppt/slides/slide28.xml><?xml version="1.0" encoding="utf-8"?>
+<p:sld xmlns:a="http://schemas.openxmlformats.org/drawingml/2006/main" xmlns:r="http://schemas.openxmlformats.org/officeDocument/2006/relationships" xmlns:mc="http://schemas.openxmlformats.org/markup-compatibility/2006" xmlns:mv="urn:schemas-microsoft-com:mac:vml" xmlns:p="http://schemas.openxmlformats.org/presentationml/2006/main" xmlns:c="http://schemas.openxmlformats.org/drawingml/2006/chart" xmlns:dgm="http://schemas.openxmlformats.org/drawingml/2006/diagram" xmlns:o="urn:schemas-microsoft-com:office:office" xmlns:v="urn:schemas-microsoft-com:vml" xmlns:pvml="urn:schemas-microsoft-com:office:powerpoint" xmlns:com="http://schemas.openxmlformats.org/drawingml/2006/compatibility" xmlns:p14="http://schemas.microsoft.com/office/powerpoint/2010/main" xmlns:p15="http://schemas.microsoft.com/office/powerpoint/2012/main" xmlns:ahyp="http://schemas.microsoft.com/office/drawing/2018/hyperlinkcolor">
+  <p:cSld>
+    <p:spTree>
+      <p:nvGrpSpPr>
+        <p:cNvPr id="226" name="Shape 226"/>
+        <p:cNvGrpSpPr/>
+        <p:nvPr/>
+      </p:nvGrpSpPr>
+      <p:grpSpPr>
+        <a:xfrm>
+          <a:off x="0" y="0"/>
+          <a:ext cx="0" cy="0"/>
+          <a:chOff x="0" y="0"/>
+          <a:chExt cx="0" cy="0"/>
+        </a:xfrm>
+      </p:grpSpPr>
+      <p:sp>
+        <p:nvSpPr>
+          <p:cNvPr id="227" name="Google Shape;227;p35"/>
+          <p:cNvSpPr txBox="1"/>
+          <p:nvPr>
             <p:ph type="title"/>
           </p:nvPr>
         </p:nvSpPr>
@@ -14231,7 +14623,7 @@
       </p:sp>
       <p:sp>
         <p:nvSpPr>
-          <p:cNvPr id="222" name="Google Shape;222;p34"/>
+          <p:cNvPr id="228" name="Google Shape;228;p35"/>
           <p:cNvSpPr txBox="1"/>
           <p:nvPr>
             <p:ph idx="12" type="sldNum"/>
@@ -14296,7 +14688,7 @@
       </p:sp>
       <p:sp>
         <p:nvSpPr>
-          <p:cNvPr id="223" name="Google Shape;223;p34"/>
+          <p:cNvPr id="229" name="Google Shape;229;p35"/>
           <p:cNvSpPr txBox="1"/>
           <p:nvPr>
             <p:ph idx="1" type="body"/>
@@ -15725,7 +16117,7 @@
             <a:tbl>
               <a:tblPr>
                 <a:noFill/>
-                <a:tableStyleId>{FB01EE5D-FCED-4213-B199-629BB343BD29}</a:tableStyleId>
+                <a:tableStyleId>{C11ED610-C3B9-4A8A-B426-B030FC94A886}</a:tableStyleId>
               </a:tblPr>
               <a:tblGrid>
                 <a:gridCol w="1314450"/>

</xml_diff>

<commit_message>
Getting ready for AMOS #22 (summer 2024)
</commit_message>
<xml_diff>
--- a/Lecture slides/AMOS A01 - Introduction.pptx
+++ b/Lecture slides/AMOS A01 - Introduction.pptx
@@ -1411,7 +1411,7 @@
   <p:cSld>
     <p:spTree>
       <p:nvGrpSpPr>
-        <p:cNvPr id="139" name="Shape 139"/>
+        <p:cNvPr id="140" name="Shape 140"/>
         <p:cNvGrpSpPr/>
         <p:nvPr/>
       </p:nvGrpSpPr>
@@ -1425,7 +1425,7 @@
       </p:grpSpPr>
       <p:sp>
         <p:nvSpPr>
-          <p:cNvPr id="140" name="Google Shape;140;g11ffc178508_0_0:notes"/>
+          <p:cNvPr id="141" name="Google Shape;141;g11ffc178508_0_0:notes"/>
           <p:cNvSpPr/>
           <p:nvPr>
             <p:ph idx="2" type="sldImg"/>
@@ -1460,7 +1460,7 @@
       </p:sp>
       <p:sp>
         <p:nvSpPr>
-          <p:cNvPr id="141" name="Google Shape;141;g11ffc178508_0_0:notes"/>
+          <p:cNvPr id="142" name="Google Shape;142;g11ffc178508_0_0:notes"/>
           <p:cNvSpPr txBox="1"/>
           <p:nvPr>
             <p:ph idx="1" type="body"/>
@@ -1510,7 +1510,7 @@
   <p:cSld>
     <p:spTree>
       <p:nvGrpSpPr>
-        <p:cNvPr id="146" name="Shape 146"/>
+        <p:cNvPr id="147" name="Shape 147"/>
         <p:cNvGrpSpPr/>
         <p:nvPr/>
       </p:nvGrpSpPr>
@@ -1524,7 +1524,7 @@
       </p:grpSpPr>
       <p:sp>
         <p:nvSpPr>
-          <p:cNvPr id="147" name="Google Shape;147;g25b0a64b870_0_7:notes"/>
+          <p:cNvPr id="148" name="Google Shape;148;g25b0a64b870_0_7:notes"/>
           <p:cNvSpPr/>
           <p:nvPr>
             <p:ph idx="2" type="sldImg"/>
@@ -1559,7 +1559,7 @@
       </p:sp>
       <p:sp>
         <p:nvSpPr>
-          <p:cNvPr id="148" name="Google Shape;148;g25b0a64b870_0_7:notes"/>
+          <p:cNvPr id="149" name="Google Shape;149;g25b0a64b870_0_7:notes"/>
           <p:cNvSpPr txBox="1"/>
           <p:nvPr>
             <p:ph idx="1" type="body"/>
@@ -1609,7 +1609,7 @@
   <p:cSld>
     <p:spTree>
       <p:nvGrpSpPr>
-        <p:cNvPr id="153" name="Shape 153"/>
+        <p:cNvPr id="154" name="Shape 154"/>
         <p:cNvGrpSpPr/>
         <p:nvPr/>
       </p:nvGrpSpPr>
@@ -1623,7 +1623,7 @@
       </p:grpSpPr>
       <p:sp>
         <p:nvSpPr>
-          <p:cNvPr id="154" name="Google Shape;154;g260d82e8164_0_0:notes"/>
+          <p:cNvPr id="155" name="Google Shape;155;g260d82e8164_0_0:notes"/>
           <p:cNvSpPr/>
           <p:nvPr>
             <p:ph idx="2" type="sldImg"/>
@@ -1658,7 +1658,7 @@
       </p:sp>
       <p:sp>
         <p:nvSpPr>
-          <p:cNvPr id="155" name="Google Shape;155;g260d82e8164_0_0:notes"/>
+          <p:cNvPr id="156" name="Google Shape;156;g260d82e8164_0_0:notes"/>
           <p:cNvSpPr txBox="1"/>
           <p:nvPr>
             <p:ph idx="1" type="body"/>
@@ -1708,7 +1708,7 @@
   <p:cSld>
     <p:spTree>
       <p:nvGrpSpPr>
-        <p:cNvPr id="160" name="Shape 160"/>
+        <p:cNvPr id="161" name="Shape 161"/>
         <p:cNvGrpSpPr/>
         <p:nvPr/>
       </p:nvGrpSpPr>
@@ -1722,7 +1722,7 @@
       </p:grpSpPr>
       <p:sp>
         <p:nvSpPr>
-          <p:cNvPr id="161" name="Google Shape;161;g25f23d62f94_0_9:notes"/>
+          <p:cNvPr id="162" name="Google Shape;162;g2a04622ea40_0_0:notes"/>
           <p:cNvSpPr/>
           <p:nvPr>
             <p:ph idx="2" type="sldImg"/>
@@ -1757,7 +1757,7 @@
       </p:sp>
       <p:sp>
         <p:nvSpPr>
-          <p:cNvPr id="162" name="Google Shape;162;g25f23d62f94_0_9:notes"/>
+          <p:cNvPr id="163" name="Google Shape;163;g2a04622ea40_0_0:notes"/>
           <p:cNvSpPr txBox="1"/>
           <p:nvPr>
             <p:ph idx="1" type="body"/>
@@ -1906,7 +1906,7 @@
   <p:cSld>
     <p:spTree>
       <p:nvGrpSpPr>
-        <p:cNvPr id="168" name="Shape 168"/>
+        <p:cNvPr id="169" name="Shape 169"/>
         <p:cNvGrpSpPr/>
         <p:nvPr/>
       </p:nvGrpSpPr>
@@ -1920,7 +1920,7 @@
       </p:grpSpPr>
       <p:sp>
         <p:nvSpPr>
-          <p:cNvPr id="169" name="Google Shape;169;g23985d0d2d4_0_88:notes"/>
+          <p:cNvPr id="170" name="Google Shape;170;g25f23d62f94_0_9:notes"/>
           <p:cNvSpPr/>
           <p:nvPr>
             <p:ph idx="2" type="sldImg"/>
@@ -1955,7 +1955,7 @@
       </p:sp>
       <p:sp>
         <p:nvSpPr>
-          <p:cNvPr id="170" name="Google Shape;170;g23985d0d2d4_0_88:notes"/>
+          <p:cNvPr id="171" name="Google Shape;171;g25f23d62f94_0_9:notes"/>
           <p:cNvSpPr txBox="1"/>
           <p:nvPr>
             <p:ph idx="1" type="body"/>
@@ -2005,7 +2005,7 @@
   <p:cSld>
     <p:spTree>
       <p:nvGrpSpPr>
-        <p:cNvPr id="175" name="Shape 175"/>
+        <p:cNvPr id="177" name="Shape 177"/>
         <p:cNvGrpSpPr/>
         <p:nvPr/>
       </p:nvGrpSpPr>
@@ -2019,7 +2019,7 @@
       </p:grpSpPr>
       <p:sp>
         <p:nvSpPr>
-          <p:cNvPr id="176" name="Google Shape;176;g23985d0d2d4_0_94:notes"/>
+          <p:cNvPr id="178" name="Google Shape;178;g2cc858d6e65_0_0:notes"/>
           <p:cNvSpPr/>
           <p:nvPr>
             <p:ph idx="2" type="sldImg"/>
@@ -2054,7 +2054,7 @@
       </p:sp>
       <p:sp>
         <p:nvSpPr>
-          <p:cNvPr id="177" name="Google Shape;177;g23985d0d2d4_0_94:notes"/>
+          <p:cNvPr id="179" name="Google Shape;179;g2cc858d6e65_0_0:notes"/>
           <p:cNvSpPr txBox="1"/>
           <p:nvPr>
             <p:ph idx="1" type="body"/>
@@ -2104,7 +2104,7 @@
   <p:cSld>
     <p:spTree>
       <p:nvGrpSpPr>
-        <p:cNvPr id="182" name="Shape 182"/>
+        <p:cNvPr id="185" name="Shape 185"/>
         <p:cNvGrpSpPr/>
         <p:nvPr/>
       </p:nvGrpSpPr>
@@ -2118,7 +2118,7 @@
       </p:grpSpPr>
       <p:sp>
         <p:nvSpPr>
-          <p:cNvPr id="183" name="Google Shape;183;g23985d0d2d4_0_100:notes"/>
+          <p:cNvPr id="186" name="Google Shape;186;g23985d0d2d4_0_100:notes"/>
           <p:cNvSpPr/>
           <p:nvPr>
             <p:ph idx="2" type="sldImg"/>
@@ -2153,7 +2153,7 @@
       </p:sp>
       <p:sp>
         <p:nvSpPr>
-          <p:cNvPr id="184" name="Google Shape;184;g23985d0d2d4_0_100:notes"/>
+          <p:cNvPr id="187" name="Google Shape;187;g23985d0d2d4_0_100:notes"/>
           <p:cNvSpPr txBox="1"/>
           <p:nvPr>
             <p:ph idx="1" type="body"/>
@@ -2203,7 +2203,7 @@
   <p:cSld>
     <p:spTree>
       <p:nvGrpSpPr>
-        <p:cNvPr id="190" name="Shape 190"/>
+        <p:cNvPr id="193" name="Shape 193"/>
         <p:cNvGrpSpPr/>
         <p:nvPr/>
       </p:nvGrpSpPr>
@@ -2217,7 +2217,7 @@
       </p:grpSpPr>
       <p:sp>
         <p:nvSpPr>
-          <p:cNvPr id="191" name="Google Shape;191;g126320e9147_0_147:notes"/>
+          <p:cNvPr id="194" name="Google Shape;194;g126320e9147_0_147:notes"/>
           <p:cNvSpPr/>
           <p:nvPr>
             <p:ph idx="2" type="sldImg"/>
@@ -2252,7 +2252,7 @@
       </p:sp>
       <p:sp>
         <p:nvSpPr>
-          <p:cNvPr id="192" name="Google Shape;192;g126320e9147_0_147:notes"/>
+          <p:cNvPr id="195" name="Google Shape;195;g126320e9147_0_147:notes"/>
           <p:cNvSpPr txBox="1"/>
           <p:nvPr>
             <p:ph idx="1" type="body"/>
@@ -2302,7 +2302,7 @@
   <p:cSld>
     <p:spTree>
       <p:nvGrpSpPr>
-        <p:cNvPr id="198" name="Shape 198"/>
+        <p:cNvPr id="201" name="Shape 201"/>
         <p:cNvGrpSpPr/>
         <p:nvPr/>
       </p:nvGrpSpPr>
@@ -2316,7 +2316,7 @@
       </p:grpSpPr>
       <p:sp>
         <p:nvSpPr>
-          <p:cNvPr id="199" name="Google Shape;199;g126320e9147_0_94:notes"/>
+          <p:cNvPr id="202" name="Google Shape;202;g126320e9147_0_94:notes"/>
           <p:cNvSpPr/>
           <p:nvPr>
             <p:ph idx="2" type="sldImg"/>
@@ -2351,7 +2351,7 @@
       </p:sp>
       <p:sp>
         <p:nvSpPr>
-          <p:cNvPr id="200" name="Google Shape;200;g126320e9147_0_94:notes"/>
+          <p:cNvPr id="203" name="Google Shape;203;g126320e9147_0_94:notes"/>
           <p:cNvSpPr txBox="1"/>
           <p:nvPr>
             <p:ph idx="1" type="body"/>
@@ -2401,7 +2401,7 @@
   <p:cSld>
     <p:spTree>
       <p:nvGrpSpPr>
-        <p:cNvPr id="205" name="Shape 205"/>
+        <p:cNvPr id="208" name="Shape 208"/>
         <p:cNvGrpSpPr/>
         <p:nvPr/>
       </p:nvGrpSpPr>
@@ -2415,7 +2415,7 @@
       </p:grpSpPr>
       <p:sp>
         <p:nvSpPr>
-          <p:cNvPr id="206" name="Google Shape;206;g126320e9147_0_210:notes"/>
+          <p:cNvPr id="209" name="Google Shape;209;g126320e9147_0_210:notes"/>
           <p:cNvSpPr/>
           <p:nvPr>
             <p:ph idx="2" type="sldImg"/>
@@ -2450,7 +2450,7 @@
       </p:sp>
       <p:sp>
         <p:nvSpPr>
-          <p:cNvPr id="207" name="Google Shape;207;g126320e9147_0_210:notes"/>
+          <p:cNvPr id="210" name="Google Shape;210;g126320e9147_0_210:notes"/>
           <p:cNvSpPr txBox="1"/>
           <p:nvPr>
             <p:ph idx="1" type="body"/>
@@ -2500,7 +2500,7 @@
   <p:cSld>
     <p:spTree>
       <p:nvGrpSpPr>
-        <p:cNvPr id="212" name="Shape 212"/>
+        <p:cNvPr id="215" name="Shape 215"/>
         <p:cNvGrpSpPr/>
         <p:nvPr/>
       </p:nvGrpSpPr>
@@ -2514,7 +2514,7 @@
       </p:grpSpPr>
       <p:sp>
         <p:nvSpPr>
-          <p:cNvPr id="213" name="Google Shape;213;g126320e9147_0_223:notes"/>
+          <p:cNvPr id="216" name="Google Shape;216;g126320e9147_0_223:notes"/>
           <p:cNvSpPr/>
           <p:nvPr>
             <p:ph idx="2" type="sldImg"/>
@@ -2549,7 +2549,7 @@
       </p:sp>
       <p:sp>
         <p:nvSpPr>
-          <p:cNvPr id="214" name="Google Shape;214;g126320e9147_0_223:notes"/>
+          <p:cNvPr id="217" name="Google Shape;217;g126320e9147_0_223:notes"/>
           <p:cNvSpPr txBox="1"/>
           <p:nvPr>
             <p:ph idx="1" type="body"/>
@@ -2599,7 +2599,7 @@
   <p:cSld>
     <p:spTree>
       <p:nvGrpSpPr>
-        <p:cNvPr id="219" name="Shape 219"/>
+        <p:cNvPr id="222" name="Shape 222"/>
         <p:cNvGrpSpPr/>
         <p:nvPr/>
       </p:nvGrpSpPr>
@@ -2613,7 +2613,7 @@
       </p:grpSpPr>
       <p:sp>
         <p:nvSpPr>
-          <p:cNvPr id="220" name="Google Shape;220;g23985d0d2d4_0_38:notes"/>
+          <p:cNvPr id="223" name="Google Shape;223;g23985d0d2d4_0_38:notes"/>
           <p:cNvSpPr/>
           <p:nvPr>
             <p:ph idx="2" type="sldImg"/>
@@ -2648,7 +2648,7 @@
       </p:sp>
       <p:sp>
         <p:nvSpPr>
-          <p:cNvPr id="221" name="Google Shape;221;g23985d0d2d4_0_38:notes"/>
+          <p:cNvPr id="224" name="Google Shape;224;g23985d0d2d4_0_38:notes"/>
           <p:cNvSpPr txBox="1"/>
           <p:nvPr>
             <p:ph idx="1" type="body"/>
@@ -2698,7 +2698,7 @@
   <p:cSld>
     <p:spTree>
       <p:nvGrpSpPr>
-        <p:cNvPr id="225" name="Shape 225"/>
+        <p:cNvPr id="228" name="Shape 228"/>
         <p:cNvGrpSpPr/>
         <p:nvPr/>
       </p:nvGrpSpPr>
@@ -2712,7 +2712,7 @@
       </p:grpSpPr>
       <p:sp>
         <p:nvSpPr>
-          <p:cNvPr id="226" name="Google Shape;226;g23985d0d2d4_0_43:notes"/>
+          <p:cNvPr id="229" name="Google Shape;229;g23985d0d2d4_0_43:notes"/>
           <p:cNvSpPr/>
           <p:nvPr>
             <p:ph idx="2" type="sldImg"/>
@@ -2747,7 +2747,7 @@
       </p:sp>
       <p:sp>
         <p:nvSpPr>
-          <p:cNvPr id="227" name="Google Shape;227;g23985d0d2d4_0_43:notes"/>
+          <p:cNvPr id="230" name="Google Shape;230;g23985d0d2d4_0_43:notes"/>
           <p:cNvSpPr txBox="1"/>
           <p:nvPr>
             <p:ph idx="1" type="body"/>
@@ -6985,7 +6985,7 @@
             <a:tbl>
               <a:tblPr>
                 <a:noFill/>
-                <a:tableStyleId>{94576337-B3BA-4665-999D-5A0DBD5474F4}</a:tableStyleId>
+                <a:tableStyleId>{A1A14D6E-7EC5-4BD2-88A4-201CB855446B}</a:tableStyleId>
               </a:tblPr>
               <a:tblGrid>
                 <a:gridCol w="1432550"/>
@@ -6995,7 +6995,7 @@
                 <a:gridCol w="1432550"/>
                 <a:gridCol w="1432550"/>
               </a:tblGrid>
-              <a:tr h="548650">
+              <a:tr h="609600">
                 <a:tc>
                   <a:txBody>
                     <a:bodyPr/>
@@ -7189,7 +7189,7 @@
                 <a:tc hMerge="1"/>
                 <a:tc hMerge="1"/>
               </a:tr>
-              <a:tr h="548650">
+              <a:tr h="609600">
                 <a:tc>
                   <a:txBody>
                     <a:bodyPr/>
@@ -7588,7 +7588,7 @@
                   </a:tcPr>
                 </a:tc>
               </a:tr>
-              <a:tr h="548650">
+              <a:tr h="609600">
                 <a:tc rowSpan="4">
                   <a:txBody>
                     <a:bodyPr/>
@@ -7983,7 +7983,7 @@
                   </a:tcPr>
                 </a:tc>
               </a:tr>
-              <a:tr h="548650">
+              <a:tr h="609600">
                 <a:tc vMerge="1"/>
                 <a:tc>
                   <a:txBody>
@@ -8308,7 +8308,7 @@
                   </a:tcPr>
                 </a:tc>
               </a:tr>
-              <a:tr h="548650">
+              <a:tr h="609600">
                 <a:tc vMerge="1"/>
                 <a:tc>
                   <a:txBody>
@@ -8633,7 +8633,7 @@
                   </a:tcPr>
                 </a:tc>
               </a:tr>
-              <a:tr h="548650">
+              <a:tr h="609600">
                 <a:tc vMerge="1"/>
                 <a:tc>
                   <a:txBody>
@@ -9067,7 +9067,7 @@
             </a:pPr>
             <a:r>
               <a:rPr lang="en"/>
-              <a:t>x	= available</a:t>
+              <a:t>x = available</a:t>
             </a:r>
             <a:endParaRPr/>
           </a:p>
@@ -9083,7 +9083,7 @@
             </a:pPr>
             <a:r>
               <a:rPr lang="en"/>
-              <a:t>–	= not available</a:t>
+              <a:t>– = not available</a:t>
             </a:r>
             <a:endParaRPr/>
           </a:p>
@@ -10520,18 +10520,13 @@
                 <a:spcPts val="1200"/>
               </a:spcBef>
               <a:spcAft>
-                <a:spcPts val="1200"/>
-              </a:spcAft>
-              <a:buClr>
-                <a:schemeClr val="dk1"/>
-              </a:buClr>
-              <a:buSzPts val="1100"/>
-              <a:buFont typeface="Arial"/>
-              <a:buNone/>
-            </a:pPr>
-            <a:r>
-              <a:rPr lang="en"/>
-              <a:t>Class quizzes are available at </a:t>
+                <a:spcPts val="0"/>
+              </a:spcAft>
+              <a:buNone/>
+            </a:pPr>
+            <a:r>
+              <a:rPr lang="en"/>
+              <a:t>Please sign up on </a:t>
             </a:r>
             <a:r>
               <a:rPr lang="en" u="sng">
@@ -10540,11 +10535,31 @@
                 </a:solidFill>
                 <a:hlinkClick r:id="rId3"/>
               </a:rPr>
-              <a:t>https://learn.uni1.de</a:t>
-            </a:r>
-            <a:r>
-              <a:rPr lang="en"/>
-              <a:t> </a:t>
+              <a:t>https://myc.uni1.de</a:t>
+            </a:r>
+            <a:r>
+              <a:rPr lang="en"/>
+              <a:t> for the quizzes</a:t>
+            </a:r>
+            <a:endParaRPr/>
+          </a:p>
+          <a:p>
+            <a:pPr indent="0" lvl="0" marL="0" rtl="0" algn="l">
+              <a:spcBef>
+                <a:spcPts val="1200"/>
+              </a:spcBef>
+              <a:spcAft>
+                <a:spcPts val="1200"/>
+              </a:spcAft>
+              <a:buClr>
+                <a:schemeClr val="dk1"/>
+              </a:buClr>
+              <a:buSzPts val="1100"/>
+              <a:buFont typeface="Arial"/>
+              <a:buNone/>
+            </a:pPr>
+            <a:r>
+              <a:t/>
             </a:r>
             <a:endParaRPr/>
           </a:p>
@@ -10735,7 +10750,7 @@
             </a:pPr>
             <a:r>
               <a:rPr lang="en"/>
-              <a:t>Regular deliverables (product backlog, code contributions, …) every sprint</a:t>
+              <a:t>Regular deliverables (product backlog, code contributions, …) every sprint [1]</a:t>
             </a:r>
             <a:endParaRPr/>
           </a:p>
@@ -10785,7 +10800,7 @@
             </a:pPr>
             <a:r>
               <a:rPr lang="en"/>
-              <a:t>We are present in the team meetings (class days 3, 5, 7, 10, and 13)</a:t>
+              <a:t>We are present in the team meetings (class days 3, 5, 7, 10, and 12 or 13)</a:t>
             </a:r>
             <a:endParaRPr/>
           </a:p>
@@ -10924,6 +10939,48 @@
           </a:p>
         </p:txBody>
       </p:sp>
+      <p:sp>
+        <p:nvSpPr>
+          <p:cNvPr id="139" name="Google Shape;139;p22"/>
+          <p:cNvSpPr txBox="1"/>
+          <p:nvPr/>
+        </p:nvSpPr>
+        <p:spPr>
+          <a:xfrm>
+            <a:off x="0" y="4233672"/>
+            <a:ext cx="7315200" cy="914400"/>
+          </a:xfrm>
+          <a:prstGeom prst="rect">
+            <a:avLst/>
+          </a:prstGeom>
+          <a:noFill/>
+          <a:ln>
+            <a:noFill/>
+          </a:ln>
+        </p:spPr>
+        <p:txBody>
+          <a:bodyPr anchorCtr="0" anchor="b" bIns="91425" lIns="91425" spcFirstLastPara="1" rIns="91425" wrap="square" tIns="91425">
+            <a:noAutofit/>
+          </a:bodyPr>
+          <a:lstStyle/>
+          <a:p>
+            <a:pPr indent="0" lvl="0" marL="0" rtl="0" algn="l">
+              <a:spcBef>
+                <a:spcPts val="0"/>
+              </a:spcBef>
+              <a:spcAft>
+                <a:spcPts val="0"/>
+              </a:spcAft>
+              <a:buNone/>
+            </a:pPr>
+            <a:r>
+              <a:rPr lang="en"/>
+              <a:t>[1] The fastest way to a poor grade is to not work regularly</a:t>
+            </a:r>
+            <a:endParaRPr/>
+          </a:p>
+        </p:txBody>
+      </p:sp>
     </p:spTree>
   </p:cSld>
   <p:clrMapOvr>
@@ -10937,7 +10994,7 @@
   <p:cSld>
     <p:spTree>
       <p:nvGrpSpPr>
-        <p:cNvPr id="142" name="Shape 142"/>
+        <p:cNvPr id="143" name="Shape 143"/>
         <p:cNvGrpSpPr/>
         <p:nvPr/>
       </p:nvGrpSpPr>
@@ -10951,7 +11008,7 @@
       </p:grpSpPr>
       <p:sp>
         <p:nvSpPr>
-          <p:cNvPr id="143" name="Google Shape;143;p23"/>
+          <p:cNvPr id="144" name="Google Shape;144;p23"/>
           <p:cNvSpPr txBox="1"/>
           <p:nvPr>
             <p:ph type="title"/>
@@ -10991,7 +11048,7 @@
       </p:sp>
       <p:sp>
         <p:nvSpPr>
-          <p:cNvPr id="144" name="Google Shape;144;p23"/>
+          <p:cNvPr id="145" name="Google Shape;145;p23"/>
           <p:cNvSpPr txBox="1"/>
           <p:nvPr>
             <p:ph idx="1" type="body"/>
@@ -11097,7 +11154,7 @@
       </p:sp>
       <p:sp>
         <p:nvSpPr>
-          <p:cNvPr id="145" name="Google Shape;145;p23"/>
+          <p:cNvPr id="146" name="Google Shape;146;p23"/>
           <p:cNvSpPr txBox="1"/>
           <p:nvPr>
             <p:ph idx="12" type="sldNum"/>
@@ -11177,7 +11234,7 @@
   <p:cSld>
     <p:spTree>
       <p:nvGrpSpPr>
-        <p:cNvPr id="149" name="Shape 149"/>
+        <p:cNvPr id="150" name="Shape 150"/>
         <p:cNvGrpSpPr/>
         <p:nvPr/>
       </p:nvGrpSpPr>
@@ -11191,7 +11248,7 @@
       </p:grpSpPr>
       <p:sp>
         <p:nvSpPr>
-          <p:cNvPr id="150" name="Google Shape;150;p24"/>
+          <p:cNvPr id="151" name="Google Shape;151;p24"/>
           <p:cNvSpPr txBox="1"/>
           <p:nvPr>
             <p:ph type="title"/>
@@ -11231,7 +11288,7 @@
       </p:sp>
       <p:sp>
         <p:nvSpPr>
-          <p:cNvPr id="151" name="Google Shape;151;p24"/>
+          <p:cNvPr id="152" name="Google Shape;152;p24"/>
           <p:cNvSpPr txBox="1"/>
           <p:nvPr>
             <p:ph idx="1" type="body"/>
@@ -11378,7 +11435,7 @@
       </p:sp>
       <p:sp>
         <p:nvSpPr>
-          <p:cNvPr id="152" name="Google Shape;152;p24"/>
+          <p:cNvPr id="153" name="Google Shape;153;p24"/>
           <p:cNvSpPr txBox="1"/>
           <p:nvPr>
             <p:ph idx="12" type="sldNum"/>
@@ -11458,7 +11515,7 @@
   <p:cSld>
     <p:spTree>
       <p:nvGrpSpPr>
-        <p:cNvPr id="156" name="Shape 156"/>
+        <p:cNvPr id="157" name="Shape 157"/>
         <p:cNvGrpSpPr/>
         <p:nvPr/>
       </p:nvGrpSpPr>
@@ -11472,7 +11529,7 @@
       </p:grpSpPr>
       <p:sp>
         <p:nvSpPr>
-          <p:cNvPr id="157" name="Google Shape;157;p25"/>
+          <p:cNvPr id="158" name="Google Shape;158;p25"/>
           <p:cNvSpPr txBox="1"/>
           <p:nvPr>
             <p:ph type="title"/>
@@ -11512,7 +11569,7 @@
       </p:sp>
       <p:sp>
         <p:nvSpPr>
-          <p:cNvPr id="158" name="Google Shape;158;p25"/>
+          <p:cNvPr id="159" name="Google Shape;159;p25"/>
           <p:cNvSpPr txBox="1"/>
           <p:nvPr>
             <p:ph idx="1" type="body"/>
@@ -11602,7 +11659,7 @@
       </p:sp>
       <p:sp>
         <p:nvSpPr>
-          <p:cNvPr id="159" name="Google Shape;159;p25"/>
+          <p:cNvPr id="160" name="Google Shape;160;p25"/>
           <p:cNvSpPr txBox="1"/>
           <p:nvPr>
             <p:ph idx="12" type="sldNum"/>
@@ -11682,7 +11739,7 @@
   <p:cSld>
     <p:spTree>
       <p:nvGrpSpPr>
-        <p:cNvPr id="163" name="Shape 163"/>
+        <p:cNvPr id="164" name="Shape 164"/>
         <p:cNvGrpSpPr/>
         <p:nvPr/>
       </p:nvGrpSpPr>
@@ -11694,128 +11751,6 @@
           <a:chExt cx="0" cy="0"/>
         </a:xfrm>
       </p:grpSpPr>
-      <p:sp>
-        <p:nvSpPr>
-          <p:cNvPr id="164" name="Google Shape;164;p26"/>
-          <p:cNvSpPr txBox="1"/>
-          <p:nvPr>
-            <p:ph idx="1" type="body"/>
-          </p:nvPr>
-        </p:nvSpPr>
-        <p:spPr>
-          <a:xfrm>
-            <a:off x="274320" y="914400"/>
-            <a:ext cx="8595300" cy="4114800"/>
-          </a:xfrm>
-          <a:prstGeom prst="rect">
-            <a:avLst/>
-          </a:prstGeom>
-        </p:spPr>
-        <p:txBody>
-          <a:bodyPr anchorCtr="0" anchor="t" bIns="0" lIns="0" spcFirstLastPara="1" rIns="0" wrap="square" tIns="0">
-            <a:noAutofit/>
-          </a:bodyPr>
-          <a:lstStyle/>
-          <a:p>
-            <a:pPr indent="0" lvl="0" marL="0" rtl="0" algn="l">
-              <a:spcBef>
-                <a:spcPts val="0"/>
-              </a:spcBef>
-              <a:spcAft>
-                <a:spcPts val="0"/>
-              </a:spcAft>
-              <a:buNone/>
-            </a:pPr>
-            <a:r>
-              <a:rPr lang="en"/>
-              <a:t>You can ask questions using the </a:t>
-            </a:r>
-            <a:r>
-              <a:rPr b="1" lang="en"/>
-              <a:t>AMOS</a:t>
-            </a:r>
-            <a:r>
-              <a:rPr lang="en"/>
-              <a:t> course channel on Slack [1] at</a:t>
-            </a:r>
-            <a:endParaRPr/>
-          </a:p>
-          <a:p>
-            <a:pPr indent="-342900" lvl="0" marL="457200" rtl="0" algn="l">
-              <a:spcBef>
-                <a:spcPts val="1200"/>
-              </a:spcBef>
-              <a:spcAft>
-                <a:spcPts val="0"/>
-              </a:spcAft>
-              <a:buSzPts val="1800"/>
-              <a:buChar char="●"/>
-            </a:pPr>
-            <a:r>
-              <a:rPr lang="en" u="sng">
-                <a:solidFill>
-                  <a:schemeClr val="hlink"/>
-                </a:solidFill>
-                <a:hlinkClick r:id="rId3"/>
-              </a:rPr>
-              <a:t>https://join.slack.com/t/amosproj/signup</a:t>
-            </a:r>
-            <a:r>
-              <a:rPr lang="en"/>
-              <a:t> </a:t>
-            </a:r>
-            <a:endParaRPr/>
-          </a:p>
-          <a:p>
-            <a:pPr indent="0" lvl="0" marL="0" rtl="0" algn="l">
-              <a:spcBef>
-                <a:spcPts val="1200"/>
-              </a:spcBef>
-              <a:spcAft>
-                <a:spcPts val="0"/>
-              </a:spcAft>
-              <a:buNone/>
-            </a:pPr>
-            <a:r>
-              <a:rPr lang="en"/>
-              <a:t>There is no downside to asking questions (no malus)</a:t>
-            </a:r>
-            <a:endParaRPr/>
-          </a:p>
-          <a:p>
-            <a:pPr indent="-342900" lvl="0" marL="457200" rtl="0" algn="l">
-              <a:spcBef>
-                <a:spcPts val="1200"/>
-              </a:spcBef>
-              <a:spcAft>
-                <a:spcPts val="0"/>
-              </a:spcAft>
-              <a:buSzPts val="1800"/>
-              <a:buChar char="●"/>
-            </a:pPr>
-            <a:r>
-              <a:rPr lang="en"/>
-              <a:t>Quality answers will afford a bonus to the answering student</a:t>
-            </a:r>
-            <a:endParaRPr/>
-          </a:p>
-          <a:p>
-            <a:pPr indent="0" lvl="0" marL="0" rtl="0" algn="l">
-              <a:spcBef>
-                <a:spcPts val="1200"/>
-              </a:spcBef>
-              <a:spcAft>
-                <a:spcPts val="1200"/>
-              </a:spcAft>
-              <a:buNone/>
-            </a:pPr>
-            <a:r>
-              <a:t/>
-            </a:r>
-            <a:endParaRPr/>
-          </a:p>
-        </p:txBody>
-      </p:sp>
       <p:sp>
         <p:nvSpPr>
           <p:cNvPr id="165" name="Google Shape;165;p26"/>
@@ -11850,7 +11785,7 @@
             </a:pPr>
             <a:r>
               <a:rPr lang="en"/>
-              <a:t>The AMOS Consultancy</a:t>
+              <a:t>Risk Management</a:t>
             </a:r>
             <a:endParaRPr/>
           </a:p>
@@ -11859,6 +11794,136 @@
       <p:sp>
         <p:nvSpPr>
           <p:cNvPr id="166" name="Google Shape;166;p26"/>
+          <p:cNvSpPr txBox="1"/>
+          <p:nvPr>
+            <p:ph idx="1" type="body"/>
+          </p:nvPr>
+        </p:nvSpPr>
+        <p:spPr>
+          <a:xfrm>
+            <a:off x="274320" y="914400"/>
+            <a:ext cx="8595300" cy="4114800"/>
+          </a:xfrm>
+          <a:prstGeom prst="rect">
+            <a:avLst/>
+          </a:prstGeom>
+        </p:spPr>
+        <p:txBody>
+          <a:bodyPr anchorCtr="0" anchor="t" bIns="0" lIns="0" spcFirstLastPara="1" rIns="0" wrap="square" tIns="0">
+            <a:noAutofit/>
+          </a:bodyPr>
+          <a:lstStyle/>
+          <a:p>
+            <a:pPr indent="0" lvl="0" marL="0" rtl="0" algn="l">
+              <a:spcBef>
+                <a:spcPts val="0"/>
+              </a:spcBef>
+              <a:spcAft>
+                <a:spcPts val="0"/>
+              </a:spcAft>
+              <a:buNone/>
+            </a:pPr>
+            <a:r>
+              <a:rPr lang="en"/>
+              <a:t>Please spend some time thinking about potential risks of your project</a:t>
+            </a:r>
+            <a:endParaRPr/>
+          </a:p>
+          <a:p>
+            <a:pPr indent="-342900" lvl="0" marL="457200" rtl="0" algn="l">
+              <a:spcBef>
+                <a:spcPts val="1200"/>
+              </a:spcBef>
+              <a:spcAft>
+                <a:spcPts val="0"/>
+              </a:spcAft>
+              <a:buSzPts val="1800"/>
+              <a:buChar char="●"/>
+            </a:pPr>
+            <a:r>
+              <a:rPr lang="en"/>
+              <a:t>Predictable risks are delays through </a:t>
+            </a:r>
+            <a:r>
+              <a:rPr lang="en"/>
+              <a:t>unavailability</a:t>
+            </a:r>
+            <a:r>
+              <a:rPr lang="en"/>
+              <a:t> of resources</a:t>
+            </a:r>
+            <a:endParaRPr/>
+          </a:p>
+          <a:p>
+            <a:pPr indent="0" lvl="0" marL="0" rtl="0" algn="l">
+              <a:spcBef>
+                <a:spcPts val="1200"/>
+              </a:spcBef>
+              <a:spcAft>
+                <a:spcPts val="0"/>
+              </a:spcAft>
+              <a:buNone/>
+            </a:pPr>
+            <a:r>
+              <a:rPr lang="en"/>
+              <a:t>Example risk: Need for computing power to train ML models</a:t>
+            </a:r>
+            <a:endParaRPr/>
+          </a:p>
+          <a:p>
+            <a:pPr indent="-342900" lvl="0" marL="457200" rtl="0" algn="l">
+              <a:spcBef>
+                <a:spcPts val="1200"/>
+              </a:spcBef>
+              <a:spcAft>
+                <a:spcPts val="0"/>
+              </a:spcAft>
+              <a:buSzPts val="1800"/>
+              <a:buChar char="●"/>
+            </a:pPr>
+            <a:r>
+              <a:rPr lang="en"/>
+              <a:t>Define your expected needs, ask your industry partner early</a:t>
+            </a:r>
+            <a:endParaRPr/>
+          </a:p>
+          <a:p>
+            <a:pPr indent="-342900" lvl="0" marL="457200" rtl="0" algn="l">
+              <a:spcBef>
+                <a:spcPts val="0"/>
+              </a:spcBef>
+              <a:spcAft>
+                <a:spcPts val="0"/>
+              </a:spcAft>
+              <a:buSzPts val="1800"/>
+              <a:buChar char="●"/>
+            </a:pPr>
+            <a:r>
+              <a:rPr lang="en"/>
+              <a:t>Work on alternative solutions, e.g. use university resources [1]</a:t>
+            </a:r>
+            <a:endParaRPr/>
+          </a:p>
+          <a:p>
+            <a:pPr indent="0" lvl="0" marL="0" rtl="0" algn="l">
+              <a:spcBef>
+                <a:spcPts val="1200"/>
+              </a:spcBef>
+              <a:spcAft>
+                <a:spcPts val="1200"/>
+              </a:spcAft>
+              <a:buNone/>
+            </a:pPr>
+            <a:r>
+              <a:t/>
+            </a:r>
+            <a:endParaRPr/>
+          </a:p>
+        </p:txBody>
+      </p:sp>
+      <p:sp>
+        <p:nvSpPr>
+          <p:cNvPr id="167" name="Google Shape;167;p26"/>
           <p:cNvSpPr txBox="1"/>
           <p:nvPr>
             <p:ph idx="12" type="sldNum"/>
@@ -11909,7 +11974,7 @@
                 <a:solidFill>
                   <a:schemeClr val="hlink"/>
                 </a:solidFill>
-                <a:hlinkClick r:id="rId4"/>
+                <a:hlinkClick r:id="rId3"/>
               </a:rPr>
               <a:t>https://profriehle.com</a:t>
             </a:r>
@@ -11927,7 +11992,7 @@
       </p:sp>
       <p:sp>
         <p:nvSpPr>
-          <p:cNvPr id="167" name="Google Shape;167;p26"/>
+          <p:cNvPr id="168" name="Google Shape;168;p26"/>
           <p:cNvSpPr txBox="1"/>
           <p:nvPr/>
         </p:nvSpPr>
@@ -11961,7 +12026,7 @@
             </a:pPr>
             <a:r>
               <a:rPr lang="en"/>
-              <a:t>[1] We expect to move to an open source solution but aren’t there yet</a:t>
+              <a:t>[1] Almost all universities have a high-performance computer (HPC) center</a:t>
             </a:r>
             <a:endParaRPr/>
           </a:p>
@@ -12319,7 +12384,7 @@
   <p:cSld>
     <p:spTree>
       <p:nvGrpSpPr>
-        <p:cNvPr id="171" name="Shape 171"/>
+        <p:cNvPr id="172" name="Shape 172"/>
         <p:cNvGrpSpPr/>
         <p:nvPr/>
       </p:nvGrpSpPr>
@@ -12331,46 +12396,6 @@
           <a:chExt cx="0" cy="0"/>
         </a:xfrm>
       </p:grpSpPr>
-      <p:sp>
-        <p:nvSpPr>
-          <p:cNvPr id="172" name="Google Shape;172;p27"/>
-          <p:cNvSpPr txBox="1"/>
-          <p:nvPr>
-            <p:ph type="title"/>
-          </p:nvPr>
-        </p:nvSpPr>
-        <p:spPr>
-          <a:xfrm>
-            <a:off x="0" y="0"/>
-            <a:ext cx="9144000" cy="685800"/>
-          </a:xfrm>
-          <a:prstGeom prst="rect">
-            <a:avLst/>
-          </a:prstGeom>
-        </p:spPr>
-        <p:txBody>
-          <a:bodyPr anchorCtr="0" anchor="ctr" bIns="91425" lIns="274300" spcFirstLastPara="1" rIns="91425" wrap="square" tIns="91425">
-            <a:noAutofit/>
-          </a:bodyPr>
-          <a:lstStyle/>
-          <a:p>
-            <a:pPr indent="0" lvl="0" marL="0" rtl="0" algn="l">
-              <a:spcBef>
-                <a:spcPts val="0"/>
-              </a:spcBef>
-              <a:spcAft>
-                <a:spcPts val="0"/>
-              </a:spcAft>
-              <a:buNone/>
-            </a:pPr>
-            <a:r>
-              <a:rPr lang="en"/>
-              <a:t>Course Registration vs. Exam Registration</a:t>
-            </a:r>
-            <a:endParaRPr/>
-          </a:p>
-        </p:txBody>
-      </p:sp>
       <p:sp>
         <p:nvSpPr>
           <p:cNvPr id="173" name="Google Shape;173;p27"/>
@@ -12404,12 +12429,16 @@
               <a:buNone/>
             </a:pPr>
             <a:r>
+              <a:rPr lang="en"/>
+              <a:t>You can ask questions using the </a:t>
+            </a:r>
+            <a:r>
               <a:rPr b="1" lang="en"/>
-              <a:t>Step 1: Course registration </a:t>
-            </a:r>
-            <a:r>
-              <a:rPr lang="en"/>
-              <a:t>(German: Kursanmeldung)</a:t>
+              <a:t>AMOS</a:t>
+            </a:r>
+            <a:r>
+              <a:rPr lang="en"/>
+              <a:t> course channel on Slack [1] at</a:t>
             </a:r>
             <a:endParaRPr/>
           </a:p>
@@ -12425,15 +12454,40 @@
               <a:buChar char="●"/>
             </a:pPr>
             <a:r>
-              <a:rPr lang="en"/>
-              <a:t>Students sign up through the course management system</a:t>
+              <a:rPr lang="en" u="sng">
+                <a:solidFill>
+                  <a:schemeClr val="hlink"/>
+                </a:solidFill>
+                <a:hlinkClick r:id="rId3"/>
+              </a:rPr>
+              <a:t>https://join.slack.com/t/amosproj/signup</a:t>
+            </a:r>
+            <a:r>
+              <a:rPr lang="en"/>
+              <a:t> </a:t>
+            </a:r>
+            <a:endParaRPr/>
+          </a:p>
+          <a:p>
+            <a:pPr indent="0" lvl="0" marL="0" rtl="0" algn="l">
+              <a:spcBef>
+                <a:spcPts val="1200"/>
+              </a:spcBef>
+              <a:spcAft>
+                <a:spcPts val="0"/>
+              </a:spcAft>
+              <a:buNone/>
+            </a:pPr>
+            <a:r>
+              <a:rPr lang="en"/>
+              <a:t>There is no downside to asking questions (no malus)</a:t>
             </a:r>
             <a:endParaRPr/>
           </a:p>
           <a:p>
             <a:pPr indent="-342900" lvl="0" marL="457200" rtl="0" algn="l">
               <a:spcBef>
-                <a:spcPts val="0"/>
+                <a:spcPts val="1200"/>
               </a:spcBef>
               <a:spcAft>
                 <a:spcPts val="0"/>
@@ -12443,24 +12497,7 @@
             </a:pPr>
             <a:r>
               <a:rPr lang="en"/>
-              <a:t>You may or may not get in, various rules and regulations apply</a:t>
-            </a:r>
-            <a:endParaRPr/>
-          </a:p>
-          <a:p>
-            <a:pPr indent="-342900" lvl="0" marL="457200" rtl="0" algn="l">
-              <a:spcBef>
-                <a:spcPts val="0"/>
-              </a:spcBef>
-              <a:spcAft>
-                <a:spcPts val="0"/>
-              </a:spcAft>
-              <a:buSzPts val="1800"/>
-              <a:buChar char="●"/>
-            </a:pPr>
-            <a:r>
-              <a:rPr lang="en"/>
-              <a:t>The earlier you sign up, the more likely you are to get in</a:t>
+              <a:t>Quality answers will afford a bonus to the answering student</a:t>
             </a:r>
             <a:endParaRPr/>
           </a:p>
@@ -12470,68 +12507,12 @@
                 <a:spcPts val="1200"/>
               </a:spcBef>
               <a:spcAft>
-                <a:spcPts val="0"/>
-              </a:spcAft>
-              <a:buNone/>
-            </a:pPr>
-            <a:r>
-              <a:rPr b="1" lang="en"/>
-              <a:t>Step 2: Exam registration </a:t>
-            </a:r>
-            <a:r>
-              <a:rPr lang="en"/>
-              <a:t>(German: Prüfungsanmeldung)</a:t>
-            </a:r>
-            <a:endParaRPr/>
-          </a:p>
-          <a:p>
-            <a:pPr indent="-342900" lvl="0" marL="457200" rtl="0" algn="l">
-              <a:spcBef>
                 <a:spcPts val="1200"/>
-              </a:spcBef>
-              <a:spcAft>
-                <a:spcPts val="0"/>
-              </a:spcAft>
-              <a:buSzPts val="1800"/>
-              <a:buChar char="●"/>
-            </a:pPr>
-            <a:r>
-              <a:rPr lang="en"/>
-              <a:t>During the first weeks of the course, you can decide to drop out</a:t>
-            </a:r>
-            <a:endParaRPr/>
-          </a:p>
-          <a:p>
-            <a:pPr indent="-342900" lvl="0" marL="457200" rtl="0" algn="l">
-              <a:spcBef>
-                <a:spcPts val="0"/>
-              </a:spcBef>
-              <a:spcAft>
-                <a:spcPts val="0"/>
-              </a:spcAft>
-              <a:buSzPts val="1800"/>
-              <a:buChar char="●"/>
-            </a:pPr>
-            <a:r>
-              <a:rPr lang="en"/>
-              <a:t>Four weeks (or so) into the semester, you can register for the exam</a:t>
-            </a:r>
-            <a:endParaRPr/>
-          </a:p>
-          <a:p>
-            <a:pPr indent="-342900" lvl="0" marL="457200" rtl="0" algn="l">
-              <a:spcBef>
-                <a:spcPts val="0"/>
-              </a:spcBef>
-              <a:spcAft>
-                <a:spcPts val="0"/>
-              </a:spcAft>
-              <a:buSzPts val="1800"/>
-              <a:buChar char="●"/>
-            </a:pPr>
-            <a:r>
-              <a:rPr lang="en"/>
-              <a:t>After exam registration closes, your decision is binding</a:t>
+              </a:spcAft>
+              <a:buNone/>
+            </a:pPr>
+            <a:r>
+              <a:t/>
             </a:r>
             <a:endParaRPr/>
           </a:p>
@@ -12540,6 +12521,46 @@
       <p:sp>
         <p:nvSpPr>
           <p:cNvPr id="174" name="Google Shape;174;p27"/>
+          <p:cNvSpPr txBox="1"/>
+          <p:nvPr>
+            <p:ph type="title"/>
+          </p:nvPr>
+        </p:nvSpPr>
+        <p:spPr>
+          <a:xfrm>
+            <a:off x="0" y="0"/>
+            <a:ext cx="9144000" cy="685800"/>
+          </a:xfrm>
+          <a:prstGeom prst="rect">
+            <a:avLst/>
+          </a:prstGeom>
+        </p:spPr>
+        <p:txBody>
+          <a:bodyPr anchorCtr="0" anchor="ctr" bIns="91425" lIns="274300" spcFirstLastPara="1" rIns="91425" wrap="square" tIns="91425">
+            <a:noAutofit/>
+          </a:bodyPr>
+          <a:lstStyle/>
+          <a:p>
+            <a:pPr indent="0" lvl="0" marL="0" rtl="0" algn="l">
+              <a:spcBef>
+                <a:spcPts val="0"/>
+              </a:spcBef>
+              <a:spcAft>
+                <a:spcPts val="0"/>
+              </a:spcAft>
+              <a:buNone/>
+            </a:pPr>
+            <a:r>
+              <a:rPr lang="en"/>
+              <a:t>The AMOS Consultancy</a:t>
+            </a:r>
+            <a:endParaRPr/>
+          </a:p>
+        </p:txBody>
+      </p:sp>
+      <p:sp>
+        <p:nvSpPr>
+          <p:cNvPr id="175" name="Google Shape;175;p27"/>
           <p:cNvSpPr txBox="1"/>
           <p:nvPr>
             <p:ph idx="12" type="sldNum"/>
@@ -12590,7 +12611,7 @@
                 <a:solidFill>
                   <a:schemeClr val="hlink"/>
                 </a:solidFill>
-                <a:hlinkClick r:id="rId3"/>
+                <a:hlinkClick r:id="rId4"/>
               </a:rPr>
               <a:t>https://profriehle.com</a:t>
             </a:r>
@@ -12601,6 +12622,48 @@
                 </a:solidFill>
               </a:rPr>
               <a:t> </a:t>
+            </a:r>
+            <a:endParaRPr/>
+          </a:p>
+        </p:txBody>
+      </p:sp>
+      <p:sp>
+        <p:nvSpPr>
+          <p:cNvPr id="176" name="Google Shape;176;p27"/>
+          <p:cNvSpPr txBox="1"/>
+          <p:nvPr/>
+        </p:nvSpPr>
+        <p:spPr>
+          <a:xfrm>
+            <a:off x="0" y="4233672"/>
+            <a:ext cx="7315200" cy="914400"/>
+          </a:xfrm>
+          <a:prstGeom prst="rect">
+            <a:avLst/>
+          </a:prstGeom>
+          <a:noFill/>
+          <a:ln>
+            <a:noFill/>
+          </a:ln>
+        </p:spPr>
+        <p:txBody>
+          <a:bodyPr anchorCtr="0" anchor="b" bIns="91425" lIns="91425" spcFirstLastPara="1" rIns="91425" wrap="square" tIns="91425">
+            <a:noAutofit/>
+          </a:bodyPr>
+          <a:lstStyle/>
+          <a:p>
+            <a:pPr indent="0" lvl="0" marL="0" rtl="0" algn="l">
+              <a:spcBef>
+                <a:spcPts val="0"/>
+              </a:spcBef>
+              <a:spcAft>
+                <a:spcPts val="0"/>
+              </a:spcAft>
+              <a:buNone/>
+            </a:pPr>
+            <a:r>
+              <a:rPr lang="en"/>
+              <a:t>[1] We expect to move to an open source solution but aren’t there yet</a:t>
             </a:r>
             <a:endParaRPr/>
           </a:p>
@@ -12619,7 +12682,7 @@
   <p:cSld>
     <p:spTree>
       <p:nvGrpSpPr>
-        <p:cNvPr id="178" name="Shape 178"/>
+        <p:cNvPr id="180" name="Shape 180"/>
         <p:cNvGrpSpPr/>
         <p:nvPr/>
       </p:nvGrpSpPr>
@@ -12633,7 +12696,7 @@
       </p:grpSpPr>
       <p:sp>
         <p:nvSpPr>
-          <p:cNvPr id="179" name="Google Shape;179;p28"/>
+          <p:cNvPr id="181" name="Google Shape;181;p28"/>
           <p:cNvSpPr txBox="1"/>
           <p:nvPr>
             <p:ph type="title"/>
@@ -12665,7 +12728,11 @@
             </a:pPr>
             <a:r>
               <a:rPr lang="en"/>
-              <a:t>Receiving a Grade for the Course</a:t>
+              <a:t>Course vs. Exam Registration</a:t>
+            </a:r>
+            <a:r>
+              <a:rPr lang="en"/>
+              <a:t> [1]</a:t>
             </a:r>
             <a:endParaRPr/>
           </a:p>
@@ -12673,7 +12740,7 @@
       </p:sp>
       <p:sp>
         <p:nvSpPr>
-          <p:cNvPr id="180" name="Google Shape;180;p28"/>
+          <p:cNvPr id="182" name="Google Shape;182;p28"/>
           <p:cNvSpPr txBox="1"/>
           <p:nvPr>
             <p:ph idx="1" type="body"/>
@@ -12710,6 +12777,27 @@
             </a:pPr>
             <a:r>
               <a:rPr lang="en"/>
+              <a:t>Course registration and exam registration are two separate things</a:t>
+            </a:r>
+            <a:endParaRPr/>
+          </a:p>
+          <a:p>
+            <a:pPr indent="0" lvl="0" marL="0" rtl="0" algn="l">
+              <a:spcBef>
+                <a:spcPts val="1200"/>
+              </a:spcBef>
+              <a:spcAft>
+                <a:spcPts val="0"/>
+              </a:spcAft>
+              <a:buClr>
+                <a:schemeClr val="dk1"/>
+              </a:buClr>
+              <a:buSzPts val="1100"/>
+              <a:buFont typeface="Arial"/>
+              <a:buNone/>
+            </a:pPr>
+            <a:r>
+              <a:rPr lang="en"/>
               <a:t>If you want to receive a grade</a:t>
             </a:r>
             <a:endParaRPr/>
@@ -12745,7 +12833,7 @@
           <a:p>
             <a:pPr indent="-317500" lvl="1" marL="914400" rtl="0" algn="l">
               <a:spcBef>
-                <a:spcPts val="1000"/>
+                <a:spcPts val="0"/>
               </a:spcBef>
               <a:spcAft>
                 <a:spcPts val="0"/>
@@ -12786,48 +12874,6 @@
                 <a:spcPts val="1200"/>
               </a:spcBef>
               <a:spcAft>
-                <a:spcPts val="0"/>
-              </a:spcAft>
-              <a:buNone/>
-            </a:pPr>
-            <a:r>
-              <a:rPr lang="en"/>
-              <a:t>In case of problems, please see</a:t>
-            </a:r>
-            <a:endParaRPr/>
-          </a:p>
-          <a:p>
-            <a:pPr indent="-342900" lvl="0" marL="457200" rtl="0" algn="l">
-              <a:spcBef>
-                <a:spcPts val="1200"/>
-              </a:spcBef>
-              <a:spcAft>
-                <a:spcPts val="0"/>
-              </a:spcAft>
-              <a:buSzPts val="1800"/>
-              <a:buChar char="●"/>
-            </a:pPr>
-            <a:r>
-              <a:rPr lang="en" u="sng">
-                <a:solidFill>
-                  <a:schemeClr val="hlink"/>
-                </a:solidFill>
-                <a:hlinkClick r:id="rId3"/>
-              </a:rPr>
-              <a:t>https://oss.cs.fau.de/teaching/course-resources/course-registration/</a:t>
-            </a:r>
-            <a:r>
-              <a:rPr lang="en"/>
-              <a:t> </a:t>
-            </a:r>
-            <a:endParaRPr/>
-          </a:p>
-          <a:p>
-            <a:pPr indent="0" lvl="0" marL="0" rtl="0" algn="l">
-              <a:spcBef>
-                <a:spcPts val="1200"/>
-              </a:spcBef>
-              <a:spcAft>
                 <a:spcPts val="1200"/>
               </a:spcAft>
               <a:buNone/>
@@ -12842,7 +12888,7 @@
       </p:sp>
       <p:sp>
         <p:nvSpPr>
-          <p:cNvPr id="181" name="Google Shape;181;p28"/>
+          <p:cNvPr id="183" name="Google Shape;183;p28"/>
           <p:cNvSpPr txBox="1"/>
           <p:nvPr>
             <p:ph idx="12" type="sldNum"/>
@@ -12893,7 +12939,7 @@
                 <a:solidFill>
                   <a:schemeClr val="hlink"/>
                 </a:solidFill>
-                <a:hlinkClick r:id="rId4"/>
+                <a:hlinkClick r:id="rId3"/>
               </a:rPr>
               <a:t>https://profriehle.com</a:t>
             </a:r>
@@ -12904,6 +12950,48 @@
                 </a:solidFill>
               </a:rPr>
               <a:t> </a:t>
+            </a:r>
+            <a:endParaRPr/>
+          </a:p>
+        </p:txBody>
+      </p:sp>
+      <p:sp>
+        <p:nvSpPr>
+          <p:cNvPr id="184" name="Google Shape;184;p28"/>
+          <p:cNvSpPr txBox="1"/>
+          <p:nvPr/>
+        </p:nvSpPr>
+        <p:spPr>
+          <a:xfrm>
+            <a:off x="0" y="4233672"/>
+            <a:ext cx="7315200" cy="914400"/>
+          </a:xfrm>
+          <a:prstGeom prst="rect">
+            <a:avLst/>
+          </a:prstGeom>
+          <a:noFill/>
+          <a:ln>
+            <a:noFill/>
+          </a:ln>
+        </p:spPr>
+        <p:txBody>
+          <a:bodyPr anchorCtr="0" anchor="b" bIns="91425" lIns="91425" spcFirstLastPara="1" rIns="91425" wrap="square" tIns="91425">
+            <a:noAutofit/>
+          </a:bodyPr>
+          <a:lstStyle/>
+          <a:p>
+            <a:pPr indent="0" lvl="0" marL="0" rtl="0" algn="l">
+              <a:spcBef>
+                <a:spcPts val="0"/>
+              </a:spcBef>
+              <a:spcAft>
+                <a:spcPts val="0"/>
+              </a:spcAft>
+              <a:buNone/>
+            </a:pPr>
+            <a:r>
+              <a:rPr lang="en"/>
+              <a:t>[1] German: Prüfungsanmeldung</a:t>
             </a:r>
             <a:endParaRPr/>
           </a:p>
@@ -12922,7 +13010,7 @@
   <p:cSld>
     <p:spTree>
       <p:nvGrpSpPr>
-        <p:cNvPr id="185" name="Shape 185"/>
+        <p:cNvPr id="188" name="Shape 188"/>
         <p:cNvGrpSpPr/>
         <p:nvPr/>
       </p:nvGrpSpPr>
@@ -12936,7 +13024,7 @@
       </p:grpSpPr>
       <p:sp>
         <p:nvSpPr>
-          <p:cNvPr id="186" name="Google Shape;186;p29"/>
+          <p:cNvPr id="189" name="Google Shape;189;p29"/>
           <p:cNvSpPr txBox="1"/>
           <p:nvPr>
             <p:ph type="title"/>
@@ -12976,7 +13064,7 @@
       </p:sp>
       <p:pic>
         <p:nvPicPr>
-          <p:cNvPr id="187" name="Google Shape;187;p29"/>
+          <p:cNvPr id="190" name="Google Shape;190;p29"/>
           <p:cNvPicPr preferRelativeResize="0"/>
           <p:nvPr/>
         </p:nvPicPr>
@@ -13004,7 +13092,7 @@
       </p:pic>
       <p:sp>
         <p:nvSpPr>
-          <p:cNvPr id="188" name="Google Shape;188;p29"/>
+          <p:cNvPr id="191" name="Google Shape;191;p29"/>
           <p:cNvSpPr txBox="1"/>
           <p:nvPr/>
         </p:nvSpPr>
@@ -13062,7 +13150,7 @@
       </p:sp>
       <p:sp>
         <p:nvSpPr>
-          <p:cNvPr id="189" name="Google Shape;189;p29"/>
+          <p:cNvPr id="192" name="Google Shape;192;p29"/>
           <p:cNvSpPr txBox="1"/>
           <p:nvPr>
             <p:ph idx="12" type="sldNum"/>
@@ -13142,7 +13230,7 @@
   <p:cSld>
     <p:spTree>
       <p:nvGrpSpPr>
-        <p:cNvPr id="193" name="Shape 193"/>
+        <p:cNvPr id="196" name="Shape 196"/>
         <p:cNvGrpSpPr/>
         <p:nvPr/>
       </p:nvGrpSpPr>
@@ -13156,7 +13244,7 @@
       </p:grpSpPr>
       <p:sp>
         <p:nvSpPr>
-          <p:cNvPr id="194" name="Google Shape;194;p30"/>
+          <p:cNvPr id="197" name="Google Shape;197;p30"/>
           <p:cNvSpPr txBox="1"/>
           <p:nvPr>
             <p:ph type="title"/>
@@ -13196,7 +13284,7 @@
       </p:sp>
       <p:sp>
         <p:nvSpPr>
-          <p:cNvPr id="195" name="Google Shape;195;p30"/>
+          <p:cNvPr id="198" name="Google Shape;198;p30"/>
           <p:cNvSpPr txBox="1"/>
           <p:nvPr/>
         </p:nvSpPr>
@@ -13251,7 +13339,7 @@
       </p:sp>
       <p:sp>
         <p:nvSpPr>
-          <p:cNvPr id="196" name="Google Shape;196;p30"/>
+          <p:cNvPr id="199" name="Google Shape;199;p30"/>
           <p:cNvSpPr txBox="1"/>
           <p:nvPr>
             <p:ph idx="1" type="body"/>
@@ -13400,7 +13488,7 @@
       </p:sp>
       <p:sp>
         <p:nvSpPr>
-          <p:cNvPr id="197" name="Google Shape;197;p30"/>
+          <p:cNvPr id="200" name="Google Shape;200;p30"/>
           <p:cNvSpPr txBox="1"/>
           <p:nvPr>
             <p:ph idx="12" type="sldNum"/>
@@ -13480,7 +13568,7 @@
   <p:cSld>
     <p:spTree>
       <p:nvGrpSpPr>
-        <p:cNvPr id="201" name="Shape 201"/>
+        <p:cNvPr id="204" name="Shape 204"/>
         <p:cNvGrpSpPr/>
         <p:nvPr/>
       </p:nvGrpSpPr>
@@ -13494,7 +13582,7 @@
       </p:grpSpPr>
       <p:sp>
         <p:nvSpPr>
-          <p:cNvPr id="202" name="Google Shape;202;p31"/>
+          <p:cNvPr id="205" name="Google Shape;205;p31"/>
           <p:cNvSpPr txBox="1"/>
           <p:nvPr>
             <p:ph type="title"/>
@@ -13534,7 +13622,7 @@
       </p:sp>
       <p:sp>
         <p:nvSpPr>
-          <p:cNvPr id="203" name="Google Shape;203;p31"/>
+          <p:cNvPr id="206" name="Google Shape;206;p31"/>
           <p:cNvSpPr txBox="1"/>
           <p:nvPr>
             <p:ph idx="1" type="body"/>
@@ -13762,7 +13850,7 @@
       </p:sp>
       <p:sp>
         <p:nvSpPr>
-          <p:cNvPr id="204" name="Google Shape;204;p31"/>
+          <p:cNvPr id="207" name="Google Shape;207;p31"/>
           <p:cNvSpPr txBox="1"/>
           <p:nvPr>
             <p:ph idx="12" type="sldNum"/>
@@ -13842,7 +13930,7 @@
   <p:cSld>
     <p:spTree>
       <p:nvGrpSpPr>
-        <p:cNvPr id="208" name="Shape 208"/>
+        <p:cNvPr id="211" name="Shape 211"/>
         <p:cNvGrpSpPr/>
         <p:nvPr/>
       </p:nvGrpSpPr>
@@ -13856,7 +13944,7 @@
       </p:grpSpPr>
       <p:sp>
         <p:nvSpPr>
-          <p:cNvPr id="209" name="Google Shape;209;p32"/>
+          <p:cNvPr id="212" name="Google Shape;212;p32"/>
           <p:cNvSpPr txBox="1"/>
           <p:nvPr>
             <p:ph type="title"/>
@@ -13896,7 +13984,7 @@
       </p:sp>
       <p:sp>
         <p:nvSpPr>
-          <p:cNvPr id="210" name="Google Shape;210;p32"/>
+          <p:cNvPr id="213" name="Google Shape;213;p32"/>
           <p:cNvSpPr txBox="1"/>
           <p:nvPr>
             <p:ph idx="1" type="body"/>
@@ -14053,7 +14141,7 @@
       </p:sp>
       <p:sp>
         <p:nvSpPr>
-          <p:cNvPr id="211" name="Google Shape;211;p32"/>
+          <p:cNvPr id="214" name="Google Shape;214;p32"/>
           <p:cNvSpPr txBox="1"/>
           <p:nvPr>
             <p:ph idx="12" type="sldNum"/>
@@ -14133,7 +14221,7 @@
   <p:cSld>
     <p:spTree>
       <p:nvGrpSpPr>
-        <p:cNvPr id="215" name="Shape 215"/>
+        <p:cNvPr id="218" name="Shape 218"/>
         <p:cNvGrpSpPr/>
         <p:nvPr/>
       </p:nvGrpSpPr>
@@ -14147,7 +14235,7 @@
       </p:grpSpPr>
       <p:sp>
         <p:nvSpPr>
-          <p:cNvPr id="216" name="Google Shape;216;p33"/>
+          <p:cNvPr id="219" name="Google Shape;219;p33"/>
           <p:cNvSpPr txBox="1"/>
           <p:nvPr>
             <p:ph type="title"/>
@@ -14187,7 +14275,7 @@
       </p:sp>
       <p:sp>
         <p:nvSpPr>
-          <p:cNvPr id="217" name="Google Shape;217;p33"/>
+          <p:cNvPr id="220" name="Google Shape;220;p33"/>
           <p:cNvSpPr txBox="1"/>
           <p:nvPr>
             <p:ph idx="1" type="body"/>
@@ -14339,7 +14427,7 @@
       </p:sp>
       <p:sp>
         <p:nvSpPr>
-          <p:cNvPr id="218" name="Google Shape;218;p33"/>
+          <p:cNvPr id="221" name="Google Shape;221;p33"/>
           <p:cNvSpPr txBox="1"/>
           <p:nvPr>
             <p:ph idx="12" type="sldNum"/>
@@ -14419,7 +14507,7 @@
   <p:cSld>
     <p:spTree>
       <p:nvGrpSpPr>
-        <p:cNvPr id="222" name="Shape 222"/>
+        <p:cNvPr id="225" name="Shape 225"/>
         <p:cNvGrpSpPr/>
         <p:nvPr/>
       </p:nvGrpSpPr>
@@ -14433,7 +14521,7 @@
       </p:grpSpPr>
       <p:sp>
         <p:nvSpPr>
-          <p:cNvPr id="223" name="Google Shape;223;p34"/>
+          <p:cNvPr id="226" name="Google Shape;226;p34"/>
           <p:cNvSpPr txBox="1"/>
           <p:nvPr>
             <p:ph type="ctrTitle"/>
@@ -14473,7 +14561,7 @@
       </p:sp>
       <p:sp>
         <p:nvSpPr>
-          <p:cNvPr id="224" name="Google Shape;224;p34"/>
+          <p:cNvPr id="227" name="Google Shape;227;p34"/>
           <p:cNvSpPr txBox="1"/>
           <p:nvPr>
             <p:ph idx="1" type="subTitle"/>
@@ -14603,7 +14691,7 @@
   <p:cSld>
     <p:spTree>
       <p:nvGrpSpPr>
-        <p:cNvPr id="228" name="Shape 228"/>
+        <p:cNvPr id="231" name="Shape 231"/>
         <p:cNvGrpSpPr/>
         <p:nvPr/>
       </p:nvGrpSpPr>
@@ -14617,7 +14705,7 @@
       </p:grpSpPr>
       <p:sp>
         <p:nvSpPr>
-          <p:cNvPr id="229" name="Google Shape;229;p35"/>
+          <p:cNvPr id="232" name="Google Shape;232;p35"/>
           <p:cNvSpPr txBox="1"/>
           <p:nvPr>
             <p:ph type="title"/>
@@ -14657,7 +14745,7 @@
       </p:sp>
       <p:sp>
         <p:nvSpPr>
-          <p:cNvPr id="230" name="Google Shape;230;p35"/>
+          <p:cNvPr id="233" name="Google Shape;233;p35"/>
           <p:cNvSpPr txBox="1"/>
           <p:nvPr>
             <p:ph idx="12" type="sldNum"/>
@@ -14722,7 +14810,7 @@
       </p:sp>
       <p:sp>
         <p:nvSpPr>
-          <p:cNvPr id="231" name="Google Shape;231;p35"/>
+          <p:cNvPr id="234" name="Google Shape;234;p35"/>
           <p:cNvSpPr txBox="1"/>
           <p:nvPr>
             <p:ph idx="1" type="body"/>
@@ -14817,7 +14905,7 @@
             </a:pPr>
             <a:r>
               <a:rPr lang="en"/>
-              <a:t>© Copyright 2023 Dirk Riehle, some rights reserved</a:t>
+              <a:t>© Copyright 2024 Dirk Riehle, some rights reserved</a:t>
             </a:r>
             <a:endParaRPr/>
           </a:p>
@@ -16151,7 +16239,7 @@
             <a:tbl>
               <a:tblPr>
                 <a:noFill/>
-                <a:tableStyleId>{94576337-B3BA-4665-999D-5A0DBD5474F4}</a:tableStyleId>
+                <a:tableStyleId>{A1A14D6E-7EC5-4BD2-88A4-201CB855446B}</a:tableStyleId>
               </a:tblPr>
               <a:tblGrid>
                 <a:gridCol w="1432550"/>
@@ -16161,7 +16249,7 @@
                 <a:gridCol w="1432550"/>
                 <a:gridCol w="1432550"/>
               </a:tblGrid>
-              <a:tr h="548650">
+              <a:tr h="609600">
                 <a:tc>
                   <a:txBody>
                     <a:bodyPr/>
@@ -16355,7 +16443,7 @@
                 <a:tc hMerge="1"/>
                 <a:tc hMerge="1"/>
               </a:tr>
-              <a:tr h="548650">
+              <a:tr h="609600">
                 <a:tc>
                   <a:txBody>
                     <a:bodyPr/>
@@ -16494,95 +16582,9 @@
                             <a:schemeClr val="lt1"/>
                           </a:solidFill>
                         </a:rPr>
-                        <a:t>AMOS-VL</a:t>
+                        <a:t>Lecture (AMOS)</a:t>
                       </a:r>
                       <a:endParaRPr b="1">
-                        <a:solidFill>
-                          <a:schemeClr val="lt1"/>
-                        </a:solidFill>
-                      </a:endParaRPr>
-                    </a:p>
-                  </a:txBody>
-                  <a:tcPr marT="91425" marB="91425" marR="91425" marL="91425" anchor="ctr">
-                    <a:lnL cap="flat" cmpd="sng" w="38100">
-                      <a:solidFill>
-                        <a:schemeClr val="lt1"/>
-                      </a:solidFill>
-                      <a:prstDash val="solid"/>
-                      <a:round/>
-                      <a:headEnd len="sm" w="sm" type="none"/>
-                      <a:tailEnd len="sm" w="sm" type="none"/>
-                    </a:lnL>
-                    <a:lnR cap="flat" cmpd="sng" w="38100">
-                      <a:solidFill>
-                        <a:schemeClr val="lt1"/>
-                      </a:solidFill>
-                      <a:prstDash val="solid"/>
-                      <a:round/>
-                      <a:headEnd len="sm" w="sm" type="none"/>
-                      <a:tailEnd len="sm" w="sm" type="none"/>
-                    </a:lnR>
-                    <a:lnT cap="flat" cmpd="sng" w="38100">
-                      <a:solidFill>
-                        <a:schemeClr val="lt1"/>
-                      </a:solidFill>
-                      <a:prstDash val="solid"/>
-                      <a:round/>
-                      <a:headEnd len="sm" w="sm" type="none"/>
-                      <a:tailEnd len="sm" w="sm" type="none"/>
-                    </a:lnT>
-                    <a:lnB cap="flat" cmpd="sng" w="38100">
-                      <a:solidFill>
-                        <a:schemeClr val="lt1"/>
-                      </a:solidFill>
-                      <a:prstDash val="solid"/>
-                      <a:round/>
-                      <a:headEnd len="sm" w="sm" type="none"/>
-                      <a:tailEnd len="sm" w="sm" type="none"/>
-                    </a:lnB>
-                    <a:solidFill>
-                      <a:schemeClr val="lt2"/>
-                    </a:solidFill>
-                  </a:tcPr>
-                </a:tc>
-                <a:tc>
-                  <a:txBody>
-                    <a:bodyPr/>
-                    <a:lstStyle/>
-                    <a:p>
-                      <a:pPr indent="0" lvl="0" marL="0" rtl="0" algn="ctr">
-                        <a:spcBef>
-                          <a:spcPts val="0"/>
-                        </a:spcBef>
-                        <a:spcAft>
-                          <a:spcPts val="0"/>
-                        </a:spcAft>
-                        <a:buNone/>
-                      </a:pPr>
-                      <a:r>
-                        <a:rPr b="1" lang="en" sz="1200">
-                          <a:solidFill>
-                            <a:schemeClr val="lt1"/>
-                          </a:solidFill>
-                        </a:rPr>
-                        <a:t>AMOS-UE</a:t>
-                      </a:r>
-                      <a:br>
-                        <a:rPr b="1" lang="en" sz="1200">
-                          <a:solidFill>
-                            <a:schemeClr val="lt1"/>
-                          </a:solidFill>
-                        </a:rPr>
-                      </a:br>
-                      <a:r>
-                        <a:rPr b="1" lang="en" sz="1200">
-                          <a:solidFill>
-                            <a:schemeClr val="lt1"/>
-                          </a:solidFill>
-                        </a:rPr>
-                        <a:t>(Team Meeting)</a:t>
-                      </a:r>
-                      <a:endParaRPr b="1" sz="1200">
                         <a:solidFill>
                           <a:schemeClr val="lt1"/>
                         </a:solidFill>
@@ -16651,7 +16653,102 @@
                             <a:schemeClr val="lt1"/>
                           </a:solidFill>
                         </a:rPr>
-                        <a:t>COACH-VL</a:t>
+                        <a:t>Exercise</a:t>
+                      </a:r>
+                      <a:endParaRPr b="1">
+                        <a:solidFill>
+                          <a:schemeClr val="lt1"/>
+                        </a:solidFill>
+                      </a:endParaRPr>
+                    </a:p>
+                    <a:p>
+                      <a:pPr indent="0" lvl="0" marL="0" rtl="0" algn="ctr">
+                        <a:spcBef>
+                          <a:spcPts val="0"/>
+                        </a:spcBef>
+                        <a:spcAft>
+                          <a:spcPts val="0"/>
+                        </a:spcAft>
+                        <a:buNone/>
+                      </a:pPr>
+                      <a:r>
+                        <a:rPr b="1" lang="en">
+                          <a:solidFill>
+                            <a:schemeClr val="lt1"/>
+                          </a:solidFill>
+                        </a:rPr>
+                        <a:t>(team meeting)</a:t>
+                      </a:r>
+                      <a:endParaRPr b="1">
+                        <a:solidFill>
+                          <a:schemeClr val="lt1"/>
+                        </a:solidFill>
+                      </a:endParaRPr>
+                    </a:p>
+                  </a:txBody>
+                  <a:tcPr marT="91425" marB="91425" marR="91425" marL="91425" anchor="ctr">
+                    <a:lnL cap="flat" cmpd="sng" w="38100">
+                      <a:solidFill>
+                        <a:schemeClr val="lt1"/>
+                      </a:solidFill>
+                      <a:prstDash val="solid"/>
+                      <a:round/>
+                      <a:headEnd len="sm" w="sm" type="none"/>
+                      <a:tailEnd len="sm" w="sm" type="none"/>
+                    </a:lnL>
+                    <a:lnR cap="flat" cmpd="sng" w="38100">
+                      <a:solidFill>
+                        <a:schemeClr val="lt1"/>
+                      </a:solidFill>
+                      <a:prstDash val="solid"/>
+                      <a:round/>
+                      <a:headEnd len="sm" w="sm" type="none"/>
+                      <a:tailEnd len="sm" w="sm" type="none"/>
+                    </a:lnR>
+                    <a:lnT cap="flat" cmpd="sng" w="38100">
+                      <a:solidFill>
+                        <a:schemeClr val="lt1"/>
+                      </a:solidFill>
+                      <a:prstDash val="solid"/>
+                      <a:round/>
+                      <a:headEnd len="sm" w="sm" type="none"/>
+                      <a:tailEnd len="sm" w="sm" type="none"/>
+                    </a:lnT>
+                    <a:lnB cap="flat" cmpd="sng" w="38100">
+                      <a:solidFill>
+                        <a:schemeClr val="lt1"/>
+                      </a:solidFill>
+                      <a:prstDash val="solid"/>
+                      <a:round/>
+                      <a:headEnd len="sm" w="sm" type="none"/>
+                      <a:tailEnd len="sm" w="sm" type="none"/>
+                    </a:lnB>
+                    <a:solidFill>
+                      <a:schemeClr val="lt2"/>
+                    </a:solidFill>
+                  </a:tcPr>
+                </a:tc>
+                <a:tc>
+                  <a:txBody>
+                    <a:bodyPr/>
+                    <a:lstStyle/>
+                    <a:p>
+                      <a:pPr indent="0" lvl="0" marL="0" rtl="0" algn="ctr">
+                        <a:spcBef>
+                          <a:spcPts val="0"/>
+                        </a:spcBef>
+                        <a:spcAft>
+                          <a:spcPts val="0"/>
+                        </a:spcAft>
+                        <a:buNone/>
+                      </a:pPr>
+                      <a:r>
+                        <a:rPr b="1" lang="en">
+                          <a:solidFill>
+                            <a:schemeClr val="lt1"/>
+                          </a:solidFill>
+                        </a:rPr>
+                        <a:t>Lecture (COACH)</a:t>
                       </a:r>
                       <a:endParaRPr b="1">
                         <a:solidFill>
@@ -16774,7 +16871,7 @@
                   </a:tcPr>
                 </a:tc>
               </a:tr>
-              <a:tr h="548650">
+              <a:tr h="609600">
                 <a:tc rowSpan="4">
                   <a:txBody>
                     <a:bodyPr/>
@@ -17170,7 +17267,7 @@
                   </a:tcPr>
                 </a:tc>
               </a:tr>
-              <a:tr h="548650">
+              <a:tr h="609600">
                 <a:tc vMerge="1"/>
                 <a:tc>
                   <a:txBody>
@@ -17496,7 +17593,7 @@
                   </a:tcPr>
                 </a:tc>
               </a:tr>
-              <a:tr h="548650">
+              <a:tr h="609600">
                 <a:tc vMerge="1"/>
                 <a:tc>
                   <a:txBody>
@@ -17585,7 +17682,7 @@
                       </a:pPr>
                       <a:r>
                         <a:rPr b="1" lang="en"/>
-                        <a:t>+ </a:t>
+                        <a:t>-</a:t>
                       </a:r>
                       <a:endParaRPr b="1"/>
                     </a:p>
@@ -17826,7 +17923,7 @@
                   </a:tcPr>
                 </a:tc>
               </a:tr>
-              <a:tr h="548650">
+              <a:tr h="609600">
                 <a:tc vMerge="1"/>
                 <a:tc>
                   <a:txBody>
@@ -17915,7 +18012,7 @@
                       </a:pPr>
                       <a:r>
                         <a:rPr b="1" lang="en"/>
-                        <a:t>+</a:t>
+                        <a:t>-</a:t>
                       </a:r>
                       <a:endParaRPr b="1"/>
                     </a:p>
@@ -18261,7 +18358,7 @@
             </a:pPr>
             <a:r>
               <a:rPr lang="en"/>
-              <a:t>x	= applies</a:t>
+              <a:t>x = applies</a:t>
             </a:r>
             <a:endParaRPr/>
           </a:p>
@@ -18277,23 +18374,7 @@
             </a:pPr>
             <a:r>
               <a:rPr lang="en"/>
-              <a:t>–	= does not apply</a:t>
-            </a:r>
-            <a:endParaRPr/>
-          </a:p>
-          <a:p>
-            <a:pPr indent="0" lvl="0" marL="0" rtl="0" algn="l">
-              <a:spcBef>
-                <a:spcPts val="0"/>
-              </a:spcBef>
-              <a:spcAft>
-                <a:spcPts val="0"/>
-              </a:spcAft>
-              <a:buNone/>
-            </a:pPr>
-            <a:r>
-              <a:rPr lang="en"/>
-              <a:t>+	= previously taken</a:t>
+              <a:t>– = does not apply</a:t>
             </a:r>
             <a:endParaRPr/>
           </a:p>
@@ -18308,6 +18389,285 @@
 </file>
 
 <file path=ppt/theme/theme1.xml><?xml version="1.0" encoding="utf-8"?>
+<a:theme xmlns:a="http://schemas.openxmlformats.org/drawingml/2006/main" xmlns:r="http://schemas.openxmlformats.org/officeDocument/2006/relationships">
+  <a:themeElements>
+    <a:clrScheme name="Default">
+      <a:dk1>
+        <a:srgbClr val="000000"/>
+      </a:dk1>
+      <a:lt1>
+        <a:srgbClr val="FFFFFF"/>
+      </a:lt1>
+      <a:dk2>
+        <a:srgbClr val="158158"/>
+      </a:dk2>
+      <a:lt2>
+        <a:srgbClr val="F3F3F3"/>
+      </a:lt2>
+      <a:accent1>
+        <a:srgbClr val="058DC7"/>
+      </a:accent1>
+      <a:accent2>
+        <a:srgbClr val="50B432"/>
+      </a:accent2>
+      <a:accent3>
+        <a:srgbClr val="ED561B"/>
+      </a:accent3>
+      <a:accent4>
+        <a:srgbClr val="EDEF00"/>
+      </a:accent4>
+      <a:accent5>
+        <a:srgbClr val="24CBE5"/>
+      </a:accent5>
+      <a:accent6>
+        <a:srgbClr val="64E572"/>
+      </a:accent6>
+      <a:hlink>
+        <a:srgbClr val="2200CC"/>
+      </a:hlink>
+      <a:folHlink>
+        <a:srgbClr val="551A8B"/>
+      </a:folHlink>
+    </a:clrScheme>
+    <a:fontScheme name="Office">
+      <a:majorFont>
+        <a:latin typeface="Arial"/>
+        <a:ea typeface=""/>
+        <a:cs typeface=""/>
+        <a:font script="Jpan" typeface="ＭＳ Ｐゴシック"/>
+        <a:font script="Hang" typeface="맑은 고딕"/>
+        <a:font script="Hans" typeface="宋体"/>
+        <a:font script="Hant" typeface="新細明體"/>
+        <a:font script="Arab" typeface="Times New Roman"/>
+        <a:font script="Hebr" typeface="Times New Roman"/>
+        <a:font script="Thai" typeface="Angsana New"/>
+        <a:font script="Ethi" typeface="Nyala"/>
+        <a:font script="Beng" typeface="Vrinda"/>
+        <a:font script="Gujr" typeface="Shruti"/>
+        <a:font script="Khmr" typeface="MoolBoran"/>
+        <a:font script="Knda" typeface="Tunga"/>
+        <a:font script="Guru" typeface="Raavi"/>
+        <a:font script="Cans" typeface="Euphemia"/>
+        <a:font script="Cher" typeface="Plantagenet Cherokee"/>
+        <a:font script="Yiii" typeface="Microsoft Yi Baiti"/>
+        <a:font script="Tibt" typeface="Microsoft Himalaya"/>
+        <a:font script="Thaa" typeface="MV Boli"/>
+        <a:font script="Deva" typeface="Mangal"/>
+        <a:font script="Telu" typeface="Gautami"/>
+        <a:font script="Taml" typeface="Latha"/>
+        <a:font script="Syrc" typeface="Estrangelo Edessa"/>
+        <a:font script="Orya" typeface="Kalinga"/>
+        <a:font script="Mlym" typeface="Kartika"/>
+        <a:font script="Laoo" typeface="DokChampa"/>
+        <a:font script="Sinh" typeface="Iskoola Pota"/>
+        <a:font script="Mong" typeface="Mongolian Baiti"/>
+        <a:font script="Viet" typeface="Times New Roman"/>
+        <a:font script="Uigh" typeface="Microsoft Uighur"/>
+        <a:font script="Geor" typeface="Sylfaen"/>
+      </a:majorFont>
+      <a:minorFont>
+        <a:latin typeface="Arial"/>
+        <a:ea typeface=""/>
+        <a:cs typeface=""/>
+        <a:font script="Jpan" typeface="ＭＳ Ｐゴシック"/>
+        <a:font script="Hang" typeface="맑은 고딕"/>
+        <a:font script="Hans" typeface="宋体"/>
+        <a:font script="Hant" typeface="新細明體"/>
+        <a:font script="Arab" typeface="Arial"/>
+        <a:font script="Hebr" typeface="Arial"/>
+        <a:font script="Thai" typeface="Cordia New"/>
+        <a:font script="Ethi" typeface="Nyala"/>
+        <a:font script="Beng" typeface="Vrinda"/>
+        <a:font script="Gujr" typeface="Shruti"/>
+        <a:font script="Khmr" typeface="DaunPenh"/>
+        <a:font script="Knda" typeface="Tunga"/>
+        <a:font script="Guru" typeface="Raavi"/>
+        <a:font script="Cans" typeface="Euphemia"/>
+        <a:font script="Cher" typeface="Plantagenet Cherokee"/>
+        <a:font script="Yiii" typeface="Microsoft Yi Baiti"/>
+        <a:font script="Tibt" typeface="Microsoft Himalaya"/>
+        <a:font script="Thaa" typeface="MV Boli"/>
+        <a:font script="Deva" typeface="Mangal"/>
+        <a:font script="Telu" typeface="Gautami"/>
+        <a:font script="Taml" typeface="Latha"/>
+        <a:font script="Syrc" typeface="Estrangelo Edessa"/>
+        <a:font script="Orya" typeface="Kalinga"/>
+        <a:font script="Mlym" typeface="Kartika"/>
+        <a:font script="Laoo" typeface="DokChampa"/>
+        <a:font script="Sinh" typeface="Iskoola Pota"/>
+        <a:font script="Mong" typeface="Mongolian Baiti"/>
+        <a:font script="Viet" typeface="Arial"/>
+        <a:font script="Uigh" typeface="Microsoft Uighur"/>
+        <a:font script="Geor" typeface="Sylfaen"/>
+      </a:minorFont>
+    </a:fontScheme>
+    <a:fmtScheme name="Office">
+      <a:fillStyleLst>
+        <a:solidFill>
+          <a:schemeClr val="phClr"/>
+        </a:solidFill>
+        <a:gradFill rotWithShape="1">
+          <a:gsLst>
+            <a:gs pos="0">
+              <a:schemeClr val="phClr">
+                <a:tint val="50000"/>
+                <a:satMod val="300000"/>
+              </a:schemeClr>
+            </a:gs>
+            <a:gs pos="35000">
+              <a:schemeClr val="phClr">
+                <a:tint val="37000"/>
+                <a:satMod val="300000"/>
+              </a:schemeClr>
+            </a:gs>
+            <a:gs pos="100000">
+              <a:schemeClr val="phClr">
+                <a:tint val="15000"/>
+                <a:satMod val="350000"/>
+              </a:schemeClr>
+            </a:gs>
+          </a:gsLst>
+          <a:lin ang="16200000" scaled="1"/>
+        </a:gradFill>
+        <a:gradFill rotWithShape="1">
+          <a:gsLst>
+            <a:gs pos="0">
+              <a:schemeClr val="phClr">
+                <a:tint val="100000"/>
+                <a:shade val="100000"/>
+                <a:satMod val="130000"/>
+              </a:schemeClr>
+            </a:gs>
+            <a:gs pos="100000">
+              <a:schemeClr val="phClr">
+                <a:tint val="50000"/>
+                <a:shade val="100000"/>
+                <a:satMod val="350000"/>
+              </a:schemeClr>
+            </a:gs>
+          </a:gsLst>
+          <a:lin ang="16200000" scaled="0"/>
+        </a:gradFill>
+      </a:fillStyleLst>
+      <a:lnStyleLst>
+        <a:ln w="9525" cap="flat" cmpd="sng" algn="ctr">
+          <a:solidFill>
+            <a:schemeClr val="phClr">
+              <a:shade val="95000"/>
+              <a:satMod val="105000"/>
+            </a:schemeClr>
+          </a:solidFill>
+          <a:prstDash val="solid"/>
+        </a:ln>
+        <a:ln w="25400" cap="flat" cmpd="sng" algn="ctr">
+          <a:solidFill>
+            <a:schemeClr val="phClr"/>
+          </a:solidFill>
+          <a:prstDash val="solid"/>
+        </a:ln>
+        <a:ln w="38100" cap="flat" cmpd="sng" algn="ctr">
+          <a:solidFill>
+            <a:schemeClr val="phClr"/>
+          </a:solidFill>
+          <a:prstDash val="solid"/>
+        </a:ln>
+      </a:lnStyleLst>
+      <a:effectStyleLst>
+        <a:effectStyle>
+          <a:effectLst>
+            <a:outerShdw blurRad="40000" dist="20000" dir="5400000" rotWithShape="0">
+              <a:srgbClr val="000000">
+                <a:alpha val="38000"/>
+              </a:srgbClr>
+            </a:outerShdw>
+          </a:effectLst>
+        </a:effectStyle>
+        <a:effectStyle>
+          <a:effectLst>
+            <a:outerShdw blurRad="40000" dist="23000" dir="5400000" rotWithShape="0">
+              <a:srgbClr val="000000">
+                <a:alpha val="35000"/>
+              </a:srgbClr>
+            </a:outerShdw>
+          </a:effectLst>
+        </a:effectStyle>
+        <a:effectStyle>
+          <a:effectLst>
+            <a:outerShdw blurRad="40000" dist="23000" dir="5400000" rotWithShape="0">
+              <a:srgbClr val="000000">
+                <a:alpha val="35000"/>
+              </a:srgbClr>
+            </a:outerShdw>
+          </a:effectLst>
+          <a:scene3d>
+            <a:camera prst="orthographicFront">
+              <a:rot lat="0" lon="0" rev="0"/>
+            </a:camera>
+            <a:lightRig rig="threePt" dir="t">
+              <a:rot lat="0" lon="0" rev="1200000"/>
+            </a:lightRig>
+          </a:scene3d>
+          <a:sp3d>
+            <a:bevelT w="63500" h="25400"/>
+          </a:sp3d>
+        </a:effectStyle>
+      </a:effectStyleLst>
+      <a:bgFillStyleLst>
+        <a:solidFill>
+          <a:schemeClr val="phClr"/>
+        </a:solidFill>
+        <a:gradFill rotWithShape="1">
+          <a:gsLst>
+            <a:gs pos="0">
+              <a:schemeClr val="phClr">
+                <a:tint val="40000"/>
+                <a:satMod val="350000"/>
+              </a:schemeClr>
+            </a:gs>
+            <a:gs pos="40000">
+              <a:schemeClr val="phClr">
+                <a:tint val="45000"/>
+                <a:shade val="99000"/>
+                <a:satMod val="350000"/>
+              </a:schemeClr>
+            </a:gs>
+            <a:gs pos="100000">
+              <a:schemeClr val="phClr">
+                <a:shade val="20000"/>
+                <a:satMod val="255000"/>
+              </a:schemeClr>
+            </a:gs>
+          </a:gsLst>
+          <a:path path="circle">
+            <a:fillToRect l="50000" t="-80000" r="50000" b="180000"/>
+          </a:path>
+        </a:gradFill>
+        <a:gradFill rotWithShape="1">
+          <a:gsLst>
+            <a:gs pos="0">
+              <a:schemeClr val="phClr">
+                <a:tint val="80000"/>
+                <a:satMod val="300000"/>
+              </a:schemeClr>
+            </a:gs>
+            <a:gs pos="100000">
+              <a:schemeClr val="phClr">
+                <a:shade val="30000"/>
+                <a:satMod val="200000"/>
+              </a:schemeClr>
+            </a:gs>
+          </a:gsLst>
+          <a:path path="circle">
+            <a:fillToRect l="50000" t="50000" r="50000" b="50000"/>
+          </a:path>
+        </a:gradFill>
+      </a:bgFillStyleLst>
+    </a:fmtScheme>
+  </a:themeElements>
+</a:theme>
+</file>
+
+<file path=ppt/theme/theme2.xml><?xml version="1.0" encoding="utf-8"?>
 <a:theme xmlns:a="http://schemas.openxmlformats.org/drawingml/2006/main" xmlns:r="http://schemas.openxmlformats.org/officeDocument/2006/relationships" name="AMOS Slides Template">
   <a:themeElements>
     <a:clrScheme name="Simple Light">
@@ -18584,283 +18944,4 @@
     </a:fmtScheme>
   </a:themeElements>
 </a:theme>
-</file>
-
-<file path=ppt/theme/theme2.xml><?xml version="1.0" encoding="utf-8"?>
-<a:theme xmlns:a="http://schemas.openxmlformats.org/drawingml/2006/main" xmlns:r="http://schemas.openxmlformats.org/officeDocument/2006/relationships">
-  <a:themeElements>
-    <a:clrScheme name="Default">
-      <a:dk1>
-        <a:srgbClr val="000000"/>
-      </a:dk1>
-      <a:lt1>
-        <a:srgbClr val="FFFFFF"/>
-      </a:lt1>
-      <a:dk2>
-        <a:srgbClr val="158158"/>
-      </a:dk2>
-      <a:lt2>
-        <a:srgbClr val="F3F3F3"/>
-      </a:lt2>
-      <a:accent1>
-        <a:srgbClr val="058DC7"/>
-      </a:accent1>
-      <a:accent2>
-        <a:srgbClr val="50B432"/>
-      </a:accent2>
-      <a:accent3>
-        <a:srgbClr val="ED561B"/>
-      </a:accent3>
-      <a:accent4>
-        <a:srgbClr val="EDEF00"/>
-      </a:accent4>
-      <a:accent5>
-        <a:srgbClr val="24CBE5"/>
-      </a:accent5>
-      <a:accent6>
-        <a:srgbClr val="64E572"/>
-      </a:accent6>
-      <a:hlink>
-        <a:srgbClr val="2200CC"/>
-      </a:hlink>
-      <a:folHlink>
-        <a:srgbClr val="551A8B"/>
-      </a:folHlink>
-    </a:clrScheme>
-    <a:fontScheme name="Office">
-      <a:majorFont>
-        <a:latin typeface="Arial"/>
-        <a:ea typeface=""/>
-        <a:cs typeface=""/>
-        <a:font script="Jpan" typeface="ＭＳ Ｐゴシック"/>
-        <a:font script="Hang" typeface="맑은 고딕"/>
-        <a:font script="Hans" typeface="宋体"/>
-        <a:font script="Hant" typeface="新細明體"/>
-        <a:font script="Arab" typeface="Times New Roman"/>
-        <a:font script="Hebr" typeface="Times New Roman"/>
-        <a:font script="Thai" typeface="Angsana New"/>
-        <a:font script="Ethi" typeface="Nyala"/>
-        <a:font script="Beng" typeface="Vrinda"/>
-        <a:font script="Gujr" typeface="Shruti"/>
-        <a:font script="Khmr" typeface="MoolBoran"/>
-        <a:font script="Knda" typeface="Tunga"/>
-        <a:font script="Guru" typeface="Raavi"/>
-        <a:font script="Cans" typeface="Euphemia"/>
-        <a:font script="Cher" typeface="Plantagenet Cherokee"/>
-        <a:font script="Yiii" typeface="Microsoft Yi Baiti"/>
-        <a:font script="Tibt" typeface="Microsoft Himalaya"/>
-        <a:font script="Thaa" typeface="MV Boli"/>
-        <a:font script="Deva" typeface="Mangal"/>
-        <a:font script="Telu" typeface="Gautami"/>
-        <a:font script="Taml" typeface="Latha"/>
-        <a:font script="Syrc" typeface="Estrangelo Edessa"/>
-        <a:font script="Orya" typeface="Kalinga"/>
-        <a:font script="Mlym" typeface="Kartika"/>
-        <a:font script="Laoo" typeface="DokChampa"/>
-        <a:font script="Sinh" typeface="Iskoola Pota"/>
-        <a:font script="Mong" typeface="Mongolian Baiti"/>
-        <a:font script="Viet" typeface="Times New Roman"/>
-        <a:font script="Uigh" typeface="Microsoft Uighur"/>
-        <a:font script="Geor" typeface="Sylfaen"/>
-      </a:majorFont>
-      <a:minorFont>
-        <a:latin typeface="Arial"/>
-        <a:ea typeface=""/>
-        <a:cs typeface=""/>
-        <a:font script="Jpan" typeface="ＭＳ Ｐゴシック"/>
-        <a:font script="Hang" typeface="맑은 고딕"/>
-        <a:font script="Hans" typeface="宋体"/>
-        <a:font script="Hant" typeface="新細明體"/>
-        <a:font script="Arab" typeface="Arial"/>
-        <a:font script="Hebr" typeface="Arial"/>
-        <a:font script="Thai" typeface="Cordia New"/>
-        <a:font script="Ethi" typeface="Nyala"/>
-        <a:font script="Beng" typeface="Vrinda"/>
-        <a:font script="Gujr" typeface="Shruti"/>
-        <a:font script="Khmr" typeface="DaunPenh"/>
-        <a:font script="Knda" typeface="Tunga"/>
-        <a:font script="Guru" typeface="Raavi"/>
-        <a:font script="Cans" typeface="Euphemia"/>
-        <a:font script="Cher" typeface="Plantagenet Cherokee"/>
-        <a:font script="Yiii" typeface="Microsoft Yi Baiti"/>
-        <a:font script="Tibt" typeface="Microsoft Himalaya"/>
-        <a:font script="Thaa" typeface="MV Boli"/>
-        <a:font script="Deva" typeface="Mangal"/>
-        <a:font script="Telu" typeface="Gautami"/>
-        <a:font script="Taml" typeface="Latha"/>
-        <a:font script="Syrc" typeface="Estrangelo Edessa"/>
-        <a:font script="Orya" typeface="Kalinga"/>
-        <a:font script="Mlym" typeface="Kartika"/>
-        <a:font script="Laoo" typeface="DokChampa"/>
-        <a:font script="Sinh" typeface="Iskoola Pota"/>
-        <a:font script="Mong" typeface="Mongolian Baiti"/>
-        <a:font script="Viet" typeface="Arial"/>
-        <a:font script="Uigh" typeface="Microsoft Uighur"/>
-        <a:font script="Geor" typeface="Sylfaen"/>
-      </a:minorFont>
-    </a:fontScheme>
-    <a:fmtScheme name="Office">
-      <a:fillStyleLst>
-        <a:solidFill>
-          <a:schemeClr val="phClr"/>
-        </a:solidFill>
-        <a:gradFill rotWithShape="1">
-          <a:gsLst>
-            <a:gs pos="0">
-              <a:schemeClr val="phClr">
-                <a:tint val="50000"/>
-                <a:satMod val="300000"/>
-              </a:schemeClr>
-            </a:gs>
-            <a:gs pos="35000">
-              <a:schemeClr val="phClr">
-                <a:tint val="37000"/>
-                <a:satMod val="300000"/>
-              </a:schemeClr>
-            </a:gs>
-            <a:gs pos="100000">
-              <a:schemeClr val="phClr">
-                <a:tint val="15000"/>
-                <a:satMod val="350000"/>
-              </a:schemeClr>
-            </a:gs>
-          </a:gsLst>
-          <a:lin ang="16200000" scaled="1"/>
-        </a:gradFill>
-        <a:gradFill rotWithShape="1">
-          <a:gsLst>
-            <a:gs pos="0">
-              <a:schemeClr val="phClr">
-                <a:tint val="100000"/>
-                <a:shade val="100000"/>
-                <a:satMod val="130000"/>
-              </a:schemeClr>
-            </a:gs>
-            <a:gs pos="100000">
-              <a:schemeClr val="phClr">
-                <a:tint val="50000"/>
-                <a:shade val="100000"/>
-                <a:satMod val="350000"/>
-              </a:schemeClr>
-            </a:gs>
-          </a:gsLst>
-          <a:lin ang="16200000" scaled="0"/>
-        </a:gradFill>
-      </a:fillStyleLst>
-      <a:lnStyleLst>
-        <a:ln w="9525" cap="flat" cmpd="sng" algn="ctr">
-          <a:solidFill>
-            <a:schemeClr val="phClr">
-              <a:shade val="95000"/>
-              <a:satMod val="105000"/>
-            </a:schemeClr>
-          </a:solidFill>
-          <a:prstDash val="solid"/>
-        </a:ln>
-        <a:ln w="25400" cap="flat" cmpd="sng" algn="ctr">
-          <a:solidFill>
-            <a:schemeClr val="phClr"/>
-          </a:solidFill>
-          <a:prstDash val="solid"/>
-        </a:ln>
-        <a:ln w="38100" cap="flat" cmpd="sng" algn="ctr">
-          <a:solidFill>
-            <a:schemeClr val="phClr"/>
-          </a:solidFill>
-          <a:prstDash val="solid"/>
-        </a:ln>
-      </a:lnStyleLst>
-      <a:effectStyleLst>
-        <a:effectStyle>
-          <a:effectLst>
-            <a:outerShdw blurRad="40000" dist="20000" dir="5400000" rotWithShape="0">
-              <a:srgbClr val="000000">
-                <a:alpha val="38000"/>
-              </a:srgbClr>
-            </a:outerShdw>
-          </a:effectLst>
-        </a:effectStyle>
-        <a:effectStyle>
-          <a:effectLst>
-            <a:outerShdw blurRad="40000" dist="23000" dir="5400000" rotWithShape="0">
-              <a:srgbClr val="000000">
-                <a:alpha val="35000"/>
-              </a:srgbClr>
-            </a:outerShdw>
-          </a:effectLst>
-        </a:effectStyle>
-        <a:effectStyle>
-          <a:effectLst>
-            <a:outerShdw blurRad="40000" dist="23000" dir="5400000" rotWithShape="0">
-              <a:srgbClr val="000000">
-                <a:alpha val="35000"/>
-              </a:srgbClr>
-            </a:outerShdw>
-          </a:effectLst>
-          <a:scene3d>
-            <a:camera prst="orthographicFront">
-              <a:rot lat="0" lon="0" rev="0"/>
-            </a:camera>
-            <a:lightRig rig="threePt" dir="t">
-              <a:rot lat="0" lon="0" rev="1200000"/>
-            </a:lightRig>
-          </a:scene3d>
-          <a:sp3d>
-            <a:bevelT w="63500" h="25400"/>
-          </a:sp3d>
-        </a:effectStyle>
-      </a:effectStyleLst>
-      <a:bgFillStyleLst>
-        <a:solidFill>
-          <a:schemeClr val="phClr"/>
-        </a:solidFill>
-        <a:gradFill rotWithShape="1">
-          <a:gsLst>
-            <a:gs pos="0">
-              <a:schemeClr val="phClr">
-                <a:tint val="40000"/>
-                <a:satMod val="350000"/>
-              </a:schemeClr>
-            </a:gs>
-            <a:gs pos="40000">
-              <a:schemeClr val="phClr">
-                <a:tint val="45000"/>
-                <a:shade val="99000"/>
-                <a:satMod val="350000"/>
-              </a:schemeClr>
-            </a:gs>
-            <a:gs pos="100000">
-              <a:schemeClr val="phClr">
-                <a:shade val="20000"/>
-                <a:satMod val="255000"/>
-              </a:schemeClr>
-            </a:gs>
-          </a:gsLst>
-          <a:path path="circle">
-            <a:fillToRect l="50000" t="-80000" r="50000" b="180000"/>
-          </a:path>
-        </a:gradFill>
-        <a:gradFill rotWithShape="1">
-          <a:gsLst>
-            <a:gs pos="0">
-              <a:schemeClr val="phClr">
-                <a:tint val="80000"/>
-                <a:satMod val="300000"/>
-              </a:schemeClr>
-            </a:gs>
-            <a:gs pos="100000">
-              <a:schemeClr val="phClr">
-                <a:shade val="30000"/>
-                <a:satMod val="200000"/>
-              </a:schemeClr>
-            </a:gs>
-          </a:gsLst>
-          <a:path path="circle">
-            <a:fillToRect l="50000" t="50000" r="50000" b="50000"/>
-          </a:path>
-        </a:gradFill>
-      </a:bgFillStyleLst>
-    </a:fmtScheme>
-  </a:themeElements>
-</a:theme>
 </file>
</xml_diff>

<commit_message>
Updates during summer 2024
</commit_message>
<xml_diff>
--- a/Lecture slides/AMOS A01 - Introduction.pptx
+++ b/Lecture slides/AMOS A01 - Introduction.pptx
@@ -6982,7 +6982,7 @@
             <a:tbl>
               <a:tblPr>
                 <a:noFill/>
-                <a:tableStyleId>{DCED1977-A5B3-4D7E-A579-3D5628B4235B}</a:tableStyleId>
+                <a:tableStyleId>{136BB66C-A47B-48A4-BC35-58527592F523}</a:tableStyleId>
               </a:tblPr>
               <a:tblGrid>
                 <a:gridCol w="1432550"/>
@@ -10841,6 +10841,22 @@
             </a:r>
             <a:endParaRPr/>
           </a:p>
+          <a:p>
+            <a:pPr indent="0" lvl="0" marL="0" rtl="0" algn="l">
+              <a:spcBef>
+                <a:spcPts val="1200"/>
+              </a:spcBef>
+              <a:spcAft>
+                <a:spcPts val="1200"/>
+              </a:spcAft>
+              <a:buNone/>
+            </a:pPr>
+            <a:r>
+              <a:rPr lang="en"/>
+              <a:t>All work is due by the next team meeting, unless stated otherwise</a:t>
+            </a:r>
+            <a:endParaRPr/>
+          </a:p>
         </p:txBody>
       </p:sp>
       <p:sp>
@@ -12953,7 +12969,7 @@
             <a:tbl>
               <a:tblPr>
                 <a:noFill/>
-                <a:tableStyleId>{DCED1977-A5B3-4D7E-A579-3D5628B4235B}</a:tableStyleId>
+                <a:tableStyleId>{136BB66C-A47B-48A4-BC35-58527592F523}</a:tableStyleId>
               </a:tblPr>
               <a:tblGrid>
                 <a:gridCol w="2148850"/>
@@ -16996,7 +17012,7 @@
             <a:tbl>
               <a:tblPr>
                 <a:noFill/>
-                <a:tableStyleId>{DCED1977-A5B3-4D7E-A579-3D5628B4235B}</a:tableStyleId>
+                <a:tableStyleId>{136BB66C-A47B-48A4-BC35-58527592F523}</a:tableStyleId>
               </a:tblPr>
               <a:tblGrid>
                 <a:gridCol w="1432550"/>
@@ -19118,6 +19134,285 @@
 </file>
 
 <file path=ppt/theme/theme1.xml><?xml version="1.0" encoding="utf-8"?>
+<a:theme xmlns:a="http://schemas.openxmlformats.org/drawingml/2006/main" xmlns:r="http://schemas.openxmlformats.org/officeDocument/2006/relationships">
+  <a:themeElements>
+    <a:clrScheme name="Default">
+      <a:dk1>
+        <a:srgbClr val="000000"/>
+      </a:dk1>
+      <a:lt1>
+        <a:srgbClr val="FFFFFF"/>
+      </a:lt1>
+      <a:dk2>
+        <a:srgbClr val="158158"/>
+      </a:dk2>
+      <a:lt2>
+        <a:srgbClr val="F3F3F3"/>
+      </a:lt2>
+      <a:accent1>
+        <a:srgbClr val="058DC7"/>
+      </a:accent1>
+      <a:accent2>
+        <a:srgbClr val="50B432"/>
+      </a:accent2>
+      <a:accent3>
+        <a:srgbClr val="ED561B"/>
+      </a:accent3>
+      <a:accent4>
+        <a:srgbClr val="EDEF00"/>
+      </a:accent4>
+      <a:accent5>
+        <a:srgbClr val="24CBE5"/>
+      </a:accent5>
+      <a:accent6>
+        <a:srgbClr val="64E572"/>
+      </a:accent6>
+      <a:hlink>
+        <a:srgbClr val="2200CC"/>
+      </a:hlink>
+      <a:folHlink>
+        <a:srgbClr val="551A8B"/>
+      </a:folHlink>
+    </a:clrScheme>
+    <a:fontScheme name="Office">
+      <a:majorFont>
+        <a:latin typeface="Arial"/>
+        <a:ea typeface=""/>
+        <a:cs typeface=""/>
+        <a:font script="Jpan" typeface="ＭＳ Ｐゴシック"/>
+        <a:font script="Hang" typeface="맑은 고딕"/>
+        <a:font script="Hans" typeface="宋体"/>
+        <a:font script="Hant" typeface="新細明體"/>
+        <a:font script="Arab" typeface="Times New Roman"/>
+        <a:font script="Hebr" typeface="Times New Roman"/>
+        <a:font script="Thai" typeface="Angsana New"/>
+        <a:font script="Ethi" typeface="Nyala"/>
+        <a:font script="Beng" typeface="Vrinda"/>
+        <a:font script="Gujr" typeface="Shruti"/>
+        <a:font script="Khmr" typeface="MoolBoran"/>
+        <a:font script="Knda" typeface="Tunga"/>
+        <a:font script="Guru" typeface="Raavi"/>
+        <a:font script="Cans" typeface="Euphemia"/>
+        <a:font script="Cher" typeface="Plantagenet Cherokee"/>
+        <a:font script="Yiii" typeface="Microsoft Yi Baiti"/>
+        <a:font script="Tibt" typeface="Microsoft Himalaya"/>
+        <a:font script="Thaa" typeface="MV Boli"/>
+        <a:font script="Deva" typeface="Mangal"/>
+        <a:font script="Telu" typeface="Gautami"/>
+        <a:font script="Taml" typeface="Latha"/>
+        <a:font script="Syrc" typeface="Estrangelo Edessa"/>
+        <a:font script="Orya" typeface="Kalinga"/>
+        <a:font script="Mlym" typeface="Kartika"/>
+        <a:font script="Laoo" typeface="DokChampa"/>
+        <a:font script="Sinh" typeface="Iskoola Pota"/>
+        <a:font script="Mong" typeface="Mongolian Baiti"/>
+        <a:font script="Viet" typeface="Times New Roman"/>
+        <a:font script="Uigh" typeface="Microsoft Uighur"/>
+        <a:font script="Geor" typeface="Sylfaen"/>
+      </a:majorFont>
+      <a:minorFont>
+        <a:latin typeface="Arial"/>
+        <a:ea typeface=""/>
+        <a:cs typeface=""/>
+        <a:font script="Jpan" typeface="ＭＳ Ｐゴシック"/>
+        <a:font script="Hang" typeface="맑은 고딕"/>
+        <a:font script="Hans" typeface="宋体"/>
+        <a:font script="Hant" typeface="新細明體"/>
+        <a:font script="Arab" typeface="Arial"/>
+        <a:font script="Hebr" typeface="Arial"/>
+        <a:font script="Thai" typeface="Cordia New"/>
+        <a:font script="Ethi" typeface="Nyala"/>
+        <a:font script="Beng" typeface="Vrinda"/>
+        <a:font script="Gujr" typeface="Shruti"/>
+        <a:font script="Khmr" typeface="DaunPenh"/>
+        <a:font script="Knda" typeface="Tunga"/>
+        <a:font script="Guru" typeface="Raavi"/>
+        <a:font script="Cans" typeface="Euphemia"/>
+        <a:font script="Cher" typeface="Plantagenet Cherokee"/>
+        <a:font script="Yiii" typeface="Microsoft Yi Baiti"/>
+        <a:font script="Tibt" typeface="Microsoft Himalaya"/>
+        <a:font script="Thaa" typeface="MV Boli"/>
+        <a:font script="Deva" typeface="Mangal"/>
+        <a:font script="Telu" typeface="Gautami"/>
+        <a:font script="Taml" typeface="Latha"/>
+        <a:font script="Syrc" typeface="Estrangelo Edessa"/>
+        <a:font script="Orya" typeface="Kalinga"/>
+        <a:font script="Mlym" typeface="Kartika"/>
+        <a:font script="Laoo" typeface="DokChampa"/>
+        <a:font script="Sinh" typeface="Iskoola Pota"/>
+        <a:font script="Mong" typeface="Mongolian Baiti"/>
+        <a:font script="Viet" typeface="Arial"/>
+        <a:font script="Uigh" typeface="Microsoft Uighur"/>
+        <a:font script="Geor" typeface="Sylfaen"/>
+      </a:minorFont>
+    </a:fontScheme>
+    <a:fmtScheme name="Office">
+      <a:fillStyleLst>
+        <a:solidFill>
+          <a:schemeClr val="phClr"/>
+        </a:solidFill>
+        <a:gradFill rotWithShape="1">
+          <a:gsLst>
+            <a:gs pos="0">
+              <a:schemeClr val="phClr">
+                <a:tint val="50000"/>
+                <a:satMod val="300000"/>
+              </a:schemeClr>
+            </a:gs>
+            <a:gs pos="35000">
+              <a:schemeClr val="phClr">
+                <a:tint val="37000"/>
+                <a:satMod val="300000"/>
+              </a:schemeClr>
+            </a:gs>
+            <a:gs pos="100000">
+              <a:schemeClr val="phClr">
+                <a:tint val="15000"/>
+                <a:satMod val="350000"/>
+              </a:schemeClr>
+            </a:gs>
+          </a:gsLst>
+          <a:lin ang="16200000" scaled="1"/>
+        </a:gradFill>
+        <a:gradFill rotWithShape="1">
+          <a:gsLst>
+            <a:gs pos="0">
+              <a:schemeClr val="phClr">
+                <a:tint val="100000"/>
+                <a:shade val="100000"/>
+                <a:satMod val="130000"/>
+              </a:schemeClr>
+            </a:gs>
+            <a:gs pos="100000">
+              <a:schemeClr val="phClr">
+                <a:tint val="50000"/>
+                <a:shade val="100000"/>
+                <a:satMod val="350000"/>
+              </a:schemeClr>
+            </a:gs>
+          </a:gsLst>
+          <a:lin ang="16200000" scaled="0"/>
+        </a:gradFill>
+      </a:fillStyleLst>
+      <a:lnStyleLst>
+        <a:ln w="9525" cap="flat" cmpd="sng" algn="ctr">
+          <a:solidFill>
+            <a:schemeClr val="phClr">
+              <a:shade val="95000"/>
+              <a:satMod val="105000"/>
+            </a:schemeClr>
+          </a:solidFill>
+          <a:prstDash val="solid"/>
+        </a:ln>
+        <a:ln w="25400" cap="flat" cmpd="sng" algn="ctr">
+          <a:solidFill>
+            <a:schemeClr val="phClr"/>
+          </a:solidFill>
+          <a:prstDash val="solid"/>
+        </a:ln>
+        <a:ln w="38100" cap="flat" cmpd="sng" algn="ctr">
+          <a:solidFill>
+            <a:schemeClr val="phClr"/>
+          </a:solidFill>
+          <a:prstDash val="solid"/>
+        </a:ln>
+      </a:lnStyleLst>
+      <a:effectStyleLst>
+        <a:effectStyle>
+          <a:effectLst>
+            <a:outerShdw blurRad="40000" dist="20000" dir="5400000" rotWithShape="0">
+              <a:srgbClr val="000000">
+                <a:alpha val="38000"/>
+              </a:srgbClr>
+            </a:outerShdw>
+          </a:effectLst>
+        </a:effectStyle>
+        <a:effectStyle>
+          <a:effectLst>
+            <a:outerShdw blurRad="40000" dist="23000" dir="5400000" rotWithShape="0">
+              <a:srgbClr val="000000">
+                <a:alpha val="35000"/>
+              </a:srgbClr>
+            </a:outerShdw>
+          </a:effectLst>
+        </a:effectStyle>
+        <a:effectStyle>
+          <a:effectLst>
+            <a:outerShdw blurRad="40000" dist="23000" dir="5400000" rotWithShape="0">
+              <a:srgbClr val="000000">
+                <a:alpha val="35000"/>
+              </a:srgbClr>
+            </a:outerShdw>
+          </a:effectLst>
+          <a:scene3d>
+            <a:camera prst="orthographicFront">
+              <a:rot lat="0" lon="0" rev="0"/>
+            </a:camera>
+            <a:lightRig rig="threePt" dir="t">
+              <a:rot lat="0" lon="0" rev="1200000"/>
+            </a:lightRig>
+          </a:scene3d>
+          <a:sp3d>
+            <a:bevelT w="63500" h="25400"/>
+          </a:sp3d>
+        </a:effectStyle>
+      </a:effectStyleLst>
+      <a:bgFillStyleLst>
+        <a:solidFill>
+          <a:schemeClr val="phClr"/>
+        </a:solidFill>
+        <a:gradFill rotWithShape="1">
+          <a:gsLst>
+            <a:gs pos="0">
+              <a:schemeClr val="phClr">
+                <a:tint val="40000"/>
+                <a:satMod val="350000"/>
+              </a:schemeClr>
+            </a:gs>
+            <a:gs pos="40000">
+              <a:schemeClr val="phClr">
+                <a:tint val="45000"/>
+                <a:shade val="99000"/>
+                <a:satMod val="350000"/>
+              </a:schemeClr>
+            </a:gs>
+            <a:gs pos="100000">
+              <a:schemeClr val="phClr">
+                <a:shade val="20000"/>
+                <a:satMod val="255000"/>
+              </a:schemeClr>
+            </a:gs>
+          </a:gsLst>
+          <a:path path="circle">
+            <a:fillToRect l="50000" t="-80000" r="50000" b="180000"/>
+          </a:path>
+        </a:gradFill>
+        <a:gradFill rotWithShape="1">
+          <a:gsLst>
+            <a:gs pos="0">
+              <a:schemeClr val="phClr">
+                <a:tint val="80000"/>
+                <a:satMod val="300000"/>
+              </a:schemeClr>
+            </a:gs>
+            <a:gs pos="100000">
+              <a:schemeClr val="phClr">
+                <a:shade val="30000"/>
+                <a:satMod val="200000"/>
+              </a:schemeClr>
+            </a:gs>
+          </a:gsLst>
+          <a:path path="circle">
+            <a:fillToRect l="50000" t="50000" r="50000" b="50000"/>
+          </a:path>
+        </a:gradFill>
+      </a:bgFillStyleLst>
+    </a:fmtScheme>
+  </a:themeElements>
+</a:theme>
+</file>
+
+<file path=ppt/theme/theme2.xml><?xml version="1.0" encoding="utf-8"?>
 <a:theme xmlns:a="http://schemas.openxmlformats.org/drawingml/2006/main" xmlns:r="http://schemas.openxmlformats.org/officeDocument/2006/relationships" name="AMOS Slides Template">
   <a:themeElements>
     <a:clrScheme name="Simple Light">
@@ -19394,283 +19689,4 @@
     </a:fmtScheme>
   </a:themeElements>
 </a:theme>
-</file>
-
-<file path=ppt/theme/theme2.xml><?xml version="1.0" encoding="utf-8"?>
-<a:theme xmlns:a="http://schemas.openxmlformats.org/drawingml/2006/main" xmlns:r="http://schemas.openxmlformats.org/officeDocument/2006/relationships">
-  <a:themeElements>
-    <a:clrScheme name="Default">
-      <a:dk1>
-        <a:srgbClr val="000000"/>
-      </a:dk1>
-      <a:lt1>
-        <a:srgbClr val="FFFFFF"/>
-      </a:lt1>
-      <a:dk2>
-        <a:srgbClr val="158158"/>
-      </a:dk2>
-      <a:lt2>
-        <a:srgbClr val="F3F3F3"/>
-      </a:lt2>
-      <a:accent1>
-        <a:srgbClr val="058DC7"/>
-      </a:accent1>
-      <a:accent2>
-        <a:srgbClr val="50B432"/>
-      </a:accent2>
-      <a:accent3>
-        <a:srgbClr val="ED561B"/>
-      </a:accent3>
-      <a:accent4>
-        <a:srgbClr val="EDEF00"/>
-      </a:accent4>
-      <a:accent5>
-        <a:srgbClr val="24CBE5"/>
-      </a:accent5>
-      <a:accent6>
-        <a:srgbClr val="64E572"/>
-      </a:accent6>
-      <a:hlink>
-        <a:srgbClr val="2200CC"/>
-      </a:hlink>
-      <a:folHlink>
-        <a:srgbClr val="551A8B"/>
-      </a:folHlink>
-    </a:clrScheme>
-    <a:fontScheme name="Office">
-      <a:majorFont>
-        <a:latin typeface="Arial"/>
-        <a:ea typeface=""/>
-        <a:cs typeface=""/>
-        <a:font script="Jpan" typeface="ＭＳ Ｐゴシック"/>
-        <a:font script="Hang" typeface="맑은 고딕"/>
-        <a:font script="Hans" typeface="宋体"/>
-        <a:font script="Hant" typeface="新細明體"/>
-        <a:font script="Arab" typeface="Times New Roman"/>
-        <a:font script="Hebr" typeface="Times New Roman"/>
-        <a:font script="Thai" typeface="Angsana New"/>
-        <a:font script="Ethi" typeface="Nyala"/>
-        <a:font script="Beng" typeface="Vrinda"/>
-        <a:font script="Gujr" typeface="Shruti"/>
-        <a:font script="Khmr" typeface="MoolBoran"/>
-        <a:font script="Knda" typeface="Tunga"/>
-        <a:font script="Guru" typeface="Raavi"/>
-        <a:font script="Cans" typeface="Euphemia"/>
-        <a:font script="Cher" typeface="Plantagenet Cherokee"/>
-        <a:font script="Yiii" typeface="Microsoft Yi Baiti"/>
-        <a:font script="Tibt" typeface="Microsoft Himalaya"/>
-        <a:font script="Thaa" typeface="MV Boli"/>
-        <a:font script="Deva" typeface="Mangal"/>
-        <a:font script="Telu" typeface="Gautami"/>
-        <a:font script="Taml" typeface="Latha"/>
-        <a:font script="Syrc" typeface="Estrangelo Edessa"/>
-        <a:font script="Orya" typeface="Kalinga"/>
-        <a:font script="Mlym" typeface="Kartika"/>
-        <a:font script="Laoo" typeface="DokChampa"/>
-        <a:font script="Sinh" typeface="Iskoola Pota"/>
-        <a:font script="Mong" typeface="Mongolian Baiti"/>
-        <a:font script="Viet" typeface="Times New Roman"/>
-        <a:font script="Uigh" typeface="Microsoft Uighur"/>
-        <a:font script="Geor" typeface="Sylfaen"/>
-      </a:majorFont>
-      <a:minorFont>
-        <a:latin typeface="Arial"/>
-        <a:ea typeface=""/>
-        <a:cs typeface=""/>
-        <a:font script="Jpan" typeface="ＭＳ Ｐゴシック"/>
-        <a:font script="Hang" typeface="맑은 고딕"/>
-        <a:font script="Hans" typeface="宋体"/>
-        <a:font script="Hant" typeface="新細明體"/>
-        <a:font script="Arab" typeface="Arial"/>
-        <a:font script="Hebr" typeface="Arial"/>
-        <a:font script="Thai" typeface="Cordia New"/>
-        <a:font script="Ethi" typeface="Nyala"/>
-        <a:font script="Beng" typeface="Vrinda"/>
-        <a:font script="Gujr" typeface="Shruti"/>
-        <a:font script="Khmr" typeface="DaunPenh"/>
-        <a:font script="Knda" typeface="Tunga"/>
-        <a:font script="Guru" typeface="Raavi"/>
-        <a:font script="Cans" typeface="Euphemia"/>
-        <a:font script="Cher" typeface="Plantagenet Cherokee"/>
-        <a:font script="Yiii" typeface="Microsoft Yi Baiti"/>
-        <a:font script="Tibt" typeface="Microsoft Himalaya"/>
-        <a:font script="Thaa" typeface="MV Boli"/>
-        <a:font script="Deva" typeface="Mangal"/>
-        <a:font script="Telu" typeface="Gautami"/>
-        <a:font script="Taml" typeface="Latha"/>
-        <a:font script="Syrc" typeface="Estrangelo Edessa"/>
-        <a:font script="Orya" typeface="Kalinga"/>
-        <a:font script="Mlym" typeface="Kartika"/>
-        <a:font script="Laoo" typeface="DokChampa"/>
-        <a:font script="Sinh" typeface="Iskoola Pota"/>
-        <a:font script="Mong" typeface="Mongolian Baiti"/>
-        <a:font script="Viet" typeface="Arial"/>
-        <a:font script="Uigh" typeface="Microsoft Uighur"/>
-        <a:font script="Geor" typeface="Sylfaen"/>
-      </a:minorFont>
-    </a:fontScheme>
-    <a:fmtScheme name="Office">
-      <a:fillStyleLst>
-        <a:solidFill>
-          <a:schemeClr val="phClr"/>
-        </a:solidFill>
-        <a:gradFill rotWithShape="1">
-          <a:gsLst>
-            <a:gs pos="0">
-              <a:schemeClr val="phClr">
-                <a:tint val="50000"/>
-                <a:satMod val="300000"/>
-              </a:schemeClr>
-            </a:gs>
-            <a:gs pos="35000">
-              <a:schemeClr val="phClr">
-                <a:tint val="37000"/>
-                <a:satMod val="300000"/>
-              </a:schemeClr>
-            </a:gs>
-            <a:gs pos="100000">
-              <a:schemeClr val="phClr">
-                <a:tint val="15000"/>
-                <a:satMod val="350000"/>
-              </a:schemeClr>
-            </a:gs>
-          </a:gsLst>
-          <a:lin ang="16200000" scaled="1"/>
-        </a:gradFill>
-        <a:gradFill rotWithShape="1">
-          <a:gsLst>
-            <a:gs pos="0">
-              <a:schemeClr val="phClr">
-                <a:tint val="100000"/>
-                <a:shade val="100000"/>
-                <a:satMod val="130000"/>
-              </a:schemeClr>
-            </a:gs>
-            <a:gs pos="100000">
-              <a:schemeClr val="phClr">
-                <a:tint val="50000"/>
-                <a:shade val="100000"/>
-                <a:satMod val="350000"/>
-              </a:schemeClr>
-            </a:gs>
-          </a:gsLst>
-          <a:lin ang="16200000" scaled="0"/>
-        </a:gradFill>
-      </a:fillStyleLst>
-      <a:lnStyleLst>
-        <a:ln w="9525" cap="flat" cmpd="sng" algn="ctr">
-          <a:solidFill>
-            <a:schemeClr val="phClr">
-              <a:shade val="95000"/>
-              <a:satMod val="105000"/>
-            </a:schemeClr>
-          </a:solidFill>
-          <a:prstDash val="solid"/>
-        </a:ln>
-        <a:ln w="25400" cap="flat" cmpd="sng" algn="ctr">
-          <a:solidFill>
-            <a:schemeClr val="phClr"/>
-          </a:solidFill>
-          <a:prstDash val="solid"/>
-        </a:ln>
-        <a:ln w="38100" cap="flat" cmpd="sng" algn="ctr">
-          <a:solidFill>
-            <a:schemeClr val="phClr"/>
-          </a:solidFill>
-          <a:prstDash val="solid"/>
-        </a:ln>
-      </a:lnStyleLst>
-      <a:effectStyleLst>
-        <a:effectStyle>
-          <a:effectLst>
-            <a:outerShdw blurRad="40000" dist="20000" dir="5400000" rotWithShape="0">
-              <a:srgbClr val="000000">
-                <a:alpha val="38000"/>
-              </a:srgbClr>
-            </a:outerShdw>
-          </a:effectLst>
-        </a:effectStyle>
-        <a:effectStyle>
-          <a:effectLst>
-            <a:outerShdw blurRad="40000" dist="23000" dir="5400000" rotWithShape="0">
-              <a:srgbClr val="000000">
-                <a:alpha val="35000"/>
-              </a:srgbClr>
-            </a:outerShdw>
-          </a:effectLst>
-        </a:effectStyle>
-        <a:effectStyle>
-          <a:effectLst>
-            <a:outerShdw blurRad="40000" dist="23000" dir="5400000" rotWithShape="0">
-              <a:srgbClr val="000000">
-                <a:alpha val="35000"/>
-              </a:srgbClr>
-            </a:outerShdw>
-          </a:effectLst>
-          <a:scene3d>
-            <a:camera prst="orthographicFront">
-              <a:rot lat="0" lon="0" rev="0"/>
-            </a:camera>
-            <a:lightRig rig="threePt" dir="t">
-              <a:rot lat="0" lon="0" rev="1200000"/>
-            </a:lightRig>
-          </a:scene3d>
-          <a:sp3d>
-            <a:bevelT w="63500" h="25400"/>
-          </a:sp3d>
-        </a:effectStyle>
-      </a:effectStyleLst>
-      <a:bgFillStyleLst>
-        <a:solidFill>
-          <a:schemeClr val="phClr"/>
-        </a:solidFill>
-        <a:gradFill rotWithShape="1">
-          <a:gsLst>
-            <a:gs pos="0">
-              <a:schemeClr val="phClr">
-                <a:tint val="40000"/>
-                <a:satMod val="350000"/>
-              </a:schemeClr>
-            </a:gs>
-            <a:gs pos="40000">
-              <a:schemeClr val="phClr">
-                <a:tint val="45000"/>
-                <a:shade val="99000"/>
-                <a:satMod val="350000"/>
-              </a:schemeClr>
-            </a:gs>
-            <a:gs pos="100000">
-              <a:schemeClr val="phClr">
-                <a:shade val="20000"/>
-                <a:satMod val="255000"/>
-              </a:schemeClr>
-            </a:gs>
-          </a:gsLst>
-          <a:path path="circle">
-            <a:fillToRect l="50000" t="-80000" r="50000" b="180000"/>
-          </a:path>
-        </a:gradFill>
-        <a:gradFill rotWithShape="1">
-          <a:gsLst>
-            <a:gs pos="0">
-              <a:schemeClr val="phClr">
-                <a:tint val="80000"/>
-                <a:satMod val="300000"/>
-              </a:schemeClr>
-            </a:gs>
-            <a:gs pos="100000">
-              <a:schemeClr val="phClr">
-                <a:shade val="30000"/>
-                <a:satMod val="200000"/>
-              </a:schemeClr>
-            </a:gs>
-          </a:gsLst>
-          <a:path path="circle">
-            <a:fillToRect l="50000" t="50000" r="50000" b="50000"/>
-          </a:path>
-        </a:gradFill>
-      </a:bgFillStyleLst>
-    </a:fmtScheme>
-  </a:themeElements>
-</a:theme>
 </file>
</xml_diff>

<commit_message>
Final version for AMOS summer 2024
</commit_message>
<xml_diff>
--- a/Lecture slides/AMOS A01 - Introduction.pptx
+++ b/Lecture slides/AMOS A01 - Introduction.pptx
@@ -6982,7 +6982,7 @@
             <a:tbl>
               <a:tblPr>
                 <a:noFill/>
-                <a:tableStyleId>{136BB66C-A47B-48A4-BC35-58527592F523}</a:tableStyleId>
+                <a:tableStyleId>{4E41C2CF-B01E-4BB1-A75A-17B50FCDE213}</a:tableStyleId>
               </a:tblPr>
               <a:tblGrid>
                 <a:gridCol w="1432550"/>
@@ -10221,6 +10221,23 @@
             </a:pPr>
             <a:r>
               <a:rPr lang="en"/>
+              <a:t>Coach workshop</a:t>
+            </a:r>
+            <a:endParaRPr/>
+          </a:p>
+          <a:p>
+            <a:pPr indent="-342900" lvl="0" marL="457200" rtl="0" algn="l">
+              <a:spcBef>
+                <a:spcPts val="0"/>
+              </a:spcBef>
+              <a:spcAft>
+                <a:spcPts val="0"/>
+              </a:spcAft>
+              <a:buSzPts val="1800"/>
+              <a:buChar char="●"/>
+            </a:pPr>
+            <a:r>
+              <a:rPr lang="en"/>
               <a:t>AMOS demo day</a:t>
             </a:r>
             <a:endParaRPr/>
@@ -12077,7 +12094,7 @@
         <p:spPr>
           <a:xfrm>
             <a:off x="274320" y="914400"/>
-            <a:ext cx="8595300" cy="4114800"/>
+            <a:ext cx="8595300" cy="3657600"/>
           </a:xfrm>
           <a:prstGeom prst="rect">
             <a:avLst/>
@@ -12089,7 +12106,7 @@
           </a:bodyPr>
           <a:lstStyle/>
           <a:p>
-            <a:pPr indent="0" lvl="0" marL="0" marR="0" rtl="0" algn="l">
+            <a:pPr indent="0" lvl="0" marL="731520" marR="731520" rtl="0" algn="l">
               <a:spcBef>
                 <a:spcPts val="0"/>
               </a:spcBef>
@@ -12969,7 +12986,7 @@
             <a:tbl>
               <a:tblPr>
                 <a:noFill/>
-                <a:tableStyleId>{136BB66C-A47B-48A4-BC35-58527592F523}</a:tableStyleId>
+                <a:tableStyleId>{4E41C2CF-B01E-4BB1-A75A-17B50FCDE213}</a:tableStyleId>
               </a:tblPr>
               <a:tblGrid>
                 <a:gridCol w="2148850"/>
@@ -17012,7 +17029,7 @@
             <a:tbl>
               <a:tblPr>
                 <a:noFill/>
-                <a:tableStyleId>{136BB66C-A47B-48A4-BC35-58527592F523}</a:tableStyleId>
+                <a:tableStyleId>{4E41C2CF-B01E-4BB1-A75A-17B50FCDE213}</a:tableStyleId>
               </a:tblPr>
               <a:tblGrid>
                 <a:gridCol w="1432550"/>
@@ -19134,6 +19151,285 @@
 </file>
 
 <file path=ppt/theme/theme1.xml><?xml version="1.0" encoding="utf-8"?>
+<a:theme xmlns:a="http://schemas.openxmlformats.org/drawingml/2006/main" xmlns:r="http://schemas.openxmlformats.org/officeDocument/2006/relationships" name="AMOS Slides Template">
+  <a:themeElements>
+    <a:clrScheme name="Simple Light">
+      <a:dk1>
+        <a:srgbClr val="000000"/>
+      </a:dk1>
+      <a:lt1>
+        <a:srgbClr val="FFFFFF"/>
+      </a:lt1>
+      <a:dk2>
+        <a:srgbClr val="404040"/>
+      </a:dk2>
+      <a:lt2>
+        <a:srgbClr val="808080"/>
+      </a:lt2>
+      <a:accent1>
+        <a:srgbClr val="D0D0D0"/>
+      </a:accent1>
+      <a:accent2>
+        <a:srgbClr val="4169E1"/>
+      </a:accent2>
+      <a:accent3>
+        <a:srgbClr val="D50D01"/>
+      </a:accent3>
+      <a:accent4>
+        <a:srgbClr val="FEB612"/>
+      </a:accent4>
+      <a:accent5>
+        <a:srgbClr val="4CAF50"/>
+      </a:accent5>
+      <a:accent6>
+        <a:srgbClr val="8E44AD"/>
+      </a:accent6>
+      <a:hlink>
+        <a:srgbClr val="34A3C5"/>
+      </a:hlink>
+      <a:folHlink>
+        <a:srgbClr val="0097A7"/>
+      </a:folHlink>
+    </a:clrScheme>
+    <a:fontScheme name="Office">
+      <a:majorFont>
+        <a:latin typeface="Arial"/>
+        <a:ea typeface=""/>
+        <a:cs typeface=""/>
+        <a:font script="Jpan" typeface="ＭＳ Ｐゴシック"/>
+        <a:font script="Hang" typeface="맑은 고딕"/>
+        <a:font script="Hans" typeface="宋体"/>
+        <a:font script="Hant" typeface="新細明體"/>
+        <a:font script="Arab" typeface="Times New Roman"/>
+        <a:font script="Hebr" typeface="Times New Roman"/>
+        <a:font script="Thai" typeface="Angsana New"/>
+        <a:font script="Ethi" typeface="Nyala"/>
+        <a:font script="Beng" typeface="Vrinda"/>
+        <a:font script="Gujr" typeface="Shruti"/>
+        <a:font script="Khmr" typeface="MoolBoran"/>
+        <a:font script="Knda" typeface="Tunga"/>
+        <a:font script="Guru" typeface="Raavi"/>
+        <a:font script="Cans" typeface="Euphemia"/>
+        <a:font script="Cher" typeface="Plantagenet Cherokee"/>
+        <a:font script="Yiii" typeface="Microsoft Yi Baiti"/>
+        <a:font script="Tibt" typeface="Microsoft Himalaya"/>
+        <a:font script="Thaa" typeface="MV Boli"/>
+        <a:font script="Deva" typeface="Mangal"/>
+        <a:font script="Telu" typeface="Gautami"/>
+        <a:font script="Taml" typeface="Latha"/>
+        <a:font script="Syrc" typeface="Estrangelo Edessa"/>
+        <a:font script="Orya" typeface="Kalinga"/>
+        <a:font script="Mlym" typeface="Kartika"/>
+        <a:font script="Laoo" typeface="DokChampa"/>
+        <a:font script="Sinh" typeface="Iskoola Pota"/>
+        <a:font script="Mong" typeface="Mongolian Baiti"/>
+        <a:font script="Viet" typeface="Times New Roman"/>
+        <a:font script="Uigh" typeface="Microsoft Uighur"/>
+        <a:font script="Geor" typeface="Sylfaen"/>
+      </a:majorFont>
+      <a:minorFont>
+        <a:latin typeface="Arial"/>
+        <a:ea typeface=""/>
+        <a:cs typeface=""/>
+        <a:font script="Jpan" typeface="ＭＳ Ｐゴシック"/>
+        <a:font script="Hang" typeface="맑은 고딕"/>
+        <a:font script="Hans" typeface="宋体"/>
+        <a:font script="Hant" typeface="新細明體"/>
+        <a:font script="Arab" typeface="Arial"/>
+        <a:font script="Hebr" typeface="Arial"/>
+        <a:font script="Thai" typeface="Cordia New"/>
+        <a:font script="Ethi" typeface="Nyala"/>
+        <a:font script="Beng" typeface="Vrinda"/>
+        <a:font script="Gujr" typeface="Shruti"/>
+        <a:font script="Khmr" typeface="DaunPenh"/>
+        <a:font script="Knda" typeface="Tunga"/>
+        <a:font script="Guru" typeface="Raavi"/>
+        <a:font script="Cans" typeface="Euphemia"/>
+        <a:font script="Cher" typeface="Plantagenet Cherokee"/>
+        <a:font script="Yiii" typeface="Microsoft Yi Baiti"/>
+        <a:font script="Tibt" typeface="Microsoft Himalaya"/>
+        <a:font script="Thaa" typeface="MV Boli"/>
+        <a:font script="Deva" typeface="Mangal"/>
+        <a:font script="Telu" typeface="Gautami"/>
+        <a:font script="Taml" typeface="Latha"/>
+        <a:font script="Syrc" typeface="Estrangelo Edessa"/>
+        <a:font script="Orya" typeface="Kalinga"/>
+        <a:font script="Mlym" typeface="Kartika"/>
+        <a:font script="Laoo" typeface="DokChampa"/>
+        <a:font script="Sinh" typeface="Iskoola Pota"/>
+        <a:font script="Mong" typeface="Mongolian Baiti"/>
+        <a:font script="Viet" typeface="Arial"/>
+        <a:font script="Uigh" typeface="Microsoft Uighur"/>
+        <a:font script="Geor" typeface="Sylfaen"/>
+      </a:minorFont>
+    </a:fontScheme>
+    <a:fmtScheme name="Office">
+      <a:fillStyleLst>
+        <a:solidFill>
+          <a:schemeClr val="phClr"/>
+        </a:solidFill>
+        <a:gradFill rotWithShape="1">
+          <a:gsLst>
+            <a:gs pos="0">
+              <a:schemeClr val="phClr">
+                <a:tint val="50000"/>
+                <a:satMod val="300000"/>
+              </a:schemeClr>
+            </a:gs>
+            <a:gs pos="35000">
+              <a:schemeClr val="phClr">
+                <a:tint val="37000"/>
+                <a:satMod val="300000"/>
+              </a:schemeClr>
+            </a:gs>
+            <a:gs pos="100000">
+              <a:schemeClr val="phClr">
+                <a:tint val="15000"/>
+                <a:satMod val="350000"/>
+              </a:schemeClr>
+            </a:gs>
+          </a:gsLst>
+          <a:lin ang="16200000" scaled="1"/>
+        </a:gradFill>
+        <a:gradFill rotWithShape="1">
+          <a:gsLst>
+            <a:gs pos="0">
+              <a:schemeClr val="phClr">
+                <a:tint val="100000"/>
+                <a:shade val="100000"/>
+                <a:satMod val="130000"/>
+              </a:schemeClr>
+            </a:gs>
+            <a:gs pos="100000">
+              <a:schemeClr val="phClr">
+                <a:tint val="50000"/>
+                <a:shade val="100000"/>
+                <a:satMod val="350000"/>
+              </a:schemeClr>
+            </a:gs>
+          </a:gsLst>
+          <a:lin ang="16200000" scaled="0"/>
+        </a:gradFill>
+      </a:fillStyleLst>
+      <a:lnStyleLst>
+        <a:ln w="9525" cap="flat" cmpd="sng" algn="ctr">
+          <a:solidFill>
+            <a:schemeClr val="phClr">
+              <a:shade val="95000"/>
+              <a:satMod val="105000"/>
+            </a:schemeClr>
+          </a:solidFill>
+          <a:prstDash val="solid"/>
+        </a:ln>
+        <a:ln w="25400" cap="flat" cmpd="sng" algn="ctr">
+          <a:solidFill>
+            <a:schemeClr val="phClr"/>
+          </a:solidFill>
+          <a:prstDash val="solid"/>
+        </a:ln>
+        <a:ln w="38100" cap="flat" cmpd="sng" algn="ctr">
+          <a:solidFill>
+            <a:schemeClr val="phClr"/>
+          </a:solidFill>
+          <a:prstDash val="solid"/>
+        </a:ln>
+      </a:lnStyleLst>
+      <a:effectStyleLst>
+        <a:effectStyle>
+          <a:effectLst>
+            <a:outerShdw blurRad="40000" dist="20000" dir="5400000" rotWithShape="0">
+              <a:srgbClr val="000000">
+                <a:alpha val="38000"/>
+              </a:srgbClr>
+            </a:outerShdw>
+          </a:effectLst>
+        </a:effectStyle>
+        <a:effectStyle>
+          <a:effectLst>
+            <a:outerShdw blurRad="40000" dist="23000" dir="5400000" rotWithShape="0">
+              <a:srgbClr val="000000">
+                <a:alpha val="35000"/>
+              </a:srgbClr>
+            </a:outerShdw>
+          </a:effectLst>
+        </a:effectStyle>
+        <a:effectStyle>
+          <a:effectLst>
+            <a:outerShdw blurRad="40000" dist="23000" dir="5400000" rotWithShape="0">
+              <a:srgbClr val="000000">
+                <a:alpha val="35000"/>
+              </a:srgbClr>
+            </a:outerShdw>
+          </a:effectLst>
+          <a:scene3d>
+            <a:camera prst="orthographicFront">
+              <a:rot lat="0" lon="0" rev="0"/>
+            </a:camera>
+            <a:lightRig rig="threePt" dir="t">
+              <a:rot lat="0" lon="0" rev="1200000"/>
+            </a:lightRig>
+          </a:scene3d>
+          <a:sp3d>
+            <a:bevelT w="63500" h="25400"/>
+          </a:sp3d>
+        </a:effectStyle>
+      </a:effectStyleLst>
+      <a:bgFillStyleLst>
+        <a:solidFill>
+          <a:schemeClr val="phClr"/>
+        </a:solidFill>
+        <a:gradFill rotWithShape="1">
+          <a:gsLst>
+            <a:gs pos="0">
+              <a:schemeClr val="phClr">
+                <a:tint val="40000"/>
+                <a:satMod val="350000"/>
+              </a:schemeClr>
+            </a:gs>
+            <a:gs pos="40000">
+              <a:schemeClr val="phClr">
+                <a:tint val="45000"/>
+                <a:shade val="99000"/>
+                <a:satMod val="350000"/>
+              </a:schemeClr>
+            </a:gs>
+            <a:gs pos="100000">
+              <a:schemeClr val="phClr">
+                <a:shade val="20000"/>
+                <a:satMod val="255000"/>
+              </a:schemeClr>
+            </a:gs>
+          </a:gsLst>
+          <a:path path="circle">
+            <a:fillToRect l="50000" t="-80000" r="50000" b="180000"/>
+          </a:path>
+        </a:gradFill>
+        <a:gradFill rotWithShape="1">
+          <a:gsLst>
+            <a:gs pos="0">
+              <a:schemeClr val="phClr">
+                <a:tint val="80000"/>
+                <a:satMod val="300000"/>
+              </a:schemeClr>
+            </a:gs>
+            <a:gs pos="100000">
+              <a:schemeClr val="phClr">
+                <a:shade val="30000"/>
+                <a:satMod val="200000"/>
+              </a:schemeClr>
+            </a:gs>
+          </a:gsLst>
+          <a:path path="circle">
+            <a:fillToRect l="50000" t="50000" r="50000" b="50000"/>
+          </a:path>
+        </a:gradFill>
+      </a:bgFillStyleLst>
+    </a:fmtScheme>
+  </a:themeElements>
+</a:theme>
+</file>
+
+<file path=ppt/theme/theme2.xml><?xml version="1.0" encoding="utf-8"?>
 <a:theme xmlns:a="http://schemas.openxmlformats.org/drawingml/2006/main" xmlns:r="http://schemas.openxmlformats.org/officeDocument/2006/relationships">
   <a:themeElements>
     <a:clrScheme name="Default">
@@ -19410,283 +19706,4 @@
     </a:fmtScheme>
   </a:themeElements>
 </a:theme>
-</file>
-
-<file path=ppt/theme/theme2.xml><?xml version="1.0" encoding="utf-8"?>
-<a:theme xmlns:a="http://schemas.openxmlformats.org/drawingml/2006/main" xmlns:r="http://schemas.openxmlformats.org/officeDocument/2006/relationships" name="AMOS Slides Template">
-  <a:themeElements>
-    <a:clrScheme name="Simple Light">
-      <a:dk1>
-        <a:srgbClr val="000000"/>
-      </a:dk1>
-      <a:lt1>
-        <a:srgbClr val="FFFFFF"/>
-      </a:lt1>
-      <a:dk2>
-        <a:srgbClr val="404040"/>
-      </a:dk2>
-      <a:lt2>
-        <a:srgbClr val="808080"/>
-      </a:lt2>
-      <a:accent1>
-        <a:srgbClr val="D0D0D0"/>
-      </a:accent1>
-      <a:accent2>
-        <a:srgbClr val="4169E1"/>
-      </a:accent2>
-      <a:accent3>
-        <a:srgbClr val="D50D01"/>
-      </a:accent3>
-      <a:accent4>
-        <a:srgbClr val="FEB612"/>
-      </a:accent4>
-      <a:accent5>
-        <a:srgbClr val="4CAF50"/>
-      </a:accent5>
-      <a:accent6>
-        <a:srgbClr val="8E44AD"/>
-      </a:accent6>
-      <a:hlink>
-        <a:srgbClr val="34A3C5"/>
-      </a:hlink>
-      <a:folHlink>
-        <a:srgbClr val="0097A7"/>
-      </a:folHlink>
-    </a:clrScheme>
-    <a:fontScheme name="Office">
-      <a:majorFont>
-        <a:latin typeface="Arial"/>
-        <a:ea typeface=""/>
-        <a:cs typeface=""/>
-        <a:font script="Jpan" typeface="ＭＳ Ｐゴシック"/>
-        <a:font script="Hang" typeface="맑은 고딕"/>
-        <a:font script="Hans" typeface="宋体"/>
-        <a:font script="Hant" typeface="新細明體"/>
-        <a:font script="Arab" typeface="Times New Roman"/>
-        <a:font script="Hebr" typeface="Times New Roman"/>
-        <a:font script="Thai" typeface="Angsana New"/>
-        <a:font script="Ethi" typeface="Nyala"/>
-        <a:font script="Beng" typeface="Vrinda"/>
-        <a:font script="Gujr" typeface="Shruti"/>
-        <a:font script="Khmr" typeface="MoolBoran"/>
-        <a:font script="Knda" typeface="Tunga"/>
-        <a:font script="Guru" typeface="Raavi"/>
-        <a:font script="Cans" typeface="Euphemia"/>
-        <a:font script="Cher" typeface="Plantagenet Cherokee"/>
-        <a:font script="Yiii" typeface="Microsoft Yi Baiti"/>
-        <a:font script="Tibt" typeface="Microsoft Himalaya"/>
-        <a:font script="Thaa" typeface="MV Boli"/>
-        <a:font script="Deva" typeface="Mangal"/>
-        <a:font script="Telu" typeface="Gautami"/>
-        <a:font script="Taml" typeface="Latha"/>
-        <a:font script="Syrc" typeface="Estrangelo Edessa"/>
-        <a:font script="Orya" typeface="Kalinga"/>
-        <a:font script="Mlym" typeface="Kartika"/>
-        <a:font script="Laoo" typeface="DokChampa"/>
-        <a:font script="Sinh" typeface="Iskoola Pota"/>
-        <a:font script="Mong" typeface="Mongolian Baiti"/>
-        <a:font script="Viet" typeface="Times New Roman"/>
-        <a:font script="Uigh" typeface="Microsoft Uighur"/>
-        <a:font script="Geor" typeface="Sylfaen"/>
-      </a:majorFont>
-      <a:minorFont>
-        <a:latin typeface="Arial"/>
-        <a:ea typeface=""/>
-        <a:cs typeface=""/>
-        <a:font script="Jpan" typeface="ＭＳ Ｐゴシック"/>
-        <a:font script="Hang" typeface="맑은 고딕"/>
-        <a:font script="Hans" typeface="宋体"/>
-        <a:font script="Hant" typeface="新細明體"/>
-        <a:font script="Arab" typeface="Arial"/>
-        <a:font script="Hebr" typeface="Arial"/>
-        <a:font script="Thai" typeface="Cordia New"/>
-        <a:font script="Ethi" typeface="Nyala"/>
-        <a:font script="Beng" typeface="Vrinda"/>
-        <a:font script="Gujr" typeface="Shruti"/>
-        <a:font script="Khmr" typeface="DaunPenh"/>
-        <a:font script="Knda" typeface="Tunga"/>
-        <a:font script="Guru" typeface="Raavi"/>
-        <a:font script="Cans" typeface="Euphemia"/>
-        <a:font script="Cher" typeface="Plantagenet Cherokee"/>
-        <a:font script="Yiii" typeface="Microsoft Yi Baiti"/>
-        <a:font script="Tibt" typeface="Microsoft Himalaya"/>
-        <a:font script="Thaa" typeface="MV Boli"/>
-        <a:font script="Deva" typeface="Mangal"/>
-        <a:font script="Telu" typeface="Gautami"/>
-        <a:font script="Taml" typeface="Latha"/>
-        <a:font script="Syrc" typeface="Estrangelo Edessa"/>
-        <a:font script="Orya" typeface="Kalinga"/>
-        <a:font script="Mlym" typeface="Kartika"/>
-        <a:font script="Laoo" typeface="DokChampa"/>
-        <a:font script="Sinh" typeface="Iskoola Pota"/>
-        <a:font script="Mong" typeface="Mongolian Baiti"/>
-        <a:font script="Viet" typeface="Arial"/>
-        <a:font script="Uigh" typeface="Microsoft Uighur"/>
-        <a:font script="Geor" typeface="Sylfaen"/>
-      </a:minorFont>
-    </a:fontScheme>
-    <a:fmtScheme name="Office">
-      <a:fillStyleLst>
-        <a:solidFill>
-          <a:schemeClr val="phClr"/>
-        </a:solidFill>
-        <a:gradFill rotWithShape="1">
-          <a:gsLst>
-            <a:gs pos="0">
-              <a:schemeClr val="phClr">
-                <a:tint val="50000"/>
-                <a:satMod val="300000"/>
-              </a:schemeClr>
-            </a:gs>
-            <a:gs pos="35000">
-              <a:schemeClr val="phClr">
-                <a:tint val="37000"/>
-                <a:satMod val="300000"/>
-              </a:schemeClr>
-            </a:gs>
-            <a:gs pos="100000">
-              <a:schemeClr val="phClr">
-                <a:tint val="15000"/>
-                <a:satMod val="350000"/>
-              </a:schemeClr>
-            </a:gs>
-          </a:gsLst>
-          <a:lin ang="16200000" scaled="1"/>
-        </a:gradFill>
-        <a:gradFill rotWithShape="1">
-          <a:gsLst>
-            <a:gs pos="0">
-              <a:schemeClr val="phClr">
-                <a:tint val="100000"/>
-                <a:shade val="100000"/>
-                <a:satMod val="130000"/>
-              </a:schemeClr>
-            </a:gs>
-            <a:gs pos="100000">
-              <a:schemeClr val="phClr">
-                <a:tint val="50000"/>
-                <a:shade val="100000"/>
-                <a:satMod val="350000"/>
-              </a:schemeClr>
-            </a:gs>
-          </a:gsLst>
-          <a:lin ang="16200000" scaled="0"/>
-        </a:gradFill>
-      </a:fillStyleLst>
-      <a:lnStyleLst>
-        <a:ln w="9525" cap="flat" cmpd="sng" algn="ctr">
-          <a:solidFill>
-            <a:schemeClr val="phClr">
-              <a:shade val="95000"/>
-              <a:satMod val="105000"/>
-            </a:schemeClr>
-          </a:solidFill>
-          <a:prstDash val="solid"/>
-        </a:ln>
-        <a:ln w="25400" cap="flat" cmpd="sng" algn="ctr">
-          <a:solidFill>
-            <a:schemeClr val="phClr"/>
-          </a:solidFill>
-          <a:prstDash val="solid"/>
-        </a:ln>
-        <a:ln w="38100" cap="flat" cmpd="sng" algn="ctr">
-          <a:solidFill>
-            <a:schemeClr val="phClr"/>
-          </a:solidFill>
-          <a:prstDash val="solid"/>
-        </a:ln>
-      </a:lnStyleLst>
-      <a:effectStyleLst>
-        <a:effectStyle>
-          <a:effectLst>
-            <a:outerShdw blurRad="40000" dist="20000" dir="5400000" rotWithShape="0">
-              <a:srgbClr val="000000">
-                <a:alpha val="38000"/>
-              </a:srgbClr>
-            </a:outerShdw>
-          </a:effectLst>
-        </a:effectStyle>
-        <a:effectStyle>
-          <a:effectLst>
-            <a:outerShdw blurRad="40000" dist="23000" dir="5400000" rotWithShape="0">
-              <a:srgbClr val="000000">
-                <a:alpha val="35000"/>
-              </a:srgbClr>
-            </a:outerShdw>
-          </a:effectLst>
-        </a:effectStyle>
-        <a:effectStyle>
-          <a:effectLst>
-            <a:outerShdw blurRad="40000" dist="23000" dir="5400000" rotWithShape="0">
-              <a:srgbClr val="000000">
-                <a:alpha val="35000"/>
-              </a:srgbClr>
-            </a:outerShdw>
-          </a:effectLst>
-          <a:scene3d>
-            <a:camera prst="orthographicFront">
-              <a:rot lat="0" lon="0" rev="0"/>
-            </a:camera>
-            <a:lightRig rig="threePt" dir="t">
-              <a:rot lat="0" lon="0" rev="1200000"/>
-            </a:lightRig>
-          </a:scene3d>
-          <a:sp3d>
-            <a:bevelT w="63500" h="25400"/>
-          </a:sp3d>
-        </a:effectStyle>
-      </a:effectStyleLst>
-      <a:bgFillStyleLst>
-        <a:solidFill>
-          <a:schemeClr val="phClr"/>
-        </a:solidFill>
-        <a:gradFill rotWithShape="1">
-          <a:gsLst>
-            <a:gs pos="0">
-              <a:schemeClr val="phClr">
-                <a:tint val="40000"/>
-                <a:satMod val="350000"/>
-              </a:schemeClr>
-            </a:gs>
-            <a:gs pos="40000">
-              <a:schemeClr val="phClr">
-                <a:tint val="45000"/>
-                <a:shade val="99000"/>
-                <a:satMod val="350000"/>
-              </a:schemeClr>
-            </a:gs>
-            <a:gs pos="100000">
-              <a:schemeClr val="phClr">
-                <a:shade val="20000"/>
-                <a:satMod val="255000"/>
-              </a:schemeClr>
-            </a:gs>
-          </a:gsLst>
-          <a:path path="circle">
-            <a:fillToRect l="50000" t="-80000" r="50000" b="180000"/>
-          </a:path>
-        </a:gradFill>
-        <a:gradFill rotWithShape="1">
-          <a:gsLst>
-            <a:gs pos="0">
-              <a:schemeClr val="phClr">
-                <a:tint val="80000"/>
-                <a:satMod val="300000"/>
-              </a:schemeClr>
-            </a:gs>
-            <a:gs pos="100000">
-              <a:schemeClr val="phClr">
-                <a:shade val="30000"/>
-                <a:satMod val="200000"/>
-              </a:schemeClr>
-            </a:gs>
-          </a:gsLst>
-          <a:path path="circle">
-            <a:fillToRect l="50000" t="50000" r="50000" b="50000"/>
-          </a:path>
-        </a:gradFill>
-      </a:bgFillStyleLst>
-    </a:fmtScheme>
-  </a:themeElements>
-</a:theme>
 </file>
</xml_diff>

<commit_message>
Updated after B02 for B03
</commit_message>
<xml_diff>
--- a/Lecture slides/AMOS A01 - Introduction.pptx
+++ b/Lecture slides/AMOS A01 - Introduction.pptx
@@ -2204,7 +2204,7 @@
   <p:cSld>
     <p:spTree>
       <p:nvGrpSpPr>
-        <p:cNvPr id="193" name="Shape 193"/>
+        <p:cNvPr id="192" name="Shape 192"/>
         <p:cNvGrpSpPr/>
         <p:nvPr/>
       </p:nvGrpSpPr>
@@ -2218,7 +2218,7 @@
       </p:grpSpPr>
       <p:sp>
         <p:nvSpPr>
-          <p:cNvPr id="194" name="Google Shape;194;g23985d0d2d4_0_100:notes"/>
+          <p:cNvPr id="193" name="Google Shape;193;g23985d0d2d4_0_100:notes"/>
           <p:cNvSpPr/>
           <p:nvPr>
             <p:ph idx="2" type="sldImg"/>
@@ -2253,7 +2253,7 @@
       </p:sp>
       <p:sp>
         <p:nvSpPr>
-          <p:cNvPr id="195" name="Google Shape;195;g23985d0d2d4_0_100:notes"/>
+          <p:cNvPr id="194" name="Google Shape;194;g23985d0d2d4_0_100:notes"/>
           <p:cNvSpPr txBox="1"/>
           <p:nvPr>
             <p:ph idx="1" type="body"/>
@@ -2303,7 +2303,7 @@
   <p:cSld>
     <p:spTree>
       <p:nvGrpSpPr>
-        <p:cNvPr id="201" name="Shape 201"/>
+        <p:cNvPr id="200" name="Shape 200"/>
         <p:cNvGrpSpPr/>
         <p:nvPr/>
       </p:nvGrpSpPr>
@@ -2317,7 +2317,7 @@
       </p:grpSpPr>
       <p:sp>
         <p:nvSpPr>
-          <p:cNvPr id="202" name="Google Shape;202;g126320e9147_0_147:notes"/>
+          <p:cNvPr id="201" name="Google Shape;201;g126320e9147_0_147:notes"/>
           <p:cNvSpPr/>
           <p:nvPr>
             <p:ph idx="2" type="sldImg"/>
@@ -2352,7 +2352,7 @@
       </p:sp>
       <p:sp>
         <p:nvSpPr>
-          <p:cNvPr id="203" name="Google Shape;203;g126320e9147_0_147:notes"/>
+          <p:cNvPr id="202" name="Google Shape;202;g126320e9147_0_147:notes"/>
           <p:cNvSpPr txBox="1"/>
           <p:nvPr>
             <p:ph idx="1" type="body"/>
@@ -2402,7 +2402,7 @@
   <p:cSld>
     <p:spTree>
       <p:nvGrpSpPr>
-        <p:cNvPr id="209" name="Shape 209"/>
+        <p:cNvPr id="208" name="Shape 208"/>
         <p:cNvGrpSpPr/>
         <p:nvPr/>
       </p:nvGrpSpPr>
@@ -2416,7 +2416,7 @@
       </p:grpSpPr>
       <p:sp>
         <p:nvSpPr>
-          <p:cNvPr id="210" name="Google Shape;210;g126320e9147_0_94:notes"/>
+          <p:cNvPr id="209" name="Google Shape;209;g126320e9147_0_94:notes"/>
           <p:cNvSpPr/>
           <p:nvPr>
             <p:ph idx="2" type="sldImg"/>
@@ -2451,7 +2451,7 @@
       </p:sp>
       <p:sp>
         <p:nvSpPr>
-          <p:cNvPr id="211" name="Google Shape;211;g126320e9147_0_94:notes"/>
+          <p:cNvPr id="210" name="Google Shape;210;g126320e9147_0_94:notes"/>
           <p:cNvSpPr txBox="1"/>
           <p:nvPr>
             <p:ph idx="1" type="body"/>
@@ -2501,7 +2501,7 @@
   <p:cSld>
     <p:spTree>
       <p:nvGrpSpPr>
-        <p:cNvPr id="216" name="Shape 216"/>
+        <p:cNvPr id="215" name="Shape 215"/>
         <p:cNvGrpSpPr/>
         <p:nvPr/>
       </p:nvGrpSpPr>
@@ -2515,7 +2515,7 @@
       </p:grpSpPr>
       <p:sp>
         <p:nvSpPr>
-          <p:cNvPr id="217" name="Google Shape;217;g126320e9147_0_210:notes"/>
+          <p:cNvPr id="216" name="Google Shape;216;g126320e9147_0_210:notes"/>
           <p:cNvSpPr/>
           <p:nvPr>
             <p:ph idx="2" type="sldImg"/>
@@ -2550,7 +2550,7 @@
       </p:sp>
       <p:sp>
         <p:nvSpPr>
-          <p:cNvPr id="218" name="Google Shape;218;g126320e9147_0_210:notes"/>
+          <p:cNvPr id="217" name="Google Shape;217;g126320e9147_0_210:notes"/>
           <p:cNvSpPr txBox="1"/>
           <p:nvPr>
             <p:ph idx="1" type="body"/>
@@ -2600,7 +2600,7 @@
   <p:cSld>
     <p:spTree>
       <p:nvGrpSpPr>
-        <p:cNvPr id="223" name="Shape 223"/>
+        <p:cNvPr id="222" name="Shape 222"/>
         <p:cNvGrpSpPr/>
         <p:nvPr/>
       </p:nvGrpSpPr>
@@ -2614,7 +2614,7 @@
       </p:grpSpPr>
       <p:sp>
         <p:nvSpPr>
-          <p:cNvPr id="224" name="Google Shape;224;g126320e9147_0_223:notes"/>
+          <p:cNvPr id="223" name="Google Shape;223;g126320e9147_0_223:notes"/>
           <p:cNvSpPr/>
           <p:nvPr>
             <p:ph idx="2" type="sldImg"/>
@@ -2649,7 +2649,7 @@
       </p:sp>
       <p:sp>
         <p:nvSpPr>
-          <p:cNvPr id="225" name="Google Shape;225;g126320e9147_0_223:notes"/>
+          <p:cNvPr id="224" name="Google Shape;224;g126320e9147_0_223:notes"/>
           <p:cNvSpPr txBox="1"/>
           <p:nvPr>
             <p:ph idx="1" type="body"/>
@@ -2699,7 +2699,7 @@
   <p:cSld>
     <p:spTree>
       <p:nvGrpSpPr>
-        <p:cNvPr id="230" name="Shape 230"/>
+        <p:cNvPr id="229" name="Shape 229"/>
         <p:cNvGrpSpPr/>
         <p:nvPr/>
       </p:nvGrpSpPr>
@@ -2713,7 +2713,7 @@
       </p:grpSpPr>
       <p:sp>
         <p:nvSpPr>
-          <p:cNvPr id="231" name="Google Shape;231;g23985d0d2d4_0_38:notes"/>
+          <p:cNvPr id="230" name="Google Shape;230;g23985d0d2d4_0_38:notes"/>
           <p:cNvSpPr/>
           <p:nvPr>
             <p:ph idx="2" type="sldImg"/>
@@ -2748,7 +2748,7 @@
       </p:sp>
       <p:sp>
         <p:nvSpPr>
-          <p:cNvPr id="232" name="Google Shape;232;g23985d0d2d4_0_38:notes"/>
+          <p:cNvPr id="231" name="Google Shape;231;g23985d0d2d4_0_38:notes"/>
           <p:cNvSpPr txBox="1"/>
           <p:nvPr>
             <p:ph idx="1" type="body"/>
@@ -2798,7 +2798,7 @@
   <p:cSld>
     <p:spTree>
       <p:nvGrpSpPr>
-        <p:cNvPr id="236" name="Shape 236"/>
+        <p:cNvPr id="235" name="Shape 235"/>
         <p:cNvGrpSpPr/>
         <p:nvPr/>
       </p:nvGrpSpPr>
@@ -2812,7 +2812,7 @@
       </p:grpSpPr>
       <p:sp>
         <p:nvSpPr>
-          <p:cNvPr id="237" name="Google Shape;237;g23985d0d2d4_0_43:notes"/>
+          <p:cNvPr id="236" name="Google Shape;236;g23985d0d2d4_0_43:notes"/>
           <p:cNvSpPr/>
           <p:nvPr>
             <p:ph idx="2" type="sldImg"/>
@@ -2847,7 +2847,7 @@
       </p:sp>
       <p:sp>
         <p:nvSpPr>
-          <p:cNvPr id="238" name="Google Shape;238;g23985d0d2d4_0_43:notes"/>
+          <p:cNvPr id="237" name="Google Shape;237;g23985d0d2d4_0_43:notes"/>
           <p:cNvSpPr txBox="1"/>
           <p:nvPr>
             <p:ph idx="1" type="body"/>
@@ -7082,7 +7082,7 @@
             <a:tbl>
               <a:tblPr>
                 <a:noFill/>
-                <a:tableStyleId>{35EA63D6-A762-40CD-ABB6-6063135DE736}</a:tableStyleId>
+                <a:tableStyleId>{1CE731DB-C362-47D9-A89E-9B6CF7A3CDFC}</a:tableStyleId>
               </a:tblPr>
               <a:tblGrid>
                 <a:gridCol w="1432550"/>
@@ -10510,7 +10510,7 @@
             </a:pPr>
             <a:r>
               <a:rPr lang="en"/>
-              <a:t>It is your job to have reliable Internet access etc.</a:t>
+              <a:t>There is no way to make up for a missed quiz</a:t>
             </a:r>
             <a:endParaRPr/>
           </a:p>
@@ -10527,7 +10527,7 @@
             </a:pPr>
             <a:r>
               <a:rPr lang="en"/>
-              <a:t>There is no way to make up for a missed quiz</a:t>
+              <a:t>The quiz is an exam; do not use help like an AI</a:t>
             </a:r>
             <a:endParaRPr/>
           </a:p>
@@ -12740,7 +12740,7 @@
             </a:pPr>
             <a:r>
               <a:rPr lang="en"/>
-              <a:t>Course information and exam registration are two separate things</a:t>
+              <a:t>Course management and exam registration are two separate things</a:t>
             </a:r>
             <a:endParaRPr/>
           </a:p>
@@ -12956,822 +12956,6 @@
           </a:p>
         </p:txBody>
       </p:sp>
-      <p:graphicFrame>
-        <p:nvGraphicFramePr>
-          <p:cNvPr id="192" name="Google Shape;192;p29"/>
-          <p:cNvGraphicFramePr/>
-          <p:nvPr/>
-        </p:nvGraphicFramePr>
-        <p:xfrm>
-          <a:off x="274320" y="3200400"/>
-          <a:ext cx="3000000" cy="3000000"/>
-        </p:xfrm>
-        <a:graphic>
-          <a:graphicData uri="http://schemas.openxmlformats.org/drawingml/2006/table">
-            <a:tbl>
-              <a:tblPr>
-                <a:noFill/>
-                <a:tableStyleId>{35EA63D6-A762-40CD-ABB6-6063135DE736}</a:tableStyleId>
-              </a:tblPr>
-              <a:tblGrid>
-                <a:gridCol w="2148850"/>
-                <a:gridCol w="2148850"/>
-                <a:gridCol w="2148850"/>
-                <a:gridCol w="2148850"/>
-              </a:tblGrid>
-              <a:tr h="365750">
-                <a:tc>
-                  <a:txBody>
-                    <a:bodyPr/>
-                    <a:lstStyle/>
-                    <a:p>
-                      <a:pPr indent="0" lvl="0" marL="0" rtl="0" algn="ctr">
-                        <a:spcBef>
-                          <a:spcPts val="0"/>
-                        </a:spcBef>
-                        <a:spcAft>
-                          <a:spcPts val="0"/>
-                        </a:spcAft>
-                        <a:buNone/>
-                      </a:pPr>
-                      <a:r>
-                        <a:t/>
-                      </a:r>
-                      <a:endParaRPr sz="1200"/>
-                    </a:p>
-                  </a:txBody>
-                  <a:tcPr marT="91425" marB="91425" marR="91425" marL="91425" anchor="ctr">
-                    <a:lnL cap="flat" cmpd="sng" w="19050">
-                      <a:solidFill>
-                        <a:schemeClr val="lt1"/>
-                      </a:solidFill>
-                      <a:prstDash val="solid"/>
-                      <a:round/>
-                      <a:headEnd len="sm" w="sm" type="none"/>
-                      <a:tailEnd len="sm" w="sm" type="none"/>
-                    </a:lnL>
-                    <a:lnR cap="flat" cmpd="sng" w="19050">
-                      <a:solidFill>
-                        <a:schemeClr val="lt1"/>
-                      </a:solidFill>
-                      <a:prstDash val="solid"/>
-                      <a:round/>
-                      <a:headEnd len="sm" w="sm" type="none"/>
-                      <a:tailEnd len="sm" w="sm" type="none"/>
-                    </a:lnR>
-                    <a:lnT cap="flat" cmpd="sng" w="19050">
-                      <a:solidFill>
-                        <a:schemeClr val="lt1"/>
-                      </a:solidFill>
-                      <a:prstDash val="solid"/>
-                      <a:round/>
-                      <a:headEnd len="sm" w="sm" type="none"/>
-                      <a:tailEnd len="sm" w="sm" type="none"/>
-                    </a:lnT>
-                    <a:lnB cap="flat" cmpd="sng" w="19050">
-                      <a:solidFill>
-                        <a:schemeClr val="lt1"/>
-                      </a:solidFill>
-                      <a:prstDash val="solid"/>
-                      <a:round/>
-                      <a:headEnd len="sm" w="sm" type="none"/>
-                      <a:tailEnd len="sm" w="sm" type="none"/>
-                    </a:lnB>
-                  </a:tcPr>
-                </a:tc>
-                <a:tc>
-                  <a:txBody>
-                    <a:bodyPr/>
-                    <a:lstStyle/>
-                    <a:p>
-                      <a:pPr indent="0" lvl="0" marL="0" rtl="0" algn="ctr">
-                        <a:spcBef>
-                          <a:spcPts val="0"/>
-                        </a:spcBef>
-                        <a:spcAft>
-                          <a:spcPts val="0"/>
-                        </a:spcAft>
-                        <a:buNone/>
-                      </a:pPr>
-                      <a:r>
-                        <a:rPr b="1" lang="en" sz="1200">
-                          <a:solidFill>
-                            <a:schemeClr val="lt1"/>
-                          </a:solidFill>
-                        </a:rPr>
-                        <a:t>FAU</a:t>
-                      </a:r>
-                      <a:endParaRPr b="1" sz="1200">
-                        <a:solidFill>
-                          <a:schemeClr val="lt1"/>
-                        </a:solidFill>
-                      </a:endParaRPr>
-                    </a:p>
-                  </a:txBody>
-                  <a:tcPr marT="91425" marB="91425" marR="91425" marL="91425" anchor="ctr">
-                    <a:lnL cap="flat" cmpd="sng" w="19050">
-                      <a:solidFill>
-                        <a:schemeClr val="lt1"/>
-                      </a:solidFill>
-                      <a:prstDash val="solid"/>
-                      <a:round/>
-                      <a:headEnd len="sm" w="sm" type="none"/>
-                      <a:tailEnd len="sm" w="sm" type="none"/>
-                    </a:lnL>
-                    <a:lnR cap="flat" cmpd="sng" w="19050">
-                      <a:solidFill>
-                        <a:schemeClr val="lt1"/>
-                      </a:solidFill>
-                      <a:prstDash val="solid"/>
-                      <a:round/>
-                      <a:headEnd len="sm" w="sm" type="none"/>
-                      <a:tailEnd len="sm" w="sm" type="none"/>
-                    </a:lnR>
-                    <a:lnT cap="flat" cmpd="sng" w="19050">
-                      <a:solidFill>
-                        <a:schemeClr val="lt1"/>
-                      </a:solidFill>
-                      <a:prstDash val="solid"/>
-                      <a:round/>
-                      <a:headEnd len="sm" w="sm" type="none"/>
-                      <a:tailEnd len="sm" w="sm" type="none"/>
-                    </a:lnT>
-                    <a:lnB cap="flat" cmpd="sng" w="19050">
-                      <a:solidFill>
-                        <a:schemeClr val="lt1"/>
-                      </a:solidFill>
-                      <a:prstDash val="solid"/>
-                      <a:round/>
-                      <a:headEnd len="sm" w="sm" type="none"/>
-                      <a:tailEnd len="sm" w="sm" type="none"/>
-                    </a:lnB>
-                    <a:solidFill>
-                      <a:schemeClr val="dk2"/>
-                    </a:solidFill>
-                  </a:tcPr>
-                </a:tc>
-                <a:tc>
-                  <a:txBody>
-                    <a:bodyPr/>
-                    <a:lstStyle/>
-                    <a:p>
-                      <a:pPr indent="0" lvl="0" marL="0" rtl="0" algn="ctr">
-                        <a:spcBef>
-                          <a:spcPts val="0"/>
-                        </a:spcBef>
-                        <a:spcAft>
-                          <a:spcPts val="0"/>
-                        </a:spcAft>
-                        <a:buNone/>
-                      </a:pPr>
-                      <a:r>
-                        <a:rPr b="1" lang="en" sz="1200">
-                          <a:solidFill>
-                            <a:schemeClr val="lt1"/>
-                          </a:solidFill>
-                        </a:rPr>
-                        <a:t>FUB</a:t>
-                      </a:r>
-                      <a:endParaRPr b="1" sz="1200">
-                        <a:solidFill>
-                          <a:schemeClr val="lt1"/>
-                        </a:solidFill>
-                      </a:endParaRPr>
-                    </a:p>
-                  </a:txBody>
-                  <a:tcPr marT="91425" marB="91425" marR="91425" marL="91425" anchor="ctr">
-                    <a:lnL cap="flat" cmpd="sng" w="19050">
-                      <a:solidFill>
-                        <a:schemeClr val="lt1"/>
-                      </a:solidFill>
-                      <a:prstDash val="solid"/>
-                      <a:round/>
-                      <a:headEnd len="sm" w="sm" type="none"/>
-                      <a:tailEnd len="sm" w="sm" type="none"/>
-                    </a:lnL>
-                    <a:lnR cap="flat" cmpd="sng" w="19050">
-                      <a:solidFill>
-                        <a:schemeClr val="lt1"/>
-                      </a:solidFill>
-                      <a:prstDash val="solid"/>
-                      <a:round/>
-                      <a:headEnd len="sm" w="sm" type="none"/>
-                      <a:tailEnd len="sm" w="sm" type="none"/>
-                    </a:lnR>
-                    <a:lnT cap="flat" cmpd="sng" w="19050">
-                      <a:solidFill>
-                        <a:schemeClr val="lt1"/>
-                      </a:solidFill>
-                      <a:prstDash val="solid"/>
-                      <a:round/>
-                      <a:headEnd len="sm" w="sm" type="none"/>
-                      <a:tailEnd len="sm" w="sm" type="none"/>
-                    </a:lnT>
-                    <a:lnB cap="flat" cmpd="sng" w="19050">
-                      <a:solidFill>
-                        <a:schemeClr val="lt1"/>
-                      </a:solidFill>
-                      <a:prstDash val="solid"/>
-                      <a:round/>
-                      <a:headEnd len="sm" w="sm" type="none"/>
-                      <a:tailEnd len="sm" w="sm" type="none"/>
-                    </a:lnB>
-                    <a:solidFill>
-                      <a:schemeClr val="dk2"/>
-                    </a:solidFill>
-                  </a:tcPr>
-                </a:tc>
-                <a:tc>
-                  <a:txBody>
-                    <a:bodyPr/>
-                    <a:lstStyle/>
-                    <a:p>
-                      <a:pPr indent="0" lvl="0" marL="0" rtl="0" algn="ctr">
-                        <a:spcBef>
-                          <a:spcPts val="0"/>
-                        </a:spcBef>
-                        <a:spcAft>
-                          <a:spcPts val="0"/>
-                        </a:spcAft>
-                        <a:buNone/>
-                      </a:pPr>
-                      <a:r>
-                        <a:rPr b="1" lang="en" sz="1200">
-                          <a:solidFill>
-                            <a:schemeClr val="lt1"/>
-                          </a:solidFill>
-                        </a:rPr>
-                        <a:t>TUB</a:t>
-                      </a:r>
-                      <a:endParaRPr b="1" sz="1200">
-                        <a:solidFill>
-                          <a:schemeClr val="lt1"/>
-                        </a:solidFill>
-                      </a:endParaRPr>
-                    </a:p>
-                  </a:txBody>
-                  <a:tcPr marT="91425" marB="91425" marR="91425" marL="91425" anchor="ctr">
-                    <a:lnL cap="flat" cmpd="sng" w="19050">
-                      <a:solidFill>
-                        <a:schemeClr val="lt1"/>
-                      </a:solidFill>
-                      <a:prstDash val="solid"/>
-                      <a:round/>
-                      <a:headEnd len="sm" w="sm" type="none"/>
-                      <a:tailEnd len="sm" w="sm" type="none"/>
-                    </a:lnL>
-                    <a:lnR cap="flat" cmpd="sng" w="19050">
-                      <a:solidFill>
-                        <a:schemeClr val="lt1"/>
-                      </a:solidFill>
-                      <a:prstDash val="solid"/>
-                      <a:round/>
-                      <a:headEnd len="sm" w="sm" type="none"/>
-                      <a:tailEnd len="sm" w="sm" type="none"/>
-                    </a:lnR>
-                    <a:lnT cap="flat" cmpd="sng" w="19050">
-                      <a:solidFill>
-                        <a:schemeClr val="lt1"/>
-                      </a:solidFill>
-                      <a:prstDash val="solid"/>
-                      <a:round/>
-                      <a:headEnd len="sm" w="sm" type="none"/>
-                      <a:tailEnd len="sm" w="sm" type="none"/>
-                    </a:lnT>
-                    <a:lnB cap="flat" cmpd="sng" w="19050">
-                      <a:solidFill>
-                        <a:schemeClr val="lt1"/>
-                      </a:solidFill>
-                      <a:prstDash val="solid"/>
-                      <a:round/>
-                      <a:headEnd len="sm" w="sm" type="none"/>
-                      <a:tailEnd len="sm" w="sm" type="none"/>
-                    </a:lnB>
-                    <a:solidFill>
-                      <a:schemeClr val="dk2"/>
-                    </a:solidFill>
-                  </a:tcPr>
-                </a:tc>
-              </a:tr>
-              <a:tr h="365750">
-                <a:tc>
-                  <a:txBody>
-                    <a:bodyPr/>
-                    <a:lstStyle/>
-                    <a:p>
-                      <a:pPr indent="0" lvl="0" marL="0" rtl="0" algn="ctr">
-                        <a:spcBef>
-                          <a:spcPts val="0"/>
-                        </a:spcBef>
-                        <a:spcAft>
-                          <a:spcPts val="0"/>
-                        </a:spcAft>
-                        <a:buNone/>
-                      </a:pPr>
-                      <a:r>
-                        <a:rPr b="1" lang="en" sz="1200">
-                          <a:solidFill>
-                            <a:schemeClr val="lt1"/>
-                          </a:solidFill>
-                        </a:rPr>
-                        <a:t>Course information</a:t>
-                      </a:r>
-                      <a:endParaRPr b="1" sz="1200">
-                        <a:solidFill>
-                          <a:schemeClr val="lt1"/>
-                        </a:solidFill>
-                      </a:endParaRPr>
-                    </a:p>
-                  </a:txBody>
-                  <a:tcPr marT="91425" marB="91425" marR="91425" marL="91425" anchor="ctr">
-                    <a:lnL cap="flat" cmpd="sng" w="19050">
-                      <a:solidFill>
-                        <a:schemeClr val="lt1"/>
-                      </a:solidFill>
-                      <a:prstDash val="solid"/>
-                      <a:round/>
-                      <a:headEnd len="sm" w="sm" type="none"/>
-                      <a:tailEnd len="sm" w="sm" type="none"/>
-                    </a:lnL>
-                    <a:lnR cap="flat" cmpd="sng" w="19050">
-                      <a:solidFill>
-                        <a:schemeClr val="lt1"/>
-                      </a:solidFill>
-                      <a:prstDash val="solid"/>
-                      <a:round/>
-                      <a:headEnd len="sm" w="sm" type="none"/>
-                      <a:tailEnd len="sm" w="sm" type="none"/>
-                    </a:lnR>
-                    <a:lnT cap="flat" cmpd="sng" w="19050">
-                      <a:solidFill>
-                        <a:schemeClr val="lt1"/>
-                      </a:solidFill>
-                      <a:prstDash val="solid"/>
-                      <a:round/>
-                      <a:headEnd len="sm" w="sm" type="none"/>
-                      <a:tailEnd len="sm" w="sm" type="none"/>
-                    </a:lnT>
-                    <a:lnB cap="flat" cmpd="sng" w="19050">
-                      <a:solidFill>
-                        <a:schemeClr val="lt1"/>
-                      </a:solidFill>
-                      <a:prstDash val="solid"/>
-                      <a:round/>
-                      <a:headEnd len="sm" w="sm" type="none"/>
-                      <a:tailEnd len="sm" w="sm" type="none"/>
-                    </a:lnB>
-                    <a:solidFill>
-                      <a:schemeClr val="dk2"/>
-                    </a:solidFill>
-                  </a:tcPr>
-                </a:tc>
-                <a:tc>
-                  <a:txBody>
-                    <a:bodyPr/>
-                    <a:lstStyle/>
-                    <a:p>
-                      <a:pPr indent="0" lvl="0" marL="0" rtl="0" algn="ctr">
-                        <a:spcBef>
-                          <a:spcPts val="0"/>
-                        </a:spcBef>
-                        <a:spcAft>
-                          <a:spcPts val="0"/>
-                        </a:spcAft>
-                        <a:buNone/>
-                      </a:pPr>
-                      <a:r>
-                        <a:rPr lang="en" sz="1200"/>
-                        <a:t>StudOn</a:t>
-                      </a:r>
-                      <a:endParaRPr sz="1200"/>
-                    </a:p>
-                  </a:txBody>
-                  <a:tcPr marT="91425" marB="91425" marR="91425" marL="91425" anchor="ctr">
-                    <a:lnL cap="flat" cmpd="sng" w="19050">
-                      <a:solidFill>
-                        <a:schemeClr val="lt1"/>
-                      </a:solidFill>
-                      <a:prstDash val="solid"/>
-                      <a:round/>
-                      <a:headEnd len="sm" w="sm" type="none"/>
-                      <a:tailEnd len="sm" w="sm" type="none"/>
-                    </a:lnL>
-                    <a:lnR cap="flat" cmpd="sng" w="19050">
-                      <a:solidFill>
-                        <a:schemeClr val="lt1"/>
-                      </a:solidFill>
-                      <a:prstDash val="solid"/>
-                      <a:round/>
-                      <a:headEnd len="sm" w="sm" type="none"/>
-                      <a:tailEnd len="sm" w="sm" type="none"/>
-                    </a:lnR>
-                    <a:lnT cap="flat" cmpd="sng" w="19050">
-                      <a:solidFill>
-                        <a:schemeClr val="lt1"/>
-                      </a:solidFill>
-                      <a:prstDash val="solid"/>
-                      <a:round/>
-                      <a:headEnd len="sm" w="sm" type="none"/>
-                      <a:tailEnd len="sm" w="sm" type="none"/>
-                    </a:lnT>
-                    <a:lnB cap="flat" cmpd="sng" w="19050">
-                      <a:solidFill>
-                        <a:schemeClr val="lt1"/>
-                      </a:solidFill>
-                      <a:prstDash val="solid"/>
-                      <a:round/>
-                      <a:headEnd len="sm" w="sm" type="none"/>
-                      <a:tailEnd len="sm" w="sm" type="none"/>
-                    </a:lnB>
-                  </a:tcPr>
-                </a:tc>
-                <a:tc>
-                  <a:txBody>
-                    <a:bodyPr/>
-                    <a:lstStyle/>
-                    <a:p>
-                      <a:pPr indent="0" lvl="0" marL="0" rtl="0" algn="ctr">
-                        <a:spcBef>
-                          <a:spcPts val="0"/>
-                        </a:spcBef>
-                        <a:spcAft>
-                          <a:spcPts val="0"/>
-                        </a:spcAft>
-                        <a:buNone/>
-                      </a:pPr>
-                      <a:r>
-                        <a:rPr lang="en" sz="1200"/>
-                        <a:t>Whiteboard</a:t>
-                      </a:r>
-                      <a:endParaRPr sz="1200"/>
-                    </a:p>
-                  </a:txBody>
-                  <a:tcPr marT="91425" marB="91425" marR="91425" marL="91425" anchor="ctr">
-                    <a:lnL cap="flat" cmpd="sng" w="19050">
-                      <a:solidFill>
-                        <a:schemeClr val="lt1"/>
-                      </a:solidFill>
-                      <a:prstDash val="solid"/>
-                      <a:round/>
-                      <a:headEnd len="sm" w="sm" type="none"/>
-                      <a:tailEnd len="sm" w="sm" type="none"/>
-                    </a:lnL>
-                    <a:lnR cap="flat" cmpd="sng" w="19050">
-                      <a:solidFill>
-                        <a:schemeClr val="lt1"/>
-                      </a:solidFill>
-                      <a:prstDash val="solid"/>
-                      <a:round/>
-                      <a:headEnd len="sm" w="sm" type="none"/>
-                      <a:tailEnd len="sm" w="sm" type="none"/>
-                    </a:lnR>
-                    <a:lnT cap="flat" cmpd="sng" w="19050">
-                      <a:solidFill>
-                        <a:schemeClr val="lt1"/>
-                      </a:solidFill>
-                      <a:prstDash val="solid"/>
-                      <a:round/>
-                      <a:headEnd len="sm" w="sm" type="none"/>
-                      <a:tailEnd len="sm" w="sm" type="none"/>
-                    </a:lnT>
-                    <a:lnB cap="flat" cmpd="sng" w="19050">
-                      <a:solidFill>
-                        <a:schemeClr val="lt1"/>
-                      </a:solidFill>
-                      <a:prstDash val="solid"/>
-                      <a:round/>
-                      <a:headEnd len="sm" w="sm" type="none"/>
-                      <a:tailEnd len="sm" w="sm" type="none"/>
-                    </a:lnB>
-                  </a:tcPr>
-                </a:tc>
-                <a:tc>
-                  <a:txBody>
-                    <a:bodyPr/>
-                    <a:lstStyle/>
-                    <a:p>
-                      <a:pPr indent="0" lvl="0" marL="0" rtl="0" algn="ctr">
-                        <a:spcBef>
-                          <a:spcPts val="0"/>
-                        </a:spcBef>
-                        <a:spcAft>
-                          <a:spcPts val="0"/>
-                        </a:spcAft>
-                        <a:buNone/>
-                      </a:pPr>
-                      <a:r>
-                        <a:rPr lang="en" sz="1200"/>
-                        <a:t>ISIS</a:t>
-                      </a:r>
-                      <a:endParaRPr sz="1200"/>
-                    </a:p>
-                  </a:txBody>
-                  <a:tcPr marT="91425" marB="91425" marR="91425" marL="91425" anchor="ctr">
-                    <a:lnL cap="flat" cmpd="sng" w="19050">
-                      <a:solidFill>
-                        <a:schemeClr val="lt1"/>
-                      </a:solidFill>
-                      <a:prstDash val="solid"/>
-                      <a:round/>
-                      <a:headEnd len="sm" w="sm" type="none"/>
-                      <a:tailEnd len="sm" w="sm" type="none"/>
-                    </a:lnL>
-                    <a:lnR cap="flat" cmpd="sng" w="19050">
-                      <a:solidFill>
-                        <a:schemeClr val="lt1"/>
-                      </a:solidFill>
-                      <a:prstDash val="solid"/>
-                      <a:round/>
-                      <a:headEnd len="sm" w="sm" type="none"/>
-                      <a:tailEnd len="sm" w="sm" type="none"/>
-                    </a:lnR>
-                    <a:lnT cap="flat" cmpd="sng" w="19050">
-                      <a:solidFill>
-                        <a:schemeClr val="lt1"/>
-                      </a:solidFill>
-                      <a:prstDash val="solid"/>
-                      <a:round/>
-                      <a:headEnd len="sm" w="sm" type="none"/>
-                      <a:tailEnd len="sm" w="sm" type="none"/>
-                    </a:lnT>
-                    <a:lnB cap="flat" cmpd="sng" w="19050">
-                      <a:solidFill>
-                        <a:schemeClr val="lt1"/>
-                      </a:solidFill>
-                      <a:prstDash val="solid"/>
-                      <a:round/>
-                      <a:headEnd len="sm" w="sm" type="none"/>
-                      <a:tailEnd len="sm" w="sm" type="none"/>
-                    </a:lnB>
-                  </a:tcPr>
-                </a:tc>
-              </a:tr>
-              <a:tr h="365750">
-                <a:tc>
-                  <a:txBody>
-                    <a:bodyPr/>
-                    <a:lstStyle/>
-                    <a:p>
-                      <a:pPr indent="0" lvl="0" marL="0" rtl="0" algn="ctr">
-                        <a:spcBef>
-                          <a:spcPts val="0"/>
-                        </a:spcBef>
-                        <a:spcAft>
-                          <a:spcPts val="0"/>
-                        </a:spcAft>
-                        <a:buNone/>
-                      </a:pPr>
-                      <a:r>
-                        <a:rPr b="1" lang="en" sz="1200">
-                          <a:solidFill>
-                            <a:schemeClr val="lt1"/>
-                          </a:solidFill>
-                        </a:rPr>
-                        <a:t>Exam registration</a:t>
-                      </a:r>
-                      <a:endParaRPr b="1" sz="1200">
-                        <a:solidFill>
-                          <a:schemeClr val="lt1"/>
-                        </a:solidFill>
-                      </a:endParaRPr>
-                    </a:p>
-                  </a:txBody>
-                  <a:tcPr marT="91425" marB="91425" marR="91425" marL="91425" anchor="ctr">
-                    <a:lnL cap="flat" cmpd="sng" w="19050">
-                      <a:solidFill>
-                        <a:schemeClr val="lt1"/>
-                      </a:solidFill>
-                      <a:prstDash val="solid"/>
-                      <a:round/>
-                      <a:headEnd len="sm" w="sm" type="none"/>
-                      <a:tailEnd len="sm" w="sm" type="none"/>
-                    </a:lnL>
-                    <a:lnR cap="flat" cmpd="sng" w="19050">
-                      <a:solidFill>
-                        <a:schemeClr val="lt1"/>
-                      </a:solidFill>
-                      <a:prstDash val="solid"/>
-                      <a:round/>
-                      <a:headEnd len="sm" w="sm" type="none"/>
-                      <a:tailEnd len="sm" w="sm" type="none"/>
-                    </a:lnR>
-                    <a:lnT cap="flat" cmpd="sng" w="19050">
-                      <a:solidFill>
-                        <a:schemeClr val="lt1"/>
-                      </a:solidFill>
-                      <a:prstDash val="solid"/>
-                      <a:round/>
-                      <a:headEnd len="sm" w="sm" type="none"/>
-                      <a:tailEnd len="sm" w="sm" type="none"/>
-                    </a:lnT>
-                    <a:lnB cap="flat" cmpd="sng" w="19050">
-                      <a:solidFill>
-                        <a:schemeClr val="lt1"/>
-                      </a:solidFill>
-                      <a:prstDash val="solid"/>
-                      <a:round/>
-                      <a:headEnd len="sm" w="sm" type="none"/>
-                      <a:tailEnd len="sm" w="sm" type="none"/>
-                    </a:lnB>
-                    <a:solidFill>
-                      <a:schemeClr val="dk2"/>
-                    </a:solidFill>
-                  </a:tcPr>
-                </a:tc>
-                <a:tc>
-                  <a:txBody>
-                    <a:bodyPr/>
-                    <a:lstStyle/>
-                    <a:p>
-                      <a:pPr indent="0" lvl="0" marL="0" rtl="0" algn="ctr">
-                        <a:spcBef>
-                          <a:spcPts val="0"/>
-                        </a:spcBef>
-                        <a:spcAft>
-                          <a:spcPts val="0"/>
-                        </a:spcAft>
-                        <a:buNone/>
-                      </a:pPr>
-                      <a:r>
-                        <a:rPr lang="en" sz="1200"/>
-                        <a:t>Campo</a:t>
-                      </a:r>
-                      <a:endParaRPr sz="1200"/>
-                    </a:p>
-                  </a:txBody>
-                  <a:tcPr marT="91425" marB="91425" marR="91425" marL="91425" anchor="ctr">
-                    <a:lnL cap="flat" cmpd="sng" w="19050">
-                      <a:solidFill>
-                        <a:schemeClr val="lt1"/>
-                      </a:solidFill>
-                      <a:prstDash val="solid"/>
-                      <a:round/>
-                      <a:headEnd len="sm" w="sm" type="none"/>
-                      <a:tailEnd len="sm" w="sm" type="none"/>
-                    </a:lnL>
-                    <a:lnR cap="flat" cmpd="sng" w="19050">
-                      <a:solidFill>
-                        <a:schemeClr val="lt1"/>
-                      </a:solidFill>
-                      <a:prstDash val="solid"/>
-                      <a:round/>
-                      <a:headEnd len="sm" w="sm" type="none"/>
-                      <a:tailEnd len="sm" w="sm" type="none"/>
-                    </a:lnR>
-                    <a:lnT cap="flat" cmpd="sng" w="19050">
-                      <a:solidFill>
-                        <a:schemeClr val="lt1"/>
-                      </a:solidFill>
-                      <a:prstDash val="solid"/>
-                      <a:round/>
-                      <a:headEnd len="sm" w="sm" type="none"/>
-                      <a:tailEnd len="sm" w="sm" type="none"/>
-                    </a:lnT>
-                    <a:lnB cap="flat" cmpd="sng" w="19050">
-                      <a:solidFill>
-                        <a:schemeClr val="lt1"/>
-                      </a:solidFill>
-                      <a:prstDash val="solid"/>
-                      <a:round/>
-                      <a:headEnd len="sm" w="sm" type="none"/>
-                      <a:tailEnd len="sm" w="sm" type="none"/>
-                    </a:lnB>
-                    <a:solidFill>
-                      <a:schemeClr val="accent1"/>
-                    </a:solidFill>
-                  </a:tcPr>
-                </a:tc>
-                <a:tc>
-                  <a:txBody>
-                    <a:bodyPr/>
-                    <a:lstStyle/>
-                    <a:p>
-                      <a:pPr indent="0" lvl="0" marL="0" rtl="0" algn="ctr">
-                        <a:spcBef>
-                          <a:spcPts val="0"/>
-                        </a:spcBef>
-                        <a:spcAft>
-                          <a:spcPts val="0"/>
-                        </a:spcAft>
-                        <a:buNone/>
-                      </a:pPr>
-                      <a:r>
-                        <a:rPr lang="en" sz="1200"/>
-                        <a:t>CampusManagement</a:t>
-                      </a:r>
-                      <a:endParaRPr sz="1200"/>
-                    </a:p>
-                  </a:txBody>
-                  <a:tcPr marT="91425" marB="91425" marR="91425" marL="91425" anchor="ctr">
-                    <a:lnL cap="flat" cmpd="sng" w="19050">
-                      <a:solidFill>
-                        <a:schemeClr val="lt1"/>
-                      </a:solidFill>
-                      <a:prstDash val="solid"/>
-                      <a:round/>
-                      <a:headEnd len="sm" w="sm" type="none"/>
-                      <a:tailEnd len="sm" w="sm" type="none"/>
-                    </a:lnL>
-                    <a:lnR cap="flat" cmpd="sng" w="19050">
-                      <a:solidFill>
-                        <a:schemeClr val="lt1"/>
-                      </a:solidFill>
-                      <a:prstDash val="solid"/>
-                      <a:round/>
-                      <a:headEnd len="sm" w="sm" type="none"/>
-                      <a:tailEnd len="sm" w="sm" type="none"/>
-                    </a:lnR>
-                    <a:lnT cap="flat" cmpd="sng" w="19050">
-                      <a:solidFill>
-                        <a:schemeClr val="lt1"/>
-                      </a:solidFill>
-                      <a:prstDash val="solid"/>
-                      <a:round/>
-                      <a:headEnd len="sm" w="sm" type="none"/>
-                      <a:tailEnd len="sm" w="sm" type="none"/>
-                    </a:lnT>
-                    <a:lnB cap="flat" cmpd="sng" w="19050">
-                      <a:solidFill>
-                        <a:schemeClr val="lt1"/>
-                      </a:solidFill>
-                      <a:prstDash val="solid"/>
-                      <a:round/>
-                      <a:headEnd len="sm" w="sm" type="none"/>
-                      <a:tailEnd len="sm" w="sm" type="none"/>
-                    </a:lnB>
-                    <a:solidFill>
-                      <a:schemeClr val="accent1"/>
-                    </a:solidFill>
-                  </a:tcPr>
-                </a:tc>
-                <a:tc>
-                  <a:txBody>
-                    <a:bodyPr/>
-                    <a:lstStyle/>
-                    <a:p>
-                      <a:pPr indent="0" lvl="0" marL="0" rtl="0" algn="ctr">
-                        <a:spcBef>
-                          <a:spcPts val="0"/>
-                        </a:spcBef>
-                        <a:spcAft>
-                          <a:spcPts val="0"/>
-                        </a:spcAft>
-                        <a:buNone/>
-                      </a:pPr>
-                      <a:r>
-                        <a:rPr lang="en" sz="1200"/>
-                        <a:t>MOSES</a:t>
-                      </a:r>
-                      <a:endParaRPr sz="1200"/>
-                    </a:p>
-                  </a:txBody>
-                  <a:tcPr marT="91425" marB="91425" marR="91425" marL="91425" anchor="ctr">
-                    <a:lnL cap="flat" cmpd="sng" w="19050">
-                      <a:solidFill>
-                        <a:schemeClr val="lt1"/>
-                      </a:solidFill>
-                      <a:prstDash val="solid"/>
-                      <a:round/>
-                      <a:headEnd len="sm" w="sm" type="none"/>
-                      <a:tailEnd len="sm" w="sm" type="none"/>
-                    </a:lnL>
-                    <a:lnR cap="flat" cmpd="sng" w="19050">
-                      <a:solidFill>
-                        <a:schemeClr val="lt1"/>
-                      </a:solidFill>
-                      <a:prstDash val="solid"/>
-                      <a:round/>
-                      <a:headEnd len="sm" w="sm" type="none"/>
-                      <a:tailEnd len="sm" w="sm" type="none"/>
-                    </a:lnR>
-                    <a:lnT cap="flat" cmpd="sng" w="19050">
-                      <a:solidFill>
-                        <a:schemeClr val="lt1"/>
-                      </a:solidFill>
-                      <a:prstDash val="solid"/>
-                      <a:round/>
-                      <a:headEnd len="sm" w="sm" type="none"/>
-                      <a:tailEnd len="sm" w="sm" type="none"/>
-                    </a:lnT>
-                    <a:lnB cap="flat" cmpd="sng" w="19050">
-                      <a:solidFill>
-                        <a:schemeClr val="lt1"/>
-                      </a:solidFill>
-                      <a:prstDash val="solid"/>
-                      <a:round/>
-                      <a:headEnd len="sm" w="sm" type="none"/>
-                      <a:tailEnd len="sm" w="sm" type="none"/>
-                    </a:lnB>
-                    <a:solidFill>
-                      <a:schemeClr val="accent1"/>
-                    </a:solidFill>
-                  </a:tcPr>
-                </a:tc>
-              </a:tr>
-            </a:tbl>
-          </a:graphicData>
-        </a:graphic>
-      </p:graphicFrame>
     </p:spTree>
   </p:cSld>
   <p:clrMapOvr>
@@ -13785,7 +12969,7 @@
   <p:cSld>
     <p:spTree>
       <p:nvGrpSpPr>
-        <p:cNvPr id="196" name="Shape 196"/>
+        <p:cNvPr id="195" name="Shape 195"/>
         <p:cNvGrpSpPr/>
         <p:nvPr/>
       </p:nvGrpSpPr>
@@ -13799,7 +12983,7 @@
       </p:grpSpPr>
       <p:sp>
         <p:nvSpPr>
-          <p:cNvPr id="197" name="Google Shape;197;p30"/>
+          <p:cNvPr id="196" name="Google Shape;196;p30"/>
           <p:cNvSpPr txBox="1"/>
           <p:nvPr>
             <p:ph type="title"/>
@@ -13839,7 +13023,7 @@
       </p:sp>
       <p:pic>
         <p:nvPicPr>
-          <p:cNvPr id="198" name="Google Shape;198;p30"/>
+          <p:cNvPr id="197" name="Google Shape;197;p30"/>
           <p:cNvPicPr preferRelativeResize="0"/>
           <p:nvPr/>
         </p:nvPicPr>
@@ -13867,7 +13051,7 @@
       </p:pic>
       <p:sp>
         <p:nvSpPr>
-          <p:cNvPr id="199" name="Google Shape;199;p30"/>
+          <p:cNvPr id="198" name="Google Shape;198;p30"/>
           <p:cNvSpPr txBox="1"/>
           <p:nvPr/>
         </p:nvSpPr>
@@ -13925,7 +13109,7 @@
       </p:sp>
       <p:sp>
         <p:nvSpPr>
-          <p:cNvPr id="200" name="Google Shape;200;p30"/>
+          <p:cNvPr id="199" name="Google Shape;199;p30"/>
           <p:cNvSpPr txBox="1"/>
           <p:nvPr>
             <p:ph idx="12" type="sldNum"/>
@@ -14001,7 +13185,7 @@
   <p:cSld>
     <p:spTree>
       <p:nvGrpSpPr>
-        <p:cNvPr id="204" name="Shape 204"/>
+        <p:cNvPr id="203" name="Shape 203"/>
         <p:cNvGrpSpPr/>
         <p:nvPr/>
       </p:nvGrpSpPr>
@@ -14015,7 +13199,7 @@
       </p:grpSpPr>
       <p:sp>
         <p:nvSpPr>
-          <p:cNvPr id="205" name="Google Shape;205;p31"/>
+          <p:cNvPr id="204" name="Google Shape;204;p31"/>
           <p:cNvSpPr txBox="1"/>
           <p:nvPr>
             <p:ph type="title"/>
@@ -14055,7 +13239,7 @@
       </p:sp>
       <p:sp>
         <p:nvSpPr>
-          <p:cNvPr id="206" name="Google Shape;206;p31"/>
+          <p:cNvPr id="205" name="Google Shape;205;p31"/>
           <p:cNvSpPr txBox="1"/>
           <p:nvPr/>
         </p:nvSpPr>
@@ -14110,7 +13294,7 @@
       </p:sp>
       <p:sp>
         <p:nvSpPr>
-          <p:cNvPr id="207" name="Google Shape;207;p31"/>
+          <p:cNvPr id="206" name="Google Shape;206;p31"/>
           <p:cNvSpPr txBox="1"/>
           <p:nvPr>
             <p:ph idx="1" type="body"/>
@@ -14259,7 +13443,7 @@
       </p:sp>
       <p:sp>
         <p:nvSpPr>
-          <p:cNvPr id="208" name="Google Shape;208;p31"/>
+          <p:cNvPr id="207" name="Google Shape;207;p31"/>
           <p:cNvSpPr txBox="1"/>
           <p:nvPr>
             <p:ph idx="12" type="sldNum"/>
@@ -14335,7 +13519,7 @@
   <p:cSld>
     <p:spTree>
       <p:nvGrpSpPr>
-        <p:cNvPr id="212" name="Shape 212"/>
+        <p:cNvPr id="211" name="Shape 211"/>
         <p:cNvGrpSpPr/>
         <p:nvPr/>
       </p:nvGrpSpPr>
@@ -14349,7 +13533,7 @@
       </p:grpSpPr>
       <p:sp>
         <p:nvSpPr>
-          <p:cNvPr id="213" name="Google Shape;213;p32"/>
+          <p:cNvPr id="212" name="Google Shape;212;p32"/>
           <p:cNvSpPr txBox="1"/>
           <p:nvPr>
             <p:ph type="title"/>
@@ -14389,7 +13573,7 @@
       </p:sp>
       <p:sp>
         <p:nvSpPr>
-          <p:cNvPr id="214" name="Google Shape;214;p32"/>
+          <p:cNvPr id="213" name="Google Shape;213;p32"/>
           <p:cNvSpPr txBox="1"/>
           <p:nvPr>
             <p:ph idx="1" type="body"/>
@@ -14566,7 +13750,7 @@
       </p:sp>
       <p:sp>
         <p:nvSpPr>
-          <p:cNvPr id="215" name="Google Shape;215;p32"/>
+          <p:cNvPr id="214" name="Google Shape;214;p32"/>
           <p:cNvSpPr txBox="1"/>
           <p:nvPr>
             <p:ph idx="12" type="sldNum"/>
@@ -14642,7 +13826,7 @@
   <p:cSld>
     <p:spTree>
       <p:nvGrpSpPr>
-        <p:cNvPr id="219" name="Shape 219"/>
+        <p:cNvPr id="218" name="Shape 218"/>
         <p:cNvGrpSpPr/>
         <p:nvPr/>
       </p:nvGrpSpPr>
@@ -14656,7 +13840,7 @@
       </p:grpSpPr>
       <p:sp>
         <p:nvSpPr>
-          <p:cNvPr id="220" name="Google Shape;220;p33"/>
+          <p:cNvPr id="219" name="Google Shape;219;p33"/>
           <p:cNvSpPr txBox="1"/>
           <p:nvPr>
             <p:ph type="title"/>
@@ -14696,7 +13880,7 @@
       </p:sp>
       <p:sp>
         <p:nvSpPr>
-          <p:cNvPr id="221" name="Google Shape;221;p33"/>
+          <p:cNvPr id="220" name="Google Shape;220;p33"/>
           <p:cNvSpPr txBox="1"/>
           <p:nvPr>
             <p:ph idx="1" type="body"/>
@@ -14849,7 +14033,7 @@
       </p:sp>
       <p:sp>
         <p:nvSpPr>
-          <p:cNvPr id="222" name="Google Shape;222;p33"/>
+          <p:cNvPr id="221" name="Google Shape;221;p33"/>
           <p:cNvSpPr txBox="1"/>
           <p:nvPr>
             <p:ph idx="12" type="sldNum"/>
@@ -14925,7 +14109,7 @@
   <p:cSld>
     <p:spTree>
       <p:nvGrpSpPr>
-        <p:cNvPr id="226" name="Shape 226"/>
+        <p:cNvPr id="225" name="Shape 225"/>
         <p:cNvGrpSpPr/>
         <p:nvPr/>
       </p:nvGrpSpPr>
@@ -14939,7 +14123,7 @@
       </p:grpSpPr>
       <p:sp>
         <p:nvSpPr>
-          <p:cNvPr id="227" name="Google Shape;227;p34"/>
+          <p:cNvPr id="226" name="Google Shape;226;p34"/>
           <p:cNvSpPr txBox="1"/>
           <p:nvPr>
             <p:ph type="title"/>
@@ -14979,7 +14163,7 @@
       </p:sp>
       <p:sp>
         <p:nvSpPr>
-          <p:cNvPr id="228" name="Google Shape;228;p34"/>
+          <p:cNvPr id="227" name="Google Shape;227;p34"/>
           <p:cNvSpPr txBox="1"/>
           <p:nvPr>
             <p:ph idx="1" type="body"/>
@@ -15123,7 +14307,7 @@
       </p:sp>
       <p:sp>
         <p:nvSpPr>
-          <p:cNvPr id="229" name="Google Shape;229;p34"/>
+          <p:cNvPr id="228" name="Google Shape;228;p34"/>
           <p:cNvSpPr txBox="1"/>
           <p:nvPr>
             <p:ph idx="12" type="sldNum"/>
@@ -15199,7 +14383,7 @@
   <p:cSld>
     <p:spTree>
       <p:nvGrpSpPr>
-        <p:cNvPr id="233" name="Shape 233"/>
+        <p:cNvPr id="232" name="Shape 232"/>
         <p:cNvGrpSpPr/>
         <p:nvPr/>
       </p:nvGrpSpPr>
@@ -15213,7 +14397,7 @@
       </p:grpSpPr>
       <p:sp>
         <p:nvSpPr>
-          <p:cNvPr id="234" name="Google Shape;234;p35"/>
+          <p:cNvPr id="233" name="Google Shape;233;p35"/>
           <p:cNvSpPr txBox="1"/>
           <p:nvPr>
             <p:ph type="ctrTitle"/>
@@ -15253,7 +14437,7 @@
       </p:sp>
       <p:sp>
         <p:nvSpPr>
-          <p:cNvPr id="235" name="Google Shape;235;p35"/>
+          <p:cNvPr id="234" name="Google Shape;234;p35"/>
           <p:cNvSpPr txBox="1"/>
           <p:nvPr>
             <p:ph idx="1" type="subTitle"/>
@@ -15383,7 +14567,7 @@
   <p:cSld>
     <p:spTree>
       <p:nvGrpSpPr>
-        <p:cNvPr id="239" name="Shape 239"/>
+        <p:cNvPr id="238" name="Shape 238"/>
         <p:cNvGrpSpPr/>
         <p:nvPr/>
       </p:nvGrpSpPr>
@@ -15397,7 +14581,7 @@
       </p:grpSpPr>
       <p:sp>
         <p:nvSpPr>
-          <p:cNvPr id="240" name="Google Shape;240;p36"/>
+          <p:cNvPr id="239" name="Google Shape;239;p36"/>
           <p:cNvSpPr txBox="1"/>
           <p:nvPr>
             <p:ph type="title"/>
@@ -15437,7 +14621,7 @@
       </p:sp>
       <p:sp>
         <p:nvSpPr>
-          <p:cNvPr id="241" name="Google Shape;241;p36"/>
+          <p:cNvPr id="240" name="Google Shape;240;p36"/>
           <p:cNvSpPr txBox="1"/>
           <p:nvPr>
             <p:ph idx="12" type="sldNum"/>
@@ -15502,7 +14686,7 @@
       </p:sp>
       <p:sp>
         <p:nvSpPr>
-          <p:cNvPr id="242" name="Google Shape;242;p36"/>
+          <p:cNvPr id="241" name="Google Shape;241;p36"/>
           <p:cNvSpPr txBox="1"/>
           <p:nvPr>
             <p:ph idx="1" type="body"/>
@@ -16705,10 +15889,6 @@
               </a:rPr>
               <a:t>https://uni1.de/amos/index</a:t>
             </a:r>
-            <a:r>
-              <a:rPr lang="en"/>
-              <a:t>  </a:t>
-            </a:r>
             <a:endParaRPr/>
           </a:p>
         </p:txBody>
@@ -16951,7 +16131,7 @@
             <a:tbl>
               <a:tblPr>
                 <a:noFill/>
-                <a:tableStyleId>{35EA63D6-A762-40CD-ABB6-6063135DE736}</a:tableStyleId>
+                <a:tableStyleId>{1CE731DB-C362-47D9-A89E-9B6CF7A3CDFC}</a:tableStyleId>
               </a:tblPr>
               <a:tblGrid>
                 <a:gridCol w="1432550"/>
@@ -18791,6 +17971,285 @@
 </file>
 
 <file path=ppt/theme/theme1.xml><?xml version="1.0" encoding="utf-8"?>
+<a:theme xmlns:a="http://schemas.openxmlformats.org/drawingml/2006/main" xmlns:r="http://schemas.openxmlformats.org/officeDocument/2006/relationships" name="AMOS Slides Template">
+  <a:themeElements>
+    <a:clrScheme name="Simple Light">
+      <a:dk1>
+        <a:srgbClr val="000000"/>
+      </a:dk1>
+      <a:lt1>
+        <a:srgbClr val="FFFFFF"/>
+      </a:lt1>
+      <a:dk2>
+        <a:srgbClr val="404040"/>
+      </a:dk2>
+      <a:lt2>
+        <a:srgbClr val="808080"/>
+      </a:lt2>
+      <a:accent1>
+        <a:srgbClr val="D0D0D0"/>
+      </a:accent1>
+      <a:accent2>
+        <a:srgbClr val="4169E1"/>
+      </a:accent2>
+      <a:accent3>
+        <a:srgbClr val="D50D01"/>
+      </a:accent3>
+      <a:accent4>
+        <a:srgbClr val="FEB612"/>
+      </a:accent4>
+      <a:accent5>
+        <a:srgbClr val="4CAF50"/>
+      </a:accent5>
+      <a:accent6>
+        <a:srgbClr val="8E44AD"/>
+      </a:accent6>
+      <a:hlink>
+        <a:srgbClr val="34A3C5"/>
+      </a:hlink>
+      <a:folHlink>
+        <a:srgbClr val="0097A7"/>
+      </a:folHlink>
+    </a:clrScheme>
+    <a:fontScheme name="Office">
+      <a:majorFont>
+        <a:latin typeface="Arial"/>
+        <a:ea typeface=""/>
+        <a:cs typeface=""/>
+        <a:font script="Jpan" typeface="ＭＳ Ｐゴシック"/>
+        <a:font script="Hang" typeface="맑은 고딕"/>
+        <a:font script="Hans" typeface="宋体"/>
+        <a:font script="Hant" typeface="新細明體"/>
+        <a:font script="Arab" typeface="Times New Roman"/>
+        <a:font script="Hebr" typeface="Times New Roman"/>
+        <a:font script="Thai" typeface="Angsana New"/>
+        <a:font script="Ethi" typeface="Nyala"/>
+        <a:font script="Beng" typeface="Vrinda"/>
+        <a:font script="Gujr" typeface="Shruti"/>
+        <a:font script="Khmr" typeface="MoolBoran"/>
+        <a:font script="Knda" typeface="Tunga"/>
+        <a:font script="Guru" typeface="Raavi"/>
+        <a:font script="Cans" typeface="Euphemia"/>
+        <a:font script="Cher" typeface="Plantagenet Cherokee"/>
+        <a:font script="Yiii" typeface="Microsoft Yi Baiti"/>
+        <a:font script="Tibt" typeface="Microsoft Himalaya"/>
+        <a:font script="Thaa" typeface="MV Boli"/>
+        <a:font script="Deva" typeface="Mangal"/>
+        <a:font script="Telu" typeface="Gautami"/>
+        <a:font script="Taml" typeface="Latha"/>
+        <a:font script="Syrc" typeface="Estrangelo Edessa"/>
+        <a:font script="Orya" typeface="Kalinga"/>
+        <a:font script="Mlym" typeface="Kartika"/>
+        <a:font script="Laoo" typeface="DokChampa"/>
+        <a:font script="Sinh" typeface="Iskoola Pota"/>
+        <a:font script="Mong" typeface="Mongolian Baiti"/>
+        <a:font script="Viet" typeface="Times New Roman"/>
+        <a:font script="Uigh" typeface="Microsoft Uighur"/>
+        <a:font script="Geor" typeface="Sylfaen"/>
+      </a:majorFont>
+      <a:minorFont>
+        <a:latin typeface="Arial"/>
+        <a:ea typeface=""/>
+        <a:cs typeface=""/>
+        <a:font script="Jpan" typeface="ＭＳ Ｐゴシック"/>
+        <a:font script="Hang" typeface="맑은 고딕"/>
+        <a:font script="Hans" typeface="宋体"/>
+        <a:font script="Hant" typeface="新細明體"/>
+        <a:font script="Arab" typeface="Arial"/>
+        <a:font script="Hebr" typeface="Arial"/>
+        <a:font script="Thai" typeface="Cordia New"/>
+        <a:font script="Ethi" typeface="Nyala"/>
+        <a:font script="Beng" typeface="Vrinda"/>
+        <a:font script="Gujr" typeface="Shruti"/>
+        <a:font script="Khmr" typeface="DaunPenh"/>
+        <a:font script="Knda" typeface="Tunga"/>
+        <a:font script="Guru" typeface="Raavi"/>
+        <a:font script="Cans" typeface="Euphemia"/>
+        <a:font script="Cher" typeface="Plantagenet Cherokee"/>
+        <a:font script="Yiii" typeface="Microsoft Yi Baiti"/>
+        <a:font script="Tibt" typeface="Microsoft Himalaya"/>
+        <a:font script="Thaa" typeface="MV Boli"/>
+        <a:font script="Deva" typeface="Mangal"/>
+        <a:font script="Telu" typeface="Gautami"/>
+        <a:font script="Taml" typeface="Latha"/>
+        <a:font script="Syrc" typeface="Estrangelo Edessa"/>
+        <a:font script="Orya" typeface="Kalinga"/>
+        <a:font script="Mlym" typeface="Kartika"/>
+        <a:font script="Laoo" typeface="DokChampa"/>
+        <a:font script="Sinh" typeface="Iskoola Pota"/>
+        <a:font script="Mong" typeface="Mongolian Baiti"/>
+        <a:font script="Viet" typeface="Arial"/>
+        <a:font script="Uigh" typeface="Microsoft Uighur"/>
+        <a:font script="Geor" typeface="Sylfaen"/>
+      </a:minorFont>
+    </a:fontScheme>
+    <a:fmtScheme name="Office">
+      <a:fillStyleLst>
+        <a:solidFill>
+          <a:schemeClr val="phClr"/>
+        </a:solidFill>
+        <a:gradFill rotWithShape="1">
+          <a:gsLst>
+            <a:gs pos="0">
+              <a:schemeClr val="phClr">
+                <a:tint val="50000"/>
+                <a:satMod val="300000"/>
+              </a:schemeClr>
+            </a:gs>
+            <a:gs pos="35000">
+              <a:schemeClr val="phClr">
+                <a:tint val="37000"/>
+                <a:satMod val="300000"/>
+              </a:schemeClr>
+            </a:gs>
+            <a:gs pos="100000">
+              <a:schemeClr val="phClr">
+                <a:tint val="15000"/>
+                <a:satMod val="350000"/>
+              </a:schemeClr>
+            </a:gs>
+          </a:gsLst>
+          <a:lin ang="16200000" scaled="1"/>
+        </a:gradFill>
+        <a:gradFill rotWithShape="1">
+          <a:gsLst>
+            <a:gs pos="0">
+              <a:schemeClr val="phClr">
+                <a:tint val="100000"/>
+                <a:shade val="100000"/>
+                <a:satMod val="130000"/>
+              </a:schemeClr>
+            </a:gs>
+            <a:gs pos="100000">
+              <a:schemeClr val="phClr">
+                <a:tint val="50000"/>
+                <a:shade val="100000"/>
+                <a:satMod val="350000"/>
+              </a:schemeClr>
+            </a:gs>
+          </a:gsLst>
+          <a:lin ang="16200000" scaled="0"/>
+        </a:gradFill>
+      </a:fillStyleLst>
+      <a:lnStyleLst>
+        <a:ln w="9525" cap="flat" cmpd="sng" algn="ctr">
+          <a:solidFill>
+            <a:schemeClr val="phClr">
+              <a:shade val="95000"/>
+              <a:satMod val="105000"/>
+            </a:schemeClr>
+          </a:solidFill>
+          <a:prstDash val="solid"/>
+        </a:ln>
+        <a:ln w="25400" cap="flat" cmpd="sng" algn="ctr">
+          <a:solidFill>
+            <a:schemeClr val="phClr"/>
+          </a:solidFill>
+          <a:prstDash val="solid"/>
+        </a:ln>
+        <a:ln w="38100" cap="flat" cmpd="sng" algn="ctr">
+          <a:solidFill>
+            <a:schemeClr val="phClr"/>
+          </a:solidFill>
+          <a:prstDash val="solid"/>
+        </a:ln>
+      </a:lnStyleLst>
+      <a:effectStyleLst>
+        <a:effectStyle>
+          <a:effectLst>
+            <a:outerShdw blurRad="40000" dist="20000" dir="5400000" rotWithShape="0">
+              <a:srgbClr val="000000">
+                <a:alpha val="38000"/>
+              </a:srgbClr>
+            </a:outerShdw>
+          </a:effectLst>
+        </a:effectStyle>
+        <a:effectStyle>
+          <a:effectLst>
+            <a:outerShdw blurRad="40000" dist="23000" dir="5400000" rotWithShape="0">
+              <a:srgbClr val="000000">
+                <a:alpha val="35000"/>
+              </a:srgbClr>
+            </a:outerShdw>
+          </a:effectLst>
+        </a:effectStyle>
+        <a:effectStyle>
+          <a:effectLst>
+            <a:outerShdw blurRad="40000" dist="23000" dir="5400000" rotWithShape="0">
+              <a:srgbClr val="000000">
+                <a:alpha val="35000"/>
+              </a:srgbClr>
+            </a:outerShdw>
+          </a:effectLst>
+          <a:scene3d>
+            <a:camera prst="orthographicFront">
+              <a:rot lat="0" lon="0" rev="0"/>
+            </a:camera>
+            <a:lightRig rig="threePt" dir="t">
+              <a:rot lat="0" lon="0" rev="1200000"/>
+            </a:lightRig>
+          </a:scene3d>
+          <a:sp3d>
+            <a:bevelT w="63500" h="25400"/>
+          </a:sp3d>
+        </a:effectStyle>
+      </a:effectStyleLst>
+      <a:bgFillStyleLst>
+        <a:solidFill>
+          <a:schemeClr val="phClr"/>
+        </a:solidFill>
+        <a:gradFill rotWithShape="1">
+          <a:gsLst>
+            <a:gs pos="0">
+              <a:schemeClr val="phClr">
+                <a:tint val="40000"/>
+                <a:satMod val="350000"/>
+              </a:schemeClr>
+            </a:gs>
+            <a:gs pos="40000">
+              <a:schemeClr val="phClr">
+                <a:tint val="45000"/>
+                <a:shade val="99000"/>
+                <a:satMod val="350000"/>
+              </a:schemeClr>
+            </a:gs>
+            <a:gs pos="100000">
+              <a:schemeClr val="phClr">
+                <a:shade val="20000"/>
+                <a:satMod val="255000"/>
+              </a:schemeClr>
+            </a:gs>
+          </a:gsLst>
+          <a:path path="circle">
+            <a:fillToRect l="50000" t="-80000" r="50000" b="180000"/>
+          </a:path>
+        </a:gradFill>
+        <a:gradFill rotWithShape="1">
+          <a:gsLst>
+            <a:gs pos="0">
+              <a:schemeClr val="phClr">
+                <a:tint val="80000"/>
+                <a:satMod val="300000"/>
+              </a:schemeClr>
+            </a:gs>
+            <a:gs pos="100000">
+              <a:schemeClr val="phClr">
+                <a:shade val="30000"/>
+                <a:satMod val="200000"/>
+              </a:schemeClr>
+            </a:gs>
+          </a:gsLst>
+          <a:path path="circle">
+            <a:fillToRect l="50000" t="50000" r="50000" b="50000"/>
+          </a:path>
+        </a:gradFill>
+      </a:bgFillStyleLst>
+    </a:fmtScheme>
+  </a:themeElements>
+</a:theme>
+</file>
+
+<file path=ppt/theme/theme2.xml><?xml version="1.0" encoding="utf-8"?>
 <a:theme xmlns:a="http://schemas.openxmlformats.org/drawingml/2006/main" xmlns:r="http://schemas.openxmlformats.org/officeDocument/2006/relationships">
   <a:themeElements>
     <a:clrScheme name="Default">
@@ -19067,283 +18526,4 @@
     </a:fmtScheme>
   </a:themeElements>
 </a:theme>
-</file>
-
-<file path=ppt/theme/theme2.xml><?xml version="1.0" encoding="utf-8"?>
-<a:theme xmlns:a="http://schemas.openxmlformats.org/drawingml/2006/main" xmlns:r="http://schemas.openxmlformats.org/officeDocument/2006/relationships" name="AMOS Slides Template">
-  <a:themeElements>
-    <a:clrScheme name="Simple Light">
-      <a:dk1>
-        <a:srgbClr val="000000"/>
-      </a:dk1>
-      <a:lt1>
-        <a:srgbClr val="FFFFFF"/>
-      </a:lt1>
-      <a:dk2>
-        <a:srgbClr val="404040"/>
-      </a:dk2>
-      <a:lt2>
-        <a:srgbClr val="808080"/>
-      </a:lt2>
-      <a:accent1>
-        <a:srgbClr val="D0D0D0"/>
-      </a:accent1>
-      <a:accent2>
-        <a:srgbClr val="4169E1"/>
-      </a:accent2>
-      <a:accent3>
-        <a:srgbClr val="D50D01"/>
-      </a:accent3>
-      <a:accent4>
-        <a:srgbClr val="FEB612"/>
-      </a:accent4>
-      <a:accent5>
-        <a:srgbClr val="4CAF50"/>
-      </a:accent5>
-      <a:accent6>
-        <a:srgbClr val="8E44AD"/>
-      </a:accent6>
-      <a:hlink>
-        <a:srgbClr val="34A3C5"/>
-      </a:hlink>
-      <a:folHlink>
-        <a:srgbClr val="0097A7"/>
-      </a:folHlink>
-    </a:clrScheme>
-    <a:fontScheme name="Office">
-      <a:majorFont>
-        <a:latin typeface="Arial"/>
-        <a:ea typeface=""/>
-        <a:cs typeface=""/>
-        <a:font script="Jpan" typeface="ＭＳ Ｐゴシック"/>
-        <a:font script="Hang" typeface="맑은 고딕"/>
-        <a:font script="Hans" typeface="宋体"/>
-        <a:font script="Hant" typeface="新細明體"/>
-        <a:font script="Arab" typeface="Times New Roman"/>
-        <a:font script="Hebr" typeface="Times New Roman"/>
-        <a:font script="Thai" typeface="Angsana New"/>
-        <a:font script="Ethi" typeface="Nyala"/>
-        <a:font script="Beng" typeface="Vrinda"/>
-        <a:font script="Gujr" typeface="Shruti"/>
-        <a:font script="Khmr" typeface="MoolBoran"/>
-        <a:font script="Knda" typeface="Tunga"/>
-        <a:font script="Guru" typeface="Raavi"/>
-        <a:font script="Cans" typeface="Euphemia"/>
-        <a:font script="Cher" typeface="Plantagenet Cherokee"/>
-        <a:font script="Yiii" typeface="Microsoft Yi Baiti"/>
-        <a:font script="Tibt" typeface="Microsoft Himalaya"/>
-        <a:font script="Thaa" typeface="MV Boli"/>
-        <a:font script="Deva" typeface="Mangal"/>
-        <a:font script="Telu" typeface="Gautami"/>
-        <a:font script="Taml" typeface="Latha"/>
-        <a:font script="Syrc" typeface="Estrangelo Edessa"/>
-        <a:font script="Orya" typeface="Kalinga"/>
-        <a:font script="Mlym" typeface="Kartika"/>
-        <a:font script="Laoo" typeface="DokChampa"/>
-        <a:font script="Sinh" typeface="Iskoola Pota"/>
-        <a:font script="Mong" typeface="Mongolian Baiti"/>
-        <a:font script="Viet" typeface="Times New Roman"/>
-        <a:font script="Uigh" typeface="Microsoft Uighur"/>
-        <a:font script="Geor" typeface="Sylfaen"/>
-      </a:majorFont>
-      <a:minorFont>
-        <a:latin typeface="Arial"/>
-        <a:ea typeface=""/>
-        <a:cs typeface=""/>
-        <a:font script="Jpan" typeface="ＭＳ Ｐゴシック"/>
-        <a:font script="Hang" typeface="맑은 고딕"/>
-        <a:font script="Hans" typeface="宋体"/>
-        <a:font script="Hant" typeface="新細明體"/>
-        <a:font script="Arab" typeface="Arial"/>
-        <a:font script="Hebr" typeface="Arial"/>
-        <a:font script="Thai" typeface="Cordia New"/>
-        <a:font script="Ethi" typeface="Nyala"/>
-        <a:font script="Beng" typeface="Vrinda"/>
-        <a:font script="Gujr" typeface="Shruti"/>
-        <a:font script="Khmr" typeface="DaunPenh"/>
-        <a:font script="Knda" typeface="Tunga"/>
-        <a:font script="Guru" typeface="Raavi"/>
-        <a:font script="Cans" typeface="Euphemia"/>
-        <a:font script="Cher" typeface="Plantagenet Cherokee"/>
-        <a:font script="Yiii" typeface="Microsoft Yi Baiti"/>
-        <a:font script="Tibt" typeface="Microsoft Himalaya"/>
-        <a:font script="Thaa" typeface="MV Boli"/>
-        <a:font script="Deva" typeface="Mangal"/>
-        <a:font script="Telu" typeface="Gautami"/>
-        <a:font script="Taml" typeface="Latha"/>
-        <a:font script="Syrc" typeface="Estrangelo Edessa"/>
-        <a:font script="Orya" typeface="Kalinga"/>
-        <a:font script="Mlym" typeface="Kartika"/>
-        <a:font script="Laoo" typeface="DokChampa"/>
-        <a:font script="Sinh" typeface="Iskoola Pota"/>
-        <a:font script="Mong" typeface="Mongolian Baiti"/>
-        <a:font script="Viet" typeface="Arial"/>
-        <a:font script="Uigh" typeface="Microsoft Uighur"/>
-        <a:font script="Geor" typeface="Sylfaen"/>
-      </a:minorFont>
-    </a:fontScheme>
-    <a:fmtScheme name="Office">
-      <a:fillStyleLst>
-        <a:solidFill>
-          <a:schemeClr val="phClr"/>
-        </a:solidFill>
-        <a:gradFill rotWithShape="1">
-          <a:gsLst>
-            <a:gs pos="0">
-              <a:schemeClr val="phClr">
-                <a:tint val="50000"/>
-                <a:satMod val="300000"/>
-              </a:schemeClr>
-            </a:gs>
-            <a:gs pos="35000">
-              <a:schemeClr val="phClr">
-                <a:tint val="37000"/>
-                <a:satMod val="300000"/>
-              </a:schemeClr>
-            </a:gs>
-            <a:gs pos="100000">
-              <a:schemeClr val="phClr">
-                <a:tint val="15000"/>
-                <a:satMod val="350000"/>
-              </a:schemeClr>
-            </a:gs>
-          </a:gsLst>
-          <a:lin ang="16200000" scaled="1"/>
-        </a:gradFill>
-        <a:gradFill rotWithShape="1">
-          <a:gsLst>
-            <a:gs pos="0">
-              <a:schemeClr val="phClr">
-                <a:tint val="100000"/>
-                <a:shade val="100000"/>
-                <a:satMod val="130000"/>
-              </a:schemeClr>
-            </a:gs>
-            <a:gs pos="100000">
-              <a:schemeClr val="phClr">
-                <a:tint val="50000"/>
-                <a:shade val="100000"/>
-                <a:satMod val="350000"/>
-              </a:schemeClr>
-            </a:gs>
-          </a:gsLst>
-          <a:lin ang="16200000" scaled="0"/>
-        </a:gradFill>
-      </a:fillStyleLst>
-      <a:lnStyleLst>
-        <a:ln w="9525" cap="flat" cmpd="sng" algn="ctr">
-          <a:solidFill>
-            <a:schemeClr val="phClr">
-              <a:shade val="95000"/>
-              <a:satMod val="105000"/>
-            </a:schemeClr>
-          </a:solidFill>
-          <a:prstDash val="solid"/>
-        </a:ln>
-        <a:ln w="25400" cap="flat" cmpd="sng" algn="ctr">
-          <a:solidFill>
-            <a:schemeClr val="phClr"/>
-          </a:solidFill>
-          <a:prstDash val="solid"/>
-        </a:ln>
-        <a:ln w="38100" cap="flat" cmpd="sng" algn="ctr">
-          <a:solidFill>
-            <a:schemeClr val="phClr"/>
-          </a:solidFill>
-          <a:prstDash val="solid"/>
-        </a:ln>
-      </a:lnStyleLst>
-      <a:effectStyleLst>
-        <a:effectStyle>
-          <a:effectLst>
-            <a:outerShdw blurRad="40000" dist="20000" dir="5400000" rotWithShape="0">
-              <a:srgbClr val="000000">
-                <a:alpha val="38000"/>
-              </a:srgbClr>
-            </a:outerShdw>
-          </a:effectLst>
-        </a:effectStyle>
-        <a:effectStyle>
-          <a:effectLst>
-            <a:outerShdw blurRad="40000" dist="23000" dir="5400000" rotWithShape="0">
-              <a:srgbClr val="000000">
-                <a:alpha val="35000"/>
-              </a:srgbClr>
-            </a:outerShdw>
-          </a:effectLst>
-        </a:effectStyle>
-        <a:effectStyle>
-          <a:effectLst>
-            <a:outerShdw blurRad="40000" dist="23000" dir="5400000" rotWithShape="0">
-              <a:srgbClr val="000000">
-                <a:alpha val="35000"/>
-              </a:srgbClr>
-            </a:outerShdw>
-          </a:effectLst>
-          <a:scene3d>
-            <a:camera prst="orthographicFront">
-              <a:rot lat="0" lon="0" rev="0"/>
-            </a:camera>
-            <a:lightRig rig="threePt" dir="t">
-              <a:rot lat="0" lon="0" rev="1200000"/>
-            </a:lightRig>
-          </a:scene3d>
-          <a:sp3d>
-            <a:bevelT w="63500" h="25400"/>
-          </a:sp3d>
-        </a:effectStyle>
-      </a:effectStyleLst>
-      <a:bgFillStyleLst>
-        <a:solidFill>
-          <a:schemeClr val="phClr"/>
-        </a:solidFill>
-        <a:gradFill rotWithShape="1">
-          <a:gsLst>
-            <a:gs pos="0">
-              <a:schemeClr val="phClr">
-                <a:tint val="40000"/>
-                <a:satMod val="350000"/>
-              </a:schemeClr>
-            </a:gs>
-            <a:gs pos="40000">
-              <a:schemeClr val="phClr">
-                <a:tint val="45000"/>
-                <a:shade val="99000"/>
-                <a:satMod val="350000"/>
-              </a:schemeClr>
-            </a:gs>
-            <a:gs pos="100000">
-              <a:schemeClr val="phClr">
-                <a:shade val="20000"/>
-                <a:satMod val="255000"/>
-              </a:schemeClr>
-            </a:gs>
-          </a:gsLst>
-          <a:path path="circle">
-            <a:fillToRect l="50000" t="-80000" r="50000" b="180000"/>
-          </a:path>
-        </a:gradFill>
-        <a:gradFill rotWithShape="1">
-          <a:gsLst>
-            <a:gs pos="0">
-              <a:schemeClr val="phClr">
-                <a:tint val="80000"/>
-                <a:satMod val="300000"/>
-              </a:schemeClr>
-            </a:gs>
-            <a:gs pos="100000">
-              <a:schemeClr val="phClr">
-                <a:shade val="30000"/>
-                <a:satMod val="200000"/>
-              </a:schemeClr>
-            </a:gs>
-          </a:gsLst>
-          <a:path path="circle">
-            <a:fillToRect l="50000" t="50000" r="50000" b="50000"/>
-          </a:path>
-        </a:gradFill>
-      </a:bgFillStyleLst>
-    </a:fmtScheme>
-  </a:themeElements>
-</a:theme>
 </file>
</xml_diff>

<commit_message>
Core lectures finished for AMOS-24 (summer 2025)
</commit_message>
<xml_diff>
--- a/Lecture slides/AMOS A01 - Introduction.pptx
+++ b/Lecture slides/AMOS A01 - Introduction.pptx
@@ -7082,7 +7082,7 @@
             <a:tbl>
               <a:tblPr>
                 <a:noFill/>
-                <a:tableStyleId>{1CE731DB-C362-47D9-A89E-9B6CF7A3CDFC}</a:tableStyleId>
+                <a:tableStyleId>{171BF2ED-3E72-4A0D-AFD7-E7312A3A811C}</a:tableStyleId>
               </a:tblPr>
               <a:tblGrid>
                 <a:gridCol w="1432550"/>
@@ -16131,7 +16131,7 @@
             <a:tbl>
               <a:tblPr>
                 <a:noFill/>
-                <a:tableStyleId>{1CE731DB-C362-47D9-A89E-9B6CF7A3CDFC}</a:tableStyleId>
+                <a:tableStyleId>{171BF2ED-3E72-4A0D-AFD7-E7312A3A811C}</a:tableStyleId>
               </a:tblPr>
               <a:tblGrid>
                 <a:gridCol w="1432550"/>

</xml_diff>